<commit_message>
Adds some more slides and notes to the presentation.
</commit_message>
<xml_diff>
--- a/Current/Azure The Good Parts Web Apps/AzureTheGoodParts-WebApps.pptx
+++ b/Current/Azure The Good Parts Web Apps/AzureTheGoodParts-WebApps.pptx
@@ -19,10 +19,15 @@
     <p:sldId id="266" r:id="rId13"/>
     <p:sldId id="267" r:id="rId14"/>
     <p:sldId id="268" r:id="rId15"/>
-    <p:sldId id="269" r:id="rId16"/>
-    <p:sldId id="270" r:id="rId17"/>
-    <p:sldId id="271" r:id="rId18"/>
-    <p:sldId id="272" r:id="rId19"/>
+    <p:sldId id="273" r:id="rId16"/>
+    <p:sldId id="269" r:id="rId17"/>
+    <p:sldId id="270" r:id="rId18"/>
+    <p:sldId id="271" r:id="rId19"/>
+    <p:sldId id="272" r:id="rId20"/>
+    <p:sldId id="274" r:id="rId21"/>
+    <p:sldId id="275" r:id="rId22"/>
+    <p:sldId id="276" r:id="rId23"/>
+    <p:sldId id="277" r:id="rId24"/>
   </p:sldIdLst>
   <p:sldSz cx="9144000" cy="6858000" type="screen4x3"/>
   <p:notesSz cx="6858000" cy="9144000"/>
@@ -271,7 +276,7 @@
           <a:p>
             <a:fld id="{8A04FFFD-6AAA-4290-B9C8-6140E8302CD5}" type="datetimeFigureOut">
               <a:rPr lang="en-GB" smtClean="0"/>
-              <a:t>12/07/2015</a:t>
+              <a:t>24/07/2015</a:t>
             </a:fld>
             <a:endParaRPr lang="en-GB"/>
           </a:p>
@@ -441,7 +446,7 @@
           <a:p>
             <a:fld id="{8A04FFFD-6AAA-4290-B9C8-6140E8302CD5}" type="datetimeFigureOut">
               <a:rPr lang="en-GB" smtClean="0"/>
-              <a:t>12/07/2015</a:t>
+              <a:t>24/07/2015</a:t>
             </a:fld>
             <a:endParaRPr lang="en-GB"/>
           </a:p>
@@ -621,7 +626,7 @@
           <a:p>
             <a:fld id="{8A04FFFD-6AAA-4290-B9C8-6140E8302CD5}" type="datetimeFigureOut">
               <a:rPr lang="en-GB" smtClean="0"/>
-              <a:t>12/07/2015</a:t>
+              <a:t>24/07/2015</a:t>
             </a:fld>
             <a:endParaRPr lang="en-GB"/>
           </a:p>
@@ -1365,7 +1370,7 @@
           <a:p>
             <a:fld id="{8A04FFFD-6AAA-4290-B9C8-6140E8302CD5}" type="datetimeFigureOut">
               <a:rPr lang="en-GB" smtClean="0"/>
-              <a:t>12/07/2015</a:t>
+              <a:t>24/07/2015</a:t>
             </a:fld>
             <a:endParaRPr lang="en-GB"/>
           </a:p>
@@ -1609,7 +1614,7 @@
           <a:p>
             <a:fld id="{8A04FFFD-6AAA-4290-B9C8-6140E8302CD5}" type="datetimeFigureOut">
               <a:rPr lang="en-GB" smtClean="0"/>
-              <a:t>12/07/2015</a:t>
+              <a:t>24/07/2015</a:t>
             </a:fld>
             <a:endParaRPr lang="en-GB"/>
           </a:p>
@@ -1841,7 +1846,7 @@
           <a:p>
             <a:fld id="{8A04FFFD-6AAA-4290-B9C8-6140E8302CD5}" type="datetimeFigureOut">
               <a:rPr lang="en-GB" smtClean="0"/>
-              <a:t>12/07/2015</a:t>
+              <a:t>24/07/2015</a:t>
             </a:fld>
             <a:endParaRPr lang="en-GB"/>
           </a:p>
@@ -2208,7 +2213,7 @@
           <a:p>
             <a:fld id="{8A04FFFD-6AAA-4290-B9C8-6140E8302CD5}" type="datetimeFigureOut">
               <a:rPr lang="en-GB" smtClean="0"/>
-              <a:t>12/07/2015</a:t>
+              <a:t>24/07/2015</a:t>
             </a:fld>
             <a:endParaRPr lang="en-GB"/>
           </a:p>
@@ -2326,7 +2331,7 @@
           <a:p>
             <a:fld id="{8A04FFFD-6AAA-4290-B9C8-6140E8302CD5}" type="datetimeFigureOut">
               <a:rPr lang="en-GB" smtClean="0"/>
-              <a:t>12/07/2015</a:t>
+              <a:t>24/07/2015</a:t>
             </a:fld>
             <a:endParaRPr lang="en-GB"/>
           </a:p>
@@ -2421,7 +2426,7 @@
           <a:p>
             <a:fld id="{8A04FFFD-6AAA-4290-B9C8-6140E8302CD5}" type="datetimeFigureOut">
               <a:rPr lang="en-GB" smtClean="0"/>
-              <a:t>12/07/2015</a:t>
+              <a:t>24/07/2015</a:t>
             </a:fld>
             <a:endParaRPr lang="en-GB"/>
           </a:p>
@@ -2698,7 +2703,7 @@
           <a:p>
             <a:fld id="{8A04FFFD-6AAA-4290-B9C8-6140E8302CD5}" type="datetimeFigureOut">
               <a:rPr lang="en-GB" smtClean="0"/>
-              <a:t>12/07/2015</a:t>
+              <a:t>24/07/2015</a:t>
             </a:fld>
             <a:endParaRPr lang="en-GB"/>
           </a:p>
@@ -2955,7 +2960,7 @@
           <a:p>
             <a:fld id="{8A04FFFD-6AAA-4290-B9C8-6140E8302CD5}" type="datetimeFigureOut">
               <a:rPr lang="en-GB" smtClean="0"/>
-              <a:t>12/07/2015</a:t>
+              <a:t>24/07/2015</a:t>
             </a:fld>
             <a:endParaRPr lang="en-GB"/>
           </a:p>
@@ -3177,7 +3182,7 @@
           <a:p>
             <a:fld id="{8A04FFFD-6AAA-4290-B9C8-6140E8302CD5}" type="datetimeFigureOut">
               <a:rPr lang="en-GB" smtClean="0"/>
-              <a:t>12/07/2015</a:t>
+              <a:t>24/07/2015</a:t>
             </a:fld>
             <a:endParaRPr lang="en-GB"/>
           </a:p>
@@ -4364,12 +4369,12 @@
         </p:nvSpPr>
         <p:spPr>
           <a:xfrm>
-            <a:off x="1475656" y="1340768"/>
-            <a:ext cx="6048672" cy="4752528"/>
+            <a:off x="1475656" y="1664804"/>
+            <a:ext cx="6048672" cy="3528392"/>
           </a:xfrm>
         </p:spPr>
         <p:txBody>
-          <a:bodyPr/>
+          <a:bodyPr anchor="ctr" anchorCtr="1"/>
           <a:lstStyle/>
           <a:p>
             <a:pPr marL="0" indent="0">
@@ -4387,11 +4392,6 @@
               </a:rPr>
               <a:t>SQL differences</a:t>
             </a:r>
-          </a:p>
-          <a:p>
-            <a:endParaRPr lang="en-GB" sz="2000" cap="none" dirty="0" smtClean="0">
-              <a:latin typeface="Georgia" panose="02040502050405020303" pitchFamily="18" charset="0"/>
-            </a:endParaRPr>
           </a:p>
           <a:p>
             <a:endParaRPr lang="en-GB" sz="2000" cap="none" dirty="0" smtClean="0">
@@ -4408,7 +4408,13 @@
               <a:rPr lang="en-GB" sz="2000" cap="none" dirty="0" smtClean="0">
                 <a:latin typeface="Georgia" panose="02040502050405020303" pitchFamily="18" charset="0"/>
               </a:rPr>
-              <a:t>All Azure SQL tables must have a clustered index.</a:t>
+              <a:t>All </a:t>
+            </a:r>
+            <a:r>
+              <a:rPr lang="en-GB" sz="2000" cap="none" dirty="0" smtClean="0">
+                <a:latin typeface="Georgia" panose="02040502050405020303" pitchFamily="18" charset="0"/>
+              </a:rPr>
+              <a:t>Azure SQL tables must have a clustered index.</a:t>
             </a:r>
           </a:p>
           <a:p>
@@ -4502,6 +4508,303 @@
 </file>
 
 <file path=ppt/slides/slide14.xml><?xml version="1.0" encoding="utf-8"?>
+<p:sld xmlns:a="http://schemas.openxmlformats.org/drawingml/2006/main" xmlns:r="http://schemas.openxmlformats.org/officeDocument/2006/relationships" xmlns:p="http://schemas.openxmlformats.org/presentationml/2006/main">
+  <p:cSld>
+    <p:spTree>
+      <p:nvGrpSpPr>
+        <p:cNvPr id="1" name=""/>
+        <p:cNvGrpSpPr/>
+        <p:nvPr/>
+      </p:nvGrpSpPr>
+      <p:grpSpPr>
+        <a:xfrm>
+          <a:off x="0" y="0"/>
+          <a:ext cx="0" cy="0"/>
+          <a:chOff x="0" y="0"/>
+          <a:chExt cx="0" cy="0"/>
+        </a:xfrm>
+      </p:grpSpPr>
+      <p:sp>
+        <p:nvSpPr>
+          <p:cNvPr id="4" name="Title 3"/>
+          <p:cNvSpPr>
+            <a:spLocks noGrp="1"/>
+          </p:cNvSpPr>
+          <p:nvPr>
+            <p:ph type="title"/>
+          </p:nvPr>
+        </p:nvSpPr>
+        <p:spPr>
+          <a:xfrm>
+            <a:off x="0" y="126000"/>
+            <a:ext cx="9143999" cy="758221"/>
+          </a:xfrm>
+        </p:spPr>
+        <p:txBody>
+          <a:bodyPr tIns="46800" anchor="ctr" anchorCtr="1">
+            <a:spAutoFit/>
+          </a:bodyPr>
+          <a:lstStyle/>
+          <a:p>
+            <a:r>
+              <a:rPr lang="en-GB" dirty="0" err="1" smtClean="0"/>
+              <a:t>DocumentDB</a:t>
+            </a:r>
+            <a:endParaRPr lang="en-GB" dirty="0"/>
+          </a:p>
+        </p:txBody>
+      </p:sp>
+      <p:sp>
+        <p:nvSpPr>
+          <p:cNvPr id="5" name="TextBox 4"/>
+          <p:cNvSpPr txBox="1"/>
+          <p:nvPr/>
+        </p:nvSpPr>
+        <p:spPr>
+          <a:xfrm>
+            <a:off x="2303748" y="1374592"/>
+            <a:ext cx="4536504" cy="4108817"/>
+          </a:xfrm>
+          <a:prstGeom prst="rect">
+            <a:avLst/>
+          </a:prstGeom>
+          <a:noFill/>
+        </p:spPr>
+        <p:txBody>
+          <a:bodyPr wrap="square" rtlCol="0">
+            <a:spAutoFit/>
+          </a:bodyPr>
+          <a:lstStyle/>
+          <a:p>
+            <a:pPr marL="285750" indent="-285750">
+              <a:lnSpc>
+                <a:spcPct val="150000"/>
+              </a:lnSpc>
+              <a:buFont typeface="Arial" panose="020B0604020202020204" pitchFamily="34" charset="0"/>
+              <a:buChar char="•"/>
+            </a:pPr>
+            <a:r>
+              <a:rPr lang="en-GB" dirty="0" smtClean="0">
+                <a:latin typeface="Georgia" panose="02040502050405020303" pitchFamily="18" charset="0"/>
+              </a:rPr>
+              <a:t>Fast</a:t>
+            </a:r>
+          </a:p>
+          <a:p>
+            <a:pPr marL="285750" indent="-285750">
+              <a:lnSpc>
+                <a:spcPct val="150000"/>
+              </a:lnSpc>
+              <a:buFont typeface="Arial" panose="020B0604020202020204" pitchFamily="34" charset="0"/>
+              <a:buChar char="•"/>
+            </a:pPr>
+            <a:r>
+              <a:rPr lang="en-GB" dirty="0" smtClean="0">
+                <a:latin typeface="Georgia" panose="02040502050405020303" pitchFamily="18" charset="0"/>
+              </a:rPr>
+              <a:t>Scalable</a:t>
+            </a:r>
+          </a:p>
+          <a:p>
+            <a:pPr marL="285750" indent="-285750">
+              <a:lnSpc>
+                <a:spcPct val="150000"/>
+              </a:lnSpc>
+              <a:buFont typeface="Arial" panose="020B0604020202020204" pitchFamily="34" charset="0"/>
+              <a:buChar char="•"/>
+            </a:pPr>
+            <a:r>
+              <a:rPr lang="en-GB" dirty="0" err="1" smtClean="0">
+                <a:latin typeface="Georgia" panose="02040502050405020303" pitchFamily="18" charset="0"/>
+              </a:rPr>
+              <a:t>Queryable</a:t>
+            </a:r>
+            <a:r>
+              <a:rPr lang="en-GB" dirty="0" smtClean="0">
+                <a:latin typeface="Georgia" panose="02040502050405020303" pitchFamily="18" charset="0"/>
+              </a:rPr>
+              <a:t> with SQL</a:t>
+            </a:r>
+          </a:p>
+          <a:p>
+            <a:pPr marL="285750" indent="-285750">
+              <a:lnSpc>
+                <a:spcPct val="150000"/>
+              </a:lnSpc>
+              <a:buFont typeface="Arial" panose="020B0604020202020204" pitchFamily="34" charset="0"/>
+              <a:buChar char="•"/>
+            </a:pPr>
+            <a:r>
+              <a:rPr lang="en-GB" dirty="0" smtClean="0">
+                <a:latin typeface="Georgia" panose="02040502050405020303" pitchFamily="18" charset="0"/>
+              </a:rPr>
+              <a:t>Deep integration with </a:t>
+            </a:r>
+            <a:r>
+              <a:rPr lang="en-GB" dirty="0" err="1" smtClean="0">
+                <a:latin typeface="Georgia" panose="02040502050405020303" pitchFamily="18" charset="0"/>
+              </a:rPr>
+              <a:t>Javascript</a:t>
+            </a:r>
+            <a:endParaRPr lang="en-GB" dirty="0" smtClean="0">
+              <a:latin typeface="Georgia" panose="02040502050405020303" pitchFamily="18" charset="0"/>
+            </a:endParaRPr>
+          </a:p>
+          <a:p>
+            <a:pPr marL="285750" indent="-285750">
+              <a:lnSpc>
+                <a:spcPct val="150000"/>
+              </a:lnSpc>
+              <a:buFont typeface="Arial" panose="020B0604020202020204" pitchFamily="34" charset="0"/>
+              <a:buChar char="•"/>
+            </a:pPr>
+            <a:r>
+              <a:rPr lang="en-GB" dirty="0" smtClean="0">
+                <a:latin typeface="Georgia" panose="02040502050405020303" pitchFamily="18" charset="0"/>
+              </a:rPr>
+              <a:t>Familiar features</a:t>
+            </a:r>
+          </a:p>
+          <a:p>
+            <a:pPr marL="742950" lvl="1" indent="-285750">
+              <a:lnSpc>
+                <a:spcPct val="150000"/>
+              </a:lnSpc>
+              <a:buFont typeface="Arial" panose="020B0604020202020204" pitchFamily="34" charset="0"/>
+              <a:buChar char="•"/>
+            </a:pPr>
+            <a:r>
+              <a:rPr lang="en-GB" dirty="0" smtClean="0">
+                <a:latin typeface="Georgia" panose="02040502050405020303" pitchFamily="18" charset="0"/>
+              </a:rPr>
+              <a:t>Stored Procedures</a:t>
+            </a:r>
+            <a:endParaRPr lang="en-GB" dirty="0">
+              <a:latin typeface="Georgia" panose="02040502050405020303" pitchFamily="18" charset="0"/>
+            </a:endParaRPr>
+          </a:p>
+          <a:p>
+            <a:pPr marL="742950" lvl="1" indent="-285750">
+              <a:lnSpc>
+                <a:spcPct val="150000"/>
+              </a:lnSpc>
+              <a:buFont typeface="Arial" panose="020B0604020202020204" pitchFamily="34" charset="0"/>
+              <a:buChar char="•"/>
+            </a:pPr>
+            <a:r>
+              <a:rPr lang="en-GB" dirty="0" smtClean="0">
+                <a:latin typeface="Georgia" panose="02040502050405020303" pitchFamily="18" charset="0"/>
+              </a:rPr>
+              <a:t>Triggers</a:t>
+            </a:r>
+          </a:p>
+          <a:p>
+            <a:pPr marL="742950" lvl="1" indent="-285750">
+              <a:lnSpc>
+                <a:spcPct val="150000"/>
+              </a:lnSpc>
+              <a:buFont typeface="Arial" panose="020B0604020202020204" pitchFamily="34" charset="0"/>
+              <a:buChar char="•"/>
+            </a:pPr>
+            <a:r>
+              <a:rPr lang="en-GB" dirty="0" smtClean="0">
+                <a:latin typeface="Georgia" panose="02040502050405020303" pitchFamily="18" charset="0"/>
+              </a:rPr>
+              <a:t>UDFs</a:t>
+            </a:r>
+          </a:p>
+          <a:p>
+            <a:pPr marL="742950" lvl="1" indent="-285750">
+              <a:lnSpc>
+                <a:spcPct val="150000"/>
+              </a:lnSpc>
+              <a:buFont typeface="Arial" panose="020B0604020202020204" pitchFamily="34" charset="0"/>
+              <a:buChar char="•"/>
+            </a:pPr>
+            <a:r>
+              <a:rPr lang="en-GB" dirty="0" smtClean="0">
+                <a:latin typeface="Georgia" panose="02040502050405020303" pitchFamily="18" charset="0"/>
+              </a:rPr>
+              <a:t>Indexes</a:t>
+            </a:r>
+          </a:p>
+          <a:p>
+            <a:pPr marL="285750" indent="-285750">
+              <a:buFont typeface="Arial" panose="020B0604020202020204" pitchFamily="34" charset="0"/>
+              <a:buChar char="•"/>
+            </a:pPr>
+            <a:endParaRPr lang="en-GB" dirty="0"/>
+          </a:p>
+        </p:txBody>
+      </p:sp>
+      <p:sp>
+        <p:nvSpPr>
+          <p:cNvPr id="6" name="TextBox 5"/>
+          <p:cNvSpPr txBox="1"/>
+          <p:nvPr/>
+        </p:nvSpPr>
+        <p:spPr>
+          <a:xfrm>
+            <a:off x="482579" y="5877272"/>
+            <a:ext cx="8178842" cy="307777"/>
+          </a:xfrm>
+          <a:prstGeom prst="rect">
+            <a:avLst/>
+          </a:prstGeom>
+          <a:noFill/>
+        </p:spPr>
+        <p:txBody>
+          <a:bodyPr wrap="none" rtlCol="0">
+            <a:spAutoFit/>
+          </a:bodyPr>
+          <a:lstStyle/>
+          <a:p>
+            <a:r>
+              <a:rPr lang="en-GB" sz="1400" dirty="0">
+                <a:latin typeface="Georgia" panose="02040502050405020303" pitchFamily="18" charset="0"/>
+              </a:rPr>
+              <a:t>More info at </a:t>
+            </a:r>
+            <a:r>
+              <a:rPr lang="en-GB" sz="1400" dirty="0">
+                <a:latin typeface="Georgia" panose="02040502050405020303" pitchFamily="18" charset="0"/>
+                <a:hlinkClick r:id="rId2"/>
+              </a:rPr>
+              <a:t>https://azure.microsoft.com/en-gb/documentation/articles/documentdb-introduction</a:t>
+            </a:r>
+            <a:r>
+              <a:rPr lang="en-GB" sz="1400" dirty="0" smtClean="0">
+                <a:latin typeface="Georgia" panose="02040502050405020303" pitchFamily="18" charset="0"/>
+                <a:hlinkClick r:id="rId2"/>
+              </a:rPr>
+              <a:t>/</a:t>
+            </a:r>
+            <a:r>
+              <a:rPr lang="en-GB" sz="1400" dirty="0" smtClean="0">
+                <a:latin typeface="Georgia" panose="02040502050405020303" pitchFamily="18" charset="0"/>
+              </a:rPr>
+              <a:t> </a:t>
+            </a:r>
+            <a:endParaRPr lang="en-GB" sz="1400" dirty="0">
+              <a:latin typeface="Georgia" panose="02040502050405020303" pitchFamily="18" charset="0"/>
+            </a:endParaRPr>
+          </a:p>
+        </p:txBody>
+      </p:sp>
+    </p:spTree>
+    <p:extLst>
+      <p:ext uri="{BB962C8B-B14F-4D97-AF65-F5344CB8AC3E}">
+        <p14:creationId xmlns:p14="http://schemas.microsoft.com/office/powerpoint/2010/main" val="3541034769"/>
+      </p:ext>
+    </p:extLst>
+  </p:cSld>
+  <p:clrMapOvr>
+    <a:masterClrMapping/>
+  </p:clrMapOvr>
+</p:sld>
+</file>
+
+<file path=ppt/slides/slide15.xml><?xml version="1.0" encoding="utf-8"?>
 <p:sld xmlns:a="http://schemas.openxmlformats.org/drawingml/2006/main" xmlns:r="http://schemas.openxmlformats.org/officeDocument/2006/relationships" xmlns:p="http://schemas.openxmlformats.org/presentationml/2006/main">
   <p:cSld>
     <p:spTree>
@@ -4597,7 +4900,7 @@
 </p:sld>
 </file>
 
-<file path=ppt/slides/slide15.xml><?xml version="1.0" encoding="utf-8"?>
+<file path=ppt/slides/slide16.xml><?xml version="1.0" encoding="utf-8"?>
 <p:sld xmlns:a="http://schemas.openxmlformats.org/drawingml/2006/main" xmlns:r="http://schemas.openxmlformats.org/officeDocument/2006/relationships" xmlns:p="http://schemas.openxmlformats.org/presentationml/2006/main">
   <p:cSld>
     <p:spTree>
@@ -4937,7 +5240,7 @@
 </p:sld>
 </file>
 
-<file path=ppt/slides/slide16.xml><?xml version="1.0" encoding="utf-8"?>
+<file path=ppt/slides/slide17.xml><?xml version="1.0" encoding="utf-8"?>
 <p:sld xmlns:a="http://schemas.openxmlformats.org/drawingml/2006/main" xmlns:r="http://schemas.openxmlformats.org/officeDocument/2006/relationships" xmlns:p="http://schemas.openxmlformats.org/presentationml/2006/main">
   <p:cSld>
     <p:spTree>
@@ -5357,7 +5660,7 @@
 </p:sld>
 </file>
 
-<file path=ppt/slides/slide17.xml><?xml version="1.0" encoding="utf-8"?>
+<file path=ppt/slides/slide18.xml><?xml version="1.0" encoding="utf-8"?>
 <p:sld xmlns:a="http://schemas.openxmlformats.org/drawingml/2006/main" xmlns:r="http://schemas.openxmlformats.org/officeDocument/2006/relationships" xmlns:p="http://schemas.openxmlformats.org/presentationml/2006/main">
   <p:cSld>
     <p:spTree>
@@ -6162,6 +6465,133 @@
 </p:sld>
 </file>
 
+<file path=ppt/slides/slide19.xml><?xml version="1.0" encoding="utf-8"?>
+<p:sld xmlns:a="http://schemas.openxmlformats.org/drawingml/2006/main" xmlns:r="http://schemas.openxmlformats.org/officeDocument/2006/relationships" xmlns:p="http://schemas.openxmlformats.org/presentationml/2006/main">
+  <p:cSld>
+    <p:spTree>
+      <p:nvGrpSpPr>
+        <p:cNvPr id="1" name=""/>
+        <p:cNvGrpSpPr/>
+        <p:nvPr/>
+      </p:nvGrpSpPr>
+      <p:grpSpPr>
+        <a:xfrm>
+          <a:off x="0" y="0"/>
+          <a:ext cx="0" cy="0"/>
+          <a:chOff x="0" y="0"/>
+          <a:chExt cx="0" cy="0"/>
+        </a:xfrm>
+      </p:grpSpPr>
+      <p:sp>
+        <p:nvSpPr>
+          <p:cNvPr id="3" name="Text Placeholder 2"/>
+          <p:cNvSpPr>
+            <a:spLocks noGrp="1"/>
+          </p:cNvSpPr>
+          <p:nvPr>
+            <p:ph type="body" sz="quarter" idx="11"/>
+          </p:nvPr>
+        </p:nvSpPr>
+        <p:spPr>
+          <a:xfrm>
+            <a:off x="152833" y="2691036"/>
+            <a:ext cx="8838334" cy="1475928"/>
+          </a:xfrm>
+        </p:spPr>
+        <p:txBody>
+          <a:bodyPr/>
+          <a:lstStyle/>
+          <a:p>
+            <a:pPr marL="0" indent="0" algn="ctr">
+              <a:buNone/>
+            </a:pPr>
+            <a:r>
+              <a:rPr lang="en-GB" sz="1800" cap="none" dirty="0" smtClean="0"/>
+              <a:t>Working </a:t>
+            </a:r>
+            <a:r>
+              <a:rPr lang="en-GB" sz="1800" cap="none" dirty="0"/>
+              <a:t>with 154 million records on Azure Table Storage – the story of “Have I been </a:t>
+            </a:r>
+            <a:r>
+              <a:rPr lang="en-GB" sz="1800" cap="none" dirty="0" err="1"/>
+              <a:t>pwned</a:t>
+            </a:r>
+            <a:r>
+              <a:rPr lang="en-GB" sz="1800" cap="none" dirty="0" smtClean="0"/>
+              <a:t>?” </a:t>
+            </a:r>
+          </a:p>
+          <a:p>
+            <a:pPr marL="0" indent="0" algn="ctr">
+              <a:buNone/>
+            </a:pPr>
+            <a:r>
+              <a:rPr lang="en-GB" sz="1800" cap="none" dirty="0" smtClean="0">
+                <a:solidFill>
+                  <a:srgbClr val="CB623C"/>
+                </a:solidFill>
+              </a:rPr>
+              <a:t>Troy Hunt</a:t>
+            </a:r>
+            <a:endParaRPr lang="en-GB" sz="1800" cap="none" dirty="0">
+              <a:solidFill>
+                <a:srgbClr val="CB623C"/>
+              </a:solidFill>
+            </a:endParaRPr>
+          </a:p>
+          <a:p>
+            <a:pPr marL="0" indent="0" algn="ctr">
+              <a:buNone/>
+            </a:pPr>
+            <a:r>
+              <a:rPr lang="en-GB" sz="1800" cap="none" dirty="0" smtClean="0">
+                <a:latin typeface="Georgia" panose="02040502050405020303" pitchFamily="18" charset="0"/>
+                <a:hlinkClick r:id="rId2"/>
+              </a:rPr>
+              <a:t>http</a:t>
+            </a:r>
+            <a:r>
+              <a:rPr lang="en-GB" sz="1800" cap="none" dirty="0">
+                <a:latin typeface="Georgia" panose="02040502050405020303" pitchFamily="18" charset="0"/>
+                <a:hlinkClick r:id="rId2"/>
+              </a:rPr>
+              <a:t>://</a:t>
+            </a:r>
+            <a:r>
+              <a:rPr lang="en-GB" sz="1800" cap="none" dirty="0" smtClean="0">
+                <a:latin typeface="Georgia" panose="02040502050405020303" pitchFamily="18" charset="0"/>
+                <a:hlinkClick r:id="rId2"/>
+              </a:rPr>
+              <a:t>www.troyhunt.com/2013/12/working-with-154-million-records-on.html</a:t>
+            </a:r>
+            <a:endParaRPr lang="en-GB" sz="1800" cap="none" dirty="0" smtClean="0">
+              <a:latin typeface="Georgia" panose="02040502050405020303" pitchFamily="18" charset="0"/>
+            </a:endParaRPr>
+          </a:p>
+          <a:p>
+            <a:pPr marL="0" indent="0">
+              <a:buNone/>
+            </a:pPr>
+            <a:endParaRPr lang="en-GB" sz="1800" cap="none" dirty="0">
+              <a:latin typeface="Georgia" panose="02040502050405020303" pitchFamily="18" charset="0"/>
+            </a:endParaRPr>
+          </a:p>
+        </p:txBody>
+      </p:sp>
+    </p:spTree>
+    <p:extLst>
+      <p:ext uri="{BB962C8B-B14F-4D97-AF65-F5344CB8AC3E}">
+        <p14:creationId xmlns:p14="http://schemas.microsoft.com/office/powerpoint/2010/main" val="3957108231"/>
+      </p:ext>
+    </p:extLst>
+  </p:cSld>
+  <p:clrMapOvr>
+    <a:masterClrMapping/>
+  </p:clrMapOvr>
+</p:sld>
+</file>
+
 <file path=ppt/slides/slide2.xml><?xml version="1.0" encoding="utf-8"?>
 <p:sld xmlns:a="http://schemas.openxmlformats.org/drawingml/2006/main" xmlns:r="http://schemas.openxmlformats.org/officeDocument/2006/relationships" xmlns:p="http://schemas.openxmlformats.org/presentationml/2006/main">
   <p:cSld>
@@ -6385,6 +6815,1294 @@
       </p:par>
     </p:tnLst>
   </p:timing>
+</p:sld>
+</file>
+
+<file path=ppt/slides/slide20.xml><?xml version="1.0" encoding="utf-8"?>
+<p:sld xmlns:a="http://schemas.openxmlformats.org/drawingml/2006/main" xmlns:r="http://schemas.openxmlformats.org/officeDocument/2006/relationships" xmlns:p="http://schemas.openxmlformats.org/presentationml/2006/main">
+  <p:cSld>
+    <p:spTree>
+      <p:nvGrpSpPr>
+        <p:cNvPr id="1" name=""/>
+        <p:cNvGrpSpPr/>
+        <p:nvPr/>
+      </p:nvGrpSpPr>
+      <p:grpSpPr>
+        <a:xfrm>
+          <a:off x="0" y="0"/>
+          <a:ext cx="0" cy="0"/>
+          <a:chOff x="0" y="0"/>
+          <a:chExt cx="0" cy="0"/>
+        </a:xfrm>
+      </p:grpSpPr>
+      <p:grpSp>
+        <p:nvGrpSpPr>
+          <p:cNvPr id="6" name="Group 5"/>
+          <p:cNvGrpSpPr/>
+          <p:nvPr/>
+        </p:nvGrpSpPr>
+        <p:grpSpPr>
+          <a:xfrm>
+            <a:off x="467544" y="404664"/>
+            <a:ext cx="4810120" cy="780290"/>
+            <a:chOff x="2478285" y="3510335"/>
+            <a:chExt cx="4810120" cy="780290"/>
+          </a:xfrm>
+        </p:grpSpPr>
+        <p:pic>
+          <p:nvPicPr>
+            <p:cNvPr id="7" name="Picture 6"/>
+            <p:cNvPicPr>
+              <a:picLocks noChangeAspect="1"/>
+            </p:cNvPicPr>
+            <p:nvPr/>
+          </p:nvPicPr>
+          <p:blipFill>
+            <a:blip r:embed="rId2" cstate="print">
+              <a:extLst>
+                <a:ext uri="{28A0092B-C50C-407E-A947-70E740481C1C}">
+                  <a14:useLocalDpi xmlns:a14="http://schemas.microsoft.com/office/drawing/2010/main" val="0"/>
+                </a:ext>
+              </a:extLst>
+            </a:blip>
+            <a:stretch>
+              <a:fillRect/>
+            </a:stretch>
+          </p:blipFill>
+          <p:spPr>
+            <a:xfrm>
+              <a:off x="2478285" y="3510335"/>
+              <a:ext cx="780290" cy="780290"/>
+            </a:xfrm>
+            <a:prstGeom prst="rect">
+              <a:avLst/>
+            </a:prstGeom>
+          </p:spPr>
+        </p:pic>
+        <p:sp>
+          <p:nvSpPr>
+            <p:cNvPr id="8" name="TextBox 7"/>
+            <p:cNvSpPr txBox="1"/>
+            <p:nvPr/>
+          </p:nvSpPr>
+          <p:spPr>
+            <a:xfrm>
+              <a:off x="3846437" y="3546537"/>
+              <a:ext cx="3441968" cy="707886"/>
+            </a:xfrm>
+            <a:prstGeom prst="rect">
+              <a:avLst/>
+            </a:prstGeom>
+            <a:noFill/>
+          </p:spPr>
+          <p:txBody>
+            <a:bodyPr wrap="none" rtlCol="0">
+              <a:spAutoFit/>
+            </a:bodyPr>
+            <a:lstStyle/>
+            <a:p>
+              <a:r>
+                <a:rPr lang="en-GB" sz="4000" dirty="0" smtClean="0">
+                  <a:solidFill>
+                    <a:srgbClr val="737373"/>
+                  </a:solidFill>
+                  <a:latin typeface="News Cycle" panose="02000503000000000000" pitchFamily="2" charset="2"/>
+                </a:rPr>
+                <a:t>AZURE </a:t>
+              </a:r>
+              <a:r>
+                <a:rPr lang="en-GB" sz="4000" dirty="0" smtClean="0">
+                  <a:solidFill>
+                    <a:srgbClr val="CB623C"/>
+                  </a:solidFill>
+                  <a:latin typeface="News Cycle" panose="02000503000000000000" pitchFamily="2" charset="2"/>
+                </a:rPr>
+                <a:t>QUEUES</a:t>
+              </a:r>
+              <a:endParaRPr lang="en-GB" sz="4000" dirty="0">
+                <a:solidFill>
+                  <a:srgbClr val="CB623C"/>
+                </a:solidFill>
+                <a:latin typeface="News Cycle" panose="02000503000000000000" pitchFamily="2" charset="2"/>
+              </a:endParaRPr>
+            </a:p>
+          </p:txBody>
+        </p:sp>
+      </p:grpSp>
+      <p:sp>
+        <p:nvSpPr>
+          <p:cNvPr id="9" name="TextBox 8"/>
+          <p:cNvSpPr txBox="1"/>
+          <p:nvPr/>
+        </p:nvSpPr>
+        <p:spPr>
+          <a:xfrm>
+            <a:off x="503548" y="1700808"/>
+            <a:ext cx="8136904" cy="1292662"/>
+          </a:xfrm>
+          <a:prstGeom prst="rect">
+            <a:avLst/>
+          </a:prstGeom>
+          <a:noFill/>
+        </p:spPr>
+        <p:txBody>
+          <a:bodyPr wrap="square" rtlCol="0">
+            <a:spAutoFit/>
+          </a:bodyPr>
+          <a:lstStyle/>
+          <a:p>
+            <a:pPr marL="285750" indent="-285750">
+              <a:lnSpc>
+                <a:spcPct val="150000"/>
+              </a:lnSpc>
+              <a:buFont typeface="Arial" panose="020B0604020202020204" pitchFamily="34" charset="0"/>
+              <a:buChar char="•"/>
+            </a:pPr>
+            <a:r>
+              <a:rPr lang="en-GB" sz="2000" dirty="0" smtClean="0">
+                <a:solidFill>
+                  <a:srgbClr val="737373"/>
+                </a:solidFill>
+                <a:latin typeface="Georgia" panose="02040502050405020303" pitchFamily="18" charset="0"/>
+              </a:rPr>
+              <a:t>Max message size, </a:t>
+            </a:r>
+            <a:r>
+              <a:rPr lang="en-GB" sz="2000" dirty="0">
+                <a:solidFill>
+                  <a:srgbClr val="737373"/>
+                </a:solidFill>
+                <a:latin typeface="Georgia" panose="02040502050405020303" pitchFamily="18" charset="0"/>
+              </a:rPr>
+              <a:t>64KB</a:t>
+            </a:r>
+            <a:endParaRPr lang="en-GB" sz="2000" dirty="0" smtClean="0">
+              <a:solidFill>
+                <a:srgbClr val="737373"/>
+              </a:solidFill>
+              <a:latin typeface="Georgia" panose="02040502050405020303" pitchFamily="18" charset="0"/>
+            </a:endParaRPr>
+          </a:p>
+          <a:p>
+            <a:pPr marL="285750" indent="-285750">
+              <a:lnSpc>
+                <a:spcPct val="150000"/>
+              </a:lnSpc>
+              <a:buFont typeface="Arial" panose="020B0604020202020204" pitchFamily="34" charset="0"/>
+              <a:buChar char="•"/>
+            </a:pPr>
+            <a:r>
+              <a:rPr lang="en-GB" sz="2000" dirty="0" smtClean="0">
+                <a:solidFill>
+                  <a:srgbClr val="737373"/>
+                </a:solidFill>
+                <a:latin typeface="Georgia" panose="02040502050405020303" pitchFamily="18" charset="0"/>
+              </a:rPr>
+              <a:t>Only limited by Storage Account size, 500TB</a:t>
+            </a:r>
+            <a:endParaRPr lang="en-GB" dirty="0" smtClean="0">
+              <a:solidFill>
+                <a:srgbClr val="737373"/>
+              </a:solidFill>
+              <a:latin typeface="Georgia" panose="02040502050405020303" pitchFamily="18" charset="0"/>
+            </a:endParaRPr>
+          </a:p>
+          <a:p>
+            <a:pPr marL="285750" indent="-285750">
+              <a:buFont typeface="Arial" panose="020B0604020202020204" pitchFamily="34" charset="0"/>
+              <a:buChar char="•"/>
+            </a:pPr>
+            <a:endParaRPr lang="en-GB" dirty="0">
+              <a:solidFill>
+                <a:srgbClr val="737373"/>
+              </a:solidFill>
+              <a:latin typeface="Georgia" panose="02040502050405020303" pitchFamily="18" charset="0"/>
+            </a:endParaRPr>
+          </a:p>
+        </p:txBody>
+      </p:sp>
+      <p:grpSp>
+        <p:nvGrpSpPr>
+          <p:cNvPr id="11" name="Group 10"/>
+          <p:cNvGrpSpPr/>
+          <p:nvPr/>
+        </p:nvGrpSpPr>
+        <p:grpSpPr>
+          <a:xfrm>
+            <a:off x="467544" y="2993470"/>
+            <a:ext cx="4266702" cy="780290"/>
+            <a:chOff x="2478285" y="3510335"/>
+            <a:chExt cx="4266702" cy="780290"/>
+          </a:xfrm>
+        </p:grpSpPr>
+        <p:pic>
+          <p:nvPicPr>
+            <p:cNvPr id="12" name="Picture 11"/>
+            <p:cNvPicPr>
+              <a:picLocks noChangeAspect="1"/>
+            </p:cNvPicPr>
+            <p:nvPr/>
+          </p:nvPicPr>
+          <p:blipFill>
+            <a:blip r:embed="rId2" cstate="print">
+              <a:extLst>
+                <a:ext uri="{28A0092B-C50C-407E-A947-70E740481C1C}">
+                  <a14:useLocalDpi xmlns:a14="http://schemas.microsoft.com/office/drawing/2010/main" val="0"/>
+                </a:ext>
+              </a:extLst>
+            </a:blip>
+            <a:stretch>
+              <a:fillRect/>
+            </a:stretch>
+          </p:blipFill>
+          <p:spPr>
+            <a:xfrm>
+              <a:off x="2478285" y="3510335"/>
+              <a:ext cx="780290" cy="780290"/>
+            </a:xfrm>
+            <a:prstGeom prst="rect">
+              <a:avLst/>
+            </a:prstGeom>
+          </p:spPr>
+        </p:pic>
+        <p:sp>
+          <p:nvSpPr>
+            <p:cNvPr id="13" name="TextBox 12"/>
+            <p:cNvSpPr txBox="1"/>
+            <p:nvPr/>
+          </p:nvSpPr>
+          <p:spPr>
+            <a:xfrm>
+              <a:off x="3846437" y="3546537"/>
+              <a:ext cx="2898550" cy="707886"/>
+            </a:xfrm>
+            <a:prstGeom prst="rect">
+              <a:avLst/>
+            </a:prstGeom>
+            <a:noFill/>
+          </p:spPr>
+          <p:txBody>
+            <a:bodyPr wrap="none" rtlCol="0">
+              <a:spAutoFit/>
+            </a:bodyPr>
+            <a:lstStyle/>
+            <a:p>
+              <a:r>
+                <a:rPr lang="en-GB" sz="4000" dirty="0" smtClean="0">
+                  <a:solidFill>
+                    <a:srgbClr val="737373"/>
+                  </a:solidFill>
+                  <a:latin typeface="News Cycle" panose="02000503000000000000" pitchFamily="2" charset="2"/>
+                </a:rPr>
+                <a:t>SERVICE </a:t>
+              </a:r>
+              <a:r>
+                <a:rPr lang="en-GB" sz="4000" dirty="0" smtClean="0">
+                  <a:solidFill>
+                    <a:srgbClr val="CB623C"/>
+                  </a:solidFill>
+                  <a:latin typeface="News Cycle" panose="02000503000000000000" pitchFamily="2" charset="2"/>
+                </a:rPr>
+                <a:t>BUS</a:t>
+              </a:r>
+              <a:endParaRPr lang="en-GB" sz="4000" dirty="0">
+                <a:solidFill>
+                  <a:srgbClr val="CB623C"/>
+                </a:solidFill>
+                <a:latin typeface="News Cycle" panose="02000503000000000000" pitchFamily="2" charset="2"/>
+              </a:endParaRPr>
+            </a:p>
+          </p:txBody>
+        </p:sp>
+      </p:grpSp>
+      <p:sp>
+        <p:nvSpPr>
+          <p:cNvPr id="14" name="TextBox 13"/>
+          <p:cNvSpPr txBox="1"/>
+          <p:nvPr/>
+        </p:nvSpPr>
+        <p:spPr>
+          <a:xfrm>
+            <a:off x="503548" y="3809962"/>
+            <a:ext cx="8136904" cy="2446824"/>
+          </a:xfrm>
+          <a:prstGeom prst="rect">
+            <a:avLst/>
+          </a:prstGeom>
+          <a:noFill/>
+        </p:spPr>
+        <p:txBody>
+          <a:bodyPr wrap="square" rtlCol="0">
+            <a:spAutoFit/>
+          </a:bodyPr>
+          <a:lstStyle/>
+          <a:p>
+            <a:pPr marL="285750" indent="-285750">
+              <a:lnSpc>
+                <a:spcPct val="150000"/>
+              </a:lnSpc>
+              <a:buFont typeface="Arial" panose="020B0604020202020204" pitchFamily="34" charset="0"/>
+              <a:buChar char="•"/>
+            </a:pPr>
+            <a:r>
+              <a:rPr lang="en-GB" dirty="0" smtClean="0">
+                <a:solidFill>
+                  <a:srgbClr val="737373"/>
+                </a:solidFill>
+                <a:latin typeface="Georgia" panose="02040502050405020303" pitchFamily="18" charset="0"/>
+              </a:rPr>
+              <a:t>AMQP</a:t>
+            </a:r>
+          </a:p>
+          <a:p>
+            <a:pPr marL="285750" indent="-285750">
+              <a:lnSpc>
+                <a:spcPct val="150000"/>
+              </a:lnSpc>
+              <a:buFont typeface="Arial" panose="020B0604020202020204" pitchFamily="34" charset="0"/>
+              <a:buChar char="•"/>
+            </a:pPr>
+            <a:r>
+              <a:rPr lang="en-GB" dirty="0" smtClean="0">
+                <a:solidFill>
+                  <a:srgbClr val="737373"/>
+                </a:solidFill>
+                <a:latin typeface="Georgia" panose="02040502050405020303" pitchFamily="18" charset="0"/>
+              </a:rPr>
+              <a:t>Transactions</a:t>
+            </a:r>
+          </a:p>
+          <a:p>
+            <a:pPr marL="285750" indent="-285750">
+              <a:lnSpc>
+                <a:spcPct val="150000"/>
+              </a:lnSpc>
+              <a:buFont typeface="Arial" panose="020B0604020202020204" pitchFamily="34" charset="0"/>
+              <a:buChar char="•"/>
+            </a:pPr>
+            <a:r>
+              <a:rPr lang="en-GB" dirty="0" smtClean="0">
+                <a:solidFill>
+                  <a:srgbClr val="737373"/>
+                </a:solidFill>
+                <a:latin typeface="Georgia" panose="02040502050405020303" pitchFamily="18" charset="0"/>
+              </a:rPr>
+              <a:t>Duplicate Detection</a:t>
+            </a:r>
+          </a:p>
+          <a:p>
+            <a:pPr marL="285750" indent="-285750">
+              <a:lnSpc>
+                <a:spcPct val="150000"/>
+              </a:lnSpc>
+              <a:buFont typeface="Arial" panose="020B0604020202020204" pitchFamily="34" charset="0"/>
+              <a:buChar char="•"/>
+            </a:pPr>
+            <a:r>
+              <a:rPr lang="en-GB" dirty="0" smtClean="0">
+                <a:solidFill>
+                  <a:srgbClr val="737373"/>
+                </a:solidFill>
+                <a:latin typeface="Georgia" panose="02040502050405020303" pitchFamily="18" charset="0"/>
+              </a:rPr>
+              <a:t>Dead-Lettering</a:t>
+            </a:r>
+          </a:p>
+          <a:p>
+            <a:pPr marL="285750" indent="-285750">
+              <a:lnSpc>
+                <a:spcPct val="150000"/>
+              </a:lnSpc>
+              <a:buFont typeface="Arial" panose="020B0604020202020204" pitchFamily="34" charset="0"/>
+              <a:buChar char="•"/>
+            </a:pPr>
+            <a:r>
+              <a:rPr lang="en-GB" dirty="0" smtClean="0">
+                <a:solidFill>
+                  <a:srgbClr val="737373"/>
+                </a:solidFill>
+                <a:latin typeface="Georgia" panose="02040502050405020303" pitchFamily="18" charset="0"/>
+              </a:rPr>
+              <a:t>Pub/Sub</a:t>
+            </a:r>
+          </a:p>
+          <a:p>
+            <a:pPr marL="285750" indent="-285750">
+              <a:buFont typeface="Arial" panose="020B0604020202020204" pitchFamily="34" charset="0"/>
+              <a:buChar char="•"/>
+            </a:pPr>
+            <a:endParaRPr lang="en-GB" dirty="0">
+              <a:solidFill>
+                <a:srgbClr val="737373"/>
+              </a:solidFill>
+              <a:latin typeface="Georgia" panose="02040502050405020303" pitchFamily="18" charset="0"/>
+            </a:endParaRPr>
+          </a:p>
+        </p:txBody>
+      </p:sp>
+      <p:sp>
+        <p:nvSpPr>
+          <p:cNvPr id="15" name="TextBox 14"/>
+          <p:cNvSpPr txBox="1"/>
+          <p:nvPr/>
+        </p:nvSpPr>
+        <p:spPr>
+          <a:xfrm>
+            <a:off x="135529" y="6284660"/>
+            <a:ext cx="8872942" cy="261610"/>
+          </a:xfrm>
+          <a:prstGeom prst="rect">
+            <a:avLst/>
+          </a:prstGeom>
+          <a:noFill/>
+        </p:spPr>
+        <p:txBody>
+          <a:bodyPr wrap="none" rtlCol="0">
+            <a:spAutoFit/>
+          </a:bodyPr>
+          <a:lstStyle/>
+          <a:p>
+            <a:r>
+              <a:rPr lang="en-GB" sz="1100" dirty="0">
+                <a:solidFill>
+                  <a:srgbClr val="737373"/>
+                </a:solidFill>
+                <a:latin typeface="Georgia" panose="02040502050405020303" pitchFamily="18" charset="0"/>
+              </a:rPr>
+              <a:t>More info at </a:t>
+            </a:r>
+            <a:r>
+              <a:rPr lang="en-GB" sz="1100" dirty="0">
+                <a:solidFill>
+                  <a:srgbClr val="737373"/>
+                </a:solidFill>
+                <a:latin typeface="Georgia" panose="02040502050405020303" pitchFamily="18" charset="0"/>
+                <a:hlinkClick r:id="rId3"/>
+              </a:rPr>
+              <a:t>https://azure.microsoft.com/en-gb/documentation/articles/service-bus-azure-and-service-bus-queues-compared-contrasted</a:t>
+            </a:r>
+            <a:r>
+              <a:rPr lang="en-GB" sz="1100" dirty="0" smtClean="0">
+                <a:solidFill>
+                  <a:srgbClr val="737373"/>
+                </a:solidFill>
+                <a:latin typeface="Georgia" panose="02040502050405020303" pitchFamily="18" charset="0"/>
+                <a:hlinkClick r:id="rId3"/>
+              </a:rPr>
+              <a:t>/</a:t>
+            </a:r>
+            <a:r>
+              <a:rPr lang="en-GB" sz="1100" dirty="0" smtClean="0">
+                <a:solidFill>
+                  <a:srgbClr val="737373"/>
+                </a:solidFill>
+                <a:latin typeface="Georgia" panose="02040502050405020303" pitchFamily="18" charset="0"/>
+              </a:rPr>
+              <a:t> </a:t>
+            </a:r>
+            <a:endParaRPr lang="en-GB" sz="1100" dirty="0">
+              <a:solidFill>
+                <a:srgbClr val="737373"/>
+              </a:solidFill>
+              <a:latin typeface="Georgia" panose="02040502050405020303" pitchFamily="18" charset="0"/>
+            </a:endParaRPr>
+          </a:p>
+        </p:txBody>
+      </p:sp>
+    </p:spTree>
+    <p:extLst>
+      <p:ext uri="{BB962C8B-B14F-4D97-AF65-F5344CB8AC3E}">
+        <p14:creationId xmlns:p14="http://schemas.microsoft.com/office/powerpoint/2010/main" val="1365724365"/>
+      </p:ext>
+    </p:extLst>
+  </p:cSld>
+  <p:clrMapOvr>
+    <a:masterClrMapping/>
+  </p:clrMapOvr>
+</p:sld>
+</file>
+
+<file path=ppt/slides/slide21.xml><?xml version="1.0" encoding="utf-8"?>
+<p:sld xmlns:a="http://schemas.openxmlformats.org/drawingml/2006/main" xmlns:r="http://schemas.openxmlformats.org/officeDocument/2006/relationships" xmlns:p="http://schemas.openxmlformats.org/presentationml/2006/main">
+  <p:cSld>
+    <p:spTree>
+      <p:nvGrpSpPr>
+        <p:cNvPr id="1" name=""/>
+        <p:cNvGrpSpPr/>
+        <p:nvPr/>
+      </p:nvGrpSpPr>
+      <p:grpSpPr>
+        <a:xfrm>
+          <a:off x="0" y="0"/>
+          <a:ext cx="0" cy="0"/>
+          <a:chOff x="0" y="0"/>
+          <a:chExt cx="0" cy="0"/>
+        </a:xfrm>
+      </p:grpSpPr>
+      <p:grpSp>
+        <p:nvGrpSpPr>
+          <p:cNvPr id="5" name="Group 4"/>
+          <p:cNvGrpSpPr/>
+          <p:nvPr/>
+        </p:nvGrpSpPr>
+        <p:grpSpPr>
+          <a:xfrm>
+            <a:off x="467544" y="404664"/>
+            <a:ext cx="6283280" cy="780290"/>
+            <a:chOff x="2478285" y="3510335"/>
+            <a:chExt cx="6283280" cy="780290"/>
+          </a:xfrm>
+        </p:grpSpPr>
+        <p:pic>
+          <p:nvPicPr>
+            <p:cNvPr id="6" name="Picture 5"/>
+            <p:cNvPicPr>
+              <a:picLocks noChangeAspect="1"/>
+            </p:cNvPicPr>
+            <p:nvPr/>
+          </p:nvPicPr>
+          <p:blipFill>
+            <a:blip r:embed="rId2" cstate="print">
+              <a:extLst>
+                <a:ext uri="{28A0092B-C50C-407E-A947-70E740481C1C}">
+                  <a14:useLocalDpi xmlns:a14="http://schemas.microsoft.com/office/drawing/2010/main" val="0"/>
+                </a:ext>
+              </a:extLst>
+            </a:blip>
+            <a:stretch>
+              <a:fillRect/>
+            </a:stretch>
+          </p:blipFill>
+          <p:spPr>
+            <a:xfrm>
+              <a:off x="2478285" y="3510335"/>
+              <a:ext cx="780290" cy="780290"/>
+            </a:xfrm>
+            <a:prstGeom prst="rect">
+              <a:avLst/>
+            </a:prstGeom>
+          </p:spPr>
+        </p:pic>
+        <p:sp>
+          <p:nvSpPr>
+            <p:cNvPr id="7" name="TextBox 6"/>
+            <p:cNvSpPr txBox="1"/>
+            <p:nvPr/>
+          </p:nvSpPr>
+          <p:spPr>
+            <a:xfrm>
+              <a:off x="3846437" y="3546537"/>
+              <a:ext cx="4915128" cy="707886"/>
+            </a:xfrm>
+            <a:prstGeom prst="rect">
+              <a:avLst/>
+            </a:prstGeom>
+            <a:noFill/>
+          </p:spPr>
+          <p:txBody>
+            <a:bodyPr wrap="none" rtlCol="0">
+              <a:spAutoFit/>
+            </a:bodyPr>
+            <a:lstStyle/>
+            <a:p>
+              <a:r>
+                <a:rPr lang="en-GB" sz="4000" dirty="0" smtClean="0">
+                  <a:solidFill>
+                    <a:srgbClr val="737373"/>
+                  </a:solidFill>
+                  <a:latin typeface="News Cycle" panose="02000503000000000000" pitchFamily="2" charset="2"/>
+                </a:rPr>
+                <a:t>STORAGE </a:t>
+              </a:r>
+              <a:r>
+                <a:rPr lang="en-GB" sz="4000" dirty="0" smtClean="0">
+                  <a:solidFill>
+                    <a:srgbClr val="CB623C"/>
+                  </a:solidFill>
+                  <a:latin typeface="News Cycle" panose="02000503000000000000" pitchFamily="2" charset="2"/>
+                </a:rPr>
+                <a:t>LIMITATIONS</a:t>
+              </a:r>
+              <a:endParaRPr lang="en-GB" sz="4000" dirty="0">
+                <a:solidFill>
+                  <a:srgbClr val="CB623C"/>
+                </a:solidFill>
+                <a:latin typeface="News Cycle" panose="02000503000000000000" pitchFamily="2" charset="2"/>
+              </a:endParaRPr>
+            </a:p>
+          </p:txBody>
+        </p:sp>
+      </p:grpSp>
+      <p:graphicFrame>
+        <p:nvGraphicFramePr>
+          <p:cNvPr id="9" name="Table 8"/>
+          <p:cNvGraphicFramePr>
+            <a:graphicFrameLocks noGrp="1"/>
+          </p:cNvGraphicFramePr>
+          <p:nvPr>
+            <p:extLst>
+              <p:ext uri="{D42A27DB-BD31-4B8C-83A1-F6EECF244321}">
+                <p14:modId xmlns:p14="http://schemas.microsoft.com/office/powerpoint/2010/main" val="4156867401"/>
+              </p:ext>
+            </p:extLst>
+          </p:nvPr>
+        </p:nvGraphicFramePr>
+        <p:xfrm>
+          <a:off x="465569" y="1916832"/>
+          <a:ext cx="8280920" cy="3726414"/>
+        </p:xfrm>
+        <a:graphic>
+          <a:graphicData uri="http://schemas.openxmlformats.org/drawingml/2006/table">
+            <a:tbl>
+              <a:tblPr bandRow="1">
+                <a:tableStyleId>{5C22544A-7EE6-4342-B048-85BDC9FD1C3A}</a:tableStyleId>
+              </a:tblPr>
+              <a:tblGrid>
+                <a:gridCol w="4140460"/>
+                <a:gridCol w="4140460"/>
+              </a:tblGrid>
+              <a:tr h="414046">
+                <a:tc>
+                  <a:txBody>
+                    <a:bodyPr/>
+                    <a:lstStyle/>
+                    <a:p>
+                      <a:r>
+                        <a:rPr lang="en-GB" dirty="0" smtClean="0">
+                          <a:solidFill>
+                            <a:srgbClr val="737373"/>
+                          </a:solidFill>
+                          <a:latin typeface="Georgia" panose="02040502050405020303" pitchFamily="18" charset="0"/>
+                        </a:rPr>
+                        <a:t>Accounts / Subscription</a:t>
+                      </a:r>
+                      <a:endParaRPr lang="en-GB" dirty="0">
+                        <a:solidFill>
+                          <a:srgbClr val="737373"/>
+                        </a:solidFill>
+                        <a:latin typeface="Georgia" panose="02040502050405020303" pitchFamily="18" charset="0"/>
+                      </a:endParaRPr>
+                    </a:p>
+                  </a:txBody>
+                  <a:tcPr/>
+                </a:tc>
+                <a:tc>
+                  <a:txBody>
+                    <a:bodyPr/>
+                    <a:lstStyle/>
+                    <a:p>
+                      <a:r>
+                        <a:rPr lang="en-GB" dirty="0" smtClean="0">
+                          <a:solidFill>
+                            <a:srgbClr val="737373"/>
+                          </a:solidFill>
+                          <a:latin typeface="Georgia" panose="02040502050405020303" pitchFamily="18" charset="0"/>
+                        </a:rPr>
+                        <a:t>20</a:t>
+                      </a:r>
+                      <a:endParaRPr lang="en-GB" dirty="0">
+                        <a:solidFill>
+                          <a:srgbClr val="737373"/>
+                        </a:solidFill>
+                        <a:latin typeface="Georgia" panose="02040502050405020303" pitchFamily="18" charset="0"/>
+                      </a:endParaRPr>
+                    </a:p>
+                  </a:txBody>
+                  <a:tcPr/>
+                </a:tc>
+              </a:tr>
+              <a:tr h="414046">
+                <a:tc>
+                  <a:txBody>
+                    <a:bodyPr/>
+                    <a:lstStyle/>
+                    <a:p>
+                      <a:r>
+                        <a:rPr lang="en-GB" dirty="0" smtClean="0">
+                          <a:solidFill>
+                            <a:srgbClr val="737373"/>
+                          </a:solidFill>
+                          <a:latin typeface="Georgia" panose="02040502050405020303" pitchFamily="18" charset="0"/>
+                        </a:rPr>
+                        <a:t>TB / Account</a:t>
+                      </a:r>
+                      <a:endParaRPr lang="en-GB" dirty="0">
+                        <a:solidFill>
+                          <a:srgbClr val="737373"/>
+                        </a:solidFill>
+                        <a:latin typeface="Georgia" panose="02040502050405020303" pitchFamily="18" charset="0"/>
+                      </a:endParaRPr>
+                    </a:p>
+                  </a:txBody>
+                  <a:tcPr/>
+                </a:tc>
+                <a:tc>
+                  <a:txBody>
+                    <a:bodyPr/>
+                    <a:lstStyle/>
+                    <a:p>
+                      <a:r>
+                        <a:rPr lang="en-GB" dirty="0" smtClean="0">
+                          <a:solidFill>
+                            <a:srgbClr val="737373"/>
+                          </a:solidFill>
+                          <a:latin typeface="Georgia" panose="02040502050405020303" pitchFamily="18" charset="0"/>
+                        </a:rPr>
+                        <a:t>500</a:t>
+                      </a:r>
+                      <a:endParaRPr lang="en-GB" dirty="0">
+                        <a:solidFill>
+                          <a:srgbClr val="737373"/>
+                        </a:solidFill>
+                        <a:latin typeface="Georgia" panose="02040502050405020303" pitchFamily="18" charset="0"/>
+                      </a:endParaRPr>
+                    </a:p>
+                  </a:txBody>
+                  <a:tcPr/>
+                </a:tc>
+              </a:tr>
+              <a:tr h="414046">
+                <a:tc>
+                  <a:txBody>
+                    <a:bodyPr/>
+                    <a:lstStyle/>
+                    <a:p>
+                      <a:r>
+                        <a:rPr lang="en-GB" dirty="0" smtClean="0">
+                          <a:solidFill>
+                            <a:srgbClr val="737373"/>
+                          </a:solidFill>
+                          <a:latin typeface="Georgia" panose="02040502050405020303" pitchFamily="18" charset="0"/>
+                        </a:rPr>
+                        <a:t>Max</a:t>
+                      </a:r>
+                      <a:r>
+                        <a:rPr lang="en-GB" baseline="0" dirty="0" smtClean="0">
+                          <a:solidFill>
+                            <a:srgbClr val="737373"/>
+                          </a:solidFill>
+                          <a:latin typeface="Georgia" panose="02040502050405020303" pitchFamily="18" charset="0"/>
+                        </a:rPr>
+                        <a:t> File Share Size</a:t>
+                      </a:r>
+                      <a:endParaRPr lang="en-GB" dirty="0">
+                        <a:solidFill>
+                          <a:srgbClr val="737373"/>
+                        </a:solidFill>
+                        <a:latin typeface="Georgia" panose="02040502050405020303" pitchFamily="18" charset="0"/>
+                      </a:endParaRPr>
+                    </a:p>
+                  </a:txBody>
+                  <a:tcPr/>
+                </a:tc>
+                <a:tc>
+                  <a:txBody>
+                    <a:bodyPr/>
+                    <a:lstStyle/>
+                    <a:p>
+                      <a:r>
+                        <a:rPr lang="en-GB" dirty="0" smtClean="0">
+                          <a:solidFill>
+                            <a:srgbClr val="737373"/>
+                          </a:solidFill>
+                          <a:latin typeface="Georgia" panose="02040502050405020303" pitchFamily="18" charset="0"/>
+                        </a:rPr>
+                        <a:t>5TB</a:t>
+                      </a:r>
+                      <a:endParaRPr lang="en-GB" dirty="0">
+                        <a:solidFill>
+                          <a:srgbClr val="737373"/>
+                        </a:solidFill>
+                        <a:latin typeface="Georgia" panose="02040502050405020303" pitchFamily="18" charset="0"/>
+                      </a:endParaRPr>
+                    </a:p>
+                  </a:txBody>
+                  <a:tcPr/>
+                </a:tc>
+              </a:tr>
+              <a:tr h="414046">
+                <a:tc>
+                  <a:txBody>
+                    <a:bodyPr/>
+                    <a:lstStyle/>
+                    <a:p>
+                      <a:r>
+                        <a:rPr lang="en-GB" dirty="0" smtClean="0">
+                          <a:solidFill>
+                            <a:srgbClr val="737373"/>
+                          </a:solidFill>
+                          <a:latin typeface="Georgia" panose="02040502050405020303" pitchFamily="18" charset="0"/>
+                        </a:rPr>
+                        <a:t>IOPS/ Account</a:t>
+                      </a:r>
+                      <a:r>
+                        <a:rPr lang="en-GB" baseline="0" dirty="0" smtClean="0">
+                          <a:solidFill>
+                            <a:srgbClr val="737373"/>
+                          </a:solidFill>
+                          <a:latin typeface="Georgia" panose="02040502050405020303" pitchFamily="18" charset="0"/>
+                        </a:rPr>
+                        <a:t> / Sec</a:t>
+                      </a:r>
+                      <a:endParaRPr lang="en-GB" dirty="0">
+                        <a:solidFill>
+                          <a:srgbClr val="737373"/>
+                        </a:solidFill>
+                        <a:latin typeface="Georgia" panose="02040502050405020303" pitchFamily="18" charset="0"/>
+                      </a:endParaRPr>
+                    </a:p>
+                  </a:txBody>
+                  <a:tcPr/>
+                </a:tc>
+                <a:tc>
+                  <a:txBody>
+                    <a:bodyPr/>
+                    <a:lstStyle/>
+                    <a:p>
+                      <a:r>
+                        <a:rPr lang="en-GB" dirty="0" smtClean="0">
+                          <a:solidFill>
+                            <a:srgbClr val="737373"/>
+                          </a:solidFill>
+                          <a:latin typeface="Georgia" panose="02040502050405020303" pitchFamily="18" charset="0"/>
+                        </a:rPr>
+                        <a:t>20,000</a:t>
+                      </a:r>
+                      <a:endParaRPr lang="en-GB" dirty="0">
+                        <a:solidFill>
+                          <a:srgbClr val="737373"/>
+                        </a:solidFill>
+                        <a:latin typeface="Georgia" panose="02040502050405020303" pitchFamily="18" charset="0"/>
+                      </a:endParaRPr>
+                    </a:p>
+                  </a:txBody>
+                  <a:tcPr/>
+                </a:tc>
+              </a:tr>
+              <a:tr h="414046">
+                <a:tc>
+                  <a:txBody>
+                    <a:bodyPr/>
+                    <a:lstStyle/>
+                    <a:p>
+                      <a:r>
+                        <a:rPr lang="en-GB" dirty="0" smtClean="0">
+                          <a:solidFill>
+                            <a:srgbClr val="737373"/>
+                          </a:solidFill>
+                          <a:latin typeface="Georgia" panose="02040502050405020303" pitchFamily="18" charset="0"/>
+                        </a:rPr>
+                        <a:t>Throughput</a:t>
+                      </a:r>
+                      <a:r>
+                        <a:rPr lang="en-GB" baseline="0" dirty="0" smtClean="0">
+                          <a:solidFill>
+                            <a:srgbClr val="737373"/>
+                          </a:solidFill>
+                          <a:latin typeface="Georgia" panose="02040502050405020303" pitchFamily="18" charset="0"/>
+                        </a:rPr>
+                        <a:t> Single Blob</a:t>
+                      </a:r>
+                      <a:endParaRPr lang="en-GB" dirty="0">
+                        <a:solidFill>
+                          <a:srgbClr val="737373"/>
+                        </a:solidFill>
+                        <a:latin typeface="Georgia" panose="02040502050405020303" pitchFamily="18" charset="0"/>
+                      </a:endParaRPr>
+                    </a:p>
+                  </a:txBody>
+                  <a:tcPr/>
+                </a:tc>
+                <a:tc>
+                  <a:txBody>
+                    <a:bodyPr/>
+                    <a:lstStyle/>
+                    <a:p>
+                      <a:r>
+                        <a:rPr lang="en-GB" dirty="0" smtClean="0">
+                          <a:solidFill>
+                            <a:srgbClr val="737373"/>
+                          </a:solidFill>
+                          <a:latin typeface="Georgia" panose="02040502050405020303" pitchFamily="18" charset="0"/>
+                        </a:rPr>
+                        <a:t>60MB or 500 </a:t>
+                      </a:r>
+                      <a:r>
+                        <a:rPr lang="en-GB" dirty="0" err="1" smtClean="0">
+                          <a:solidFill>
+                            <a:srgbClr val="737373"/>
+                          </a:solidFill>
+                          <a:latin typeface="Georgia" panose="02040502050405020303" pitchFamily="18" charset="0"/>
+                        </a:rPr>
+                        <a:t>reqs</a:t>
+                      </a:r>
+                      <a:endParaRPr lang="en-GB" dirty="0">
+                        <a:solidFill>
+                          <a:srgbClr val="737373"/>
+                        </a:solidFill>
+                        <a:latin typeface="Georgia" panose="02040502050405020303" pitchFamily="18" charset="0"/>
+                      </a:endParaRPr>
+                    </a:p>
+                  </a:txBody>
+                  <a:tcPr/>
+                </a:tc>
+              </a:tr>
+              <a:tr h="414046">
+                <a:tc>
+                  <a:txBody>
+                    <a:bodyPr/>
+                    <a:lstStyle/>
+                    <a:p>
+                      <a:r>
+                        <a:rPr lang="en-GB" dirty="0" smtClean="0">
+                          <a:solidFill>
+                            <a:srgbClr val="737373"/>
+                          </a:solidFill>
+                          <a:latin typeface="Georgia" panose="02040502050405020303" pitchFamily="18" charset="0"/>
+                        </a:rPr>
+                        <a:t>Throughput</a:t>
+                      </a:r>
+                      <a:r>
+                        <a:rPr lang="en-GB" baseline="0" dirty="0" smtClean="0">
+                          <a:solidFill>
+                            <a:srgbClr val="737373"/>
+                          </a:solidFill>
+                          <a:latin typeface="Georgia" panose="02040502050405020303" pitchFamily="18" charset="0"/>
+                        </a:rPr>
+                        <a:t> Single Queue</a:t>
+                      </a:r>
+                      <a:endParaRPr lang="en-GB" dirty="0">
+                        <a:solidFill>
+                          <a:srgbClr val="737373"/>
+                        </a:solidFill>
+                        <a:latin typeface="Georgia" panose="02040502050405020303" pitchFamily="18" charset="0"/>
+                      </a:endParaRPr>
+                    </a:p>
+                  </a:txBody>
+                  <a:tcPr/>
+                </a:tc>
+                <a:tc>
+                  <a:txBody>
+                    <a:bodyPr/>
+                    <a:lstStyle/>
+                    <a:p>
+                      <a:r>
+                        <a:rPr lang="en-GB" dirty="0" smtClean="0">
+                          <a:solidFill>
+                            <a:srgbClr val="737373"/>
+                          </a:solidFill>
+                          <a:latin typeface="Georgia" panose="02040502050405020303" pitchFamily="18" charset="0"/>
+                        </a:rPr>
+                        <a:t> 2000 messages / sec</a:t>
+                      </a:r>
+                      <a:endParaRPr lang="en-GB" dirty="0">
+                        <a:solidFill>
+                          <a:srgbClr val="737373"/>
+                        </a:solidFill>
+                        <a:latin typeface="Georgia" panose="02040502050405020303" pitchFamily="18" charset="0"/>
+                      </a:endParaRPr>
+                    </a:p>
+                  </a:txBody>
+                  <a:tcPr/>
+                </a:tc>
+              </a:tr>
+              <a:tr h="414046">
+                <a:tc>
+                  <a:txBody>
+                    <a:bodyPr/>
+                    <a:lstStyle/>
+                    <a:p>
+                      <a:r>
+                        <a:rPr lang="en-GB" dirty="0" smtClean="0">
+                          <a:solidFill>
+                            <a:srgbClr val="737373"/>
+                          </a:solidFill>
+                          <a:latin typeface="Georgia" panose="02040502050405020303" pitchFamily="18" charset="0"/>
+                        </a:rPr>
+                        <a:t>Throughput</a:t>
+                      </a:r>
+                      <a:r>
+                        <a:rPr lang="en-GB" baseline="0" dirty="0" smtClean="0">
+                          <a:solidFill>
+                            <a:srgbClr val="737373"/>
+                          </a:solidFill>
+                          <a:latin typeface="Georgia" panose="02040502050405020303" pitchFamily="18" charset="0"/>
+                        </a:rPr>
+                        <a:t> Single Table Partition</a:t>
+                      </a:r>
+                      <a:endParaRPr lang="en-GB" dirty="0">
+                        <a:solidFill>
+                          <a:srgbClr val="737373"/>
+                        </a:solidFill>
+                        <a:latin typeface="Georgia" panose="02040502050405020303" pitchFamily="18" charset="0"/>
+                      </a:endParaRPr>
+                    </a:p>
+                  </a:txBody>
+                  <a:tcPr/>
+                </a:tc>
+                <a:tc>
+                  <a:txBody>
+                    <a:bodyPr/>
+                    <a:lstStyle/>
+                    <a:p>
+                      <a:r>
+                        <a:rPr lang="en-GB" dirty="0" smtClean="0">
+                          <a:solidFill>
+                            <a:srgbClr val="737373"/>
+                          </a:solidFill>
+                          <a:latin typeface="Georgia" panose="02040502050405020303" pitchFamily="18" charset="0"/>
+                        </a:rPr>
+                        <a:t>2000 entities / sec</a:t>
+                      </a:r>
+                      <a:endParaRPr lang="en-GB" dirty="0">
+                        <a:solidFill>
+                          <a:srgbClr val="737373"/>
+                        </a:solidFill>
+                        <a:latin typeface="Georgia" panose="02040502050405020303" pitchFamily="18" charset="0"/>
+                      </a:endParaRPr>
+                    </a:p>
+                  </a:txBody>
+                  <a:tcPr/>
+                </a:tc>
+              </a:tr>
+              <a:tr h="414046">
+                <a:tc>
+                  <a:txBody>
+                    <a:bodyPr/>
+                    <a:lstStyle/>
+                    <a:p>
+                      <a:r>
+                        <a:rPr lang="en-GB" dirty="0" smtClean="0">
+                          <a:solidFill>
+                            <a:srgbClr val="737373"/>
+                          </a:solidFill>
+                          <a:latin typeface="Georgia" panose="02040502050405020303" pitchFamily="18" charset="0"/>
+                        </a:rPr>
+                        <a:t>Max Ingress / Account (EU)</a:t>
+                      </a:r>
+                      <a:endParaRPr lang="en-GB" dirty="0">
+                        <a:solidFill>
+                          <a:srgbClr val="737373"/>
+                        </a:solidFill>
+                        <a:latin typeface="Georgia" panose="02040502050405020303" pitchFamily="18" charset="0"/>
+                      </a:endParaRPr>
+                    </a:p>
+                  </a:txBody>
+                  <a:tcPr/>
+                </a:tc>
+                <a:tc>
+                  <a:txBody>
+                    <a:bodyPr/>
+                    <a:lstStyle/>
+                    <a:p>
+                      <a:r>
+                        <a:rPr lang="en-GB" dirty="0" smtClean="0">
+                          <a:solidFill>
+                            <a:srgbClr val="737373"/>
+                          </a:solidFill>
+                          <a:latin typeface="Georgia" panose="02040502050405020303" pitchFamily="18" charset="0"/>
+                        </a:rPr>
+                        <a:t>5Gbps (GRS), 10Gbps (LRS)</a:t>
+                      </a:r>
+                      <a:endParaRPr lang="en-GB" dirty="0">
+                        <a:solidFill>
+                          <a:srgbClr val="737373"/>
+                        </a:solidFill>
+                        <a:latin typeface="Georgia" panose="02040502050405020303" pitchFamily="18" charset="0"/>
+                      </a:endParaRPr>
+                    </a:p>
+                  </a:txBody>
+                  <a:tcPr/>
+                </a:tc>
+              </a:tr>
+              <a:tr h="414046">
+                <a:tc>
+                  <a:txBody>
+                    <a:bodyPr/>
+                    <a:lstStyle/>
+                    <a:p>
+                      <a:r>
+                        <a:rPr lang="en-GB" dirty="0" smtClean="0">
+                          <a:solidFill>
+                            <a:srgbClr val="737373"/>
+                          </a:solidFill>
+                          <a:latin typeface="Georgia" panose="02040502050405020303" pitchFamily="18" charset="0"/>
+                        </a:rPr>
+                        <a:t>Max Egress / Account (EU)</a:t>
+                      </a:r>
+                      <a:endParaRPr lang="en-GB" dirty="0">
+                        <a:solidFill>
+                          <a:srgbClr val="737373"/>
+                        </a:solidFill>
+                        <a:latin typeface="Georgia" panose="02040502050405020303" pitchFamily="18" charset="0"/>
+                      </a:endParaRPr>
+                    </a:p>
+                  </a:txBody>
+                  <a:tcPr/>
+                </a:tc>
+                <a:tc>
+                  <a:txBody>
+                    <a:bodyPr/>
+                    <a:lstStyle/>
+                    <a:p>
+                      <a:r>
+                        <a:rPr lang="en-GB" dirty="0" smtClean="0">
+                          <a:solidFill>
+                            <a:srgbClr val="737373"/>
+                          </a:solidFill>
+                          <a:latin typeface="Georgia" panose="02040502050405020303" pitchFamily="18" charset="0"/>
+                        </a:rPr>
+                        <a:t>10Gbps (GRS), 15Gbps (LRS)</a:t>
+                      </a:r>
+                      <a:endParaRPr lang="en-GB" dirty="0">
+                        <a:solidFill>
+                          <a:srgbClr val="737373"/>
+                        </a:solidFill>
+                        <a:latin typeface="Georgia" panose="02040502050405020303" pitchFamily="18" charset="0"/>
+                      </a:endParaRPr>
+                    </a:p>
+                  </a:txBody>
+                  <a:tcPr/>
+                </a:tc>
+              </a:tr>
+            </a:tbl>
+          </a:graphicData>
+        </a:graphic>
+      </p:graphicFrame>
+    </p:spTree>
+    <p:extLst>
+      <p:ext uri="{BB962C8B-B14F-4D97-AF65-F5344CB8AC3E}">
+        <p14:creationId xmlns:p14="http://schemas.microsoft.com/office/powerpoint/2010/main" val="3542197898"/>
+      </p:ext>
+    </p:extLst>
+  </p:cSld>
+  <p:clrMapOvr>
+    <a:masterClrMapping/>
+  </p:clrMapOvr>
+</p:sld>
+</file>
+
+<file path=ppt/slides/slide22.xml><?xml version="1.0" encoding="utf-8"?>
+<p:sld xmlns:a="http://schemas.openxmlformats.org/drawingml/2006/main" xmlns:r="http://schemas.openxmlformats.org/officeDocument/2006/relationships" xmlns:p="http://schemas.openxmlformats.org/presentationml/2006/main">
+  <p:cSld>
+    <p:spTree>
+      <p:nvGrpSpPr>
+        <p:cNvPr id="1" name=""/>
+        <p:cNvGrpSpPr/>
+        <p:nvPr/>
+      </p:nvGrpSpPr>
+      <p:grpSpPr>
+        <a:xfrm>
+          <a:off x="0" y="0"/>
+          <a:ext cx="0" cy="0"/>
+          <a:chOff x="0" y="0"/>
+          <a:chExt cx="0" cy="0"/>
+        </a:xfrm>
+      </p:grpSpPr>
+      <p:grpSp>
+        <p:nvGrpSpPr>
+          <p:cNvPr id="5" name="Group 4"/>
+          <p:cNvGrpSpPr/>
+          <p:nvPr/>
+        </p:nvGrpSpPr>
+        <p:grpSpPr>
+          <a:xfrm>
+            <a:off x="2123728" y="2780928"/>
+            <a:ext cx="4909506" cy="780290"/>
+            <a:chOff x="2478285" y="3510335"/>
+            <a:chExt cx="4909506" cy="780290"/>
+          </a:xfrm>
+        </p:grpSpPr>
+        <p:pic>
+          <p:nvPicPr>
+            <p:cNvPr id="6" name="Picture 5"/>
+            <p:cNvPicPr>
+              <a:picLocks noChangeAspect="1"/>
+            </p:cNvPicPr>
+            <p:nvPr/>
+          </p:nvPicPr>
+          <p:blipFill>
+            <a:blip r:embed="rId2" cstate="print">
+              <a:extLst>
+                <a:ext uri="{28A0092B-C50C-407E-A947-70E740481C1C}">
+                  <a14:useLocalDpi xmlns:a14="http://schemas.microsoft.com/office/drawing/2010/main" val="0"/>
+                </a:ext>
+              </a:extLst>
+            </a:blip>
+            <a:stretch>
+              <a:fillRect/>
+            </a:stretch>
+          </p:blipFill>
+          <p:spPr>
+            <a:xfrm>
+              <a:off x="2478285" y="3510335"/>
+              <a:ext cx="780290" cy="780290"/>
+            </a:xfrm>
+            <a:prstGeom prst="rect">
+              <a:avLst/>
+            </a:prstGeom>
+          </p:spPr>
+        </p:pic>
+        <p:sp>
+          <p:nvSpPr>
+            <p:cNvPr id="7" name="TextBox 6"/>
+            <p:cNvSpPr txBox="1"/>
+            <p:nvPr/>
+          </p:nvSpPr>
+          <p:spPr>
+            <a:xfrm>
+              <a:off x="3846437" y="3546537"/>
+              <a:ext cx="3541354" cy="707886"/>
+            </a:xfrm>
+            <a:prstGeom prst="rect">
+              <a:avLst/>
+            </a:prstGeom>
+            <a:noFill/>
+          </p:spPr>
+          <p:txBody>
+            <a:bodyPr wrap="none" rtlCol="0">
+              <a:spAutoFit/>
+            </a:bodyPr>
+            <a:lstStyle/>
+            <a:p>
+              <a:r>
+                <a:rPr lang="en-GB" sz="4000" dirty="0" smtClean="0">
+                  <a:solidFill>
+                    <a:srgbClr val="737373"/>
+                  </a:solidFill>
+                  <a:latin typeface="News Cycle" panose="02000503000000000000" pitchFamily="2" charset="2"/>
+                </a:rPr>
+                <a:t>STORAGE </a:t>
+              </a:r>
+              <a:r>
+                <a:rPr lang="en-GB" sz="4000" dirty="0" smtClean="0">
+                  <a:solidFill>
+                    <a:srgbClr val="CB623C"/>
+                  </a:solidFill>
+                  <a:latin typeface="News Cycle" panose="02000503000000000000" pitchFamily="2" charset="2"/>
+                </a:rPr>
+                <a:t>DEMO</a:t>
+              </a:r>
+              <a:endParaRPr lang="en-GB" sz="4000" dirty="0">
+                <a:solidFill>
+                  <a:srgbClr val="CB623C"/>
+                </a:solidFill>
+                <a:latin typeface="News Cycle" panose="02000503000000000000" pitchFamily="2" charset="2"/>
+              </a:endParaRPr>
+            </a:p>
+          </p:txBody>
+        </p:sp>
+      </p:grpSp>
+    </p:spTree>
+    <p:extLst>
+      <p:ext uri="{BB962C8B-B14F-4D97-AF65-F5344CB8AC3E}">
+        <p14:creationId xmlns:p14="http://schemas.microsoft.com/office/powerpoint/2010/main" val="3340390190"/>
+      </p:ext>
+    </p:extLst>
+  </p:cSld>
+  <p:clrMapOvr>
+    <a:masterClrMapping/>
+  </p:clrMapOvr>
 </p:sld>
 </file>
 

</xml_diff>

<commit_message>
Adds new images to the assets and new slides to the presentation.
</commit_message>
<xml_diff>
--- a/Current/Azure The Good Parts Web Apps/AzureTheGoodParts-WebApps.pptx
+++ b/Current/Azure The Good Parts Web Apps/AzureTheGoodParts-WebApps.pptx
@@ -28,6 +28,9 @@
     <p:sldId id="275" r:id="rId22"/>
     <p:sldId id="276" r:id="rId23"/>
     <p:sldId id="277" r:id="rId24"/>
+    <p:sldId id="278" r:id="rId25"/>
+    <p:sldId id="279" r:id="rId26"/>
+    <p:sldId id="280" r:id="rId27"/>
   </p:sldIdLst>
   <p:sldSz cx="9144000" cy="6858000" type="screen4x3"/>
   <p:notesSz cx="6858000" cy="9144000"/>
@@ -276,7 +279,7 @@
           <a:p>
             <a:fld id="{8A04FFFD-6AAA-4290-B9C8-6140E8302CD5}" type="datetimeFigureOut">
               <a:rPr lang="en-GB" smtClean="0"/>
-              <a:t>24/07/2015</a:t>
+              <a:t>26/07/2015</a:t>
             </a:fld>
             <a:endParaRPr lang="en-GB"/>
           </a:p>
@@ -446,7 +449,7 @@
           <a:p>
             <a:fld id="{8A04FFFD-6AAA-4290-B9C8-6140E8302CD5}" type="datetimeFigureOut">
               <a:rPr lang="en-GB" smtClean="0"/>
-              <a:t>24/07/2015</a:t>
+              <a:t>26/07/2015</a:t>
             </a:fld>
             <a:endParaRPr lang="en-GB"/>
           </a:p>
@@ -626,7 +629,7 @@
           <a:p>
             <a:fld id="{8A04FFFD-6AAA-4290-B9C8-6140E8302CD5}" type="datetimeFigureOut">
               <a:rPr lang="en-GB" smtClean="0"/>
-              <a:t>24/07/2015</a:t>
+              <a:t>26/07/2015</a:t>
             </a:fld>
             <a:endParaRPr lang="en-GB"/>
           </a:p>
@@ -1370,7 +1373,7 @@
           <a:p>
             <a:fld id="{8A04FFFD-6AAA-4290-B9C8-6140E8302CD5}" type="datetimeFigureOut">
               <a:rPr lang="en-GB" smtClean="0"/>
-              <a:t>24/07/2015</a:t>
+              <a:t>26/07/2015</a:t>
             </a:fld>
             <a:endParaRPr lang="en-GB"/>
           </a:p>
@@ -1614,7 +1617,7 @@
           <a:p>
             <a:fld id="{8A04FFFD-6AAA-4290-B9C8-6140E8302CD5}" type="datetimeFigureOut">
               <a:rPr lang="en-GB" smtClean="0"/>
-              <a:t>24/07/2015</a:t>
+              <a:t>26/07/2015</a:t>
             </a:fld>
             <a:endParaRPr lang="en-GB"/>
           </a:p>
@@ -1846,7 +1849,7 @@
           <a:p>
             <a:fld id="{8A04FFFD-6AAA-4290-B9C8-6140E8302CD5}" type="datetimeFigureOut">
               <a:rPr lang="en-GB" smtClean="0"/>
-              <a:t>24/07/2015</a:t>
+              <a:t>26/07/2015</a:t>
             </a:fld>
             <a:endParaRPr lang="en-GB"/>
           </a:p>
@@ -2213,7 +2216,7 @@
           <a:p>
             <a:fld id="{8A04FFFD-6AAA-4290-B9C8-6140E8302CD5}" type="datetimeFigureOut">
               <a:rPr lang="en-GB" smtClean="0"/>
-              <a:t>24/07/2015</a:t>
+              <a:t>26/07/2015</a:t>
             </a:fld>
             <a:endParaRPr lang="en-GB"/>
           </a:p>
@@ -2331,7 +2334,7 @@
           <a:p>
             <a:fld id="{8A04FFFD-6AAA-4290-B9C8-6140E8302CD5}" type="datetimeFigureOut">
               <a:rPr lang="en-GB" smtClean="0"/>
-              <a:t>24/07/2015</a:t>
+              <a:t>26/07/2015</a:t>
             </a:fld>
             <a:endParaRPr lang="en-GB"/>
           </a:p>
@@ -2426,7 +2429,7 @@
           <a:p>
             <a:fld id="{8A04FFFD-6AAA-4290-B9C8-6140E8302CD5}" type="datetimeFigureOut">
               <a:rPr lang="en-GB" smtClean="0"/>
-              <a:t>24/07/2015</a:t>
+              <a:t>26/07/2015</a:t>
             </a:fld>
             <a:endParaRPr lang="en-GB"/>
           </a:p>
@@ -2703,7 +2706,7 @@
           <a:p>
             <a:fld id="{8A04FFFD-6AAA-4290-B9C8-6140E8302CD5}" type="datetimeFigureOut">
               <a:rPr lang="en-GB" smtClean="0"/>
-              <a:t>24/07/2015</a:t>
+              <a:t>26/07/2015</a:t>
             </a:fld>
             <a:endParaRPr lang="en-GB"/>
           </a:p>
@@ -2960,7 +2963,7 @@
           <a:p>
             <a:fld id="{8A04FFFD-6AAA-4290-B9C8-6140E8302CD5}" type="datetimeFigureOut">
               <a:rPr lang="en-GB" smtClean="0"/>
-              <a:t>24/07/2015</a:t>
+              <a:t>26/07/2015</a:t>
             </a:fld>
             <a:endParaRPr lang="en-GB"/>
           </a:p>
@@ -3182,7 +3185,7 @@
           <a:p>
             <a:fld id="{8A04FFFD-6AAA-4290-B9C8-6140E8302CD5}" type="datetimeFigureOut">
               <a:rPr lang="en-GB" smtClean="0"/>
-              <a:t>24/07/2015</a:t>
+              <a:t>26/07/2015</a:t>
             </a:fld>
             <a:endParaRPr lang="en-GB"/>
           </a:p>
@@ -4070,8 +4073,8 @@
         </p:blipFill>
         <p:spPr>
           <a:xfrm>
-            <a:off x="2267744" y="1556792"/>
-            <a:ext cx="4608512" cy="4608512"/>
+            <a:off x="1922399" y="1196752"/>
+            <a:ext cx="5299200" cy="5299200"/>
           </a:xfrm>
         </p:spPr>
       </p:pic>
@@ -4408,13 +4411,7 @@
               <a:rPr lang="en-GB" sz="2000" cap="none" dirty="0" smtClean="0">
                 <a:latin typeface="Georgia" panose="02040502050405020303" pitchFamily="18" charset="0"/>
               </a:rPr>
-              <a:t>All </a:t>
-            </a:r>
-            <a:r>
-              <a:rPr lang="en-GB" sz="2000" cap="none" dirty="0" smtClean="0">
-                <a:latin typeface="Georgia" panose="02040502050405020303" pitchFamily="18" charset="0"/>
-              </a:rPr>
-              <a:t>Azure SQL tables must have a clustered index.</a:t>
+              <a:t>All Azure SQL tables must have a clustered index.</a:t>
             </a:r>
           </a:p>
           <a:p>
@@ -4563,7 +4560,7 @@
         <p:spPr>
           <a:xfrm>
             <a:off x="2303748" y="1374592"/>
-            <a:ext cx="4536504" cy="4108817"/>
+            <a:ext cx="4536504" cy="4555093"/>
           </a:xfrm>
           <a:prstGeom prst="rect">
             <a:avLst/>
@@ -4584,7 +4581,10 @@
               <a:buChar char="•"/>
             </a:pPr>
             <a:r>
-              <a:rPr lang="en-GB" dirty="0" smtClean="0">
+              <a:rPr lang="en-GB" sz="2000" dirty="0" smtClean="0">
+                <a:solidFill>
+                  <a:srgbClr val="737373"/>
+                </a:solidFill>
                 <a:latin typeface="Georgia" panose="02040502050405020303" pitchFamily="18" charset="0"/>
               </a:rPr>
               <a:t>Fast</a:t>
@@ -4599,7 +4599,10 @@
               <a:buChar char="•"/>
             </a:pPr>
             <a:r>
-              <a:rPr lang="en-GB" dirty="0" smtClean="0">
+              <a:rPr lang="en-GB" sz="2000" dirty="0" smtClean="0">
+                <a:solidFill>
+                  <a:srgbClr val="737373"/>
+                </a:solidFill>
                 <a:latin typeface="Georgia" panose="02040502050405020303" pitchFamily="18" charset="0"/>
               </a:rPr>
               <a:t>Scalable</a:t>
@@ -4614,13 +4617,19 @@
               <a:buChar char="•"/>
             </a:pPr>
             <a:r>
-              <a:rPr lang="en-GB" dirty="0" err="1" smtClean="0">
+              <a:rPr lang="en-GB" sz="2000" dirty="0" err="1" smtClean="0">
+                <a:solidFill>
+                  <a:srgbClr val="737373"/>
+                </a:solidFill>
                 <a:latin typeface="Georgia" panose="02040502050405020303" pitchFamily="18" charset="0"/>
               </a:rPr>
               <a:t>Queryable</a:t>
             </a:r>
             <a:r>
-              <a:rPr lang="en-GB" dirty="0" smtClean="0">
+              <a:rPr lang="en-GB" sz="2000" dirty="0" smtClean="0">
+                <a:solidFill>
+                  <a:srgbClr val="737373"/>
+                </a:solidFill>
                 <a:latin typeface="Georgia" panose="02040502050405020303" pitchFamily="18" charset="0"/>
               </a:rPr>
               <a:t> with SQL</a:t>
@@ -4635,18 +4644,27 @@
               <a:buChar char="•"/>
             </a:pPr>
             <a:r>
-              <a:rPr lang="en-GB" dirty="0" smtClean="0">
+              <a:rPr lang="en-GB" sz="2000" dirty="0" smtClean="0">
+                <a:solidFill>
+                  <a:srgbClr val="737373"/>
+                </a:solidFill>
                 <a:latin typeface="Georgia" panose="02040502050405020303" pitchFamily="18" charset="0"/>
               </a:rPr>
               <a:t>Deep integration with </a:t>
             </a:r>
             <a:r>
-              <a:rPr lang="en-GB" dirty="0" err="1" smtClean="0">
+              <a:rPr lang="en-GB" sz="2000" dirty="0" smtClean="0">
+                <a:solidFill>
+                  <a:srgbClr val="737373"/>
+                </a:solidFill>
                 <a:latin typeface="Georgia" panose="02040502050405020303" pitchFamily="18" charset="0"/>
               </a:rPr>
-              <a:t>Javascript</a:t>
-            </a:r>
-            <a:endParaRPr lang="en-GB" dirty="0" smtClean="0">
+              <a:t>JavaScript</a:t>
+            </a:r>
+            <a:endParaRPr lang="en-GB" sz="2000" dirty="0" smtClean="0">
+              <a:solidFill>
+                <a:srgbClr val="737373"/>
+              </a:solidFill>
               <a:latin typeface="Georgia" panose="02040502050405020303" pitchFamily="18" charset="0"/>
             </a:endParaRPr>
           </a:p>
@@ -4659,7 +4677,10 @@
               <a:buChar char="•"/>
             </a:pPr>
             <a:r>
-              <a:rPr lang="en-GB" dirty="0" smtClean="0">
+              <a:rPr lang="en-GB" sz="2000" dirty="0" smtClean="0">
+                <a:solidFill>
+                  <a:srgbClr val="737373"/>
+                </a:solidFill>
                 <a:latin typeface="Georgia" panose="02040502050405020303" pitchFamily="18" charset="0"/>
               </a:rPr>
               <a:t>Familiar features</a:t>
@@ -4674,12 +4695,18 @@
               <a:buChar char="•"/>
             </a:pPr>
             <a:r>
-              <a:rPr lang="en-GB" dirty="0" smtClean="0">
+              <a:rPr lang="en-GB" sz="2000" dirty="0" smtClean="0">
+                <a:solidFill>
+                  <a:srgbClr val="737373"/>
+                </a:solidFill>
                 <a:latin typeface="Georgia" panose="02040502050405020303" pitchFamily="18" charset="0"/>
               </a:rPr>
               <a:t>Stored Procedures</a:t>
             </a:r>
-            <a:endParaRPr lang="en-GB" dirty="0">
+            <a:endParaRPr lang="en-GB" sz="2000" dirty="0">
+              <a:solidFill>
+                <a:srgbClr val="737373"/>
+              </a:solidFill>
               <a:latin typeface="Georgia" panose="02040502050405020303" pitchFamily="18" charset="0"/>
             </a:endParaRPr>
           </a:p>
@@ -4692,7 +4719,10 @@
               <a:buChar char="•"/>
             </a:pPr>
             <a:r>
-              <a:rPr lang="en-GB" dirty="0" smtClean="0">
+              <a:rPr lang="en-GB" sz="2000" dirty="0" smtClean="0">
+                <a:solidFill>
+                  <a:srgbClr val="737373"/>
+                </a:solidFill>
                 <a:latin typeface="Georgia" panose="02040502050405020303" pitchFamily="18" charset="0"/>
               </a:rPr>
               <a:t>Triggers</a:t>
@@ -4707,7 +4737,10 @@
               <a:buChar char="•"/>
             </a:pPr>
             <a:r>
-              <a:rPr lang="en-GB" dirty="0" smtClean="0">
+              <a:rPr lang="en-GB" sz="2000" dirty="0" smtClean="0">
+                <a:solidFill>
+                  <a:srgbClr val="737373"/>
+                </a:solidFill>
                 <a:latin typeface="Georgia" panose="02040502050405020303" pitchFamily="18" charset="0"/>
               </a:rPr>
               <a:t>UDFs</a:t>
@@ -4722,7 +4755,10 @@
               <a:buChar char="•"/>
             </a:pPr>
             <a:r>
-              <a:rPr lang="en-GB" dirty="0" smtClean="0">
+              <a:rPr lang="en-GB" sz="2000" dirty="0" smtClean="0">
+                <a:solidFill>
+                  <a:srgbClr val="737373"/>
+                </a:solidFill>
                 <a:latin typeface="Georgia" panose="02040502050405020303" pitchFamily="18" charset="0"/>
               </a:rPr>
               <a:t>Indexes</a:t>
@@ -4733,7 +4769,11 @@
               <a:buFont typeface="Arial" panose="020B0604020202020204" pitchFamily="34" charset="0"/>
               <a:buChar char="•"/>
             </a:pPr>
-            <a:endParaRPr lang="en-GB" dirty="0"/>
+            <a:endParaRPr lang="en-GB" sz="2000" dirty="0">
+              <a:solidFill>
+                <a:srgbClr val="737373"/>
+              </a:solidFill>
+            </a:endParaRPr>
           </a:p>
         </p:txBody>
       </p:sp>
@@ -4761,6 +4801,9 @@
           <a:p>
             <a:r>
               <a:rPr lang="en-GB" sz="1400" dirty="0">
+                <a:solidFill>
+                  <a:srgbClr val="737373"/>
+                </a:solidFill>
                 <a:latin typeface="Georgia" panose="02040502050405020303" pitchFamily="18" charset="0"/>
               </a:rPr>
               <a:t>More info at </a:t>
@@ -8106,6 +8149,706 @@
 </p:sld>
 </file>
 
+<file path=ppt/slides/slide23.xml><?xml version="1.0" encoding="utf-8"?>
+<p:sld xmlns:a="http://schemas.openxmlformats.org/drawingml/2006/main" xmlns:r="http://schemas.openxmlformats.org/officeDocument/2006/relationships" xmlns:p="http://schemas.openxmlformats.org/presentationml/2006/main">
+  <p:cSld>
+    <p:spTree>
+      <p:nvGrpSpPr>
+        <p:cNvPr id="1" name=""/>
+        <p:cNvGrpSpPr/>
+        <p:nvPr/>
+      </p:nvGrpSpPr>
+      <p:grpSpPr>
+        <a:xfrm>
+          <a:off x="0" y="0"/>
+          <a:ext cx="0" cy="0"/>
+          <a:chOff x="0" y="0"/>
+          <a:chExt cx="0" cy="0"/>
+        </a:xfrm>
+      </p:grpSpPr>
+      <p:pic>
+        <p:nvPicPr>
+          <p:cNvPr id="5" name="Picture Placeholder 4"/>
+          <p:cNvPicPr>
+            <a:picLocks noGrp="1" noChangeAspect="1"/>
+          </p:cNvPicPr>
+          <p:nvPr>
+            <p:ph type="pic" sz="quarter" idx="10"/>
+          </p:nvPr>
+        </p:nvPicPr>
+        <p:blipFill>
+          <a:blip r:embed="rId2">
+            <a:extLst>
+              <a:ext uri="{28A0092B-C50C-407E-A947-70E740481C1C}">
+                <a14:useLocalDpi xmlns:a14="http://schemas.microsoft.com/office/drawing/2010/main" val="0"/>
+              </a:ext>
+            </a:extLst>
+          </a:blip>
+          <a:stretch>
+            <a:fillRect/>
+          </a:stretch>
+        </p:blipFill>
+        <p:spPr>
+          <a:xfrm>
+            <a:off x="1922399" y="1124744"/>
+            <a:ext cx="5299200" cy="5299200"/>
+          </a:xfrm>
+        </p:spPr>
+      </p:pic>
+      <p:sp>
+        <p:nvSpPr>
+          <p:cNvPr id="4" name="Title 3"/>
+          <p:cNvSpPr>
+            <a:spLocks noGrp="1"/>
+          </p:cNvSpPr>
+          <p:nvPr>
+            <p:ph type="title"/>
+          </p:nvPr>
+        </p:nvSpPr>
+        <p:spPr>
+          <a:xfrm>
+            <a:off x="0" y="126000"/>
+            <a:ext cx="9143999" cy="757130"/>
+          </a:xfrm>
+        </p:spPr>
+        <p:txBody>
+          <a:bodyPr anchor="ctr" anchorCtr="1">
+            <a:spAutoFit/>
+          </a:bodyPr>
+          <a:lstStyle/>
+          <a:p>
+            <a:r>
+              <a:rPr lang="en-GB" dirty="0" smtClean="0"/>
+              <a:t>Cloud services</a:t>
+            </a:r>
+            <a:endParaRPr lang="en-GB" dirty="0"/>
+          </a:p>
+        </p:txBody>
+      </p:sp>
+    </p:spTree>
+    <p:extLst>
+      <p:ext uri="{BB962C8B-B14F-4D97-AF65-F5344CB8AC3E}">
+        <p14:creationId xmlns:p14="http://schemas.microsoft.com/office/powerpoint/2010/main" val="712399529"/>
+      </p:ext>
+    </p:extLst>
+  </p:cSld>
+  <p:clrMapOvr>
+    <a:masterClrMapping/>
+  </p:clrMapOvr>
+</p:sld>
+</file>
+
+<file path=ppt/slides/slide24.xml><?xml version="1.0" encoding="utf-8"?>
+<p:sld xmlns:a="http://schemas.openxmlformats.org/drawingml/2006/main" xmlns:r="http://schemas.openxmlformats.org/officeDocument/2006/relationships" xmlns:p="http://schemas.openxmlformats.org/presentationml/2006/main">
+  <p:cSld>
+    <p:spTree>
+      <p:nvGrpSpPr>
+        <p:cNvPr id="1" name=""/>
+        <p:cNvGrpSpPr/>
+        <p:nvPr/>
+      </p:nvGrpSpPr>
+      <p:grpSpPr>
+        <a:xfrm>
+          <a:off x="0" y="0"/>
+          <a:ext cx="0" cy="0"/>
+          <a:chOff x="0" y="0"/>
+          <a:chExt cx="0" cy="0"/>
+        </a:xfrm>
+      </p:grpSpPr>
+      <p:sp>
+        <p:nvSpPr>
+          <p:cNvPr id="3" name="Text Placeholder 2"/>
+          <p:cNvSpPr>
+            <a:spLocks noGrp="1"/>
+          </p:cNvSpPr>
+          <p:nvPr>
+            <p:ph type="body" sz="quarter" idx="11"/>
+          </p:nvPr>
+        </p:nvSpPr>
+        <p:spPr>
+          <a:xfrm>
+            <a:off x="467545" y="2649813"/>
+            <a:ext cx="8208912" cy="2663825"/>
+          </a:xfrm>
+        </p:spPr>
+        <p:txBody>
+          <a:bodyPr/>
+          <a:lstStyle/>
+          <a:p>
+            <a:pPr>
+              <a:lnSpc>
+                <a:spcPct val="150000"/>
+              </a:lnSpc>
+            </a:pPr>
+            <a:r>
+              <a:rPr lang="en-GB" sz="2000" cap="none" dirty="0" smtClean="0">
+                <a:latin typeface="Georgia" panose="02040502050405020303" pitchFamily="18" charset="0"/>
+              </a:rPr>
+              <a:t>Service for VM clusters</a:t>
+            </a:r>
+          </a:p>
+          <a:p>
+            <a:pPr lvl="1">
+              <a:lnSpc>
+                <a:spcPct val="150000"/>
+              </a:lnSpc>
+            </a:pPr>
+            <a:r>
+              <a:rPr lang="en-GB" sz="1800" dirty="0" smtClean="0"/>
+              <a:t>Single Point of Entry</a:t>
+            </a:r>
+          </a:p>
+          <a:p>
+            <a:pPr lvl="1">
+              <a:lnSpc>
+                <a:spcPct val="150000"/>
+              </a:lnSpc>
+            </a:pPr>
+            <a:r>
+              <a:rPr lang="en-GB" sz="1800" dirty="0" smtClean="0"/>
+              <a:t>Load Balancer</a:t>
+            </a:r>
+          </a:p>
+          <a:p>
+            <a:pPr lvl="1">
+              <a:lnSpc>
+                <a:spcPct val="150000"/>
+              </a:lnSpc>
+            </a:pPr>
+            <a:r>
+              <a:rPr lang="en-GB" sz="1800" cap="none" dirty="0" smtClean="0"/>
+              <a:t>Availability</a:t>
+            </a:r>
+          </a:p>
+          <a:p>
+            <a:pPr>
+              <a:lnSpc>
+                <a:spcPct val="150000"/>
+              </a:lnSpc>
+            </a:pPr>
+            <a:r>
+              <a:rPr lang="en-GB" sz="2000" cap="none" dirty="0" smtClean="0">
+                <a:latin typeface="Georgia" panose="02040502050405020303" pitchFamily="18" charset="0"/>
+              </a:rPr>
+              <a:t>Consists of Web and Worker Roles</a:t>
+            </a:r>
+          </a:p>
+          <a:p>
+            <a:pPr marL="0" indent="0">
+              <a:buNone/>
+            </a:pPr>
+            <a:endParaRPr lang="en-GB" sz="2000" cap="none" dirty="0" smtClean="0">
+              <a:latin typeface="Georgia" panose="02040502050405020303" pitchFamily="18" charset="0"/>
+            </a:endParaRPr>
+          </a:p>
+          <a:p>
+            <a:pPr lvl="1"/>
+            <a:endParaRPr lang="en-GB" sz="1400" cap="none" dirty="0">
+              <a:latin typeface="Georgia" panose="02040502050405020303" pitchFamily="18" charset="0"/>
+            </a:endParaRPr>
+          </a:p>
+        </p:txBody>
+      </p:sp>
+      <p:sp>
+        <p:nvSpPr>
+          <p:cNvPr id="4" name="Title 3"/>
+          <p:cNvSpPr>
+            <a:spLocks noGrp="1"/>
+          </p:cNvSpPr>
+          <p:nvPr>
+            <p:ph type="title"/>
+          </p:nvPr>
+        </p:nvSpPr>
+        <p:spPr/>
+        <p:txBody>
+          <a:bodyPr anchor="ctr" anchorCtr="1"/>
+          <a:lstStyle/>
+          <a:p>
+            <a:r>
+              <a:rPr lang="en-GB" dirty="0" smtClean="0"/>
+              <a:t>Cloud services vs </a:t>
+            </a:r>
+            <a:br>
+              <a:rPr lang="en-GB" dirty="0" smtClean="0"/>
+            </a:br>
+            <a:r>
+              <a:rPr lang="en-GB" dirty="0" smtClean="0"/>
+              <a:t>Cloud </a:t>
+            </a:r>
+            <a:r>
+              <a:rPr lang="en-GB" dirty="0"/>
+              <a:t>services</a:t>
+            </a:r>
+          </a:p>
+        </p:txBody>
+      </p:sp>
+    </p:spTree>
+    <p:extLst>
+      <p:ext uri="{BB962C8B-B14F-4D97-AF65-F5344CB8AC3E}">
+        <p14:creationId xmlns:p14="http://schemas.microsoft.com/office/powerpoint/2010/main" val="2892933450"/>
+      </p:ext>
+    </p:extLst>
+  </p:cSld>
+  <p:clrMapOvr>
+    <a:masterClrMapping/>
+  </p:clrMapOvr>
+</p:sld>
+</file>
+
+<file path=ppt/slides/slide25.xml><?xml version="1.0" encoding="utf-8"?>
+<p:sld xmlns:a="http://schemas.openxmlformats.org/drawingml/2006/main" xmlns:r="http://schemas.openxmlformats.org/officeDocument/2006/relationships" xmlns:p="http://schemas.openxmlformats.org/presentationml/2006/main">
+  <p:cSld>
+    <p:spTree>
+      <p:nvGrpSpPr>
+        <p:cNvPr id="1" name=""/>
+        <p:cNvGrpSpPr/>
+        <p:nvPr/>
+      </p:nvGrpSpPr>
+      <p:grpSpPr>
+        <a:xfrm>
+          <a:off x="0" y="0"/>
+          <a:ext cx="0" cy="0"/>
+          <a:chOff x="0" y="0"/>
+          <a:chExt cx="0" cy="0"/>
+        </a:xfrm>
+      </p:grpSpPr>
+      <p:grpSp>
+        <p:nvGrpSpPr>
+          <p:cNvPr id="5" name="Group 4"/>
+          <p:cNvGrpSpPr/>
+          <p:nvPr/>
+        </p:nvGrpSpPr>
+        <p:grpSpPr>
+          <a:xfrm>
+            <a:off x="467544" y="404664"/>
+            <a:ext cx="5141942" cy="780290"/>
+            <a:chOff x="2530459" y="1780953"/>
+            <a:chExt cx="5141942" cy="780290"/>
+          </a:xfrm>
+        </p:grpSpPr>
+        <p:pic>
+          <p:nvPicPr>
+            <p:cNvPr id="6" name="Picture 5"/>
+            <p:cNvPicPr>
+              <a:picLocks noChangeAspect="1"/>
+            </p:cNvPicPr>
+            <p:nvPr/>
+          </p:nvPicPr>
+          <p:blipFill>
+            <a:blip r:embed="rId2" cstate="print">
+              <a:extLst>
+                <a:ext uri="{28A0092B-C50C-407E-A947-70E740481C1C}">
+                  <a14:useLocalDpi xmlns:a14="http://schemas.microsoft.com/office/drawing/2010/main" val="0"/>
+                </a:ext>
+              </a:extLst>
+            </a:blip>
+            <a:stretch>
+              <a:fillRect/>
+            </a:stretch>
+          </p:blipFill>
+          <p:spPr>
+            <a:xfrm>
+              <a:off x="2530459" y="1780953"/>
+              <a:ext cx="780290" cy="780290"/>
+            </a:xfrm>
+            <a:prstGeom prst="rect">
+              <a:avLst/>
+            </a:prstGeom>
+          </p:spPr>
+        </p:pic>
+        <p:sp>
+          <p:nvSpPr>
+            <p:cNvPr id="7" name="TextBox 6"/>
+            <p:cNvSpPr txBox="1"/>
+            <p:nvPr/>
+          </p:nvSpPr>
+          <p:spPr>
+            <a:xfrm>
+              <a:off x="3898611" y="1817155"/>
+              <a:ext cx="3773790" cy="707886"/>
+            </a:xfrm>
+            <a:prstGeom prst="rect">
+              <a:avLst/>
+            </a:prstGeom>
+            <a:noFill/>
+          </p:spPr>
+          <p:txBody>
+            <a:bodyPr wrap="none" rtlCol="0">
+              <a:spAutoFit/>
+            </a:bodyPr>
+            <a:lstStyle/>
+            <a:p>
+              <a:r>
+                <a:rPr lang="en-GB" sz="4000" dirty="0" smtClean="0">
+                  <a:solidFill>
+                    <a:srgbClr val="737373"/>
+                  </a:solidFill>
+                  <a:latin typeface="News Cycle" panose="02000503000000000000" pitchFamily="2" charset="2"/>
+                </a:rPr>
+                <a:t>CLOUD </a:t>
+              </a:r>
+              <a:r>
+                <a:rPr lang="en-GB" sz="4000" dirty="0" smtClean="0">
+                  <a:solidFill>
+                    <a:srgbClr val="CB623C"/>
+                  </a:solidFill>
+                  <a:latin typeface="News Cycle" panose="02000503000000000000" pitchFamily="2" charset="2"/>
+                </a:rPr>
+                <a:t>SERVICES</a:t>
+              </a:r>
+              <a:endParaRPr lang="en-GB" sz="4000" dirty="0">
+                <a:solidFill>
+                  <a:srgbClr val="CB623C"/>
+                </a:solidFill>
+                <a:latin typeface="News Cycle" panose="02000503000000000000" pitchFamily="2" charset="2"/>
+              </a:endParaRPr>
+            </a:p>
+          </p:txBody>
+        </p:sp>
+      </p:grpSp>
+      <p:grpSp>
+        <p:nvGrpSpPr>
+          <p:cNvPr id="8" name="Group 7"/>
+          <p:cNvGrpSpPr/>
+          <p:nvPr/>
+        </p:nvGrpSpPr>
+        <p:grpSpPr>
+          <a:xfrm>
+            <a:off x="591546" y="1918810"/>
+            <a:ext cx="3383447" cy="780290"/>
+            <a:chOff x="2530459" y="1780953"/>
+            <a:chExt cx="3383447" cy="780290"/>
+          </a:xfrm>
+        </p:grpSpPr>
+        <p:pic>
+          <p:nvPicPr>
+            <p:cNvPr id="9" name="Picture 8"/>
+            <p:cNvPicPr>
+              <a:picLocks noChangeAspect="1"/>
+            </p:cNvPicPr>
+            <p:nvPr/>
+          </p:nvPicPr>
+          <p:blipFill>
+            <a:blip r:embed="rId3" cstate="print">
+              <a:extLst>
+                <a:ext uri="{28A0092B-C50C-407E-A947-70E740481C1C}">
+                  <a14:useLocalDpi xmlns:a14="http://schemas.microsoft.com/office/drawing/2010/main" val="0"/>
+                </a:ext>
+              </a:extLst>
+            </a:blip>
+            <a:stretch>
+              <a:fillRect/>
+            </a:stretch>
+          </p:blipFill>
+          <p:spPr>
+            <a:xfrm>
+              <a:off x="2530459" y="1780953"/>
+              <a:ext cx="780290" cy="780290"/>
+            </a:xfrm>
+            <a:prstGeom prst="rect">
+              <a:avLst/>
+            </a:prstGeom>
+          </p:spPr>
+        </p:pic>
+        <p:sp>
+          <p:nvSpPr>
+            <p:cNvPr id="10" name="TextBox 9"/>
+            <p:cNvSpPr txBox="1"/>
+            <p:nvPr/>
+          </p:nvSpPr>
+          <p:spPr>
+            <a:xfrm>
+              <a:off x="3898611" y="1894099"/>
+              <a:ext cx="2015295" cy="553998"/>
+            </a:xfrm>
+            <a:prstGeom prst="rect">
+              <a:avLst/>
+            </a:prstGeom>
+            <a:noFill/>
+          </p:spPr>
+          <p:txBody>
+            <a:bodyPr wrap="none" rtlCol="0">
+              <a:spAutoFit/>
+            </a:bodyPr>
+            <a:lstStyle/>
+            <a:p>
+              <a:r>
+                <a:rPr lang="en-GB" sz="3000" dirty="0" smtClean="0">
+                  <a:solidFill>
+                    <a:srgbClr val="737373"/>
+                  </a:solidFill>
+                  <a:latin typeface="News Cycle" panose="02000503000000000000" pitchFamily="2" charset="2"/>
+                </a:rPr>
+                <a:t>WEB </a:t>
+              </a:r>
+              <a:r>
+                <a:rPr lang="en-GB" sz="3000" dirty="0" smtClean="0">
+                  <a:solidFill>
+                    <a:srgbClr val="CB623C"/>
+                  </a:solidFill>
+                  <a:latin typeface="News Cycle" panose="02000503000000000000" pitchFamily="2" charset="2"/>
+                </a:rPr>
+                <a:t>ROLES</a:t>
+              </a:r>
+              <a:endParaRPr lang="en-GB" sz="3000" dirty="0">
+                <a:solidFill>
+                  <a:srgbClr val="CB623C"/>
+                </a:solidFill>
+                <a:latin typeface="News Cycle" panose="02000503000000000000" pitchFamily="2" charset="2"/>
+              </a:endParaRPr>
+            </a:p>
+          </p:txBody>
+        </p:sp>
+      </p:grpSp>
+      <p:grpSp>
+        <p:nvGrpSpPr>
+          <p:cNvPr id="11" name="Group 10"/>
+          <p:cNvGrpSpPr/>
+          <p:nvPr/>
+        </p:nvGrpSpPr>
+        <p:grpSpPr>
+          <a:xfrm>
+            <a:off x="591546" y="4329589"/>
+            <a:ext cx="4032664" cy="780290"/>
+            <a:chOff x="2530459" y="1780953"/>
+            <a:chExt cx="4032664" cy="780290"/>
+          </a:xfrm>
+        </p:grpSpPr>
+        <p:pic>
+          <p:nvPicPr>
+            <p:cNvPr id="12" name="Picture 11"/>
+            <p:cNvPicPr>
+              <a:picLocks noChangeAspect="1"/>
+            </p:cNvPicPr>
+            <p:nvPr/>
+          </p:nvPicPr>
+          <p:blipFill>
+            <a:blip r:embed="rId4" cstate="print">
+              <a:extLst>
+                <a:ext uri="{28A0092B-C50C-407E-A947-70E740481C1C}">
+                  <a14:useLocalDpi xmlns:a14="http://schemas.microsoft.com/office/drawing/2010/main" val="0"/>
+                </a:ext>
+              </a:extLst>
+            </a:blip>
+            <a:stretch>
+              <a:fillRect/>
+            </a:stretch>
+          </p:blipFill>
+          <p:spPr>
+            <a:xfrm>
+              <a:off x="2530459" y="1780953"/>
+              <a:ext cx="780290" cy="780290"/>
+            </a:xfrm>
+            <a:prstGeom prst="rect">
+              <a:avLst/>
+            </a:prstGeom>
+          </p:spPr>
+        </p:pic>
+        <p:sp>
+          <p:nvSpPr>
+            <p:cNvPr id="13" name="TextBox 12"/>
+            <p:cNvSpPr txBox="1"/>
+            <p:nvPr/>
+          </p:nvSpPr>
+          <p:spPr>
+            <a:xfrm>
+              <a:off x="3898611" y="1894099"/>
+              <a:ext cx="2664512" cy="553998"/>
+            </a:xfrm>
+            <a:prstGeom prst="rect">
+              <a:avLst/>
+            </a:prstGeom>
+            <a:noFill/>
+          </p:spPr>
+          <p:txBody>
+            <a:bodyPr wrap="none" rtlCol="0">
+              <a:spAutoFit/>
+            </a:bodyPr>
+            <a:lstStyle/>
+            <a:p>
+              <a:r>
+                <a:rPr lang="en-GB" sz="3000" dirty="0" smtClean="0">
+                  <a:solidFill>
+                    <a:srgbClr val="737373"/>
+                  </a:solidFill>
+                  <a:latin typeface="News Cycle" panose="02000503000000000000" pitchFamily="2" charset="2"/>
+                </a:rPr>
+                <a:t>WORKER </a:t>
+              </a:r>
+              <a:r>
+                <a:rPr lang="en-GB" sz="3000" dirty="0" smtClean="0">
+                  <a:solidFill>
+                    <a:srgbClr val="CB623C"/>
+                  </a:solidFill>
+                  <a:latin typeface="News Cycle" panose="02000503000000000000" pitchFamily="2" charset="2"/>
+                </a:rPr>
+                <a:t>ROLES</a:t>
+              </a:r>
+              <a:endParaRPr lang="en-GB" sz="3000" dirty="0">
+                <a:solidFill>
+                  <a:srgbClr val="CB623C"/>
+                </a:solidFill>
+                <a:latin typeface="News Cycle" panose="02000503000000000000" pitchFamily="2" charset="2"/>
+              </a:endParaRPr>
+            </a:p>
+          </p:txBody>
+        </p:sp>
+      </p:grpSp>
+      <p:sp>
+        <p:nvSpPr>
+          <p:cNvPr id="14" name="TextBox 13"/>
+          <p:cNvSpPr txBox="1"/>
+          <p:nvPr/>
+        </p:nvSpPr>
+        <p:spPr>
+          <a:xfrm>
+            <a:off x="760630" y="2936992"/>
+            <a:ext cx="6428726" cy="1015663"/>
+          </a:xfrm>
+          <a:prstGeom prst="rect">
+            <a:avLst/>
+          </a:prstGeom>
+          <a:noFill/>
+        </p:spPr>
+        <p:txBody>
+          <a:bodyPr wrap="square" rtlCol="0">
+            <a:spAutoFit/>
+          </a:bodyPr>
+          <a:lstStyle/>
+          <a:p>
+            <a:pPr marL="285750" indent="-285750">
+              <a:buFont typeface="Arial" panose="020B0604020202020204" pitchFamily="34" charset="0"/>
+              <a:buChar char="•"/>
+            </a:pPr>
+            <a:r>
+              <a:rPr lang="en-GB" sz="2000" dirty="0" smtClean="0">
+                <a:solidFill>
+                  <a:srgbClr val="737373"/>
+                </a:solidFill>
+                <a:latin typeface="Georgia" panose="02040502050405020303" pitchFamily="18" charset="0"/>
+              </a:rPr>
+              <a:t>Runs IIS</a:t>
+            </a:r>
+          </a:p>
+          <a:p>
+            <a:pPr marL="285750" indent="-285750">
+              <a:buFont typeface="Arial" panose="020B0604020202020204" pitchFamily="34" charset="0"/>
+              <a:buChar char="•"/>
+            </a:pPr>
+            <a:r>
+              <a:rPr lang="en-GB" sz="2000" dirty="0" smtClean="0">
+                <a:solidFill>
+                  <a:srgbClr val="737373"/>
+                </a:solidFill>
+                <a:latin typeface="Georgia" panose="02040502050405020303" pitchFamily="18" charset="0"/>
+              </a:rPr>
+              <a:t>Multiple Endpoints</a:t>
+            </a:r>
+          </a:p>
+          <a:p>
+            <a:pPr marL="285750" indent="-285750">
+              <a:buFont typeface="Arial" panose="020B0604020202020204" pitchFamily="34" charset="0"/>
+              <a:buChar char="•"/>
+            </a:pPr>
+            <a:r>
+              <a:rPr lang="en-GB" sz="2000" dirty="0" err="1" smtClean="0">
+                <a:solidFill>
+                  <a:srgbClr val="737373"/>
+                </a:solidFill>
+                <a:latin typeface="Georgia" panose="02040502050405020303" pitchFamily="18" charset="0"/>
+              </a:rPr>
+              <a:t>OnStart</a:t>
+            </a:r>
+            <a:r>
+              <a:rPr lang="en-GB" sz="2000" dirty="0" smtClean="0">
+                <a:solidFill>
+                  <a:srgbClr val="737373"/>
+                </a:solidFill>
+                <a:latin typeface="Georgia" panose="02040502050405020303" pitchFamily="18" charset="0"/>
+              </a:rPr>
+              <a:t> executes before the web app starts</a:t>
+            </a:r>
+            <a:endParaRPr lang="en-GB" sz="2000" dirty="0">
+              <a:solidFill>
+                <a:srgbClr val="737373"/>
+              </a:solidFill>
+              <a:latin typeface="Georgia" panose="02040502050405020303" pitchFamily="18" charset="0"/>
+            </a:endParaRPr>
+          </a:p>
+        </p:txBody>
+      </p:sp>
+      <p:sp>
+        <p:nvSpPr>
+          <p:cNvPr id="15" name="TextBox 14"/>
+          <p:cNvSpPr txBox="1"/>
+          <p:nvPr/>
+        </p:nvSpPr>
+        <p:spPr>
+          <a:xfrm>
+            <a:off x="899592" y="5229200"/>
+            <a:ext cx="6428726" cy="707886"/>
+          </a:xfrm>
+          <a:prstGeom prst="rect">
+            <a:avLst/>
+          </a:prstGeom>
+          <a:noFill/>
+        </p:spPr>
+        <p:txBody>
+          <a:bodyPr wrap="square" rtlCol="0">
+            <a:spAutoFit/>
+          </a:bodyPr>
+          <a:lstStyle/>
+          <a:p>
+            <a:pPr marL="285750" indent="-285750">
+              <a:buFont typeface="Arial" panose="020B0604020202020204" pitchFamily="34" charset="0"/>
+              <a:buChar char="•"/>
+            </a:pPr>
+            <a:r>
+              <a:rPr lang="en-GB" sz="2000" dirty="0" smtClean="0">
+                <a:solidFill>
+                  <a:srgbClr val="737373"/>
+                </a:solidFill>
+                <a:latin typeface="Georgia" panose="02040502050405020303" pitchFamily="18" charset="0"/>
+              </a:rPr>
+              <a:t>Doesn’t run IIS</a:t>
+            </a:r>
+          </a:p>
+          <a:p>
+            <a:pPr marL="285750" indent="-285750">
+              <a:buFont typeface="Arial" panose="020B0604020202020204" pitchFamily="34" charset="0"/>
+              <a:buChar char="•"/>
+            </a:pPr>
+            <a:r>
+              <a:rPr lang="en-GB" sz="2000" dirty="0" smtClean="0">
+                <a:solidFill>
+                  <a:srgbClr val="737373"/>
+                </a:solidFill>
+                <a:latin typeface="Georgia" panose="02040502050405020303" pitchFamily="18" charset="0"/>
+              </a:rPr>
+              <a:t>Doesn’t affect the performance of web roles</a:t>
+            </a:r>
+            <a:endParaRPr lang="en-GB" sz="2000" dirty="0">
+              <a:solidFill>
+                <a:srgbClr val="737373"/>
+              </a:solidFill>
+              <a:latin typeface="Georgia" panose="02040502050405020303" pitchFamily="18" charset="0"/>
+            </a:endParaRPr>
+          </a:p>
+        </p:txBody>
+      </p:sp>
+    </p:spTree>
+    <p:extLst>
+      <p:ext uri="{BB962C8B-B14F-4D97-AF65-F5344CB8AC3E}">
+        <p14:creationId xmlns:p14="http://schemas.microsoft.com/office/powerpoint/2010/main" val="2029543117"/>
+      </p:ext>
+    </p:extLst>
+  </p:cSld>
+  <p:clrMapOvr>
+    <a:masterClrMapping/>
+  </p:clrMapOvr>
+</p:sld>
+</file>
+
 <file path=ppt/slides/slide3.xml><?xml version="1.0" encoding="utf-8"?>
 <p:sld xmlns:a="http://schemas.openxmlformats.org/drawingml/2006/main" xmlns:r="http://schemas.openxmlformats.org/officeDocument/2006/relationships" xmlns:p="http://schemas.openxmlformats.org/presentationml/2006/main">
   <p:cSld>
@@ -8629,8 +9372,8 @@
         </p:blipFill>
         <p:spPr>
           <a:xfrm>
-            <a:off x="1910602" y="1211355"/>
-            <a:ext cx="5322794" cy="5322794"/>
+            <a:off x="1922399" y="1196752"/>
+            <a:ext cx="5299200" cy="5299200"/>
           </a:xfrm>
         </p:spPr>
       </p:pic>

</xml_diff>

<commit_message>
Adds new images, expands on some of the notes and adds notes to the presentation.
</commit_message>
<xml_diff>
--- a/Current/Azure The Good Parts Web Apps/AzureTheGoodParts-WebApps.pptx
+++ b/Current/Azure The Good Parts Web Apps/AzureTheGoodParts-WebApps.pptx
@@ -5,32 +5,36 @@
     <p:sldMasterId id="2147483660" r:id="rId1"/>
     <p:sldMasterId id="2147483672" r:id="rId2"/>
   </p:sldMasterIdLst>
+  <p:notesMasterIdLst>
+    <p:notesMasterId r:id="rId29"/>
+  </p:notesMasterIdLst>
   <p:sldIdLst>
     <p:sldId id="256" r:id="rId3"/>
     <p:sldId id="257" r:id="rId4"/>
-    <p:sldId id="258" r:id="rId5"/>
-    <p:sldId id="259" r:id="rId6"/>
-    <p:sldId id="260" r:id="rId7"/>
-    <p:sldId id="261" r:id="rId8"/>
-    <p:sldId id="262" r:id="rId9"/>
-    <p:sldId id="263" r:id="rId10"/>
-    <p:sldId id="264" r:id="rId11"/>
-    <p:sldId id="265" r:id="rId12"/>
-    <p:sldId id="266" r:id="rId13"/>
-    <p:sldId id="267" r:id="rId14"/>
-    <p:sldId id="268" r:id="rId15"/>
-    <p:sldId id="273" r:id="rId16"/>
-    <p:sldId id="269" r:id="rId17"/>
-    <p:sldId id="270" r:id="rId18"/>
-    <p:sldId id="271" r:id="rId19"/>
-    <p:sldId id="272" r:id="rId20"/>
-    <p:sldId id="274" r:id="rId21"/>
-    <p:sldId id="275" r:id="rId22"/>
-    <p:sldId id="276" r:id="rId23"/>
-    <p:sldId id="277" r:id="rId24"/>
-    <p:sldId id="278" r:id="rId25"/>
-    <p:sldId id="279" r:id="rId26"/>
-    <p:sldId id="280" r:id="rId27"/>
+    <p:sldId id="281" r:id="rId5"/>
+    <p:sldId id="258" r:id="rId6"/>
+    <p:sldId id="259" r:id="rId7"/>
+    <p:sldId id="260" r:id="rId8"/>
+    <p:sldId id="261" r:id="rId9"/>
+    <p:sldId id="262" r:id="rId10"/>
+    <p:sldId id="263" r:id="rId11"/>
+    <p:sldId id="264" r:id="rId12"/>
+    <p:sldId id="265" r:id="rId13"/>
+    <p:sldId id="266" r:id="rId14"/>
+    <p:sldId id="267" r:id="rId15"/>
+    <p:sldId id="268" r:id="rId16"/>
+    <p:sldId id="273" r:id="rId17"/>
+    <p:sldId id="269" r:id="rId18"/>
+    <p:sldId id="270" r:id="rId19"/>
+    <p:sldId id="271" r:id="rId20"/>
+    <p:sldId id="272" r:id="rId21"/>
+    <p:sldId id="274" r:id="rId22"/>
+    <p:sldId id="275" r:id="rId23"/>
+    <p:sldId id="276" r:id="rId24"/>
+    <p:sldId id="277" r:id="rId25"/>
+    <p:sldId id="278" r:id="rId26"/>
+    <p:sldId id="279" r:id="rId27"/>
+    <p:sldId id="280" r:id="rId28"/>
   </p:sldIdLst>
   <p:sldSz cx="9144000" cy="6858000" type="screen4x3"/>
   <p:notesSz cx="6858000" cy="9144000"/>
@@ -148,6 +152,733 @@
 </p:presentation>
 </file>
 
+<file path=ppt/notesMasters/notesMaster1.xml><?xml version="1.0" encoding="utf-8"?>
+<p:notesMaster xmlns:a="http://schemas.openxmlformats.org/drawingml/2006/main" xmlns:r="http://schemas.openxmlformats.org/officeDocument/2006/relationships" xmlns:p="http://schemas.openxmlformats.org/presentationml/2006/main">
+  <p:cSld>
+    <p:bg>
+      <p:bgRef idx="1001">
+        <a:schemeClr val="bg1"/>
+      </p:bgRef>
+    </p:bg>
+    <p:spTree>
+      <p:nvGrpSpPr>
+        <p:cNvPr id="1" name=""/>
+        <p:cNvGrpSpPr/>
+        <p:nvPr/>
+      </p:nvGrpSpPr>
+      <p:grpSpPr>
+        <a:xfrm>
+          <a:off x="0" y="0"/>
+          <a:ext cx="0" cy="0"/>
+          <a:chOff x="0" y="0"/>
+          <a:chExt cx="0" cy="0"/>
+        </a:xfrm>
+      </p:grpSpPr>
+      <p:sp>
+        <p:nvSpPr>
+          <p:cNvPr id="2" name="Header Placeholder 1"/>
+          <p:cNvSpPr>
+            <a:spLocks noGrp="1"/>
+          </p:cNvSpPr>
+          <p:nvPr>
+            <p:ph type="hdr" sz="quarter"/>
+          </p:nvPr>
+        </p:nvSpPr>
+        <p:spPr>
+          <a:xfrm>
+            <a:off x="0" y="0"/>
+            <a:ext cx="2971800" cy="458788"/>
+          </a:xfrm>
+          <a:prstGeom prst="rect">
+            <a:avLst/>
+          </a:prstGeom>
+        </p:spPr>
+        <p:txBody>
+          <a:bodyPr vert="horz" lIns="91440" tIns="45720" rIns="91440" bIns="45720" rtlCol="0"/>
+          <a:lstStyle>
+            <a:lvl1pPr algn="l">
+              <a:defRPr sz="1200"/>
+            </a:lvl1pPr>
+          </a:lstStyle>
+          <a:p>
+            <a:endParaRPr lang="en-GB"/>
+          </a:p>
+        </p:txBody>
+      </p:sp>
+      <p:sp>
+        <p:nvSpPr>
+          <p:cNvPr id="3" name="Date Placeholder 2"/>
+          <p:cNvSpPr>
+            <a:spLocks noGrp="1"/>
+          </p:cNvSpPr>
+          <p:nvPr>
+            <p:ph type="dt" idx="1"/>
+          </p:nvPr>
+        </p:nvSpPr>
+        <p:spPr>
+          <a:xfrm>
+            <a:off x="3884613" y="0"/>
+            <a:ext cx="2971800" cy="458788"/>
+          </a:xfrm>
+          <a:prstGeom prst="rect">
+            <a:avLst/>
+          </a:prstGeom>
+        </p:spPr>
+        <p:txBody>
+          <a:bodyPr vert="horz" lIns="91440" tIns="45720" rIns="91440" bIns="45720" rtlCol="0"/>
+          <a:lstStyle>
+            <a:lvl1pPr algn="r">
+              <a:defRPr sz="1200"/>
+            </a:lvl1pPr>
+          </a:lstStyle>
+          <a:p>
+            <a:fld id="{9E29A4B1-5A86-4619-B723-CCAF1C8CA250}" type="datetimeFigureOut">
+              <a:rPr lang="en-GB" smtClean="0"/>
+              <a:t>28/07/2015</a:t>
+            </a:fld>
+            <a:endParaRPr lang="en-GB"/>
+          </a:p>
+        </p:txBody>
+      </p:sp>
+      <p:sp>
+        <p:nvSpPr>
+          <p:cNvPr id="4" name="Slide Image Placeholder 3"/>
+          <p:cNvSpPr>
+            <a:spLocks noGrp="1" noRot="1" noChangeAspect="1"/>
+          </p:cNvSpPr>
+          <p:nvPr>
+            <p:ph type="sldImg" idx="2"/>
+          </p:nvPr>
+        </p:nvSpPr>
+        <p:spPr>
+          <a:xfrm>
+            <a:off x="1371600" y="1143000"/>
+            <a:ext cx="4114800" cy="3086100"/>
+          </a:xfrm>
+          <a:prstGeom prst="rect">
+            <a:avLst/>
+          </a:prstGeom>
+          <a:noFill/>
+          <a:ln w="12700">
+            <a:solidFill>
+              <a:prstClr val="black"/>
+            </a:solidFill>
+          </a:ln>
+        </p:spPr>
+        <p:txBody>
+          <a:bodyPr vert="horz" lIns="91440" tIns="45720" rIns="91440" bIns="45720" rtlCol="0" anchor="ctr"/>
+          <a:lstStyle/>
+          <a:p>
+            <a:endParaRPr lang="en-GB"/>
+          </a:p>
+        </p:txBody>
+      </p:sp>
+      <p:sp>
+        <p:nvSpPr>
+          <p:cNvPr id="5" name="Notes Placeholder 4"/>
+          <p:cNvSpPr>
+            <a:spLocks noGrp="1"/>
+          </p:cNvSpPr>
+          <p:nvPr>
+            <p:ph type="body" sz="quarter" idx="3"/>
+          </p:nvPr>
+        </p:nvSpPr>
+        <p:spPr>
+          <a:xfrm>
+            <a:off x="685800" y="4400550"/>
+            <a:ext cx="5486400" cy="3600450"/>
+          </a:xfrm>
+          <a:prstGeom prst="rect">
+            <a:avLst/>
+          </a:prstGeom>
+        </p:spPr>
+        <p:txBody>
+          <a:bodyPr vert="horz" lIns="91440" tIns="45720" rIns="91440" bIns="45720" rtlCol="0"/>
+          <a:lstStyle/>
+          <a:p>
+            <a:pPr lvl="0"/>
+            <a:r>
+              <a:rPr lang="en-US" smtClean="0"/>
+              <a:t>Click to edit Master text styles</a:t>
+            </a:r>
+          </a:p>
+          <a:p>
+            <a:pPr lvl="1"/>
+            <a:r>
+              <a:rPr lang="en-US" smtClean="0"/>
+              <a:t>Second level</a:t>
+            </a:r>
+          </a:p>
+          <a:p>
+            <a:pPr lvl="2"/>
+            <a:r>
+              <a:rPr lang="en-US" smtClean="0"/>
+              <a:t>Third level</a:t>
+            </a:r>
+          </a:p>
+          <a:p>
+            <a:pPr lvl="3"/>
+            <a:r>
+              <a:rPr lang="en-US" smtClean="0"/>
+              <a:t>Fourth level</a:t>
+            </a:r>
+          </a:p>
+          <a:p>
+            <a:pPr lvl="4"/>
+            <a:r>
+              <a:rPr lang="en-US" smtClean="0"/>
+              <a:t>Fifth level</a:t>
+            </a:r>
+            <a:endParaRPr lang="en-GB"/>
+          </a:p>
+        </p:txBody>
+      </p:sp>
+      <p:sp>
+        <p:nvSpPr>
+          <p:cNvPr id="6" name="Footer Placeholder 5"/>
+          <p:cNvSpPr>
+            <a:spLocks noGrp="1"/>
+          </p:cNvSpPr>
+          <p:nvPr>
+            <p:ph type="ftr" sz="quarter" idx="4"/>
+          </p:nvPr>
+        </p:nvSpPr>
+        <p:spPr>
+          <a:xfrm>
+            <a:off x="0" y="8685213"/>
+            <a:ext cx="2971800" cy="458787"/>
+          </a:xfrm>
+          <a:prstGeom prst="rect">
+            <a:avLst/>
+          </a:prstGeom>
+        </p:spPr>
+        <p:txBody>
+          <a:bodyPr vert="horz" lIns="91440" tIns="45720" rIns="91440" bIns="45720" rtlCol="0" anchor="b"/>
+          <a:lstStyle>
+            <a:lvl1pPr algn="l">
+              <a:defRPr sz="1200"/>
+            </a:lvl1pPr>
+          </a:lstStyle>
+          <a:p>
+            <a:endParaRPr lang="en-GB"/>
+          </a:p>
+        </p:txBody>
+      </p:sp>
+      <p:sp>
+        <p:nvSpPr>
+          <p:cNvPr id="7" name="Slide Number Placeholder 6"/>
+          <p:cNvSpPr>
+            <a:spLocks noGrp="1"/>
+          </p:cNvSpPr>
+          <p:nvPr>
+            <p:ph type="sldNum" sz="quarter" idx="5"/>
+          </p:nvPr>
+        </p:nvSpPr>
+        <p:spPr>
+          <a:xfrm>
+            <a:off x="3884613" y="8685213"/>
+            <a:ext cx="2971800" cy="458787"/>
+          </a:xfrm>
+          <a:prstGeom prst="rect">
+            <a:avLst/>
+          </a:prstGeom>
+        </p:spPr>
+        <p:txBody>
+          <a:bodyPr vert="horz" lIns="91440" tIns="45720" rIns="91440" bIns="45720" rtlCol="0" anchor="b"/>
+          <a:lstStyle>
+            <a:lvl1pPr algn="r">
+              <a:defRPr sz="1200"/>
+            </a:lvl1pPr>
+          </a:lstStyle>
+          <a:p>
+            <a:fld id="{F9DCBFB8-3C0D-4265-9EBB-AF74934A7B39}" type="slidenum">
+              <a:rPr lang="en-GB" smtClean="0"/>
+              <a:t>‹#›</a:t>
+            </a:fld>
+            <a:endParaRPr lang="en-GB"/>
+          </a:p>
+        </p:txBody>
+      </p:sp>
+    </p:spTree>
+    <p:extLst>
+      <p:ext uri="{BB962C8B-B14F-4D97-AF65-F5344CB8AC3E}">
+        <p14:creationId xmlns:p14="http://schemas.microsoft.com/office/powerpoint/2010/main" val="2282726114"/>
+      </p:ext>
+    </p:extLst>
+  </p:cSld>
+  <p:clrMap bg1="lt1" tx1="dk1" bg2="lt2" tx2="dk2" accent1="accent1" accent2="accent2" accent3="accent3" accent4="accent4" accent5="accent5" accent6="accent6" hlink="hlink" folHlink="folHlink"/>
+  <p:notesStyle>
+    <a:lvl1pPr marL="0" algn="l" defTabSz="914400" rtl="0" eaLnBrk="1" latinLnBrk="0" hangingPunct="1">
+      <a:defRPr sz="1200" kern="1200">
+        <a:solidFill>
+          <a:schemeClr val="tx1"/>
+        </a:solidFill>
+        <a:latin typeface="+mn-lt"/>
+        <a:ea typeface="+mn-ea"/>
+        <a:cs typeface="+mn-cs"/>
+      </a:defRPr>
+    </a:lvl1pPr>
+    <a:lvl2pPr marL="457200" algn="l" defTabSz="914400" rtl="0" eaLnBrk="1" latinLnBrk="0" hangingPunct="1">
+      <a:defRPr sz="1200" kern="1200">
+        <a:solidFill>
+          <a:schemeClr val="tx1"/>
+        </a:solidFill>
+        <a:latin typeface="+mn-lt"/>
+        <a:ea typeface="+mn-ea"/>
+        <a:cs typeface="+mn-cs"/>
+      </a:defRPr>
+    </a:lvl2pPr>
+    <a:lvl3pPr marL="914400" algn="l" defTabSz="914400" rtl="0" eaLnBrk="1" latinLnBrk="0" hangingPunct="1">
+      <a:defRPr sz="1200" kern="1200">
+        <a:solidFill>
+          <a:schemeClr val="tx1"/>
+        </a:solidFill>
+        <a:latin typeface="+mn-lt"/>
+        <a:ea typeface="+mn-ea"/>
+        <a:cs typeface="+mn-cs"/>
+      </a:defRPr>
+    </a:lvl3pPr>
+    <a:lvl4pPr marL="1371600" algn="l" defTabSz="914400" rtl="0" eaLnBrk="1" latinLnBrk="0" hangingPunct="1">
+      <a:defRPr sz="1200" kern="1200">
+        <a:solidFill>
+          <a:schemeClr val="tx1"/>
+        </a:solidFill>
+        <a:latin typeface="+mn-lt"/>
+        <a:ea typeface="+mn-ea"/>
+        <a:cs typeface="+mn-cs"/>
+      </a:defRPr>
+    </a:lvl4pPr>
+    <a:lvl5pPr marL="1828800" algn="l" defTabSz="914400" rtl="0" eaLnBrk="1" latinLnBrk="0" hangingPunct="1">
+      <a:defRPr sz="1200" kern="1200">
+        <a:solidFill>
+          <a:schemeClr val="tx1"/>
+        </a:solidFill>
+        <a:latin typeface="+mn-lt"/>
+        <a:ea typeface="+mn-ea"/>
+        <a:cs typeface="+mn-cs"/>
+      </a:defRPr>
+    </a:lvl5pPr>
+    <a:lvl6pPr marL="2286000" algn="l" defTabSz="914400" rtl="0" eaLnBrk="1" latinLnBrk="0" hangingPunct="1">
+      <a:defRPr sz="1200" kern="1200">
+        <a:solidFill>
+          <a:schemeClr val="tx1"/>
+        </a:solidFill>
+        <a:latin typeface="+mn-lt"/>
+        <a:ea typeface="+mn-ea"/>
+        <a:cs typeface="+mn-cs"/>
+      </a:defRPr>
+    </a:lvl6pPr>
+    <a:lvl7pPr marL="2743200" algn="l" defTabSz="914400" rtl="0" eaLnBrk="1" latinLnBrk="0" hangingPunct="1">
+      <a:defRPr sz="1200" kern="1200">
+        <a:solidFill>
+          <a:schemeClr val="tx1"/>
+        </a:solidFill>
+        <a:latin typeface="+mn-lt"/>
+        <a:ea typeface="+mn-ea"/>
+        <a:cs typeface="+mn-cs"/>
+      </a:defRPr>
+    </a:lvl7pPr>
+    <a:lvl8pPr marL="3200400" algn="l" defTabSz="914400" rtl="0" eaLnBrk="1" latinLnBrk="0" hangingPunct="1">
+      <a:defRPr sz="1200" kern="1200">
+        <a:solidFill>
+          <a:schemeClr val="tx1"/>
+        </a:solidFill>
+        <a:latin typeface="+mn-lt"/>
+        <a:ea typeface="+mn-ea"/>
+        <a:cs typeface="+mn-cs"/>
+      </a:defRPr>
+    </a:lvl8pPr>
+    <a:lvl9pPr marL="3657600" algn="l" defTabSz="914400" rtl="0" eaLnBrk="1" latinLnBrk="0" hangingPunct="1">
+      <a:defRPr sz="1200" kern="1200">
+        <a:solidFill>
+          <a:schemeClr val="tx1"/>
+        </a:solidFill>
+        <a:latin typeface="+mn-lt"/>
+        <a:ea typeface="+mn-ea"/>
+        <a:cs typeface="+mn-cs"/>
+      </a:defRPr>
+    </a:lvl9pPr>
+  </p:notesStyle>
+</p:notesMaster>
+</file>
+
+<file path=ppt/notesSlides/notesSlide1.xml><?xml version="1.0" encoding="utf-8"?>
+<p:notes xmlns:a="http://schemas.openxmlformats.org/drawingml/2006/main" xmlns:r="http://schemas.openxmlformats.org/officeDocument/2006/relationships" xmlns:p="http://schemas.openxmlformats.org/presentationml/2006/main">
+  <p:cSld>
+    <p:spTree>
+      <p:nvGrpSpPr>
+        <p:cNvPr id="1" name=""/>
+        <p:cNvGrpSpPr/>
+        <p:nvPr/>
+      </p:nvGrpSpPr>
+      <p:grpSpPr>
+        <a:xfrm>
+          <a:off x="0" y="0"/>
+          <a:ext cx="0" cy="0"/>
+          <a:chOff x="0" y="0"/>
+          <a:chExt cx="0" cy="0"/>
+        </a:xfrm>
+      </p:grpSpPr>
+      <p:sp>
+        <p:nvSpPr>
+          <p:cNvPr id="2" name="Slide Image Placeholder 1"/>
+          <p:cNvSpPr>
+            <a:spLocks noGrp="1" noRot="1" noChangeAspect="1"/>
+          </p:cNvSpPr>
+          <p:nvPr>
+            <p:ph type="sldImg"/>
+          </p:nvPr>
+        </p:nvSpPr>
+        <p:spPr/>
+      </p:sp>
+      <p:sp>
+        <p:nvSpPr>
+          <p:cNvPr id="3" name="Notes Placeholder 2"/>
+          <p:cNvSpPr>
+            <a:spLocks noGrp="1"/>
+          </p:cNvSpPr>
+          <p:nvPr>
+            <p:ph type="body" idx="1"/>
+          </p:nvPr>
+        </p:nvSpPr>
+        <p:spPr/>
+        <p:txBody>
+          <a:bodyPr/>
+          <a:lstStyle/>
+          <a:p>
+            <a:r>
+              <a:rPr lang="en-GB" u="sng" dirty="0" smtClean="0"/>
+              <a:t>Introduction</a:t>
+            </a:r>
+          </a:p>
+          <a:p>
+            <a:endParaRPr lang="en-GB" dirty="0" smtClean="0"/>
+          </a:p>
+          <a:p>
+            <a:r>
+              <a:rPr lang="en-GB" u="sng" dirty="0" smtClean="0"/>
+              <a:t>Who am I</a:t>
+            </a:r>
+            <a:endParaRPr lang="en-GB" u="sng" dirty="0" smtClean="0">
+              <a:sym typeface="Wingdings" panose="05000000000000000000" pitchFamily="2" charset="2"/>
+            </a:endParaRPr>
+          </a:p>
+          <a:p>
+            <a:pPr marL="171450" indent="-171450">
+              <a:buFont typeface="Arial" panose="020B0604020202020204" pitchFamily="34" charset="0"/>
+              <a:buChar char="•"/>
+            </a:pPr>
+            <a:r>
+              <a:rPr lang="en-GB" dirty="0" smtClean="0">
+                <a:sym typeface="Wingdings" panose="05000000000000000000" pitchFamily="2" charset="2"/>
+              </a:rPr>
+              <a:t>Name</a:t>
+            </a:r>
+          </a:p>
+          <a:p>
+            <a:pPr marL="171450" indent="-171450">
+              <a:buFont typeface="Arial" panose="020B0604020202020204" pitchFamily="34" charset="0"/>
+              <a:buChar char="•"/>
+            </a:pPr>
+            <a:r>
+              <a:rPr lang="en-GB" dirty="0" smtClean="0">
+                <a:sym typeface="Wingdings" panose="05000000000000000000" pitchFamily="2" charset="2"/>
+              </a:rPr>
+              <a:t>Twitter</a:t>
+            </a:r>
+          </a:p>
+          <a:p>
+            <a:pPr marL="171450" indent="-171450">
+              <a:buFont typeface="Arial" panose="020B0604020202020204" pitchFamily="34" charset="0"/>
+              <a:buChar char="•"/>
+            </a:pPr>
+            <a:r>
+              <a:rPr lang="en-GB" dirty="0" smtClean="0">
+                <a:sym typeface="Wingdings" panose="05000000000000000000" pitchFamily="2" charset="2"/>
+              </a:rPr>
+              <a:t>Email</a:t>
+            </a:r>
+          </a:p>
+          <a:p>
+            <a:pPr marL="171450" indent="-171450">
+              <a:buFont typeface="Arial" panose="020B0604020202020204" pitchFamily="34" charset="0"/>
+              <a:buChar char="•"/>
+            </a:pPr>
+            <a:r>
+              <a:rPr lang="en-GB" dirty="0" smtClean="0">
+                <a:sym typeface="Wingdings" panose="05000000000000000000" pitchFamily="2" charset="2"/>
+              </a:rPr>
+              <a:t>Blog</a:t>
+            </a:r>
+          </a:p>
+          <a:p>
+            <a:pPr marL="171450" indent="-171450">
+              <a:buFont typeface="Arial" panose="020B0604020202020204" pitchFamily="34" charset="0"/>
+              <a:buChar char="•"/>
+            </a:pPr>
+            <a:r>
+              <a:rPr lang="en-GB" dirty="0" smtClean="0">
+                <a:sym typeface="Wingdings" panose="05000000000000000000" pitchFamily="2" charset="2"/>
+              </a:rPr>
+              <a:t>Bio</a:t>
+            </a:r>
+          </a:p>
+          <a:p>
+            <a:endParaRPr lang="en-GB" dirty="0" smtClean="0"/>
+          </a:p>
+          <a:p>
+            <a:r>
+              <a:rPr lang="en-GB" u="sng" dirty="0" smtClean="0"/>
+              <a:t>What am I talking about &amp; who is this talk for</a:t>
+            </a:r>
+          </a:p>
+          <a:p>
+            <a:pPr marL="171450" indent="-171450">
+              <a:buFont typeface="Arial" panose="020B0604020202020204" pitchFamily="34" charset="0"/>
+              <a:buChar char="•"/>
+            </a:pPr>
+            <a:r>
+              <a:rPr lang="en-GB" dirty="0" smtClean="0"/>
+              <a:t>Azure, </a:t>
+            </a:r>
+            <a:r>
+              <a:rPr lang="en-GB" dirty="0" err="1" smtClean="0"/>
+              <a:t>WebApps</a:t>
+            </a:r>
+            <a:r>
+              <a:rPr lang="en-GB" dirty="0" smtClean="0"/>
+              <a:t> &amp; the Azure Services you can use</a:t>
+            </a:r>
+          </a:p>
+          <a:p>
+            <a:pPr marL="171450" indent="-171450">
+              <a:buFont typeface="Arial" panose="020B0604020202020204" pitchFamily="34" charset="0"/>
+              <a:buChar char="•"/>
+            </a:pPr>
+            <a:r>
+              <a:rPr lang="en-GB" dirty="0" smtClean="0"/>
+              <a:t>Aimed at</a:t>
+            </a:r>
+            <a:r>
+              <a:rPr lang="en-GB" baseline="0" dirty="0" smtClean="0"/>
+              <a:t> developers, but could be used for IT professionals new to Could Computing</a:t>
+            </a:r>
+          </a:p>
+          <a:p>
+            <a:pPr marL="171450" indent="-171450">
+              <a:buFont typeface="Arial" panose="020B0604020202020204" pitchFamily="34" charset="0"/>
+              <a:buChar char="•"/>
+            </a:pPr>
+            <a:r>
+              <a:rPr lang="en-GB" baseline="0" dirty="0" smtClean="0"/>
+              <a:t>Throughout talk give overviews, basic setup &amp; configuration and demos</a:t>
+            </a:r>
+            <a:endParaRPr lang="en-GB" dirty="0" smtClean="0"/>
+          </a:p>
+        </p:txBody>
+      </p:sp>
+      <p:sp>
+        <p:nvSpPr>
+          <p:cNvPr id="4" name="Slide Number Placeholder 3"/>
+          <p:cNvSpPr>
+            <a:spLocks noGrp="1"/>
+          </p:cNvSpPr>
+          <p:nvPr>
+            <p:ph type="sldNum" sz="quarter" idx="10"/>
+          </p:nvPr>
+        </p:nvSpPr>
+        <p:spPr/>
+        <p:txBody>
+          <a:bodyPr/>
+          <a:lstStyle/>
+          <a:p>
+            <a:fld id="{F9DCBFB8-3C0D-4265-9EBB-AF74934A7B39}" type="slidenum">
+              <a:rPr lang="en-GB" smtClean="0"/>
+              <a:t>1</a:t>
+            </a:fld>
+            <a:endParaRPr lang="en-GB"/>
+          </a:p>
+        </p:txBody>
+      </p:sp>
+    </p:spTree>
+    <p:extLst>
+      <p:ext uri="{BB962C8B-B14F-4D97-AF65-F5344CB8AC3E}">
+        <p14:creationId xmlns:p14="http://schemas.microsoft.com/office/powerpoint/2010/main" val="1413195144"/>
+      </p:ext>
+    </p:extLst>
+  </p:cSld>
+  <p:clrMapOvr>
+    <a:masterClrMapping/>
+  </p:clrMapOvr>
+</p:notes>
+</file>
+
+<file path=ppt/notesSlides/notesSlide2.xml><?xml version="1.0" encoding="utf-8"?>
+<p:notes xmlns:a="http://schemas.openxmlformats.org/drawingml/2006/main" xmlns:r="http://schemas.openxmlformats.org/officeDocument/2006/relationships" xmlns:p="http://schemas.openxmlformats.org/presentationml/2006/main">
+  <p:cSld>
+    <p:spTree>
+      <p:nvGrpSpPr>
+        <p:cNvPr id="1" name=""/>
+        <p:cNvGrpSpPr/>
+        <p:nvPr/>
+      </p:nvGrpSpPr>
+      <p:grpSpPr>
+        <a:xfrm>
+          <a:off x="0" y="0"/>
+          <a:ext cx="0" cy="0"/>
+          <a:chOff x="0" y="0"/>
+          <a:chExt cx="0" cy="0"/>
+        </a:xfrm>
+      </p:grpSpPr>
+      <p:sp>
+        <p:nvSpPr>
+          <p:cNvPr id="2" name="Slide Image Placeholder 1"/>
+          <p:cNvSpPr>
+            <a:spLocks noGrp="1" noRot="1" noChangeAspect="1"/>
+          </p:cNvSpPr>
+          <p:nvPr>
+            <p:ph type="sldImg"/>
+          </p:nvPr>
+        </p:nvSpPr>
+        <p:spPr/>
+      </p:sp>
+      <p:sp>
+        <p:nvSpPr>
+          <p:cNvPr id="3" name="Notes Placeholder 2"/>
+          <p:cNvSpPr>
+            <a:spLocks noGrp="1"/>
+          </p:cNvSpPr>
+          <p:nvPr>
+            <p:ph type="body" idx="1"/>
+          </p:nvPr>
+        </p:nvSpPr>
+        <p:spPr/>
+        <p:txBody>
+          <a:bodyPr/>
+          <a:lstStyle/>
+          <a:p>
+            <a:r>
+              <a:rPr lang="en-GB" dirty="0" smtClean="0"/>
+              <a:t>Assumptions</a:t>
+            </a:r>
+          </a:p>
+          <a:p>
+            <a:pPr marL="171450" indent="-171450">
+              <a:buFont typeface="Arial" panose="020B0604020202020204" pitchFamily="34" charset="0"/>
+              <a:buChar char="•"/>
+            </a:pPr>
+            <a:r>
+              <a:rPr lang="en-GB" dirty="0" smtClean="0"/>
+              <a:t>Basic HTTP and C# knowledge.</a:t>
+            </a:r>
+          </a:p>
+          <a:p>
+            <a:pPr marL="171450" indent="-171450">
+              <a:buFont typeface="Arial" panose="020B0604020202020204" pitchFamily="34" charset="0"/>
+              <a:buChar char="•"/>
+            </a:pPr>
+            <a:r>
+              <a:rPr lang="en-GB" dirty="0" smtClean="0"/>
+              <a:t>The Azure SDK and Visual Studio installed I'll be using 2013/2015 Community.</a:t>
+            </a:r>
+          </a:p>
+          <a:p>
+            <a:pPr marL="171450" indent="-171450">
+              <a:buFont typeface="Arial" panose="020B0604020202020204" pitchFamily="34" charset="0"/>
+              <a:buChar char="•"/>
+            </a:pPr>
+            <a:r>
+              <a:rPr lang="en-GB" dirty="0" smtClean="0"/>
+              <a:t>An Azure subscription.</a:t>
+            </a:r>
+          </a:p>
+          <a:p>
+            <a:pPr marL="171450" indent="-171450">
+              <a:buFont typeface="Arial" panose="020B0604020202020204" pitchFamily="34" charset="0"/>
+              <a:buChar char="•"/>
+            </a:pPr>
+            <a:r>
+              <a:rPr lang="en-GB" dirty="0" smtClean="0"/>
+              <a:t>I wont be talking</a:t>
+            </a:r>
+            <a:r>
+              <a:rPr lang="en-GB" baseline="0" dirty="0" smtClean="0"/>
+              <a:t> about</a:t>
+            </a:r>
+            <a:r>
+              <a:rPr lang="en-GB" dirty="0" smtClean="0"/>
+              <a:t> </a:t>
+            </a:r>
+          </a:p>
+          <a:p>
+            <a:pPr marL="628650" lvl="1" indent="-171450">
+              <a:buFont typeface="Arial" panose="020B0604020202020204" pitchFamily="34" charset="0"/>
+              <a:buChar char="•"/>
+            </a:pPr>
+            <a:r>
+              <a:rPr lang="en-GB" dirty="0" smtClean="0"/>
+              <a:t>Infrastructure-as-a-Service features </a:t>
+            </a:r>
+          </a:p>
+          <a:p>
+            <a:pPr marL="628650" lvl="1" indent="-171450">
+              <a:buFont typeface="Arial" panose="020B0604020202020204" pitchFamily="34" charset="0"/>
+              <a:buChar char="•"/>
+            </a:pPr>
+            <a:r>
+              <a:rPr lang="en-GB" dirty="0" smtClean="0"/>
+              <a:t>BI tools</a:t>
+            </a:r>
+          </a:p>
+          <a:p>
+            <a:pPr marL="171450" lvl="0" indent="-171450">
+              <a:buFont typeface="Arial" panose="020B0604020202020204" pitchFamily="34" charset="0"/>
+              <a:buChar char="•"/>
+            </a:pPr>
+            <a:r>
+              <a:rPr lang="en-GB" dirty="0" smtClean="0"/>
+              <a:t>No Billing, but there is a calculator</a:t>
+            </a:r>
+            <a:endParaRPr lang="en-GB" dirty="0"/>
+          </a:p>
+        </p:txBody>
+      </p:sp>
+      <p:sp>
+        <p:nvSpPr>
+          <p:cNvPr id="4" name="Slide Number Placeholder 3"/>
+          <p:cNvSpPr>
+            <a:spLocks noGrp="1"/>
+          </p:cNvSpPr>
+          <p:nvPr>
+            <p:ph type="sldNum" sz="quarter" idx="10"/>
+          </p:nvPr>
+        </p:nvSpPr>
+        <p:spPr/>
+        <p:txBody>
+          <a:bodyPr/>
+          <a:lstStyle/>
+          <a:p>
+            <a:fld id="{F9DCBFB8-3C0D-4265-9EBB-AF74934A7B39}" type="slidenum">
+              <a:rPr lang="en-GB" smtClean="0"/>
+              <a:t>2</a:t>
+            </a:fld>
+            <a:endParaRPr lang="en-GB"/>
+          </a:p>
+        </p:txBody>
+      </p:sp>
+    </p:spTree>
+    <p:extLst>
+      <p:ext uri="{BB962C8B-B14F-4D97-AF65-F5344CB8AC3E}">
+        <p14:creationId xmlns:p14="http://schemas.microsoft.com/office/powerpoint/2010/main" val="1306969724"/>
+      </p:ext>
+    </p:extLst>
+  </p:cSld>
+  <p:clrMapOvr>
+    <a:masterClrMapping/>
+  </p:clrMapOvr>
+</p:notes>
+</file>
+
 <file path=ppt/slideLayouts/slideLayout1.xml><?xml version="1.0" encoding="utf-8"?>
 <p:sldLayout xmlns:a="http://schemas.openxmlformats.org/drawingml/2006/main" xmlns:r="http://schemas.openxmlformats.org/officeDocument/2006/relationships" xmlns:p="http://schemas.openxmlformats.org/presentationml/2006/main" type="title" preserve="1">
   <p:cSld name="Title Slide">
@@ -279,7 +1010,7 @@
           <a:p>
             <a:fld id="{8A04FFFD-6AAA-4290-B9C8-6140E8302CD5}" type="datetimeFigureOut">
               <a:rPr lang="en-GB" smtClean="0"/>
-              <a:t>26/07/2015</a:t>
+              <a:t>28/07/2015</a:t>
             </a:fld>
             <a:endParaRPr lang="en-GB"/>
           </a:p>
@@ -449,7 +1180,7 @@
           <a:p>
             <a:fld id="{8A04FFFD-6AAA-4290-B9C8-6140E8302CD5}" type="datetimeFigureOut">
               <a:rPr lang="en-GB" smtClean="0"/>
-              <a:t>26/07/2015</a:t>
+              <a:t>28/07/2015</a:t>
             </a:fld>
             <a:endParaRPr lang="en-GB"/>
           </a:p>
@@ -629,7 +1360,7 @@
           <a:p>
             <a:fld id="{8A04FFFD-6AAA-4290-B9C8-6140E8302CD5}" type="datetimeFigureOut">
               <a:rPr lang="en-GB" smtClean="0"/>
-              <a:t>26/07/2015</a:t>
+              <a:t>28/07/2015</a:t>
             </a:fld>
             <a:endParaRPr lang="en-GB"/>
           </a:p>
@@ -1373,7 +2104,7 @@
           <a:p>
             <a:fld id="{8A04FFFD-6AAA-4290-B9C8-6140E8302CD5}" type="datetimeFigureOut">
               <a:rPr lang="en-GB" smtClean="0"/>
-              <a:t>26/07/2015</a:t>
+              <a:t>28/07/2015</a:t>
             </a:fld>
             <a:endParaRPr lang="en-GB"/>
           </a:p>
@@ -1617,7 +2348,7 @@
           <a:p>
             <a:fld id="{8A04FFFD-6AAA-4290-B9C8-6140E8302CD5}" type="datetimeFigureOut">
               <a:rPr lang="en-GB" smtClean="0"/>
-              <a:t>26/07/2015</a:t>
+              <a:t>28/07/2015</a:t>
             </a:fld>
             <a:endParaRPr lang="en-GB"/>
           </a:p>
@@ -1849,7 +2580,7 @@
           <a:p>
             <a:fld id="{8A04FFFD-6AAA-4290-B9C8-6140E8302CD5}" type="datetimeFigureOut">
               <a:rPr lang="en-GB" smtClean="0"/>
-              <a:t>26/07/2015</a:t>
+              <a:t>28/07/2015</a:t>
             </a:fld>
             <a:endParaRPr lang="en-GB"/>
           </a:p>
@@ -2216,7 +2947,7 @@
           <a:p>
             <a:fld id="{8A04FFFD-6AAA-4290-B9C8-6140E8302CD5}" type="datetimeFigureOut">
               <a:rPr lang="en-GB" smtClean="0"/>
-              <a:t>26/07/2015</a:t>
+              <a:t>28/07/2015</a:t>
             </a:fld>
             <a:endParaRPr lang="en-GB"/>
           </a:p>
@@ -2334,7 +3065,7 @@
           <a:p>
             <a:fld id="{8A04FFFD-6AAA-4290-B9C8-6140E8302CD5}" type="datetimeFigureOut">
               <a:rPr lang="en-GB" smtClean="0"/>
-              <a:t>26/07/2015</a:t>
+              <a:t>28/07/2015</a:t>
             </a:fld>
             <a:endParaRPr lang="en-GB"/>
           </a:p>
@@ -2429,7 +3160,7 @@
           <a:p>
             <a:fld id="{8A04FFFD-6AAA-4290-B9C8-6140E8302CD5}" type="datetimeFigureOut">
               <a:rPr lang="en-GB" smtClean="0"/>
-              <a:t>26/07/2015</a:t>
+              <a:t>28/07/2015</a:t>
             </a:fld>
             <a:endParaRPr lang="en-GB"/>
           </a:p>
@@ -2706,7 +3437,7 @@
           <a:p>
             <a:fld id="{8A04FFFD-6AAA-4290-B9C8-6140E8302CD5}" type="datetimeFigureOut">
               <a:rPr lang="en-GB" smtClean="0"/>
-              <a:t>26/07/2015</a:t>
+              <a:t>28/07/2015</a:t>
             </a:fld>
             <a:endParaRPr lang="en-GB"/>
           </a:p>
@@ -2963,7 +3694,7 @@
           <a:p>
             <a:fld id="{8A04FFFD-6AAA-4290-B9C8-6140E8302CD5}" type="datetimeFigureOut">
               <a:rPr lang="en-GB" smtClean="0"/>
-              <a:t>26/07/2015</a:t>
+              <a:t>28/07/2015</a:t>
             </a:fld>
             <a:endParaRPr lang="en-GB"/>
           </a:p>
@@ -3185,7 +3916,7 @@
           <a:p>
             <a:fld id="{8A04FFFD-6AAA-4290-B9C8-6140E8302CD5}" type="datetimeFigureOut">
               <a:rPr lang="en-GB" smtClean="0"/>
-              <a:t>26/07/2015</a:t>
+              <a:t>28/07/2015</a:t>
             </a:fld>
             <a:endParaRPr lang="en-GB"/>
           </a:p>
@@ -3979,6 +4710,507 @@
         </p:nvSpPr>
         <p:spPr>
           <a:xfrm>
+            <a:off x="278845" y="1297295"/>
+            <a:ext cx="2181967" cy="469905"/>
+          </a:xfrm>
+        </p:spPr>
+        <p:txBody>
+          <a:bodyPr/>
+          <a:lstStyle/>
+          <a:p>
+            <a:pPr marL="0" indent="0">
+              <a:buNone/>
+            </a:pPr>
+            <a:r>
+              <a:rPr lang="en-GB" dirty="0" smtClean="0"/>
+              <a:t>Blog / </a:t>
+            </a:r>
+            <a:r>
+              <a:rPr lang="en-GB" dirty="0" err="1" smtClean="0">
+                <a:solidFill>
+                  <a:srgbClr val="CB623C"/>
+                </a:solidFill>
+              </a:rPr>
+              <a:t>cms</a:t>
+            </a:r>
+            <a:endParaRPr lang="en-GB" dirty="0">
+              <a:solidFill>
+                <a:srgbClr val="CB623C"/>
+              </a:solidFill>
+            </a:endParaRPr>
+          </a:p>
+        </p:txBody>
+      </p:sp>
+      <p:sp>
+        <p:nvSpPr>
+          <p:cNvPr id="4" name="Title 3"/>
+          <p:cNvSpPr>
+            <a:spLocks noGrp="1"/>
+          </p:cNvSpPr>
+          <p:nvPr>
+            <p:ph type="title"/>
+          </p:nvPr>
+        </p:nvSpPr>
+        <p:spPr>
+          <a:xfrm>
+            <a:off x="0" y="127458"/>
+            <a:ext cx="9143999" cy="757130"/>
+          </a:xfrm>
+        </p:spPr>
+        <p:txBody>
+          <a:bodyPr anchor="ctr" anchorCtr="0">
+            <a:spAutoFit/>
+          </a:bodyPr>
+          <a:lstStyle/>
+          <a:p>
+            <a:r>
+              <a:rPr lang="en-GB" dirty="0" err="1" smtClean="0"/>
+              <a:t>Webapp</a:t>
+            </a:r>
+            <a:r>
+              <a:rPr lang="en-GB" dirty="0" smtClean="0"/>
+              <a:t> marketplace</a:t>
+            </a:r>
+            <a:endParaRPr lang="en-GB" dirty="0"/>
+          </a:p>
+        </p:txBody>
+      </p:sp>
+      <p:pic>
+        <p:nvPicPr>
+          <p:cNvPr id="6" name="Picture 5"/>
+          <p:cNvPicPr>
+            <a:picLocks noChangeAspect="1"/>
+          </p:cNvPicPr>
+          <p:nvPr/>
+        </p:nvPicPr>
+        <p:blipFill>
+          <a:blip r:embed="rId2" cstate="print">
+            <a:extLst>
+              <a:ext uri="{28A0092B-C50C-407E-A947-70E740481C1C}">
+                <a14:useLocalDpi xmlns:a14="http://schemas.microsoft.com/office/drawing/2010/main" val="0"/>
+              </a:ext>
+            </a:extLst>
+          </a:blip>
+          <a:stretch>
+            <a:fillRect/>
+          </a:stretch>
+        </p:blipFill>
+        <p:spPr>
+          <a:xfrm>
+            <a:off x="278845" y="2022694"/>
+            <a:ext cx="1402037" cy="1402037"/>
+          </a:xfrm>
+          <a:prstGeom prst="rect">
+            <a:avLst/>
+          </a:prstGeom>
+        </p:spPr>
+      </p:pic>
+      <p:pic>
+        <p:nvPicPr>
+          <p:cNvPr id="7" name="Picture 6"/>
+          <p:cNvPicPr>
+            <a:picLocks noChangeAspect="1"/>
+          </p:cNvPicPr>
+          <p:nvPr/>
+        </p:nvPicPr>
+        <p:blipFill rotWithShape="1">
+          <a:blip r:embed="rId3">
+            <a:extLst>
+              <a:ext uri="{28A0092B-C50C-407E-A947-70E740481C1C}">
+                <a14:useLocalDpi xmlns:a14="http://schemas.microsoft.com/office/drawing/2010/main" val="0"/>
+              </a:ext>
+            </a:extLst>
+          </a:blip>
+          <a:srcRect r="69250"/>
+          <a:stretch/>
+        </p:blipFill>
+        <p:spPr>
+          <a:xfrm>
+            <a:off x="2669957" y="1999815"/>
+            <a:ext cx="1437103" cy="1402036"/>
+          </a:xfrm>
+          <a:prstGeom prst="rect">
+            <a:avLst/>
+          </a:prstGeom>
+        </p:spPr>
+      </p:pic>
+      <p:pic>
+        <p:nvPicPr>
+          <p:cNvPr id="8" name="Picture 7"/>
+          <p:cNvPicPr>
+            <a:picLocks noChangeAspect="1"/>
+          </p:cNvPicPr>
+          <p:nvPr/>
+        </p:nvPicPr>
+        <p:blipFill rotWithShape="1">
+          <a:blip r:embed="rId4" cstate="print">
+            <a:extLst>
+              <a:ext uri="{28A0092B-C50C-407E-A947-70E740481C1C}">
+                <a14:useLocalDpi xmlns:a14="http://schemas.microsoft.com/office/drawing/2010/main" val="0"/>
+              </a:ext>
+            </a:extLst>
+          </a:blip>
+          <a:srcRect r="78733"/>
+          <a:stretch/>
+        </p:blipFill>
+        <p:spPr>
+          <a:xfrm>
+            <a:off x="5096135" y="1999815"/>
+            <a:ext cx="1478549" cy="1402037"/>
+          </a:xfrm>
+          <a:prstGeom prst="rect">
+            <a:avLst/>
+          </a:prstGeom>
+        </p:spPr>
+      </p:pic>
+      <p:pic>
+        <p:nvPicPr>
+          <p:cNvPr id="9" name="Picture 8"/>
+          <p:cNvPicPr>
+            <a:picLocks noChangeAspect="1"/>
+          </p:cNvPicPr>
+          <p:nvPr/>
+        </p:nvPicPr>
+        <p:blipFill>
+          <a:blip r:embed="rId5" cstate="print">
+            <a:extLst>
+              <a:ext uri="{28A0092B-C50C-407E-A947-70E740481C1C}">
+                <a14:useLocalDpi xmlns:a14="http://schemas.microsoft.com/office/drawing/2010/main" val="0"/>
+              </a:ext>
+            </a:extLst>
+          </a:blip>
+          <a:stretch>
+            <a:fillRect/>
+          </a:stretch>
+        </p:blipFill>
+        <p:spPr>
+          <a:xfrm>
+            <a:off x="7563760" y="2019303"/>
+            <a:ext cx="1405428" cy="1405428"/>
+          </a:xfrm>
+          <a:prstGeom prst="rect">
+            <a:avLst/>
+          </a:prstGeom>
+        </p:spPr>
+      </p:pic>
+      <p:sp>
+        <p:nvSpPr>
+          <p:cNvPr id="10" name="Text Placeholder 2"/>
+          <p:cNvSpPr txBox="1">
+            <a:spLocks/>
+          </p:cNvSpPr>
+          <p:nvPr/>
+        </p:nvSpPr>
+        <p:spPr>
+          <a:xfrm>
+            <a:off x="278844" y="3770558"/>
+            <a:ext cx="2391113" cy="507831"/>
+          </a:xfrm>
+          <a:prstGeom prst="rect">
+            <a:avLst/>
+          </a:prstGeom>
+        </p:spPr>
+        <p:txBody>
+          <a:bodyPr>
+            <a:spAutoFit/>
+          </a:bodyPr>
+          <a:lstStyle>
+            <a:lvl1pPr marL="228600" indent="-228600" algn="l" defTabSz="914400" rtl="0" eaLnBrk="1" latinLnBrk="0" hangingPunct="1">
+              <a:lnSpc>
+                <a:spcPct val="90000"/>
+              </a:lnSpc>
+              <a:spcBef>
+                <a:spcPts val="1000"/>
+              </a:spcBef>
+              <a:buFont typeface="Arial" panose="020B0604020202020204" pitchFamily="34" charset="0"/>
+              <a:buChar char="•"/>
+              <a:defRPr sz="3000" kern="1200" cap="all" baseline="0">
+                <a:solidFill>
+                  <a:srgbClr val="737373"/>
+                </a:solidFill>
+                <a:latin typeface="News Cycle" panose="02000503000000000000" pitchFamily="2" charset="2"/>
+                <a:ea typeface="+mn-ea"/>
+                <a:cs typeface="+mn-cs"/>
+              </a:defRPr>
+            </a:lvl1pPr>
+            <a:lvl2pPr marL="685800" indent="-228600" algn="l" defTabSz="914400" rtl="0" eaLnBrk="1" latinLnBrk="0" hangingPunct="1">
+              <a:lnSpc>
+                <a:spcPct val="90000"/>
+              </a:lnSpc>
+              <a:spcBef>
+                <a:spcPts val="500"/>
+              </a:spcBef>
+              <a:buFont typeface="Arial" panose="020B0604020202020204" pitchFamily="34" charset="0"/>
+              <a:buChar char="•"/>
+              <a:defRPr sz="2400" kern="1200">
+                <a:solidFill>
+                  <a:srgbClr val="737373"/>
+                </a:solidFill>
+                <a:latin typeface="Georgia" panose="02040502050405020303" pitchFamily="18" charset="0"/>
+                <a:ea typeface="+mn-ea"/>
+                <a:cs typeface="+mn-cs"/>
+              </a:defRPr>
+            </a:lvl2pPr>
+            <a:lvl3pPr marL="1143000" indent="-228600" algn="l" defTabSz="914400" rtl="0" eaLnBrk="1" latinLnBrk="0" hangingPunct="1">
+              <a:lnSpc>
+                <a:spcPct val="90000"/>
+              </a:lnSpc>
+              <a:spcBef>
+                <a:spcPts val="500"/>
+              </a:spcBef>
+              <a:buFont typeface="Arial" panose="020B0604020202020204" pitchFamily="34" charset="0"/>
+              <a:buChar char="•"/>
+              <a:defRPr sz="2000" kern="1200">
+                <a:solidFill>
+                  <a:srgbClr val="737373"/>
+                </a:solidFill>
+                <a:latin typeface="Georgia" panose="02040502050405020303" pitchFamily="18" charset="0"/>
+                <a:ea typeface="+mn-ea"/>
+                <a:cs typeface="+mn-cs"/>
+              </a:defRPr>
+            </a:lvl3pPr>
+            <a:lvl4pPr marL="1600200" indent="-228600" algn="l" defTabSz="914400" rtl="0" eaLnBrk="1" latinLnBrk="0" hangingPunct="1">
+              <a:lnSpc>
+                <a:spcPct val="90000"/>
+              </a:lnSpc>
+              <a:spcBef>
+                <a:spcPts val="500"/>
+              </a:spcBef>
+              <a:buFont typeface="Arial" panose="020B0604020202020204" pitchFamily="34" charset="0"/>
+              <a:buChar char="•"/>
+              <a:defRPr sz="1800" kern="1200">
+                <a:solidFill>
+                  <a:srgbClr val="737373"/>
+                </a:solidFill>
+                <a:latin typeface="Georgia" panose="02040502050405020303" pitchFamily="18" charset="0"/>
+                <a:ea typeface="+mn-ea"/>
+                <a:cs typeface="+mn-cs"/>
+              </a:defRPr>
+            </a:lvl4pPr>
+            <a:lvl5pPr marL="2057400" indent="-228600" algn="l" defTabSz="914400" rtl="0" eaLnBrk="1" latinLnBrk="0" hangingPunct="1">
+              <a:lnSpc>
+                <a:spcPct val="90000"/>
+              </a:lnSpc>
+              <a:spcBef>
+                <a:spcPts val="500"/>
+              </a:spcBef>
+              <a:buFont typeface="Arial" panose="020B0604020202020204" pitchFamily="34" charset="0"/>
+              <a:buChar char="•"/>
+              <a:defRPr sz="1800" kern="1200">
+                <a:solidFill>
+                  <a:srgbClr val="737373"/>
+                </a:solidFill>
+                <a:latin typeface="Georgia" panose="02040502050405020303" pitchFamily="18" charset="0"/>
+                <a:ea typeface="+mn-ea"/>
+                <a:cs typeface="+mn-cs"/>
+              </a:defRPr>
+            </a:lvl5pPr>
+            <a:lvl6pPr marL="2514600" indent="-228600" algn="l" defTabSz="914400" rtl="0" eaLnBrk="1" latinLnBrk="0" hangingPunct="1">
+              <a:lnSpc>
+                <a:spcPct val="90000"/>
+              </a:lnSpc>
+              <a:spcBef>
+                <a:spcPts val="500"/>
+              </a:spcBef>
+              <a:buFont typeface="Arial" panose="020B0604020202020204" pitchFamily="34" charset="0"/>
+              <a:buChar char="•"/>
+              <a:defRPr sz="1800" kern="1200">
+                <a:solidFill>
+                  <a:schemeClr val="tx1"/>
+                </a:solidFill>
+                <a:latin typeface="+mn-lt"/>
+                <a:ea typeface="+mn-ea"/>
+                <a:cs typeface="+mn-cs"/>
+              </a:defRPr>
+            </a:lvl6pPr>
+            <a:lvl7pPr marL="2971800" indent="-228600" algn="l" defTabSz="914400" rtl="0" eaLnBrk="1" latinLnBrk="0" hangingPunct="1">
+              <a:lnSpc>
+                <a:spcPct val="90000"/>
+              </a:lnSpc>
+              <a:spcBef>
+                <a:spcPts val="500"/>
+              </a:spcBef>
+              <a:buFont typeface="Arial" panose="020B0604020202020204" pitchFamily="34" charset="0"/>
+              <a:buChar char="•"/>
+              <a:defRPr sz="1800" kern="1200">
+                <a:solidFill>
+                  <a:schemeClr val="tx1"/>
+                </a:solidFill>
+                <a:latin typeface="+mn-lt"/>
+                <a:ea typeface="+mn-ea"/>
+                <a:cs typeface="+mn-cs"/>
+              </a:defRPr>
+            </a:lvl7pPr>
+            <a:lvl8pPr marL="3429000" indent="-228600" algn="l" defTabSz="914400" rtl="0" eaLnBrk="1" latinLnBrk="0" hangingPunct="1">
+              <a:lnSpc>
+                <a:spcPct val="90000"/>
+              </a:lnSpc>
+              <a:spcBef>
+                <a:spcPts val="500"/>
+              </a:spcBef>
+              <a:buFont typeface="Arial" panose="020B0604020202020204" pitchFamily="34" charset="0"/>
+              <a:buChar char="•"/>
+              <a:defRPr sz="1800" kern="1200">
+                <a:solidFill>
+                  <a:schemeClr val="tx1"/>
+                </a:solidFill>
+                <a:latin typeface="+mn-lt"/>
+                <a:ea typeface="+mn-ea"/>
+                <a:cs typeface="+mn-cs"/>
+              </a:defRPr>
+            </a:lvl8pPr>
+            <a:lvl9pPr marL="3886200" indent="-228600" algn="l" defTabSz="914400" rtl="0" eaLnBrk="1" latinLnBrk="0" hangingPunct="1">
+              <a:lnSpc>
+                <a:spcPct val="90000"/>
+              </a:lnSpc>
+              <a:spcBef>
+                <a:spcPts val="500"/>
+              </a:spcBef>
+              <a:buFont typeface="Arial" panose="020B0604020202020204" pitchFamily="34" charset="0"/>
+              <a:buChar char="•"/>
+              <a:defRPr sz="1800" kern="1200">
+                <a:solidFill>
+                  <a:schemeClr val="tx1"/>
+                </a:solidFill>
+                <a:latin typeface="+mn-lt"/>
+                <a:ea typeface="+mn-ea"/>
+                <a:cs typeface="+mn-cs"/>
+              </a:defRPr>
+            </a:lvl9pPr>
+          </a:lstStyle>
+          <a:p>
+            <a:pPr marL="0" indent="0">
+              <a:buFont typeface="Arial" panose="020B0604020202020204" pitchFamily="34" charset="0"/>
+              <a:buNone/>
+            </a:pPr>
+            <a:r>
+              <a:rPr lang="en-GB" dirty="0" smtClean="0"/>
+              <a:t>E-</a:t>
+            </a:r>
+            <a:r>
+              <a:rPr lang="en-GB" dirty="0" smtClean="0">
+                <a:solidFill>
+                  <a:srgbClr val="CB623C"/>
+                </a:solidFill>
+              </a:rPr>
+              <a:t>commerce</a:t>
+            </a:r>
+            <a:endParaRPr lang="en-GB" dirty="0">
+              <a:solidFill>
+                <a:srgbClr val="CB623C"/>
+              </a:solidFill>
+            </a:endParaRPr>
+          </a:p>
+        </p:txBody>
+      </p:sp>
+      <p:pic>
+        <p:nvPicPr>
+          <p:cNvPr id="12" name="Picture 11"/>
+          <p:cNvPicPr>
+            <a:picLocks noChangeAspect="1"/>
+          </p:cNvPicPr>
+          <p:nvPr/>
+        </p:nvPicPr>
+        <p:blipFill>
+          <a:blip r:embed="rId6">
+            <a:extLst>
+              <a:ext uri="{28A0092B-C50C-407E-A947-70E740481C1C}">
+                <a14:useLocalDpi xmlns:a14="http://schemas.microsoft.com/office/drawing/2010/main" val="0"/>
+              </a:ext>
+            </a:extLst>
+          </a:blip>
+          <a:stretch>
+            <a:fillRect/>
+          </a:stretch>
+        </p:blipFill>
+        <p:spPr>
+          <a:xfrm>
+            <a:off x="1779199" y="4278389"/>
+            <a:ext cx="2389585" cy="1786235"/>
+          </a:xfrm>
+          <a:prstGeom prst="rect">
+            <a:avLst/>
+          </a:prstGeom>
+        </p:spPr>
+      </p:pic>
+      <p:pic>
+        <p:nvPicPr>
+          <p:cNvPr id="13" name="Picture 12"/>
+          <p:cNvPicPr>
+            <a:picLocks noChangeAspect="1"/>
+          </p:cNvPicPr>
+          <p:nvPr/>
+        </p:nvPicPr>
+        <p:blipFill rotWithShape="1">
+          <a:blip r:embed="rId7" cstate="print">
+            <a:extLst>
+              <a:ext uri="{28A0092B-C50C-407E-A947-70E740481C1C}">
+                <a14:useLocalDpi xmlns:a14="http://schemas.microsoft.com/office/drawing/2010/main" val="0"/>
+              </a:ext>
+            </a:extLst>
+          </a:blip>
+          <a:srcRect t="18695"/>
+          <a:stretch/>
+        </p:blipFill>
+        <p:spPr>
+          <a:xfrm>
+            <a:off x="5828179" y="4271573"/>
+            <a:ext cx="1536622" cy="1799866"/>
+          </a:xfrm>
+          <a:prstGeom prst="rect">
+            <a:avLst/>
+          </a:prstGeom>
+        </p:spPr>
+      </p:pic>
+    </p:spTree>
+    <p:extLst>
+      <p:ext uri="{BB962C8B-B14F-4D97-AF65-F5344CB8AC3E}">
+        <p14:creationId xmlns:p14="http://schemas.microsoft.com/office/powerpoint/2010/main" val="73351509"/>
+      </p:ext>
+    </p:extLst>
+  </p:cSld>
+  <p:clrMapOvr>
+    <a:masterClrMapping/>
+  </p:clrMapOvr>
+  <p:timing>
+    <p:tnLst>
+      <p:par>
+        <p:cTn id="1" dur="indefinite" restart="never" nodeType="tmRoot"/>
+      </p:par>
+    </p:tnLst>
+  </p:timing>
+</p:sld>
+</file>
+
+<file path=ppt/slides/slide11.xml><?xml version="1.0" encoding="utf-8"?>
+<p:sld xmlns:a="http://schemas.openxmlformats.org/drawingml/2006/main" xmlns:r="http://schemas.openxmlformats.org/officeDocument/2006/relationships" xmlns:p="http://schemas.openxmlformats.org/presentationml/2006/main">
+  <p:cSld>
+    <p:spTree>
+      <p:nvGrpSpPr>
+        <p:cNvPr id="1" name=""/>
+        <p:cNvGrpSpPr/>
+        <p:nvPr/>
+      </p:nvGrpSpPr>
+      <p:grpSpPr>
+        <a:xfrm>
+          <a:off x="0" y="0"/>
+          <a:ext cx="0" cy="0"/>
+          <a:chOff x="0" y="0"/>
+          <a:chExt cx="0" cy="0"/>
+        </a:xfrm>
+      </p:grpSpPr>
+      <p:sp>
+        <p:nvSpPr>
+          <p:cNvPr id="3" name="Text Placeholder 2"/>
+          <p:cNvSpPr>
+            <a:spLocks noGrp="1"/>
+          </p:cNvSpPr>
+          <p:nvPr>
+            <p:ph type="body" sz="quarter" idx="11"/>
+          </p:nvPr>
+        </p:nvSpPr>
+        <p:spPr>
+          <a:xfrm>
             <a:off x="986587" y="3046460"/>
             <a:ext cx="7170826" cy="765081"/>
           </a:xfrm>
@@ -4032,7 +5264,7 @@
 </p:sld>
 </file>
 
-<file path=ppt/slides/slide11.xml><?xml version="1.0" encoding="utf-8"?>
+<file path=ppt/slides/slide12.xml><?xml version="1.0" encoding="utf-8"?>
 <p:sld xmlns:a="http://schemas.openxmlformats.org/drawingml/2006/main" xmlns:r="http://schemas.openxmlformats.org/officeDocument/2006/relationships" xmlns:p="http://schemas.openxmlformats.org/presentationml/2006/main">
   <p:cSld>
     <p:spTree>
@@ -4128,7 +5360,7 @@
 </p:sld>
 </file>
 
-<file path=ppt/slides/slide12.xml><?xml version="1.0" encoding="utf-8"?>
+<file path=ppt/slides/slide13.xml><?xml version="1.0" encoding="utf-8"?>
 <p:sld xmlns:a="http://schemas.openxmlformats.org/drawingml/2006/main" xmlns:r="http://schemas.openxmlformats.org/officeDocument/2006/relationships" xmlns:p="http://schemas.openxmlformats.org/presentationml/2006/main">
   <p:cSld>
     <p:spTree>
@@ -4343,7 +5575,7 @@
 </p:sld>
 </file>
 
-<file path=ppt/slides/slide13.xml><?xml version="1.0" encoding="utf-8"?>
+<file path=ppt/slides/slide14.xml><?xml version="1.0" encoding="utf-8"?>
 <p:sld xmlns:a="http://schemas.openxmlformats.org/drawingml/2006/main" xmlns:r="http://schemas.openxmlformats.org/officeDocument/2006/relationships" xmlns:p="http://schemas.openxmlformats.org/presentationml/2006/main">
   <p:cSld>
     <p:spTree>
@@ -4504,7 +5736,7 @@
 </p:sld>
 </file>
 
-<file path=ppt/slides/slide14.xml><?xml version="1.0" encoding="utf-8"?>
+<file path=ppt/slides/slide15.xml><?xml version="1.0" encoding="utf-8"?>
 <p:sld xmlns:a="http://schemas.openxmlformats.org/drawingml/2006/main" xmlns:r="http://schemas.openxmlformats.org/officeDocument/2006/relationships" xmlns:p="http://schemas.openxmlformats.org/presentationml/2006/main">
   <p:cSld>
     <p:spTree>
@@ -4650,23 +5882,8 @@
                 </a:solidFill>
                 <a:latin typeface="Georgia" panose="02040502050405020303" pitchFamily="18" charset="0"/>
               </a:rPr>
-              <a:t>Deep integration with </a:t>
-            </a:r>
-            <a:r>
-              <a:rPr lang="en-GB" sz="2000" dirty="0" smtClean="0">
-                <a:solidFill>
-                  <a:srgbClr val="737373"/>
-                </a:solidFill>
-                <a:latin typeface="Georgia" panose="02040502050405020303" pitchFamily="18" charset="0"/>
-              </a:rPr>
-              <a:t>JavaScript</a:t>
-            </a:r>
-            <a:endParaRPr lang="en-GB" sz="2000" dirty="0" smtClean="0">
-              <a:solidFill>
-                <a:srgbClr val="737373"/>
-              </a:solidFill>
-              <a:latin typeface="Georgia" panose="02040502050405020303" pitchFamily="18" charset="0"/>
-            </a:endParaRPr>
+              <a:t>Deep integration with JavaScript</a:t>
+            </a:r>
           </a:p>
           <a:p>
             <a:pPr marL="285750" indent="-285750">
@@ -4847,7 +6064,7 @@
 </p:sld>
 </file>
 
-<file path=ppt/slides/slide15.xml><?xml version="1.0" encoding="utf-8"?>
+<file path=ppt/slides/slide16.xml><?xml version="1.0" encoding="utf-8"?>
 <p:sld xmlns:a="http://schemas.openxmlformats.org/drawingml/2006/main" xmlns:r="http://schemas.openxmlformats.org/officeDocument/2006/relationships" xmlns:p="http://schemas.openxmlformats.org/presentationml/2006/main">
   <p:cSld>
     <p:spTree>
@@ -4943,7 +6160,7 @@
 </p:sld>
 </file>
 
-<file path=ppt/slides/slide16.xml><?xml version="1.0" encoding="utf-8"?>
+<file path=ppt/slides/slide17.xml><?xml version="1.0" encoding="utf-8"?>
 <p:sld xmlns:a="http://schemas.openxmlformats.org/drawingml/2006/main" xmlns:r="http://schemas.openxmlformats.org/officeDocument/2006/relationships" xmlns:p="http://schemas.openxmlformats.org/presentationml/2006/main">
   <p:cSld>
     <p:spTree>
@@ -5283,7 +6500,7 @@
 </p:sld>
 </file>
 
-<file path=ppt/slides/slide17.xml><?xml version="1.0" encoding="utf-8"?>
+<file path=ppt/slides/slide18.xml><?xml version="1.0" encoding="utf-8"?>
 <p:sld xmlns:a="http://schemas.openxmlformats.org/drawingml/2006/main" xmlns:r="http://schemas.openxmlformats.org/officeDocument/2006/relationships" xmlns:p="http://schemas.openxmlformats.org/presentationml/2006/main">
   <p:cSld>
     <p:spTree>
@@ -5703,7 +6920,7 @@
 </p:sld>
 </file>
 
-<file path=ppt/slides/slide18.xml><?xml version="1.0" encoding="utf-8"?>
+<file path=ppt/slides/slide19.xml><?xml version="1.0" encoding="utf-8"?>
 <p:sld xmlns:a="http://schemas.openxmlformats.org/drawingml/2006/main" xmlns:r="http://schemas.openxmlformats.org/officeDocument/2006/relationships" xmlns:p="http://schemas.openxmlformats.org/presentationml/2006/main">
   <p:cSld>
     <p:spTree>
@@ -6508,7 +7725,239 @@
 </p:sld>
 </file>
 
-<file path=ppt/slides/slide19.xml><?xml version="1.0" encoding="utf-8"?>
+<file path=ppt/slides/slide2.xml><?xml version="1.0" encoding="utf-8"?>
+<p:sld xmlns:a="http://schemas.openxmlformats.org/drawingml/2006/main" xmlns:r="http://schemas.openxmlformats.org/officeDocument/2006/relationships" xmlns:p="http://schemas.openxmlformats.org/presentationml/2006/main">
+  <p:cSld>
+    <p:spTree>
+      <p:nvGrpSpPr>
+        <p:cNvPr id="1" name=""/>
+        <p:cNvGrpSpPr/>
+        <p:nvPr/>
+      </p:nvGrpSpPr>
+      <p:grpSpPr>
+        <a:xfrm>
+          <a:off x="0" y="0"/>
+          <a:ext cx="0" cy="0"/>
+          <a:chOff x="0" y="0"/>
+          <a:chExt cx="0" cy="0"/>
+        </a:xfrm>
+      </p:grpSpPr>
+      <p:sp>
+        <p:nvSpPr>
+          <p:cNvPr id="2" name="TextBox 1"/>
+          <p:cNvSpPr txBox="1"/>
+          <p:nvPr/>
+        </p:nvSpPr>
+        <p:spPr>
+          <a:xfrm>
+            <a:off x="482958" y="843679"/>
+            <a:ext cx="8178084" cy="5170646"/>
+          </a:xfrm>
+          <a:prstGeom prst="rect">
+            <a:avLst/>
+          </a:prstGeom>
+          <a:noFill/>
+        </p:spPr>
+        <p:txBody>
+          <a:bodyPr wrap="square" rtlCol="0" anchor="ctr">
+            <a:spAutoFit/>
+          </a:bodyPr>
+          <a:lstStyle/>
+          <a:p>
+            <a:r>
+              <a:rPr lang="en-GB" sz="3000" dirty="0" smtClean="0">
+                <a:solidFill>
+                  <a:srgbClr val="737373"/>
+                </a:solidFill>
+                <a:latin typeface="News Cycle" panose="02000503000000000000" pitchFamily="2" charset="2"/>
+              </a:rPr>
+              <a:t>AZURE</a:t>
+            </a:r>
+            <a:r>
+              <a:rPr lang="en-GB" sz="3000" dirty="0" smtClean="0">
+                <a:latin typeface="News Cycle" panose="02000503000000000000" pitchFamily="2" charset="2"/>
+              </a:rPr>
+              <a:t> </a:t>
+            </a:r>
+            <a:r>
+              <a:rPr lang="en-GB" sz="3000" dirty="0" smtClean="0">
+                <a:solidFill>
+                  <a:srgbClr val="CB623C"/>
+                </a:solidFill>
+                <a:latin typeface="News Cycle" panose="02000503000000000000" pitchFamily="2" charset="2"/>
+              </a:rPr>
+              <a:t>SDK</a:t>
+            </a:r>
+            <a:r>
+              <a:rPr lang="en-GB" sz="3000" dirty="0" smtClean="0">
+                <a:latin typeface="News Cycle" panose="02000503000000000000" pitchFamily="2" charset="2"/>
+              </a:rPr>
+              <a:t> </a:t>
+            </a:r>
+            <a:endParaRPr lang="en-GB" sz="3000" dirty="0" smtClean="0">
+              <a:latin typeface="News Cycle" panose="02000503000000000000" pitchFamily="2" charset="2"/>
+            </a:endParaRPr>
+          </a:p>
+          <a:p>
+            <a:r>
+              <a:rPr lang="en-GB" sz="3000" dirty="0" smtClean="0">
+                <a:latin typeface="Georgia" panose="02040502050405020303" pitchFamily="18" charset="0"/>
+                <a:hlinkClick r:id="rId3"/>
+              </a:rPr>
+              <a:t>https</a:t>
+            </a:r>
+            <a:r>
+              <a:rPr lang="en-GB" sz="3000" dirty="0">
+                <a:latin typeface="Georgia" panose="02040502050405020303" pitchFamily="18" charset="0"/>
+                <a:hlinkClick r:id="rId3"/>
+              </a:rPr>
+              <a:t>://</a:t>
+            </a:r>
+            <a:r>
+              <a:rPr lang="en-GB" sz="3000" dirty="0" smtClean="0">
+                <a:latin typeface="Georgia" panose="02040502050405020303" pitchFamily="18" charset="0"/>
+                <a:hlinkClick r:id="rId3"/>
+              </a:rPr>
+              <a:t>www.microsoft.com/en-us/download/details.aspx?id=46892</a:t>
+            </a:r>
+            <a:endParaRPr lang="en-GB" sz="3000" dirty="0" smtClean="0">
+              <a:latin typeface="Georgia" panose="02040502050405020303" pitchFamily="18" charset="0"/>
+            </a:endParaRPr>
+          </a:p>
+          <a:p>
+            <a:endParaRPr lang="en-GB" sz="3000" dirty="0">
+              <a:latin typeface="Georgia" panose="02040502050405020303" pitchFamily="18" charset="0"/>
+            </a:endParaRPr>
+          </a:p>
+          <a:p>
+            <a:r>
+              <a:rPr lang="en-GB" sz="3000" dirty="0" smtClean="0">
+                <a:solidFill>
+                  <a:srgbClr val="737373"/>
+                </a:solidFill>
+                <a:latin typeface="News Cycle" panose="02000503000000000000" pitchFamily="2" charset="2"/>
+              </a:rPr>
+              <a:t>VISUAL </a:t>
+            </a:r>
+            <a:r>
+              <a:rPr lang="en-GB" sz="3000" dirty="0">
+                <a:solidFill>
+                  <a:srgbClr val="737373"/>
+                </a:solidFill>
+                <a:latin typeface="News Cycle" panose="02000503000000000000" pitchFamily="2" charset="2"/>
+              </a:rPr>
+              <a:t>STUDIO </a:t>
+            </a:r>
+            <a:r>
+              <a:rPr lang="en-GB" sz="3000" dirty="0">
+                <a:solidFill>
+                  <a:srgbClr val="CB623C"/>
+                </a:solidFill>
+                <a:latin typeface="News Cycle" panose="02000503000000000000" pitchFamily="2" charset="2"/>
+              </a:rPr>
+              <a:t>COMMUNITY EDITION</a:t>
+            </a:r>
+            <a:r>
+              <a:rPr lang="en-GB" sz="3000" dirty="0">
+                <a:latin typeface="News Cycle" panose="02000503000000000000" pitchFamily="2" charset="2"/>
+              </a:rPr>
+              <a:t> </a:t>
+            </a:r>
+            <a:r>
+              <a:rPr lang="en-GB" sz="3000" dirty="0" smtClean="0">
+                <a:latin typeface="Georgia" panose="02040502050405020303" pitchFamily="18" charset="0"/>
+              </a:rPr>
+              <a:t> </a:t>
+            </a:r>
+            <a:r>
+              <a:rPr lang="en-GB" sz="3000" dirty="0">
+                <a:latin typeface="Georgia" panose="02040502050405020303" pitchFamily="18" charset="0"/>
+                <a:hlinkClick r:id="rId4"/>
+              </a:rPr>
+              <a:t>https://</a:t>
+            </a:r>
+            <a:r>
+              <a:rPr lang="en-GB" sz="3000" dirty="0" smtClean="0">
+                <a:latin typeface="Georgia" panose="02040502050405020303" pitchFamily="18" charset="0"/>
+                <a:hlinkClick r:id="rId4"/>
+              </a:rPr>
+              <a:t>www.visualstudio.com/en-us/products/visual-studio-community-vs.aspx</a:t>
+            </a:r>
+            <a:endParaRPr lang="en-GB" sz="3000" dirty="0" smtClean="0">
+              <a:latin typeface="Georgia" panose="02040502050405020303" pitchFamily="18" charset="0"/>
+            </a:endParaRPr>
+          </a:p>
+          <a:p>
+            <a:endParaRPr lang="en-GB" sz="3000" dirty="0">
+              <a:latin typeface="Georgia" panose="02040502050405020303" pitchFamily="18" charset="0"/>
+            </a:endParaRPr>
+          </a:p>
+          <a:p>
+            <a:r>
+              <a:rPr lang="en-GB" sz="3000" dirty="0">
+                <a:solidFill>
+                  <a:srgbClr val="737373"/>
+                </a:solidFill>
+                <a:latin typeface="News Cycle" panose="02000503000000000000" pitchFamily="2" charset="2"/>
+              </a:rPr>
+              <a:t>AZURE PRICING </a:t>
+            </a:r>
+            <a:r>
+              <a:rPr lang="en-GB" sz="3000" dirty="0" smtClean="0">
+                <a:solidFill>
+                  <a:srgbClr val="CB623C"/>
+                </a:solidFill>
+                <a:latin typeface="News Cycle" panose="02000503000000000000" pitchFamily="2" charset="2"/>
+              </a:rPr>
+              <a:t>CACLUATOR</a:t>
+            </a:r>
+            <a:r>
+              <a:rPr lang="en-GB" sz="3000" dirty="0" smtClean="0">
+                <a:latin typeface="News Cycle" panose="02000503000000000000" pitchFamily="2" charset="2"/>
+              </a:rPr>
+              <a:t> </a:t>
+            </a:r>
+            <a:r>
+              <a:rPr lang="en-GB" sz="3000" dirty="0">
+                <a:latin typeface="Georgia" panose="02040502050405020303" pitchFamily="18" charset="0"/>
+                <a:hlinkClick r:id="rId5"/>
+              </a:rPr>
+              <a:t>http://</a:t>
+            </a:r>
+            <a:r>
+              <a:rPr lang="en-GB" sz="3000" dirty="0" smtClean="0">
+                <a:latin typeface="Georgia" panose="02040502050405020303" pitchFamily="18" charset="0"/>
+                <a:hlinkClick r:id="rId5"/>
+              </a:rPr>
+              <a:t>azure.microsoft.com/en-gb/pricing/calculator</a:t>
+            </a:r>
+            <a:endParaRPr lang="en-GB" sz="3000" dirty="0" smtClean="0">
+              <a:latin typeface="Georgia" panose="02040502050405020303" pitchFamily="18" charset="0"/>
+            </a:endParaRPr>
+          </a:p>
+        </p:txBody>
+      </p:sp>
+    </p:spTree>
+    <p:extLst>
+      <p:ext uri="{BB962C8B-B14F-4D97-AF65-F5344CB8AC3E}">
+        <p14:creationId xmlns:p14="http://schemas.microsoft.com/office/powerpoint/2010/main" val="2318639002"/>
+      </p:ext>
+    </p:extLst>
+  </p:cSld>
+  <p:clrMapOvr>
+    <a:masterClrMapping/>
+  </p:clrMapOvr>
+  <p:timing>
+    <p:tnLst>
+      <p:par>
+        <p:cTn id="1" dur="indefinite" restart="never" nodeType="tmRoot"/>
+      </p:par>
+    </p:tnLst>
+  </p:timing>
+</p:sld>
+</file>
+
+<file path=ppt/slides/slide20.xml><?xml version="1.0" encoding="utf-8"?>
 <p:sld xmlns:a="http://schemas.openxmlformats.org/drawingml/2006/main" xmlns:r="http://schemas.openxmlformats.org/officeDocument/2006/relationships" xmlns:p="http://schemas.openxmlformats.org/presentationml/2006/main">
   <p:cSld>
     <p:spTree>
@@ -6635,233 +8084,7 @@
 </p:sld>
 </file>
 
-<file path=ppt/slides/slide2.xml><?xml version="1.0" encoding="utf-8"?>
-<p:sld xmlns:a="http://schemas.openxmlformats.org/drawingml/2006/main" xmlns:r="http://schemas.openxmlformats.org/officeDocument/2006/relationships" xmlns:p="http://schemas.openxmlformats.org/presentationml/2006/main">
-  <p:cSld>
-    <p:spTree>
-      <p:nvGrpSpPr>
-        <p:cNvPr id="1" name=""/>
-        <p:cNvGrpSpPr/>
-        <p:nvPr/>
-      </p:nvGrpSpPr>
-      <p:grpSpPr>
-        <a:xfrm>
-          <a:off x="0" y="0"/>
-          <a:ext cx="0" cy="0"/>
-          <a:chOff x="0" y="0"/>
-          <a:chExt cx="0" cy="0"/>
-        </a:xfrm>
-      </p:grpSpPr>
-      <p:sp>
-        <p:nvSpPr>
-          <p:cNvPr id="2" name="TextBox 1"/>
-          <p:cNvSpPr txBox="1"/>
-          <p:nvPr/>
-        </p:nvSpPr>
-        <p:spPr>
-          <a:xfrm>
-            <a:off x="482958" y="1074511"/>
-            <a:ext cx="8178084" cy="4708981"/>
-          </a:xfrm>
-          <a:prstGeom prst="rect">
-            <a:avLst/>
-          </a:prstGeom>
-          <a:noFill/>
-        </p:spPr>
-        <p:txBody>
-          <a:bodyPr wrap="square" rtlCol="0" anchor="ctr">
-            <a:spAutoFit/>
-          </a:bodyPr>
-          <a:lstStyle/>
-          <a:p>
-            <a:r>
-              <a:rPr lang="en-GB" sz="3000" dirty="0" smtClean="0">
-                <a:solidFill>
-                  <a:srgbClr val="737373"/>
-                </a:solidFill>
-                <a:latin typeface="News Cycle" panose="02000503000000000000" pitchFamily="2" charset="2"/>
-              </a:rPr>
-              <a:t>AZURE</a:t>
-            </a:r>
-            <a:r>
-              <a:rPr lang="en-GB" sz="3000" dirty="0" smtClean="0">
-                <a:latin typeface="News Cycle" panose="02000503000000000000" pitchFamily="2" charset="2"/>
-              </a:rPr>
-              <a:t> </a:t>
-            </a:r>
-            <a:r>
-              <a:rPr lang="en-GB" sz="3000" dirty="0" smtClean="0">
-                <a:solidFill>
-                  <a:srgbClr val="CB623C"/>
-                </a:solidFill>
-                <a:latin typeface="News Cycle" panose="02000503000000000000" pitchFamily="2" charset="2"/>
-              </a:rPr>
-              <a:t>SDK</a:t>
-            </a:r>
-            <a:r>
-              <a:rPr lang="en-GB" sz="3000" dirty="0" smtClean="0">
-                <a:latin typeface="News Cycle" panose="02000503000000000000" pitchFamily="2" charset="2"/>
-              </a:rPr>
-              <a:t> </a:t>
-            </a:r>
-            <a:r>
-              <a:rPr lang="en-GB" sz="3000" dirty="0">
-                <a:latin typeface="News Cycle" panose="02000503000000000000" pitchFamily="2" charset="2"/>
-              </a:rPr>
-              <a:t>- </a:t>
-            </a:r>
-            <a:r>
-              <a:rPr lang="en-GB" sz="3000" dirty="0">
-                <a:latin typeface="Georgia" panose="02040502050405020303" pitchFamily="18" charset="0"/>
-                <a:hlinkClick r:id="rId2"/>
-              </a:rPr>
-              <a:t>https://</a:t>
-            </a:r>
-            <a:r>
-              <a:rPr lang="en-GB" sz="3000" dirty="0" smtClean="0">
-                <a:latin typeface="Georgia" panose="02040502050405020303" pitchFamily="18" charset="0"/>
-                <a:hlinkClick r:id="rId2"/>
-              </a:rPr>
-              <a:t>www.microsoft.com/en-us/download/details.aspx?id=46892</a:t>
-            </a:r>
-            <a:endParaRPr lang="en-GB" sz="3000" dirty="0" smtClean="0">
-              <a:latin typeface="Georgia" panose="02040502050405020303" pitchFamily="18" charset="0"/>
-            </a:endParaRPr>
-          </a:p>
-          <a:p>
-            <a:endParaRPr lang="en-GB" sz="3000" dirty="0">
-              <a:latin typeface="Georgia" panose="02040502050405020303" pitchFamily="18" charset="0"/>
-            </a:endParaRPr>
-          </a:p>
-          <a:p>
-            <a:r>
-              <a:rPr lang="en-GB" sz="3000" dirty="0" smtClean="0">
-                <a:solidFill>
-                  <a:srgbClr val="737373"/>
-                </a:solidFill>
-                <a:latin typeface="News Cycle" panose="02000503000000000000" pitchFamily="2" charset="2"/>
-              </a:rPr>
-              <a:t>VISUAL </a:t>
-            </a:r>
-            <a:r>
-              <a:rPr lang="en-GB" sz="3000" dirty="0">
-                <a:solidFill>
-                  <a:srgbClr val="737373"/>
-                </a:solidFill>
-                <a:latin typeface="News Cycle" panose="02000503000000000000" pitchFamily="2" charset="2"/>
-              </a:rPr>
-              <a:t>STUDIO </a:t>
-            </a:r>
-            <a:r>
-              <a:rPr lang="en-GB" sz="3000" dirty="0">
-                <a:solidFill>
-                  <a:srgbClr val="CB623C"/>
-                </a:solidFill>
-                <a:latin typeface="News Cycle" panose="02000503000000000000" pitchFamily="2" charset="2"/>
-              </a:rPr>
-              <a:t>COMMUNITY EDITION</a:t>
-            </a:r>
-            <a:r>
-              <a:rPr lang="en-GB" sz="3000" dirty="0">
-                <a:latin typeface="News Cycle" panose="02000503000000000000" pitchFamily="2" charset="2"/>
-              </a:rPr>
-              <a:t> -</a:t>
-            </a:r>
-            <a:r>
-              <a:rPr lang="en-GB" sz="3000" dirty="0">
-                <a:latin typeface="Georgia" panose="02040502050405020303" pitchFamily="18" charset="0"/>
-              </a:rPr>
-              <a:t> </a:t>
-            </a:r>
-            <a:r>
-              <a:rPr lang="en-GB" sz="3000" dirty="0">
-                <a:latin typeface="Georgia" panose="02040502050405020303" pitchFamily="18" charset="0"/>
-                <a:hlinkClick r:id="rId3"/>
-              </a:rPr>
-              <a:t>https://</a:t>
-            </a:r>
-            <a:r>
-              <a:rPr lang="en-GB" sz="3000" dirty="0" smtClean="0">
-                <a:latin typeface="Georgia" panose="02040502050405020303" pitchFamily="18" charset="0"/>
-                <a:hlinkClick r:id="rId3"/>
-              </a:rPr>
-              <a:t>www.visualstudio.com/en-us/products/visual-studio-community-vs.aspx</a:t>
-            </a:r>
-            <a:endParaRPr lang="en-GB" sz="3000" dirty="0" smtClean="0">
-              <a:latin typeface="Georgia" panose="02040502050405020303" pitchFamily="18" charset="0"/>
-            </a:endParaRPr>
-          </a:p>
-          <a:p>
-            <a:endParaRPr lang="en-GB" sz="3000" dirty="0">
-              <a:latin typeface="Georgia" panose="02040502050405020303" pitchFamily="18" charset="0"/>
-            </a:endParaRPr>
-          </a:p>
-          <a:p>
-            <a:r>
-              <a:rPr lang="en-GB" sz="3000" dirty="0">
-                <a:solidFill>
-                  <a:srgbClr val="737373"/>
-                </a:solidFill>
-                <a:latin typeface="News Cycle" panose="02000503000000000000" pitchFamily="2" charset="2"/>
-              </a:rPr>
-              <a:t>AZURE PRICING </a:t>
-            </a:r>
-            <a:r>
-              <a:rPr lang="en-GB" sz="3000" dirty="0">
-                <a:solidFill>
-                  <a:srgbClr val="CB623C"/>
-                </a:solidFill>
-                <a:latin typeface="News Cycle" panose="02000503000000000000" pitchFamily="2" charset="2"/>
-              </a:rPr>
-              <a:t>CACLUATOR</a:t>
-            </a:r>
-            <a:r>
-              <a:rPr lang="en-GB" sz="3000" dirty="0">
-                <a:latin typeface="News Cycle" panose="02000503000000000000" pitchFamily="2" charset="2"/>
-              </a:rPr>
-              <a:t> - </a:t>
-            </a:r>
-            <a:r>
-              <a:rPr lang="en-GB" sz="3000" dirty="0">
-                <a:latin typeface="Georgia" panose="02040502050405020303" pitchFamily="18" charset="0"/>
-                <a:hlinkClick r:id="rId4"/>
-              </a:rPr>
-              <a:t>http://</a:t>
-            </a:r>
-            <a:r>
-              <a:rPr lang="en-GB" sz="3000" dirty="0" smtClean="0">
-                <a:latin typeface="Georgia" panose="02040502050405020303" pitchFamily="18" charset="0"/>
-                <a:hlinkClick r:id="rId4"/>
-              </a:rPr>
-              <a:t>azure.microsoft.com/en-gb/pricing/calculator</a:t>
-            </a:r>
-            <a:endParaRPr lang="en-GB" sz="3000" dirty="0" smtClean="0">
-              <a:latin typeface="Georgia" panose="02040502050405020303" pitchFamily="18" charset="0"/>
-            </a:endParaRPr>
-          </a:p>
-        </p:txBody>
-      </p:sp>
-    </p:spTree>
-    <p:extLst>
-      <p:ext uri="{BB962C8B-B14F-4D97-AF65-F5344CB8AC3E}">
-        <p14:creationId xmlns:p14="http://schemas.microsoft.com/office/powerpoint/2010/main" val="2318639002"/>
-      </p:ext>
-    </p:extLst>
-  </p:cSld>
-  <p:clrMapOvr>
-    <a:masterClrMapping/>
-  </p:clrMapOvr>
-  <p:timing>
-    <p:tnLst>
-      <p:par>
-        <p:cTn id="1" dur="indefinite" restart="never" nodeType="tmRoot"/>
-      </p:par>
-    </p:tnLst>
-  </p:timing>
-</p:sld>
-</file>
-
-<file path=ppt/slides/slide20.xml><?xml version="1.0" encoding="utf-8"?>
+<file path=ppt/slides/slide21.xml><?xml version="1.0" encoding="utf-8"?>
 <p:sld xmlns:a="http://schemas.openxmlformats.org/drawingml/2006/main" xmlns:r="http://schemas.openxmlformats.org/officeDocument/2006/relationships" xmlns:p="http://schemas.openxmlformats.org/presentationml/2006/main">
   <p:cSld>
     <p:spTree>
@@ -7365,7 +8588,7 @@
 </p:sld>
 </file>
 
-<file path=ppt/slides/slide21.xml><?xml version="1.0" encoding="utf-8"?>
+<file path=ppt/slides/slide22.xml><?xml version="1.0" encoding="utf-8"?>
 <p:sld xmlns:a="http://schemas.openxmlformats.org/drawingml/2006/main" xmlns:r="http://schemas.openxmlformats.org/officeDocument/2006/relationships" xmlns:p="http://schemas.openxmlformats.org/presentationml/2006/main">
   <p:cSld>
     <p:spTree>
@@ -8025,7 +9248,7 @@
 </p:sld>
 </file>
 
-<file path=ppt/slides/slide22.xml><?xml version="1.0" encoding="utf-8"?>
+<file path=ppt/slides/slide23.xml><?xml version="1.0" encoding="utf-8"?>
 <p:sld xmlns:a="http://schemas.openxmlformats.org/drawingml/2006/main" xmlns:r="http://schemas.openxmlformats.org/officeDocument/2006/relationships" xmlns:p="http://schemas.openxmlformats.org/presentationml/2006/main">
   <p:cSld>
     <p:spTree>
@@ -8149,7 +9372,7 @@
 </p:sld>
 </file>
 
-<file path=ppt/slides/slide23.xml><?xml version="1.0" encoding="utf-8"?>
+<file path=ppt/slides/slide24.xml><?xml version="1.0" encoding="utf-8"?>
 <p:sld xmlns:a="http://schemas.openxmlformats.org/drawingml/2006/main" xmlns:r="http://schemas.openxmlformats.org/officeDocument/2006/relationships" xmlns:p="http://schemas.openxmlformats.org/presentationml/2006/main">
   <p:cSld>
     <p:spTree>
@@ -8238,7 +9461,7 @@
 </p:sld>
 </file>
 
-<file path=ppt/slides/slide24.xml><?xml version="1.0" encoding="utf-8"?>
+<file path=ppt/slides/slide25.xml><?xml version="1.0" encoding="utf-8"?>
 <p:sld xmlns:a="http://schemas.openxmlformats.org/drawingml/2006/main" xmlns:r="http://schemas.openxmlformats.org/officeDocument/2006/relationships" xmlns:p="http://schemas.openxmlformats.org/presentationml/2006/main">
   <p:cSld>
     <p:spTree>
@@ -8395,7 +9618,7 @@
 </p:sld>
 </file>
 
-<file path=ppt/slides/slide25.xml><?xml version="1.0" encoding="utf-8"?>
+<file path=ppt/slides/slide26.xml><?xml version="1.0" encoding="utf-8"?>
 <p:sld xmlns:a="http://schemas.openxmlformats.org/drawingml/2006/main" xmlns:r="http://schemas.openxmlformats.org/officeDocument/2006/relationships" xmlns:p="http://schemas.openxmlformats.org/presentationml/2006/main">
   <p:cSld>
     <p:spTree>
@@ -8866,6 +10089,283 @@
           <a:chExt cx="0" cy="0"/>
         </a:xfrm>
       </p:grpSpPr>
+      <p:sp>
+        <p:nvSpPr>
+          <p:cNvPr id="2" name="Title 1"/>
+          <p:cNvSpPr>
+            <a:spLocks noGrp="1"/>
+          </p:cNvSpPr>
+          <p:nvPr>
+            <p:ph type="title"/>
+          </p:nvPr>
+        </p:nvSpPr>
+        <p:spPr>
+          <a:xfrm>
+            <a:off x="0" y="126000"/>
+            <a:ext cx="9143999" cy="757130"/>
+          </a:xfrm>
+        </p:spPr>
+        <p:txBody>
+          <a:bodyPr anchor="ctr" anchorCtr="1">
+            <a:spAutoFit/>
+          </a:bodyPr>
+          <a:lstStyle/>
+          <a:p>
+            <a:r>
+              <a:rPr lang="en-GB" dirty="0" smtClean="0"/>
+              <a:t>What is Azure</a:t>
+            </a:r>
+            <a:endParaRPr lang="en-GB" dirty="0"/>
+          </a:p>
+        </p:txBody>
+      </p:sp>
+      <p:pic>
+        <p:nvPicPr>
+          <p:cNvPr id="5" name="Picture Placeholder 4"/>
+          <p:cNvPicPr>
+            <a:picLocks noGrp="1" noChangeAspect="1"/>
+          </p:cNvPicPr>
+          <p:nvPr>
+            <p:ph type="pic" sz="quarter" idx="10"/>
+          </p:nvPr>
+        </p:nvPicPr>
+        <p:blipFill>
+          <a:blip r:embed="rId2">
+            <a:extLst>
+              <a:ext uri="{28A0092B-C50C-407E-A947-70E740481C1C}">
+                <a14:useLocalDpi xmlns:a14="http://schemas.microsoft.com/office/drawing/2010/main" val="0"/>
+              </a:ext>
+            </a:extLst>
+          </a:blip>
+          <a:srcRect t="13314" b="13314"/>
+          <a:stretch>
+            <a:fillRect/>
+          </a:stretch>
+        </p:blipFill>
+        <p:spPr>
+          <a:xfrm>
+            <a:off x="3491880" y="2996952"/>
+            <a:ext cx="2160238" cy="1584994"/>
+          </a:xfrm>
+        </p:spPr>
+      </p:pic>
+      <p:pic>
+        <p:nvPicPr>
+          <p:cNvPr id="6" name="Picture 5"/>
+          <p:cNvPicPr>
+            <a:picLocks noChangeAspect="1"/>
+          </p:cNvPicPr>
+          <p:nvPr/>
+        </p:nvPicPr>
+        <p:blipFill>
+          <a:blip r:embed="rId3" cstate="print">
+            <a:extLst>
+              <a:ext uri="{28A0092B-C50C-407E-A947-70E740481C1C}">
+                <a14:useLocalDpi xmlns:a14="http://schemas.microsoft.com/office/drawing/2010/main" val="0"/>
+              </a:ext>
+            </a:extLst>
+          </a:blip>
+          <a:stretch>
+            <a:fillRect/>
+          </a:stretch>
+        </p:blipFill>
+        <p:spPr>
+          <a:xfrm>
+            <a:off x="4061926" y="1197571"/>
+            <a:ext cx="1260000" cy="1260000"/>
+          </a:xfrm>
+          <a:prstGeom prst="rect">
+            <a:avLst/>
+          </a:prstGeom>
+        </p:spPr>
+      </p:pic>
+      <p:pic>
+        <p:nvPicPr>
+          <p:cNvPr id="7" name="Picture 6"/>
+          <p:cNvPicPr>
+            <a:picLocks noChangeAspect="1"/>
+          </p:cNvPicPr>
+          <p:nvPr/>
+        </p:nvPicPr>
+        <p:blipFill>
+          <a:blip r:embed="rId4" cstate="print">
+            <a:extLst>
+              <a:ext uri="{28A0092B-C50C-407E-A947-70E740481C1C}">
+                <a14:useLocalDpi xmlns:a14="http://schemas.microsoft.com/office/drawing/2010/main" val="0"/>
+              </a:ext>
+            </a:extLst>
+          </a:blip>
+          <a:stretch>
+            <a:fillRect/>
+          </a:stretch>
+        </p:blipFill>
+        <p:spPr>
+          <a:xfrm>
+            <a:off x="1127412" y="4805768"/>
+            <a:ext cx="1260000" cy="1260000"/>
+          </a:xfrm>
+          <a:prstGeom prst="rect">
+            <a:avLst/>
+          </a:prstGeom>
+        </p:spPr>
+      </p:pic>
+      <p:pic>
+        <p:nvPicPr>
+          <p:cNvPr id="8" name="Picture 7"/>
+          <p:cNvPicPr>
+            <a:picLocks noChangeAspect="1"/>
+          </p:cNvPicPr>
+          <p:nvPr/>
+        </p:nvPicPr>
+        <p:blipFill>
+          <a:blip r:embed="rId5" cstate="print">
+            <a:extLst>
+              <a:ext uri="{28A0092B-C50C-407E-A947-70E740481C1C}">
+                <a14:useLocalDpi xmlns:a14="http://schemas.microsoft.com/office/drawing/2010/main" val="0"/>
+              </a:ext>
+            </a:extLst>
+          </a:blip>
+          <a:stretch>
+            <a:fillRect/>
+          </a:stretch>
+        </p:blipFill>
+        <p:spPr>
+          <a:xfrm>
+            <a:off x="6996440" y="1736952"/>
+            <a:ext cx="1260000" cy="1260000"/>
+          </a:xfrm>
+          <a:prstGeom prst="rect">
+            <a:avLst/>
+          </a:prstGeom>
+        </p:spPr>
+      </p:pic>
+      <p:pic>
+        <p:nvPicPr>
+          <p:cNvPr id="9" name="Picture 8"/>
+          <p:cNvPicPr>
+            <a:picLocks noChangeAspect="1"/>
+          </p:cNvPicPr>
+          <p:nvPr/>
+        </p:nvPicPr>
+        <p:blipFill>
+          <a:blip r:embed="rId6" cstate="print">
+            <a:extLst>
+              <a:ext uri="{28A0092B-C50C-407E-A947-70E740481C1C}">
+                <a14:useLocalDpi xmlns:a14="http://schemas.microsoft.com/office/drawing/2010/main" val="0"/>
+              </a:ext>
+            </a:extLst>
+          </a:blip>
+          <a:stretch>
+            <a:fillRect/>
+          </a:stretch>
+        </p:blipFill>
+        <p:spPr>
+          <a:xfrm>
+            <a:off x="6996440" y="4805768"/>
+            <a:ext cx="1260000" cy="1260000"/>
+          </a:xfrm>
+          <a:prstGeom prst="rect">
+            <a:avLst/>
+          </a:prstGeom>
+        </p:spPr>
+      </p:pic>
+      <p:pic>
+        <p:nvPicPr>
+          <p:cNvPr id="11" name="Picture 10"/>
+          <p:cNvPicPr>
+            <a:picLocks noChangeAspect="1"/>
+          </p:cNvPicPr>
+          <p:nvPr/>
+        </p:nvPicPr>
+        <p:blipFill>
+          <a:blip r:embed="rId7" cstate="print">
+            <a:extLst>
+              <a:ext uri="{28A0092B-C50C-407E-A947-70E740481C1C}">
+                <a14:useLocalDpi xmlns:a14="http://schemas.microsoft.com/office/drawing/2010/main" val="0"/>
+              </a:ext>
+            </a:extLst>
+          </a:blip>
+          <a:stretch>
+            <a:fillRect/>
+          </a:stretch>
+        </p:blipFill>
+        <p:spPr>
+          <a:xfrm>
+            <a:off x="1127412" y="1646359"/>
+            <a:ext cx="1260000" cy="1260000"/>
+          </a:xfrm>
+          <a:prstGeom prst="rect">
+            <a:avLst/>
+          </a:prstGeom>
+        </p:spPr>
+      </p:pic>
+      <p:pic>
+        <p:nvPicPr>
+          <p:cNvPr id="12" name="Picture 11"/>
+          <p:cNvPicPr>
+            <a:picLocks noChangeAspect="1"/>
+          </p:cNvPicPr>
+          <p:nvPr/>
+        </p:nvPicPr>
+        <p:blipFill>
+          <a:blip r:embed="rId8" cstate="print">
+            <a:extLst>
+              <a:ext uri="{28A0092B-C50C-407E-A947-70E740481C1C}">
+                <a14:useLocalDpi xmlns:a14="http://schemas.microsoft.com/office/drawing/2010/main" val="0"/>
+              </a:ext>
+            </a:extLst>
+          </a:blip>
+          <a:stretch>
+            <a:fillRect/>
+          </a:stretch>
+        </p:blipFill>
+        <p:spPr>
+          <a:xfrm>
+            <a:off x="4061926" y="5435768"/>
+            <a:ext cx="1260000" cy="1260000"/>
+          </a:xfrm>
+          <a:prstGeom prst="rect">
+            <a:avLst/>
+          </a:prstGeom>
+        </p:spPr>
+      </p:pic>
+    </p:spTree>
+    <p:extLst>
+      <p:ext uri="{BB962C8B-B14F-4D97-AF65-F5344CB8AC3E}">
+        <p14:creationId xmlns:p14="http://schemas.microsoft.com/office/powerpoint/2010/main" val="486634373"/>
+      </p:ext>
+    </p:extLst>
+  </p:cSld>
+  <p:clrMapOvr>
+    <a:masterClrMapping/>
+  </p:clrMapOvr>
+  <p:timing>
+    <p:tnLst>
+      <p:par>
+        <p:cTn id="1" dur="indefinite" restart="never" nodeType="tmRoot"/>
+      </p:par>
+    </p:tnLst>
+  </p:timing>
+</p:sld>
+</file>
+
+<file path=ppt/slides/slide4.xml><?xml version="1.0" encoding="utf-8"?>
+<p:sld xmlns:a="http://schemas.openxmlformats.org/drawingml/2006/main" xmlns:r="http://schemas.openxmlformats.org/officeDocument/2006/relationships" xmlns:p="http://schemas.openxmlformats.org/presentationml/2006/main">
+  <p:cSld>
+    <p:spTree>
+      <p:nvGrpSpPr>
+        <p:cNvPr id="1" name=""/>
+        <p:cNvGrpSpPr/>
+        <p:nvPr/>
+      </p:nvGrpSpPr>
+      <p:grpSpPr>
+        <a:xfrm>
+          <a:off x="0" y="0"/>
+          <a:ext cx="0" cy="0"/>
+          <a:chOff x="0" y="0"/>
+          <a:chExt cx="0" cy="0"/>
+        </a:xfrm>
+      </p:grpSpPr>
       <p:pic>
         <p:nvPicPr>
           <p:cNvPr id="2" name="Picture 1"/>
@@ -8969,14 +10469,181 @@
   <p:timing>
     <p:tnLst>
       <p:par>
-        <p:cTn id="1" dur="indefinite" restart="never" nodeType="tmRoot"/>
+        <p:cTn id="1" dur="indefinite" restart="never" nodeType="tmRoot">
+          <p:childTnLst>
+            <p:seq concurrent="1" nextAc="seek">
+              <p:cTn id="2" dur="indefinite" nodeType="mainSeq">
+                <p:childTnLst>
+                  <p:par>
+                    <p:cTn id="3" fill="hold">
+                      <p:stCondLst>
+                        <p:cond delay="indefinite"/>
+                        <p:cond evt="onBegin" delay="0">
+                          <p:tn val="2"/>
+                        </p:cond>
+                      </p:stCondLst>
+                      <p:childTnLst>
+                        <p:par>
+                          <p:cTn id="4" fill="hold">
+                            <p:stCondLst>
+                              <p:cond delay="0"/>
+                            </p:stCondLst>
+                            <p:childTnLst>
+                              <p:par>
+                                <p:cTn id="5" presetID="10" presetClass="entr" presetSubtype="0" fill="hold" nodeType="afterEffect">
+                                  <p:stCondLst>
+                                    <p:cond delay="700"/>
+                                  </p:stCondLst>
+                                  <p:childTnLst>
+                                    <p:set>
+                                      <p:cBhvr>
+                                        <p:cTn id="6" dur="1" fill="hold">
+                                          <p:stCondLst>
+                                            <p:cond delay="0"/>
+                                          </p:stCondLst>
+                                        </p:cTn>
+                                        <p:tgtEl>
+                                          <p:spTgt spid="4"/>
+                                        </p:tgtEl>
+                                        <p:attrNameLst>
+                                          <p:attrName>style.visibility</p:attrName>
+                                        </p:attrNameLst>
+                                      </p:cBhvr>
+                                      <p:to>
+                                        <p:strVal val="visible"/>
+                                      </p:to>
+                                    </p:set>
+                                    <p:animEffect transition="in" filter="fade">
+                                      <p:cBhvr>
+                                        <p:cTn id="7" dur="1000"/>
+                                        <p:tgtEl>
+                                          <p:spTgt spid="4"/>
+                                        </p:tgtEl>
+                                      </p:cBhvr>
+                                    </p:animEffect>
+                                  </p:childTnLst>
+                                </p:cTn>
+                              </p:par>
+                            </p:childTnLst>
+                          </p:cTn>
+                        </p:par>
+                        <p:par>
+                          <p:cTn id="8" fill="hold">
+                            <p:stCondLst>
+                              <p:cond delay="1700"/>
+                            </p:stCondLst>
+                            <p:childTnLst>
+                              <p:par>
+                                <p:cTn id="9" presetID="10" presetClass="entr" presetSubtype="0" fill="hold" nodeType="afterEffect">
+                                  <p:stCondLst>
+                                    <p:cond delay="500"/>
+                                  </p:stCondLst>
+                                  <p:childTnLst>
+                                    <p:set>
+                                      <p:cBhvr>
+                                        <p:cTn id="10" dur="1" fill="hold">
+                                          <p:stCondLst>
+                                            <p:cond delay="0"/>
+                                          </p:stCondLst>
+                                        </p:cTn>
+                                        <p:tgtEl>
+                                          <p:spTgt spid="2"/>
+                                        </p:tgtEl>
+                                        <p:attrNameLst>
+                                          <p:attrName>style.visibility</p:attrName>
+                                        </p:attrNameLst>
+                                      </p:cBhvr>
+                                      <p:to>
+                                        <p:strVal val="visible"/>
+                                      </p:to>
+                                    </p:set>
+                                    <p:animEffect transition="in" filter="fade">
+                                      <p:cBhvr>
+                                        <p:cTn id="11" dur="1000"/>
+                                        <p:tgtEl>
+                                          <p:spTgt spid="2"/>
+                                        </p:tgtEl>
+                                      </p:cBhvr>
+                                    </p:animEffect>
+                                  </p:childTnLst>
+                                </p:cTn>
+                              </p:par>
+                            </p:childTnLst>
+                          </p:cTn>
+                        </p:par>
+                        <p:par>
+                          <p:cTn id="12" fill="hold">
+                            <p:stCondLst>
+                              <p:cond delay="3200"/>
+                            </p:stCondLst>
+                            <p:childTnLst>
+                              <p:par>
+                                <p:cTn id="13" presetID="10" presetClass="entr" presetSubtype="0" fill="hold" nodeType="afterEffect">
+                                  <p:stCondLst>
+                                    <p:cond delay="500"/>
+                                  </p:stCondLst>
+                                  <p:childTnLst>
+                                    <p:set>
+                                      <p:cBhvr>
+                                        <p:cTn id="14" dur="1" fill="hold">
+                                          <p:stCondLst>
+                                            <p:cond delay="0"/>
+                                          </p:stCondLst>
+                                        </p:cTn>
+                                        <p:tgtEl>
+                                          <p:spTgt spid="3"/>
+                                        </p:tgtEl>
+                                        <p:attrNameLst>
+                                          <p:attrName>style.visibility</p:attrName>
+                                        </p:attrNameLst>
+                                      </p:cBhvr>
+                                      <p:to>
+                                        <p:strVal val="visible"/>
+                                      </p:to>
+                                    </p:set>
+                                    <p:animEffect transition="in" filter="fade">
+                                      <p:cBhvr>
+                                        <p:cTn id="15" dur="1000"/>
+                                        <p:tgtEl>
+                                          <p:spTgt spid="3"/>
+                                        </p:tgtEl>
+                                      </p:cBhvr>
+                                    </p:animEffect>
+                                  </p:childTnLst>
+                                </p:cTn>
+                              </p:par>
+                            </p:childTnLst>
+                          </p:cTn>
+                        </p:par>
+                      </p:childTnLst>
+                    </p:cTn>
+                  </p:par>
+                </p:childTnLst>
+              </p:cTn>
+              <p:prevCondLst>
+                <p:cond evt="onPrev" delay="0">
+                  <p:tgtEl>
+                    <p:sldTgt/>
+                  </p:tgtEl>
+                </p:cond>
+              </p:prevCondLst>
+              <p:nextCondLst>
+                <p:cond evt="onNext" delay="0">
+                  <p:tgtEl>
+                    <p:sldTgt/>
+                  </p:tgtEl>
+                </p:cond>
+              </p:nextCondLst>
+            </p:seq>
+          </p:childTnLst>
+        </p:cTn>
       </p:par>
     </p:tnLst>
   </p:timing>
 </p:sld>
 </file>
 
-<file path=ppt/slides/slide4.xml><?xml version="1.0" encoding="utf-8"?>
+<file path=ppt/slides/slide5.xml><?xml version="1.0" encoding="utf-8"?>
 <p:sld xmlns:a="http://schemas.openxmlformats.org/drawingml/2006/main" xmlns:r="http://schemas.openxmlformats.org/officeDocument/2006/relationships" xmlns:p="http://schemas.openxmlformats.org/presentationml/2006/main">
   <p:cSld>
     <p:spTree>
@@ -9015,7 +10682,7 @@
         </p:blipFill>
         <p:spPr>
           <a:xfrm>
-            <a:off x="62865" y="1600200"/>
+            <a:off x="3052441" y="1617857"/>
             <a:ext cx="3006090" cy="3657600"/>
           </a:xfrm>
           <a:prstGeom prst="rect">
@@ -9075,7 +10742,7 @@
         </p:blipFill>
         <p:spPr>
           <a:xfrm>
-            <a:off x="6075045" y="1600200"/>
+            <a:off x="3059832" y="1600200"/>
             <a:ext cx="3006090" cy="3657600"/>
           </a:xfrm>
           <a:prstGeom prst="rect">
@@ -9096,14 +10763,169 @@
   <p:timing>
     <p:tnLst>
       <p:par>
-        <p:cTn id="1" dur="indefinite" restart="never" nodeType="tmRoot"/>
+        <p:cTn id="1" dur="indefinite" restart="never" nodeType="tmRoot">
+          <p:childTnLst>
+            <p:seq concurrent="1" nextAc="seek">
+              <p:cTn id="2" dur="indefinite" nodeType="mainSeq">
+                <p:childTnLst>
+                  <p:par>
+                    <p:cTn id="3" fill="hold">
+                      <p:stCondLst>
+                        <p:cond delay="indefinite"/>
+                      </p:stCondLst>
+                      <p:childTnLst>
+                        <p:par>
+                          <p:cTn id="4" fill="hold">
+                            <p:stCondLst>
+                              <p:cond delay="0"/>
+                            </p:stCondLst>
+                            <p:childTnLst>
+                              <p:par>
+                                <p:cTn id="5" presetID="42" presetClass="path" presetSubtype="0" accel="50000" decel="50000" fill="hold" nodeType="clickEffect">
+                                  <p:stCondLst>
+                                    <p:cond delay="0"/>
+                                  </p:stCondLst>
+                                  <p:childTnLst>
+                                    <p:animMotion origin="layout" path="M -2.77778E-7 -0.00255 L -0.33663 -0.00093 " pathEditMode="relative" rAng="0" ptsTypes="AA">
+                                      <p:cBhvr>
+                                        <p:cTn id="6" dur="2000" fill="hold"/>
+                                        <p:tgtEl>
+                                          <p:spTgt spid="2"/>
+                                        </p:tgtEl>
+                                        <p:attrNameLst>
+                                          <p:attrName>ppt_x</p:attrName>
+                                          <p:attrName>ppt_y</p:attrName>
+                                        </p:attrNameLst>
+                                      </p:cBhvr>
+                                      <p:rCtr x="-16840" y="69"/>
+                                    </p:animMotion>
+                                  </p:childTnLst>
+                                </p:cTn>
+                              </p:par>
+                              <p:par>
+                                <p:cTn id="7" presetID="10" presetClass="entr" presetSubtype="0" fill="hold" nodeType="withEffect">
+                                  <p:stCondLst>
+                                    <p:cond delay="0"/>
+                                  </p:stCondLst>
+                                  <p:childTnLst>
+                                    <p:set>
+                                      <p:cBhvr>
+                                        <p:cTn id="8" dur="1" fill="hold">
+                                          <p:stCondLst>
+                                            <p:cond delay="0"/>
+                                          </p:stCondLst>
+                                        </p:cTn>
+                                        <p:tgtEl>
+                                          <p:spTgt spid="2"/>
+                                        </p:tgtEl>
+                                        <p:attrNameLst>
+                                          <p:attrName>style.visibility</p:attrName>
+                                        </p:attrNameLst>
+                                      </p:cBhvr>
+                                      <p:to>
+                                        <p:strVal val="visible"/>
+                                      </p:to>
+                                    </p:set>
+                                    <p:animEffect transition="in" filter="fade">
+                                      <p:cBhvr>
+                                        <p:cTn id="9" dur="2000"/>
+                                        <p:tgtEl>
+                                          <p:spTgt spid="2"/>
+                                        </p:tgtEl>
+                                      </p:cBhvr>
+                                    </p:animEffect>
+                                  </p:childTnLst>
+                                </p:cTn>
+                              </p:par>
+                              <p:par>
+                                <p:cTn id="10" presetID="42" presetClass="path" presetSubtype="0" accel="50000" decel="50000" fill="hold" nodeType="withEffect">
+                                  <p:stCondLst>
+                                    <p:cond delay="0"/>
+                                  </p:stCondLst>
+                                  <p:childTnLst>
+                                    <p:animMotion origin="layout" path="M 1.66667E-6 0 L 0.33177 0 " pathEditMode="relative" rAng="0" ptsTypes="AA">
+                                      <p:cBhvr>
+                                        <p:cTn id="11" dur="2000" fill="hold"/>
+                                        <p:tgtEl>
+                                          <p:spTgt spid="4"/>
+                                        </p:tgtEl>
+                                        <p:attrNameLst>
+                                          <p:attrName>ppt_x</p:attrName>
+                                          <p:attrName>ppt_y</p:attrName>
+                                        </p:attrNameLst>
+                                      </p:cBhvr>
+                                      <p:rCtr x="16580" y="0"/>
+                                    </p:animMotion>
+                                  </p:childTnLst>
+                                </p:cTn>
+                              </p:par>
+                              <p:par>
+                                <p:cTn id="12" presetID="10" presetClass="entr" presetSubtype="0" fill="hold" nodeType="withEffect">
+                                  <p:stCondLst>
+                                    <p:cond delay="0"/>
+                                  </p:stCondLst>
+                                  <p:childTnLst>
+                                    <p:set>
+                                      <p:cBhvr>
+                                        <p:cTn id="13" dur="1" fill="hold">
+                                          <p:stCondLst>
+                                            <p:cond delay="0"/>
+                                          </p:stCondLst>
+                                        </p:cTn>
+                                        <p:tgtEl>
+                                          <p:spTgt spid="4"/>
+                                        </p:tgtEl>
+                                        <p:attrNameLst>
+                                          <p:attrName>style.visibility</p:attrName>
+                                        </p:attrNameLst>
+                                      </p:cBhvr>
+                                      <p:to>
+                                        <p:strVal val="visible"/>
+                                      </p:to>
+                                    </p:set>
+                                    <p:animEffect transition="in" filter="fade">
+                                      <p:cBhvr>
+                                        <p:cTn id="14" dur="2000"/>
+                                        <p:tgtEl>
+                                          <p:spTgt spid="4"/>
+                                        </p:tgtEl>
+                                      </p:cBhvr>
+                                    </p:animEffect>
+                                  </p:childTnLst>
+                                </p:cTn>
+                              </p:par>
+                            </p:childTnLst>
+                          </p:cTn>
+                        </p:par>
+                      </p:childTnLst>
+                    </p:cTn>
+                  </p:par>
+                </p:childTnLst>
+              </p:cTn>
+              <p:prevCondLst>
+                <p:cond evt="onPrev" delay="0">
+                  <p:tgtEl>
+                    <p:sldTgt/>
+                  </p:tgtEl>
+                </p:cond>
+              </p:prevCondLst>
+              <p:nextCondLst>
+                <p:cond evt="onNext" delay="0">
+                  <p:tgtEl>
+                    <p:sldTgt/>
+                  </p:tgtEl>
+                </p:cond>
+              </p:nextCondLst>
+            </p:seq>
+          </p:childTnLst>
+        </p:cTn>
       </p:par>
     </p:tnLst>
   </p:timing>
 </p:sld>
 </file>
 
-<file path=ppt/slides/slide5.xml><?xml version="1.0" encoding="utf-8"?>
+<file path=ppt/slides/slide6.xml><?xml version="1.0" encoding="utf-8"?>
 <p:sld xmlns:a="http://schemas.openxmlformats.org/drawingml/2006/main" xmlns:r="http://schemas.openxmlformats.org/officeDocument/2006/relationships" xmlns:p="http://schemas.openxmlformats.org/presentationml/2006/main">
   <p:cSld>
     <p:spTree>
@@ -9204,7 +11026,7 @@
 </p:sld>
 </file>
 
-<file path=ppt/slides/slide6.xml><?xml version="1.0" encoding="utf-8"?>
+<file path=ppt/slides/slide7.xml><?xml version="1.0" encoding="utf-8"?>
 <p:sld xmlns:a="http://schemas.openxmlformats.org/drawingml/2006/main" xmlns:r="http://schemas.openxmlformats.org/officeDocument/2006/relationships" xmlns:p="http://schemas.openxmlformats.org/presentationml/2006/main">
   <p:cSld>
     <p:spTree>
@@ -9297,7 +11119,7 @@
 </p:sld>
 </file>
 
-<file path=ppt/slides/slide7.xml><?xml version="1.0" encoding="utf-8"?>
+<file path=ppt/slides/slide8.xml><?xml version="1.0" encoding="utf-8"?>
 <p:sld xmlns:a="http://schemas.openxmlformats.org/drawingml/2006/main" xmlns:r="http://schemas.openxmlformats.org/officeDocument/2006/relationships" xmlns:p="http://schemas.openxmlformats.org/presentationml/2006/main">
   <p:cSld>
     <p:spTree>
@@ -9397,7 +11219,7 @@
 </p:sld>
 </file>
 
-<file path=ppt/slides/slide8.xml><?xml version="1.0" encoding="utf-8"?>
+<file path=ppt/slides/slide9.xml><?xml version="1.0" encoding="utf-8"?>
 <p:sld xmlns:a="http://schemas.openxmlformats.org/drawingml/2006/main" xmlns:r="http://schemas.openxmlformats.org/officeDocument/2006/relationships" xmlns:p="http://schemas.openxmlformats.org/presentationml/2006/main">
   <p:cSld>
     <p:spTree>
@@ -9504,507 +11326,6 @@
     <p:extLst>
       <p:ext uri="{BB962C8B-B14F-4D97-AF65-F5344CB8AC3E}">
         <p14:creationId xmlns:p14="http://schemas.microsoft.com/office/powerpoint/2010/main" val="2671006284"/>
-      </p:ext>
-    </p:extLst>
-  </p:cSld>
-  <p:clrMapOvr>
-    <a:masterClrMapping/>
-  </p:clrMapOvr>
-  <p:timing>
-    <p:tnLst>
-      <p:par>
-        <p:cTn id="1" dur="indefinite" restart="never" nodeType="tmRoot"/>
-      </p:par>
-    </p:tnLst>
-  </p:timing>
-</p:sld>
-</file>
-
-<file path=ppt/slides/slide9.xml><?xml version="1.0" encoding="utf-8"?>
-<p:sld xmlns:a="http://schemas.openxmlformats.org/drawingml/2006/main" xmlns:r="http://schemas.openxmlformats.org/officeDocument/2006/relationships" xmlns:p="http://schemas.openxmlformats.org/presentationml/2006/main">
-  <p:cSld>
-    <p:spTree>
-      <p:nvGrpSpPr>
-        <p:cNvPr id="1" name=""/>
-        <p:cNvGrpSpPr/>
-        <p:nvPr/>
-      </p:nvGrpSpPr>
-      <p:grpSpPr>
-        <a:xfrm>
-          <a:off x="0" y="0"/>
-          <a:ext cx="0" cy="0"/>
-          <a:chOff x="0" y="0"/>
-          <a:chExt cx="0" cy="0"/>
-        </a:xfrm>
-      </p:grpSpPr>
-      <p:sp>
-        <p:nvSpPr>
-          <p:cNvPr id="3" name="Text Placeholder 2"/>
-          <p:cNvSpPr>
-            <a:spLocks noGrp="1"/>
-          </p:cNvSpPr>
-          <p:nvPr>
-            <p:ph type="body" sz="quarter" idx="11"/>
-          </p:nvPr>
-        </p:nvSpPr>
-        <p:spPr>
-          <a:xfrm>
-            <a:off x="278845" y="1297295"/>
-            <a:ext cx="2181967" cy="469905"/>
-          </a:xfrm>
-        </p:spPr>
-        <p:txBody>
-          <a:bodyPr/>
-          <a:lstStyle/>
-          <a:p>
-            <a:pPr marL="0" indent="0">
-              <a:buNone/>
-            </a:pPr>
-            <a:r>
-              <a:rPr lang="en-GB" dirty="0" smtClean="0"/>
-              <a:t>Blog / </a:t>
-            </a:r>
-            <a:r>
-              <a:rPr lang="en-GB" dirty="0" err="1" smtClean="0">
-                <a:solidFill>
-                  <a:srgbClr val="CB623C"/>
-                </a:solidFill>
-              </a:rPr>
-              <a:t>cms</a:t>
-            </a:r>
-            <a:endParaRPr lang="en-GB" dirty="0">
-              <a:solidFill>
-                <a:srgbClr val="CB623C"/>
-              </a:solidFill>
-            </a:endParaRPr>
-          </a:p>
-        </p:txBody>
-      </p:sp>
-      <p:sp>
-        <p:nvSpPr>
-          <p:cNvPr id="4" name="Title 3"/>
-          <p:cNvSpPr>
-            <a:spLocks noGrp="1"/>
-          </p:cNvSpPr>
-          <p:nvPr>
-            <p:ph type="title"/>
-          </p:nvPr>
-        </p:nvSpPr>
-        <p:spPr>
-          <a:xfrm>
-            <a:off x="0" y="127458"/>
-            <a:ext cx="9143999" cy="757130"/>
-          </a:xfrm>
-        </p:spPr>
-        <p:txBody>
-          <a:bodyPr anchor="ctr" anchorCtr="0">
-            <a:spAutoFit/>
-          </a:bodyPr>
-          <a:lstStyle/>
-          <a:p>
-            <a:r>
-              <a:rPr lang="en-GB" dirty="0" err="1" smtClean="0"/>
-              <a:t>Webapp</a:t>
-            </a:r>
-            <a:r>
-              <a:rPr lang="en-GB" dirty="0" smtClean="0"/>
-              <a:t> marketplace</a:t>
-            </a:r>
-            <a:endParaRPr lang="en-GB" dirty="0"/>
-          </a:p>
-        </p:txBody>
-      </p:sp>
-      <p:pic>
-        <p:nvPicPr>
-          <p:cNvPr id="6" name="Picture 5"/>
-          <p:cNvPicPr>
-            <a:picLocks noChangeAspect="1"/>
-          </p:cNvPicPr>
-          <p:nvPr/>
-        </p:nvPicPr>
-        <p:blipFill>
-          <a:blip r:embed="rId2" cstate="print">
-            <a:extLst>
-              <a:ext uri="{28A0092B-C50C-407E-A947-70E740481C1C}">
-                <a14:useLocalDpi xmlns:a14="http://schemas.microsoft.com/office/drawing/2010/main" val="0"/>
-              </a:ext>
-            </a:extLst>
-          </a:blip>
-          <a:stretch>
-            <a:fillRect/>
-          </a:stretch>
-        </p:blipFill>
-        <p:spPr>
-          <a:xfrm>
-            <a:off x="278845" y="2022694"/>
-            <a:ext cx="1402037" cy="1402037"/>
-          </a:xfrm>
-          <a:prstGeom prst="rect">
-            <a:avLst/>
-          </a:prstGeom>
-        </p:spPr>
-      </p:pic>
-      <p:pic>
-        <p:nvPicPr>
-          <p:cNvPr id="7" name="Picture 6"/>
-          <p:cNvPicPr>
-            <a:picLocks noChangeAspect="1"/>
-          </p:cNvPicPr>
-          <p:nvPr/>
-        </p:nvPicPr>
-        <p:blipFill rotWithShape="1">
-          <a:blip r:embed="rId3">
-            <a:extLst>
-              <a:ext uri="{28A0092B-C50C-407E-A947-70E740481C1C}">
-                <a14:useLocalDpi xmlns:a14="http://schemas.microsoft.com/office/drawing/2010/main" val="0"/>
-              </a:ext>
-            </a:extLst>
-          </a:blip>
-          <a:srcRect r="69250"/>
-          <a:stretch/>
-        </p:blipFill>
-        <p:spPr>
-          <a:xfrm>
-            <a:off x="2669957" y="1999815"/>
-            <a:ext cx="1437103" cy="1402036"/>
-          </a:xfrm>
-          <a:prstGeom prst="rect">
-            <a:avLst/>
-          </a:prstGeom>
-        </p:spPr>
-      </p:pic>
-      <p:pic>
-        <p:nvPicPr>
-          <p:cNvPr id="8" name="Picture 7"/>
-          <p:cNvPicPr>
-            <a:picLocks noChangeAspect="1"/>
-          </p:cNvPicPr>
-          <p:nvPr/>
-        </p:nvPicPr>
-        <p:blipFill rotWithShape="1">
-          <a:blip r:embed="rId4" cstate="print">
-            <a:extLst>
-              <a:ext uri="{28A0092B-C50C-407E-A947-70E740481C1C}">
-                <a14:useLocalDpi xmlns:a14="http://schemas.microsoft.com/office/drawing/2010/main" val="0"/>
-              </a:ext>
-            </a:extLst>
-          </a:blip>
-          <a:srcRect r="78733"/>
-          <a:stretch/>
-        </p:blipFill>
-        <p:spPr>
-          <a:xfrm>
-            <a:off x="5096135" y="1999815"/>
-            <a:ext cx="1478549" cy="1402037"/>
-          </a:xfrm>
-          <a:prstGeom prst="rect">
-            <a:avLst/>
-          </a:prstGeom>
-        </p:spPr>
-      </p:pic>
-      <p:pic>
-        <p:nvPicPr>
-          <p:cNvPr id="9" name="Picture 8"/>
-          <p:cNvPicPr>
-            <a:picLocks noChangeAspect="1"/>
-          </p:cNvPicPr>
-          <p:nvPr/>
-        </p:nvPicPr>
-        <p:blipFill>
-          <a:blip r:embed="rId5" cstate="print">
-            <a:extLst>
-              <a:ext uri="{28A0092B-C50C-407E-A947-70E740481C1C}">
-                <a14:useLocalDpi xmlns:a14="http://schemas.microsoft.com/office/drawing/2010/main" val="0"/>
-              </a:ext>
-            </a:extLst>
-          </a:blip>
-          <a:stretch>
-            <a:fillRect/>
-          </a:stretch>
-        </p:blipFill>
-        <p:spPr>
-          <a:xfrm>
-            <a:off x="7563760" y="2019303"/>
-            <a:ext cx="1405428" cy="1405428"/>
-          </a:xfrm>
-          <a:prstGeom prst="rect">
-            <a:avLst/>
-          </a:prstGeom>
-        </p:spPr>
-      </p:pic>
-      <p:sp>
-        <p:nvSpPr>
-          <p:cNvPr id="10" name="Text Placeholder 2"/>
-          <p:cNvSpPr txBox="1">
-            <a:spLocks/>
-          </p:cNvSpPr>
-          <p:nvPr/>
-        </p:nvSpPr>
-        <p:spPr>
-          <a:xfrm>
-            <a:off x="278844" y="3770558"/>
-            <a:ext cx="2391113" cy="507831"/>
-          </a:xfrm>
-          <a:prstGeom prst="rect">
-            <a:avLst/>
-          </a:prstGeom>
-        </p:spPr>
-        <p:txBody>
-          <a:bodyPr>
-            <a:spAutoFit/>
-          </a:bodyPr>
-          <a:lstStyle>
-            <a:lvl1pPr marL="228600" indent="-228600" algn="l" defTabSz="914400" rtl="0" eaLnBrk="1" latinLnBrk="0" hangingPunct="1">
-              <a:lnSpc>
-                <a:spcPct val="90000"/>
-              </a:lnSpc>
-              <a:spcBef>
-                <a:spcPts val="1000"/>
-              </a:spcBef>
-              <a:buFont typeface="Arial" panose="020B0604020202020204" pitchFamily="34" charset="0"/>
-              <a:buChar char="•"/>
-              <a:defRPr sz="3000" kern="1200" cap="all" baseline="0">
-                <a:solidFill>
-                  <a:srgbClr val="737373"/>
-                </a:solidFill>
-                <a:latin typeface="News Cycle" panose="02000503000000000000" pitchFamily="2" charset="2"/>
-                <a:ea typeface="+mn-ea"/>
-                <a:cs typeface="+mn-cs"/>
-              </a:defRPr>
-            </a:lvl1pPr>
-            <a:lvl2pPr marL="685800" indent="-228600" algn="l" defTabSz="914400" rtl="0" eaLnBrk="1" latinLnBrk="0" hangingPunct="1">
-              <a:lnSpc>
-                <a:spcPct val="90000"/>
-              </a:lnSpc>
-              <a:spcBef>
-                <a:spcPts val="500"/>
-              </a:spcBef>
-              <a:buFont typeface="Arial" panose="020B0604020202020204" pitchFamily="34" charset="0"/>
-              <a:buChar char="•"/>
-              <a:defRPr sz="2400" kern="1200">
-                <a:solidFill>
-                  <a:srgbClr val="737373"/>
-                </a:solidFill>
-                <a:latin typeface="Georgia" panose="02040502050405020303" pitchFamily="18" charset="0"/>
-                <a:ea typeface="+mn-ea"/>
-                <a:cs typeface="+mn-cs"/>
-              </a:defRPr>
-            </a:lvl2pPr>
-            <a:lvl3pPr marL="1143000" indent="-228600" algn="l" defTabSz="914400" rtl="0" eaLnBrk="1" latinLnBrk="0" hangingPunct="1">
-              <a:lnSpc>
-                <a:spcPct val="90000"/>
-              </a:lnSpc>
-              <a:spcBef>
-                <a:spcPts val="500"/>
-              </a:spcBef>
-              <a:buFont typeface="Arial" panose="020B0604020202020204" pitchFamily="34" charset="0"/>
-              <a:buChar char="•"/>
-              <a:defRPr sz="2000" kern="1200">
-                <a:solidFill>
-                  <a:srgbClr val="737373"/>
-                </a:solidFill>
-                <a:latin typeface="Georgia" panose="02040502050405020303" pitchFamily="18" charset="0"/>
-                <a:ea typeface="+mn-ea"/>
-                <a:cs typeface="+mn-cs"/>
-              </a:defRPr>
-            </a:lvl3pPr>
-            <a:lvl4pPr marL="1600200" indent="-228600" algn="l" defTabSz="914400" rtl="0" eaLnBrk="1" latinLnBrk="0" hangingPunct="1">
-              <a:lnSpc>
-                <a:spcPct val="90000"/>
-              </a:lnSpc>
-              <a:spcBef>
-                <a:spcPts val="500"/>
-              </a:spcBef>
-              <a:buFont typeface="Arial" panose="020B0604020202020204" pitchFamily="34" charset="0"/>
-              <a:buChar char="•"/>
-              <a:defRPr sz="1800" kern="1200">
-                <a:solidFill>
-                  <a:srgbClr val="737373"/>
-                </a:solidFill>
-                <a:latin typeface="Georgia" panose="02040502050405020303" pitchFamily="18" charset="0"/>
-                <a:ea typeface="+mn-ea"/>
-                <a:cs typeface="+mn-cs"/>
-              </a:defRPr>
-            </a:lvl4pPr>
-            <a:lvl5pPr marL="2057400" indent="-228600" algn="l" defTabSz="914400" rtl="0" eaLnBrk="1" latinLnBrk="0" hangingPunct="1">
-              <a:lnSpc>
-                <a:spcPct val="90000"/>
-              </a:lnSpc>
-              <a:spcBef>
-                <a:spcPts val="500"/>
-              </a:spcBef>
-              <a:buFont typeface="Arial" panose="020B0604020202020204" pitchFamily="34" charset="0"/>
-              <a:buChar char="•"/>
-              <a:defRPr sz="1800" kern="1200">
-                <a:solidFill>
-                  <a:srgbClr val="737373"/>
-                </a:solidFill>
-                <a:latin typeface="Georgia" panose="02040502050405020303" pitchFamily="18" charset="0"/>
-                <a:ea typeface="+mn-ea"/>
-                <a:cs typeface="+mn-cs"/>
-              </a:defRPr>
-            </a:lvl5pPr>
-            <a:lvl6pPr marL="2514600" indent="-228600" algn="l" defTabSz="914400" rtl="0" eaLnBrk="1" latinLnBrk="0" hangingPunct="1">
-              <a:lnSpc>
-                <a:spcPct val="90000"/>
-              </a:lnSpc>
-              <a:spcBef>
-                <a:spcPts val="500"/>
-              </a:spcBef>
-              <a:buFont typeface="Arial" panose="020B0604020202020204" pitchFamily="34" charset="0"/>
-              <a:buChar char="•"/>
-              <a:defRPr sz="1800" kern="1200">
-                <a:solidFill>
-                  <a:schemeClr val="tx1"/>
-                </a:solidFill>
-                <a:latin typeface="+mn-lt"/>
-                <a:ea typeface="+mn-ea"/>
-                <a:cs typeface="+mn-cs"/>
-              </a:defRPr>
-            </a:lvl6pPr>
-            <a:lvl7pPr marL="2971800" indent="-228600" algn="l" defTabSz="914400" rtl="0" eaLnBrk="1" latinLnBrk="0" hangingPunct="1">
-              <a:lnSpc>
-                <a:spcPct val="90000"/>
-              </a:lnSpc>
-              <a:spcBef>
-                <a:spcPts val="500"/>
-              </a:spcBef>
-              <a:buFont typeface="Arial" panose="020B0604020202020204" pitchFamily="34" charset="0"/>
-              <a:buChar char="•"/>
-              <a:defRPr sz="1800" kern="1200">
-                <a:solidFill>
-                  <a:schemeClr val="tx1"/>
-                </a:solidFill>
-                <a:latin typeface="+mn-lt"/>
-                <a:ea typeface="+mn-ea"/>
-                <a:cs typeface="+mn-cs"/>
-              </a:defRPr>
-            </a:lvl7pPr>
-            <a:lvl8pPr marL="3429000" indent="-228600" algn="l" defTabSz="914400" rtl="0" eaLnBrk="1" latinLnBrk="0" hangingPunct="1">
-              <a:lnSpc>
-                <a:spcPct val="90000"/>
-              </a:lnSpc>
-              <a:spcBef>
-                <a:spcPts val="500"/>
-              </a:spcBef>
-              <a:buFont typeface="Arial" panose="020B0604020202020204" pitchFamily="34" charset="0"/>
-              <a:buChar char="•"/>
-              <a:defRPr sz="1800" kern="1200">
-                <a:solidFill>
-                  <a:schemeClr val="tx1"/>
-                </a:solidFill>
-                <a:latin typeface="+mn-lt"/>
-                <a:ea typeface="+mn-ea"/>
-                <a:cs typeface="+mn-cs"/>
-              </a:defRPr>
-            </a:lvl8pPr>
-            <a:lvl9pPr marL="3886200" indent="-228600" algn="l" defTabSz="914400" rtl="0" eaLnBrk="1" latinLnBrk="0" hangingPunct="1">
-              <a:lnSpc>
-                <a:spcPct val="90000"/>
-              </a:lnSpc>
-              <a:spcBef>
-                <a:spcPts val="500"/>
-              </a:spcBef>
-              <a:buFont typeface="Arial" panose="020B0604020202020204" pitchFamily="34" charset="0"/>
-              <a:buChar char="•"/>
-              <a:defRPr sz="1800" kern="1200">
-                <a:solidFill>
-                  <a:schemeClr val="tx1"/>
-                </a:solidFill>
-                <a:latin typeface="+mn-lt"/>
-                <a:ea typeface="+mn-ea"/>
-                <a:cs typeface="+mn-cs"/>
-              </a:defRPr>
-            </a:lvl9pPr>
-          </a:lstStyle>
-          <a:p>
-            <a:pPr marL="0" indent="0">
-              <a:buFont typeface="Arial" panose="020B0604020202020204" pitchFamily="34" charset="0"/>
-              <a:buNone/>
-            </a:pPr>
-            <a:r>
-              <a:rPr lang="en-GB" dirty="0" smtClean="0"/>
-              <a:t>E-</a:t>
-            </a:r>
-            <a:r>
-              <a:rPr lang="en-GB" dirty="0" smtClean="0">
-                <a:solidFill>
-                  <a:srgbClr val="CB623C"/>
-                </a:solidFill>
-              </a:rPr>
-              <a:t>commerce</a:t>
-            </a:r>
-            <a:endParaRPr lang="en-GB" dirty="0">
-              <a:solidFill>
-                <a:srgbClr val="CB623C"/>
-              </a:solidFill>
-            </a:endParaRPr>
-          </a:p>
-        </p:txBody>
-      </p:sp>
-      <p:pic>
-        <p:nvPicPr>
-          <p:cNvPr id="12" name="Picture 11"/>
-          <p:cNvPicPr>
-            <a:picLocks noChangeAspect="1"/>
-          </p:cNvPicPr>
-          <p:nvPr/>
-        </p:nvPicPr>
-        <p:blipFill>
-          <a:blip r:embed="rId6">
-            <a:extLst>
-              <a:ext uri="{28A0092B-C50C-407E-A947-70E740481C1C}">
-                <a14:useLocalDpi xmlns:a14="http://schemas.microsoft.com/office/drawing/2010/main" val="0"/>
-              </a:ext>
-            </a:extLst>
-          </a:blip>
-          <a:stretch>
-            <a:fillRect/>
-          </a:stretch>
-        </p:blipFill>
-        <p:spPr>
-          <a:xfrm>
-            <a:off x="1779199" y="4278389"/>
-            <a:ext cx="2389585" cy="1786235"/>
-          </a:xfrm>
-          <a:prstGeom prst="rect">
-            <a:avLst/>
-          </a:prstGeom>
-        </p:spPr>
-      </p:pic>
-      <p:pic>
-        <p:nvPicPr>
-          <p:cNvPr id="13" name="Picture 12"/>
-          <p:cNvPicPr>
-            <a:picLocks noChangeAspect="1"/>
-          </p:cNvPicPr>
-          <p:nvPr/>
-        </p:nvPicPr>
-        <p:blipFill rotWithShape="1">
-          <a:blip r:embed="rId7" cstate="print">
-            <a:extLst>
-              <a:ext uri="{28A0092B-C50C-407E-A947-70E740481C1C}">
-                <a14:useLocalDpi xmlns:a14="http://schemas.microsoft.com/office/drawing/2010/main" val="0"/>
-              </a:ext>
-            </a:extLst>
-          </a:blip>
-          <a:srcRect t="18695"/>
-          <a:stretch/>
-        </p:blipFill>
-        <p:spPr>
-          <a:xfrm>
-            <a:off x="5828179" y="4271573"/>
-            <a:ext cx="1536622" cy="1799866"/>
-          </a:xfrm>
-          <a:prstGeom prst="rect">
-            <a:avLst/>
-          </a:prstGeom>
-        </p:spPr>
-      </p:pic>
-    </p:spTree>
-    <p:extLst>
-      <p:ext uri="{BB962C8B-B14F-4D97-AF65-F5344CB8AC3E}">
-        <p14:creationId xmlns:p14="http://schemas.microsoft.com/office/powerpoint/2010/main" val="73351509"/>
       </p:ext>
     </p:extLst>
   </p:cSld>
@@ -10541,4 +11862,265 @@
     </a:ext>
   </a:extLst>
 </a:theme>
+</file>
+
+<file path=ppt/theme/theme3.xml><?xml version="1.0" encoding="utf-8"?>
+<a:theme xmlns:a="http://schemas.openxmlformats.org/drawingml/2006/main" name="Office Theme">
+  <a:themeElements>
+    <a:clrScheme name="Office">
+      <a:dk1>
+        <a:sysClr val="windowText" lastClr="000000"/>
+      </a:dk1>
+      <a:lt1>
+        <a:sysClr val="window" lastClr="FFFFFF"/>
+      </a:lt1>
+      <a:dk2>
+        <a:srgbClr val="44546A"/>
+      </a:dk2>
+      <a:lt2>
+        <a:srgbClr val="E7E6E6"/>
+      </a:lt2>
+      <a:accent1>
+        <a:srgbClr val="5B9BD5"/>
+      </a:accent1>
+      <a:accent2>
+        <a:srgbClr val="ED7D31"/>
+      </a:accent2>
+      <a:accent3>
+        <a:srgbClr val="A5A5A5"/>
+      </a:accent3>
+      <a:accent4>
+        <a:srgbClr val="FFC000"/>
+      </a:accent4>
+      <a:accent5>
+        <a:srgbClr val="4472C4"/>
+      </a:accent5>
+      <a:accent6>
+        <a:srgbClr val="70AD47"/>
+      </a:accent6>
+      <a:hlink>
+        <a:srgbClr val="0563C1"/>
+      </a:hlink>
+      <a:folHlink>
+        <a:srgbClr val="954F72"/>
+      </a:folHlink>
+    </a:clrScheme>
+    <a:fontScheme name="Office">
+      <a:majorFont>
+        <a:latin typeface="Calibri Light" panose="020F0302020204030204"/>
+        <a:ea typeface=""/>
+        <a:cs typeface=""/>
+        <a:font script="Jpan" typeface="ＭＳ Ｐゴシック"/>
+        <a:font script="Hang" typeface="맑은 고딕"/>
+        <a:font script="Hans" typeface="宋体"/>
+        <a:font script="Hant" typeface="新細明體"/>
+        <a:font script="Arab" typeface="Times New Roman"/>
+        <a:font script="Hebr" typeface="Times New Roman"/>
+        <a:font script="Thai" typeface="Angsana New"/>
+        <a:font script="Ethi" typeface="Nyala"/>
+        <a:font script="Beng" typeface="Vrinda"/>
+        <a:font script="Gujr" typeface="Shruti"/>
+        <a:font script="Khmr" typeface="MoolBoran"/>
+        <a:font script="Knda" typeface="Tunga"/>
+        <a:font script="Guru" typeface="Raavi"/>
+        <a:font script="Cans" typeface="Euphemia"/>
+        <a:font script="Cher" typeface="Plantagenet Cherokee"/>
+        <a:font script="Yiii" typeface="Microsoft Yi Baiti"/>
+        <a:font script="Tibt" typeface="Microsoft Himalaya"/>
+        <a:font script="Thaa" typeface="MV Boli"/>
+        <a:font script="Deva" typeface="Mangal"/>
+        <a:font script="Telu" typeface="Gautami"/>
+        <a:font script="Taml" typeface="Latha"/>
+        <a:font script="Syrc" typeface="Estrangelo Edessa"/>
+        <a:font script="Orya" typeface="Kalinga"/>
+        <a:font script="Mlym" typeface="Kartika"/>
+        <a:font script="Laoo" typeface="DokChampa"/>
+        <a:font script="Sinh" typeface="Iskoola Pota"/>
+        <a:font script="Mong" typeface="Mongolian Baiti"/>
+        <a:font script="Viet" typeface="Times New Roman"/>
+        <a:font script="Uigh" typeface="Microsoft Uighur"/>
+        <a:font script="Geor" typeface="Sylfaen"/>
+      </a:majorFont>
+      <a:minorFont>
+        <a:latin typeface="Calibri" panose="020F0502020204030204"/>
+        <a:ea typeface=""/>
+        <a:cs typeface=""/>
+        <a:font script="Jpan" typeface="ＭＳ Ｐゴシック"/>
+        <a:font script="Hang" typeface="맑은 고딕"/>
+        <a:font script="Hans" typeface="宋体"/>
+        <a:font script="Hant" typeface="新細明體"/>
+        <a:font script="Arab" typeface="Arial"/>
+        <a:font script="Hebr" typeface="Arial"/>
+        <a:font script="Thai" typeface="Cordia New"/>
+        <a:font script="Ethi" typeface="Nyala"/>
+        <a:font script="Beng" typeface="Vrinda"/>
+        <a:font script="Gujr" typeface="Shruti"/>
+        <a:font script="Khmr" typeface="DaunPenh"/>
+        <a:font script="Knda" typeface="Tunga"/>
+        <a:font script="Guru" typeface="Raavi"/>
+        <a:font script="Cans" typeface="Euphemia"/>
+        <a:font script="Cher" typeface="Plantagenet Cherokee"/>
+        <a:font script="Yiii" typeface="Microsoft Yi Baiti"/>
+        <a:font script="Tibt" typeface="Microsoft Himalaya"/>
+        <a:font script="Thaa" typeface="MV Boli"/>
+        <a:font script="Deva" typeface="Mangal"/>
+        <a:font script="Telu" typeface="Gautami"/>
+        <a:font script="Taml" typeface="Latha"/>
+        <a:font script="Syrc" typeface="Estrangelo Edessa"/>
+        <a:font script="Orya" typeface="Kalinga"/>
+        <a:font script="Mlym" typeface="Kartika"/>
+        <a:font script="Laoo" typeface="DokChampa"/>
+        <a:font script="Sinh" typeface="Iskoola Pota"/>
+        <a:font script="Mong" typeface="Mongolian Baiti"/>
+        <a:font script="Viet" typeface="Arial"/>
+        <a:font script="Uigh" typeface="Microsoft Uighur"/>
+        <a:font script="Geor" typeface="Sylfaen"/>
+      </a:minorFont>
+    </a:fontScheme>
+    <a:fmtScheme name="Office">
+      <a:fillStyleLst>
+        <a:solidFill>
+          <a:schemeClr val="phClr"/>
+        </a:solidFill>
+        <a:gradFill rotWithShape="1">
+          <a:gsLst>
+            <a:gs pos="0">
+              <a:schemeClr val="phClr">
+                <a:lumMod val="110000"/>
+                <a:satMod val="105000"/>
+                <a:tint val="67000"/>
+              </a:schemeClr>
+            </a:gs>
+            <a:gs pos="50000">
+              <a:schemeClr val="phClr">
+                <a:lumMod val="105000"/>
+                <a:satMod val="103000"/>
+                <a:tint val="73000"/>
+              </a:schemeClr>
+            </a:gs>
+            <a:gs pos="100000">
+              <a:schemeClr val="phClr">
+                <a:lumMod val="105000"/>
+                <a:satMod val="109000"/>
+                <a:tint val="81000"/>
+              </a:schemeClr>
+            </a:gs>
+          </a:gsLst>
+          <a:lin ang="5400000" scaled="0"/>
+        </a:gradFill>
+        <a:gradFill rotWithShape="1">
+          <a:gsLst>
+            <a:gs pos="0">
+              <a:schemeClr val="phClr">
+                <a:satMod val="103000"/>
+                <a:lumMod val="102000"/>
+                <a:tint val="94000"/>
+              </a:schemeClr>
+            </a:gs>
+            <a:gs pos="50000">
+              <a:schemeClr val="phClr">
+                <a:satMod val="110000"/>
+                <a:lumMod val="100000"/>
+                <a:shade val="100000"/>
+              </a:schemeClr>
+            </a:gs>
+            <a:gs pos="100000">
+              <a:schemeClr val="phClr">
+                <a:lumMod val="99000"/>
+                <a:satMod val="120000"/>
+                <a:shade val="78000"/>
+              </a:schemeClr>
+            </a:gs>
+          </a:gsLst>
+          <a:lin ang="5400000" scaled="0"/>
+        </a:gradFill>
+      </a:fillStyleLst>
+      <a:lnStyleLst>
+        <a:ln w="6350" cap="flat" cmpd="sng" algn="ctr">
+          <a:solidFill>
+            <a:schemeClr val="phClr"/>
+          </a:solidFill>
+          <a:prstDash val="solid"/>
+          <a:miter lim="800000"/>
+        </a:ln>
+        <a:ln w="12700" cap="flat" cmpd="sng" algn="ctr">
+          <a:solidFill>
+            <a:schemeClr val="phClr"/>
+          </a:solidFill>
+          <a:prstDash val="solid"/>
+          <a:miter lim="800000"/>
+        </a:ln>
+        <a:ln w="19050" cap="flat" cmpd="sng" algn="ctr">
+          <a:solidFill>
+            <a:schemeClr val="phClr"/>
+          </a:solidFill>
+          <a:prstDash val="solid"/>
+          <a:miter lim="800000"/>
+        </a:ln>
+      </a:lnStyleLst>
+      <a:effectStyleLst>
+        <a:effectStyle>
+          <a:effectLst/>
+        </a:effectStyle>
+        <a:effectStyle>
+          <a:effectLst/>
+        </a:effectStyle>
+        <a:effectStyle>
+          <a:effectLst>
+            <a:outerShdw blurRad="57150" dist="19050" dir="5400000" algn="ctr" rotWithShape="0">
+              <a:srgbClr val="000000">
+                <a:alpha val="63000"/>
+              </a:srgbClr>
+            </a:outerShdw>
+          </a:effectLst>
+        </a:effectStyle>
+      </a:effectStyleLst>
+      <a:bgFillStyleLst>
+        <a:solidFill>
+          <a:schemeClr val="phClr"/>
+        </a:solidFill>
+        <a:solidFill>
+          <a:schemeClr val="phClr">
+            <a:tint val="95000"/>
+            <a:satMod val="170000"/>
+          </a:schemeClr>
+        </a:solidFill>
+        <a:gradFill rotWithShape="1">
+          <a:gsLst>
+            <a:gs pos="0">
+              <a:schemeClr val="phClr">
+                <a:tint val="93000"/>
+                <a:satMod val="150000"/>
+                <a:shade val="98000"/>
+                <a:lumMod val="102000"/>
+              </a:schemeClr>
+            </a:gs>
+            <a:gs pos="50000">
+              <a:schemeClr val="phClr">
+                <a:tint val="98000"/>
+                <a:satMod val="130000"/>
+                <a:shade val="90000"/>
+                <a:lumMod val="103000"/>
+              </a:schemeClr>
+            </a:gs>
+            <a:gs pos="100000">
+              <a:schemeClr val="phClr">
+                <a:shade val="63000"/>
+                <a:satMod val="120000"/>
+              </a:schemeClr>
+            </a:gs>
+          </a:gsLst>
+          <a:lin ang="5400000" scaled="0"/>
+        </a:gradFill>
+      </a:bgFillStyleLst>
+    </a:fmtScheme>
+  </a:themeElements>
+  <a:objectDefaults/>
+  <a:extraClrSchemeLst/>
+  <a:extLst>
+    <a:ext uri="{05A4C25C-085E-4340-85A3-A5531E510DB2}">
+      <thm15:themeFamily xmlns:thm15="http://schemas.microsoft.com/office/thememl/2012/main" name="Office Theme" id="{62F939B6-93AF-4DB8-9C6B-D6C7DFDC589F}" vid="{4A3C46E8-61CC-4603-A589-7422A47A8E4A}"/>
+    </a:ext>
+  </a:extLst>
+</a:theme>
 </file>
</xml_diff>

<commit_message>
Makes a start on Data Stores.
</commit_message>
<xml_diff>
--- a/Current/Azure The Good Parts Web Apps/AzureTheGoodParts-WebApps.pptx
+++ b/Current/Azure The Good Parts Web Apps/AzureTheGoodParts-WebApps.pptx
@@ -6,7 +6,7 @@
     <p:sldMasterId id="2147483672" r:id="rId2"/>
   </p:sldMasterIdLst>
   <p:notesMasterIdLst>
-    <p:notesMasterId r:id="rId26"/>
+    <p:notesMasterId r:id="rId32"/>
   </p:notesMasterIdLst>
   <p:sldIdLst>
     <p:sldId id="256" r:id="rId3"/>
@@ -21,17 +21,23 @@
     <p:sldId id="294" r:id="rId12"/>
     <p:sldId id="295" r:id="rId13"/>
     <p:sldId id="284" r:id="rId14"/>
-    <p:sldId id="266" r:id="rId15"/>
-    <p:sldId id="273" r:id="rId16"/>
-    <p:sldId id="269" r:id="rId17"/>
-    <p:sldId id="272" r:id="rId18"/>
-    <p:sldId id="274" r:id="rId19"/>
-    <p:sldId id="275" r:id="rId20"/>
-    <p:sldId id="280" r:id="rId21"/>
-    <p:sldId id="286" r:id="rId22"/>
-    <p:sldId id="271" r:id="rId23"/>
-    <p:sldId id="287" r:id="rId24"/>
-    <p:sldId id="288" r:id="rId25"/>
+    <p:sldId id="296" r:id="rId15"/>
+    <p:sldId id="297" r:id="rId16"/>
+    <p:sldId id="266" r:id="rId17"/>
+    <p:sldId id="298" r:id="rId18"/>
+    <p:sldId id="299" r:id="rId19"/>
+    <p:sldId id="300" r:id="rId20"/>
+    <p:sldId id="273" r:id="rId21"/>
+    <p:sldId id="301" r:id="rId22"/>
+    <p:sldId id="269" r:id="rId23"/>
+    <p:sldId id="272" r:id="rId24"/>
+    <p:sldId id="274" r:id="rId25"/>
+    <p:sldId id="275" r:id="rId26"/>
+    <p:sldId id="280" r:id="rId27"/>
+    <p:sldId id="286" r:id="rId28"/>
+    <p:sldId id="271" r:id="rId29"/>
+    <p:sldId id="287" r:id="rId30"/>
+    <p:sldId id="288" r:id="rId31"/>
   </p:sldIdLst>
   <p:sldSz cx="9144000" cy="6858000" type="screen4x3"/>
   <p:notesSz cx="6858000" cy="9144000"/>
@@ -231,7 +237,7 @@
           <a:p>
             <a:fld id="{9E29A4B1-5A86-4619-B723-CCAF1C8CA250}" type="datetimeFigureOut">
               <a:rPr lang="en-GB" smtClean="0"/>
-              <a:t>20/09/2015</a:t>
+              <a:t>21/09/2015</a:t>
             </a:fld>
             <a:endParaRPr lang="en-GB"/>
           </a:p>
@@ -1649,94 +1655,42 @@
           <a:p>
             <a:r>
               <a:rPr lang="en-GB" dirty="0" smtClean="0"/>
-              <a:t>If you have an on premise server with a vanilla install of the latest version of Windows Server, how long will it take to provision a SQL Server install?</a:t>
-            </a:r>
-          </a:p>
-          <a:p>
-            <a:r>
-              <a:rPr lang="en-GB" dirty="0" smtClean="0"/>
-              <a:t>Lets create one now! I don't need you to time me this time. </a:t>
-            </a:r>
-          </a:p>
-          <a:p>
-            <a:endParaRPr lang="en-GB" dirty="0" smtClean="0"/>
-          </a:p>
-          <a:p>
-            <a:r>
-              <a:rPr lang="en-GB" dirty="0" smtClean="0"/>
-              <a:t>While that is being setup it will talk a bit more about the Azure SQL Service. </a:t>
-            </a:r>
-          </a:p>
-          <a:p>
-            <a:r>
-              <a:rPr lang="en-GB" dirty="0" smtClean="0"/>
-              <a:t>What Azure is doing here is basically setting up a Database-as-a-Service. They are</a:t>
+              <a:t>Most people are</a:t>
             </a:r>
             <a:r>
               <a:rPr lang="en-GB" baseline="0" dirty="0" smtClean="0"/>
-              <a:t> </a:t>
-            </a:r>
-            <a:r>
-              <a:rPr lang="en-GB" dirty="0" smtClean="0"/>
-              <a:t>giving you a SQL Database in the cloud, which takes away all the maintenance and licensing costs. </a:t>
-            </a:r>
-          </a:p>
-          <a:p>
-            <a:r>
-              <a:rPr lang="en-GB" dirty="0" smtClean="0"/>
-              <a:t>And all that time spent setting up a SQL server has gone.</a:t>
-            </a:r>
-          </a:p>
-          <a:p>
-            <a:r>
-              <a:rPr lang="en-GB" dirty="0" smtClean="0"/>
-              <a:t>	</a:t>
-            </a:r>
-          </a:p>
-          <a:p>
-            <a:r>
-              <a:rPr lang="en-GB" dirty="0" smtClean="0"/>
-              <a:t>Azure SQL provides some great features such as,</a:t>
-            </a:r>
-          </a:p>
-          <a:p>
-            <a:pPr marL="171450" indent="-171450">
-              <a:buFont typeface="Arial" panose="020B0604020202020204" pitchFamily="34" charset="0"/>
-              <a:buChar char="•"/>
-            </a:pPr>
-            <a:r>
-              <a:rPr lang="en-GB" dirty="0" smtClean="0"/>
-              <a:t>Elastic Scale - If you business is doing well you may need to think about shading your DB. Azure provide a set of tools that will help you do so automatically.</a:t>
-            </a:r>
-          </a:p>
-          <a:p>
-            <a:pPr marL="171450" indent="-171450">
-              <a:buFont typeface="Arial" panose="020B0604020202020204" pitchFamily="34" charset="0"/>
-              <a:buChar char="•"/>
-            </a:pPr>
-            <a:r>
-              <a:rPr lang="en-GB" dirty="0" smtClean="0"/>
-              <a:t>Predicable Performance - Because each database is allocated a fixed amount of resource, even if there is a database on the same server being hammered, that wont effect your database.</a:t>
-            </a:r>
-          </a:p>
-          <a:p>
-            <a:pPr marL="171450" indent="-171450">
-              <a:buFont typeface="Arial" panose="020B0604020202020204" pitchFamily="34" charset="0"/>
-              <a:buChar char="•"/>
-            </a:pPr>
-            <a:r>
-              <a:rPr lang="en-GB" dirty="0" smtClean="0"/>
-              <a:t>Business Continuity - Each database in Azure SQL is part of a cluster of replication nodes, one primary and 2 secondary. All transactions are not considered successful until the data has been written to the primary and at least one of the secondary nodes. There is also the option to setup geo-replication.</a:t>
-            </a:r>
-          </a:p>
-          <a:p>
-            <a:pPr marL="171450" indent="-171450">
-              <a:buFont typeface="Arial" panose="020B0604020202020204" pitchFamily="34" charset="0"/>
-              <a:buChar char="•"/>
-            </a:pPr>
-            <a:r>
-              <a:rPr lang="en-GB" dirty="0" smtClean="0"/>
-              <a:t>And from the developer point of view, there is no major difference between Azure SQL and SQL Server. So you can continue using your favourite tools.</a:t>
+              <a:t> so used to using relational data stores that they tend to forget there are other data store options available when architecting their app.</a:t>
+            </a:r>
+          </a:p>
+          <a:p>
+            <a:r>
+              <a:rPr lang="en-GB" baseline="0" dirty="0" smtClean="0"/>
+              <a:t>Some of the common problems I hear are due to relational databases producing suboptimal performance no matter how </a:t>
+            </a:r>
+            <a:r>
+              <a:rPr lang="en-GB" sz="1200" b="0" i="0" kern="1200" dirty="0" smtClean="0">
+                <a:solidFill>
+                  <a:schemeClr val="tx1"/>
+                </a:solidFill>
+                <a:effectLst/>
+                <a:latin typeface="+mn-lt"/>
+                <a:ea typeface="+mn-ea"/>
+                <a:cs typeface="+mn-cs"/>
+              </a:rPr>
+              <a:t>efficient </a:t>
+            </a:r>
+            <a:r>
+              <a:rPr lang="en-GB" baseline="0" dirty="0" smtClean="0"/>
+              <a:t>the query is and being expensive to licence.</a:t>
+            </a:r>
+          </a:p>
+          <a:p>
+            <a:endParaRPr lang="en-GB" baseline="0" dirty="0" smtClean="0"/>
+          </a:p>
+          <a:p>
+            <a:r>
+              <a:rPr lang="en-GB" baseline="0" dirty="0" smtClean="0"/>
+              <a:t>A NoSQL data store may have solved their problems, as they can handle tasks better than a relational data store. But it would be stupid to suggest that a NoSQL database can do everything well.</a:t>
             </a:r>
             <a:endParaRPr lang="en-GB" dirty="0"/>
           </a:p>
@@ -1768,7 +1722,7 @@
     </p:spTree>
     <p:extLst>
       <p:ext uri="{BB962C8B-B14F-4D97-AF65-F5344CB8AC3E}">
-        <p14:creationId xmlns:p14="http://schemas.microsoft.com/office/powerpoint/2010/main" val="1424571647"/>
+        <p14:creationId xmlns:p14="http://schemas.microsoft.com/office/powerpoint/2010/main" val="362760658"/>
       </p:ext>
     </p:extLst>
   </p:cSld>
@@ -1824,123 +1778,55 @@
           <a:p>
             <a:r>
               <a:rPr lang="en-GB" dirty="0" smtClean="0"/>
-              <a:t>As well as Azure SQL Azure provide a range of other data storage technologies such as My SQL or </a:t>
-            </a:r>
-            <a:r>
-              <a:rPr lang="en-GB" dirty="0" err="1" smtClean="0"/>
-              <a:t>Postgres</a:t>
-            </a:r>
+              <a:t>Most data store technologies will fall into one of these</a:t>
+            </a:r>
+            <a:r>
+              <a:rPr lang="en-GB" baseline="0" dirty="0" smtClean="0"/>
+              <a:t> families.</a:t>
+            </a:r>
+          </a:p>
+          <a:p>
+            <a:r>
+              <a:rPr lang="en-GB" baseline="0" dirty="0" smtClean="0"/>
+              <a:t>A lot of these data stores are already on Azure either through managed services or marketplace add-ins and many more are becoming available as the community builds containers for them.</a:t>
+            </a:r>
+          </a:p>
+          <a:p>
+            <a:endParaRPr lang="en-GB" baseline="0" dirty="0" smtClean="0"/>
+          </a:p>
+          <a:p>
+            <a:r>
+              <a:rPr lang="en-GB" baseline="0" dirty="0" smtClean="0"/>
+              <a:t>There are three managed services on Azure that will cover most of your data storage use cases.</a:t>
+            </a:r>
+          </a:p>
+          <a:p>
+            <a:endParaRPr lang="en-GB" baseline="0" dirty="0" smtClean="0"/>
+          </a:p>
+          <a:p>
             <a:r>
               <a:rPr lang="en-GB" dirty="0" smtClean="0"/>
-              <a:t> in the relational family. </a:t>
-            </a:r>
-            <a:r>
-              <a:rPr lang="en-GB" dirty="0" err="1" smtClean="0"/>
-              <a:t>Redis</a:t>
-            </a:r>
-            <a:r>
-              <a:rPr lang="en-GB" dirty="0" smtClean="0"/>
-              <a:t> and </a:t>
-            </a:r>
-            <a:r>
-              <a:rPr lang="en-GB" dirty="0" err="1" smtClean="0"/>
-              <a:t>Riak</a:t>
-            </a:r>
-            <a:r>
-              <a:rPr lang="en-GB" dirty="0" smtClean="0"/>
-              <a:t> in the Key/Value family.</a:t>
-            </a:r>
-          </a:p>
-          <a:p>
-            <a:r>
-              <a:rPr lang="en-GB" dirty="0" smtClean="0"/>
-              <a:t>For graph databases there is Neo4j and in the Document database space there is Mongo, </a:t>
-            </a:r>
-            <a:r>
-              <a:rPr lang="en-GB" dirty="0" err="1" smtClean="0"/>
-              <a:t>RethinkDb</a:t>
-            </a:r>
-            <a:r>
-              <a:rPr lang="en-GB" dirty="0" smtClean="0"/>
-              <a:t> and Azure </a:t>
-            </a:r>
-            <a:r>
-              <a:rPr lang="en-GB" dirty="0" err="1" smtClean="0"/>
-              <a:t>DocumentDB</a:t>
-            </a:r>
-            <a:r>
-              <a:rPr lang="en-GB" dirty="0" smtClean="0"/>
-              <a:t>.</a:t>
-            </a:r>
-          </a:p>
-          <a:p>
-            <a:r>
-              <a:rPr lang="en-GB" dirty="0" smtClean="0"/>
-              <a:t>		</a:t>
-            </a:r>
-          </a:p>
-          <a:p>
-            <a:r>
-              <a:rPr lang="en-GB" dirty="0" smtClean="0"/>
-              <a:t>Azure </a:t>
-            </a:r>
-            <a:r>
-              <a:rPr lang="en-GB" dirty="0" err="1" smtClean="0"/>
-              <a:t>DocumentDB</a:t>
-            </a:r>
-            <a:r>
-              <a:rPr lang="en-GB" dirty="0" smtClean="0"/>
-              <a:t> is Microsoft's offering in the field of NoSQL JSON document databases.</a:t>
-            </a:r>
-          </a:p>
-          <a:p>
-            <a:r>
-              <a:rPr lang="en-GB" dirty="0" err="1" smtClean="0"/>
-              <a:t>DocumentDB</a:t>
-            </a:r>
-            <a:r>
-              <a:rPr lang="en-GB" dirty="0" smtClean="0"/>
-              <a:t> is a fully managed document database as a service and designed to keep pace with modern rapidly evolving applications. </a:t>
-            </a:r>
-            <a:r>
-              <a:rPr lang="en-GB" dirty="0" err="1" smtClean="0"/>
-              <a:t>DocumentDB</a:t>
-            </a:r>
-            <a:r>
-              <a:rPr lang="en-GB" dirty="0" smtClean="0"/>
-              <a:t> </a:t>
-            </a:r>
-            <a:r>
-              <a:rPr lang="en-GB" dirty="0" err="1" smtClean="0"/>
-              <a:t>nativly</a:t>
-            </a:r>
-            <a:r>
-              <a:rPr lang="en-GB" dirty="0" smtClean="0"/>
-              <a:t> supports JSON and executes </a:t>
-            </a:r>
-            <a:r>
-              <a:rPr lang="en-GB" dirty="0" err="1" smtClean="0"/>
-              <a:t>Javascript</a:t>
-            </a:r>
-            <a:r>
-              <a:rPr lang="en-GB" dirty="0" smtClean="0"/>
-              <a:t> within it database engine. Meaning you can write and execute stored procedures and user defined functions directly on the database. </a:t>
-            </a:r>
-            <a:r>
-              <a:rPr lang="en-GB" dirty="0" err="1" smtClean="0"/>
-              <a:t>DocumentDB</a:t>
-            </a:r>
-            <a:r>
-              <a:rPr lang="en-GB" dirty="0" smtClean="0"/>
-              <a:t> automatically indexes all JSON documents, then allows you to query them with the familiar SQL syntax. A well as JavaScript Azure also provide SDKs in </a:t>
-            </a:r>
-            <a:r>
-              <a:rPr lang="en-GB" dirty="0" err="1" smtClean="0"/>
-              <a:t>.Net</a:t>
-            </a:r>
-            <a:r>
-              <a:rPr lang="en-GB" dirty="0" smtClean="0"/>
-              <a:t>, Java, Python and more, so you up and running quickly with the tools and languages you are already familiar with.</a:t>
+              <a:t>Azure SQL – A cut down version of Microsoft’s popular relational SQL</a:t>
+            </a:r>
+            <a:r>
+              <a:rPr lang="en-GB" baseline="0" dirty="0" smtClean="0"/>
+              <a:t> Server.</a:t>
+            </a:r>
+          </a:p>
+          <a:p>
+            <a:r>
+              <a:rPr lang="en-GB" baseline="0" dirty="0" smtClean="0"/>
+              <a:t>Table Storage – A fast Key/Value data store</a:t>
+            </a:r>
+          </a:p>
+          <a:p>
+            <a:r>
+              <a:rPr lang="en-GB" baseline="0" dirty="0" err="1" smtClean="0"/>
+              <a:t>DocumetDB</a:t>
+            </a:r>
+            <a:r>
+              <a:rPr lang="en-GB" baseline="0" dirty="0" smtClean="0"/>
+              <a:t> – I will give you one guess which family Document… DB is from.</a:t>
             </a:r>
             <a:endParaRPr lang="en-GB" dirty="0"/>
           </a:p>
@@ -1972,7 +1858,7 @@
     </p:spTree>
     <p:extLst>
       <p:ext uri="{BB962C8B-B14F-4D97-AF65-F5344CB8AC3E}">
-        <p14:creationId xmlns:p14="http://schemas.microsoft.com/office/powerpoint/2010/main" val="2846866398"/>
+        <p14:creationId xmlns:p14="http://schemas.microsoft.com/office/powerpoint/2010/main" val="1018545271"/>
       </p:ext>
     </p:extLst>
   </p:cSld>
@@ -2026,7 +1912,95 @@
           <a:bodyPr/>
           <a:lstStyle/>
           <a:p>
+            <a:r>
+              <a:rPr lang="en-GB" dirty="0" smtClean="0"/>
+              <a:t>If you have an on premise server with a vanilla install of the latest version of Windows Server, how long will it take to provision a SQL Server install</a:t>
+            </a:r>
+            <a:r>
+              <a:rPr lang="en-GB" dirty="0" smtClean="0"/>
+              <a:t>?</a:t>
+            </a:r>
+          </a:p>
+          <a:p>
+            <a:r>
+              <a:rPr lang="en-GB" dirty="0" smtClean="0"/>
+              <a:t>It will probably take about</a:t>
+            </a:r>
+            <a:r>
+              <a:rPr lang="en-GB" baseline="0" dirty="0" smtClean="0"/>
+              <a:t> 5mins to setup a brand new SQL instance with an empty database.</a:t>
+            </a:r>
+          </a:p>
+          <a:p>
             <a:endParaRPr lang="en-GB" dirty="0" smtClean="0"/>
+          </a:p>
+          <a:p>
+            <a:r>
+              <a:rPr lang="en-GB" dirty="0" smtClean="0"/>
+              <a:t>What the Azure team are doing </a:t>
+            </a:r>
+            <a:r>
+              <a:rPr lang="en-GB" dirty="0" smtClean="0"/>
+              <a:t>here is </a:t>
+            </a:r>
+            <a:r>
+              <a:rPr lang="en-GB" dirty="0" smtClean="0"/>
+              <a:t>providing a relational Database-as-a-Service</a:t>
+            </a:r>
+            <a:r>
+              <a:rPr lang="en-GB" dirty="0" smtClean="0"/>
+              <a:t>. </a:t>
+            </a:r>
+            <a:r>
+              <a:rPr lang="en-GB" dirty="0" smtClean="0"/>
+              <a:t>Because this is a managed service, it </a:t>
+            </a:r>
+            <a:r>
+              <a:rPr lang="en-GB" dirty="0" smtClean="0"/>
+              <a:t>takes away all the maintenance and licensing costs. </a:t>
+            </a:r>
+          </a:p>
+          <a:p>
+            <a:r>
+              <a:rPr lang="en-GB" dirty="0" smtClean="0"/>
+              <a:t>And all that time spent setting up </a:t>
+            </a:r>
+            <a:r>
+              <a:rPr lang="en-GB" dirty="0" smtClean="0"/>
+              <a:t>the </a:t>
+            </a:r>
+            <a:r>
+              <a:rPr lang="en-GB" dirty="0" smtClean="0"/>
+              <a:t>SQL </a:t>
+            </a:r>
+            <a:r>
+              <a:rPr lang="en-GB" dirty="0" smtClean="0"/>
+              <a:t>server.</a:t>
+            </a:r>
+            <a:endParaRPr lang="en-GB" dirty="0"/>
+          </a:p>
+          <a:p>
+            <a:endParaRPr lang="en-GB" dirty="0"/>
+          </a:p>
+          <a:p>
+            <a:r>
+              <a:rPr lang="en-GB" dirty="0" smtClean="0"/>
+              <a:t>Azure</a:t>
+            </a:r>
+            <a:r>
+              <a:rPr lang="en-GB" baseline="0" dirty="0" smtClean="0"/>
+              <a:t> SQL provides predictable performance, scalability with no downtime, business continuity and data protection all with almost no administration. Which means you can focus on developing the features of your app using a familiar tool.</a:t>
+            </a:r>
+          </a:p>
+          <a:p>
+            <a:endParaRPr lang="en-GB" baseline="0" dirty="0" smtClean="0"/>
+          </a:p>
+          <a:p>
+            <a:r>
+              <a:rPr lang="en-GB" baseline="0" dirty="0" smtClean="0"/>
+              <a:t>Because Azure SQL is built upon the SQL engine it means you can use existing SQL Server tools, libraries and APIs which makes it easier to move your app to the cloud.</a:t>
+            </a:r>
+            <a:endParaRPr lang="en-GB" dirty="0"/>
           </a:p>
         </p:txBody>
       </p:sp>
@@ -2056,7 +2030,7 @@
     </p:spTree>
     <p:extLst>
       <p:ext uri="{BB962C8B-B14F-4D97-AF65-F5344CB8AC3E}">
-        <p14:creationId xmlns:p14="http://schemas.microsoft.com/office/powerpoint/2010/main" val="248086816"/>
+        <p14:creationId xmlns:p14="http://schemas.microsoft.com/office/powerpoint/2010/main" val="1424571647"/>
       </p:ext>
     </p:extLst>
   </p:cSld>
@@ -2112,60 +2086,115 @@
           <a:p>
             <a:r>
               <a:rPr lang="en-GB" dirty="0" smtClean="0"/>
-              <a:t>Table storage is a schema-less NoSQL data store, that is scalable, redundant and fast. </a:t>
-            </a:r>
-          </a:p>
-          <a:p>
+              <a:t>Azure SQL has three service tiers with</a:t>
+            </a:r>
+            <a:r>
+              <a:rPr lang="en-GB" baseline="0" dirty="0" smtClean="0"/>
+              <a:t> different performance aspects.</a:t>
+            </a:r>
+          </a:p>
+          <a:p>
+            <a:endParaRPr lang="en-GB" baseline="0" dirty="0" smtClean="0"/>
+          </a:p>
+          <a:p>
+            <a:pPr marL="171450" indent="-171450">
+              <a:buFont typeface="Arial" panose="020B0604020202020204" pitchFamily="34" charset="0"/>
+              <a:buChar char="•"/>
+            </a:pPr>
+            <a:r>
+              <a:rPr lang="en-GB" b="1" dirty="0" smtClean="0"/>
+              <a:t>Basic</a:t>
+            </a:r>
+            <a:r>
+              <a:rPr lang="en-GB" dirty="0" smtClean="0"/>
+              <a:t>: Best suited for a small size database, typically used for development or testing, or small scale applications.</a:t>
+            </a:r>
+          </a:p>
+          <a:p>
+            <a:pPr marL="171450" indent="-171450">
+              <a:buFont typeface="Arial" panose="020B0604020202020204" pitchFamily="34" charset="0"/>
+              <a:buChar char="•"/>
+            </a:pPr>
+            <a:r>
+              <a:rPr lang="en-GB" b="1" dirty="0" smtClean="0"/>
+              <a:t>Standard</a:t>
+            </a:r>
+            <a:r>
+              <a:rPr lang="en-GB" dirty="0" smtClean="0"/>
+              <a:t>: The go-to option for most cloud applications, supporting multiple concurrent queries. Examples include workgroup or web applications.</a:t>
+            </a:r>
+          </a:p>
+          <a:p>
+            <a:pPr marL="171450" indent="-171450">
+              <a:buFont typeface="Arial" panose="020B0604020202020204" pitchFamily="34" charset="0"/>
+              <a:buChar char="•"/>
+            </a:pPr>
+            <a:r>
+              <a:rPr lang="en-GB" b="1" dirty="0" smtClean="0"/>
+              <a:t>Premium</a:t>
+            </a:r>
+            <a:r>
+              <a:rPr lang="en-GB" dirty="0" smtClean="0"/>
+              <a:t>: Designed for high transactional volume, supporting a large number of concurrent users and requiring the highest level of business continuity capabilities. Examples are databases supporting mission critical applications.</a:t>
+            </a:r>
+          </a:p>
+          <a:p>
+            <a:pPr marL="0" indent="0">
+              <a:buFont typeface="Arial" panose="020B0604020202020204" pitchFamily="34" charset="0"/>
+              <a:buNone/>
+            </a:pPr>
             <a:endParaRPr lang="en-GB" dirty="0" smtClean="0"/>
           </a:p>
           <a:p>
+            <a:pPr marL="0" indent="0">
+              <a:buFont typeface="Arial" panose="020B0604020202020204" pitchFamily="34" charset="0"/>
+              <a:buNone/>
+            </a:pPr>
             <a:r>
               <a:rPr lang="en-GB" dirty="0" smtClean="0"/>
-              <a:t>It is fast because every table has a clustered index which should be used to query the data. </a:t>
-            </a:r>
-          </a:p>
-          <a:p>
-            <a:r>
-              <a:rPr lang="en-GB" dirty="0" smtClean="0"/>
-              <a:t>The index consists of a Partition Key and a Row Key and together they make a unique ID. The Partition Key is used to shard the data between different nodes in the storage cluster, records with the same partition key are stored on the same node and the row key is used for uniqueness within the partition. The tables also have timestamp column which updates when the record is updated. The timestamp column is also used as an E-Tag to maintain data integrity. </a:t>
-            </a:r>
-          </a:p>
-          <a:p>
-            <a:r>
-              <a:rPr lang="en-GB" dirty="0" smtClean="0"/>
-              <a:t>		</a:t>
-            </a:r>
-          </a:p>
-          <a:p>
-            <a:r>
-              <a:rPr lang="en-GB" dirty="0" smtClean="0"/>
-              <a:t>As well as the 3 system properties each table entity can have up to 252 additional properties which are key / values. Because table storage is scheme less not every record needs all the properties. </a:t>
-            </a:r>
-          </a:p>
-          <a:p>
-            <a:endParaRPr lang="en-GB" dirty="0" smtClean="0"/>
-          </a:p>
-          <a:p>
-            <a:r>
-              <a:rPr lang="en-GB" dirty="0" smtClean="0"/>
-              <a:t>In this example table storage is being used as a log. The first record is only logging the fact a clean up job had completed. The second has logged an exception, with a stack trace for someone to review later.</a:t>
-            </a:r>
-          </a:p>
-          <a:p>
-            <a:endParaRPr lang="en-GB" dirty="0" smtClean="0"/>
-          </a:p>
-          <a:p>
-            <a:r>
-              <a:rPr lang="en-GB" dirty="0" smtClean="0"/>
-              <a:t>When designing your tables your really need to think about how to partition your data to get the maximum performance benefits.</a:t>
-            </a:r>
-          </a:p>
-          <a:p>
-            <a:r>
-              <a:rPr lang="en-GB" dirty="0" smtClean="0"/>
-              <a:t>In this example I have a collection of users indexed by email. The domain part and the local part of the email address has been used as the partition and row keys. When I search for a user by email I will split the email on the @ symbol and only search for the user within the relevant partition. Because you are querying on a subset of the data this is lighting quick.</a:t>
-            </a:r>
-            <a:endParaRPr lang="en-GB" dirty="0"/>
+              <a:t>This</a:t>
+            </a:r>
+            <a:r>
+              <a:rPr lang="en-GB" baseline="0" dirty="0" smtClean="0"/>
+              <a:t> table gives you some of the limits and governance for the different tiers.</a:t>
+            </a:r>
+          </a:p>
+          <a:p>
+            <a:pPr marL="0" indent="0">
+              <a:buFont typeface="Arial" panose="020B0604020202020204" pitchFamily="34" charset="0"/>
+              <a:buNone/>
+            </a:pPr>
+            <a:r>
+              <a:rPr lang="en-GB" baseline="0" dirty="0" smtClean="0"/>
+              <a:t>The top DTUs (or Database Transaction Unit) row is a unit of measure that represents the relative power of the database. The metric is a combination of how much CPU, memory and the number of read/writes available to the database. With the resource allocated a basic database with 5 DTUs will be able to complete 5 transaction per second when fully loaded. </a:t>
+            </a:r>
+          </a:p>
+          <a:p>
+            <a:pPr marL="0" indent="0">
+              <a:buFont typeface="Arial" panose="020B0604020202020204" pitchFamily="34" charset="0"/>
+              <a:buNone/>
+            </a:pPr>
+            <a:r>
+              <a:rPr lang="en-GB" baseline="0" dirty="0" smtClean="0"/>
+              <a:t>Each SQL server instance has 2000 DTUs and you can split that how you want. For example you could have 2 of the Premium databases at 1000 DTUs each or 400 basic databases or anything in between.</a:t>
+            </a:r>
+          </a:p>
+          <a:p>
+            <a:pPr marL="0" indent="0">
+              <a:buFont typeface="Arial" panose="020B0604020202020204" pitchFamily="34" charset="0"/>
+              <a:buNone/>
+            </a:pPr>
+            <a:endParaRPr lang="en-GB" baseline="0" dirty="0" smtClean="0"/>
+          </a:p>
+          <a:p>
+            <a:pPr marL="0" indent="0">
+              <a:buFont typeface="Arial" panose="020B0604020202020204" pitchFamily="34" charset="0"/>
+              <a:buNone/>
+            </a:pPr>
+            <a:r>
+              <a:rPr lang="en-GB" baseline="0" dirty="0" smtClean="0"/>
+              <a:t>Because the databases are allocated a set amount of resource this is how Azure can predicted the performance of the database.</a:t>
+            </a:r>
           </a:p>
         </p:txBody>
       </p:sp>
@@ -2195,7 +2224,7 @@
     </p:spTree>
     <p:extLst>
       <p:ext uri="{BB962C8B-B14F-4D97-AF65-F5344CB8AC3E}">
-        <p14:creationId xmlns:p14="http://schemas.microsoft.com/office/powerpoint/2010/main" val="3715315906"/>
+        <p14:creationId xmlns:p14="http://schemas.microsoft.com/office/powerpoint/2010/main" val="1764896833"/>
       </p:ext>
     </p:extLst>
   </p:cSld>
@@ -2251,15 +2280,37 @@
           <a:p>
             <a:r>
               <a:rPr lang="en-GB" dirty="0" smtClean="0"/>
-              <a:t>Troy Hunt has written a really good blog post about how he setup table storage for his Have I been </a:t>
-            </a:r>
-            <a:r>
-              <a:rPr lang="en-GB" dirty="0" err="1" smtClean="0"/>
-              <a:t>Pwnd</a:t>
-            </a:r>
-            <a:r>
-              <a:rPr lang="en-GB" dirty="0" smtClean="0"/>
-              <a:t> site. In it he say that he had to put a 400ms delay into his code because table storage was returning too quickly and the UX didn't feel real.</a:t>
+              <a:t>When developing you app you may choose to start out using a basic database. But</a:t>
+            </a:r>
+            <a:r>
+              <a:rPr lang="en-GB" baseline="0" dirty="0" smtClean="0"/>
+              <a:t> in production you will want to change the database tier and as your app goes viral you will want to scale your database. </a:t>
+            </a:r>
+          </a:p>
+          <a:p>
+            <a:endParaRPr lang="en-GB" baseline="0" dirty="0" smtClean="0"/>
+          </a:p>
+          <a:p>
+            <a:r>
+              <a:rPr lang="en-GB" baseline="0" dirty="0" smtClean="0"/>
+              <a:t>Elastic scale is a simple concept, you allocate the performance to a pool, and pay for the pool not the databases in use. The pool will auto scale up and down to meet demand, but wont ever exceed the pool allocation , so cost will remain constant.</a:t>
+            </a:r>
+          </a:p>
+          <a:p>
+            <a:endParaRPr lang="en-GB" baseline="0" dirty="0" smtClean="0"/>
+          </a:p>
+          <a:p>
+            <a:r>
+              <a:rPr lang="en-GB" baseline="0" dirty="0" smtClean="0"/>
+              <a:t>A simple example would be to have a pool with 1000 DTUs allocated to it and then fill it with 200 basic databases. In code you would connect to the pool and all the </a:t>
+            </a:r>
+            <a:r>
+              <a:rPr lang="en-GB" baseline="0" dirty="0" err="1" smtClean="0"/>
+              <a:t>sharding</a:t>
+            </a:r>
+            <a:r>
+              <a:rPr lang="en-GB" baseline="0" dirty="0" smtClean="0"/>
+              <a:t> would be managed for you.</a:t>
             </a:r>
             <a:endParaRPr lang="en-GB" dirty="0"/>
           </a:p>
@@ -2291,7 +2342,7 @@
     </p:spTree>
     <p:extLst>
       <p:ext uri="{BB962C8B-B14F-4D97-AF65-F5344CB8AC3E}">
-        <p14:creationId xmlns:p14="http://schemas.microsoft.com/office/powerpoint/2010/main" val="2856833730"/>
+        <p14:creationId xmlns:p14="http://schemas.microsoft.com/office/powerpoint/2010/main" val="3680660741"/>
       </p:ext>
     </p:extLst>
   </p:cSld>
@@ -2347,79 +2398,43 @@
           <a:p>
             <a:r>
               <a:rPr lang="en-GB" dirty="0" smtClean="0"/>
-              <a:t>The Azure Queues is a simple service for storing and retrieving messages. </a:t>
-            </a:r>
-          </a:p>
-          <a:p>
-            <a:r>
-              <a:rPr lang="en-GB" dirty="0" smtClean="0"/>
-              <a:t>Each message a max limit of 64KB in size but you can have as many messages as you want in as many queues as you want up to the 500GB limit. </a:t>
-            </a:r>
-          </a:p>
-          <a:p>
-            <a:endParaRPr lang="en-GB" dirty="0" smtClean="0"/>
-          </a:p>
-          <a:p>
-            <a:r>
-              <a:rPr lang="en-GB" dirty="0" smtClean="0"/>
-              <a:t>Azure does provide another queue service </a:t>
-            </a:r>
-            <a:r>
-              <a:rPr lang="en-GB" dirty="0" err="1" smtClean="0"/>
-              <a:t>ServiceBus</a:t>
-            </a:r>
-            <a:r>
-              <a:rPr lang="en-GB" dirty="0" smtClean="0"/>
-              <a:t>. This is a more advanced queue which follows the AMQP standard and has features such as sessions, topics, transactions, duplicate detection, automatic dead-lettering, and publish/subscribe capabilities. If you are interacting with external systems using the AMQP or just want to use some of these features then Service Bus might be for you. But if you are not concerned with that and you just want a simple way to communicate with the different parts of your app then Azure Queues would be the better choice.</a:t>
-            </a:r>
-          </a:p>
-          <a:p>
-            <a:r>
-              <a:rPr lang="en-GB" dirty="0" smtClean="0"/>
-              <a:t> </a:t>
-            </a:r>
-          </a:p>
-          <a:p>
-            <a:r>
-              <a:rPr lang="en-GB" dirty="0" smtClean="0"/>
-              <a:t>For more info see, https://azure.microsoft.com/en-gb/documentation/articles/service-bus-azure-and-service-bus-queues-compared-contrasted/</a:t>
-            </a:r>
-          </a:p>
-          <a:p>
-            <a:endParaRPr lang="en-GB" dirty="0" smtClean="0"/>
-          </a:p>
-          <a:p>
-            <a:r>
-              <a:rPr lang="en-GB" u="sng" dirty="0" smtClean="0"/>
-              <a:t>Why Use Queues</a:t>
-            </a:r>
-            <a:endParaRPr lang="en-GB" u="none" dirty="0" smtClean="0"/>
-          </a:p>
-          <a:p>
-            <a:endParaRPr lang="en-GB" u="none" dirty="0" smtClean="0"/>
-          </a:p>
-          <a:p>
-            <a:r>
-              <a:rPr lang="en-GB" u="none" dirty="0" smtClean="0"/>
-              <a:t>What would you use queues for? A good example is a website that allows users to upload images. But the site needs to create a thumbnail for each image. The thumbnail generation will take a long time to complete. You wouldn't want to hold the user up while that process is happening. So uploading the image to blob storage and putting the image blob </a:t>
-            </a:r>
-            <a:r>
-              <a:rPr lang="en-GB" u="none" dirty="0" err="1" smtClean="0"/>
-              <a:t>url</a:t>
-            </a:r>
-            <a:r>
-              <a:rPr lang="en-GB" u="none" dirty="0" smtClean="0"/>
-              <a:t> in a message on a queue so the image can be processed outside of the </a:t>
-            </a:r>
-            <a:r>
-              <a:rPr lang="en-GB" u="none" dirty="0" err="1" smtClean="0"/>
-              <a:t>webapp</a:t>
-            </a:r>
-            <a:r>
-              <a:rPr lang="en-GB" u="none" dirty="0" smtClean="0"/>
-              <a:t>. Doing this stops the having to wait for the image to be processed before continuing. But also return the request thread to the thread pool freeing it up to handle the next request. Which is one of the first steps to make your site scalable.</a:t>
-            </a:r>
-            <a:endParaRPr lang="en-GB" u="none" dirty="0"/>
+              <a:t>When developing you app you may choose to start out using a basic database. But</a:t>
+            </a:r>
+            <a:r>
+              <a:rPr lang="en-GB" baseline="0" dirty="0" smtClean="0"/>
+              <a:t> in production you will want to change the database tier and as your app goes viral you will want to scale your database. </a:t>
+            </a:r>
+          </a:p>
+          <a:p>
+            <a:endParaRPr lang="en-GB" baseline="0" dirty="0" smtClean="0"/>
+          </a:p>
+          <a:p>
+            <a:r>
+              <a:rPr lang="en-GB" baseline="0" dirty="0" smtClean="0"/>
+              <a:t>Elastic scale is a simple concept, you allocate the performance to a pool, and pay for the pool not the databases in use. The pool will auto scale up and down to meet demand, but wont ever exceed the pool allocation , so cost will remain constant.</a:t>
+            </a:r>
+          </a:p>
+          <a:p>
+            <a:endParaRPr lang="en-GB" baseline="0" dirty="0" smtClean="0"/>
+          </a:p>
+          <a:p>
+            <a:r>
+              <a:rPr lang="en-GB" baseline="0" dirty="0" smtClean="0"/>
+              <a:t>A simple example would be to have a pool with 1000 DTUs allocated to it and then fill it with 200 basic databases. In code you would connect to the pool and all the </a:t>
+            </a:r>
+            <a:r>
+              <a:rPr lang="en-GB" baseline="0" dirty="0" err="1" smtClean="0"/>
+              <a:t>sharding</a:t>
+            </a:r>
+            <a:r>
+              <a:rPr lang="en-GB" baseline="0" dirty="0" smtClean="0"/>
+              <a:t> would </a:t>
+            </a:r>
+            <a:r>
+              <a:rPr lang="en-GB" baseline="0" smtClean="0"/>
+              <a:t>be managed for you.</a:t>
+            </a:r>
+            <a:endParaRPr lang="en-GB" dirty="0"/>
           </a:p>
         </p:txBody>
       </p:sp>
@@ -2449,7 +2464,7 @@
     </p:spTree>
     <p:extLst>
       <p:ext uri="{BB962C8B-B14F-4D97-AF65-F5344CB8AC3E}">
-        <p14:creationId xmlns:p14="http://schemas.microsoft.com/office/powerpoint/2010/main" val="1799822381"/>
+        <p14:creationId xmlns:p14="http://schemas.microsoft.com/office/powerpoint/2010/main" val="590031180"/>
       </p:ext>
     </p:extLst>
   </p:cSld>
@@ -2504,57 +2519,98 @@
           <a:lstStyle/>
           <a:p>
             <a:r>
-              <a:rPr lang="en-GB" u="sng" dirty="0" smtClean="0"/>
-              <a:t>Web Roles</a:t>
+              <a:rPr lang="en-GB" dirty="0" smtClean="0"/>
+              <a:t>Azure </a:t>
+            </a:r>
+            <a:r>
+              <a:rPr lang="en-GB" dirty="0" err="1" smtClean="0"/>
+              <a:t>DocumentDB</a:t>
+            </a:r>
+            <a:r>
+              <a:rPr lang="en-GB" dirty="0" smtClean="0"/>
+              <a:t> is </a:t>
+            </a:r>
+            <a:r>
+              <a:rPr lang="en-GB" dirty="0" smtClean="0"/>
+              <a:t>Azures offering in the document database</a:t>
+            </a:r>
+            <a:r>
+              <a:rPr lang="en-GB" baseline="0" dirty="0" smtClean="0"/>
+              <a:t> family</a:t>
+            </a:r>
+            <a:r>
+              <a:rPr lang="en-GB" dirty="0" smtClean="0"/>
+              <a:t>.</a:t>
             </a:r>
           </a:p>
           <a:p>
             <a:endParaRPr lang="en-GB" dirty="0" smtClean="0"/>
           </a:p>
           <a:p>
-            <a:pPr marL="171450" indent="-171450">
-              <a:buFont typeface="Arial" panose="020B0604020202020204" pitchFamily="34" charset="0"/>
-              <a:buChar char="•"/>
-            </a:pPr>
             <a:r>
               <a:rPr lang="en-GB" dirty="0" smtClean="0"/>
-              <a:t>Run on top of IIS, so you can host </a:t>
-            </a:r>
+              <a:t>A document databases</a:t>
+            </a:r>
+            <a:r>
+              <a:rPr lang="en-GB" baseline="0" dirty="0" smtClean="0"/>
+              <a:t> document is a collection of named fields and values. Where the values can be standard data types or complex objects and arrays. The documents can be encoded in a variety of ways, including BSON, JSON, XML and YAML.</a:t>
+            </a:r>
+          </a:p>
+          <a:p>
+            <a:endParaRPr lang="en-GB" baseline="0" dirty="0" smtClean="0"/>
+          </a:p>
+          <a:p>
             <a:r>
               <a:rPr lang="en-GB" dirty="0" err="1" smtClean="0"/>
-              <a:t>ASP.Net</a:t>
+              <a:t>DocumentDB</a:t>
             </a:r>
             <a:r>
               <a:rPr lang="en-GB" dirty="0" smtClean="0"/>
-              <a:t> Websites and Web APIs, WCF Services or any other technology that can be ran on IIS.</a:t>
-            </a:r>
-          </a:p>
-          <a:p>
-            <a:pPr marL="171450" indent="-171450">
-              <a:buFont typeface="Arial" panose="020B0604020202020204" pitchFamily="34" charset="0"/>
-              <a:buChar char="•"/>
-            </a:pPr>
+              <a:t> </a:t>
+            </a:r>
             <a:r>
               <a:rPr lang="en-GB" dirty="0" smtClean="0"/>
-              <a:t>You can have multiple application endpoints in one Web Role instance. For example, you could expose your app via a HTML interface, a REST API or a WCF service.</a:t>
-            </a:r>
-          </a:p>
-          <a:p>
-            <a:pPr marL="171450" indent="-171450">
-              <a:buFont typeface="Arial" panose="020B0604020202020204" pitchFamily="34" charset="0"/>
-              <a:buChar char="•"/>
-            </a:pPr>
+              <a:t>is a fully managed </a:t>
+            </a:r>
             <a:r>
               <a:rPr lang="en-GB" dirty="0" smtClean="0"/>
-              <a:t>The Azure Cloud Service calls the </a:t>
+              <a:t>JSON document </a:t>
+            </a:r>
+            <a:r>
+              <a:rPr lang="en-GB" dirty="0" smtClean="0"/>
+              <a:t>database as a service and designed to keep pace with modern rapidly evolving applications. </a:t>
             </a:r>
             <a:r>
               <a:rPr lang="en-GB" dirty="0" err="1" smtClean="0"/>
-              <a:t>OnStart</a:t>
+              <a:t>DocumentDB</a:t>
             </a:r>
             <a:r>
               <a:rPr lang="en-GB" dirty="0" smtClean="0"/>
-              <a:t> event before the it starts the main web application. This means you can get the app into a ready state, like prepopulating a cache or creating tables or queues.</a:t>
+              <a:t> </a:t>
+            </a:r>
+            <a:r>
+              <a:rPr lang="en-GB" dirty="0" smtClean="0"/>
+              <a:t>executes </a:t>
+            </a:r>
+            <a:r>
+              <a:rPr lang="en-GB" dirty="0" err="1" smtClean="0"/>
+              <a:t>Javascript</a:t>
+            </a:r>
+            <a:r>
+              <a:rPr lang="en-GB" dirty="0" smtClean="0"/>
+              <a:t> within it database engine. Meaning you can write and execute stored procedures and user defined functions directly on the </a:t>
+            </a:r>
+            <a:r>
+              <a:rPr lang="en-GB" dirty="0" smtClean="0"/>
+              <a:t>database written in </a:t>
+            </a:r>
+            <a:r>
+              <a:rPr lang="en-GB" dirty="0" err="1" smtClean="0"/>
+              <a:t>Javascript</a:t>
+            </a:r>
+            <a:r>
+              <a:rPr lang="en-GB" dirty="0" smtClean="0"/>
+              <a:t>. </a:t>
             </a:r>
           </a:p>
           <a:p>
@@ -2562,53 +2618,24 @@
           </a:p>
           <a:p>
             <a:r>
-              <a:rPr lang="en-GB" u="sng" dirty="0" smtClean="0"/>
-              <a:t>Worker Roles</a:t>
-            </a:r>
-          </a:p>
-          <a:p>
-            <a:endParaRPr lang="en-GB" dirty="0" smtClean="0"/>
-          </a:p>
-          <a:p>
-            <a:pPr marL="171450" indent="-171450">
-              <a:buFont typeface="Arial" panose="020B0604020202020204" pitchFamily="34" charset="0"/>
-              <a:buChar char="•"/>
-            </a:pPr>
-            <a:r>
               <a:rPr lang="en-GB" dirty="0" err="1" smtClean="0"/>
-              <a:t>WorkerRoles</a:t>
+              <a:t>DocumentDB</a:t>
             </a:r>
             <a:r>
               <a:rPr lang="en-GB" dirty="0" smtClean="0"/>
-              <a:t> don't run on IIS. They can be considered as Windows services that execute background tasks but in the cloud.</a:t>
-            </a:r>
-          </a:p>
-          <a:p>
-            <a:pPr marL="171450" indent="-171450">
-              <a:buFont typeface="Arial" panose="020B0604020202020204" pitchFamily="34" charset="0"/>
-              <a:buChar char="•"/>
-            </a:pPr>
+              <a:t> </a:t>
+            </a:r>
             <a:r>
               <a:rPr lang="en-GB" dirty="0" smtClean="0"/>
-              <a:t>Worker Roles are hosted in their own VMs. So any heavy lifting the Worker Roles does wont impact on the performance of other recourses. Unlike </a:t>
+              <a:t>automatically indexes all JSON documents, then allows you to query them with the familiar SQL syntax. A well as JavaScript Azure also provide SDKs in </a:t>
             </a:r>
             <a:r>
               <a:rPr lang="en-GB" dirty="0" err="1" smtClean="0"/>
-              <a:t>WebJobs</a:t>
+              <a:t>.Net</a:t>
             </a:r>
             <a:r>
               <a:rPr lang="en-GB" dirty="0" smtClean="0"/>
-              <a:t> but I will come on to that later.</a:t>
-            </a:r>
-          </a:p>
-          <a:p>
-            <a:pPr marL="171450" indent="-171450">
-              <a:buFont typeface="Arial" panose="020B0604020202020204" pitchFamily="34" charset="0"/>
-              <a:buChar char="•"/>
-            </a:pPr>
-            <a:r>
-              <a:rPr lang="en-GB" dirty="0" smtClean="0"/>
-              <a:t>The Web / Worker Role pattern is a common architectural design pattern within the Azure Cloud Services, common scenarios for this pattern is to have the Web Role handle any HTTP requests coming in to the app. Then for the Web Role to pass any intensive work off to the Worker Role usually via a queue.</a:t>
+              <a:t>, Java, Python and more, so you up and running quickly with the tools and languages you are already familiar with.</a:t>
             </a:r>
             <a:endParaRPr lang="en-GB" dirty="0"/>
           </a:p>
@@ -2640,7 +2667,7 @@
     </p:spTree>
     <p:extLst>
       <p:ext uri="{BB962C8B-B14F-4D97-AF65-F5344CB8AC3E}">
-        <p14:creationId xmlns:p14="http://schemas.microsoft.com/office/powerpoint/2010/main" val="2015399243"/>
+        <p14:creationId xmlns:p14="http://schemas.microsoft.com/office/powerpoint/2010/main" val="2846866398"/>
       </p:ext>
     </p:extLst>
   </p:cSld>
@@ -2867,125 +2894,25 @@
           <a:p>
             <a:r>
               <a:rPr lang="en-GB" dirty="0" smtClean="0"/>
-              <a:t>I have told you that any heavy lifting or any background task should be done with a worker role rather than you app and that still holds true. But let me introduce you to the worker roles little brother the </a:t>
+              <a:t>Within the Azure portal I provisioned a new </a:t>
             </a:r>
             <a:r>
               <a:rPr lang="en-GB" dirty="0" err="1" smtClean="0"/>
-              <a:t>WebJob</a:t>
+              <a:t>DocumentDB</a:t>
             </a:r>
             <a:r>
               <a:rPr lang="en-GB" dirty="0" smtClean="0"/>
-              <a:t>. </a:t>
-            </a:r>
-          </a:p>
-          <a:p>
-            <a:r>
-              <a:rPr lang="en-GB" dirty="0" err="1" smtClean="0"/>
-              <a:t>WebJobs</a:t>
-            </a:r>
-            <a:r>
-              <a:rPr lang="en-GB" dirty="0" smtClean="0"/>
-              <a:t> allow you to run programs or scripts in your </a:t>
-            </a:r>
-            <a:r>
-              <a:rPr lang="en-GB" dirty="0" err="1" smtClean="0"/>
-              <a:t>WebApp</a:t>
-            </a:r>
-            <a:r>
-              <a:rPr lang="en-GB" dirty="0" smtClean="0"/>
-              <a:t> service. You can run a </a:t>
-            </a:r>
-            <a:r>
-              <a:rPr lang="en-GB" dirty="0" err="1" smtClean="0"/>
-              <a:t>WebJob</a:t>
-            </a:r>
-            <a:r>
-              <a:rPr lang="en-GB" dirty="0" smtClean="0"/>
-              <a:t> either on demand or continuously. </a:t>
-            </a:r>
-          </a:p>
-          <a:p>
-            <a:r>
-              <a:rPr lang="en-GB" dirty="0" smtClean="0"/>
-              <a:t>		</a:t>
-            </a:r>
-          </a:p>
-          <a:p>
-            <a:r>
-              <a:rPr lang="en-GB" dirty="0" err="1" smtClean="0"/>
-              <a:t>WebJobs</a:t>
-            </a:r>
-            <a:r>
-              <a:rPr lang="en-GB" dirty="0" smtClean="0"/>
-              <a:t> run along side you </a:t>
-            </a:r>
-            <a:r>
-              <a:rPr lang="en-GB" dirty="0" err="1" smtClean="0"/>
-              <a:t>WebApp</a:t>
-            </a:r>
-            <a:r>
-              <a:rPr lang="en-GB" dirty="0" smtClean="0"/>
-              <a:t> and uses the same resources, hence why I say its the worker roles little brother as you will still want to do any intensive work with a worker role because they wont effect the performance of the web app.</a:t>
-            </a:r>
-          </a:p>
-          <a:p>
-            <a:r>
-              <a:rPr lang="en-GB" dirty="0" smtClean="0"/>
-              <a:t>		</a:t>
-            </a:r>
-          </a:p>
-          <a:p>
-            <a:r>
-              <a:rPr lang="en-GB" dirty="0" err="1" smtClean="0"/>
-              <a:t>Webjobs</a:t>
-            </a:r>
-            <a:r>
-              <a:rPr lang="en-GB" dirty="0" smtClean="0"/>
-              <a:t> can be as simple as </a:t>
-            </a:r>
-            <a:r>
-              <a:rPr lang="en-GB" dirty="0" err="1" smtClean="0"/>
-              <a:t>Console.Writeline</a:t>
-            </a:r>
-            <a:r>
-              <a:rPr lang="en-GB" dirty="0" smtClean="0"/>
-              <a:t>("Hello world") or you can use the Azure </a:t>
-            </a:r>
-            <a:r>
-              <a:rPr lang="en-GB" dirty="0" err="1" smtClean="0"/>
-              <a:t>WebJobs</a:t>
-            </a:r>
-            <a:r>
-              <a:rPr lang="en-GB" dirty="0" smtClean="0"/>
-              <a:t> SDK to pull in cool features such as triggering a job when a file is uploaded to a blob storage container or when a message is put on a queue.</a:t>
-            </a:r>
-          </a:p>
-          <a:p>
-            <a:r>
-              <a:rPr lang="en-GB" dirty="0" smtClean="0"/>
-              <a:t>		</a:t>
-            </a:r>
-          </a:p>
-          <a:p>
-            <a:r>
-              <a:rPr lang="en-GB" dirty="0" smtClean="0"/>
-              <a:t>So if the Web and Worker role architecture is too much for your small </a:t>
-            </a:r>
-            <a:r>
-              <a:rPr lang="en-GB" dirty="0" err="1" smtClean="0"/>
-              <a:t>WebApp</a:t>
-            </a:r>
-            <a:r>
-              <a:rPr lang="en-GB" dirty="0" smtClean="0"/>
-              <a:t> then </a:t>
-            </a:r>
-            <a:r>
-              <a:rPr lang="en-GB" dirty="0" err="1" smtClean="0"/>
-              <a:t>WebJobs</a:t>
-            </a:r>
-            <a:r>
-              <a:rPr lang="en-GB" dirty="0" smtClean="0"/>
-              <a:t> is one of the many services available and waiting for you on Azure.</a:t>
+              <a:t> instance.</a:t>
+            </a:r>
+            <a:r>
+              <a:rPr lang="en-GB" baseline="0" dirty="0" smtClean="0"/>
+              <a:t> </a:t>
+            </a:r>
+          </a:p>
+          <a:p>
+            <a:r>
+              <a:rPr lang="en-GB" baseline="0" dirty="0" smtClean="0"/>
+              <a:t>Created a Contacts table and filled it with some demo data.</a:t>
             </a:r>
             <a:endParaRPr lang="en-GB" dirty="0"/>
           </a:p>
@@ -3017,7 +2944,7 @@
     </p:spTree>
     <p:extLst>
       <p:ext uri="{BB962C8B-B14F-4D97-AF65-F5344CB8AC3E}">
-        <p14:creationId xmlns:p14="http://schemas.microsoft.com/office/powerpoint/2010/main" val="739052694"/>
+        <p14:creationId xmlns:p14="http://schemas.microsoft.com/office/powerpoint/2010/main" val="2169096221"/>
       </p:ext>
     </p:extLst>
   </p:cSld>
@@ -3071,70 +2998,7 @@
           <a:bodyPr/>
           <a:lstStyle/>
           <a:p>
-            <a:r>
-              <a:rPr lang="en-GB" dirty="0" smtClean="0"/>
-              <a:t>Blob is an acronym for Binary Large </a:t>
-            </a:r>
-            <a:r>
-              <a:rPr lang="en-GB" dirty="0" err="1" smtClean="0"/>
-              <a:t>OBject</a:t>
-            </a:r>
-            <a:r>
-              <a:rPr lang="en-GB" dirty="0" smtClean="0"/>
-              <a:t>, which are files. </a:t>
-            </a:r>
-          </a:p>
-          <a:p>
             <a:endParaRPr lang="en-GB" dirty="0" smtClean="0"/>
-          </a:p>
-          <a:p>
-            <a:r>
-              <a:rPr lang="en-GB" dirty="0" smtClean="0"/>
-              <a:t>They can be anything from images to database backups. Due to the nature of the cloud you don't know which server your request has been sent to. So you should avoid saving files to the servers file system. </a:t>
-            </a:r>
-          </a:p>
-          <a:p>
-            <a:endParaRPr lang="en-GB" dirty="0" smtClean="0"/>
-          </a:p>
-          <a:p>
-            <a:r>
-              <a:rPr lang="en-GB" dirty="0" smtClean="0"/>
-              <a:t>Blob storage gives you the ability to store and access files from anywhere in the world. You can interact with blob storage via its REST API or via any of the client libraries provided. You can also give read only access by sharing a URL to the blob.</a:t>
-            </a:r>
-          </a:p>
-          <a:p>
-            <a:r>
-              <a:rPr lang="en-GB" dirty="0" smtClean="0"/>
-              <a:t>		</a:t>
-            </a:r>
-          </a:p>
-          <a:p>
-            <a:r>
-              <a:rPr lang="en-GB" dirty="0" smtClean="0"/>
-              <a:t>You will need a storage account before you can access blob storage. Once you have one then you can start adding containers. Containers can be thought of like folders on you file system. A storage account can have an unlimited number of containers and a container can have an unlimited number of files, up to the storage account limit of 500TB.</a:t>
-            </a:r>
-          </a:p>
-          <a:p>
-            <a:r>
-              <a:rPr lang="en-GB" dirty="0" smtClean="0"/>
-              <a:t>		</a:t>
-            </a:r>
-          </a:p>
-          <a:p>
-            <a:r>
-              <a:rPr lang="en-GB" dirty="0" smtClean="0"/>
-              <a:t>Blob storage only allows for a single level of containers, therefore you cannot have containers within containers. But blob storage does try to simulate a hierarchical file system by pre-pending what would be folder names and slashes to beginning of the file name. </a:t>
-            </a:r>
-          </a:p>
-          <a:p>
-            <a:endParaRPr lang="en-GB" dirty="0" smtClean="0"/>
-          </a:p>
-          <a:p>
-            <a:r>
-              <a:rPr lang="en-GB" dirty="0" smtClean="0"/>
-              <a:t>In the following examples, "cars" is the container name and everything after is the blob name. Depending on the blob storage viewer you use you will see a folder structure or just a list of blobs in the container.</a:t>
-            </a:r>
-            <a:endParaRPr lang="en-GB" dirty="0"/>
           </a:p>
         </p:txBody>
       </p:sp>
@@ -3156,6 +3020,943 @@
             <a:fld id="{F9DCBFB8-3C0D-4265-9EBB-AF74934A7B39}" type="slidenum">
               <a:rPr lang="en-GB" smtClean="0"/>
               <a:t>21</a:t>
+            </a:fld>
+            <a:endParaRPr lang="en-GB"/>
+          </a:p>
+        </p:txBody>
+      </p:sp>
+    </p:spTree>
+    <p:extLst>
+      <p:ext uri="{BB962C8B-B14F-4D97-AF65-F5344CB8AC3E}">
+        <p14:creationId xmlns:p14="http://schemas.microsoft.com/office/powerpoint/2010/main" val="248086816"/>
+      </p:ext>
+    </p:extLst>
+  </p:cSld>
+  <p:clrMapOvr>
+    <a:masterClrMapping/>
+  </p:clrMapOvr>
+</p:notes>
+</file>
+
+<file path=ppt/notesSlides/notesSlide22.xml><?xml version="1.0" encoding="utf-8"?>
+<p:notes xmlns:a="http://schemas.openxmlformats.org/drawingml/2006/main" xmlns:r="http://schemas.openxmlformats.org/officeDocument/2006/relationships" xmlns:p="http://schemas.openxmlformats.org/presentationml/2006/main">
+  <p:cSld>
+    <p:spTree>
+      <p:nvGrpSpPr>
+        <p:cNvPr id="1" name=""/>
+        <p:cNvGrpSpPr/>
+        <p:nvPr/>
+      </p:nvGrpSpPr>
+      <p:grpSpPr>
+        <a:xfrm>
+          <a:off x="0" y="0"/>
+          <a:ext cx="0" cy="0"/>
+          <a:chOff x="0" y="0"/>
+          <a:chExt cx="0" cy="0"/>
+        </a:xfrm>
+      </p:grpSpPr>
+      <p:sp>
+        <p:nvSpPr>
+          <p:cNvPr id="2" name="Slide Image Placeholder 1"/>
+          <p:cNvSpPr>
+            <a:spLocks noGrp="1" noRot="1" noChangeAspect="1"/>
+          </p:cNvSpPr>
+          <p:nvPr>
+            <p:ph type="sldImg"/>
+          </p:nvPr>
+        </p:nvSpPr>
+        <p:spPr/>
+      </p:sp>
+      <p:sp>
+        <p:nvSpPr>
+          <p:cNvPr id="3" name="Notes Placeholder 2"/>
+          <p:cNvSpPr>
+            <a:spLocks noGrp="1"/>
+          </p:cNvSpPr>
+          <p:nvPr>
+            <p:ph type="body" idx="1"/>
+          </p:nvPr>
+        </p:nvSpPr>
+        <p:spPr/>
+        <p:txBody>
+          <a:bodyPr/>
+          <a:lstStyle/>
+          <a:p>
+            <a:r>
+              <a:rPr lang="en-GB" dirty="0" smtClean="0"/>
+              <a:t>Table storage is a schema-less NoSQL data store, that is scalable, redundant and fast. </a:t>
+            </a:r>
+          </a:p>
+          <a:p>
+            <a:endParaRPr lang="en-GB" dirty="0" smtClean="0"/>
+          </a:p>
+          <a:p>
+            <a:r>
+              <a:rPr lang="en-GB" dirty="0" smtClean="0"/>
+              <a:t>It is fast because every table has a clustered index which should be used to query the data. </a:t>
+            </a:r>
+          </a:p>
+          <a:p>
+            <a:r>
+              <a:rPr lang="en-GB" dirty="0" smtClean="0"/>
+              <a:t>The index consists of a Partition Key and a Row Key and together they make a unique ID. The Partition Key is used to shard the data between different nodes in the storage cluster, records with the same partition key are stored on the same node and the row key is used for uniqueness within the partition. The tables also have timestamp column which updates when the record is updated. The timestamp column is also used as an E-Tag to maintain data integrity. </a:t>
+            </a:r>
+          </a:p>
+          <a:p>
+            <a:r>
+              <a:rPr lang="en-GB" dirty="0" smtClean="0"/>
+              <a:t>		</a:t>
+            </a:r>
+          </a:p>
+          <a:p>
+            <a:r>
+              <a:rPr lang="en-GB" dirty="0" smtClean="0"/>
+              <a:t>As well as the 3 system properties each table entity can have up to 252 additional properties which are key / values. Because table storage is scheme less not every record needs all the properties. </a:t>
+            </a:r>
+          </a:p>
+          <a:p>
+            <a:endParaRPr lang="en-GB" dirty="0" smtClean="0"/>
+          </a:p>
+          <a:p>
+            <a:r>
+              <a:rPr lang="en-GB" dirty="0" smtClean="0"/>
+              <a:t>In this example table storage is being used as a log. The first record is only logging the fact a clean up job had completed. The second has logged an exception, with a stack trace for someone to review later.</a:t>
+            </a:r>
+          </a:p>
+          <a:p>
+            <a:endParaRPr lang="en-GB" dirty="0" smtClean="0"/>
+          </a:p>
+          <a:p>
+            <a:r>
+              <a:rPr lang="en-GB" dirty="0" smtClean="0"/>
+              <a:t>When designing your tables your really need to think about how to partition your data to get the maximum performance benefits.</a:t>
+            </a:r>
+          </a:p>
+          <a:p>
+            <a:r>
+              <a:rPr lang="en-GB" dirty="0" smtClean="0"/>
+              <a:t>In this example I have a collection of users indexed by email. The domain part and the local part of the email address has been used as the partition and row keys. When I search for a user by email I will split the email on the @ symbol and only search for the user within the relevant partition. Because you are querying on a subset of the data this is lighting quick.</a:t>
+            </a:r>
+            <a:endParaRPr lang="en-GB" dirty="0"/>
+          </a:p>
+        </p:txBody>
+      </p:sp>
+      <p:sp>
+        <p:nvSpPr>
+          <p:cNvPr id="4" name="Slide Number Placeholder 3"/>
+          <p:cNvSpPr>
+            <a:spLocks noGrp="1"/>
+          </p:cNvSpPr>
+          <p:nvPr>
+            <p:ph type="sldNum" sz="quarter" idx="10"/>
+          </p:nvPr>
+        </p:nvSpPr>
+        <p:spPr/>
+        <p:txBody>
+          <a:bodyPr/>
+          <a:lstStyle/>
+          <a:p>
+            <a:fld id="{F9DCBFB8-3C0D-4265-9EBB-AF74934A7B39}" type="slidenum">
+              <a:rPr lang="en-GB" smtClean="0"/>
+              <a:t>22</a:t>
+            </a:fld>
+            <a:endParaRPr lang="en-GB"/>
+          </a:p>
+        </p:txBody>
+      </p:sp>
+    </p:spTree>
+    <p:extLst>
+      <p:ext uri="{BB962C8B-B14F-4D97-AF65-F5344CB8AC3E}">
+        <p14:creationId xmlns:p14="http://schemas.microsoft.com/office/powerpoint/2010/main" val="3715315906"/>
+      </p:ext>
+    </p:extLst>
+  </p:cSld>
+  <p:clrMapOvr>
+    <a:masterClrMapping/>
+  </p:clrMapOvr>
+</p:notes>
+</file>
+
+<file path=ppt/notesSlides/notesSlide23.xml><?xml version="1.0" encoding="utf-8"?>
+<p:notes xmlns:a="http://schemas.openxmlformats.org/drawingml/2006/main" xmlns:r="http://schemas.openxmlformats.org/officeDocument/2006/relationships" xmlns:p="http://schemas.openxmlformats.org/presentationml/2006/main">
+  <p:cSld>
+    <p:spTree>
+      <p:nvGrpSpPr>
+        <p:cNvPr id="1" name=""/>
+        <p:cNvGrpSpPr/>
+        <p:nvPr/>
+      </p:nvGrpSpPr>
+      <p:grpSpPr>
+        <a:xfrm>
+          <a:off x="0" y="0"/>
+          <a:ext cx="0" cy="0"/>
+          <a:chOff x="0" y="0"/>
+          <a:chExt cx="0" cy="0"/>
+        </a:xfrm>
+      </p:grpSpPr>
+      <p:sp>
+        <p:nvSpPr>
+          <p:cNvPr id="2" name="Slide Image Placeholder 1"/>
+          <p:cNvSpPr>
+            <a:spLocks noGrp="1" noRot="1" noChangeAspect="1"/>
+          </p:cNvSpPr>
+          <p:nvPr>
+            <p:ph type="sldImg"/>
+          </p:nvPr>
+        </p:nvSpPr>
+        <p:spPr/>
+      </p:sp>
+      <p:sp>
+        <p:nvSpPr>
+          <p:cNvPr id="3" name="Notes Placeholder 2"/>
+          <p:cNvSpPr>
+            <a:spLocks noGrp="1"/>
+          </p:cNvSpPr>
+          <p:nvPr>
+            <p:ph type="body" idx="1"/>
+          </p:nvPr>
+        </p:nvSpPr>
+        <p:spPr/>
+        <p:txBody>
+          <a:bodyPr/>
+          <a:lstStyle/>
+          <a:p>
+            <a:r>
+              <a:rPr lang="en-GB" dirty="0" smtClean="0"/>
+              <a:t>Troy Hunt has written a really good blog post about how he setup table storage for his Have I been </a:t>
+            </a:r>
+            <a:r>
+              <a:rPr lang="en-GB" dirty="0" err="1" smtClean="0"/>
+              <a:t>Pwnd</a:t>
+            </a:r>
+            <a:r>
+              <a:rPr lang="en-GB" dirty="0" smtClean="0"/>
+              <a:t> site. In it he say that he had to put a 400ms delay into his code because table storage was returning too quickly and the UX didn't feel real.</a:t>
+            </a:r>
+            <a:endParaRPr lang="en-GB" dirty="0"/>
+          </a:p>
+        </p:txBody>
+      </p:sp>
+      <p:sp>
+        <p:nvSpPr>
+          <p:cNvPr id="4" name="Slide Number Placeholder 3"/>
+          <p:cNvSpPr>
+            <a:spLocks noGrp="1"/>
+          </p:cNvSpPr>
+          <p:nvPr>
+            <p:ph type="sldNum" sz="quarter" idx="10"/>
+          </p:nvPr>
+        </p:nvSpPr>
+        <p:spPr/>
+        <p:txBody>
+          <a:bodyPr/>
+          <a:lstStyle/>
+          <a:p>
+            <a:fld id="{F9DCBFB8-3C0D-4265-9EBB-AF74934A7B39}" type="slidenum">
+              <a:rPr lang="en-GB" smtClean="0"/>
+              <a:t>23</a:t>
+            </a:fld>
+            <a:endParaRPr lang="en-GB"/>
+          </a:p>
+        </p:txBody>
+      </p:sp>
+    </p:spTree>
+    <p:extLst>
+      <p:ext uri="{BB962C8B-B14F-4D97-AF65-F5344CB8AC3E}">
+        <p14:creationId xmlns:p14="http://schemas.microsoft.com/office/powerpoint/2010/main" val="2856833730"/>
+      </p:ext>
+    </p:extLst>
+  </p:cSld>
+  <p:clrMapOvr>
+    <a:masterClrMapping/>
+  </p:clrMapOvr>
+</p:notes>
+</file>
+
+<file path=ppt/notesSlides/notesSlide24.xml><?xml version="1.0" encoding="utf-8"?>
+<p:notes xmlns:a="http://schemas.openxmlformats.org/drawingml/2006/main" xmlns:r="http://schemas.openxmlformats.org/officeDocument/2006/relationships" xmlns:p="http://schemas.openxmlformats.org/presentationml/2006/main">
+  <p:cSld>
+    <p:spTree>
+      <p:nvGrpSpPr>
+        <p:cNvPr id="1" name=""/>
+        <p:cNvGrpSpPr/>
+        <p:nvPr/>
+      </p:nvGrpSpPr>
+      <p:grpSpPr>
+        <a:xfrm>
+          <a:off x="0" y="0"/>
+          <a:ext cx="0" cy="0"/>
+          <a:chOff x="0" y="0"/>
+          <a:chExt cx="0" cy="0"/>
+        </a:xfrm>
+      </p:grpSpPr>
+      <p:sp>
+        <p:nvSpPr>
+          <p:cNvPr id="2" name="Slide Image Placeholder 1"/>
+          <p:cNvSpPr>
+            <a:spLocks noGrp="1" noRot="1" noChangeAspect="1"/>
+          </p:cNvSpPr>
+          <p:nvPr>
+            <p:ph type="sldImg"/>
+          </p:nvPr>
+        </p:nvSpPr>
+        <p:spPr/>
+      </p:sp>
+      <p:sp>
+        <p:nvSpPr>
+          <p:cNvPr id="3" name="Notes Placeholder 2"/>
+          <p:cNvSpPr>
+            <a:spLocks noGrp="1"/>
+          </p:cNvSpPr>
+          <p:nvPr>
+            <p:ph type="body" idx="1"/>
+          </p:nvPr>
+        </p:nvSpPr>
+        <p:spPr/>
+        <p:txBody>
+          <a:bodyPr/>
+          <a:lstStyle/>
+          <a:p>
+            <a:r>
+              <a:rPr lang="en-GB" dirty="0" smtClean="0"/>
+              <a:t>The Azure Queues is a simple service for storing and retrieving messages. </a:t>
+            </a:r>
+          </a:p>
+          <a:p>
+            <a:r>
+              <a:rPr lang="en-GB" dirty="0" smtClean="0"/>
+              <a:t>Each message a max limit of 64KB in size but you can have as many messages as you want in as many queues as you want up to the 500GB limit. </a:t>
+            </a:r>
+          </a:p>
+          <a:p>
+            <a:endParaRPr lang="en-GB" dirty="0" smtClean="0"/>
+          </a:p>
+          <a:p>
+            <a:r>
+              <a:rPr lang="en-GB" dirty="0" smtClean="0"/>
+              <a:t>Azure does provide another queue service </a:t>
+            </a:r>
+            <a:r>
+              <a:rPr lang="en-GB" dirty="0" err="1" smtClean="0"/>
+              <a:t>ServiceBus</a:t>
+            </a:r>
+            <a:r>
+              <a:rPr lang="en-GB" dirty="0" smtClean="0"/>
+              <a:t>. This is a more advanced queue which follows the AMQP standard and has features such as sessions, topics, transactions, duplicate detection, automatic dead-lettering, and publish/subscribe capabilities. If you are interacting with external systems using the AMQP or just want to use some of these features then Service Bus might be for you. But if you are not concerned with that and you just want a simple way to communicate with the different parts of your app then Azure Queues would be the better choice.</a:t>
+            </a:r>
+          </a:p>
+          <a:p>
+            <a:r>
+              <a:rPr lang="en-GB" dirty="0" smtClean="0"/>
+              <a:t> </a:t>
+            </a:r>
+          </a:p>
+          <a:p>
+            <a:r>
+              <a:rPr lang="en-GB" dirty="0" smtClean="0"/>
+              <a:t>For more info see, https://azure.microsoft.com/en-gb/documentation/articles/service-bus-azure-and-service-bus-queues-compared-contrasted/</a:t>
+            </a:r>
+          </a:p>
+          <a:p>
+            <a:endParaRPr lang="en-GB" dirty="0" smtClean="0"/>
+          </a:p>
+          <a:p>
+            <a:r>
+              <a:rPr lang="en-GB" u="sng" dirty="0" smtClean="0"/>
+              <a:t>Why Use Queues</a:t>
+            </a:r>
+            <a:endParaRPr lang="en-GB" u="none" dirty="0" smtClean="0"/>
+          </a:p>
+          <a:p>
+            <a:endParaRPr lang="en-GB" u="none" dirty="0" smtClean="0"/>
+          </a:p>
+          <a:p>
+            <a:r>
+              <a:rPr lang="en-GB" u="none" dirty="0" smtClean="0"/>
+              <a:t>What would you use queues for? A good example is a website that allows users to upload images. But the site needs to create a thumbnail for each image. The thumbnail generation will take a long time to complete. You wouldn't want to hold the user up while that process is happening. So uploading the image to blob storage and putting the image blob </a:t>
+            </a:r>
+            <a:r>
+              <a:rPr lang="en-GB" u="none" dirty="0" err="1" smtClean="0"/>
+              <a:t>url</a:t>
+            </a:r>
+            <a:r>
+              <a:rPr lang="en-GB" u="none" dirty="0" smtClean="0"/>
+              <a:t> in a message on a queue so the image can be processed outside of the </a:t>
+            </a:r>
+            <a:r>
+              <a:rPr lang="en-GB" u="none" dirty="0" err="1" smtClean="0"/>
+              <a:t>webapp</a:t>
+            </a:r>
+            <a:r>
+              <a:rPr lang="en-GB" u="none" dirty="0" smtClean="0"/>
+              <a:t>. Doing this stops the having to wait for the image to be processed before continuing. But also return the request thread to the thread pool freeing it up to handle the next request. Which is one of the first steps to make your site scalable.</a:t>
+            </a:r>
+            <a:endParaRPr lang="en-GB" u="none" dirty="0"/>
+          </a:p>
+        </p:txBody>
+      </p:sp>
+      <p:sp>
+        <p:nvSpPr>
+          <p:cNvPr id="4" name="Slide Number Placeholder 3"/>
+          <p:cNvSpPr>
+            <a:spLocks noGrp="1"/>
+          </p:cNvSpPr>
+          <p:nvPr>
+            <p:ph type="sldNum" sz="quarter" idx="10"/>
+          </p:nvPr>
+        </p:nvSpPr>
+        <p:spPr/>
+        <p:txBody>
+          <a:bodyPr/>
+          <a:lstStyle/>
+          <a:p>
+            <a:fld id="{F9DCBFB8-3C0D-4265-9EBB-AF74934A7B39}" type="slidenum">
+              <a:rPr lang="en-GB" smtClean="0"/>
+              <a:t>24</a:t>
+            </a:fld>
+            <a:endParaRPr lang="en-GB"/>
+          </a:p>
+        </p:txBody>
+      </p:sp>
+    </p:spTree>
+    <p:extLst>
+      <p:ext uri="{BB962C8B-B14F-4D97-AF65-F5344CB8AC3E}">
+        <p14:creationId xmlns:p14="http://schemas.microsoft.com/office/powerpoint/2010/main" val="1799822381"/>
+      </p:ext>
+    </p:extLst>
+  </p:cSld>
+  <p:clrMapOvr>
+    <a:masterClrMapping/>
+  </p:clrMapOvr>
+</p:notes>
+</file>
+
+<file path=ppt/notesSlides/notesSlide25.xml><?xml version="1.0" encoding="utf-8"?>
+<p:notes xmlns:a="http://schemas.openxmlformats.org/drawingml/2006/main" xmlns:r="http://schemas.openxmlformats.org/officeDocument/2006/relationships" xmlns:p="http://schemas.openxmlformats.org/presentationml/2006/main">
+  <p:cSld>
+    <p:spTree>
+      <p:nvGrpSpPr>
+        <p:cNvPr id="1" name=""/>
+        <p:cNvGrpSpPr/>
+        <p:nvPr/>
+      </p:nvGrpSpPr>
+      <p:grpSpPr>
+        <a:xfrm>
+          <a:off x="0" y="0"/>
+          <a:ext cx="0" cy="0"/>
+          <a:chOff x="0" y="0"/>
+          <a:chExt cx="0" cy="0"/>
+        </a:xfrm>
+      </p:grpSpPr>
+      <p:sp>
+        <p:nvSpPr>
+          <p:cNvPr id="2" name="Slide Image Placeholder 1"/>
+          <p:cNvSpPr>
+            <a:spLocks noGrp="1" noRot="1" noChangeAspect="1"/>
+          </p:cNvSpPr>
+          <p:nvPr>
+            <p:ph type="sldImg"/>
+          </p:nvPr>
+        </p:nvSpPr>
+        <p:spPr/>
+      </p:sp>
+      <p:sp>
+        <p:nvSpPr>
+          <p:cNvPr id="3" name="Notes Placeholder 2"/>
+          <p:cNvSpPr>
+            <a:spLocks noGrp="1"/>
+          </p:cNvSpPr>
+          <p:nvPr>
+            <p:ph type="body" idx="1"/>
+          </p:nvPr>
+        </p:nvSpPr>
+        <p:spPr/>
+        <p:txBody>
+          <a:bodyPr/>
+          <a:lstStyle/>
+          <a:p>
+            <a:r>
+              <a:rPr lang="en-GB" u="sng" dirty="0" smtClean="0"/>
+              <a:t>Web Roles</a:t>
+            </a:r>
+          </a:p>
+          <a:p>
+            <a:endParaRPr lang="en-GB" dirty="0" smtClean="0"/>
+          </a:p>
+          <a:p>
+            <a:pPr marL="171450" indent="-171450">
+              <a:buFont typeface="Arial" panose="020B0604020202020204" pitchFamily="34" charset="0"/>
+              <a:buChar char="•"/>
+            </a:pPr>
+            <a:r>
+              <a:rPr lang="en-GB" dirty="0" smtClean="0"/>
+              <a:t>Run on top of IIS, so you can host </a:t>
+            </a:r>
+            <a:r>
+              <a:rPr lang="en-GB" dirty="0" err="1" smtClean="0"/>
+              <a:t>ASP.Net</a:t>
+            </a:r>
+            <a:r>
+              <a:rPr lang="en-GB" dirty="0" smtClean="0"/>
+              <a:t> Websites and Web APIs, WCF Services or any other technology that can be ran on IIS.</a:t>
+            </a:r>
+          </a:p>
+          <a:p>
+            <a:pPr marL="171450" indent="-171450">
+              <a:buFont typeface="Arial" panose="020B0604020202020204" pitchFamily="34" charset="0"/>
+              <a:buChar char="•"/>
+            </a:pPr>
+            <a:r>
+              <a:rPr lang="en-GB" dirty="0" smtClean="0"/>
+              <a:t>You can have multiple application endpoints in one Web Role instance. For example, you could expose your app via a HTML interface, a REST API or a WCF service.</a:t>
+            </a:r>
+          </a:p>
+          <a:p>
+            <a:pPr marL="171450" indent="-171450">
+              <a:buFont typeface="Arial" panose="020B0604020202020204" pitchFamily="34" charset="0"/>
+              <a:buChar char="•"/>
+            </a:pPr>
+            <a:r>
+              <a:rPr lang="en-GB" dirty="0" smtClean="0"/>
+              <a:t>The Azure Cloud Service calls the </a:t>
+            </a:r>
+            <a:r>
+              <a:rPr lang="en-GB" dirty="0" err="1" smtClean="0"/>
+              <a:t>OnStart</a:t>
+            </a:r>
+            <a:r>
+              <a:rPr lang="en-GB" dirty="0" smtClean="0"/>
+              <a:t> event before the it starts the main web application. This means you can get the app into a ready state, like prepopulating a cache or creating tables or queues.</a:t>
+            </a:r>
+          </a:p>
+          <a:p>
+            <a:endParaRPr lang="en-GB" dirty="0" smtClean="0"/>
+          </a:p>
+          <a:p>
+            <a:r>
+              <a:rPr lang="en-GB" u="sng" dirty="0" smtClean="0"/>
+              <a:t>Worker Roles</a:t>
+            </a:r>
+          </a:p>
+          <a:p>
+            <a:endParaRPr lang="en-GB" dirty="0" smtClean="0"/>
+          </a:p>
+          <a:p>
+            <a:pPr marL="171450" indent="-171450">
+              <a:buFont typeface="Arial" panose="020B0604020202020204" pitchFamily="34" charset="0"/>
+              <a:buChar char="•"/>
+            </a:pPr>
+            <a:r>
+              <a:rPr lang="en-GB" dirty="0" err="1" smtClean="0"/>
+              <a:t>WorkerRoles</a:t>
+            </a:r>
+            <a:r>
+              <a:rPr lang="en-GB" dirty="0" smtClean="0"/>
+              <a:t> don't run on IIS. They can be considered as Windows services that execute background tasks but in the cloud.</a:t>
+            </a:r>
+          </a:p>
+          <a:p>
+            <a:pPr marL="171450" indent="-171450">
+              <a:buFont typeface="Arial" panose="020B0604020202020204" pitchFamily="34" charset="0"/>
+              <a:buChar char="•"/>
+            </a:pPr>
+            <a:r>
+              <a:rPr lang="en-GB" dirty="0" smtClean="0"/>
+              <a:t>Worker Roles are hosted in their own VMs. So any heavy lifting the Worker Roles does wont impact on the performance of other recourses. Unlike </a:t>
+            </a:r>
+            <a:r>
+              <a:rPr lang="en-GB" dirty="0" err="1" smtClean="0"/>
+              <a:t>WebJobs</a:t>
+            </a:r>
+            <a:r>
+              <a:rPr lang="en-GB" dirty="0" smtClean="0"/>
+              <a:t> but I will come on to that later.</a:t>
+            </a:r>
+          </a:p>
+          <a:p>
+            <a:pPr marL="171450" indent="-171450">
+              <a:buFont typeface="Arial" panose="020B0604020202020204" pitchFamily="34" charset="0"/>
+              <a:buChar char="•"/>
+            </a:pPr>
+            <a:r>
+              <a:rPr lang="en-GB" dirty="0" smtClean="0"/>
+              <a:t>The Web / Worker Role pattern is a common architectural design pattern within the Azure Cloud Services, common scenarios for this pattern is to have the Web Role handle any HTTP requests coming in to the app. Then for the Web Role to pass any intensive work off to the Worker Role usually via a queue.</a:t>
+            </a:r>
+            <a:endParaRPr lang="en-GB" dirty="0"/>
+          </a:p>
+        </p:txBody>
+      </p:sp>
+      <p:sp>
+        <p:nvSpPr>
+          <p:cNvPr id="4" name="Slide Number Placeholder 3"/>
+          <p:cNvSpPr>
+            <a:spLocks noGrp="1"/>
+          </p:cNvSpPr>
+          <p:nvPr>
+            <p:ph type="sldNum" sz="quarter" idx="10"/>
+          </p:nvPr>
+        </p:nvSpPr>
+        <p:spPr/>
+        <p:txBody>
+          <a:bodyPr/>
+          <a:lstStyle/>
+          <a:p>
+            <a:fld id="{F9DCBFB8-3C0D-4265-9EBB-AF74934A7B39}" type="slidenum">
+              <a:rPr lang="en-GB" smtClean="0"/>
+              <a:t>25</a:t>
+            </a:fld>
+            <a:endParaRPr lang="en-GB"/>
+          </a:p>
+        </p:txBody>
+      </p:sp>
+    </p:spTree>
+    <p:extLst>
+      <p:ext uri="{BB962C8B-B14F-4D97-AF65-F5344CB8AC3E}">
+        <p14:creationId xmlns:p14="http://schemas.microsoft.com/office/powerpoint/2010/main" val="2015399243"/>
+      </p:ext>
+    </p:extLst>
+  </p:cSld>
+  <p:clrMapOvr>
+    <a:masterClrMapping/>
+  </p:clrMapOvr>
+</p:notes>
+</file>
+
+<file path=ppt/notesSlides/notesSlide26.xml><?xml version="1.0" encoding="utf-8"?>
+<p:notes xmlns:a="http://schemas.openxmlformats.org/drawingml/2006/main" xmlns:r="http://schemas.openxmlformats.org/officeDocument/2006/relationships" xmlns:p="http://schemas.openxmlformats.org/presentationml/2006/main">
+  <p:cSld>
+    <p:spTree>
+      <p:nvGrpSpPr>
+        <p:cNvPr id="1" name=""/>
+        <p:cNvGrpSpPr/>
+        <p:nvPr/>
+      </p:nvGrpSpPr>
+      <p:grpSpPr>
+        <a:xfrm>
+          <a:off x="0" y="0"/>
+          <a:ext cx="0" cy="0"/>
+          <a:chOff x="0" y="0"/>
+          <a:chExt cx="0" cy="0"/>
+        </a:xfrm>
+      </p:grpSpPr>
+      <p:sp>
+        <p:nvSpPr>
+          <p:cNvPr id="2" name="Slide Image Placeholder 1"/>
+          <p:cNvSpPr>
+            <a:spLocks noGrp="1" noRot="1" noChangeAspect="1"/>
+          </p:cNvSpPr>
+          <p:nvPr>
+            <p:ph type="sldImg"/>
+          </p:nvPr>
+        </p:nvSpPr>
+        <p:spPr/>
+      </p:sp>
+      <p:sp>
+        <p:nvSpPr>
+          <p:cNvPr id="3" name="Notes Placeholder 2"/>
+          <p:cNvSpPr>
+            <a:spLocks noGrp="1"/>
+          </p:cNvSpPr>
+          <p:nvPr>
+            <p:ph type="body" idx="1"/>
+          </p:nvPr>
+        </p:nvSpPr>
+        <p:spPr/>
+        <p:txBody>
+          <a:bodyPr/>
+          <a:lstStyle/>
+          <a:p>
+            <a:r>
+              <a:rPr lang="en-GB" dirty="0" smtClean="0"/>
+              <a:t>I have told you that any heavy lifting or any background task should be done with a worker role rather than you app and that still holds true. But let me introduce you to the worker roles little brother the </a:t>
+            </a:r>
+            <a:r>
+              <a:rPr lang="en-GB" dirty="0" err="1" smtClean="0"/>
+              <a:t>WebJob</a:t>
+            </a:r>
+            <a:r>
+              <a:rPr lang="en-GB" dirty="0" smtClean="0"/>
+              <a:t>. </a:t>
+            </a:r>
+          </a:p>
+          <a:p>
+            <a:r>
+              <a:rPr lang="en-GB" dirty="0" err="1" smtClean="0"/>
+              <a:t>WebJobs</a:t>
+            </a:r>
+            <a:r>
+              <a:rPr lang="en-GB" dirty="0" smtClean="0"/>
+              <a:t> allow you to run programs or scripts in your </a:t>
+            </a:r>
+            <a:r>
+              <a:rPr lang="en-GB" dirty="0" err="1" smtClean="0"/>
+              <a:t>WebApp</a:t>
+            </a:r>
+            <a:r>
+              <a:rPr lang="en-GB" dirty="0" smtClean="0"/>
+              <a:t> service. You can run a </a:t>
+            </a:r>
+            <a:r>
+              <a:rPr lang="en-GB" dirty="0" err="1" smtClean="0"/>
+              <a:t>WebJob</a:t>
+            </a:r>
+            <a:r>
+              <a:rPr lang="en-GB" dirty="0" smtClean="0"/>
+              <a:t> either on demand or continuously. </a:t>
+            </a:r>
+          </a:p>
+          <a:p>
+            <a:r>
+              <a:rPr lang="en-GB" dirty="0" smtClean="0"/>
+              <a:t>		</a:t>
+            </a:r>
+          </a:p>
+          <a:p>
+            <a:r>
+              <a:rPr lang="en-GB" dirty="0" err="1" smtClean="0"/>
+              <a:t>WebJobs</a:t>
+            </a:r>
+            <a:r>
+              <a:rPr lang="en-GB" dirty="0" smtClean="0"/>
+              <a:t> run along side you </a:t>
+            </a:r>
+            <a:r>
+              <a:rPr lang="en-GB" dirty="0" err="1" smtClean="0"/>
+              <a:t>WebApp</a:t>
+            </a:r>
+            <a:r>
+              <a:rPr lang="en-GB" dirty="0" smtClean="0"/>
+              <a:t> and uses the same resources, hence why I say its the worker roles little brother as you will still want to do any intensive work with a worker role because they wont effect the performance of the web app.</a:t>
+            </a:r>
+          </a:p>
+          <a:p>
+            <a:r>
+              <a:rPr lang="en-GB" dirty="0" smtClean="0"/>
+              <a:t>		</a:t>
+            </a:r>
+          </a:p>
+          <a:p>
+            <a:r>
+              <a:rPr lang="en-GB" dirty="0" err="1" smtClean="0"/>
+              <a:t>Webjobs</a:t>
+            </a:r>
+            <a:r>
+              <a:rPr lang="en-GB" dirty="0" smtClean="0"/>
+              <a:t> can be as simple as </a:t>
+            </a:r>
+            <a:r>
+              <a:rPr lang="en-GB" dirty="0" err="1" smtClean="0"/>
+              <a:t>Console.Writeline</a:t>
+            </a:r>
+            <a:r>
+              <a:rPr lang="en-GB" dirty="0" smtClean="0"/>
+              <a:t>("Hello world") or you can use the Azure </a:t>
+            </a:r>
+            <a:r>
+              <a:rPr lang="en-GB" dirty="0" err="1" smtClean="0"/>
+              <a:t>WebJobs</a:t>
+            </a:r>
+            <a:r>
+              <a:rPr lang="en-GB" dirty="0" smtClean="0"/>
+              <a:t> SDK to pull in cool features such as triggering a job when a file is uploaded to a blob storage container or when a message is put on a queue.</a:t>
+            </a:r>
+          </a:p>
+          <a:p>
+            <a:r>
+              <a:rPr lang="en-GB" dirty="0" smtClean="0"/>
+              <a:t>		</a:t>
+            </a:r>
+          </a:p>
+          <a:p>
+            <a:r>
+              <a:rPr lang="en-GB" dirty="0" smtClean="0"/>
+              <a:t>So if the Web and Worker role architecture is too much for your small </a:t>
+            </a:r>
+            <a:r>
+              <a:rPr lang="en-GB" dirty="0" err="1" smtClean="0"/>
+              <a:t>WebApp</a:t>
+            </a:r>
+            <a:r>
+              <a:rPr lang="en-GB" dirty="0" smtClean="0"/>
+              <a:t> then </a:t>
+            </a:r>
+            <a:r>
+              <a:rPr lang="en-GB" dirty="0" err="1" smtClean="0"/>
+              <a:t>WebJobs</a:t>
+            </a:r>
+            <a:r>
+              <a:rPr lang="en-GB" dirty="0" smtClean="0"/>
+              <a:t> is one of the many services available and waiting for you on Azure.</a:t>
+            </a:r>
+            <a:endParaRPr lang="en-GB" dirty="0"/>
+          </a:p>
+        </p:txBody>
+      </p:sp>
+      <p:sp>
+        <p:nvSpPr>
+          <p:cNvPr id="4" name="Slide Number Placeholder 3"/>
+          <p:cNvSpPr>
+            <a:spLocks noGrp="1"/>
+          </p:cNvSpPr>
+          <p:nvPr>
+            <p:ph type="sldNum" sz="quarter" idx="10"/>
+          </p:nvPr>
+        </p:nvSpPr>
+        <p:spPr/>
+        <p:txBody>
+          <a:bodyPr/>
+          <a:lstStyle/>
+          <a:p>
+            <a:fld id="{F9DCBFB8-3C0D-4265-9EBB-AF74934A7B39}" type="slidenum">
+              <a:rPr lang="en-GB" smtClean="0"/>
+              <a:t>26</a:t>
+            </a:fld>
+            <a:endParaRPr lang="en-GB"/>
+          </a:p>
+        </p:txBody>
+      </p:sp>
+    </p:spTree>
+    <p:extLst>
+      <p:ext uri="{BB962C8B-B14F-4D97-AF65-F5344CB8AC3E}">
+        <p14:creationId xmlns:p14="http://schemas.microsoft.com/office/powerpoint/2010/main" val="739052694"/>
+      </p:ext>
+    </p:extLst>
+  </p:cSld>
+  <p:clrMapOvr>
+    <a:masterClrMapping/>
+  </p:clrMapOvr>
+</p:notes>
+</file>
+
+<file path=ppt/notesSlides/notesSlide27.xml><?xml version="1.0" encoding="utf-8"?>
+<p:notes xmlns:a="http://schemas.openxmlformats.org/drawingml/2006/main" xmlns:r="http://schemas.openxmlformats.org/officeDocument/2006/relationships" xmlns:p="http://schemas.openxmlformats.org/presentationml/2006/main">
+  <p:cSld>
+    <p:spTree>
+      <p:nvGrpSpPr>
+        <p:cNvPr id="1" name=""/>
+        <p:cNvGrpSpPr/>
+        <p:nvPr/>
+      </p:nvGrpSpPr>
+      <p:grpSpPr>
+        <a:xfrm>
+          <a:off x="0" y="0"/>
+          <a:ext cx="0" cy="0"/>
+          <a:chOff x="0" y="0"/>
+          <a:chExt cx="0" cy="0"/>
+        </a:xfrm>
+      </p:grpSpPr>
+      <p:sp>
+        <p:nvSpPr>
+          <p:cNvPr id="2" name="Slide Image Placeholder 1"/>
+          <p:cNvSpPr>
+            <a:spLocks noGrp="1" noRot="1" noChangeAspect="1"/>
+          </p:cNvSpPr>
+          <p:nvPr>
+            <p:ph type="sldImg"/>
+          </p:nvPr>
+        </p:nvSpPr>
+        <p:spPr/>
+      </p:sp>
+      <p:sp>
+        <p:nvSpPr>
+          <p:cNvPr id="3" name="Notes Placeholder 2"/>
+          <p:cNvSpPr>
+            <a:spLocks noGrp="1"/>
+          </p:cNvSpPr>
+          <p:nvPr>
+            <p:ph type="body" idx="1"/>
+          </p:nvPr>
+        </p:nvSpPr>
+        <p:spPr/>
+        <p:txBody>
+          <a:bodyPr/>
+          <a:lstStyle/>
+          <a:p>
+            <a:r>
+              <a:rPr lang="en-GB" dirty="0" smtClean="0"/>
+              <a:t>Blob is an acronym for Binary Large </a:t>
+            </a:r>
+            <a:r>
+              <a:rPr lang="en-GB" dirty="0" err="1" smtClean="0"/>
+              <a:t>OBject</a:t>
+            </a:r>
+            <a:r>
+              <a:rPr lang="en-GB" dirty="0" smtClean="0"/>
+              <a:t>, which are files. </a:t>
+            </a:r>
+          </a:p>
+          <a:p>
+            <a:endParaRPr lang="en-GB" dirty="0" smtClean="0"/>
+          </a:p>
+          <a:p>
+            <a:r>
+              <a:rPr lang="en-GB" dirty="0" smtClean="0"/>
+              <a:t>They can be anything from images to database backups. Due to the nature of the cloud you don't know which server your request has been sent to. So you should avoid saving files to the servers file system. </a:t>
+            </a:r>
+          </a:p>
+          <a:p>
+            <a:endParaRPr lang="en-GB" dirty="0" smtClean="0"/>
+          </a:p>
+          <a:p>
+            <a:r>
+              <a:rPr lang="en-GB" dirty="0" smtClean="0"/>
+              <a:t>Blob storage gives you the ability to store and access files from anywhere in the world. You can interact with blob storage via its REST API or via any of the client libraries provided. You can also give read only access by sharing a URL to the blob.</a:t>
+            </a:r>
+          </a:p>
+          <a:p>
+            <a:r>
+              <a:rPr lang="en-GB" dirty="0" smtClean="0"/>
+              <a:t>		</a:t>
+            </a:r>
+          </a:p>
+          <a:p>
+            <a:r>
+              <a:rPr lang="en-GB" dirty="0" smtClean="0"/>
+              <a:t>You will need a storage account before you can access blob storage. Once you have one then you can start adding containers. Containers can be thought of like folders on you file system. A storage account can have an unlimited number of containers and a container can have an unlimited number of files, up to the storage account limit of 500TB.</a:t>
+            </a:r>
+          </a:p>
+          <a:p>
+            <a:r>
+              <a:rPr lang="en-GB" dirty="0" smtClean="0"/>
+              <a:t>		</a:t>
+            </a:r>
+          </a:p>
+          <a:p>
+            <a:r>
+              <a:rPr lang="en-GB" dirty="0" smtClean="0"/>
+              <a:t>Blob storage only allows for a single level of containers, therefore you cannot have containers within containers. But blob storage does try to simulate a hierarchical file system by pre-pending what would be folder names and slashes to beginning of the file name. </a:t>
+            </a:r>
+          </a:p>
+          <a:p>
+            <a:endParaRPr lang="en-GB" dirty="0" smtClean="0"/>
+          </a:p>
+          <a:p>
+            <a:r>
+              <a:rPr lang="en-GB" dirty="0" smtClean="0"/>
+              <a:t>In the following examples, "cars" is the container name and everything after is the blob name. Depending on the blob storage viewer you use you will see a folder structure or just a list of blobs in the container.</a:t>
+            </a:r>
+            <a:endParaRPr lang="en-GB" dirty="0"/>
+          </a:p>
+        </p:txBody>
+      </p:sp>
+      <p:sp>
+        <p:nvSpPr>
+          <p:cNvPr id="4" name="Slide Number Placeholder 3"/>
+          <p:cNvSpPr>
+            <a:spLocks noGrp="1"/>
+          </p:cNvSpPr>
+          <p:nvPr>
+            <p:ph type="sldNum" sz="quarter" idx="10"/>
+          </p:nvPr>
+        </p:nvSpPr>
+        <p:spPr/>
+        <p:txBody>
+          <a:bodyPr/>
+          <a:lstStyle/>
+          <a:p>
+            <a:fld id="{F9DCBFB8-3C0D-4265-9EBB-AF74934A7B39}" type="slidenum">
+              <a:rPr lang="en-GB" smtClean="0"/>
+              <a:t>27</a:t>
             </a:fld>
             <a:endParaRPr lang="en-GB"/>
           </a:p>
@@ -4006,13 +4807,8 @@
             </a:pPr>
             <a:r>
               <a:rPr lang="en-GB" baseline="0" dirty="0" smtClean="0"/>
-              <a:t>Week Night</a:t>
-            </a:r>
-            <a:r>
-              <a:rPr lang="en-GB" baseline="0" dirty="0" smtClean="0"/>
-              <a:t>, triggers Mon – Fri after 18:00</a:t>
-            </a:r>
-            <a:endParaRPr lang="en-GB" baseline="0" dirty="0" smtClean="0"/>
+              <a:t>Week Night, triggers Mon – Fri after 18:00</a:t>
+            </a:r>
           </a:p>
           <a:p>
             <a:pPr marL="171450" indent="-171450">
@@ -4021,13 +4817,8 @@
             </a:pPr>
             <a:r>
               <a:rPr lang="en-GB" baseline="0" dirty="0" smtClean="0"/>
-              <a:t>Weekend</a:t>
-            </a:r>
-            <a:r>
-              <a:rPr lang="en-GB" baseline="0" dirty="0" smtClean="0"/>
-              <a:t>, triggers Sat – Sun after 01:00</a:t>
-            </a:r>
-            <a:endParaRPr lang="en-GB" baseline="0" dirty="0" smtClean="0"/>
+              <a:t>Weekend, triggers Sat – Sun after 01:00</a:t>
+            </a:r>
           </a:p>
           <a:p>
             <a:endParaRPr lang="en-GB" baseline="0" dirty="0" smtClean="0"/>
@@ -4057,11 +4848,7 @@
           <a:p>
             <a:r>
               <a:rPr lang="en-GB" baseline="0" dirty="0" smtClean="0"/>
-              <a:t>When the Week Night profile is active, Azure</a:t>
-            </a:r>
-            <a:r>
-              <a:rPr lang="en-GB" baseline="0" dirty="0" smtClean="0"/>
-              <a:t> will only add up to 5 servers when the CPU load is at 95% for 10mins, and remove a server at 75%. </a:t>
+              <a:t>When the Week Night profile is active, Azure will only add up to 5 servers when the CPU load is at 95% for 10mins, and remove a server at 75%. </a:t>
             </a:r>
           </a:p>
           <a:p>
@@ -4439,7 +5226,6 @@
               <a:rPr lang="en-GB" baseline="0" dirty="0" smtClean="0"/>
               <a:t> class.</a:t>
             </a:r>
-            <a:endParaRPr lang="en-GB" baseline="0" dirty="0" smtClean="0"/>
           </a:p>
           <a:p>
             <a:pPr marL="228600" indent="-228600">
@@ -4617,7 +5403,7 @@
           <a:p>
             <a:fld id="{8A04FFFD-6AAA-4290-B9C8-6140E8302CD5}" type="datetimeFigureOut">
               <a:rPr lang="en-GB" smtClean="0"/>
-              <a:t>20/09/2015</a:t>
+              <a:t>21/09/2015</a:t>
             </a:fld>
             <a:endParaRPr lang="en-GB"/>
           </a:p>
@@ -4787,7 +5573,7 @@
           <a:p>
             <a:fld id="{8A04FFFD-6AAA-4290-B9C8-6140E8302CD5}" type="datetimeFigureOut">
               <a:rPr lang="en-GB" smtClean="0"/>
-              <a:t>20/09/2015</a:t>
+              <a:t>21/09/2015</a:t>
             </a:fld>
             <a:endParaRPr lang="en-GB"/>
           </a:p>
@@ -4967,7 +5753,7 @@
           <a:p>
             <a:fld id="{8A04FFFD-6AAA-4290-B9C8-6140E8302CD5}" type="datetimeFigureOut">
               <a:rPr lang="en-GB" smtClean="0"/>
-              <a:t>20/09/2015</a:t>
+              <a:t>21/09/2015</a:t>
             </a:fld>
             <a:endParaRPr lang="en-GB"/>
           </a:p>
@@ -6064,7 +6850,7 @@
           <a:p>
             <a:fld id="{8A04FFFD-6AAA-4290-B9C8-6140E8302CD5}" type="datetimeFigureOut">
               <a:rPr lang="en-GB" smtClean="0"/>
-              <a:t>20/09/2015</a:t>
+              <a:t>21/09/2015</a:t>
             </a:fld>
             <a:endParaRPr lang="en-GB"/>
           </a:p>
@@ -6308,7 +7094,7 @@
           <a:p>
             <a:fld id="{8A04FFFD-6AAA-4290-B9C8-6140E8302CD5}" type="datetimeFigureOut">
               <a:rPr lang="en-GB" smtClean="0"/>
-              <a:t>20/09/2015</a:t>
+              <a:t>21/09/2015</a:t>
             </a:fld>
             <a:endParaRPr lang="en-GB"/>
           </a:p>
@@ -6540,7 +7326,7 @@
           <a:p>
             <a:fld id="{8A04FFFD-6AAA-4290-B9C8-6140E8302CD5}" type="datetimeFigureOut">
               <a:rPr lang="en-GB" smtClean="0"/>
-              <a:t>20/09/2015</a:t>
+              <a:t>21/09/2015</a:t>
             </a:fld>
             <a:endParaRPr lang="en-GB"/>
           </a:p>
@@ -6907,7 +7693,7 @@
           <a:p>
             <a:fld id="{8A04FFFD-6AAA-4290-B9C8-6140E8302CD5}" type="datetimeFigureOut">
               <a:rPr lang="en-GB" smtClean="0"/>
-              <a:t>20/09/2015</a:t>
+              <a:t>21/09/2015</a:t>
             </a:fld>
             <a:endParaRPr lang="en-GB"/>
           </a:p>
@@ -7025,7 +7811,7 @@
           <a:p>
             <a:fld id="{8A04FFFD-6AAA-4290-B9C8-6140E8302CD5}" type="datetimeFigureOut">
               <a:rPr lang="en-GB" smtClean="0"/>
-              <a:t>20/09/2015</a:t>
+              <a:t>21/09/2015</a:t>
             </a:fld>
             <a:endParaRPr lang="en-GB"/>
           </a:p>
@@ -7120,7 +7906,7 @@
           <a:p>
             <a:fld id="{8A04FFFD-6AAA-4290-B9C8-6140E8302CD5}" type="datetimeFigureOut">
               <a:rPr lang="en-GB" smtClean="0"/>
-              <a:t>20/09/2015</a:t>
+              <a:t>21/09/2015</a:t>
             </a:fld>
             <a:endParaRPr lang="en-GB"/>
           </a:p>
@@ -7397,7 +8183,7 @@
           <a:p>
             <a:fld id="{8A04FFFD-6AAA-4290-B9C8-6140E8302CD5}" type="datetimeFigureOut">
               <a:rPr lang="en-GB" smtClean="0"/>
-              <a:t>20/09/2015</a:t>
+              <a:t>21/09/2015</a:t>
             </a:fld>
             <a:endParaRPr lang="en-GB"/>
           </a:p>
@@ -7654,7 +8440,7 @@
           <a:p>
             <a:fld id="{8A04FFFD-6AAA-4290-B9C8-6140E8302CD5}" type="datetimeFigureOut">
               <a:rPr lang="en-GB" smtClean="0"/>
-              <a:t>20/09/2015</a:t>
+              <a:t>21/09/2015</a:t>
             </a:fld>
             <a:endParaRPr lang="en-GB"/>
           </a:p>
@@ -7876,7 +8662,7 @@
           <a:p>
             <a:fld id="{8A04FFFD-6AAA-4290-B9C8-6140E8302CD5}" type="datetimeFigureOut">
               <a:rPr lang="en-GB" smtClean="0"/>
-              <a:t>20/09/2015</a:t>
+              <a:t>21/09/2015</a:t>
             </a:fld>
             <a:endParaRPr lang="en-GB"/>
           </a:p>
@@ -9405,6 +10191,954 @@
           <a:chExt cx="0" cy="0"/>
         </a:xfrm>
       </p:grpSpPr>
+      <p:sp>
+        <p:nvSpPr>
+          <p:cNvPr id="4" name="Title 3"/>
+          <p:cNvSpPr>
+            <a:spLocks noGrp="1"/>
+          </p:cNvSpPr>
+          <p:nvPr>
+            <p:ph type="title"/>
+          </p:nvPr>
+        </p:nvSpPr>
+        <p:spPr>
+          <a:xfrm>
+            <a:off x="0" y="126000"/>
+            <a:ext cx="9143999" cy="757130"/>
+          </a:xfrm>
+        </p:spPr>
+        <p:txBody>
+          <a:bodyPr anchor="ctr" anchorCtr="1">
+            <a:spAutoFit/>
+          </a:bodyPr>
+          <a:lstStyle/>
+          <a:p>
+            <a:r>
+              <a:rPr lang="en-GB" dirty="0" smtClean="0"/>
+              <a:t>Data Storage</a:t>
+            </a:r>
+            <a:endParaRPr lang="en-GB" dirty="0"/>
+          </a:p>
+        </p:txBody>
+      </p:sp>
+      <p:pic>
+        <p:nvPicPr>
+          <p:cNvPr id="5" name="Picture 4"/>
+          <p:cNvPicPr>
+            <a:picLocks noChangeAspect="1"/>
+          </p:cNvPicPr>
+          <p:nvPr/>
+        </p:nvPicPr>
+        <p:blipFill>
+          <a:blip r:embed="rId3" cstate="print">
+            <a:extLst>
+              <a:ext uri="{28A0092B-C50C-407E-A947-70E740481C1C}">
+                <a14:useLocalDpi xmlns:a14="http://schemas.microsoft.com/office/drawing/2010/main" val="0"/>
+              </a:ext>
+            </a:extLst>
+          </a:blip>
+          <a:stretch>
+            <a:fillRect/>
+          </a:stretch>
+        </p:blipFill>
+        <p:spPr>
+          <a:xfrm>
+            <a:off x="3852000" y="1180004"/>
+            <a:ext cx="1440000" cy="1440000"/>
+          </a:xfrm>
+          <a:prstGeom prst="rect">
+            <a:avLst/>
+          </a:prstGeom>
+        </p:spPr>
+      </p:pic>
+      <p:pic>
+        <p:nvPicPr>
+          <p:cNvPr id="7" name="Picture 6"/>
+          <p:cNvPicPr>
+            <a:picLocks noChangeAspect="1"/>
+          </p:cNvPicPr>
+          <p:nvPr/>
+        </p:nvPicPr>
+        <p:blipFill>
+          <a:blip r:embed="rId4" cstate="print">
+            <a:extLst>
+              <a:ext uri="{28A0092B-C50C-407E-A947-70E740481C1C}">
+                <a14:useLocalDpi xmlns:a14="http://schemas.microsoft.com/office/drawing/2010/main" val="0"/>
+              </a:ext>
+            </a:extLst>
+          </a:blip>
+          <a:stretch>
+            <a:fillRect/>
+          </a:stretch>
+        </p:blipFill>
+        <p:spPr>
+          <a:xfrm>
+            <a:off x="3762000" y="3177152"/>
+            <a:ext cx="1620000" cy="1620000"/>
+          </a:xfrm>
+          <a:prstGeom prst="rect">
+            <a:avLst/>
+          </a:prstGeom>
+        </p:spPr>
+      </p:pic>
+      <p:pic>
+        <p:nvPicPr>
+          <p:cNvPr id="6" name="Picture 5"/>
+          <p:cNvPicPr>
+            <a:picLocks noChangeAspect="1"/>
+          </p:cNvPicPr>
+          <p:nvPr/>
+        </p:nvPicPr>
+        <p:blipFill>
+          <a:blip r:embed="rId5" cstate="print">
+            <a:extLst>
+              <a:ext uri="{28A0092B-C50C-407E-A947-70E740481C1C}">
+                <a14:useLocalDpi xmlns:a14="http://schemas.microsoft.com/office/drawing/2010/main" val="0"/>
+              </a:ext>
+            </a:extLst>
+          </a:blip>
+          <a:stretch>
+            <a:fillRect/>
+          </a:stretch>
+        </p:blipFill>
+        <p:spPr>
+          <a:xfrm>
+            <a:off x="6156336" y="4797152"/>
+            <a:ext cx="1440000" cy="1440000"/>
+          </a:xfrm>
+          <a:prstGeom prst="rect">
+            <a:avLst/>
+          </a:prstGeom>
+        </p:spPr>
+      </p:pic>
+      <p:pic>
+        <p:nvPicPr>
+          <p:cNvPr id="9" name="Picture 8"/>
+          <p:cNvPicPr>
+            <a:picLocks noChangeAspect="1"/>
+          </p:cNvPicPr>
+          <p:nvPr/>
+        </p:nvPicPr>
+        <p:blipFill>
+          <a:blip r:embed="rId6" cstate="print">
+            <a:extLst>
+              <a:ext uri="{28A0092B-C50C-407E-A947-70E740481C1C}">
+                <a14:useLocalDpi xmlns:a14="http://schemas.microsoft.com/office/drawing/2010/main" val="0"/>
+              </a:ext>
+            </a:extLst>
+          </a:blip>
+          <a:stretch>
+            <a:fillRect/>
+          </a:stretch>
+        </p:blipFill>
+        <p:spPr>
+          <a:xfrm>
+            <a:off x="1547664" y="4797152"/>
+            <a:ext cx="1440000" cy="1440000"/>
+          </a:xfrm>
+          <a:prstGeom prst="rect">
+            <a:avLst/>
+          </a:prstGeom>
+        </p:spPr>
+      </p:pic>
+    </p:spTree>
+    <p:extLst>
+      <p:ext uri="{BB962C8B-B14F-4D97-AF65-F5344CB8AC3E}">
+        <p14:creationId xmlns:p14="http://schemas.microsoft.com/office/powerpoint/2010/main" val="3553075068"/>
+      </p:ext>
+    </p:extLst>
+  </p:cSld>
+  <p:clrMapOvr>
+    <a:masterClrMapping/>
+  </p:clrMapOvr>
+  <p:timing>
+    <p:tnLst>
+      <p:par>
+        <p:cTn id="1" dur="indefinite" restart="never" nodeType="tmRoot"/>
+      </p:par>
+    </p:tnLst>
+  </p:timing>
+</p:sld>
+</file>
+
+<file path=ppt/slides/slide14.xml><?xml version="1.0" encoding="utf-8"?>
+<p:sld xmlns:a="http://schemas.openxmlformats.org/drawingml/2006/main" xmlns:r="http://schemas.openxmlformats.org/officeDocument/2006/relationships" xmlns:p="http://schemas.openxmlformats.org/presentationml/2006/main">
+  <p:cSld>
+    <p:spTree>
+      <p:nvGrpSpPr>
+        <p:cNvPr id="1" name=""/>
+        <p:cNvGrpSpPr/>
+        <p:nvPr/>
+      </p:nvGrpSpPr>
+      <p:grpSpPr>
+        <a:xfrm>
+          <a:off x="0" y="0"/>
+          <a:ext cx="0" cy="0"/>
+          <a:chOff x="0" y="0"/>
+          <a:chExt cx="0" cy="0"/>
+        </a:xfrm>
+      </p:grpSpPr>
+      <p:sp>
+        <p:nvSpPr>
+          <p:cNvPr id="5" name="Title 3"/>
+          <p:cNvSpPr>
+            <a:spLocks noGrp="1"/>
+          </p:cNvSpPr>
+          <p:nvPr>
+            <p:ph type="title"/>
+          </p:nvPr>
+        </p:nvSpPr>
+        <p:spPr>
+          <a:xfrm>
+            <a:off x="0" y="126000"/>
+            <a:ext cx="9143999" cy="757130"/>
+          </a:xfrm>
+        </p:spPr>
+        <p:txBody>
+          <a:bodyPr anchor="ctr" anchorCtr="1">
+            <a:spAutoFit/>
+          </a:bodyPr>
+          <a:lstStyle/>
+          <a:p>
+            <a:r>
+              <a:rPr lang="en-GB" dirty="0" smtClean="0"/>
+              <a:t>Data Storage</a:t>
+            </a:r>
+            <a:endParaRPr lang="en-GB" dirty="0"/>
+          </a:p>
+        </p:txBody>
+      </p:sp>
+      <p:graphicFrame>
+        <p:nvGraphicFramePr>
+          <p:cNvPr id="6" name="Table 5"/>
+          <p:cNvGraphicFramePr>
+            <a:graphicFrameLocks noGrp="1"/>
+          </p:cNvGraphicFramePr>
+          <p:nvPr>
+            <p:extLst>
+              <p:ext uri="{D42A27DB-BD31-4B8C-83A1-F6EECF244321}">
+                <p14:modId xmlns:p14="http://schemas.microsoft.com/office/powerpoint/2010/main" val="286809101"/>
+              </p:ext>
+            </p:extLst>
+          </p:nvPr>
+        </p:nvGraphicFramePr>
+        <p:xfrm>
+          <a:off x="1185416" y="1772816"/>
+          <a:ext cx="6874512" cy="2377440"/>
+        </p:xfrm>
+        <a:graphic>
+          <a:graphicData uri="http://schemas.openxmlformats.org/drawingml/2006/table">
+            <a:tbl>
+              <a:tblPr firstRow="1" bandRow="1">
+                <a:tableStyleId>{125E5076-3810-47DD-B79F-674D7AD40C01}</a:tableStyleId>
+              </a:tblPr>
+              <a:tblGrid>
+                <a:gridCol w="1355916"/>
+                <a:gridCol w="1320800"/>
+                <a:gridCol w="1668209"/>
+                <a:gridCol w="1336231"/>
+                <a:gridCol w="1193356"/>
+              </a:tblGrid>
+              <a:tr h="370840">
+                <a:tc>
+                  <a:txBody>
+                    <a:bodyPr/>
+                    <a:lstStyle/>
+                    <a:p>
+                      <a:r>
+                        <a:rPr lang="en-GB" sz="2000" dirty="0" smtClean="0"/>
+                        <a:t>Relational</a:t>
+                      </a:r>
+                      <a:endParaRPr lang="en-GB" sz="2000" dirty="0"/>
+                    </a:p>
+                  </a:txBody>
+                  <a:tcPr/>
+                </a:tc>
+                <a:tc>
+                  <a:txBody>
+                    <a:bodyPr/>
+                    <a:lstStyle/>
+                    <a:p>
+                      <a:r>
+                        <a:rPr lang="en-GB" sz="2000" dirty="0" smtClean="0"/>
+                        <a:t>Key/Value</a:t>
+                      </a:r>
+                      <a:endParaRPr lang="en-GB" sz="2000" dirty="0"/>
+                    </a:p>
+                  </a:txBody>
+                  <a:tcPr/>
+                </a:tc>
+                <a:tc>
+                  <a:txBody>
+                    <a:bodyPr/>
+                    <a:lstStyle/>
+                    <a:p>
+                      <a:r>
+                        <a:rPr lang="en-GB" sz="2000" dirty="0" smtClean="0"/>
+                        <a:t>Column Store</a:t>
+                      </a:r>
+                      <a:endParaRPr lang="en-GB" sz="2000" dirty="0"/>
+                    </a:p>
+                  </a:txBody>
+                  <a:tcPr/>
+                </a:tc>
+                <a:tc>
+                  <a:txBody>
+                    <a:bodyPr/>
+                    <a:lstStyle/>
+                    <a:p>
+                      <a:r>
+                        <a:rPr lang="en-GB" sz="2000" dirty="0" smtClean="0"/>
+                        <a:t>Document</a:t>
+                      </a:r>
+                      <a:endParaRPr lang="en-GB" sz="2000" dirty="0"/>
+                    </a:p>
+                  </a:txBody>
+                  <a:tcPr/>
+                </a:tc>
+                <a:tc>
+                  <a:txBody>
+                    <a:bodyPr/>
+                    <a:lstStyle/>
+                    <a:p>
+                      <a:r>
+                        <a:rPr lang="en-GB" sz="2000" dirty="0" smtClean="0"/>
+                        <a:t>Graph</a:t>
+                      </a:r>
+                      <a:endParaRPr lang="en-GB" sz="2000" dirty="0"/>
+                    </a:p>
+                  </a:txBody>
+                  <a:tcPr/>
+                </a:tc>
+              </a:tr>
+              <a:tr h="370840">
+                <a:tc>
+                  <a:txBody>
+                    <a:bodyPr/>
+                    <a:lstStyle/>
+                    <a:p>
+                      <a:r>
+                        <a:rPr lang="en-GB" sz="2000" dirty="0" smtClean="0"/>
+                        <a:t>SQL Server</a:t>
+                      </a:r>
+                      <a:endParaRPr lang="en-GB" sz="2000" dirty="0"/>
+                    </a:p>
+                  </a:txBody>
+                  <a:tcPr/>
+                </a:tc>
+                <a:tc>
+                  <a:txBody>
+                    <a:bodyPr/>
+                    <a:lstStyle/>
+                    <a:p>
+                      <a:r>
+                        <a:rPr lang="en-GB" sz="2000" dirty="0" smtClean="0"/>
+                        <a:t>Dynamo</a:t>
+                      </a:r>
+                      <a:endParaRPr lang="en-GB" sz="2000" dirty="0"/>
+                    </a:p>
+                  </a:txBody>
+                  <a:tcPr/>
+                </a:tc>
+                <a:tc>
+                  <a:txBody>
+                    <a:bodyPr/>
+                    <a:lstStyle/>
+                    <a:p>
+                      <a:r>
+                        <a:rPr lang="en-GB" sz="2000" dirty="0" smtClean="0"/>
+                        <a:t>Cassandra</a:t>
+                      </a:r>
+                      <a:endParaRPr lang="en-GB" sz="2000" dirty="0"/>
+                    </a:p>
+                  </a:txBody>
+                  <a:tcPr/>
+                </a:tc>
+                <a:tc>
+                  <a:txBody>
+                    <a:bodyPr/>
+                    <a:lstStyle/>
+                    <a:p>
+                      <a:r>
+                        <a:rPr lang="en-GB" sz="2000" dirty="0" smtClean="0"/>
+                        <a:t>MongoDB</a:t>
+                      </a:r>
+                      <a:endParaRPr lang="en-GB" sz="2000" dirty="0"/>
+                    </a:p>
+                  </a:txBody>
+                  <a:tcPr/>
+                </a:tc>
+                <a:tc>
+                  <a:txBody>
+                    <a:bodyPr/>
+                    <a:lstStyle/>
+                    <a:p>
+                      <a:r>
+                        <a:rPr lang="en-GB" sz="2000" dirty="0" smtClean="0"/>
+                        <a:t>Allegro</a:t>
+                      </a:r>
+                      <a:endParaRPr lang="en-GB" sz="2000" dirty="0"/>
+                    </a:p>
+                  </a:txBody>
+                  <a:tcPr/>
+                </a:tc>
+              </a:tr>
+              <a:tr h="370840">
+                <a:tc>
+                  <a:txBody>
+                    <a:bodyPr/>
+                    <a:lstStyle/>
+                    <a:p>
+                      <a:r>
+                        <a:rPr lang="en-GB" sz="2000" dirty="0" smtClean="0"/>
+                        <a:t>Oracle</a:t>
+                      </a:r>
+                      <a:endParaRPr lang="en-GB" sz="2000" dirty="0"/>
+                    </a:p>
+                  </a:txBody>
+                  <a:tcPr/>
+                </a:tc>
+                <a:tc>
+                  <a:txBody>
+                    <a:bodyPr/>
+                    <a:lstStyle/>
+                    <a:p>
+                      <a:r>
+                        <a:rPr lang="en-GB" sz="2000" dirty="0" err="1" smtClean="0"/>
+                        <a:t>Redis</a:t>
+                      </a:r>
+                      <a:endParaRPr lang="en-GB" sz="2000" dirty="0"/>
+                    </a:p>
+                  </a:txBody>
+                  <a:tcPr/>
+                </a:tc>
+                <a:tc>
+                  <a:txBody>
+                    <a:bodyPr/>
+                    <a:lstStyle/>
+                    <a:p>
+                      <a:r>
+                        <a:rPr lang="en-GB" sz="2000" dirty="0" smtClean="0"/>
+                        <a:t>Druid</a:t>
+                      </a:r>
+                      <a:endParaRPr lang="en-GB" sz="2000" dirty="0"/>
+                    </a:p>
+                  </a:txBody>
+                  <a:tcPr/>
+                </a:tc>
+                <a:tc>
+                  <a:txBody>
+                    <a:bodyPr/>
+                    <a:lstStyle/>
+                    <a:p>
+                      <a:r>
+                        <a:rPr lang="en-GB" sz="2000" dirty="0" err="1" smtClean="0"/>
+                        <a:t>RavenDB</a:t>
+                      </a:r>
+                      <a:endParaRPr lang="en-GB" sz="2000" dirty="0"/>
+                    </a:p>
+                  </a:txBody>
+                  <a:tcPr/>
+                </a:tc>
+                <a:tc>
+                  <a:txBody>
+                    <a:bodyPr/>
+                    <a:lstStyle/>
+                    <a:p>
+                      <a:r>
+                        <a:rPr lang="en-GB" sz="2000" dirty="0" smtClean="0"/>
+                        <a:t>Neo4j</a:t>
+                      </a:r>
+                      <a:endParaRPr lang="en-GB" sz="2000" dirty="0"/>
+                    </a:p>
+                  </a:txBody>
+                  <a:tcPr/>
+                </a:tc>
+              </a:tr>
+              <a:tr h="370840">
+                <a:tc>
+                  <a:txBody>
+                    <a:bodyPr/>
+                    <a:lstStyle/>
+                    <a:p>
+                      <a:r>
+                        <a:rPr lang="en-GB" sz="2000" dirty="0" smtClean="0"/>
+                        <a:t>MySQL</a:t>
+                      </a:r>
+                    </a:p>
+                  </a:txBody>
+                  <a:tcPr/>
+                </a:tc>
+                <a:tc>
+                  <a:txBody>
+                    <a:bodyPr/>
+                    <a:lstStyle/>
+                    <a:p>
+                      <a:r>
+                        <a:rPr lang="en-GB" sz="2000" dirty="0" err="1" smtClean="0"/>
+                        <a:t>Riak</a:t>
+                      </a:r>
+                      <a:endParaRPr lang="en-GB" sz="2000" dirty="0"/>
+                    </a:p>
+                  </a:txBody>
+                  <a:tcPr/>
+                </a:tc>
+                <a:tc>
+                  <a:txBody>
+                    <a:bodyPr/>
+                    <a:lstStyle/>
+                    <a:p>
+                      <a:r>
+                        <a:rPr lang="en-GB" sz="2000" dirty="0" err="1" smtClean="0"/>
+                        <a:t>HBase</a:t>
+                      </a:r>
+                      <a:endParaRPr lang="en-GB" sz="2000" dirty="0"/>
+                    </a:p>
+                  </a:txBody>
+                  <a:tcPr/>
+                </a:tc>
+                <a:tc>
+                  <a:txBody>
+                    <a:bodyPr/>
+                    <a:lstStyle/>
+                    <a:p>
+                      <a:r>
+                        <a:rPr lang="en-GB" sz="2000" dirty="0" err="1" smtClean="0"/>
+                        <a:t>CouchDB</a:t>
+                      </a:r>
+                      <a:endParaRPr lang="en-GB" sz="2000" dirty="0"/>
+                    </a:p>
+                  </a:txBody>
+                  <a:tcPr/>
+                </a:tc>
+                <a:tc>
+                  <a:txBody>
+                    <a:bodyPr/>
+                    <a:lstStyle/>
+                    <a:p>
+                      <a:r>
+                        <a:rPr lang="en-GB" sz="2000" dirty="0" err="1" smtClean="0"/>
+                        <a:t>OrientDB</a:t>
+                      </a:r>
+                      <a:endParaRPr lang="en-GB" sz="2000" dirty="0"/>
+                    </a:p>
+                  </a:txBody>
+                  <a:tcPr/>
+                </a:tc>
+              </a:tr>
+              <a:tr h="370840">
+                <a:tc>
+                  <a:txBody>
+                    <a:bodyPr/>
+                    <a:lstStyle/>
+                    <a:p>
+                      <a:r>
+                        <a:rPr lang="en-GB" sz="2000" dirty="0" smtClean="0"/>
+                        <a:t>SQLite</a:t>
+                      </a:r>
+                      <a:endParaRPr lang="en-GB" sz="2000" dirty="0"/>
+                    </a:p>
+                  </a:txBody>
+                  <a:tcPr/>
+                </a:tc>
+                <a:tc>
+                  <a:txBody>
+                    <a:bodyPr/>
+                    <a:lstStyle/>
+                    <a:p>
+                      <a:r>
+                        <a:rPr lang="en-GB" sz="2000" dirty="0" err="1" smtClean="0"/>
+                        <a:t>Aerospike</a:t>
+                      </a:r>
+                      <a:endParaRPr lang="en-GB" sz="2000" dirty="0"/>
+                    </a:p>
+                  </a:txBody>
+                  <a:tcPr/>
+                </a:tc>
+                <a:tc>
+                  <a:txBody>
+                    <a:bodyPr/>
+                    <a:lstStyle/>
+                    <a:p>
+                      <a:endParaRPr lang="en-GB" sz="2000" dirty="0"/>
+                    </a:p>
+                  </a:txBody>
+                  <a:tcPr/>
+                </a:tc>
+                <a:tc>
+                  <a:txBody>
+                    <a:bodyPr/>
+                    <a:lstStyle/>
+                    <a:p>
+                      <a:r>
+                        <a:rPr lang="en-GB" sz="2000" dirty="0" err="1" smtClean="0"/>
+                        <a:t>RethinkDB</a:t>
+                      </a:r>
+                      <a:endParaRPr lang="en-GB" sz="2000" dirty="0"/>
+                    </a:p>
+                  </a:txBody>
+                  <a:tcPr/>
+                </a:tc>
+                <a:tc>
+                  <a:txBody>
+                    <a:bodyPr/>
+                    <a:lstStyle/>
+                    <a:p>
+                      <a:r>
+                        <a:rPr lang="en-GB" sz="2000" dirty="0" err="1" smtClean="0"/>
+                        <a:t>StarDog</a:t>
+                      </a:r>
+                      <a:endParaRPr lang="en-GB" sz="2000" dirty="0"/>
+                    </a:p>
+                  </a:txBody>
+                  <a:tcPr/>
+                </a:tc>
+              </a:tr>
+              <a:tr h="370840">
+                <a:tc>
+                  <a:txBody>
+                    <a:bodyPr/>
+                    <a:lstStyle/>
+                    <a:p>
+                      <a:r>
+                        <a:rPr lang="en-GB" sz="2000" dirty="0" err="1" smtClean="0"/>
+                        <a:t>Postgres</a:t>
+                      </a:r>
+                      <a:endParaRPr lang="en-GB" sz="2000" dirty="0"/>
+                    </a:p>
+                  </a:txBody>
+                  <a:tcPr/>
+                </a:tc>
+                <a:tc>
+                  <a:txBody>
+                    <a:bodyPr/>
+                    <a:lstStyle/>
+                    <a:p>
+                      <a:endParaRPr lang="en-GB" sz="2000"/>
+                    </a:p>
+                  </a:txBody>
+                  <a:tcPr/>
+                </a:tc>
+                <a:tc>
+                  <a:txBody>
+                    <a:bodyPr/>
+                    <a:lstStyle/>
+                    <a:p>
+                      <a:endParaRPr lang="en-GB" sz="2000"/>
+                    </a:p>
+                  </a:txBody>
+                  <a:tcPr/>
+                </a:tc>
+                <a:tc>
+                  <a:txBody>
+                    <a:bodyPr/>
+                    <a:lstStyle/>
+                    <a:p>
+                      <a:endParaRPr lang="en-GB" sz="2000"/>
+                    </a:p>
+                  </a:txBody>
+                  <a:tcPr/>
+                </a:tc>
+                <a:tc>
+                  <a:txBody>
+                    <a:bodyPr/>
+                    <a:lstStyle/>
+                    <a:p>
+                      <a:endParaRPr lang="en-GB" sz="2000" dirty="0"/>
+                    </a:p>
+                  </a:txBody>
+                  <a:tcPr/>
+                </a:tc>
+              </a:tr>
+            </a:tbl>
+          </a:graphicData>
+        </a:graphic>
+      </p:graphicFrame>
+      <p:pic>
+        <p:nvPicPr>
+          <p:cNvPr id="7" name="Picture 6"/>
+          <p:cNvPicPr>
+            <a:picLocks noChangeAspect="1"/>
+          </p:cNvPicPr>
+          <p:nvPr/>
+        </p:nvPicPr>
+        <p:blipFill>
+          <a:blip r:embed="rId3" cstate="print">
+            <a:extLst>
+              <a:ext uri="{28A0092B-C50C-407E-A947-70E740481C1C}">
+                <a14:useLocalDpi xmlns:a14="http://schemas.microsoft.com/office/drawing/2010/main" val="0"/>
+              </a:ext>
+            </a:extLst>
+          </a:blip>
+          <a:stretch>
+            <a:fillRect/>
+          </a:stretch>
+        </p:blipFill>
+        <p:spPr>
+          <a:xfrm>
+            <a:off x="1185416" y="4797152"/>
+            <a:ext cx="1440000" cy="1440000"/>
+          </a:xfrm>
+          <a:prstGeom prst="rect">
+            <a:avLst/>
+          </a:prstGeom>
+        </p:spPr>
+      </p:pic>
+      <p:pic>
+        <p:nvPicPr>
+          <p:cNvPr id="8" name="Picture 7"/>
+          <p:cNvPicPr>
+            <a:picLocks noChangeAspect="1"/>
+          </p:cNvPicPr>
+          <p:nvPr/>
+        </p:nvPicPr>
+        <p:blipFill>
+          <a:blip r:embed="rId4" cstate="print">
+            <a:extLst>
+              <a:ext uri="{28A0092B-C50C-407E-A947-70E740481C1C}">
+                <a14:useLocalDpi xmlns:a14="http://schemas.microsoft.com/office/drawing/2010/main" val="0"/>
+              </a:ext>
+            </a:extLst>
+          </a:blip>
+          <a:stretch>
+            <a:fillRect/>
+          </a:stretch>
+        </p:blipFill>
+        <p:spPr>
+          <a:xfrm>
+            <a:off x="6619928" y="4797152"/>
+            <a:ext cx="1440000" cy="1440000"/>
+          </a:xfrm>
+          <a:prstGeom prst="rect">
+            <a:avLst/>
+          </a:prstGeom>
+        </p:spPr>
+      </p:pic>
+      <p:pic>
+        <p:nvPicPr>
+          <p:cNvPr id="9" name="Picture 8"/>
+          <p:cNvPicPr>
+            <a:picLocks noChangeAspect="1"/>
+          </p:cNvPicPr>
+          <p:nvPr/>
+        </p:nvPicPr>
+        <p:blipFill>
+          <a:blip r:embed="rId5" cstate="print">
+            <a:extLst>
+              <a:ext uri="{28A0092B-C50C-407E-A947-70E740481C1C}">
+                <a14:useLocalDpi xmlns:a14="http://schemas.microsoft.com/office/drawing/2010/main" val="0"/>
+              </a:ext>
+            </a:extLst>
+          </a:blip>
+          <a:stretch>
+            <a:fillRect/>
+          </a:stretch>
+        </p:blipFill>
+        <p:spPr>
+          <a:xfrm>
+            <a:off x="3852000" y="4797152"/>
+            <a:ext cx="1440000" cy="1440000"/>
+          </a:xfrm>
+          <a:prstGeom prst="rect">
+            <a:avLst/>
+          </a:prstGeom>
+        </p:spPr>
+      </p:pic>
+    </p:spTree>
+    <p:extLst>
+      <p:ext uri="{BB962C8B-B14F-4D97-AF65-F5344CB8AC3E}">
+        <p14:creationId xmlns:p14="http://schemas.microsoft.com/office/powerpoint/2010/main" val="101812021"/>
+      </p:ext>
+    </p:extLst>
+  </p:cSld>
+  <p:clrMapOvr>
+    <a:masterClrMapping/>
+  </p:clrMapOvr>
+  <p:timing>
+    <p:tnLst>
+      <p:par>
+        <p:cTn id="1" dur="indefinite" restart="never" nodeType="tmRoot">
+          <p:childTnLst>
+            <p:seq concurrent="1" nextAc="seek">
+              <p:cTn id="2" dur="indefinite" nodeType="mainSeq">
+                <p:childTnLst>
+                  <p:par>
+                    <p:cTn id="3" fill="hold">
+                      <p:stCondLst>
+                        <p:cond delay="indefinite"/>
+                      </p:stCondLst>
+                      <p:childTnLst>
+                        <p:par>
+                          <p:cTn id="4" fill="hold">
+                            <p:stCondLst>
+                              <p:cond delay="0"/>
+                            </p:stCondLst>
+                            <p:childTnLst>
+                              <p:par>
+                                <p:cTn id="5" presetID="1" presetClass="entr" presetSubtype="0" fill="hold" nodeType="clickEffect">
+                                  <p:stCondLst>
+                                    <p:cond delay="0"/>
+                                  </p:stCondLst>
+                                  <p:childTnLst>
+                                    <p:set>
+                                      <p:cBhvr>
+                                        <p:cTn id="6" dur="1" fill="hold">
+                                          <p:stCondLst>
+                                            <p:cond delay="0"/>
+                                          </p:stCondLst>
+                                        </p:cTn>
+                                        <p:tgtEl>
+                                          <p:spTgt spid="7"/>
+                                        </p:tgtEl>
+                                        <p:attrNameLst>
+                                          <p:attrName>style.visibility</p:attrName>
+                                        </p:attrNameLst>
+                                      </p:cBhvr>
+                                      <p:to>
+                                        <p:strVal val="visible"/>
+                                      </p:to>
+                                    </p:set>
+                                  </p:childTnLst>
+                                </p:cTn>
+                              </p:par>
+                            </p:childTnLst>
+                          </p:cTn>
+                        </p:par>
+                      </p:childTnLst>
+                    </p:cTn>
+                  </p:par>
+                  <p:par>
+                    <p:cTn id="7" fill="hold">
+                      <p:stCondLst>
+                        <p:cond delay="indefinite"/>
+                      </p:stCondLst>
+                      <p:childTnLst>
+                        <p:par>
+                          <p:cTn id="8" fill="hold">
+                            <p:stCondLst>
+                              <p:cond delay="0"/>
+                            </p:stCondLst>
+                            <p:childTnLst>
+                              <p:par>
+                                <p:cTn id="9" presetID="1" presetClass="entr" presetSubtype="0" fill="hold" nodeType="clickEffect">
+                                  <p:stCondLst>
+                                    <p:cond delay="0"/>
+                                  </p:stCondLst>
+                                  <p:childTnLst>
+                                    <p:set>
+                                      <p:cBhvr>
+                                        <p:cTn id="10" dur="1" fill="hold">
+                                          <p:stCondLst>
+                                            <p:cond delay="0"/>
+                                          </p:stCondLst>
+                                        </p:cTn>
+                                        <p:tgtEl>
+                                          <p:spTgt spid="9"/>
+                                        </p:tgtEl>
+                                        <p:attrNameLst>
+                                          <p:attrName>style.visibility</p:attrName>
+                                        </p:attrNameLst>
+                                      </p:cBhvr>
+                                      <p:to>
+                                        <p:strVal val="visible"/>
+                                      </p:to>
+                                    </p:set>
+                                  </p:childTnLst>
+                                </p:cTn>
+                              </p:par>
+                            </p:childTnLst>
+                          </p:cTn>
+                        </p:par>
+                      </p:childTnLst>
+                    </p:cTn>
+                  </p:par>
+                  <p:par>
+                    <p:cTn id="11" fill="hold">
+                      <p:stCondLst>
+                        <p:cond delay="indefinite"/>
+                      </p:stCondLst>
+                      <p:childTnLst>
+                        <p:par>
+                          <p:cTn id="12" fill="hold">
+                            <p:stCondLst>
+                              <p:cond delay="0"/>
+                            </p:stCondLst>
+                            <p:childTnLst>
+                              <p:par>
+                                <p:cTn id="13" presetID="1" presetClass="entr" presetSubtype="0" fill="hold" nodeType="clickEffect">
+                                  <p:stCondLst>
+                                    <p:cond delay="0"/>
+                                  </p:stCondLst>
+                                  <p:childTnLst>
+                                    <p:set>
+                                      <p:cBhvr>
+                                        <p:cTn id="14" dur="1" fill="hold">
+                                          <p:stCondLst>
+                                            <p:cond delay="0"/>
+                                          </p:stCondLst>
+                                        </p:cTn>
+                                        <p:tgtEl>
+                                          <p:spTgt spid="8"/>
+                                        </p:tgtEl>
+                                        <p:attrNameLst>
+                                          <p:attrName>style.visibility</p:attrName>
+                                        </p:attrNameLst>
+                                      </p:cBhvr>
+                                      <p:to>
+                                        <p:strVal val="visible"/>
+                                      </p:to>
+                                    </p:set>
+                                  </p:childTnLst>
+                                </p:cTn>
+                              </p:par>
+                            </p:childTnLst>
+                          </p:cTn>
+                        </p:par>
+                      </p:childTnLst>
+                    </p:cTn>
+                  </p:par>
+                </p:childTnLst>
+              </p:cTn>
+              <p:prevCondLst>
+                <p:cond evt="onPrev" delay="0">
+                  <p:tgtEl>
+                    <p:sldTgt/>
+                  </p:tgtEl>
+                </p:cond>
+              </p:prevCondLst>
+              <p:nextCondLst>
+                <p:cond evt="onNext" delay="0">
+                  <p:tgtEl>
+                    <p:sldTgt/>
+                  </p:tgtEl>
+                </p:cond>
+              </p:nextCondLst>
+            </p:seq>
+          </p:childTnLst>
+        </p:cTn>
+      </p:par>
+    </p:tnLst>
+  </p:timing>
+</p:sld>
+</file>
+
+<file path=ppt/slides/slide15.xml><?xml version="1.0" encoding="utf-8"?>
+<p:sld xmlns:a="http://schemas.openxmlformats.org/drawingml/2006/main" xmlns:r="http://schemas.openxmlformats.org/officeDocument/2006/relationships" xmlns:p="http://schemas.openxmlformats.org/presentationml/2006/main">
+  <p:cSld>
+    <p:spTree>
+      <p:nvGrpSpPr>
+        <p:cNvPr id="1" name=""/>
+        <p:cNvGrpSpPr/>
+        <p:nvPr/>
+      </p:nvGrpSpPr>
+      <p:grpSpPr>
+        <a:xfrm>
+          <a:off x="0" y="0"/>
+          <a:ext cx="0" cy="0"/>
+          <a:chOff x="0" y="0"/>
+          <a:chExt cx="0" cy="0"/>
+        </a:xfrm>
+      </p:grpSpPr>
       <p:pic>
         <p:nvPicPr>
           <p:cNvPr id="5" name="Picture Placeholder 4"/>
@@ -9484,7 +11218,728 @@
 </p:sld>
 </file>
 
-<file path=ppt/slides/slide14.xml><?xml version="1.0" encoding="utf-8"?>
+<file path=ppt/slides/slide16.xml><?xml version="1.0" encoding="utf-8"?>
+<p:sld xmlns:a="http://schemas.openxmlformats.org/drawingml/2006/main" xmlns:r="http://schemas.openxmlformats.org/officeDocument/2006/relationships" xmlns:p="http://schemas.openxmlformats.org/presentationml/2006/main">
+  <p:cSld>
+    <p:spTree>
+      <p:nvGrpSpPr>
+        <p:cNvPr id="1" name=""/>
+        <p:cNvGrpSpPr/>
+        <p:nvPr/>
+      </p:nvGrpSpPr>
+      <p:grpSpPr>
+        <a:xfrm>
+          <a:off x="0" y="0"/>
+          <a:ext cx="0" cy="0"/>
+          <a:chOff x="0" y="0"/>
+          <a:chExt cx="0" cy="0"/>
+        </a:xfrm>
+      </p:grpSpPr>
+      <p:sp>
+        <p:nvSpPr>
+          <p:cNvPr id="5" name="Title 3"/>
+          <p:cNvSpPr>
+            <a:spLocks noGrp="1"/>
+          </p:cNvSpPr>
+          <p:nvPr>
+            <p:ph type="title"/>
+          </p:nvPr>
+        </p:nvSpPr>
+        <p:spPr>
+          <a:xfrm>
+            <a:off x="0" y="127458"/>
+            <a:ext cx="9143999" cy="757130"/>
+          </a:xfrm>
+        </p:spPr>
+        <p:txBody>
+          <a:bodyPr anchor="ctr" anchorCtr="0">
+            <a:spAutoFit/>
+          </a:bodyPr>
+          <a:lstStyle/>
+          <a:p>
+            <a:r>
+              <a:rPr lang="en-GB" dirty="0" smtClean="0"/>
+              <a:t>Azure SQL</a:t>
+            </a:r>
+            <a:endParaRPr lang="en-GB" dirty="0"/>
+          </a:p>
+        </p:txBody>
+      </p:sp>
+      <p:graphicFrame>
+        <p:nvGraphicFramePr>
+          <p:cNvPr id="6" name="Table 5"/>
+          <p:cNvGraphicFramePr>
+            <a:graphicFrameLocks noGrp="1"/>
+          </p:cNvGraphicFramePr>
+          <p:nvPr>
+            <p:extLst>
+              <p:ext uri="{D42A27DB-BD31-4B8C-83A1-F6EECF244321}">
+                <p14:modId xmlns:p14="http://schemas.microsoft.com/office/powerpoint/2010/main" val="244347383"/>
+              </p:ext>
+            </p:extLst>
+          </p:nvPr>
+        </p:nvGraphicFramePr>
+        <p:xfrm>
+          <a:off x="994440" y="2060848"/>
+          <a:ext cx="7155118" cy="3565765"/>
+        </p:xfrm>
+        <a:graphic>
+          <a:graphicData uri="http://schemas.openxmlformats.org/drawingml/2006/table">
+            <a:tbl>
+              <a:tblPr firstRow="1" bandRow="1">
+                <a:tableStyleId>{8FD4443E-F989-4FC4-A0C8-D5A2AF1F390B}</a:tableStyleId>
+              </a:tblPr>
+              <a:tblGrid>
+                <a:gridCol w="2493328"/>
+                <a:gridCol w="1203643"/>
+                <a:gridCol w="1825943"/>
+                <a:gridCol w="1632204"/>
+              </a:tblGrid>
+              <a:tr h="509395">
+                <a:tc>
+                  <a:txBody>
+                    <a:bodyPr/>
+                    <a:lstStyle/>
+                    <a:p>
+                      <a:endParaRPr lang="en-GB" sz="2000" dirty="0"/>
+                    </a:p>
+                  </a:txBody>
+                  <a:tcPr anchor="ctr"/>
+                </a:tc>
+                <a:tc>
+                  <a:txBody>
+                    <a:bodyPr/>
+                    <a:lstStyle/>
+                    <a:p>
+                      <a:r>
+                        <a:rPr lang="en-GB" sz="2000" dirty="0" smtClean="0"/>
+                        <a:t>Basic</a:t>
+                      </a:r>
+                      <a:endParaRPr lang="en-GB" sz="2000" dirty="0"/>
+                    </a:p>
+                  </a:txBody>
+                  <a:tcPr anchor="ctr"/>
+                </a:tc>
+                <a:tc>
+                  <a:txBody>
+                    <a:bodyPr/>
+                    <a:lstStyle/>
+                    <a:p>
+                      <a:r>
+                        <a:rPr lang="en-GB" sz="2000" dirty="0" smtClean="0"/>
+                        <a:t>Standard</a:t>
+                      </a:r>
+                      <a:endParaRPr lang="en-GB" sz="2000" dirty="0"/>
+                    </a:p>
+                  </a:txBody>
+                  <a:tcPr anchor="ctr"/>
+                </a:tc>
+                <a:tc>
+                  <a:txBody>
+                    <a:bodyPr/>
+                    <a:lstStyle/>
+                    <a:p>
+                      <a:r>
+                        <a:rPr lang="en-GB" sz="2000" dirty="0" smtClean="0"/>
+                        <a:t>Premium</a:t>
+                      </a:r>
+                      <a:endParaRPr lang="en-GB" sz="2000" dirty="0"/>
+                    </a:p>
+                  </a:txBody>
+                  <a:tcPr anchor="ctr"/>
+                </a:tc>
+              </a:tr>
+              <a:tr h="509395">
+                <a:tc>
+                  <a:txBody>
+                    <a:bodyPr/>
+                    <a:lstStyle/>
+                    <a:p>
+                      <a:r>
+                        <a:rPr lang="en-GB" sz="2000" dirty="0" smtClean="0"/>
+                        <a:t>DTUs</a:t>
+                      </a:r>
+                      <a:endParaRPr lang="en-GB" sz="2000" dirty="0"/>
+                    </a:p>
+                  </a:txBody>
+                  <a:tcPr anchor="ctr"/>
+                </a:tc>
+                <a:tc>
+                  <a:txBody>
+                    <a:bodyPr/>
+                    <a:lstStyle/>
+                    <a:p>
+                      <a:r>
+                        <a:rPr lang="en-GB" sz="2000" dirty="0" smtClean="0"/>
+                        <a:t>5</a:t>
+                      </a:r>
+                      <a:endParaRPr lang="en-GB" sz="2000" dirty="0"/>
+                    </a:p>
+                  </a:txBody>
+                  <a:tcPr anchor="ctr"/>
+                </a:tc>
+                <a:tc>
+                  <a:txBody>
+                    <a:bodyPr/>
+                    <a:lstStyle/>
+                    <a:p>
+                      <a:r>
+                        <a:rPr lang="en-GB" sz="2000" dirty="0" smtClean="0"/>
+                        <a:t>10-100</a:t>
+                      </a:r>
+                      <a:endParaRPr lang="en-GB" sz="2000" dirty="0"/>
+                    </a:p>
+                  </a:txBody>
+                  <a:tcPr anchor="ctr"/>
+                </a:tc>
+                <a:tc>
+                  <a:txBody>
+                    <a:bodyPr/>
+                    <a:lstStyle/>
+                    <a:p>
+                      <a:r>
+                        <a:rPr lang="en-GB" sz="2000" dirty="0" smtClean="0"/>
+                        <a:t>125-1000</a:t>
+                      </a:r>
+                      <a:endParaRPr lang="en-GB" sz="2000" dirty="0"/>
+                    </a:p>
+                  </a:txBody>
+                  <a:tcPr anchor="ctr"/>
+                </a:tc>
+              </a:tr>
+              <a:tr h="509395">
+                <a:tc>
+                  <a:txBody>
+                    <a:bodyPr/>
+                    <a:lstStyle/>
+                    <a:p>
+                      <a:r>
+                        <a:rPr lang="en-GB" sz="2000" dirty="0" smtClean="0"/>
+                        <a:t>Max DB Size</a:t>
+                      </a:r>
+                      <a:endParaRPr lang="en-GB" sz="2000" dirty="0"/>
+                    </a:p>
+                  </a:txBody>
+                  <a:tcPr anchor="ctr"/>
+                </a:tc>
+                <a:tc>
+                  <a:txBody>
+                    <a:bodyPr/>
+                    <a:lstStyle/>
+                    <a:p>
+                      <a:r>
+                        <a:rPr lang="en-GB" sz="2000" dirty="0" smtClean="0"/>
+                        <a:t>2GB</a:t>
+                      </a:r>
+                      <a:endParaRPr lang="en-GB" sz="2000" dirty="0"/>
+                    </a:p>
+                  </a:txBody>
+                  <a:tcPr anchor="ctr"/>
+                </a:tc>
+                <a:tc>
+                  <a:txBody>
+                    <a:bodyPr/>
+                    <a:lstStyle/>
+                    <a:p>
+                      <a:r>
+                        <a:rPr lang="en-GB" sz="2000" dirty="0" smtClean="0"/>
+                        <a:t>250GB</a:t>
+                      </a:r>
+                      <a:endParaRPr lang="en-GB" sz="2000" dirty="0"/>
+                    </a:p>
+                  </a:txBody>
+                  <a:tcPr anchor="ctr"/>
+                </a:tc>
+                <a:tc>
+                  <a:txBody>
+                    <a:bodyPr/>
+                    <a:lstStyle/>
+                    <a:p>
+                      <a:r>
+                        <a:rPr lang="en-GB" sz="2000" dirty="0" smtClean="0"/>
+                        <a:t>500GB</a:t>
+                      </a:r>
+                      <a:endParaRPr lang="en-GB" sz="2000" dirty="0"/>
+                    </a:p>
+                  </a:txBody>
+                  <a:tcPr anchor="ctr"/>
+                </a:tc>
+              </a:tr>
+              <a:tr h="509395">
+                <a:tc>
+                  <a:txBody>
+                    <a:bodyPr/>
+                    <a:lstStyle/>
+                    <a:p>
+                      <a:r>
+                        <a:rPr lang="en-GB" sz="2000" dirty="0" err="1" smtClean="0"/>
+                        <a:t>Mx</a:t>
+                      </a:r>
+                      <a:r>
+                        <a:rPr lang="en-GB" sz="2000" dirty="0" smtClean="0"/>
+                        <a:t> Concurrent </a:t>
+                      </a:r>
+                      <a:r>
+                        <a:rPr lang="en-GB" sz="2000" dirty="0" err="1" smtClean="0"/>
+                        <a:t>Reqs</a:t>
+                      </a:r>
+                      <a:endParaRPr lang="en-GB" sz="2000" dirty="0"/>
+                    </a:p>
+                  </a:txBody>
+                  <a:tcPr anchor="ctr"/>
+                </a:tc>
+                <a:tc>
+                  <a:txBody>
+                    <a:bodyPr/>
+                    <a:lstStyle/>
+                    <a:p>
+                      <a:r>
+                        <a:rPr lang="en-GB" sz="2000" dirty="0" smtClean="0"/>
+                        <a:t>30</a:t>
+                      </a:r>
+                      <a:endParaRPr lang="en-GB" sz="2000" dirty="0"/>
+                    </a:p>
+                  </a:txBody>
+                  <a:tcPr anchor="ctr"/>
+                </a:tc>
+                <a:tc>
+                  <a:txBody>
+                    <a:bodyPr/>
+                    <a:lstStyle/>
+                    <a:p>
+                      <a:r>
+                        <a:rPr lang="en-GB" sz="2000" dirty="0" smtClean="0"/>
+                        <a:t>60 - 200</a:t>
+                      </a:r>
+                      <a:endParaRPr lang="en-GB" sz="2000" dirty="0"/>
+                    </a:p>
+                  </a:txBody>
+                  <a:tcPr anchor="ctr"/>
+                </a:tc>
+                <a:tc>
+                  <a:txBody>
+                    <a:bodyPr/>
+                    <a:lstStyle/>
+                    <a:p>
+                      <a:r>
+                        <a:rPr lang="en-GB" sz="2000" dirty="0" smtClean="0"/>
+                        <a:t>200 - 1600</a:t>
+                      </a:r>
+                      <a:endParaRPr lang="en-GB" sz="2000" dirty="0"/>
+                    </a:p>
+                  </a:txBody>
+                  <a:tcPr anchor="ctr"/>
+                </a:tc>
+              </a:tr>
+              <a:tr h="509395">
+                <a:tc>
+                  <a:txBody>
+                    <a:bodyPr/>
+                    <a:lstStyle/>
+                    <a:p>
+                      <a:r>
+                        <a:rPr lang="en-GB" sz="2000" dirty="0" err="1" smtClean="0"/>
+                        <a:t>Mx</a:t>
+                      </a:r>
+                      <a:r>
+                        <a:rPr lang="en-GB" sz="2000" dirty="0" smtClean="0"/>
+                        <a:t> Concurrent Logins</a:t>
+                      </a:r>
+                      <a:endParaRPr lang="en-GB" sz="2000" dirty="0"/>
+                    </a:p>
+                  </a:txBody>
+                  <a:tcPr anchor="ctr"/>
+                </a:tc>
+                <a:tc>
+                  <a:txBody>
+                    <a:bodyPr/>
+                    <a:lstStyle/>
+                    <a:p>
+                      <a:r>
+                        <a:rPr lang="en-GB" sz="2000" dirty="0" smtClean="0"/>
+                        <a:t>30</a:t>
+                      </a:r>
+                      <a:endParaRPr lang="en-GB" sz="2000" dirty="0"/>
+                    </a:p>
+                  </a:txBody>
+                  <a:tcPr anchor="ctr"/>
+                </a:tc>
+                <a:tc>
+                  <a:txBody>
+                    <a:bodyPr/>
+                    <a:lstStyle/>
+                    <a:p>
+                      <a:r>
+                        <a:rPr lang="en-GB" sz="2000" dirty="0" smtClean="0"/>
+                        <a:t>60 - 200</a:t>
+                      </a:r>
+                      <a:endParaRPr lang="en-GB" sz="2000" dirty="0"/>
+                    </a:p>
+                  </a:txBody>
+                  <a:tcPr anchor="ctr"/>
+                </a:tc>
+                <a:tc>
+                  <a:txBody>
+                    <a:bodyPr/>
+                    <a:lstStyle/>
+                    <a:p>
+                      <a:r>
+                        <a:rPr lang="en-GB" sz="2000" dirty="0" smtClean="0"/>
+                        <a:t>200-  1600</a:t>
+                      </a:r>
+                      <a:endParaRPr lang="en-GB" sz="2000" dirty="0"/>
+                    </a:p>
+                  </a:txBody>
+                  <a:tcPr anchor="ctr"/>
+                </a:tc>
+              </a:tr>
+              <a:tr h="509395">
+                <a:tc>
+                  <a:txBody>
+                    <a:bodyPr/>
+                    <a:lstStyle/>
+                    <a:p>
+                      <a:r>
+                        <a:rPr lang="en-GB" sz="2000" dirty="0" err="1" smtClean="0"/>
+                        <a:t>Mx</a:t>
+                      </a:r>
+                      <a:r>
+                        <a:rPr lang="en-GB" sz="2000" dirty="0" smtClean="0"/>
+                        <a:t> Sessions</a:t>
+                      </a:r>
+                      <a:endParaRPr lang="en-GB" sz="2000" dirty="0"/>
+                    </a:p>
+                  </a:txBody>
+                  <a:tcPr anchor="ctr"/>
+                </a:tc>
+                <a:tc>
+                  <a:txBody>
+                    <a:bodyPr/>
+                    <a:lstStyle/>
+                    <a:p>
+                      <a:r>
+                        <a:rPr lang="en-GB" sz="2000" dirty="0" smtClean="0"/>
+                        <a:t>300</a:t>
+                      </a:r>
+                      <a:endParaRPr lang="en-GB" sz="2000" dirty="0"/>
+                    </a:p>
+                  </a:txBody>
+                  <a:tcPr anchor="ctr"/>
+                </a:tc>
+                <a:tc>
+                  <a:txBody>
+                    <a:bodyPr/>
+                    <a:lstStyle/>
+                    <a:p>
+                      <a:r>
+                        <a:rPr lang="en-GB" sz="2000" dirty="0" smtClean="0"/>
+                        <a:t>600 - 2400</a:t>
+                      </a:r>
+                      <a:endParaRPr lang="en-GB" sz="2000" dirty="0"/>
+                    </a:p>
+                  </a:txBody>
+                  <a:tcPr anchor="ctr"/>
+                </a:tc>
+                <a:tc>
+                  <a:txBody>
+                    <a:bodyPr/>
+                    <a:lstStyle/>
+                    <a:p>
+                      <a:r>
+                        <a:rPr lang="en-GB" sz="2000" dirty="0" smtClean="0"/>
+                        <a:t>2400  -19200</a:t>
+                      </a:r>
+                      <a:endParaRPr lang="en-GB" sz="2000" dirty="0"/>
+                    </a:p>
+                  </a:txBody>
+                  <a:tcPr anchor="ctr"/>
+                </a:tc>
+              </a:tr>
+              <a:tr h="509395">
+                <a:tc>
+                  <a:txBody>
+                    <a:bodyPr/>
+                    <a:lstStyle/>
+                    <a:p>
+                      <a:r>
+                        <a:rPr lang="en-GB" sz="2000" dirty="0" smtClean="0"/>
+                        <a:t>Transaction Rate</a:t>
+                      </a:r>
+                      <a:endParaRPr lang="en-GB" sz="2000" dirty="0"/>
+                    </a:p>
+                  </a:txBody>
+                  <a:tcPr anchor="ctr"/>
+                </a:tc>
+                <a:tc>
+                  <a:txBody>
+                    <a:bodyPr/>
+                    <a:lstStyle/>
+                    <a:p>
+                      <a:r>
+                        <a:rPr lang="en-GB" sz="2000" dirty="0" smtClean="0"/>
+                        <a:t>16600/hr</a:t>
+                      </a:r>
+                      <a:endParaRPr lang="en-GB" sz="2000" dirty="0"/>
+                    </a:p>
+                  </a:txBody>
+                  <a:tcPr anchor="ctr"/>
+                </a:tc>
+                <a:tc>
+                  <a:txBody>
+                    <a:bodyPr/>
+                    <a:lstStyle/>
+                    <a:p>
+                      <a:r>
+                        <a:rPr lang="en-GB" sz="2000" dirty="0" smtClean="0"/>
+                        <a:t>521 - 5100/min</a:t>
+                      </a:r>
+                      <a:endParaRPr lang="en-GB" sz="2000" dirty="0"/>
+                    </a:p>
+                  </a:txBody>
+                  <a:tcPr anchor="ctr"/>
+                </a:tc>
+                <a:tc>
+                  <a:txBody>
+                    <a:bodyPr/>
+                    <a:lstStyle/>
+                    <a:p>
+                      <a:r>
+                        <a:rPr lang="en-GB" sz="2000" dirty="0" smtClean="0"/>
+                        <a:t>105 - 735/sec</a:t>
+                      </a:r>
+                      <a:endParaRPr lang="en-GB" sz="2000" dirty="0"/>
+                    </a:p>
+                  </a:txBody>
+                  <a:tcPr anchor="ctr"/>
+                </a:tc>
+              </a:tr>
+            </a:tbl>
+          </a:graphicData>
+        </a:graphic>
+      </p:graphicFrame>
+    </p:spTree>
+    <p:extLst>
+      <p:ext uri="{BB962C8B-B14F-4D97-AF65-F5344CB8AC3E}">
+        <p14:creationId xmlns:p14="http://schemas.microsoft.com/office/powerpoint/2010/main" val="148016406"/>
+      </p:ext>
+    </p:extLst>
+  </p:cSld>
+  <p:clrMapOvr>
+    <a:masterClrMapping/>
+  </p:clrMapOvr>
+  <p:timing>
+    <p:tnLst>
+      <p:par>
+        <p:cTn id="1" dur="indefinite" restart="never" nodeType="tmRoot"/>
+      </p:par>
+    </p:tnLst>
+  </p:timing>
+</p:sld>
+</file>
+
+<file path=ppt/slides/slide17.xml><?xml version="1.0" encoding="utf-8"?>
+<p:sld xmlns:a="http://schemas.openxmlformats.org/drawingml/2006/main" xmlns:r="http://schemas.openxmlformats.org/officeDocument/2006/relationships" xmlns:p="http://schemas.openxmlformats.org/presentationml/2006/main">
+  <p:cSld>
+    <p:spTree>
+      <p:nvGrpSpPr>
+        <p:cNvPr id="1" name=""/>
+        <p:cNvGrpSpPr/>
+        <p:nvPr/>
+      </p:nvGrpSpPr>
+      <p:grpSpPr>
+        <a:xfrm>
+          <a:off x="0" y="0"/>
+          <a:ext cx="0" cy="0"/>
+          <a:chOff x="0" y="0"/>
+          <a:chExt cx="0" cy="0"/>
+        </a:xfrm>
+      </p:grpSpPr>
+      <p:sp>
+        <p:nvSpPr>
+          <p:cNvPr id="5" name="Title 3"/>
+          <p:cNvSpPr>
+            <a:spLocks noGrp="1"/>
+          </p:cNvSpPr>
+          <p:nvPr>
+            <p:ph type="title"/>
+          </p:nvPr>
+        </p:nvSpPr>
+        <p:spPr>
+          <a:xfrm>
+            <a:off x="0" y="123483"/>
+            <a:ext cx="9143999" cy="765081"/>
+          </a:xfrm>
+        </p:spPr>
+        <p:txBody>
+          <a:bodyPr anchor="ctr" anchorCtr="0">
+            <a:spAutoFit/>
+          </a:bodyPr>
+          <a:lstStyle/>
+          <a:p>
+            <a:r>
+              <a:rPr lang="en-GB" dirty="0" smtClean="0"/>
+              <a:t>Azure </a:t>
+            </a:r>
+            <a:r>
+              <a:rPr lang="en-GB" dirty="0" smtClean="0"/>
+              <a:t>SQL - Scale</a:t>
+            </a:r>
+            <a:endParaRPr lang="en-GB" dirty="0"/>
+          </a:p>
+        </p:txBody>
+      </p:sp>
+      <p:pic>
+        <p:nvPicPr>
+          <p:cNvPr id="7" name="Picture 6"/>
+          <p:cNvPicPr>
+            <a:picLocks noChangeAspect="1"/>
+          </p:cNvPicPr>
+          <p:nvPr/>
+        </p:nvPicPr>
+        <p:blipFill>
+          <a:blip r:embed="rId3">
+            <a:extLst>
+              <a:ext uri="{28A0092B-C50C-407E-A947-70E740481C1C}">
+                <a14:useLocalDpi xmlns:a14="http://schemas.microsoft.com/office/drawing/2010/main" val="0"/>
+              </a:ext>
+            </a:extLst>
+          </a:blip>
+          <a:stretch>
+            <a:fillRect/>
+          </a:stretch>
+        </p:blipFill>
+        <p:spPr>
+          <a:xfrm>
+            <a:off x="395534" y="2201569"/>
+            <a:ext cx="8352930" cy="3615624"/>
+          </a:xfrm>
+          <a:prstGeom prst="rect">
+            <a:avLst/>
+          </a:prstGeom>
+        </p:spPr>
+      </p:pic>
+    </p:spTree>
+    <p:extLst>
+      <p:ext uri="{BB962C8B-B14F-4D97-AF65-F5344CB8AC3E}">
+        <p14:creationId xmlns:p14="http://schemas.microsoft.com/office/powerpoint/2010/main" val="931965844"/>
+      </p:ext>
+    </p:extLst>
+  </p:cSld>
+  <p:clrMapOvr>
+    <a:masterClrMapping/>
+  </p:clrMapOvr>
+  <p:timing>
+    <p:tnLst>
+      <p:par>
+        <p:cTn id="1" dur="indefinite" restart="never" nodeType="tmRoot"/>
+      </p:par>
+    </p:tnLst>
+  </p:timing>
+</p:sld>
+</file>
+
+<file path=ppt/slides/slide18.xml><?xml version="1.0" encoding="utf-8"?>
+<p:sld xmlns:a="http://schemas.openxmlformats.org/drawingml/2006/main" xmlns:r="http://schemas.openxmlformats.org/officeDocument/2006/relationships" xmlns:p="http://schemas.openxmlformats.org/presentationml/2006/main">
+  <p:cSld>
+    <p:spTree>
+      <p:nvGrpSpPr>
+        <p:cNvPr id="1" name=""/>
+        <p:cNvGrpSpPr/>
+        <p:nvPr/>
+      </p:nvGrpSpPr>
+      <p:grpSpPr>
+        <a:xfrm>
+          <a:off x="0" y="0"/>
+          <a:ext cx="0" cy="0"/>
+          <a:chOff x="0" y="0"/>
+          <a:chExt cx="0" cy="0"/>
+        </a:xfrm>
+      </p:grpSpPr>
+      <p:sp>
+        <p:nvSpPr>
+          <p:cNvPr id="5" name="Title 3"/>
+          <p:cNvSpPr>
+            <a:spLocks noGrp="1"/>
+          </p:cNvSpPr>
+          <p:nvPr>
+            <p:ph type="title"/>
+          </p:nvPr>
+        </p:nvSpPr>
+        <p:spPr>
+          <a:xfrm>
+            <a:off x="0" y="123483"/>
+            <a:ext cx="9143999" cy="765081"/>
+          </a:xfrm>
+        </p:spPr>
+        <p:txBody>
+          <a:bodyPr anchor="ctr" anchorCtr="0">
+            <a:spAutoFit/>
+          </a:bodyPr>
+          <a:lstStyle/>
+          <a:p>
+            <a:r>
+              <a:rPr lang="en-GB" dirty="0" smtClean="0"/>
+              <a:t>Azure </a:t>
+            </a:r>
+            <a:r>
+              <a:rPr lang="en-GB" dirty="0" smtClean="0"/>
+              <a:t>SQL - Scale</a:t>
+            </a:r>
+            <a:endParaRPr lang="en-GB" dirty="0"/>
+          </a:p>
+        </p:txBody>
+      </p:sp>
+      <p:pic>
+        <p:nvPicPr>
+          <p:cNvPr id="7" name="Picture 6"/>
+          <p:cNvPicPr>
+            <a:picLocks noChangeAspect="1"/>
+          </p:cNvPicPr>
+          <p:nvPr/>
+        </p:nvPicPr>
+        <p:blipFill>
+          <a:blip r:embed="rId3">
+            <a:extLst>
+              <a:ext uri="{28A0092B-C50C-407E-A947-70E740481C1C}">
+                <a14:useLocalDpi xmlns:a14="http://schemas.microsoft.com/office/drawing/2010/main" val="0"/>
+              </a:ext>
+            </a:extLst>
+          </a:blip>
+          <a:stretch>
+            <a:fillRect/>
+          </a:stretch>
+        </p:blipFill>
+        <p:spPr>
+          <a:xfrm>
+            <a:off x="395534" y="2201569"/>
+            <a:ext cx="8352930" cy="3615624"/>
+          </a:xfrm>
+          <a:prstGeom prst="rect">
+            <a:avLst/>
+          </a:prstGeom>
+        </p:spPr>
+      </p:pic>
+    </p:spTree>
+    <p:extLst>
+      <p:ext uri="{BB962C8B-B14F-4D97-AF65-F5344CB8AC3E}">
+        <p14:creationId xmlns:p14="http://schemas.microsoft.com/office/powerpoint/2010/main" val="2601876045"/>
+      </p:ext>
+    </p:extLst>
+  </p:cSld>
+  <p:clrMapOvr>
+    <a:masterClrMapping/>
+  </p:clrMapOvr>
+  <p:timing>
+    <p:tnLst>
+      <p:par>
+        <p:cTn id="1" dur="indefinite" restart="never" nodeType="tmRoot"/>
+      </p:par>
+    </p:tnLst>
+  </p:timing>
+</p:sld>
+</file>
+
+<file path=ppt/slides/slide19.xml><?xml version="1.0" encoding="utf-8"?>
 <p:sld xmlns:a="http://schemas.openxmlformats.org/drawingml/2006/main" xmlns:r="http://schemas.openxmlformats.org/officeDocument/2006/relationships" xmlns:p="http://schemas.openxmlformats.org/presentationml/2006/main">
   <p:cSld>
     <p:spTree>
@@ -9581,7 +12036,351 @@
 </p:sld>
 </file>
 
-<file path=ppt/slides/slide15.xml><?xml version="1.0" encoding="utf-8"?>
+<file path=ppt/slides/slide2.xml><?xml version="1.0" encoding="utf-8"?>
+<p:sld xmlns:a="http://schemas.openxmlformats.org/drawingml/2006/main" xmlns:r="http://schemas.openxmlformats.org/officeDocument/2006/relationships" xmlns:p="http://schemas.openxmlformats.org/presentationml/2006/main">
+  <p:cSld>
+    <p:spTree>
+      <p:nvGrpSpPr>
+        <p:cNvPr id="1" name=""/>
+        <p:cNvGrpSpPr/>
+        <p:nvPr/>
+      </p:nvGrpSpPr>
+      <p:grpSpPr>
+        <a:xfrm>
+          <a:off x="0" y="0"/>
+          <a:ext cx="0" cy="0"/>
+          <a:chOff x="0" y="0"/>
+          <a:chExt cx="0" cy="0"/>
+        </a:xfrm>
+      </p:grpSpPr>
+      <p:sp>
+        <p:nvSpPr>
+          <p:cNvPr id="2" name="Title 1"/>
+          <p:cNvSpPr>
+            <a:spLocks noGrp="1"/>
+          </p:cNvSpPr>
+          <p:nvPr>
+            <p:ph type="title"/>
+          </p:nvPr>
+        </p:nvSpPr>
+        <p:spPr>
+          <a:xfrm>
+            <a:off x="0" y="126000"/>
+            <a:ext cx="9143999" cy="757130"/>
+          </a:xfrm>
+        </p:spPr>
+        <p:txBody>
+          <a:bodyPr anchor="ctr" anchorCtr="1">
+            <a:spAutoFit/>
+          </a:bodyPr>
+          <a:lstStyle/>
+          <a:p>
+            <a:r>
+              <a:rPr lang="en-GB" dirty="0" smtClean="0"/>
+              <a:t>What is Azure</a:t>
+            </a:r>
+            <a:endParaRPr lang="en-GB" dirty="0"/>
+          </a:p>
+        </p:txBody>
+      </p:sp>
+      <p:pic>
+        <p:nvPicPr>
+          <p:cNvPr id="5" name="Picture Placeholder 4"/>
+          <p:cNvPicPr>
+            <a:picLocks noGrp="1" noChangeAspect="1"/>
+          </p:cNvPicPr>
+          <p:nvPr>
+            <p:ph type="pic" sz="quarter" idx="10"/>
+          </p:nvPr>
+        </p:nvPicPr>
+        <p:blipFill>
+          <a:blip r:embed="rId3">
+            <a:extLst>
+              <a:ext uri="{28A0092B-C50C-407E-A947-70E740481C1C}">
+                <a14:useLocalDpi xmlns:a14="http://schemas.microsoft.com/office/drawing/2010/main" val="0"/>
+              </a:ext>
+            </a:extLst>
+          </a:blip>
+          <a:srcRect t="13314" b="13314"/>
+          <a:stretch>
+            <a:fillRect/>
+          </a:stretch>
+        </p:blipFill>
+        <p:spPr>
+          <a:xfrm>
+            <a:off x="3491880" y="2996952"/>
+            <a:ext cx="2160238" cy="1584994"/>
+          </a:xfrm>
+        </p:spPr>
+      </p:pic>
+      <p:pic>
+        <p:nvPicPr>
+          <p:cNvPr id="6" name="Picture 5"/>
+          <p:cNvPicPr>
+            <a:picLocks noChangeAspect="1"/>
+          </p:cNvPicPr>
+          <p:nvPr/>
+        </p:nvPicPr>
+        <p:blipFill>
+          <a:blip r:embed="rId4" cstate="print">
+            <a:extLst>
+              <a:ext uri="{28A0092B-C50C-407E-A947-70E740481C1C}">
+                <a14:useLocalDpi xmlns:a14="http://schemas.microsoft.com/office/drawing/2010/main" val="0"/>
+              </a:ext>
+            </a:extLst>
+          </a:blip>
+          <a:stretch>
+            <a:fillRect/>
+          </a:stretch>
+        </p:blipFill>
+        <p:spPr>
+          <a:xfrm>
+            <a:off x="4061926" y="1197571"/>
+            <a:ext cx="1260000" cy="1260000"/>
+          </a:xfrm>
+          <a:prstGeom prst="rect">
+            <a:avLst/>
+          </a:prstGeom>
+        </p:spPr>
+      </p:pic>
+      <p:pic>
+        <p:nvPicPr>
+          <p:cNvPr id="7" name="Picture 6"/>
+          <p:cNvPicPr>
+            <a:picLocks noChangeAspect="1"/>
+          </p:cNvPicPr>
+          <p:nvPr/>
+        </p:nvPicPr>
+        <p:blipFill>
+          <a:blip r:embed="rId5" cstate="print">
+            <a:extLst>
+              <a:ext uri="{28A0092B-C50C-407E-A947-70E740481C1C}">
+                <a14:useLocalDpi xmlns:a14="http://schemas.microsoft.com/office/drawing/2010/main" val="0"/>
+              </a:ext>
+            </a:extLst>
+          </a:blip>
+          <a:stretch>
+            <a:fillRect/>
+          </a:stretch>
+        </p:blipFill>
+        <p:spPr>
+          <a:xfrm>
+            <a:off x="1127412" y="4805768"/>
+            <a:ext cx="1260000" cy="1260000"/>
+          </a:xfrm>
+          <a:prstGeom prst="rect">
+            <a:avLst/>
+          </a:prstGeom>
+        </p:spPr>
+      </p:pic>
+      <p:pic>
+        <p:nvPicPr>
+          <p:cNvPr id="8" name="Picture 7"/>
+          <p:cNvPicPr>
+            <a:picLocks noChangeAspect="1"/>
+          </p:cNvPicPr>
+          <p:nvPr/>
+        </p:nvPicPr>
+        <p:blipFill>
+          <a:blip r:embed="rId6" cstate="print">
+            <a:extLst>
+              <a:ext uri="{28A0092B-C50C-407E-A947-70E740481C1C}">
+                <a14:useLocalDpi xmlns:a14="http://schemas.microsoft.com/office/drawing/2010/main" val="0"/>
+              </a:ext>
+            </a:extLst>
+          </a:blip>
+          <a:stretch>
+            <a:fillRect/>
+          </a:stretch>
+        </p:blipFill>
+        <p:spPr>
+          <a:xfrm>
+            <a:off x="6996440" y="1736952"/>
+            <a:ext cx="1260000" cy="1260000"/>
+          </a:xfrm>
+          <a:prstGeom prst="rect">
+            <a:avLst/>
+          </a:prstGeom>
+        </p:spPr>
+      </p:pic>
+      <p:pic>
+        <p:nvPicPr>
+          <p:cNvPr id="9" name="Picture 8"/>
+          <p:cNvPicPr>
+            <a:picLocks noChangeAspect="1"/>
+          </p:cNvPicPr>
+          <p:nvPr/>
+        </p:nvPicPr>
+        <p:blipFill>
+          <a:blip r:embed="rId7" cstate="print">
+            <a:extLst>
+              <a:ext uri="{28A0092B-C50C-407E-A947-70E740481C1C}">
+                <a14:useLocalDpi xmlns:a14="http://schemas.microsoft.com/office/drawing/2010/main" val="0"/>
+              </a:ext>
+            </a:extLst>
+          </a:blip>
+          <a:stretch>
+            <a:fillRect/>
+          </a:stretch>
+        </p:blipFill>
+        <p:spPr>
+          <a:xfrm>
+            <a:off x="6996440" y="4805768"/>
+            <a:ext cx="1260000" cy="1260000"/>
+          </a:xfrm>
+          <a:prstGeom prst="rect">
+            <a:avLst/>
+          </a:prstGeom>
+        </p:spPr>
+      </p:pic>
+      <p:pic>
+        <p:nvPicPr>
+          <p:cNvPr id="11" name="Picture 10"/>
+          <p:cNvPicPr>
+            <a:picLocks noChangeAspect="1"/>
+          </p:cNvPicPr>
+          <p:nvPr/>
+        </p:nvPicPr>
+        <p:blipFill>
+          <a:blip r:embed="rId8" cstate="print">
+            <a:extLst>
+              <a:ext uri="{28A0092B-C50C-407E-A947-70E740481C1C}">
+                <a14:useLocalDpi xmlns:a14="http://schemas.microsoft.com/office/drawing/2010/main" val="0"/>
+              </a:ext>
+            </a:extLst>
+          </a:blip>
+          <a:stretch>
+            <a:fillRect/>
+          </a:stretch>
+        </p:blipFill>
+        <p:spPr>
+          <a:xfrm>
+            <a:off x="1127412" y="1646359"/>
+            <a:ext cx="1260000" cy="1260000"/>
+          </a:xfrm>
+          <a:prstGeom prst="rect">
+            <a:avLst/>
+          </a:prstGeom>
+        </p:spPr>
+      </p:pic>
+      <p:pic>
+        <p:nvPicPr>
+          <p:cNvPr id="12" name="Picture 11"/>
+          <p:cNvPicPr>
+            <a:picLocks noChangeAspect="1"/>
+          </p:cNvPicPr>
+          <p:nvPr/>
+        </p:nvPicPr>
+        <p:blipFill>
+          <a:blip r:embed="rId9" cstate="print">
+            <a:extLst>
+              <a:ext uri="{28A0092B-C50C-407E-A947-70E740481C1C}">
+                <a14:useLocalDpi xmlns:a14="http://schemas.microsoft.com/office/drawing/2010/main" val="0"/>
+              </a:ext>
+            </a:extLst>
+          </a:blip>
+          <a:stretch>
+            <a:fillRect/>
+          </a:stretch>
+        </p:blipFill>
+        <p:spPr>
+          <a:xfrm>
+            <a:off x="4061926" y="5435768"/>
+            <a:ext cx="1260000" cy="1260000"/>
+          </a:xfrm>
+          <a:prstGeom prst="rect">
+            <a:avLst/>
+          </a:prstGeom>
+        </p:spPr>
+      </p:pic>
+    </p:spTree>
+    <p:extLst>
+      <p:ext uri="{BB962C8B-B14F-4D97-AF65-F5344CB8AC3E}">
+        <p14:creationId xmlns:p14="http://schemas.microsoft.com/office/powerpoint/2010/main" val="486634373"/>
+      </p:ext>
+    </p:extLst>
+  </p:cSld>
+  <p:clrMapOvr>
+    <a:masterClrMapping/>
+  </p:clrMapOvr>
+  <p:timing>
+    <p:tnLst>
+      <p:par>
+        <p:cTn id="1" dur="indefinite" restart="never" nodeType="tmRoot"/>
+      </p:par>
+    </p:tnLst>
+  </p:timing>
+</p:sld>
+</file>
+
+<file path=ppt/slides/slide20.xml><?xml version="1.0" encoding="utf-8"?>
+<p:sld xmlns:a="http://schemas.openxmlformats.org/drawingml/2006/main" xmlns:r="http://schemas.openxmlformats.org/officeDocument/2006/relationships" xmlns:p="http://schemas.openxmlformats.org/presentationml/2006/main">
+  <p:cSld>
+    <p:spTree>
+      <p:nvGrpSpPr>
+        <p:cNvPr id="1" name=""/>
+        <p:cNvGrpSpPr/>
+        <p:nvPr/>
+      </p:nvGrpSpPr>
+      <p:grpSpPr>
+        <a:xfrm>
+          <a:off x="0" y="0"/>
+          <a:ext cx="0" cy="0"/>
+          <a:chOff x="0" y="0"/>
+          <a:chExt cx="0" cy="0"/>
+        </a:xfrm>
+      </p:grpSpPr>
+      <p:sp>
+        <p:nvSpPr>
+          <p:cNvPr id="5" name="Title 3"/>
+          <p:cNvSpPr>
+            <a:spLocks noGrp="1"/>
+          </p:cNvSpPr>
+          <p:nvPr>
+            <p:ph type="title"/>
+          </p:nvPr>
+        </p:nvSpPr>
+        <p:spPr>
+          <a:xfrm>
+            <a:off x="0" y="122025"/>
+            <a:ext cx="9143999" cy="766172"/>
+          </a:xfrm>
+        </p:spPr>
+        <p:txBody>
+          <a:bodyPr tIns="46800" anchor="ctr" anchorCtr="1">
+            <a:spAutoFit/>
+          </a:bodyPr>
+          <a:lstStyle/>
+          <a:p>
+            <a:r>
+              <a:rPr lang="en-GB" dirty="0" smtClean="0"/>
+              <a:t>Portal Example</a:t>
+            </a:r>
+            <a:endParaRPr lang="en-GB" dirty="0"/>
+          </a:p>
+        </p:txBody>
+      </p:sp>
+    </p:spTree>
+    <p:extLst>
+      <p:ext uri="{BB962C8B-B14F-4D97-AF65-F5344CB8AC3E}">
+        <p14:creationId xmlns:p14="http://schemas.microsoft.com/office/powerpoint/2010/main" val="2172538785"/>
+      </p:ext>
+    </p:extLst>
+  </p:cSld>
+  <p:clrMapOvr>
+    <a:masterClrMapping/>
+  </p:clrMapOvr>
+  <p:timing>
+    <p:tnLst>
+      <p:par>
+        <p:cTn id="1" dur="indefinite" restart="never" nodeType="tmRoot"/>
+      </p:par>
+    </p:tnLst>
+  </p:timing>
+</p:sld>
+</file>
+
+<file path=ppt/slides/slide21.xml><?xml version="1.0" encoding="utf-8"?>
 <p:sld xmlns:a="http://schemas.openxmlformats.org/drawingml/2006/main" xmlns:r="http://schemas.openxmlformats.org/officeDocument/2006/relationships" xmlns:p="http://schemas.openxmlformats.org/presentationml/2006/main">
   <p:cSld>
     <p:spTree>
@@ -9677,7 +12476,7 @@
 </p:sld>
 </file>
 
-<file path=ppt/slides/slide16.xml><?xml version="1.0" encoding="utf-8"?>
+<file path=ppt/slides/slide22.xml><?xml version="1.0" encoding="utf-8"?>
 <p:sld xmlns:a="http://schemas.openxmlformats.org/drawingml/2006/main" xmlns:r="http://schemas.openxmlformats.org/officeDocument/2006/relationships" xmlns:p="http://schemas.openxmlformats.org/presentationml/2006/main">
   <p:cSld>
     <p:spTree>
@@ -10649,7 +13448,7 @@
 </p:sld>
 </file>
 
-<file path=ppt/slides/slide17.xml><?xml version="1.0" encoding="utf-8"?>
+<file path=ppt/slides/slide23.xml><?xml version="1.0" encoding="utf-8"?>
 <p:sld xmlns:a="http://schemas.openxmlformats.org/drawingml/2006/main" xmlns:r="http://schemas.openxmlformats.org/officeDocument/2006/relationships" xmlns:p="http://schemas.openxmlformats.org/presentationml/2006/main">
   <p:cSld>
     <p:spTree>
@@ -10783,7 +13582,7 @@
 </p:sld>
 </file>
 
-<file path=ppt/slides/slide18.xml><?xml version="1.0" encoding="utf-8"?>
+<file path=ppt/slides/slide24.xml><?xml version="1.0" encoding="utf-8"?>
 <p:sld xmlns:a="http://schemas.openxmlformats.org/drawingml/2006/main" xmlns:r="http://schemas.openxmlformats.org/officeDocument/2006/relationships" xmlns:p="http://schemas.openxmlformats.org/presentationml/2006/main">
   <p:cSld>
     <p:spTree>
@@ -11853,7 +14652,7 @@
 </p:sld>
 </file>
 
-<file path=ppt/slides/slide19.xml><?xml version="1.0" encoding="utf-8"?>
+<file path=ppt/slides/slide25.xml><?xml version="1.0" encoding="utf-8"?>
 <p:sld xmlns:a="http://schemas.openxmlformats.org/drawingml/2006/main" xmlns:r="http://schemas.openxmlformats.org/officeDocument/2006/relationships" xmlns:p="http://schemas.openxmlformats.org/presentationml/2006/main">
   <p:cSld>
     <p:spTree>
@@ -12748,284 +15547,7 @@
 </p:sld>
 </file>
 
-<file path=ppt/slides/slide2.xml><?xml version="1.0" encoding="utf-8"?>
-<p:sld xmlns:a="http://schemas.openxmlformats.org/drawingml/2006/main" xmlns:r="http://schemas.openxmlformats.org/officeDocument/2006/relationships" xmlns:p="http://schemas.openxmlformats.org/presentationml/2006/main">
-  <p:cSld>
-    <p:spTree>
-      <p:nvGrpSpPr>
-        <p:cNvPr id="1" name=""/>
-        <p:cNvGrpSpPr/>
-        <p:nvPr/>
-      </p:nvGrpSpPr>
-      <p:grpSpPr>
-        <a:xfrm>
-          <a:off x="0" y="0"/>
-          <a:ext cx="0" cy="0"/>
-          <a:chOff x="0" y="0"/>
-          <a:chExt cx="0" cy="0"/>
-        </a:xfrm>
-      </p:grpSpPr>
-      <p:sp>
-        <p:nvSpPr>
-          <p:cNvPr id="2" name="Title 1"/>
-          <p:cNvSpPr>
-            <a:spLocks noGrp="1"/>
-          </p:cNvSpPr>
-          <p:nvPr>
-            <p:ph type="title"/>
-          </p:nvPr>
-        </p:nvSpPr>
-        <p:spPr>
-          <a:xfrm>
-            <a:off x="0" y="126000"/>
-            <a:ext cx="9143999" cy="757130"/>
-          </a:xfrm>
-        </p:spPr>
-        <p:txBody>
-          <a:bodyPr anchor="ctr" anchorCtr="1">
-            <a:spAutoFit/>
-          </a:bodyPr>
-          <a:lstStyle/>
-          <a:p>
-            <a:r>
-              <a:rPr lang="en-GB" dirty="0" smtClean="0"/>
-              <a:t>What is Azure</a:t>
-            </a:r>
-            <a:endParaRPr lang="en-GB" dirty="0"/>
-          </a:p>
-        </p:txBody>
-      </p:sp>
-      <p:pic>
-        <p:nvPicPr>
-          <p:cNvPr id="5" name="Picture Placeholder 4"/>
-          <p:cNvPicPr>
-            <a:picLocks noGrp="1" noChangeAspect="1"/>
-          </p:cNvPicPr>
-          <p:nvPr>
-            <p:ph type="pic" sz="quarter" idx="10"/>
-          </p:nvPr>
-        </p:nvPicPr>
-        <p:blipFill>
-          <a:blip r:embed="rId3">
-            <a:extLst>
-              <a:ext uri="{28A0092B-C50C-407E-A947-70E740481C1C}">
-                <a14:useLocalDpi xmlns:a14="http://schemas.microsoft.com/office/drawing/2010/main" val="0"/>
-              </a:ext>
-            </a:extLst>
-          </a:blip>
-          <a:srcRect t="13314" b="13314"/>
-          <a:stretch>
-            <a:fillRect/>
-          </a:stretch>
-        </p:blipFill>
-        <p:spPr>
-          <a:xfrm>
-            <a:off x="3491880" y="2996952"/>
-            <a:ext cx="2160238" cy="1584994"/>
-          </a:xfrm>
-        </p:spPr>
-      </p:pic>
-      <p:pic>
-        <p:nvPicPr>
-          <p:cNvPr id="6" name="Picture 5"/>
-          <p:cNvPicPr>
-            <a:picLocks noChangeAspect="1"/>
-          </p:cNvPicPr>
-          <p:nvPr/>
-        </p:nvPicPr>
-        <p:blipFill>
-          <a:blip r:embed="rId4" cstate="print">
-            <a:extLst>
-              <a:ext uri="{28A0092B-C50C-407E-A947-70E740481C1C}">
-                <a14:useLocalDpi xmlns:a14="http://schemas.microsoft.com/office/drawing/2010/main" val="0"/>
-              </a:ext>
-            </a:extLst>
-          </a:blip>
-          <a:stretch>
-            <a:fillRect/>
-          </a:stretch>
-        </p:blipFill>
-        <p:spPr>
-          <a:xfrm>
-            <a:off x="4061926" y="1197571"/>
-            <a:ext cx="1260000" cy="1260000"/>
-          </a:xfrm>
-          <a:prstGeom prst="rect">
-            <a:avLst/>
-          </a:prstGeom>
-        </p:spPr>
-      </p:pic>
-      <p:pic>
-        <p:nvPicPr>
-          <p:cNvPr id="7" name="Picture 6"/>
-          <p:cNvPicPr>
-            <a:picLocks noChangeAspect="1"/>
-          </p:cNvPicPr>
-          <p:nvPr/>
-        </p:nvPicPr>
-        <p:blipFill>
-          <a:blip r:embed="rId5" cstate="print">
-            <a:extLst>
-              <a:ext uri="{28A0092B-C50C-407E-A947-70E740481C1C}">
-                <a14:useLocalDpi xmlns:a14="http://schemas.microsoft.com/office/drawing/2010/main" val="0"/>
-              </a:ext>
-            </a:extLst>
-          </a:blip>
-          <a:stretch>
-            <a:fillRect/>
-          </a:stretch>
-        </p:blipFill>
-        <p:spPr>
-          <a:xfrm>
-            <a:off x="1127412" y="4805768"/>
-            <a:ext cx="1260000" cy="1260000"/>
-          </a:xfrm>
-          <a:prstGeom prst="rect">
-            <a:avLst/>
-          </a:prstGeom>
-        </p:spPr>
-      </p:pic>
-      <p:pic>
-        <p:nvPicPr>
-          <p:cNvPr id="8" name="Picture 7"/>
-          <p:cNvPicPr>
-            <a:picLocks noChangeAspect="1"/>
-          </p:cNvPicPr>
-          <p:nvPr/>
-        </p:nvPicPr>
-        <p:blipFill>
-          <a:blip r:embed="rId6" cstate="print">
-            <a:extLst>
-              <a:ext uri="{28A0092B-C50C-407E-A947-70E740481C1C}">
-                <a14:useLocalDpi xmlns:a14="http://schemas.microsoft.com/office/drawing/2010/main" val="0"/>
-              </a:ext>
-            </a:extLst>
-          </a:blip>
-          <a:stretch>
-            <a:fillRect/>
-          </a:stretch>
-        </p:blipFill>
-        <p:spPr>
-          <a:xfrm>
-            <a:off x="6996440" y="1736952"/>
-            <a:ext cx="1260000" cy="1260000"/>
-          </a:xfrm>
-          <a:prstGeom prst="rect">
-            <a:avLst/>
-          </a:prstGeom>
-        </p:spPr>
-      </p:pic>
-      <p:pic>
-        <p:nvPicPr>
-          <p:cNvPr id="9" name="Picture 8"/>
-          <p:cNvPicPr>
-            <a:picLocks noChangeAspect="1"/>
-          </p:cNvPicPr>
-          <p:nvPr/>
-        </p:nvPicPr>
-        <p:blipFill>
-          <a:blip r:embed="rId7" cstate="print">
-            <a:extLst>
-              <a:ext uri="{28A0092B-C50C-407E-A947-70E740481C1C}">
-                <a14:useLocalDpi xmlns:a14="http://schemas.microsoft.com/office/drawing/2010/main" val="0"/>
-              </a:ext>
-            </a:extLst>
-          </a:blip>
-          <a:stretch>
-            <a:fillRect/>
-          </a:stretch>
-        </p:blipFill>
-        <p:spPr>
-          <a:xfrm>
-            <a:off x="6996440" y="4805768"/>
-            <a:ext cx="1260000" cy="1260000"/>
-          </a:xfrm>
-          <a:prstGeom prst="rect">
-            <a:avLst/>
-          </a:prstGeom>
-        </p:spPr>
-      </p:pic>
-      <p:pic>
-        <p:nvPicPr>
-          <p:cNvPr id="11" name="Picture 10"/>
-          <p:cNvPicPr>
-            <a:picLocks noChangeAspect="1"/>
-          </p:cNvPicPr>
-          <p:nvPr/>
-        </p:nvPicPr>
-        <p:blipFill>
-          <a:blip r:embed="rId8" cstate="print">
-            <a:extLst>
-              <a:ext uri="{28A0092B-C50C-407E-A947-70E740481C1C}">
-                <a14:useLocalDpi xmlns:a14="http://schemas.microsoft.com/office/drawing/2010/main" val="0"/>
-              </a:ext>
-            </a:extLst>
-          </a:blip>
-          <a:stretch>
-            <a:fillRect/>
-          </a:stretch>
-        </p:blipFill>
-        <p:spPr>
-          <a:xfrm>
-            <a:off x="1127412" y="1646359"/>
-            <a:ext cx="1260000" cy="1260000"/>
-          </a:xfrm>
-          <a:prstGeom prst="rect">
-            <a:avLst/>
-          </a:prstGeom>
-        </p:spPr>
-      </p:pic>
-      <p:pic>
-        <p:nvPicPr>
-          <p:cNvPr id="12" name="Picture 11"/>
-          <p:cNvPicPr>
-            <a:picLocks noChangeAspect="1"/>
-          </p:cNvPicPr>
-          <p:nvPr/>
-        </p:nvPicPr>
-        <p:blipFill>
-          <a:blip r:embed="rId9" cstate="print">
-            <a:extLst>
-              <a:ext uri="{28A0092B-C50C-407E-A947-70E740481C1C}">
-                <a14:useLocalDpi xmlns:a14="http://schemas.microsoft.com/office/drawing/2010/main" val="0"/>
-              </a:ext>
-            </a:extLst>
-          </a:blip>
-          <a:stretch>
-            <a:fillRect/>
-          </a:stretch>
-        </p:blipFill>
-        <p:spPr>
-          <a:xfrm>
-            <a:off x="4061926" y="5435768"/>
-            <a:ext cx="1260000" cy="1260000"/>
-          </a:xfrm>
-          <a:prstGeom prst="rect">
-            <a:avLst/>
-          </a:prstGeom>
-        </p:spPr>
-      </p:pic>
-    </p:spTree>
-    <p:extLst>
-      <p:ext uri="{BB962C8B-B14F-4D97-AF65-F5344CB8AC3E}">
-        <p14:creationId xmlns:p14="http://schemas.microsoft.com/office/powerpoint/2010/main" val="486634373"/>
-      </p:ext>
-    </p:extLst>
-  </p:cSld>
-  <p:clrMapOvr>
-    <a:masterClrMapping/>
-  </p:clrMapOvr>
-  <p:timing>
-    <p:tnLst>
-      <p:par>
-        <p:cTn id="1" dur="indefinite" restart="never" nodeType="tmRoot"/>
-      </p:par>
-    </p:tnLst>
-  </p:timing>
-</p:sld>
-</file>
-
-<file path=ppt/slides/slide20.xml><?xml version="1.0" encoding="utf-8"?>
+<file path=ppt/slides/slide26.xml><?xml version="1.0" encoding="utf-8"?>
 <p:sld xmlns:a="http://schemas.openxmlformats.org/drawingml/2006/main" xmlns:r="http://schemas.openxmlformats.org/officeDocument/2006/relationships" xmlns:p="http://schemas.openxmlformats.org/presentationml/2006/main">
   <p:cSld>
     <p:spTree>
@@ -13625,7 +16147,7 @@
 </p:sld>
 </file>
 
-<file path=ppt/slides/slide21.xml><?xml version="1.0" encoding="utf-8"?>
+<file path=ppt/slides/slide27.xml><?xml version="1.0" encoding="utf-8"?>
 <p:sld xmlns:a="http://schemas.openxmlformats.org/drawingml/2006/main" xmlns:r="http://schemas.openxmlformats.org/officeDocument/2006/relationships" xmlns:p="http://schemas.openxmlformats.org/presentationml/2006/main">
   <p:cSld>
     <p:spTree>
@@ -14477,7 +16999,7 @@
 </p:sld>
 </file>
 
-<file path=ppt/slides/slide22.xml><?xml version="1.0" encoding="utf-8"?>
+<file path=ppt/slides/slide28.xml><?xml version="1.0" encoding="utf-8"?>
 <p:sld xmlns:a="http://schemas.openxmlformats.org/drawingml/2006/main" xmlns:r="http://schemas.openxmlformats.org/officeDocument/2006/relationships" xmlns:p="http://schemas.openxmlformats.org/presentationml/2006/main">
   <p:cSld>
     <p:spTree>
@@ -14738,7 +17260,7 @@
 </p:sld>
 </file>
 
-<file path=ppt/slides/slide23.xml><?xml version="1.0" encoding="utf-8"?>
+<file path=ppt/slides/slide29.xml><?xml version="1.0" encoding="utf-8"?>
 <p:sld xmlns:a="http://schemas.openxmlformats.org/drawingml/2006/main" xmlns:r="http://schemas.openxmlformats.org/officeDocument/2006/relationships" xmlns:p="http://schemas.openxmlformats.org/presentationml/2006/main">
   <p:cSld>
     <p:spTree>
@@ -14920,11 +17442,7 @@
             </a:r>
             <a:r>
               <a:rPr lang="en-GB" dirty="0" smtClean="0"/>
-              <a:t> </a:t>
-            </a:r>
-            <a:r>
-              <a:rPr lang="en-GB" dirty="0" smtClean="0"/>
-              <a:t>Tools</a:t>
+              <a:t> Tools</a:t>
             </a:r>
             <a:endParaRPr lang="en-GB" dirty="0"/>
           </a:p>
@@ -14939,7 +17457,7 @@
           <p:nvPr/>
         </p:nvPicPr>
         <p:blipFill>
-          <a:blip r:embed="rId4" cstate="print">
+          <a:blip r:embed="rId3" cstate="print">
             <a:extLst>
               <a:ext uri="{28A0092B-C50C-407E-A947-70E740481C1C}">
                 <a14:useLocalDpi xmlns:a14="http://schemas.microsoft.com/office/drawing/2010/main" val="0"/>
@@ -14969,7 +17487,7 @@
           <p:nvPr/>
         </p:nvPicPr>
         <p:blipFill rotWithShape="1">
-          <a:blip r:embed="rId5">
+          <a:blip r:embed="rId4">
             <a:extLst>
               <a:ext uri="{28A0092B-C50C-407E-A947-70E740481C1C}">
                 <a14:useLocalDpi xmlns:a14="http://schemas.microsoft.com/office/drawing/2010/main" val="0"/>
@@ -14998,7 +17516,7 @@
           <p:nvPr/>
         </p:nvPicPr>
         <p:blipFill rotWithShape="1">
-          <a:blip r:embed="rId6" cstate="print">
+          <a:blip r:embed="rId5" cstate="print">
             <a:extLst>
               <a:ext uri="{28A0092B-C50C-407E-A947-70E740481C1C}">
                 <a14:useLocalDpi xmlns:a14="http://schemas.microsoft.com/office/drawing/2010/main" val="0"/>
@@ -15027,7 +17545,7 @@
           <p:nvPr/>
         </p:nvPicPr>
         <p:blipFill>
-          <a:blip r:embed="rId7" cstate="print">
+          <a:blip r:embed="rId6" cstate="print">
             <a:extLst>
               <a:ext uri="{28A0092B-C50C-407E-A947-70E740481C1C}">
                 <a14:useLocalDpi xmlns:a14="http://schemas.microsoft.com/office/drawing/2010/main" val="0"/>
@@ -15057,7 +17575,7 @@
           <p:nvPr/>
         </p:nvPicPr>
         <p:blipFill>
-          <a:blip r:embed="rId8" cstate="print">
+          <a:blip r:embed="rId7" cstate="print">
             <a:extLst>
               <a:ext uri="{28A0092B-C50C-407E-A947-70E740481C1C}">
                 <a14:useLocalDpi xmlns:a14="http://schemas.microsoft.com/office/drawing/2010/main" val="0"/>
@@ -15087,7 +17605,7 @@
           <p:nvPr/>
         </p:nvPicPr>
         <p:blipFill rotWithShape="1">
-          <a:blip r:embed="rId9" cstate="print">
+          <a:blip r:embed="rId8" cstate="print">
             <a:extLst>
               <a:ext uri="{28A0092B-C50C-407E-A947-70E740481C1C}">
                 <a14:useLocalDpi xmlns:a14="http://schemas.microsoft.com/office/drawing/2010/main" val="0"/>
@@ -15116,7 +17634,7 @@
           <p:nvPr/>
         </p:nvPicPr>
         <p:blipFill rotWithShape="1">
-          <a:blip r:embed="rId10">
+          <a:blip r:embed="rId9">
             <a:extLst>
               <a:ext uri="{28A0092B-C50C-407E-A947-70E740481C1C}">
                 <a14:useLocalDpi xmlns:a14="http://schemas.microsoft.com/office/drawing/2010/main" val="0"/>
@@ -15145,7 +17663,7 @@
           <p:nvPr/>
         </p:nvPicPr>
         <p:blipFill>
-          <a:blip r:embed="rId11" cstate="print">
+          <a:blip r:embed="rId10" cstate="print">
             <a:extLst>
               <a:ext uri="{28A0092B-C50C-407E-A947-70E740481C1C}">
                 <a14:useLocalDpi xmlns:a14="http://schemas.microsoft.com/office/drawing/2010/main" val="0"/>
@@ -15175,7 +17693,7 @@
           <p:nvPr/>
         </p:nvPicPr>
         <p:blipFill>
-          <a:blip r:embed="rId12" cstate="print">
+          <a:blip r:embed="rId11" cstate="print">
             <a:extLst>
               <a:ext uri="{28A0092B-C50C-407E-A947-70E740481C1C}">
                 <a14:useLocalDpi xmlns:a14="http://schemas.microsoft.com/office/drawing/2010/main" val="0"/>
@@ -15205,7 +17723,7 @@
           <p:nvPr/>
         </p:nvPicPr>
         <p:blipFill>
-          <a:blip r:embed="rId13">
+          <a:blip r:embed="rId12">
             <a:extLst>
               <a:ext uri="{28A0092B-C50C-407E-A947-70E740481C1C}">
                 <a14:useLocalDpi xmlns:a14="http://schemas.microsoft.com/office/drawing/2010/main" val="0"/>
@@ -15235,7 +17753,7 @@
           <p:nvPr/>
         </p:nvPicPr>
         <p:blipFill rotWithShape="1">
-          <a:blip r:embed="rId14" cstate="print">
+          <a:blip r:embed="rId13" cstate="print">
             <a:extLst>
               <a:ext uri="{28A0092B-C50C-407E-A947-70E740481C1C}">
                 <a14:useLocalDpi xmlns:a14="http://schemas.microsoft.com/office/drawing/2010/main" val="0"/>
@@ -15264,7 +17782,7 @@
           <p:nvPr/>
         </p:nvPicPr>
         <p:blipFill>
-          <a:blip r:embed="rId15" cstate="print">
+          <a:blip r:embed="rId14" cstate="print">
             <a:extLst>
               <a:ext uri="{28A0092B-C50C-407E-A947-70E740481C1C}">
                 <a14:useLocalDpi xmlns:a14="http://schemas.microsoft.com/office/drawing/2010/main" val="0"/>
@@ -15294,7 +17812,7 @@
           <p:nvPr/>
         </p:nvPicPr>
         <p:blipFill rotWithShape="1">
-          <a:blip r:embed="rId16">
+          <a:blip r:embed="rId15">
             <a:extLst>
               <a:ext uri="{28A0092B-C50C-407E-A947-70E740481C1C}">
                 <a14:useLocalDpi xmlns:a14="http://schemas.microsoft.com/office/drawing/2010/main" val="0"/>

</xml_diff>

<commit_message>
Archives presentation and removes duplicate slides.
</commit_message>
<xml_diff>
--- a/Current/Azure The Good Parts Web Apps/AzureTheGoodParts-WebApps.pptx
+++ b/Current/Azure The Good Parts Web Apps/AzureTheGoodParts-WebApps.pptx
@@ -6,7 +6,7 @@
     <p:sldMasterId id="2147483672" r:id="rId2"/>
   </p:sldMasterIdLst>
   <p:notesMasterIdLst>
-    <p:notesMasterId r:id="rId35"/>
+    <p:notesMasterId r:id="rId33"/>
   </p:notesMasterIdLst>
   <p:sldIdLst>
     <p:sldId id="256" r:id="rId3"/>
@@ -26,21 +26,19 @@
     <p:sldId id="266" r:id="rId17"/>
     <p:sldId id="298" r:id="rId18"/>
     <p:sldId id="299" r:id="rId19"/>
-    <p:sldId id="300" r:id="rId20"/>
-    <p:sldId id="273" r:id="rId21"/>
-    <p:sldId id="301" r:id="rId22"/>
-    <p:sldId id="269" r:id="rId23"/>
-    <p:sldId id="302" r:id="rId24"/>
-    <p:sldId id="274" r:id="rId25"/>
-    <p:sldId id="303" r:id="rId26"/>
-    <p:sldId id="304" r:id="rId27"/>
-    <p:sldId id="305" r:id="rId28"/>
-    <p:sldId id="307" r:id="rId29"/>
-    <p:sldId id="308" r:id="rId30"/>
-    <p:sldId id="309" r:id="rId31"/>
-    <p:sldId id="310" r:id="rId32"/>
-    <p:sldId id="311" r:id="rId33"/>
-    <p:sldId id="288" r:id="rId34"/>
+    <p:sldId id="273" r:id="rId20"/>
+    <p:sldId id="269" r:id="rId21"/>
+    <p:sldId id="302" r:id="rId22"/>
+    <p:sldId id="274" r:id="rId23"/>
+    <p:sldId id="303" r:id="rId24"/>
+    <p:sldId id="304" r:id="rId25"/>
+    <p:sldId id="305" r:id="rId26"/>
+    <p:sldId id="307" r:id="rId27"/>
+    <p:sldId id="308" r:id="rId28"/>
+    <p:sldId id="309" r:id="rId29"/>
+    <p:sldId id="310" r:id="rId30"/>
+    <p:sldId id="311" r:id="rId31"/>
+    <p:sldId id="288" r:id="rId32"/>
   </p:sldIdLst>
   <p:sldSz cx="9144000" cy="6858000" type="screen4x3"/>
   <p:notesSz cx="6858000" cy="9144000"/>
@@ -240,7 +238,7 @@
           <a:p>
             <a:fld id="{9E29A4B1-5A86-4619-B723-CCAF1C8CA250}" type="datetimeFigureOut">
               <a:rPr lang="en-GB" smtClean="0"/>
-              <a:t>23/09/2015</a:t>
+              <a:t>12/10/2015</a:t>
             </a:fld>
             <a:endParaRPr lang="en-GB"/>
           </a:p>
@@ -2365,11 +2363,36 @@
           <a:p>
             <a:r>
               <a:rPr lang="en-GB" dirty="0" smtClean="0"/>
-              <a:t>When developing you app you may choose to start out using a basic database. But</a:t>
+              <a:t>Azure </a:t>
+            </a:r>
+            <a:r>
+              <a:rPr lang="en-GB" dirty="0" err="1" smtClean="0"/>
+              <a:t>DocumentDB</a:t>
+            </a:r>
+            <a:r>
+              <a:rPr lang="en-GB" dirty="0" smtClean="0"/>
+              <a:t> is Azures offering in the document database</a:t>
             </a:r>
             <a:r>
               <a:rPr lang="en-GB" baseline="0" dirty="0" smtClean="0"/>
-              <a:t> in production you will want to change the database tier and as your app goes viral you will want to scale your database. </a:t>
+              <a:t> family</a:t>
+            </a:r>
+            <a:r>
+              <a:rPr lang="en-GB" dirty="0" smtClean="0"/>
+              <a:t>.</a:t>
+            </a:r>
+          </a:p>
+          <a:p>
+            <a:endParaRPr lang="en-GB" dirty="0" smtClean="0"/>
+          </a:p>
+          <a:p>
+            <a:r>
+              <a:rPr lang="en-GB" dirty="0" smtClean="0"/>
+              <a:t>A document databases</a:t>
+            </a:r>
+            <a:r>
+              <a:rPr lang="en-GB" baseline="0" dirty="0" smtClean="0"/>
+              <a:t> document is a collection of named fields and values. Where the values can be standard data types or complex objects and arrays. The documents can be encoded in a variety of ways, including BSON, JSON, XML and YAML.</a:t>
             </a:r>
           </a:p>
           <a:p>
@@ -2377,29 +2400,57 @@
           </a:p>
           <a:p>
             <a:r>
-              <a:rPr lang="en-GB" baseline="0" dirty="0" smtClean="0"/>
-              <a:t>Elastic scale is a simple concept, you allocate the performance to a pool, and pay for the pool not the databases in use. The pool will auto scale up and down to meet demand, but wont ever exceed the pool allocation , so cost will remain constant.</a:t>
-            </a:r>
-          </a:p>
-          <a:p>
-            <a:endParaRPr lang="en-GB" baseline="0" dirty="0" smtClean="0"/>
-          </a:p>
-          <a:p>
-            <a:r>
-              <a:rPr lang="en-GB" baseline="0" dirty="0" smtClean="0"/>
-              <a:t>A simple example would be to have a pool with 1000 DTUs allocated to it and then fill it with 200 basic databases. In code you would connect to the pool and all the </a:t>
-            </a:r>
-            <a:r>
-              <a:rPr lang="en-GB" baseline="0" dirty="0" err="1" smtClean="0"/>
-              <a:t>sharding</a:t>
-            </a:r>
-            <a:r>
-              <a:rPr lang="en-GB" baseline="0" dirty="0" smtClean="0"/>
-              <a:t> would </a:t>
-            </a:r>
-            <a:r>
-              <a:rPr lang="en-GB" baseline="0" smtClean="0"/>
-              <a:t>be managed for you.</a:t>
+              <a:rPr lang="en-GB" dirty="0" err="1" smtClean="0"/>
+              <a:t>DocumentDB</a:t>
+            </a:r>
+            <a:r>
+              <a:rPr lang="en-GB" dirty="0" smtClean="0"/>
+              <a:t> is a fully managed JSON document database as a service and designed to keep pace with modern rapidly evolving applications. </a:t>
+            </a:r>
+            <a:r>
+              <a:rPr lang="en-GB" dirty="0" err="1" smtClean="0"/>
+              <a:t>DocumentDB</a:t>
+            </a:r>
+            <a:r>
+              <a:rPr lang="en-GB" dirty="0" smtClean="0"/>
+              <a:t> executes </a:t>
+            </a:r>
+            <a:r>
+              <a:rPr lang="en-GB" dirty="0" err="1" smtClean="0"/>
+              <a:t>Javascript</a:t>
+            </a:r>
+            <a:r>
+              <a:rPr lang="en-GB" dirty="0" smtClean="0"/>
+              <a:t> within it database engine. Meaning you can write and execute stored procedures and user defined functions directly on the database written in </a:t>
+            </a:r>
+            <a:r>
+              <a:rPr lang="en-GB" dirty="0" err="1" smtClean="0"/>
+              <a:t>Javascript</a:t>
+            </a:r>
+            <a:r>
+              <a:rPr lang="en-GB" dirty="0" smtClean="0"/>
+              <a:t>. </a:t>
+            </a:r>
+          </a:p>
+          <a:p>
+            <a:endParaRPr lang="en-GB" dirty="0" smtClean="0"/>
+          </a:p>
+          <a:p>
+            <a:r>
+              <a:rPr lang="en-GB" dirty="0" err="1" smtClean="0"/>
+              <a:t>DocumentDB</a:t>
+            </a:r>
+            <a:r>
+              <a:rPr lang="en-GB" dirty="0" smtClean="0"/>
+              <a:t> automatically indexes all JSON documents, then allows you to query them with the familiar SQL syntax. A well as JavaScript Azure also provide SDKs in </a:t>
+            </a:r>
+            <a:r>
+              <a:rPr lang="en-GB" dirty="0" err="1" smtClean="0"/>
+              <a:t>.Net</a:t>
+            </a:r>
+            <a:r>
+              <a:rPr lang="en-GB" dirty="0" smtClean="0"/>
+              <a:t>, Java, Python and more, so you up and running quickly with the tools and languages you are already familiar with.</a:t>
             </a:r>
             <a:endParaRPr lang="en-GB" dirty="0"/>
           </a:p>
@@ -2431,7 +2482,7 @@
     </p:spTree>
     <p:extLst>
       <p:ext uri="{BB962C8B-B14F-4D97-AF65-F5344CB8AC3E}">
-        <p14:creationId xmlns:p14="http://schemas.microsoft.com/office/powerpoint/2010/main" val="590031180"/>
+        <p14:creationId xmlns:p14="http://schemas.microsoft.com/office/powerpoint/2010/main" val="2846866398"/>
       </p:ext>
     </p:extLst>
   </p:cSld>
@@ -2487,96 +2538,92 @@
           <a:p>
             <a:r>
               <a:rPr lang="en-GB" dirty="0" smtClean="0"/>
-              <a:t>Azure </a:t>
-            </a:r>
-            <a:r>
-              <a:rPr lang="en-GB" dirty="0" err="1" smtClean="0"/>
-              <a:t>DocumentDB</a:t>
-            </a:r>
+              <a:t>Azure Table Storage is a non-relational,</a:t>
+            </a:r>
+            <a:r>
+              <a:rPr lang="en-GB" baseline="0" dirty="0" smtClean="0"/>
+              <a:t> key-value pair data store designed for storing massive amounts of unstructured data and optimised for fast retrieval.</a:t>
+            </a:r>
+          </a:p>
+          <a:p>
+            <a:endParaRPr lang="en-GB" baseline="0" dirty="0" smtClean="0"/>
+          </a:p>
+          <a:p>
+            <a:r>
+              <a:rPr lang="en-GB" baseline="0" dirty="0" smtClean="0"/>
+              <a:t>Table storage offers highly available, massively scalable storage so you application can automatically scale to meet demand.</a:t>
+            </a:r>
+          </a:p>
+          <a:p>
+            <a:endParaRPr lang="en-GB" baseline="0" dirty="0" smtClean="0"/>
+          </a:p>
+          <a:p>
             <a:r>
               <a:rPr lang="en-GB" dirty="0" smtClean="0"/>
-              <a:t> is Azures offering in the document database</a:t>
+              <a:t>Table</a:t>
             </a:r>
             <a:r>
               <a:rPr lang="en-GB" baseline="0" dirty="0" smtClean="0"/>
-              <a:t> family</a:t>
-            </a:r>
+              <a:t> storage is scales in terms of data storage rather than server resource. With a single Azure subscription you can create 50 storage accounts and each storage account can store up to 500TB of data, that’s 25 </a:t>
+            </a:r>
+            <a:r>
+              <a:rPr lang="en-GB" baseline="0" dirty="0" err="1" smtClean="0"/>
+              <a:t>peta</a:t>
+            </a:r>
+            <a:r>
+              <a:rPr lang="en-GB" baseline="0" dirty="0" smtClean="0"/>
+              <a:t> bytes of data.</a:t>
+            </a:r>
+          </a:p>
+          <a:p>
+            <a:endParaRPr lang="en-GB" baseline="0" dirty="0" smtClean="0"/>
+          </a:p>
+          <a:p>
+            <a:r>
+              <a:rPr lang="en-GB" baseline="0" dirty="0" smtClean="0"/>
+              <a:t>With those sort of volumes of data available you would be pretty miffed if that data was lost.</a:t>
+            </a:r>
+          </a:p>
+          <a:p>
+            <a:endParaRPr lang="en-GB" baseline="0" dirty="0" smtClean="0"/>
+          </a:p>
+          <a:p>
+            <a:r>
+              <a:rPr lang="en-GB" baseline="0" dirty="0" smtClean="0"/>
+              <a:t>Azure always at least three copies of you data. When you create a storage account you have to pick one of 4 replication options.</a:t>
+            </a:r>
+          </a:p>
+          <a:p>
+            <a:endParaRPr lang="en-GB" baseline="0" dirty="0" smtClean="0"/>
+          </a:p>
+          <a:p>
             <a:r>
               <a:rPr lang="en-GB" dirty="0" smtClean="0"/>
-              <a:t>.</a:t>
-            </a:r>
-          </a:p>
-          <a:p>
+              <a:t>Locally redundant storage – data is replicated 3x</a:t>
+            </a:r>
+            <a:r>
+              <a:rPr lang="en-GB" baseline="0" dirty="0" smtClean="0"/>
+              <a:t> in a data centre.</a:t>
+            </a:r>
+          </a:p>
+          <a:p>
+            <a:r>
+              <a:rPr lang="en-GB" baseline="0" dirty="0" smtClean="0"/>
+              <a:t>Zone redundant storage – data is replicated 2-3 times within 1 or 2  near by regions.</a:t>
+            </a:r>
+          </a:p>
+          <a:p>
+            <a:r>
+              <a:rPr lang="en-GB" baseline="0" dirty="0" smtClean="0"/>
+              <a:t>Geo-redundant storage – data is replicated 6x. 3x in your primary region and 3x in a secondary region which is located hundreds of miles away.</a:t>
+            </a:r>
+          </a:p>
+          <a:p>
+            <a:r>
+              <a:rPr lang="en-GB" baseline="0" dirty="0" smtClean="0"/>
+              <a:t>Read-Access Geo-Redundant Storage – The same as Geo-Redundant Storage, but you get read access to the secondary location when the primary location is unavailable.</a:t>
+            </a:r>
             <a:endParaRPr lang="en-GB" dirty="0" smtClean="0"/>
-          </a:p>
-          <a:p>
-            <a:r>
-              <a:rPr lang="en-GB" dirty="0" smtClean="0"/>
-              <a:t>A document databases</a:t>
-            </a:r>
-            <a:r>
-              <a:rPr lang="en-GB" baseline="0" dirty="0" smtClean="0"/>
-              <a:t> document is a collection of named fields and values. Where the values can be standard data types or complex objects and arrays. The documents can be encoded in a variety of ways, including BSON, JSON, XML and YAML.</a:t>
-            </a:r>
-          </a:p>
-          <a:p>
-            <a:endParaRPr lang="en-GB" baseline="0" dirty="0" smtClean="0"/>
-          </a:p>
-          <a:p>
-            <a:r>
-              <a:rPr lang="en-GB" dirty="0" err="1" smtClean="0"/>
-              <a:t>DocumentDB</a:t>
-            </a:r>
-            <a:r>
-              <a:rPr lang="en-GB" dirty="0" smtClean="0"/>
-              <a:t> is a fully managed JSON document database as a service and designed to keep pace with modern rapidly evolving applications. </a:t>
-            </a:r>
-            <a:r>
-              <a:rPr lang="en-GB" dirty="0" err="1" smtClean="0"/>
-              <a:t>DocumentDB</a:t>
-            </a:r>
-            <a:r>
-              <a:rPr lang="en-GB" dirty="0" smtClean="0"/>
-              <a:t> executes </a:t>
-            </a:r>
-            <a:r>
-              <a:rPr lang="en-GB" dirty="0" err="1" smtClean="0"/>
-              <a:t>Javascript</a:t>
-            </a:r>
-            <a:r>
-              <a:rPr lang="en-GB" dirty="0" smtClean="0"/>
-              <a:t> within it database engine. Meaning you can write and execute stored procedures and user defined functions directly on the database written in </a:t>
-            </a:r>
-            <a:r>
-              <a:rPr lang="en-GB" dirty="0" err="1" smtClean="0"/>
-              <a:t>Javascript</a:t>
-            </a:r>
-            <a:r>
-              <a:rPr lang="en-GB" dirty="0" smtClean="0"/>
-              <a:t>. </a:t>
-            </a:r>
-          </a:p>
-          <a:p>
-            <a:endParaRPr lang="en-GB" dirty="0" smtClean="0"/>
-          </a:p>
-          <a:p>
-            <a:r>
-              <a:rPr lang="en-GB" dirty="0" err="1" smtClean="0"/>
-              <a:t>DocumentDB</a:t>
-            </a:r>
-            <a:r>
-              <a:rPr lang="en-GB" dirty="0" smtClean="0"/>
-              <a:t> automatically indexes all JSON documents, then allows you to query them with the familiar SQL syntax. A well as JavaScript Azure also provide SDKs in </a:t>
-            </a:r>
-            <a:r>
-              <a:rPr lang="en-GB" dirty="0" err="1" smtClean="0"/>
-              <a:t>.Net</a:t>
-            </a:r>
-            <a:r>
-              <a:rPr lang="en-GB" dirty="0" smtClean="0"/>
-              <a:t>, Java, Python and more, so you up and running quickly with the tools and languages you are already familiar with.</a:t>
-            </a:r>
-            <a:endParaRPr lang="en-GB" dirty="0"/>
           </a:p>
         </p:txBody>
       </p:sp>
@@ -2606,7 +2653,7 @@
     </p:spTree>
     <p:extLst>
       <p:ext uri="{BB962C8B-B14F-4D97-AF65-F5344CB8AC3E}">
-        <p14:creationId xmlns:p14="http://schemas.microsoft.com/office/powerpoint/2010/main" val="2846866398"/>
+        <p14:creationId xmlns:p14="http://schemas.microsoft.com/office/powerpoint/2010/main" val="248086816"/>
       </p:ext>
     </p:extLst>
   </p:cSld>
@@ -2833,27 +2880,60 @@
           <a:p>
             <a:r>
               <a:rPr lang="en-GB" dirty="0" smtClean="0"/>
-              <a:t>Within the Azure portal I provisioned a new </a:t>
-            </a:r>
-            <a:r>
-              <a:rPr lang="en-GB" dirty="0" err="1" smtClean="0"/>
-              <a:t>DocumentDB</a:t>
-            </a:r>
-            <a:r>
-              <a:rPr lang="en-GB" dirty="0" smtClean="0"/>
-              <a:t> instance.</a:t>
+              <a:t>Like me, if you are</a:t>
             </a:r>
             <a:r>
               <a:rPr lang="en-GB" baseline="0" dirty="0" smtClean="0"/>
-              <a:t> </a:t>
+              <a:t> used to developing relational models you will find table storage strange and you will make all the mistakes I have.</a:t>
             </a:r>
           </a:p>
           <a:p>
             <a:r>
               <a:rPr lang="en-GB" baseline="0" dirty="0" smtClean="0"/>
-              <a:t>Created a Contacts table and filled it with some demo data.</a:t>
-            </a:r>
-            <a:endParaRPr lang="en-GB" dirty="0"/>
+              <a:t>There are a number of factors you need to consider when building you data model.</a:t>
+            </a:r>
+          </a:p>
+          <a:p>
+            <a:endParaRPr lang="en-GB" baseline="0" dirty="0" smtClean="0"/>
+          </a:p>
+          <a:p>
+            <a:r>
+              <a:rPr lang="en-GB" baseline="0" dirty="0" smtClean="0"/>
+              <a:t>As I said earlier, Table storage is key/value store. Which means every property in an entity has a name and a value. The value can by any of the basic data types plus it can be a byte array as well. You cannot have more than 252 properties to an entity and an entity cannot be more than 1MB in size.</a:t>
+            </a:r>
+          </a:p>
+          <a:p>
+            <a:endParaRPr lang="en-GB" baseline="0" dirty="0" smtClean="0"/>
+          </a:p>
+          <a:p>
+            <a:r>
+              <a:rPr lang="en-GB" baseline="0" dirty="0" smtClean="0"/>
+              <a:t>Every entity also has a Partition Key, a Row Key and a Time stamp. The timestamp is updated every time you save the entity. The partition key and row key form a composite key. And how this key is used is why table storage is so fast at retrieving data.</a:t>
+            </a:r>
+          </a:p>
+          <a:p>
+            <a:endParaRPr lang="en-GB" baseline="0" dirty="0" smtClean="0"/>
+          </a:p>
+          <a:p>
+            <a:r>
+              <a:rPr lang="en-GB" baseline="0" dirty="0" smtClean="0"/>
+              <a:t>The Partition key groups all entities with the same key into one partition and stores them together on the same server. Key advantages to grouping a set of entities in a single partition is that it is possible to perform batch operations and query a subset of the data.</a:t>
+            </a:r>
+          </a:p>
+          <a:p>
+            <a:r>
+              <a:rPr lang="en-GB" baseline="0" dirty="0" smtClean="0"/>
+              <a:t>Data spread across multiple partitions can be load balanced making it possible to have massive data sets that are lighting quick to query.</a:t>
+            </a:r>
+          </a:p>
+          <a:p>
+            <a:endParaRPr lang="en-GB" baseline="0" dirty="0" smtClean="0"/>
+          </a:p>
+          <a:p>
+            <a:r>
+              <a:rPr lang="en-GB" baseline="0" dirty="0" smtClean="0"/>
+              <a:t>The Row Key is used to order the data in the partition and to identify a single record. Which means a row key has to be unique within a partition.</a:t>
+            </a:r>
           </a:p>
         </p:txBody>
       </p:sp>
@@ -2883,7 +2963,7 @@
     </p:spTree>
     <p:extLst>
       <p:ext uri="{BB962C8B-B14F-4D97-AF65-F5344CB8AC3E}">
-        <p14:creationId xmlns:p14="http://schemas.microsoft.com/office/powerpoint/2010/main" val="2169096221"/>
+        <p14:creationId xmlns:p14="http://schemas.microsoft.com/office/powerpoint/2010/main" val="3425282268"/>
       </p:ext>
     </p:extLst>
   </p:cSld>
@@ -2939,92 +3019,31 @@
           <a:p>
             <a:r>
               <a:rPr lang="en-GB" dirty="0" smtClean="0"/>
-              <a:t>Azure Table Storage is a non-relational,</a:t>
+              <a:t>For an </a:t>
             </a:r>
             <a:r>
               <a:rPr lang="en-GB" baseline="0" dirty="0" smtClean="0"/>
-              <a:t> key-value pair data store designed for storing massive amounts of unstructured data and optimised for fast retrieval.</a:t>
-            </a:r>
-          </a:p>
-          <a:p>
-            <a:endParaRPr lang="en-GB" baseline="0" dirty="0" smtClean="0"/>
-          </a:p>
-          <a:p>
-            <a:r>
-              <a:rPr lang="en-GB" baseline="0" dirty="0" smtClean="0"/>
-              <a:t>Table storage offers highly available, massively scalable storage so you application can automatically scale to meet demand.</a:t>
-            </a:r>
-          </a:p>
-          <a:p>
-            <a:endParaRPr lang="en-GB" baseline="0" dirty="0" smtClean="0"/>
-          </a:p>
-          <a:p>
+              <a:t>example of good table design, </a:t>
+            </a:r>
             <a:r>
               <a:rPr lang="en-GB" dirty="0" smtClean="0"/>
-              <a:t>Table</a:t>
-            </a:r>
-            <a:r>
-              <a:rPr lang="en-GB" baseline="0" dirty="0" smtClean="0"/>
-              <a:t> storage is scales in terms of data storage rather than server resource. With a single Azure subscription you can create 50 storage accounts and each storage account can store up to 500TB of data, that’s 25 </a:t>
-            </a:r>
-            <a:r>
-              <a:rPr lang="en-GB" baseline="0" dirty="0" err="1" smtClean="0"/>
-              <a:t>peta</a:t>
-            </a:r>
-            <a:r>
-              <a:rPr lang="en-GB" baseline="0" dirty="0" smtClean="0"/>
-              <a:t> bytes of data.</a:t>
-            </a:r>
-          </a:p>
-          <a:p>
-            <a:endParaRPr lang="en-GB" baseline="0" dirty="0" smtClean="0"/>
-          </a:p>
-          <a:p>
-            <a:r>
-              <a:rPr lang="en-GB" baseline="0" dirty="0" smtClean="0"/>
-              <a:t>With those sort of volumes of data available you would be pretty miffed if that data was lost.</a:t>
-            </a:r>
-          </a:p>
-          <a:p>
-            <a:endParaRPr lang="en-GB" baseline="0" dirty="0" smtClean="0"/>
-          </a:p>
-          <a:p>
-            <a:r>
-              <a:rPr lang="en-GB" baseline="0" dirty="0" smtClean="0"/>
-              <a:t>Azure always at least three copies of you data. When you create a storage account you have to pick one of 4 replication options.</a:t>
-            </a:r>
-          </a:p>
-          <a:p>
-            <a:endParaRPr lang="en-GB" baseline="0" dirty="0" smtClean="0"/>
-          </a:p>
-          <a:p>
+              <a:t>Troy Hunt has written a really good blog post about how he setup table storage for his Have I been </a:t>
+            </a:r>
+            <a:r>
+              <a:rPr lang="en-GB" dirty="0" err="1" smtClean="0"/>
+              <a:t>Pwnd</a:t>
+            </a:r>
             <a:r>
               <a:rPr lang="en-GB" dirty="0" smtClean="0"/>
-              <a:t>Locally redundant storage – data is replicated 3x</a:t>
-            </a:r>
-            <a:r>
-              <a:rPr lang="en-GB" baseline="0" dirty="0" smtClean="0"/>
-              <a:t> in a data centre.</a:t>
-            </a:r>
-          </a:p>
-          <a:p>
-            <a:r>
-              <a:rPr lang="en-GB" baseline="0" dirty="0" smtClean="0"/>
-              <a:t>Zone redundant storage – data is replicated 2-3 times within 1 or 2  near by regions.</a:t>
-            </a:r>
-          </a:p>
-          <a:p>
-            <a:r>
-              <a:rPr lang="en-GB" baseline="0" dirty="0" smtClean="0"/>
-              <a:t>Geo-redundant storage – data is replicated 6x. 3x in your primary region and 3x in a secondary region which is located hundreds of miles away.</a:t>
-            </a:r>
-          </a:p>
-          <a:p>
-            <a:r>
-              <a:rPr lang="en-GB" baseline="0" dirty="0" smtClean="0"/>
-              <a:t>Read-Access Geo-Redundant Storage – The same as Geo-Redundant Storage, but you get read access to the secondary location when the primary location is unavailable.</a:t>
-            </a:r>
-            <a:endParaRPr lang="en-GB" dirty="0" smtClean="0"/>
+              <a:t> site. </a:t>
+            </a:r>
+          </a:p>
+          <a:p>
+            <a:r>
+              <a:rPr lang="en-GB" dirty="0" smtClean="0"/>
+              <a:t>In it he say that he had to put a 400ms delay into his code because table storage was returning too quickly and the UX didn't feel real.</a:t>
+            </a:r>
+            <a:endParaRPr lang="en-GB" dirty="0"/>
           </a:p>
         </p:txBody>
       </p:sp>
@@ -3054,7 +3073,7 @@
     </p:spTree>
     <p:extLst>
       <p:ext uri="{BB962C8B-B14F-4D97-AF65-F5344CB8AC3E}">
-        <p14:creationId xmlns:p14="http://schemas.microsoft.com/office/powerpoint/2010/main" val="248086816"/>
+        <p14:creationId xmlns:p14="http://schemas.microsoft.com/office/powerpoint/2010/main" val="2856833730"/>
       </p:ext>
     </p:extLst>
   </p:cSld>
@@ -3110,17 +3129,27 @@
           <a:p>
             <a:r>
               <a:rPr lang="en-GB" dirty="0" smtClean="0"/>
-              <a:t>Like me, if you are</a:t>
+              <a:t>Azure supports two types of queue</a:t>
             </a:r>
             <a:r>
               <a:rPr lang="en-GB" baseline="0" dirty="0" smtClean="0"/>
-              <a:t> used to developing relational models you will find table storage strange and you will make all the mistakes I have.</a:t>
-            </a:r>
-          </a:p>
-          <a:p>
+              <a:t> mechanisms. </a:t>
+            </a:r>
+            <a:r>
+              <a:rPr lang="en-GB" b="1" baseline="0" dirty="0" smtClean="0"/>
+              <a:t>Azure Queues</a:t>
+            </a:r>
             <a:r>
               <a:rPr lang="en-GB" baseline="0" dirty="0" smtClean="0"/>
-              <a:t>There are a number of factors you need to consider when building you data model.</a:t>
+              <a:t> and </a:t>
+            </a:r>
+            <a:r>
+              <a:rPr lang="en-GB" b="1" baseline="0" dirty="0" smtClean="0"/>
+              <a:t>Service Bus Queues</a:t>
+            </a:r>
+            <a:r>
+              <a:rPr lang="en-GB" baseline="0" dirty="0" smtClean="0"/>
+              <a:t>.</a:t>
             </a:r>
           </a:p>
           <a:p>
@@ -3128,8 +3157,12 @@
           </a:p>
           <a:p>
             <a:r>
+              <a:rPr lang="en-GB" b="1" baseline="0" dirty="0" smtClean="0"/>
+              <a:t>Azure Queues</a:t>
+            </a:r>
+            <a:r>
               <a:rPr lang="en-GB" baseline="0" dirty="0" smtClean="0"/>
-              <a:t>As I said earlier, Table storage is key/value store. Which means every property in an entity has a name and a value. The value can by any of the basic data types plus it can be a byte array as well. You cannot have more than 252 properties to an entity and an entity cannot be more than 1MB in size.</a:t>
+              <a:t> are part of the same Azure Storage service that Table Storage is part of. They provide a simple interface to reliably persist messages between services.</a:t>
             </a:r>
           </a:p>
           <a:p>
@@ -3137,33 +3170,14 @@
           </a:p>
           <a:p>
             <a:r>
+              <a:rPr lang="en-GB" b="1" baseline="0" dirty="0" smtClean="0"/>
+              <a:t>Service Bus</a:t>
+            </a:r>
+            <a:r>
               <a:rPr lang="en-GB" baseline="0" dirty="0" smtClean="0"/>
-              <a:t>Every entity also has a Partition Key, a Row Key and a Time stamp. The timestamp is updated every time you save the entity. The partition key and row key form a composite key. And how this key is used is why table storage is so fast at retrieving data.</a:t>
-            </a:r>
-          </a:p>
-          <a:p>
-            <a:endParaRPr lang="en-GB" baseline="0" dirty="0" smtClean="0"/>
-          </a:p>
-          <a:p>
-            <a:r>
-              <a:rPr lang="en-GB" baseline="0" dirty="0" smtClean="0"/>
-              <a:t>The Partition key groups all entities with the same key into one partition and stores them together on the same server. Key advantages to grouping a set of entities in a single partition is that it is possible to perform batch operations and query a subset of the data.</a:t>
-            </a:r>
-          </a:p>
-          <a:p>
-            <a:r>
-              <a:rPr lang="en-GB" baseline="0" dirty="0" smtClean="0"/>
-              <a:t>Data spread across multiple partitions can be load balanced making it possible to have massive data sets that are lighting quick to query.</a:t>
-            </a:r>
-          </a:p>
-          <a:p>
-            <a:endParaRPr lang="en-GB" baseline="0" dirty="0" smtClean="0"/>
-          </a:p>
-          <a:p>
-            <a:r>
-              <a:rPr lang="en-GB" baseline="0" dirty="0" smtClean="0"/>
-              <a:t>The Row Key is used to order the data in the partition and to identify a single record. Which means a row key has to be unique within a partition.</a:t>
-            </a:r>
+              <a:t> queues are part of the wider Azure Messaging service which provides Queues, Topics, Relays and Event Hubs.</a:t>
+            </a:r>
+            <a:endParaRPr lang="en-GB" dirty="0" smtClean="0"/>
           </a:p>
         </p:txBody>
       </p:sp>
@@ -3193,7 +3207,7 @@
     </p:spTree>
     <p:extLst>
       <p:ext uri="{BB962C8B-B14F-4D97-AF65-F5344CB8AC3E}">
-        <p14:creationId xmlns:p14="http://schemas.microsoft.com/office/powerpoint/2010/main" val="3425282268"/>
+        <p14:creationId xmlns:p14="http://schemas.microsoft.com/office/powerpoint/2010/main" val="4251635917"/>
       </p:ext>
     </p:extLst>
   </p:cSld>
@@ -3249,29 +3263,73 @@
           <a:p>
             <a:r>
               <a:rPr lang="en-GB" dirty="0" smtClean="0"/>
-              <a:t>For an </a:t>
+              <a:t>Azure Storage Queues was</a:t>
             </a:r>
             <a:r>
               <a:rPr lang="en-GB" baseline="0" dirty="0" smtClean="0"/>
-              <a:t>example of good table design, </a:t>
-            </a:r>
-            <a:r>
-              <a:rPr lang="en-GB" dirty="0" smtClean="0"/>
-              <a:t>Troy Hunt has written a really good blog post about how he setup table storage for his Have I been </a:t>
-            </a:r>
-            <a:r>
-              <a:rPr lang="en-GB" dirty="0" err="1" smtClean="0"/>
-              <a:t>Pwnd</a:t>
-            </a:r>
-            <a:r>
-              <a:rPr lang="en-GB" dirty="0" smtClean="0"/>
-              <a:t> site. </a:t>
-            </a:r>
-          </a:p>
-          <a:p>
-            <a:r>
-              <a:rPr lang="en-GB" dirty="0" smtClean="0"/>
-              <a:t>In it he say that he had to put a 400ms delay into his code because table storage was returning too quickly and the UX didn't feel real.</a:t>
+              <a:t> the first queue mechanism on Azure and provides a way of storing a large number of messages for services to process.</a:t>
+            </a:r>
+          </a:p>
+          <a:p>
+            <a:endParaRPr lang="en-GB" baseline="0" dirty="0" smtClean="0"/>
+          </a:p>
+          <a:p>
+            <a:r>
+              <a:rPr lang="en-GB" baseline="0" dirty="0" smtClean="0"/>
+              <a:t>A single message can be up to 64KB and the only limit on the number of messages you can store is the storage account data limit of 500TB.</a:t>
+            </a:r>
+          </a:p>
+          <a:p>
+            <a:endParaRPr lang="en-GB" baseline="0" dirty="0" smtClean="0"/>
+          </a:p>
+          <a:p>
+            <a:r>
+              <a:rPr lang="en-GB" baseline="0" dirty="0" smtClean="0"/>
+              <a:t>Queues are used to delegate work and decouple your application from long running tasks.</a:t>
+            </a:r>
+          </a:p>
+          <a:p>
+            <a:r>
+              <a:rPr lang="en-GB" baseline="0" dirty="0" smtClean="0"/>
+              <a:t>For example you application may allow you users to upload images, But the application needs a thumbnail of the image.</a:t>
+            </a:r>
+          </a:p>
+          <a:p>
+            <a:r>
+              <a:rPr lang="en-GB" baseline="0" dirty="0" smtClean="0"/>
+              <a:t>Rather than making your customer wait for the thumbnail to be created you can put the location of the image in a message and put the message on a queue.</a:t>
+            </a:r>
+          </a:p>
+          <a:p>
+            <a:r>
+              <a:rPr lang="en-GB" baseline="0" dirty="0" smtClean="0"/>
+              <a:t>Then a background task can take that message off the queue generate the thumbnail, save it and delete the message off the queue.</a:t>
+            </a:r>
+          </a:p>
+          <a:p>
+            <a:endParaRPr lang="en-GB" baseline="0" dirty="0" smtClean="0"/>
+          </a:p>
+          <a:p>
+            <a:r>
+              <a:rPr lang="en-GB" baseline="0" dirty="0" smtClean="0"/>
+              <a:t>One thing to be aware of is when a message is read it is not removed off the queue it is hidden for a configurable amount of time. You need to be careful not to set the Invisibility Timeout to low, by default is 2 </a:t>
+            </a:r>
+            <a:r>
+              <a:rPr lang="en-GB" baseline="0" dirty="0" err="1" smtClean="0"/>
+              <a:t>mins</a:t>
+            </a:r>
+            <a:r>
+              <a:rPr lang="en-GB" baseline="0" dirty="0" smtClean="0"/>
+              <a:t>, because your message could appear back on the queue and be read again before you have finished processing it. </a:t>
+            </a:r>
+          </a:p>
+          <a:p>
+            <a:endParaRPr lang="en-GB" baseline="0" dirty="0" smtClean="0"/>
+          </a:p>
+          <a:p>
+            <a:r>
+              <a:rPr lang="en-GB" baseline="0" dirty="0" smtClean="0"/>
+              <a:t>I have hit upon this problem when encoding video. Video can take a long time to encode and the timeout on the messages was left at its default of 2mins. Which meant the message was being read multiple times kicking of a new encoding job each time. Until the first job had finished and deleted the message off he queue.</a:t>
             </a:r>
             <a:endParaRPr lang="en-GB" dirty="0"/>
           </a:p>
@@ -3303,7 +3361,7 @@
     </p:spTree>
     <p:extLst>
       <p:ext uri="{BB962C8B-B14F-4D97-AF65-F5344CB8AC3E}">
-        <p14:creationId xmlns:p14="http://schemas.microsoft.com/office/powerpoint/2010/main" val="2856833730"/>
+        <p14:creationId xmlns:p14="http://schemas.microsoft.com/office/powerpoint/2010/main" val="2631402639"/>
       </p:ext>
     </p:extLst>
   </p:cSld>
@@ -3359,55 +3417,135 @@
           <a:p>
             <a:r>
               <a:rPr lang="en-GB" dirty="0" smtClean="0"/>
-              <a:t>Azure supports two types of queue</a:t>
+              <a:t>The Azure Service Bus Service allows the user to create</a:t>
             </a:r>
             <a:r>
               <a:rPr lang="en-GB" baseline="0" dirty="0" smtClean="0"/>
-              <a:t> mechanisms. </a:t>
-            </a:r>
+              <a:t> namespaces where they can setup one or more of the available communication mechanisms.</a:t>
+            </a:r>
+          </a:p>
+          <a:p>
+            <a:endParaRPr lang="en-GB" baseline="0" dirty="0" smtClean="0"/>
+          </a:p>
+          <a:p>
+            <a:endParaRPr lang="en-GB" baseline="0" dirty="0" smtClean="0"/>
+          </a:p>
+          <a:p>
+            <a:pPr marL="171450" indent="-171450">
+              <a:buFont typeface="Arial" panose="020B0604020202020204" pitchFamily="34" charset="0"/>
+              <a:buChar char="•"/>
+            </a:pPr>
+            <a:r>
+              <a:rPr lang="en-GB" b="1" dirty="0" smtClean="0"/>
+              <a:t>Queues</a:t>
+            </a:r>
+            <a:r>
+              <a:rPr lang="en-GB" dirty="0" smtClean="0"/>
+              <a:t>,</a:t>
+            </a:r>
+            <a:r>
+              <a:rPr lang="en-GB" baseline="0" dirty="0" smtClean="0"/>
+              <a:t> which allow one directional communication. A message producer hands off a message to the queue. A single message consumer pulls the message from the queue and processes it.</a:t>
+            </a:r>
+          </a:p>
+          <a:p>
+            <a:pPr marL="171450" indent="-171450">
+              <a:buFont typeface="Arial" panose="020B0604020202020204" pitchFamily="34" charset="0"/>
+              <a:buChar char="•"/>
+            </a:pPr>
             <a:r>
               <a:rPr lang="en-GB" b="1" baseline="0" dirty="0" smtClean="0"/>
-              <a:t>Azure Queues</a:t>
+              <a:t>Topics</a:t>
             </a:r>
             <a:r>
               <a:rPr lang="en-GB" baseline="0" dirty="0" smtClean="0"/>
-              <a:t> and </a:t>
-            </a:r>
-            <a:r>
-              <a:rPr lang="en-GB" b="1" baseline="0" dirty="0" smtClean="0"/>
-              <a:t>Service Bus Queues</a:t>
-            </a:r>
-            <a:r>
-              <a:rPr lang="en-GB" baseline="0" dirty="0" smtClean="0"/>
-              <a:t>.</a:t>
-            </a:r>
-          </a:p>
-          <a:p>
-            <a:endParaRPr lang="en-GB" baseline="0" dirty="0" smtClean="0"/>
-          </a:p>
-          <a:p>
-            <a:r>
-              <a:rPr lang="en-GB" b="1" baseline="0" dirty="0" smtClean="0"/>
-              <a:t>Azure Queues</a:t>
-            </a:r>
-            <a:r>
-              <a:rPr lang="en-GB" baseline="0" dirty="0" smtClean="0"/>
-              <a:t> are part of the same Azure Storage service that Table Storage is part of. They provide a simple interface to reliably persist messages between services.</a:t>
-            </a:r>
-          </a:p>
-          <a:p>
-            <a:endParaRPr lang="en-GB" baseline="0" dirty="0" smtClean="0"/>
-          </a:p>
-          <a:p>
-            <a:r>
-              <a:rPr lang="en-GB" b="1" baseline="0" dirty="0" smtClean="0"/>
-              <a:t>Service Bus</a:t>
-            </a:r>
-            <a:r>
-              <a:rPr lang="en-GB" baseline="0" dirty="0" smtClean="0"/>
-              <a:t> queues are part of the wider Azure Messaging service which provides Queues, Topics, Relays and Event Hubs.</a:t>
-            </a:r>
-            <a:endParaRPr lang="en-GB" dirty="0" smtClean="0"/>
+              <a:t>, </a:t>
+            </a:r>
+            <a:r>
+              <a:rPr lang="en-GB" sz="1200" dirty="0" smtClean="0">
+                <a:solidFill>
+                  <a:srgbClr val="737373"/>
+                </a:solidFill>
+                <a:latin typeface="Georgia" panose="02040502050405020303" pitchFamily="18" charset="0"/>
+              </a:rPr>
+              <a:t>which provide one-directional communication using a publish/subscribe pattern. Like queues a single message producer hands a message off to a queue, but multiple message consumers can subscribe to that topic.</a:t>
+            </a:r>
+          </a:p>
+          <a:p>
+            <a:pPr marL="171450" indent="-171450">
+              <a:buFont typeface="Arial" panose="020B0604020202020204" pitchFamily="34" charset="0"/>
+              <a:buChar char="•"/>
+            </a:pPr>
+            <a:r>
+              <a:rPr lang="en-GB" sz="1200" b="1" dirty="0" smtClean="0">
+                <a:solidFill>
+                  <a:srgbClr val="737373"/>
+                </a:solidFill>
+                <a:latin typeface="Georgia" panose="02040502050405020303" pitchFamily="18" charset="0"/>
+              </a:rPr>
+              <a:t>Relays</a:t>
+            </a:r>
+            <a:r>
+              <a:rPr lang="en-GB" sz="1200" dirty="0" smtClean="0">
+                <a:solidFill>
+                  <a:srgbClr val="737373"/>
+                </a:solidFill>
+                <a:latin typeface="Georgia" panose="02040502050405020303" pitchFamily="18" charset="0"/>
+              </a:rPr>
+              <a:t>, which provide bi-directional communication. Unlike queues and topics a relay doesn’t broker messages via a queue. Instead,</a:t>
+            </a:r>
+            <a:r>
+              <a:rPr lang="en-GB" sz="1200" baseline="0" dirty="0" smtClean="0">
+                <a:solidFill>
+                  <a:srgbClr val="737373"/>
+                </a:solidFill>
+                <a:latin typeface="Georgia" panose="02040502050405020303" pitchFamily="18" charset="0"/>
+              </a:rPr>
+              <a:t> it just passes them on to the destination application via WCF messages.</a:t>
+            </a:r>
+          </a:p>
+          <a:p>
+            <a:pPr marL="171450" indent="-171450">
+              <a:buFont typeface="Arial" panose="020B0604020202020204" pitchFamily="34" charset="0"/>
+              <a:buChar char="•"/>
+            </a:pPr>
+            <a:r>
+              <a:rPr lang="en-GB" sz="1200" b="1" baseline="0" dirty="0" smtClean="0">
+                <a:solidFill>
+                  <a:srgbClr val="737373"/>
+                </a:solidFill>
+                <a:latin typeface="Georgia" panose="02040502050405020303" pitchFamily="18" charset="0"/>
+              </a:rPr>
+              <a:t>Event Hubs</a:t>
+            </a:r>
+            <a:r>
+              <a:rPr lang="en-GB" sz="1200" baseline="0" dirty="0" smtClean="0">
+                <a:solidFill>
+                  <a:srgbClr val="737373"/>
+                </a:solidFill>
+                <a:latin typeface="Georgia" panose="02040502050405020303" pitchFamily="18" charset="0"/>
+              </a:rPr>
+              <a:t>, </a:t>
+            </a:r>
+            <a:r>
+              <a:rPr lang="en-GB" sz="1200" dirty="0" smtClean="0">
+                <a:solidFill>
+                  <a:srgbClr val="737373"/>
+                </a:solidFill>
+                <a:latin typeface="Georgia" panose="02040502050405020303" pitchFamily="18" charset="0"/>
+              </a:rPr>
+              <a:t>which provide event and telemetry ingress to the cloud. Event Hubs are use</a:t>
+            </a:r>
+            <a:r>
+              <a:rPr lang="en-GB" sz="1200" baseline="0" dirty="0" smtClean="0">
+                <a:solidFill>
+                  <a:srgbClr val="737373"/>
+                </a:solidFill>
+                <a:latin typeface="Georgia" panose="02040502050405020303" pitchFamily="18" charset="0"/>
+              </a:rPr>
+              <a:t> to collect high volumes of data. They can process millions of events per second. For example, Volkswagen could have collect the live emissions data from all its cars using event hubs.</a:t>
+            </a:r>
+            <a:endParaRPr lang="en-GB" dirty="0"/>
           </a:p>
         </p:txBody>
       </p:sp>
@@ -3437,7 +3575,7 @@
     </p:spTree>
     <p:extLst>
       <p:ext uri="{BB962C8B-B14F-4D97-AF65-F5344CB8AC3E}">
-        <p14:creationId xmlns:p14="http://schemas.microsoft.com/office/powerpoint/2010/main" val="4251635917"/>
+        <p14:creationId xmlns:p14="http://schemas.microsoft.com/office/powerpoint/2010/main" val="1570882835"/>
       </p:ext>
     </p:extLst>
   </p:cSld>
@@ -3493,75 +3631,53 @@
           <a:p>
             <a:r>
               <a:rPr lang="en-GB" dirty="0" smtClean="0"/>
-              <a:t>Azure Storage Queues was</a:t>
+              <a:t>At every size of web application you will probably need to run some sort of background task</a:t>
             </a:r>
             <a:r>
               <a:rPr lang="en-GB" baseline="0" dirty="0" smtClean="0"/>
-              <a:t> the first queue mechanism on Azure and provides a way of storing a large number of messages for services to process.</a:t>
+              <a:t> weather that is clean up data, resize images or process queue messages.</a:t>
+            </a:r>
+          </a:p>
+          <a:p>
+            <a:r>
+              <a:rPr lang="en-GB" baseline="0" dirty="0" smtClean="0"/>
+              <a:t>Azure has two services you could use.</a:t>
             </a:r>
           </a:p>
           <a:p>
             <a:endParaRPr lang="en-GB" baseline="0" dirty="0" smtClean="0"/>
           </a:p>
           <a:p>
+            <a:pPr marL="171450" indent="-171450">
+              <a:buFont typeface="Arial" panose="020B0604020202020204" pitchFamily="34" charset="0"/>
+              <a:buChar char="•"/>
+            </a:pPr>
+            <a:r>
+              <a:rPr lang="en-GB" b="1" baseline="0" dirty="0" smtClean="0"/>
+              <a:t>Web Jobs</a:t>
+            </a:r>
             <a:r>
               <a:rPr lang="en-GB" baseline="0" dirty="0" smtClean="0"/>
-              <a:t>A single message can be up to 64KB and the only limit on the number of messages you can store is the storage account data limit of 500TB.</a:t>
-            </a:r>
+              <a:t>, which are part of the Web Apps service. You can run any program or script continuously, on a schedule or on a trigger with a web job.</a:t>
+            </a:r>
+          </a:p>
+          <a:p>
+            <a:pPr marL="171450" indent="-171450">
+              <a:buFont typeface="Arial" panose="020B0604020202020204" pitchFamily="34" charset="0"/>
+              <a:buChar char="•"/>
+            </a:pPr>
+            <a:r>
+              <a:rPr lang="en-GB" b="1" baseline="0" dirty="0" smtClean="0"/>
+              <a:t>Worker Roles</a:t>
+            </a:r>
+            <a:r>
+              <a:rPr lang="en-GB" baseline="0" dirty="0" smtClean="0"/>
+              <a:t>, which are part of the Cloud Services service. Like a Web Role a Worker Role has an entry point class, which as a number of events that are triggered.</a:t>
+            </a:r>
+            <a:endParaRPr lang="en-GB" dirty="0" smtClean="0"/>
           </a:p>
           <a:p>
             <a:endParaRPr lang="en-GB" baseline="0" dirty="0" smtClean="0"/>
-          </a:p>
-          <a:p>
-            <a:r>
-              <a:rPr lang="en-GB" baseline="0" dirty="0" smtClean="0"/>
-              <a:t>Queues are used to delegate work and decouple your application from long running tasks.</a:t>
-            </a:r>
-          </a:p>
-          <a:p>
-            <a:r>
-              <a:rPr lang="en-GB" baseline="0" dirty="0" smtClean="0"/>
-              <a:t>For example you application may allow you users to upload images, But the application needs a thumbnail of the image.</a:t>
-            </a:r>
-          </a:p>
-          <a:p>
-            <a:r>
-              <a:rPr lang="en-GB" baseline="0" dirty="0" smtClean="0"/>
-              <a:t>Rather than making your customer wait for the thumbnail to be created you can put the location of the image in a message and put the message on a queue.</a:t>
-            </a:r>
-          </a:p>
-          <a:p>
-            <a:r>
-              <a:rPr lang="en-GB" baseline="0" dirty="0" smtClean="0"/>
-              <a:t>Then a background task can take that message off the queue generate the thumbnail, save it and delete the message off the queue.</a:t>
-            </a:r>
-          </a:p>
-          <a:p>
-            <a:endParaRPr lang="en-GB" baseline="0" dirty="0" smtClean="0"/>
-          </a:p>
-          <a:p>
-            <a:r>
-              <a:rPr lang="en-GB" baseline="0" dirty="0" smtClean="0"/>
-              <a:t>One thing to be aware of is when a message is read it is not removed off the queue it is hidden for a configurable amount of time. You need to be careful not to set the Invisibility Timeout to low, by default is 2 </a:t>
-            </a:r>
-            <a:r>
-              <a:rPr lang="en-GB" baseline="0" dirty="0" err="1" smtClean="0"/>
-              <a:t>mins</a:t>
-            </a:r>
-            <a:r>
-              <a:rPr lang="en-GB" baseline="0" dirty="0" smtClean="0"/>
-              <a:t>, because your message could appear back on the queue and be read again before you have finished processing it. </a:t>
-            </a:r>
-          </a:p>
-          <a:p>
-            <a:endParaRPr lang="en-GB" baseline="0" dirty="0" smtClean="0"/>
-          </a:p>
-          <a:p>
-            <a:r>
-              <a:rPr lang="en-GB" baseline="0" dirty="0" smtClean="0"/>
-              <a:t>I have hit upon this problem when encoding video. Video can take a long time to encode and the timeout on the messages was left at its default of 2mins. Which meant the message was being read multiple times kicking of a new encoding job each time. Until the first job had finished and deleted the message off he queue.</a:t>
-            </a:r>
-            <a:endParaRPr lang="en-GB" dirty="0"/>
           </a:p>
         </p:txBody>
       </p:sp>
@@ -3591,7 +3707,7 @@
     </p:spTree>
     <p:extLst>
       <p:ext uri="{BB962C8B-B14F-4D97-AF65-F5344CB8AC3E}">
-        <p14:creationId xmlns:p14="http://schemas.microsoft.com/office/powerpoint/2010/main" val="2631402639"/>
+        <p14:creationId xmlns:p14="http://schemas.microsoft.com/office/powerpoint/2010/main" val="3640884441"/>
       </p:ext>
     </p:extLst>
   </p:cSld>
@@ -3645,37 +3761,17 @@
           <a:bodyPr/>
           <a:lstStyle/>
           <a:p>
-            <a:r>
-              <a:rPr lang="en-GB" dirty="0" smtClean="0"/>
-              <a:t>The Azure Service Bus Service allows the user to create</a:t>
-            </a:r>
-            <a:r>
-              <a:rPr lang="en-GB" baseline="0" dirty="0" smtClean="0"/>
-              <a:t> namespaces where they can setup one or more of the available communication mechanisms.</a:t>
-            </a:r>
-          </a:p>
-          <a:p>
-            <a:endParaRPr lang="en-GB" baseline="0" dirty="0" smtClean="0"/>
-          </a:p>
-          <a:p>
-            <a:endParaRPr lang="en-GB" baseline="0" dirty="0" smtClean="0"/>
-          </a:p>
-          <a:p>
             <a:pPr marL="171450" indent="-171450">
               <a:buFont typeface="Arial" panose="020B0604020202020204" pitchFamily="34" charset="0"/>
               <a:buChar char="•"/>
             </a:pPr>
             <a:r>
-              <a:rPr lang="en-GB" b="1" dirty="0" smtClean="0"/>
-              <a:t>Queues</a:t>
-            </a:r>
-            <a:r>
               <a:rPr lang="en-GB" dirty="0" smtClean="0"/>
-              <a:t>,</a:t>
+              <a:t>Put simply,</a:t>
             </a:r>
             <a:r>
               <a:rPr lang="en-GB" baseline="0" dirty="0" smtClean="0"/>
-              <a:t> which allow one directional communication. A message producer hands off a message to the queue. A single message consumer pulls the message from the queue and processes it.</a:t>
+              <a:t> if you are able to run a script or a program on your local computer you can run it on Azure. All you need to do is upload it.</a:t>
             </a:r>
           </a:p>
           <a:p>
@@ -3684,21 +3780,8 @@
               <a:buChar char="•"/>
             </a:pPr>
             <a:r>
-              <a:rPr lang="en-GB" b="1" baseline="0" dirty="0" smtClean="0"/>
-              <a:t>Topics</a:t>
-            </a:r>
-            <a:r>
               <a:rPr lang="en-GB" baseline="0" dirty="0" smtClean="0"/>
-              <a:t>, </a:t>
-            </a:r>
-            <a:r>
-              <a:rPr lang="en-GB" sz="1200" dirty="0" smtClean="0">
-                <a:solidFill>
-                  <a:srgbClr val="737373"/>
-                </a:solidFill>
-                <a:latin typeface="Georgia" panose="02040502050405020303" pitchFamily="18" charset="0"/>
-              </a:rPr>
-              <a:t>which provide one-directional communication using a publish/subscribe pattern. Like queues a single message producer hands a message off to a queue, but multiple message consumers can subscribe to that topic.</a:t>
+              <a:t>There are lot of scripts and programs which are supported. </a:t>
             </a:r>
           </a:p>
           <a:p>
@@ -3707,31 +3790,52 @@
               <a:buChar char="•"/>
             </a:pPr>
             <a:r>
-              <a:rPr lang="en-GB" sz="1200" b="1" dirty="0" smtClean="0">
-                <a:solidFill>
-                  <a:srgbClr val="737373"/>
-                </a:solidFill>
-                <a:latin typeface="Georgia" panose="02040502050405020303" pitchFamily="18" charset="0"/>
-              </a:rPr>
-              <a:t>Relays</a:t>
-            </a:r>
-            <a:r>
-              <a:rPr lang="en-GB" sz="1200" dirty="0" smtClean="0">
-                <a:solidFill>
-                  <a:srgbClr val="737373"/>
-                </a:solidFill>
-                <a:latin typeface="Georgia" panose="02040502050405020303" pitchFamily="18" charset="0"/>
-              </a:rPr>
-              <a:t>, which provide bi-directional communication. Unlike queues and topics a relay doesn’t broker messages via a queue. Instead,</a:t>
-            </a:r>
-            <a:r>
-              <a:rPr lang="en-GB" sz="1200" baseline="0" dirty="0" smtClean="0">
-                <a:solidFill>
-                  <a:srgbClr val="737373"/>
-                </a:solidFill>
-                <a:latin typeface="Georgia" panose="02040502050405020303" pitchFamily="18" charset="0"/>
-              </a:rPr>
-              <a:t> it just passes them on to the destination application via WCF messages.</a:t>
+              <a:rPr lang="en-GB" dirty="0" smtClean="0"/>
+              <a:t>As they are built in</a:t>
+            </a:r>
+            <a:r>
+              <a:rPr lang="en-GB" baseline="0" dirty="0" smtClean="0"/>
+              <a:t> to the </a:t>
+            </a:r>
+            <a:r>
+              <a:rPr lang="en-GB" baseline="0" dirty="0" err="1" smtClean="0"/>
+              <a:t>WebApps</a:t>
+            </a:r>
+            <a:r>
+              <a:rPr lang="en-GB" baseline="0" dirty="0" smtClean="0"/>
+              <a:t> service </a:t>
+            </a:r>
+            <a:r>
+              <a:rPr lang="en-GB" baseline="0" dirty="0" err="1" smtClean="0"/>
+              <a:t>WebJobs</a:t>
+            </a:r>
+            <a:r>
+              <a:rPr lang="en-GB" baseline="0" dirty="0" smtClean="0"/>
+              <a:t> get all the feature </a:t>
+            </a:r>
+            <a:r>
+              <a:rPr lang="en-GB" baseline="0" dirty="0" err="1" smtClean="0"/>
+              <a:t>WebApps</a:t>
+            </a:r>
+            <a:r>
+              <a:rPr lang="en-GB" baseline="0" dirty="0" smtClean="0"/>
+              <a:t> do, </a:t>
+            </a:r>
+            <a:r>
+              <a:rPr lang="en-GB" baseline="0" dirty="0" err="1" smtClean="0"/>
+              <a:t>WebJobs</a:t>
+            </a:r>
+            <a:r>
+              <a:rPr lang="en-GB" baseline="0" dirty="0" smtClean="0"/>
+              <a:t> also share the same instance resources as you </a:t>
+            </a:r>
+            <a:r>
+              <a:rPr lang="en-GB" baseline="0" dirty="0" err="1" smtClean="0"/>
+              <a:t>WebApp</a:t>
+            </a:r>
+            <a:r>
+              <a:rPr lang="en-GB" baseline="0" dirty="0" smtClean="0"/>
+              <a:t>.</a:t>
             </a:r>
           </a:p>
           <a:p>
@@ -3740,42 +3844,83 @@
               <a:buChar char="•"/>
             </a:pPr>
             <a:r>
-              <a:rPr lang="en-GB" sz="1200" b="1" baseline="0" dirty="0" smtClean="0">
-                <a:solidFill>
-                  <a:srgbClr val="737373"/>
-                </a:solidFill>
-                <a:latin typeface="Georgia" panose="02040502050405020303" pitchFamily="18" charset="0"/>
-              </a:rPr>
-              <a:t>Event Hubs</a:t>
-            </a:r>
-            <a:r>
-              <a:rPr lang="en-GB" sz="1200" baseline="0" dirty="0" smtClean="0">
-                <a:solidFill>
-                  <a:srgbClr val="737373"/>
-                </a:solidFill>
-                <a:latin typeface="Georgia" panose="02040502050405020303" pitchFamily="18" charset="0"/>
-              </a:rPr>
-              <a:t>, </a:t>
-            </a:r>
-            <a:r>
-              <a:rPr lang="en-GB" sz="1200" dirty="0" smtClean="0">
-                <a:solidFill>
-                  <a:srgbClr val="737373"/>
-                </a:solidFill>
-                <a:latin typeface="Georgia" panose="02040502050405020303" pitchFamily="18" charset="0"/>
-              </a:rPr>
-              <a:t>which provide event and telemetry ingress to the cloud. Event Hubs are use</a:t>
-            </a:r>
-            <a:r>
-              <a:rPr lang="en-GB" sz="1200" baseline="0" dirty="0" smtClean="0">
-                <a:solidFill>
-                  <a:srgbClr val="737373"/>
-                </a:solidFill>
-                <a:latin typeface="Georgia" panose="02040502050405020303" pitchFamily="18" charset="0"/>
-              </a:rPr>
-              <a:t> to collect high volumes of data. They can process millions of events per second. For example, Volkswagen could have collect the live emissions data from all its cars using event hubs.</a:t>
-            </a:r>
-            <a:endParaRPr lang="en-GB" dirty="0"/>
+              <a:rPr lang="en-GB" baseline="0" dirty="0" smtClean="0"/>
+              <a:t>The </a:t>
+            </a:r>
+            <a:r>
+              <a:rPr lang="en-GB" baseline="0" dirty="0" err="1" smtClean="0"/>
+              <a:t>WebJobs</a:t>
+            </a:r>
+            <a:r>
+              <a:rPr lang="en-GB" baseline="0" dirty="0" smtClean="0"/>
+              <a:t> SDK makes working with over Azure service, such as Blob &amp; table storage, Queues and Service Bus, a breeze.</a:t>
+            </a:r>
+          </a:p>
+          <a:p>
+            <a:pPr marL="171450" indent="-171450">
+              <a:buFont typeface="Arial" panose="020B0604020202020204" pitchFamily="34" charset="0"/>
+              <a:buChar char="•"/>
+            </a:pPr>
+            <a:r>
+              <a:rPr lang="en-GB" baseline="0" dirty="0" smtClean="0"/>
+              <a:t>Because </a:t>
+            </a:r>
+            <a:r>
+              <a:rPr lang="en-GB" baseline="0" dirty="0" err="1" smtClean="0"/>
+              <a:t>WebJobs</a:t>
+            </a:r>
+            <a:r>
+              <a:rPr lang="en-GB" baseline="0" dirty="0" smtClean="0"/>
+              <a:t> are on the same server instance as your </a:t>
+            </a:r>
+            <a:r>
+              <a:rPr lang="en-GB" baseline="0" dirty="0" err="1" smtClean="0"/>
+              <a:t>WebApp</a:t>
+            </a:r>
+            <a:r>
+              <a:rPr lang="en-GB" baseline="0" dirty="0" smtClean="0"/>
+              <a:t>, it means </a:t>
+            </a:r>
+            <a:r>
+              <a:rPr lang="en-GB" baseline="0" dirty="0" err="1" smtClean="0"/>
+              <a:t>WebApp</a:t>
+            </a:r>
+            <a:r>
+              <a:rPr lang="en-GB" baseline="0" dirty="0" smtClean="0"/>
+              <a:t> and </a:t>
+            </a:r>
+            <a:r>
+              <a:rPr lang="en-GB" baseline="0" dirty="0" err="1" smtClean="0"/>
+              <a:t>WebJob</a:t>
+            </a:r>
+            <a:r>
+              <a:rPr lang="en-GB" baseline="0" dirty="0" smtClean="0"/>
+              <a:t> scale together. If your </a:t>
+            </a:r>
+            <a:r>
+              <a:rPr lang="en-GB" baseline="0" dirty="0" err="1" smtClean="0"/>
+              <a:t>WebApp</a:t>
+            </a:r>
+            <a:r>
+              <a:rPr lang="en-GB" baseline="0" dirty="0" smtClean="0"/>
+              <a:t> trigger an </a:t>
+            </a:r>
+            <a:r>
+              <a:rPr lang="en-GB" baseline="0" dirty="0" err="1" smtClean="0"/>
+              <a:t>autoscale</a:t>
+            </a:r>
+            <a:r>
+              <a:rPr lang="en-GB" baseline="0" dirty="0" smtClean="0"/>
+              <a:t> event your </a:t>
+            </a:r>
+            <a:r>
+              <a:rPr lang="en-GB" baseline="0" dirty="0" err="1" smtClean="0"/>
+              <a:t>WebJob</a:t>
+            </a:r>
+            <a:r>
+              <a:rPr lang="en-GB" baseline="0" dirty="0" smtClean="0"/>
+              <a:t> will scale out with the App.</a:t>
+            </a:r>
           </a:p>
         </p:txBody>
       </p:sp>
@@ -3805,7 +3950,7 @@
     </p:spTree>
     <p:extLst>
       <p:ext uri="{BB962C8B-B14F-4D97-AF65-F5344CB8AC3E}">
-        <p14:creationId xmlns:p14="http://schemas.microsoft.com/office/powerpoint/2010/main" val="1570882835"/>
+        <p14:creationId xmlns:p14="http://schemas.microsoft.com/office/powerpoint/2010/main" val="2191421544"/>
       </p:ext>
     </p:extLst>
   </p:cSld>
@@ -3860,22 +4005,17 @@
           <a:lstStyle/>
           <a:p>
             <a:r>
-              <a:rPr lang="en-GB" dirty="0" smtClean="0"/>
-              <a:t>At every size of web application you will probably need to run some sort of background task</a:t>
-            </a:r>
-            <a:r>
               <a:rPr lang="en-GB" baseline="0" dirty="0" smtClean="0"/>
-              <a:t> weather that is clean up data, resize images or process queue messages.</a:t>
-            </a:r>
-          </a:p>
-          <a:p>
+              <a:t>Worker Roles can be thought of the </a:t>
+            </a:r>
+            <a:r>
+              <a:rPr lang="en-GB" baseline="0" dirty="0" err="1" smtClean="0"/>
+              <a:t>WebJobs</a:t>
+            </a:r>
             <a:r>
               <a:rPr lang="en-GB" baseline="0" dirty="0" smtClean="0"/>
-              <a:t>Azure has two services you could use.</a:t>
-            </a:r>
-          </a:p>
-          <a:p>
-            <a:endParaRPr lang="en-GB" baseline="0" dirty="0" smtClean="0"/>
+              <a:t> powerlifting big brother. Worker Roles are part of the Cloud Services service, which Web Roles are part of too.</a:t>
+            </a:r>
           </a:p>
           <a:p>
             <a:pPr marL="171450" indent="-171450">
@@ -3883,12 +4023,12 @@
               <a:buChar char="•"/>
             </a:pPr>
             <a:r>
-              <a:rPr lang="en-GB" b="1" baseline="0" dirty="0" smtClean="0"/>
-              <a:t>Web Jobs</a:t>
-            </a:r>
-            <a:r>
               <a:rPr lang="en-GB" baseline="0" dirty="0" smtClean="0"/>
-              <a:t>, which are part of the Web Apps service. You can run any program or script continuously, on a schedule or on a trigger with a web job.</a:t>
+              <a:t>So all the features a Web Role has a Worker Role has. The difference between a Web Role and a Worker role is that Worker Roles are not hosted in IIS so cannot contain one or more web applications. A Worker Role </a:t>
+            </a:r>
+            <a:r>
+              <a:rPr lang="en-GB" dirty="0" smtClean="0"/>
+              <a:t>can be thought of as Windows services that execute background tasks but in the cloud.</a:t>
             </a:r>
           </a:p>
           <a:p>
@@ -3897,14 +4037,40 @@
               <a:buChar char="•"/>
             </a:pPr>
             <a:r>
-              <a:rPr lang="en-GB" b="1" baseline="0" dirty="0" smtClean="0"/>
-              <a:t>Worker Roles</a:t>
+              <a:rPr lang="en-GB" dirty="0" smtClean="0"/>
+              <a:t>Unlike a </a:t>
+            </a:r>
+            <a:r>
+              <a:rPr lang="en-GB" dirty="0" err="1" smtClean="0"/>
+              <a:t>WebJob</a:t>
+            </a:r>
+            <a:r>
+              <a:rPr lang="en-GB" dirty="0" smtClean="0"/>
+              <a:t> a </a:t>
+            </a:r>
+            <a:r>
+              <a:rPr lang="en-GB" dirty="0" err="1" smtClean="0"/>
+              <a:t>WorkerRole</a:t>
             </a:r>
             <a:r>
               <a:rPr lang="en-GB" baseline="0" dirty="0" smtClean="0"/>
-              <a:t>, which are part of the Cloud Services service. Like a Web Role a Worker Role has an entry point class, which as a number of events that are triggered.</a:t>
+              <a:t> is hosted in its own VM, so any resource heavy tasks wont affect the Website. This also means it can scale independently of a </a:t>
+            </a:r>
+            <a:r>
+              <a:rPr lang="en-GB" baseline="0" dirty="0" err="1" smtClean="0"/>
+              <a:t>WebApp</a:t>
+            </a:r>
+            <a:r>
+              <a:rPr lang="en-GB" baseline="0" dirty="0" smtClean="0"/>
+              <a:t> or Web Role. </a:t>
             </a:r>
             <a:endParaRPr lang="en-GB" dirty="0" smtClean="0"/>
+          </a:p>
+          <a:p>
+            <a:endParaRPr lang="en-GB" baseline="0" dirty="0" smtClean="0"/>
+          </a:p>
+          <a:p>
+            <a:endParaRPr lang="en-GB" baseline="0" dirty="0" smtClean="0"/>
           </a:p>
           <a:p>
             <a:endParaRPr lang="en-GB" baseline="0" dirty="0" smtClean="0"/>
@@ -3937,7 +4103,7 @@
     </p:spTree>
     <p:extLst>
       <p:ext uri="{BB962C8B-B14F-4D97-AF65-F5344CB8AC3E}">
-        <p14:creationId xmlns:p14="http://schemas.microsoft.com/office/powerpoint/2010/main" val="3640884441"/>
+        <p14:creationId xmlns:p14="http://schemas.microsoft.com/office/powerpoint/2010/main" val="2757543137"/>
       </p:ext>
     </p:extLst>
   </p:cSld>
@@ -3991,166 +4157,21 @@
           <a:bodyPr/>
           <a:lstStyle/>
           <a:p>
-            <a:pPr marL="171450" indent="-171450">
-              <a:buFont typeface="Arial" panose="020B0604020202020204" pitchFamily="34" charset="0"/>
-              <a:buChar char="•"/>
-            </a:pPr>
-            <a:r>
-              <a:rPr lang="en-GB" dirty="0" smtClean="0"/>
-              <a:t>Put simply,</a:t>
-            </a:r>
             <a:r>
               <a:rPr lang="en-GB" baseline="0" dirty="0" smtClean="0"/>
-              <a:t> if you are able to run a script or a program on your local computer you can run it on Azure. All you need to do is upload it.</a:t>
-            </a:r>
-          </a:p>
-          <a:p>
-            <a:pPr marL="171450" indent="-171450">
-              <a:buFont typeface="Arial" panose="020B0604020202020204" pitchFamily="34" charset="0"/>
-              <a:buChar char="•"/>
-            </a:pPr>
+              <a:t>Worker Roles still has a </a:t>
+            </a:r>
+            <a:r>
+              <a:rPr lang="en-GB" baseline="0" dirty="0" err="1" smtClean="0"/>
+              <a:t>RoleEntryPoint</a:t>
+            </a:r>
             <a:r>
               <a:rPr lang="en-GB" baseline="0" dirty="0" smtClean="0"/>
-              <a:t>There are lot of scripts and programs which are supported. </a:t>
-            </a:r>
-          </a:p>
-          <a:p>
-            <a:pPr marL="171450" indent="-171450">
-              <a:buFont typeface="Arial" panose="020B0604020202020204" pitchFamily="34" charset="0"/>
-              <a:buChar char="•"/>
-            </a:pPr>
-            <a:r>
-              <a:rPr lang="en-GB" dirty="0" smtClean="0"/>
-              <a:t>As they are built in</a:t>
-            </a:r>
-            <a:r>
-              <a:rPr lang="en-GB" baseline="0" dirty="0" smtClean="0"/>
-              <a:t> to the </a:t>
-            </a:r>
-            <a:r>
-              <a:rPr lang="en-GB" baseline="0" dirty="0" err="1" smtClean="0"/>
-              <a:t>WebApps</a:t>
-            </a:r>
-            <a:r>
-              <a:rPr lang="en-GB" baseline="0" dirty="0" smtClean="0"/>
-              <a:t> service </a:t>
-            </a:r>
-            <a:r>
-              <a:rPr lang="en-GB" baseline="0" dirty="0" err="1" smtClean="0"/>
-              <a:t>WebJobs</a:t>
-            </a:r>
-            <a:r>
-              <a:rPr lang="en-GB" baseline="0" dirty="0" smtClean="0"/>
-              <a:t> get all the feature </a:t>
-            </a:r>
-            <a:r>
-              <a:rPr lang="en-GB" baseline="0" dirty="0" err="1" smtClean="0"/>
-              <a:t>WebApps</a:t>
-            </a:r>
-            <a:r>
-              <a:rPr lang="en-GB" baseline="0" dirty="0" smtClean="0"/>
-              <a:t> do, </a:t>
-            </a:r>
-            <a:r>
-              <a:rPr lang="en-GB" baseline="0" dirty="0" err="1" smtClean="0"/>
-              <a:t>WebJobs</a:t>
-            </a:r>
-            <a:r>
-              <a:rPr lang="en-GB" baseline="0" dirty="0" smtClean="0"/>
-              <a:t> also share the same instance resources as you </a:t>
-            </a:r>
-            <a:r>
-              <a:rPr lang="en-GB" baseline="0" dirty="0" err="1" smtClean="0"/>
-              <a:t>WebApp</a:t>
-            </a:r>
-            <a:r>
-              <a:rPr lang="en-GB" baseline="0" dirty="0" smtClean="0"/>
-              <a:t>.</a:t>
-            </a:r>
-          </a:p>
-          <a:p>
-            <a:pPr marL="171450" indent="-171450">
-              <a:buFont typeface="Arial" panose="020B0604020202020204" pitchFamily="34" charset="0"/>
-              <a:buChar char="•"/>
-            </a:pPr>
-            <a:r>
-              <a:rPr lang="en-GB" baseline="0" dirty="0" smtClean="0"/>
-              <a:t>The </a:t>
-            </a:r>
-            <a:r>
-              <a:rPr lang="en-GB" baseline="0" dirty="0" err="1" smtClean="0"/>
-              <a:t>WebJobs</a:t>
-            </a:r>
-            <a:r>
-              <a:rPr lang="en-GB" baseline="0" dirty="0" smtClean="0"/>
-              <a:t> SDK makes working with over Azure service, such as Blob &amp; table storage, Queues and Service Bus, a breeze.</a:t>
-            </a:r>
-          </a:p>
-          <a:p>
-            <a:pPr marL="171450" indent="-171450">
-              <a:buFont typeface="Arial" panose="020B0604020202020204" pitchFamily="34" charset="0"/>
-              <a:buChar char="•"/>
-            </a:pPr>
-            <a:r>
-              <a:rPr lang="en-GB" baseline="0" dirty="0" smtClean="0"/>
-              <a:t>Because </a:t>
-            </a:r>
-            <a:r>
-              <a:rPr lang="en-GB" baseline="0" dirty="0" err="1" smtClean="0"/>
-              <a:t>WebJobs</a:t>
-            </a:r>
-            <a:r>
-              <a:rPr lang="en-GB" baseline="0" dirty="0" smtClean="0"/>
-              <a:t> are on the same server instance as your </a:t>
-            </a:r>
-            <a:r>
-              <a:rPr lang="en-GB" baseline="0" dirty="0" err="1" smtClean="0"/>
-              <a:t>WebApp</a:t>
-            </a:r>
-            <a:r>
-              <a:rPr lang="en-GB" baseline="0" dirty="0" smtClean="0"/>
-              <a:t>, it means </a:t>
-            </a:r>
-            <a:r>
-              <a:rPr lang="en-GB" baseline="0" dirty="0" err="1" smtClean="0"/>
-              <a:t>WebApp</a:t>
-            </a:r>
-            <a:r>
-              <a:rPr lang="en-GB" baseline="0" dirty="0" smtClean="0"/>
-              <a:t> and </a:t>
-            </a:r>
-            <a:r>
-              <a:rPr lang="en-GB" baseline="0" dirty="0" err="1" smtClean="0"/>
-              <a:t>WebJob</a:t>
-            </a:r>
-            <a:r>
-              <a:rPr lang="en-GB" baseline="0" dirty="0" smtClean="0"/>
-              <a:t> scale together. If your </a:t>
-            </a:r>
-            <a:r>
-              <a:rPr lang="en-GB" baseline="0" dirty="0" err="1" smtClean="0"/>
-              <a:t>WebApp</a:t>
-            </a:r>
-            <a:r>
-              <a:rPr lang="en-GB" baseline="0" dirty="0" smtClean="0"/>
-              <a:t> trigger an </a:t>
-            </a:r>
-            <a:r>
-              <a:rPr lang="en-GB" baseline="0" dirty="0" err="1" smtClean="0"/>
-              <a:t>autoscale</a:t>
-            </a:r>
-            <a:r>
-              <a:rPr lang="en-GB" baseline="0" dirty="0" smtClean="0"/>
-              <a:t> event your </a:t>
-            </a:r>
-            <a:r>
-              <a:rPr lang="en-GB" baseline="0" dirty="0" err="1" smtClean="0"/>
-              <a:t>WebJob</a:t>
-            </a:r>
-            <a:r>
-              <a:rPr lang="en-GB" baseline="0" dirty="0" smtClean="0"/>
-              <a:t> will scale out with the App.</a:t>
-            </a:r>
+              <a:t> class and the Service Configuration project, but we don’t have the ASP.NET that we had earlier.</a:t>
+            </a:r>
+          </a:p>
+          <a:p>
+            <a:endParaRPr lang="en-GB" baseline="0" dirty="0" smtClean="0"/>
           </a:p>
         </p:txBody>
       </p:sp>
@@ -4180,7 +4201,7 @@
     </p:spTree>
     <p:extLst>
       <p:ext uri="{BB962C8B-B14F-4D97-AF65-F5344CB8AC3E}">
-        <p14:creationId xmlns:p14="http://schemas.microsoft.com/office/powerpoint/2010/main" val="2191421544"/>
+        <p14:creationId xmlns:p14="http://schemas.microsoft.com/office/powerpoint/2010/main" val="251820965"/>
       </p:ext>
     </p:extLst>
   </p:cSld>
@@ -4236,7 +4257,24 @@
           <a:p>
             <a:r>
               <a:rPr lang="en-GB" baseline="0" dirty="0" smtClean="0"/>
-              <a:t>Worker Roles can be thought of the </a:t>
+              <a:t>Here I have modified the class to write some text out every 5 seconds using a Timer event. It is not spectacular but it shows how the Worker Role creates and sets up the Timer in the </a:t>
+            </a:r>
+            <a:r>
+              <a:rPr lang="en-GB" baseline="0" dirty="0" err="1" smtClean="0"/>
+              <a:t>OnStart</a:t>
+            </a:r>
+            <a:r>
+              <a:rPr lang="en-GB" baseline="0" dirty="0" smtClean="0"/>
+              <a:t> method. Then Starts the timer in the Run method.</a:t>
+            </a:r>
+          </a:p>
+          <a:p>
+            <a:endParaRPr lang="en-GB" baseline="0" dirty="0" smtClean="0"/>
+          </a:p>
+          <a:p>
+            <a:r>
+              <a:rPr lang="en-GB" baseline="0" dirty="0" smtClean="0"/>
+              <a:t>While both </a:t>
             </a:r>
             <a:r>
               <a:rPr lang="en-GB" baseline="0" dirty="0" err="1" smtClean="0"/>
@@ -4244,63 +4282,87 @@
             </a:r>
             <a:r>
               <a:rPr lang="en-GB" baseline="0" dirty="0" smtClean="0"/>
-              <a:t> powerlifting big brother. Worker Roles are part of the Cloud Services service, which Web Roles are part of too.</a:t>
-            </a:r>
-          </a:p>
-          <a:p>
-            <a:pPr marL="171450" indent="-171450">
-              <a:buFont typeface="Arial" panose="020B0604020202020204" pitchFamily="34" charset="0"/>
-              <a:buChar char="•"/>
-            </a:pPr>
+              <a:t> and Worker Roles are able to process background tasks. </a:t>
+            </a:r>
+          </a:p>
+          <a:p>
+            <a:r>
+              <a:rPr lang="en-GB" baseline="0" dirty="0" err="1" smtClean="0"/>
+              <a:t>WebJobs</a:t>
+            </a:r>
             <a:r>
               <a:rPr lang="en-GB" baseline="0" dirty="0" smtClean="0"/>
-              <a:t>So all the features a Web Role has a Worker Role has. The difference between a Web Role and a Worker role is that Worker Roles are not hosted in IIS so cannot contain one or more web applications. A Worker Role </a:t>
-            </a:r>
-            <a:r>
-              <a:rPr lang="en-GB" dirty="0" smtClean="0"/>
-              <a:t>can be thought of as Windows services that execute background tasks but in the cloud.</a:t>
-            </a:r>
-          </a:p>
-          <a:p>
-            <a:pPr marL="171450" indent="-171450">
-              <a:buFont typeface="Arial" panose="020B0604020202020204" pitchFamily="34" charset="0"/>
-              <a:buChar char="•"/>
-            </a:pPr>
-            <a:r>
-              <a:rPr lang="en-GB" dirty="0" smtClean="0"/>
-              <a:t>Unlike a </a:t>
-            </a:r>
-            <a:r>
-              <a:rPr lang="en-GB" dirty="0" err="1" smtClean="0"/>
+              <a:t> can only do one thing, you would have to deploy many different </a:t>
+            </a:r>
+            <a:r>
+              <a:rPr lang="en-GB" baseline="0" dirty="0" err="1" smtClean="0"/>
+              <a:t>WebJobs</a:t>
+            </a:r>
+            <a:r>
+              <a:rPr lang="en-GB" baseline="0" dirty="0" smtClean="0"/>
+              <a:t> to process different tasks.</a:t>
+            </a:r>
+          </a:p>
+          <a:p>
+            <a:r>
+              <a:rPr lang="en-GB" baseline="0" dirty="0" smtClean="0"/>
+              <a:t>If you required additional software installed to complete a task, a Worker Role would be the only choice as you can RDP into a Worker Role but you cannot on a </a:t>
+            </a:r>
+            <a:r>
+              <a:rPr lang="en-GB" baseline="0" dirty="0" err="1" smtClean="0"/>
               <a:t>WebJob</a:t>
             </a:r>
             <a:r>
-              <a:rPr lang="en-GB" dirty="0" smtClean="0"/>
-              <a:t> a </a:t>
-            </a:r>
-            <a:r>
-              <a:rPr lang="en-GB" dirty="0" err="1" smtClean="0"/>
-              <a:t>WorkerRole</a:t>
-            </a:r>
-            <a:r>
               <a:rPr lang="en-GB" baseline="0" dirty="0" smtClean="0"/>
-              <a:t> is hosted in its own VM, so any resource heavy tasks wont affect the Website. This also means it can scale independently of a </a:t>
+              <a:t>.</a:t>
+            </a:r>
+          </a:p>
+          <a:p>
+            <a:r>
+              <a:rPr lang="en-GB" baseline="0" dirty="0" smtClean="0"/>
+              <a:t>If your objective is to run scheduled jobs only using the libraries available in </a:t>
             </a:r>
             <a:r>
               <a:rPr lang="en-GB" baseline="0" dirty="0" err="1" smtClean="0"/>
-              <a:t>WebApp</a:t>
+              <a:t>.Net</a:t>
             </a:r>
             <a:r>
               <a:rPr lang="en-GB" baseline="0" dirty="0" smtClean="0"/>
-              <a:t> or Web Role. </a:t>
-            </a:r>
-            <a:endParaRPr lang="en-GB" dirty="0" smtClean="0"/>
+              <a:t> then a </a:t>
+            </a:r>
+            <a:r>
+              <a:rPr lang="en-GB" baseline="0" dirty="0" err="1" smtClean="0"/>
+              <a:t>WebJob</a:t>
+            </a:r>
+            <a:r>
+              <a:rPr lang="en-GB" baseline="0" dirty="0" smtClean="0"/>
+              <a:t> would be the correct choice.</a:t>
+            </a:r>
           </a:p>
           <a:p>
             <a:endParaRPr lang="en-GB" baseline="0" dirty="0" smtClean="0"/>
           </a:p>
           <a:p>
-            <a:endParaRPr lang="en-GB" baseline="0" dirty="0" smtClean="0"/>
+            <a:r>
+              <a:rPr lang="en-GB" baseline="0" dirty="0" smtClean="0"/>
+              <a:t>In my opinion I would start off with a </a:t>
+            </a:r>
+            <a:r>
+              <a:rPr lang="en-GB" baseline="0" dirty="0" err="1" smtClean="0"/>
+              <a:t>WebJob</a:t>
+            </a:r>
+            <a:r>
+              <a:rPr lang="en-GB" baseline="0" dirty="0" smtClean="0"/>
+              <a:t> as they are easy to setup and deploy. They also scale really well and are cheap. If you find in the future that </a:t>
+            </a:r>
+            <a:r>
+              <a:rPr lang="en-GB" baseline="0" dirty="0" err="1" smtClean="0"/>
+              <a:t>WebJobs</a:t>
+            </a:r>
+            <a:r>
+              <a:rPr lang="en-GB" baseline="0" dirty="0" smtClean="0"/>
+              <a:t> are suboptimal for whatever you are doing you can move over to a Worker Role.</a:t>
+            </a:r>
           </a:p>
           <a:p>
             <a:endParaRPr lang="en-GB" baseline="0" dirty="0" smtClean="0"/>
@@ -4333,7 +4395,7 @@
     </p:spTree>
     <p:extLst>
       <p:ext uri="{BB962C8B-B14F-4D97-AF65-F5344CB8AC3E}">
-        <p14:creationId xmlns:p14="http://schemas.microsoft.com/office/powerpoint/2010/main" val="2757543137"/>
+        <p14:creationId xmlns:p14="http://schemas.microsoft.com/office/powerpoint/2010/main" val="3593320600"/>
       </p:ext>
     </p:extLst>
   </p:cSld>
@@ -4468,298 +4530,6 @@
     <p:extLst>
       <p:ext uri="{BB962C8B-B14F-4D97-AF65-F5344CB8AC3E}">
         <p14:creationId xmlns:p14="http://schemas.microsoft.com/office/powerpoint/2010/main" val="3509110737"/>
-      </p:ext>
-    </p:extLst>
-  </p:cSld>
-  <p:clrMapOvr>
-    <a:masterClrMapping/>
-  </p:clrMapOvr>
-</p:notes>
-</file>
-
-<file path=ppt/notesSlides/notesSlide30.xml><?xml version="1.0" encoding="utf-8"?>
-<p:notes xmlns:a="http://schemas.openxmlformats.org/drawingml/2006/main" xmlns:r="http://schemas.openxmlformats.org/officeDocument/2006/relationships" xmlns:p="http://schemas.openxmlformats.org/presentationml/2006/main">
-  <p:cSld>
-    <p:spTree>
-      <p:nvGrpSpPr>
-        <p:cNvPr id="1" name=""/>
-        <p:cNvGrpSpPr/>
-        <p:nvPr/>
-      </p:nvGrpSpPr>
-      <p:grpSpPr>
-        <a:xfrm>
-          <a:off x="0" y="0"/>
-          <a:ext cx="0" cy="0"/>
-          <a:chOff x="0" y="0"/>
-          <a:chExt cx="0" cy="0"/>
-        </a:xfrm>
-      </p:grpSpPr>
-      <p:sp>
-        <p:nvSpPr>
-          <p:cNvPr id="2" name="Slide Image Placeholder 1"/>
-          <p:cNvSpPr>
-            <a:spLocks noGrp="1" noRot="1" noChangeAspect="1"/>
-          </p:cNvSpPr>
-          <p:nvPr>
-            <p:ph type="sldImg"/>
-          </p:nvPr>
-        </p:nvSpPr>
-        <p:spPr/>
-      </p:sp>
-      <p:sp>
-        <p:nvSpPr>
-          <p:cNvPr id="3" name="Notes Placeholder 2"/>
-          <p:cNvSpPr>
-            <a:spLocks noGrp="1"/>
-          </p:cNvSpPr>
-          <p:nvPr>
-            <p:ph type="body" idx="1"/>
-          </p:nvPr>
-        </p:nvSpPr>
-        <p:spPr/>
-        <p:txBody>
-          <a:bodyPr/>
-          <a:lstStyle/>
-          <a:p>
-            <a:r>
-              <a:rPr lang="en-GB" baseline="0" dirty="0" smtClean="0"/>
-              <a:t>Worker Roles still has a </a:t>
-            </a:r>
-            <a:r>
-              <a:rPr lang="en-GB" baseline="0" dirty="0" err="1" smtClean="0"/>
-              <a:t>RoleEntryPoint</a:t>
-            </a:r>
-            <a:r>
-              <a:rPr lang="en-GB" baseline="0" dirty="0" smtClean="0"/>
-              <a:t> class and the Service Configuration project, but we don’t have the ASP.NET that we had earlier.</a:t>
-            </a:r>
-          </a:p>
-          <a:p>
-            <a:endParaRPr lang="en-GB" baseline="0" dirty="0" smtClean="0"/>
-          </a:p>
-        </p:txBody>
-      </p:sp>
-      <p:sp>
-        <p:nvSpPr>
-          <p:cNvPr id="4" name="Slide Number Placeholder 3"/>
-          <p:cNvSpPr>
-            <a:spLocks noGrp="1"/>
-          </p:cNvSpPr>
-          <p:nvPr>
-            <p:ph type="sldNum" sz="quarter" idx="10"/>
-          </p:nvPr>
-        </p:nvSpPr>
-        <p:spPr/>
-        <p:txBody>
-          <a:bodyPr/>
-          <a:lstStyle/>
-          <a:p>
-            <a:fld id="{F9DCBFB8-3C0D-4265-9EBB-AF74934A7B39}" type="slidenum">
-              <a:rPr lang="en-GB" smtClean="0"/>
-              <a:t>30</a:t>
-            </a:fld>
-            <a:endParaRPr lang="en-GB"/>
-          </a:p>
-        </p:txBody>
-      </p:sp>
-    </p:spTree>
-    <p:extLst>
-      <p:ext uri="{BB962C8B-B14F-4D97-AF65-F5344CB8AC3E}">
-        <p14:creationId xmlns:p14="http://schemas.microsoft.com/office/powerpoint/2010/main" val="251820965"/>
-      </p:ext>
-    </p:extLst>
-  </p:cSld>
-  <p:clrMapOvr>
-    <a:masterClrMapping/>
-  </p:clrMapOvr>
-</p:notes>
-</file>
-
-<file path=ppt/notesSlides/notesSlide31.xml><?xml version="1.0" encoding="utf-8"?>
-<p:notes xmlns:a="http://schemas.openxmlformats.org/drawingml/2006/main" xmlns:r="http://schemas.openxmlformats.org/officeDocument/2006/relationships" xmlns:p="http://schemas.openxmlformats.org/presentationml/2006/main">
-  <p:cSld>
-    <p:spTree>
-      <p:nvGrpSpPr>
-        <p:cNvPr id="1" name=""/>
-        <p:cNvGrpSpPr/>
-        <p:nvPr/>
-      </p:nvGrpSpPr>
-      <p:grpSpPr>
-        <a:xfrm>
-          <a:off x="0" y="0"/>
-          <a:ext cx="0" cy="0"/>
-          <a:chOff x="0" y="0"/>
-          <a:chExt cx="0" cy="0"/>
-        </a:xfrm>
-      </p:grpSpPr>
-      <p:sp>
-        <p:nvSpPr>
-          <p:cNvPr id="2" name="Slide Image Placeholder 1"/>
-          <p:cNvSpPr>
-            <a:spLocks noGrp="1" noRot="1" noChangeAspect="1"/>
-          </p:cNvSpPr>
-          <p:nvPr>
-            <p:ph type="sldImg"/>
-          </p:nvPr>
-        </p:nvSpPr>
-        <p:spPr/>
-      </p:sp>
-      <p:sp>
-        <p:nvSpPr>
-          <p:cNvPr id="3" name="Notes Placeholder 2"/>
-          <p:cNvSpPr>
-            <a:spLocks noGrp="1"/>
-          </p:cNvSpPr>
-          <p:nvPr>
-            <p:ph type="body" idx="1"/>
-          </p:nvPr>
-        </p:nvSpPr>
-        <p:spPr/>
-        <p:txBody>
-          <a:bodyPr/>
-          <a:lstStyle/>
-          <a:p>
-            <a:r>
-              <a:rPr lang="en-GB" baseline="0" dirty="0" smtClean="0"/>
-              <a:t>Here I have modified the class to write some text out every 5 seconds using a Timer event. It is not spectacular but it shows how the Worker Role creates and sets up the Timer in the </a:t>
-            </a:r>
-            <a:r>
-              <a:rPr lang="en-GB" baseline="0" dirty="0" err="1" smtClean="0"/>
-              <a:t>OnStart</a:t>
-            </a:r>
-            <a:r>
-              <a:rPr lang="en-GB" baseline="0" dirty="0" smtClean="0"/>
-              <a:t> method. Then Starts the timer in the Run method.</a:t>
-            </a:r>
-          </a:p>
-          <a:p>
-            <a:endParaRPr lang="en-GB" baseline="0" dirty="0" smtClean="0"/>
-          </a:p>
-          <a:p>
-            <a:r>
-              <a:rPr lang="en-GB" baseline="0" dirty="0" smtClean="0"/>
-              <a:t>While both </a:t>
-            </a:r>
-            <a:r>
-              <a:rPr lang="en-GB" baseline="0" dirty="0" err="1" smtClean="0"/>
-              <a:t>WebJobs</a:t>
-            </a:r>
-            <a:r>
-              <a:rPr lang="en-GB" baseline="0" dirty="0" smtClean="0"/>
-              <a:t> and Worker Roles are able to process background tasks. </a:t>
-            </a:r>
-          </a:p>
-          <a:p>
-            <a:r>
-              <a:rPr lang="en-GB" baseline="0" dirty="0" err="1" smtClean="0"/>
-              <a:t>WebJobs</a:t>
-            </a:r>
-            <a:r>
-              <a:rPr lang="en-GB" baseline="0" dirty="0" smtClean="0"/>
-              <a:t> can only do one thing, you would have to deploy many different </a:t>
-            </a:r>
-            <a:r>
-              <a:rPr lang="en-GB" baseline="0" dirty="0" err="1" smtClean="0"/>
-              <a:t>WebJobs</a:t>
-            </a:r>
-            <a:r>
-              <a:rPr lang="en-GB" baseline="0" dirty="0" smtClean="0"/>
-              <a:t> to process different tasks.</a:t>
-            </a:r>
-          </a:p>
-          <a:p>
-            <a:r>
-              <a:rPr lang="en-GB" baseline="0" dirty="0" smtClean="0"/>
-              <a:t>If you required additional software installed to complete a task, a Worker Role would be the only choice as you can RDP into a Worker Role but you cannot on a </a:t>
-            </a:r>
-            <a:r>
-              <a:rPr lang="en-GB" baseline="0" dirty="0" err="1" smtClean="0"/>
-              <a:t>WebJob</a:t>
-            </a:r>
-            <a:r>
-              <a:rPr lang="en-GB" baseline="0" dirty="0" smtClean="0"/>
-              <a:t>.</a:t>
-            </a:r>
-          </a:p>
-          <a:p>
-            <a:r>
-              <a:rPr lang="en-GB" baseline="0" dirty="0" smtClean="0"/>
-              <a:t>If your objective is to run scheduled jobs only using the libraries available in </a:t>
-            </a:r>
-            <a:r>
-              <a:rPr lang="en-GB" baseline="0" dirty="0" err="1" smtClean="0"/>
-              <a:t>.Net</a:t>
-            </a:r>
-            <a:r>
-              <a:rPr lang="en-GB" baseline="0" dirty="0" smtClean="0"/>
-              <a:t> then a </a:t>
-            </a:r>
-            <a:r>
-              <a:rPr lang="en-GB" baseline="0" dirty="0" err="1" smtClean="0"/>
-              <a:t>WebJob</a:t>
-            </a:r>
-            <a:r>
-              <a:rPr lang="en-GB" baseline="0" dirty="0" smtClean="0"/>
-              <a:t> would be the correct choice.</a:t>
-            </a:r>
-          </a:p>
-          <a:p>
-            <a:endParaRPr lang="en-GB" baseline="0" dirty="0" smtClean="0"/>
-          </a:p>
-          <a:p>
-            <a:r>
-              <a:rPr lang="en-GB" baseline="0" dirty="0" smtClean="0"/>
-              <a:t>In my opinion I would start off with a </a:t>
-            </a:r>
-            <a:r>
-              <a:rPr lang="en-GB" baseline="0" dirty="0" err="1" smtClean="0"/>
-              <a:t>WebJob</a:t>
-            </a:r>
-            <a:r>
-              <a:rPr lang="en-GB" baseline="0" dirty="0" smtClean="0"/>
-              <a:t> as they are easy to setup and deploy. They also scale really well and are cheap. If you find in the future that </a:t>
-            </a:r>
-            <a:r>
-              <a:rPr lang="en-GB" baseline="0" dirty="0" err="1" smtClean="0"/>
-              <a:t>WebJobs</a:t>
-            </a:r>
-            <a:r>
-              <a:rPr lang="en-GB" baseline="0" dirty="0" smtClean="0"/>
-              <a:t> are suboptimal for whatever you are doing you can move over to a Worker Role.</a:t>
-            </a:r>
-          </a:p>
-          <a:p>
-            <a:endParaRPr lang="en-GB" baseline="0" dirty="0" smtClean="0"/>
-          </a:p>
-        </p:txBody>
-      </p:sp>
-      <p:sp>
-        <p:nvSpPr>
-          <p:cNvPr id="4" name="Slide Number Placeholder 3"/>
-          <p:cNvSpPr>
-            <a:spLocks noGrp="1"/>
-          </p:cNvSpPr>
-          <p:nvPr>
-            <p:ph type="sldNum" sz="quarter" idx="10"/>
-          </p:nvPr>
-        </p:nvSpPr>
-        <p:spPr/>
-        <p:txBody>
-          <a:bodyPr/>
-          <a:lstStyle/>
-          <a:p>
-            <a:fld id="{F9DCBFB8-3C0D-4265-9EBB-AF74934A7B39}" type="slidenum">
-              <a:rPr lang="en-GB" smtClean="0"/>
-              <a:t>31</a:t>
-            </a:fld>
-            <a:endParaRPr lang="en-GB"/>
-          </a:p>
-        </p:txBody>
-      </p:sp>
-    </p:spTree>
-    <p:extLst>
-      <p:ext uri="{BB962C8B-B14F-4D97-AF65-F5344CB8AC3E}">
-        <p14:creationId xmlns:p14="http://schemas.microsoft.com/office/powerpoint/2010/main" val="3593320600"/>
       </p:ext>
     </p:extLst>
   </p:cSld>
@@ -6063,7 +5833,7 @@
           <a:p>
             <a:fld id="{8A04FFFD-6AAA-4290-B9C8-6140E8302CD5}" type="datetimeFigureOut">
               <a:rPr lang="en-GB" smtClean="0"/>
-              <a:t>23/09/2015</a:t>
+              <a:t>12/10/2015</a:t>
             </a:fld>
             <a:endParaRPr lang="en-GB"/>
           </a:p>
@@ -6233,7 +6003,7 @@
           <a:p>
             <a:fld id="{8A04FFFD-6AAA-4290-B9C8-6140E8302CD5}" type="datetimeFigureOut">
               <a:rPr lang="en-GB" smtClean="0"/>
-              <a:t>23/09/2015</a:t>
+              <a:t>12/10/2015</a:t>
             </a:fld>
             <a:endParaRPr lang="en-GB"/>
           </a:p>
@@ -6413,7 +6183,7 @@
           <a:p>
             <a:fld id="{8A04FFFD-6AAA-4290-B9C8-6140E8302CD5}" type="datetimeFigureOut">
               <a:rPr lang="en-GB" smtClean="0"/>
-              <a:t>23/09/2015</a:t>
+              <a:t>12/10/2015</a:t>
             </a:fld>
             <a:endParaRPr lang="en-GB"/>
           </a:p>
@@ -7510,7 +7280,7 @@
           <a:p>
             <a:fld id="{8A04FFFD-6AAA-4290-B9C8-6140E8302CD5}" type="datetimeFigureOut">
               <a:rPr lang="en-GB" smtClean="0"/>
-              <a:t>23/09/2015</a:t>
+              <a:t>12/10/2015</a:t>
             </a:fld>
             <a:endParaRPr lang="en-GB"/>
           </a:p>
@@ -7754,7 +7524,7 @@
           <a:p>
             <a:fld id="{8A04FFFD-6AAA-4290-B9C8-6140E8302CD5}" type="datetimeFigureOut">
               <a:rPr lang="en-GB" smtClean="0"/>
-              <a:t>23/09/2015</a:t>
+              <a:t>12/10/2015</a:t>
             </a:fld>
             <a:endParaRPr lang="en-GB"/>
           </a:p>
@@ -7986,7 +7756,7 @@
           <a:p>
             <a:fld id="{8A04FFFD-6AAA-4290-B9C8-6140E8302CD5}" type="datetimeFigureOut">
               <a:rPr lang="en-GB" smtClean="0"/>
-              <a:t>23/09/2015</a:t>
+              <a:t>12/10/2015</a:t>
             </a:fld>
             <a:endParaRPr lang="en-GB"/>
           </a:p>
@@ -8353,7 +8123,7 @@
           <a:p>
             <a:fld id="{8A04FFFD-6AAA-4290-B9C8-6140E8302CD5}" type="datetimeFigureOut">
               <a:rPr lang="en-GB" smtClean="0"/>
-              <a:t>23/09/2015</a:t>
+              <a:t>12/10/2015</a:t>
             </a:fld>
             <a:endParaRPr lang="en-GB"/>
           </a:p>
@@ -8471,7 +8241,7 @@
           <a:p>
             <a:fld id="{8A04FFFD-6AAA-4290-B9C8-6140E8302CD5}" type="datetimeFigureOut">
               <a:rPr lang="en-GB" smtClean="0"/>
-              <a:t>23/09/2015</a:t>
+              <a:t>12/10/2015</a:t>
             </a:fld>
             <a:endParaRPr lang="en-GB"/>
           </a:p>
@@ -8566,7 +8336,7 @@
           <a:p>
             <a:fld id="{8A04FFFD-6AAA-4290-B9C8-6140E8302CD5}" type="datetimeFigureOut">
               <a:rPr lang="en-GB" smtClean="0"/>
-              <a:t>23/09/2015</a:t>
+              <a:t>12/10/2015</a:t>
             </a:fld>
             <a:endParaRPr lang="en-GB"/>
           </a:p>
@@ -8843,7 +8613,7 @@
           <a:p>
             <a:fld id="{8A04FFFD-6AAA-4290-B9C8-6140E8302CD5}" type="datetimeFigureOut">
               <a:rPr lang="en-GB" smtClean="0"/>
-              <a:t>23/09/2015</a:t>
+              <a:t>12/10/2015</a:t>
             </a:fld>
             <a:endParaRPr lang="en-GB"/>
           </a:p>
@@ -9100,7 +8870,7 @@
           <a:p>
             <a:fld id="{8A04FFFD-6AAA-4290-B9C8-6140E8302CD5}" type="datetimeFigureOut">
               <a:rPr lang="en-GB" smtClean="0"/>
-              <a:t>23/09/2015</a:t>
+              <a:t>12/10/2015</a:t>
             </a:fld>
             <a:endParaRPr lang="en-GB"/>
           </a:p>
@@ -9322,7 +9092,7 @@
           <a:p>
             <a:fld id="{8A04FFFD-6AAA-4290-B9C8-6140E8302CD5}" type="datetimeFigureOut">
               <a:rPr lang="en-GB" smtClean="0"/>
-              <a:t>23/09/2015</a:t>
+              <a:t>12/10/2015</a:t>
             </a:fld>
             <a:endParaRPr lang="en-GB"/>
           </a:p>
@@ -12513,103 +12283,6 @@
       </p:grpSpPr>
       <p:sp>
         <p:nvSpPr>
-          <p:cNvPr id="5" name="Title 3"/>
-          <p:cNvSpPr>
-            <a:spLocks noGrp="1"/>
-          </p:cNvSpPr>
-          <p:nvPr>
-            <p:ph type="title"/>
-          </p:nvPr>
-        </p:nvSpPr>
-        <p:spPr>
-          <a:xfrm>
-            <a:off x="0" y="123483"/>
-            <a:ext cx="9143999" cy="765081"/>
-          </a:xfrm>
-        </p:spPr>
-        <p:txBody>
-          <a:bodyPr anchor="ctr" anchorCtr="0">
-            <a:spAutoFit/>
-          </a:bodyPr>
-          <a:lstStyle/>
-          <a:p>
-            <a:r>
-              <a:rPr lang="en-GB" dirty="0" smtClean="0"/>
-              <a:t>Azure SQL - Scale</a:t>
-            </a:r>
-            <a:endParaRPr lang="en-GB" dirty="0"/>
-          </a:p>
-        </p:txBody>
-      </p:sp>
-      <p:pic>
-        <p:nvPicPr>
-          <p:cNvPr id="7" name="Picture 6"/>
-          <p:cNvPicPr>
-            <a:picLocks noChangeAspect="1"/>
-          </p:cNvPicPr>
-          <p:nvPr/>
-        </p:nvPicPr>
-        <p:blipFill>
-          <a:blip r:embed="rId3">
-            <a:extLst>
-              <a:ext uri="{28A0092B-C50C-407E-A947-70E740481C1C}">
-                <a14:useLocalDpi xmlns:a14="http://schemas.microsoft.com/office/drawing/2010/main" val="0"/>
-              </a:ext>
-            </a:extLst>
-          </a:blip>
-          <a:stretch>
-            <a:fillRect/>
-          </a:stretch>
-        </p:blipFill>
-        <p:spPr>
-          <a:xfrm>
-            <a:off x="395534" y="2201569"/>
-            <a:ext cx="8352930" cy="3615624"/>
-          </a:xfrm>
-          <a:prstGeom prst="rect">
-            <a:avLst/>
-          </a:prstGeom>
-        </p:spPr>
-      </p:pic>
-    </p:spTree>
-    <p:extLst>
-      <p:ext uri="{BB962C8B-B14F-4D97-AF65-F5344CB8AC3E}">
-        <p14:creationId xmlns:p14="http://schemas.microsoft.com/office/powerpoint/2010/main" val="2601876045"/>
-      </p:ext>
-    </p:extLst>
-  </p:cSld>
-  <p:clrMapOvr>
-    <a:masterClrMapping/>
-  </p:clrMapOvr>
-  <p:timing>
-    <p:tnLst>
-      <p:par>
-        <p:cTn id="1" dur="indefinite" restart="never" nodeType="tmRoot"/>
-      </p:par>
-    </p:tnLst>
-  </p:timing>
-</p:sld>
-</file>
-
-<file path=ppt/slides/slide19.xml><?xml version="1.0" encoding="utf-8"?>
-<p:sld xmlns:a="http://schemas.openxmlformats.org/drawingml/2006/main" xmlns:r="http://schemas.openxmlformats.org/officeDocument/2006/relationships" xmlns:p="http://schemas.openxmlformats.org/presentationml/2006/main">
-  <p:cSld>
-    <p:spTree>
-      <p:nvGrpSpPr>
-        <p:cNvPr id="1" name=""/>
-        <p:cNvGrpSpPr/>
-        <p:nvPr/>
-      </p:nvGrpSpPr>
-      <p:grpSpPr>
-        <a:xfrm>
-          <a:off x="0" y="0"/>
-          <a:ext cx="0" cy="0"/>
-          <a:chOff x="0" y="0"/>
-          <a:chExt cx="0" cy="0"/>
-        </a:xfrm>
-      </p:grpSpPr>
-      <p:sp>
-        <p:nvSpPr>
           <p:cNvPr id="4" name="Title 3"/>
           <p:cNvSpPr>
             <a:spLocks noGrp="1"/>
@@ -12672,6 +12345,102 @@
     <p:extLst>
       <p:ext uri="{BB962C8B-B14F-4D97-AF65-F5344CB8AC3E}">
         <p14:creationId xmlns:p14="http://schemas.microsoft.com/office/powerpoint/2010/main" val="3541034769"/>
+      </p:ext>
+    </p:extLst>
+  </p:cSld>
+  <p:clrMapOvr>
+    <a:masterClrMapping/>
+  </p:clrMapOvr>
+  <p:timing>
+    <p:tnLst>
+      <p:par>
+        <p:cTn id="1" dur="indefinite" restart="never" nodeType="tmRoot"/>
+      </p:par>
+    </p:tnLst>
+  </p:timing>
+</p:sld>
+</file>
+
+<file path=ppt/slides/slide19.xml><?xml version="1.0" encoding="utf-8"?>
+<p:sld xmlns:a="http://schemas.openxmlformats.org/drawingml/2006/main" xmlns:r="http://schemas.openxmlformats.org/officeDocument/2006/relationships" xmlns:p="http://schemas.openxmlformats.org/presentationml/2006/main">
+  <p:cSld>
+    <p:spTree>
+      <p:nvGrpSpPr>
+        <p:cNvPr id="1" name=""/>
+        <p:cNvGrpSpPr/>
+        <p:nvPr/>
+      </p:nvGrpSpPr>
+      <p:grpSpPr>
+        <a:xfrm>
+          <a:off x="0" y="0"/>
+          <a:ext cx="0" cy="0"/>
+          <a:chOff x="0" y="0"/>
+          <a:chExt cx="0" cy="0"/>
+        </a:xfrm>
+      </p:grpSpPr>
+      <p:pic>
+        <p:nvPicPr>
+          <p:cNvPr id="5" name="Picture Placeholder 4"/>
+          <p:cNvPicPr>
+            <a:picLocks noGrp="1" noChangeAspect="1"/>
+          </p:cNvPicPr>
+          <p:nvPr>
+            <p:ph type="pic" sz="quarter" idx="10"/>
+          </p:nvPr>
+        </p:nvPicPr>
+        <p:blipFill>
+          <a:blip r:embed="rId3">
+            <a:extLst>
+              <a:ext uri="{28A0092B-C50C-407E-A947-70E740481C1C}">
+                <a14:useLocalDpi xmlns:a14="http://schemas.microsoft.com/office/drawing/2010/main" val="0"/>
+              </a:ext>
+            </a:extLst>
+          </a:blip>
+          <a:stretch>
+            <a:fillRect/>
+          </a:stretch>
+        </p:blipFill>
+        <p:spPr>
+          <a:xfrm>
+            <a:off x="1922511" y="1196752"/>
+            <a:ext cx="5298976" cy="5298976"/>
+          </a:xfrm>
+        </p:spPr>
+      </p:pic>
+      <p:sp>
+        <p:nvSpPr>
+          <p:cNvPr id="4" name="Title 3"/>
+          <p:cNvSpPr>
+            <a:spLocks noGrp="1"/>
+          </p:cNvSpPr>
+          <p:nvPr>
+            <p:ph type="title"/>
+          </p:nvPr>
+        </p:nvSpPr>
+        <p:spPr>
+          <a:xfrm>
+            <a:off x="0" y="122025"/>
+            <a:ext cx="9143999" cy="765081"/>
+          </a:xfrm>
+        </p:spPr>
+        <p:txBody>
+          <a:bodyPr anchor="ctr" anchorCtr="1">
+            <a:spAutoFit/>
+          </a:bodyPr>
+          <a:lstStyle/>
+          <a:p>
+            <a:r>
+              <a:rPr lang="en-GB" dirty="0" smtClean="0"/>
+              <a:t>Azure Table Storage</a:t>
+            </a:r>
+            <a:endParaRPr lang="en-GB" dirty="0"/>
+          </a:p>
+        </p:txBody>
+      </p:sp>
+    </p:spTree>
+    <p:extLst>
+      <p:ext uri="{BB962C8B-B14F-4D97-AF65-F5344CB8AC3E}">
+        <p14:creationId xmlns:p14="http://schemas.microsoft.com/office/powerpoint/2010/main" val="778141364"/>
       </p:ext>
     </p:extLst>
   </p:cSld>
@@ -12966,169 +12735,6 @@
 </file>
 
 <file path=ppt/slides/slide20.xml><?xml version="1.0" encoding="utf-8"?>
-<p:sld xmlns:a="http://schemas.openxmlformats.org/drawingml/2006/main" xmlns:r="http://schemas.openxmlformats.org/officeDocument/2006/relationships" xmlns:p="http://schemas.openxmlformats.org/presentationml/2006/main">
-  <p:cSld>
-    <p:spTree>
-      <p:nvGrpSpPr>
-        <p:cNvPr id="1" name=""/>
-        <p:cNvGrpSpPr/>
-        <p:nvPr/>
-      </p:nvGrpSpPr>
-      <p:grpSpPr>
-        <a:xfrm>
-          <a:off x="0" y="0"/>
-          <a:ext cx="0" cy="0"/>
-          <a:chOff x="0" y="0"/>
-          <a:chExt cx="0" cy="0"/>
-        </a:xfrm>
-      </p:grpSpPr>
-      <p:sp>
-        <p:nvSpPr>
-          <p:cNvPr id="5" name="Title 3"/>
-          <p:cNvSpPr>
-            <a:spLocks noGrp="1"/>
-          </p:cNvSpPr>
-          <p:nvPr>
-            <p:ph type="title"/>
-          </p:nvPr>
-        </p:nvSpPr>
-        <p:spPr>
-          <a:xfrm>
-            <a:off x="0" y="122025"/>
-            <a:ext cx="9143999" cy="766172"/>
-          </a:xfrm>
-        </p:spPr>
-        <p:txBody>
-          <a:bodyPr tIns="46800" anchor="ctr" anchorCtr="1">
-            <a:spAutoFit/>
-          </a:bodyPr>
-          <a:lstStyle/>
-          <a:p>
-            <a:r>
-              <a:rPr lang="en-GB" dirty="0" smtClean="0"/>
-              <a:t>Portal Example</a:t>
-            </a:r>
-            <a:endParaRPr lang="en-GB" dirty="0"/>
-          </a:p>
-        </p:txBody>
-      </p:sp>
-    </p:spTree>
-    <p:extLst>
-      <p:ext uri="{BB962C8B-B14F-4D97-AF65-F5344CB8AC3E}">
-        <p14:creationId xmlns:p14="http://schemas.microsoft.com/office/powerpoint/2010/main" val="2172538785"/>
-      </p:ext>
-    </p:extLst>
-  </p:cSld>
-  <p:clrMapOvr>
-    <a:masterClrMapping/>
-  </p:clrMapOvr>
-  <p:timing>
-    <p:tnLst>
-      <p:par>
-        <p:cTn id="1" dur="indefinite" restart="never" nodeType="tmRoot"/>
-      </p:par>
-    </p:tnLst>
-  </p:timing>
-</p:sld>
-</file>
-
-<file path=ppt/slides/slide21.xml><?xml version="1.0" encoding="utf-8"?>
-<p:sld xmlns:a="http://schemas.openxmlformats.org/drawingml/2006/main" xmlns:r="http://schemas.openxmlformats.org/officeDocument/2006/relationships" xmlns:p="http://schemas.openxmlformats.org/presentationml/2006/main">
-  <p:cSld>
-    <p:spTree>
-      <p:nvGrpSpPr>
-        <p:cNvPr id="1" name=""/>
-        <p:cNvGrpSpPr/>
-        <p:nvPr/>
-      </p:nvGrpSpPr>
-      <p:grpSpPr>
-        <a:xfrm>
-          <a:off x="0" y="0"/>
-          <a:ext cx="0" cy="0"/>
-          <a:chOff x="0" y="0"/>
-          <a:chExt cx="0" cy="0"/>
-        </a:xfrm>
-      </p:grpSpPr>
-      <p:pic>
-        <p:nvPicPr>
-          <p:cNvPr id="5" name="Picture Placeholder 4"/>
-          <p:cNvPicPr>
-            <a:picLocks noGrp="1" noChangeAspect="1"/>
-          </p:cNvPicPr>
-          <p:nvPr>
-            <p:ph type="pic" sz="quarter" idx="10"/>
-          </p:nvPr>
-        </p:nvPicPr>
-        <p:blipFill>
-          <a:blip r:embed="rId3">
-            <a:extLst>
-              <a:ext uri="{28A0092B-C50C-407E-A947-70E740481C1C}">
-                <a14:useLocalDpi xmlns:a14="http://schemas.microsoft.com/office/drawing/2010/main" val="0"/>
-              </a:ext>
-            </a:extLst>
-          </a:blip>
-          <a:stretch>
-            <a:fillRect/>
-          </a:stretch>
-        </p:blipFill>
-        <p:spPr>
-          <a:xfrm>
-            <a:off x="1922511" y="1196752"/>
-            <a:ext cx="5298976" cy="5298976"/>
-          </a:xfrm>
-        </p:spPr>
-      </p:pic>
-      <p:sp>
-        <p:nvSpPr>
-          <p:cNvPr id="4" name="Title 3"/>
-          <p:cNvSpPr>
-            <a:spLocks noGrp="1"/>
-          </p:cNvSpPr>
-          <p:nvPr>
-            <p:ph type="title"/>
-          </p:nvPr>
-        </p:nvSpPr>
-        <p:spPr>
-          <a:xfrm>
-            <a:off x="0" y="122025"/>
-            <a:ext cx="9143999" cy="765081"/>
-          </a:xfrm>
-        </p:spPr>
-        <p:txBody>
-          <a:bodyPr anchor="ctr" anchorCtr="1">
-            <a:spAutoFit/>
-          </a:bodyPr>
-          <a:lstStyle/>
-          <a:p>
-            <a:r>
-              <a:rPr lang="en-GB" dirty="0" smtClean="0"/>
-              <a:t>Azure Table Storage</a:t>
-            </a:r>
-            <a:endParaRPr lang="en-GB" dirty="0"/>
-          </a:p>
-        </p:txBody>
-      </p:sp>
-    </p:spTree>
-    <p:extLst>
-      <p:ext uri="{BB962C8B-B14F-4D97-AF65-F5344CB8AC3E}">
-        <p14:creationId xmlns:p14="http://schemas.microsoft.com/office/powerpoint/2010/main" val="778141364"/>
-      </p:ext>
-    </p:extLst>
-  </p:cSld>
-  <p:clrMapOvr>
-    <a:masterClrMapping/>
-  </p:clrMapOvr>
-  <p:timing>
-    <p:tnLst>
-      <p:par>
-        <p:cTn id="1" dur="indefinite" restart="never" nodeType="tmRoot"/>
-      </p:par>
-    </p:tnLst>
-  </p:timing>
-</p:sld>
-</file>
-
-<file path=ppt/slides/slide22.xml><?xml version="1.0" encoding="utf-8"?>
 <p:sld xmlns:a="http://schemas.openxmlformats.org/drawingml/2006/main" xmlns:r="http://schemas.openxmlformats.org/officeDocument/2006/relationships" xmlns:p="http://schemas.openxmlformats.org/presentationml/2006/main">
   <p:cSld>
     <p:spTree>
@@ -13831,7 +13437,7 @@
 </p:sld>
 </file>
 
-<file path=ppt/slides/slide23.xml><?xml version="1.0" encoding="utf-8"?>
+<file path=ppt/slides/slide21.xml><?xml version="1.0" encoding="utf-8"?>
 <p:sld xmlns:a="http://schemas.openxmlformats.org/drawingml/2006/main" xmlns:r="http://schemas.openxmlformats.org/officeDocument/2006/relationships" xmlns:p="http://schemas.openxmlformats.org/presentationml/2006/main">
   <p:cSld>
     <p:spTree>
@@ -13965,7 +13571,7 @@
 </p:sld>
 </file>
 
-<file path=ppt/slides/slide24.xml><?xml version="1.0" encoding="utf-8"?>
+<file path=ppt/slides/slide22.xml><?xml version="1.0" encoding="utf-8"?>
 <p:sld xmlns:a="http://schemas.openxmlformats.org/drawingml/2006/main" xmlns:r="http://schemas.openxmlformats.org/officeDocument/2006/relationships" xmlns:p="http://schemas.openxmlformats.org/presentationml/2006/main">
   <p:cSld>
     <p:spTree>
@@ -14091,7 +13697,7 @@
 </p:sld>
 </file>
 
-<file path=ppt/slides/slide25.xml><?xml version="1.0" encoding="utf-8"?>
+<file path=ppt/slides/slide23.xml><?xml version="1.0" encoding="utf-8"?>
 <p:sld xmlns:a="http://schemas.openxmlformats.org/drawingml/2006/main" xmlns:r="http://schemas.openxmlformats.org/officeDocument/2006/relationships" xmlns:p="http://schemas.openxmlformats.org/presentationml/2006/main">
   <p:cSld>
     <p:spTree>
@@ -14676,7 +14282,7 @@
 </p:sld>
 </file>
 
-<file path=ppt/slides/slide26.xml><?xml version="1.0" encoding="utf-8"?>
+<file path=ppt/slides/slide24.xml><?xml version="1.0" encoding="utf-8"?>
 <p:sld xmlns:a="http://schemas.openxmlformats.org/drawingml/2006/main" xmlns:r="http://schemas.openxmlformats.org/officeDocument/2006/relationships" xmlns:p="http://schemas.openxmlformats.org/presentationml/2006/main">
   <p:cSld>
     <p:spTree>
@@ -14717,11 +14323,7 @@
           <a:p>
             <a:r>
               <a:rPr lang="en-GB" dirty="0" smtClean="0"/>
-              <a:t>Azure </a:t>
-            </a:r>
-            <a:r>
-              <a:rPr lang="en-GB" dirty="0" smtClean="0"/>
-              <a:t>Service Bus</a:t>
+              <a:t>Azure Service Bus</a:t>
             </a:r>
             <a:endParaRPr lang="en-GB" dirty="0"/>
           </a:p>
@@ -15157,7 +14759,7 @@
 </p:sld>
 </file>
 
-<file path=ppt/slides/slide27.xml><?xml version="1.0" encoding="utf-8"?>
+<file path=ppt/slides/slide25.xml><?xml version="1.0" encoding="utf-8"?>
 <p:sld xmlns:a="http://schemas.openxmlformats.org/drawingml/2006/main" xmlns:r="http://schemas.openxmlformats.org/officeDocument/2006/relationships" xmlns:p="http://schemas.openxmlformats.org/presentationml/2006/main">
   <p:cSld>
     <p:spTree>
@@ -15283,7 +14885,7 @@
 </p:sld>
 </file>
 
-<file path=ppt/slides/slide28.xml><?xml version="1.0" encoding="utf-8"?>
+<file path=ppt/slides/slide26.xml><?xml version="1.0" encoding="utf-8"?>
 <p:sld xmlns:a="http://schemas.openxmlformats.org/drawingml/2006/main" xmlns:r="http://schemas.openxmlformats.org/officeDocument/2006/relationships" xmlns:p="http://schemas.openxmlformats.org/presentationml/2006/main">
   <p:cSld>
     <p:spTree>
@@ -16268,7 +15870,7 @@
 </p:sld>
 </file>
 
-<file path=ppt/slides/slide29.xml><?xml version="1.0" encoding="utf-8"?>
+<file path=ppt/slides/slide27.xml><?xml version="1.0" encoding="utf-8"?>
 <p:sld xmlns:a="http://schemas.openxmlformats.org/drawingml/2006/main" xmlns:r="http://schemas.openxmlformats.org/officeDocument/2006/relationships" xmlns:p="http://schemas.openxmlformats.org/presentationml/2006/main">
   <p:cSld>
     <p:spTree>
@@ -16359,107 +15961,7 @@
 </p:sld>
 </file>
 
-<file path=ppt/slides/slide3.xml><?xml version="1.0" encoding="utf-8"?>
-<p:sld xmlns:a="http://schemas.openxmlformats.org/drawingml/2006/main" xmlns:r="http://schemas.openxmlformats.org/officeDocument/2006/relationships" xmlns:p="http://schemas.openxmlformats.org/presentationml/2006/main">
-  <p:cSld>
-    <p:spTree>
-      <p:nvGrpSpPr>
-        <p:cNvPr id="1" name=""/>
-        <p:cNvGrpSpPr/>
-        <p:nvPr/>
-      </p:nvGrpSpPr>
-      <p:grpSpPr>
-        <a:xfrm>
-          <a:off x="0" y="0"/>
-          <a:ext cx="0" cy="0"/>
-          <a:chOff x="0" y="0"/>
-          <a:chExt cx="0" cy="0"/>
-        </a:xfrm>
-      </p:grpSpPr>
-      <p:sp>
-        <p:nvSpPr>
-          <p:cNvPr id="4" name="Title 3"/>
-          <p:cNvSpPr>
-            <a:spLocks noGrp="1"/>
-          </p:cNvSpPr>
-          <p:nvPr>
-            <p:ph type="title"/>
-          </p:nvPr>
-        </p:nvSpPr>
-        <p:spPr>
-          <a:xfrm>
-            <a:off x="0" y="127458"/>
-            <a:ext cx="9143999" cy="757130"/>
-          </a:xfrm>
-        </p:spPr>
-        <p:txBody>
-          <a:bodyPr>
-            <a:spAutoFit/>
-          </a:bodyPr>
-          <a:lstStyle/>
-          <a:p>
-            <a:r>
-              <a:rPr lang="en-GB" dirty="0" smtClean="0"/>
-              <a:t>Azure </a:t>
-            </a:r>
-            <a:r>
-              <a:rPr lang="en-GB" dirty="0" err="1" smtClean="0"/>
-              <a:t>WebApps</a:t>
-            </a:r>
-            <a:endParaRPr lang="en-GB" dirty="0"/>
-          </a:p>
-        </p:txBody>
-      </p:sp>
-      <p:pic>
-        <p:nvPicPr>
-          <p:cNvPr id="7" name="Picture Placeholder 6"/>
-          <p:cNvPicPr>
-            <a:picLocks noGrp="1" noChangeAspect="1"/>
-          </p:cNvPicPr>
-          <p:nvPr>
-            <p:ph type="pic" sz="quarter" idx="10"/>
-          </p:nvPr>
-        </p:nvPicPr>
-        <p:blipFill>
-          <a:blip r:embed="rId3">
-            <a:extLst>
-              <a:ext uri="{28A0092B-C50C-407E-A947-70E740481C1C}">
-                <a14:useLocalDpi xmlns:a14="http://schemas.microsoft.com/office/drawing/2010/main" val="0"/>
-              </a:ext>
-            </a:extLst>
-          </a:blip>
-          <a:stretch>
-            <a:fillRect/>
-          </a:stretch>
-        </p:blipFill>
-        <p:spPr>
-          <a:xfrm>
-            <a:off x="1922399" y="1196752"/>
-            <a:ext cx="5299200" cy="5299200"/>
-          </a:xfrm>
-        </p:spPr>
-      </p:pic>
-    </p:spTree>
-    <p:extLst>
-      <p:ext uri="{BB962C8B-B14F-4D97-AF65-F5344CB8AC3E}">
-        <p14:creationId xmlns:p14="http://schemas.microsoft.com/office/powerpoint/2010/main" val="388841508"/>
-      </p:ext>
-    </p:extLst>
-  </p:cSld>
-  <p:clrMapOvr>
-    <a:masterClrMapping/>
-  </p:clrMapOvr>
-  <p:timing>
-    <p:tnLst>
-      <p:par>
-        <p:cTn id="1" dur="indefinite" restart="never" nodeType="tmRoot"/>
-      </p:par>
-    </p:tnLst>
-  </p:timing>
-</p:sld>
-</file>
-
-<file path=ppt/slides/slide30.xml><?xml version="1.0" encoding="utf-8"?>
+<file path=ppt/slides/slide28.xml><?xml version="1.0" encoding="utf-8"?>
 <p:sld xmlns:a="http://schemas.openxmlformats.org/drawingml/2006/main" xmlns:r="http://schemas.openxmlformats.org/officeDocument/2006/relationships" xmlns:p="http://schemas.openxmlformats.org/presentationml/2006/main">
   <p:cSld>
     <p:spTree>
@@ -16550,7 +16052,7 @@
 </p:sld>
 </file>
 
-<file path=ppt/slides/slide31.xml><?xml version="1.0" encoding="utf-8"?>
+<file path=ppt/slides/slide29.xml><?xml version="1.0" encoding="utf-8"?>
 <p:sld xmlns:a="http://schemas.openxmlformats.org/drawingml/2006/main" xmlns:r="http://schemas.openxmlformats.org/officeDocument/2006/relationships" xmlns:p="http://schemas.openxmlformats.org/presentationml/2006/main">
   <p:cSld>
     <p:spTree>
@@ -16641,7 +16143,107 @@
 </p:sld>
 </file>
 
-<file path=ppt/slides/slide32.xml><?xml version="1.0" encoding="utf-8"?>
+<file path=ppt/slides/slide3.xml><?xml version="1.0" encoding="utf-8"?>
+<p:sld xmlns:a="http://schemas.openxmlformats.org/drawingml/2006/main" xmlns:r="http://schemas.openxmlformats.org/officeDocument/2006/relationships" xmlns:p="http://schemas.openxmlformats.org/presentationml/2006/main">
+  <p:cSld>
+    <p:spTree>
+      <p:nvGrpSpPr>
+        <p:cNvPr id="1" name=""/>
+        <p:cNvGrpSpPr/>
+        <p:nvPr/>
+      </p:nvGrpSpPr>
+      <p:grpSpPr>
+        <a:xfrm>
+          <a:off x="0" y="0"/>
+          <a:ext cx="0" cy="0"/>
+          <a:chOff x="0" y="0"/>
+          <a:chExt cx="0" cy="0"/>
+        </a:xfrm>
+      </p:grpSpPr>
+      <p:sp>
+        <p:nvSpPr>
+          <p:cNvPr id="4" name="Title 3"/>
+          <p:cNvSpPr>
+            <a:spLocks noGrp="1"/>
+          </p:cNvSpPr>
+          <p:nvPr>
+            <p:ph type="title"/>
+          </p:nvPr>
+        </p:nvSpPr>
+        <p:spPr>
+          <a:xfrm>
+            <a:off x="0" y="127458"/>
+            <a:ext cx="9143999" cy="757130"/>
+          </a:xfrm>
+        </p:spPr>
+        <p:txBody>
+          <a:bodyPr>
+            <a:spAutoFit/>
+          </a:bodyPr>
+          <a:lstStyle/>
+          <a:p>
+            <a:r>
+              <a:rPr lang="en-GB" dirty="0" smtClean="0"/>
+              <a:t>Azure </a:t>
+            </a:r>
+            <a:r>
+              <a:rPr lang="en-GB" dirty="0" err="1" smtClean="0"/>
+              <a:t>WebApps</a:t>
+            </a:r>
+            <a:endParaRPr lang="en-GB" dirty="0"/>
+          </a:p>
+        </p:txBody>
+      </p:sp>
+      <p:pic>
+        <p:nvPicPr>
+          <p:cNvPr id="7" name="Picture Placeholder 6"/>
+          <p:cNvPicPr>
+            <a:picLocks noGrp="1" noChangeAspect="1"/>
+          </p:cNvPicPr>
+          <p:nvPr>
+            <p:ph type="pic" sz="quarter" idx="10"/>
+          </p:nvPr>
+        </p:nvPicPr>
+        <p:blipFill>
+          <a:blip r:embed="rId3">
+            <a:extLst>
+              <a:ext uri="{28A0092B-C50C-407E-A947-70E740481C1C}">
+                <a14:useLocalDpi xmlns:a14="http://schemas.microsoft.com/office/drawing/2010/main" val="0"/>
+              </a:ext>
+            </a:extLst>
+          </a:blip>
+          <a:stretch>
+            <a:fillRect/>
+          </a:stretch>
+        </p:blipFill>
+        <p:spPr>
+          <a:xfrm>
+            <a:off x="1922399" y="1196752"/>
+            <a:ext cx="5299200" cy="5299200"/>
+          </a:xfrm>
+        </p:spPr>
+      </p:pic>
+    </p:spTree>
+    <p:extLst>
+      <p:ext uri="{BB962C8B-B14F-4D97-AF65-F5344CB8AC3E}">
+        <p14:creationId xmlns:p14="http://schemas.microsoft.com/office/powerpoint/2010/main" val="388841508"/>
+      </p:ext>
+    </p:extLst>
+  </p:cSld>
+  <p:clrMapOvr>
+    <a:masterClrMapping/>
+  </p:clrMapOvr>
+  <p:timing>
+    <p:tnLst>
+      <p:par>
+        <p:cTn id="1" dur="indefinite" restart="never" nodeType="tmRoot"/>
+      </p:par>
+    </p:tnLst>
+  </p:timing>
+</p:sld>
+</file>
+
+<file path=ppt/slides/slide30.xml><?xml version="1.0" encoding="utf-8"?>
 <p:sld xmlns:a="http://schemas.openxmlformats.org/drawingml/2006/main" xmlns:r="http://schemas.openxmlformats.org/officeDocument/2006/relationships" xmlns:p="http://schemas.openxmlformats.org/presentationml/2006/main">
   <p:cSld>
     <p:spTree>

</xml_diff>

<commit_message>
Update to the data store section.
</commit_message>
<xml_diff>
--- a/Current/Azure The Good Parts Web Apps/AzureTheGoodParts-WebApps.pptx
+++ b/Current/Azure The Good Parts Web Apps/AzureTheGoodParts-WebApps.pptx
@@ -6,7 +6,7 @@
     <p:sldMasterId id="2147483672" r:id="rId2"/>
   </p:sldMasterIdLst>
   <p:notesMasterIdLst>
-    <p:notesMasterId r:id="rId28"/>
+    <p:notesMasterId r:id="rId30"/>
   </p:notesMasterIdLst>
   <p:sldIdLst>
     <p:sldId id="256" r:id="rId3"/>
@@ -22,18 +22,20 @@
     <p:sldId id="298" r:id="rId13"/>
     <p:sldId id="299" r:id="rId14"/>
     <p:sldId id="273" r:id="rId15"/>
-    <p:sldId id="269" r:id="rId16"/>
-    <p:sldId id="302" r:id="rId17"/>
-    <p:sldId id="274" r:id="rId18"/>
-    <p:sldId id="303" r:id="rId19"/>
-    <p:sldId id="304" r:id="rId20"/>
-    <p:sldId id="305" r:id="rId21"/>
-    <p:sldId id="307" r:id="rId22"/>
-    <p:sldId id="308" r:id="rId23"/>
-    <p:sldId id="309" r:id="rId24"/>
-    <p:sldId id="310" r:id="rId25"/>
-    <p:sldId id="311" r:id="rId26"/>
-    <p:sldId id="288" r:id="rId27"/>
+    <p:sldId id="314" r:id="rId16"/>
+    <p:sldId id="315" r:id="rId17"/>
+    <p:sldId id="269" r:id="rId18"/>
+    <p:sldId id="302" r:id="rId19"/>
+    <p:sldId id="274" r:id="rId20"/>
+    <p:sldId id="303" r:id="rId21"/>
+    <p:sldId id="304" r:id="rId22"/>
+    <p:sldId id="305" r:id="rId23"/>
+    <p:sldId id="307" r:id="rId24"/>
+    <p:sldId id="308" r:id="rId25"/>
+    <p:sldId id="309" r:id="rId26"/>
+    <p:sldId id="310" r:id="rId27"/>
+    <p:sldId id="311" r:id="rId28"/>
+    <p:sldId id="288" r:id="rId29"/>
   </p:sldIdLst>
   <p:sldSz cx="9144000" cy="6858000" type="screen4x3"/>
   <p:notesSz cx="6858000" cy="9144000"/>
@@ -233,7 +235,7 @@
           <a:p>
             <a:fld id="{9E29A4B1-5A86-4619-B723-CCAF1C8CA250}" type="datetimeFigureOut">
               <a:rPr lang="en-GB" smtClean="0"/>
-              <a:t>14/10/2015</a:t>
+              <a:t>19/10/2015</a:t>
             </a:fld>
             <a:endParaRPr lang="en-GB"/>
           </a:p>
@@ -616,7 +618,6 @@
               <a:rPr lang="en-GB" u="sng" dirty="0" smtClean="0"/>
               <a:t>The Talk</a:t>
             </a:r>
-            <a:endParaRPr lang="en-GB" u="sng" dirty="0" smtClean="0"/>
           </a:p>
           <a:p>
             <a:pPr marL="0" indent="0">
@@ -1056,38 +1057,66 @@
           <a:lstStyle/>
           <a:p>
             <a:r>
+              <a:rPr lang="en-GB" baseline="0" dirty="0" smtClean="0"/>
+              <a:t>Azure SQL should be very familiar to use as it is built upon the same database engine you are used to using.</a:t>
+            </a:r>
+          </a:p>
+          <a:p>
+            <a:r>
+              <a:rPr lang="en-GB" baseline="0" dirty="0" smtClean="0"/>
+              <a:t>There is one feature worth going into slightly more detail. Elastic Scale.</a:t>
+            </a:r>
+          </a:p>
+          <a:p>
+            <a:endParaRPr lang="en-GB" baseline="0" dirty="0" smtClean="0"/>
+          </a:p>
+          <a:p>
+            <a:r>
+              <a:rPr lang="en-GB" baseline="0" dirty="0" smtClean="0"/>
+              <a:t>Elastic scale is a simple concept, you </a:t>
+            </a:r>
+            <a:r>
+              <a:rPr lang="en-GB" baseline="0" dirty="0" smtClean="0"/>
+              <a:t>create a database pool and allocate a DTU performance value. Then by using the Elastic Database Tools and libraries and a few lines of code you will be able to easily create and manage database shards. You will be able to create as many shards as you need but will only be able to simultaneously interact with as many databases up to the DTU value you allocated to the pool.</a:t>
+            </a:r>
+            <a:endParaRPr lang="en-GB" baseline="0" dirty="0" smtClean="0"/>
+          </a:p>
+          <a:p>
+            <a:endParaRPr lang="en-GB" baseline="0" dirty="0" smtClean="0"/>
+          </a:p>
+          <a:p>
+            <a:r>
+              <a:rPr lang="en-GB" baseline="0" dirty="0" smtClean="0"/>
+              <a:t>A simple example would be to have a pool with 1000 DTUs allocated to it and then fill it with </a:t>
+            </a:r>
+            <a:r>
+              <a:rPr lang="en-GB" baseline="0" dirty="0" smtClean="0"/>
+              <a:t>800 </a:t>
+            </a:r>
+            <a:r>
+              <a:rPr lang="en-GB" baseline="0" dirty="0" smtClean="0"/>
+              <a:t>basic </a:t>
+            </a:r>
+            <a:r>
+              <a:rPr lang="en-GB" baseline="0" dirty="0" smtClean="0"/>
+              <a:t>databases shards. </a:t>
+            </a:r>
+            <a:r>
+              <a:rPr lang="en-GB" baseline="0" dirty="0" smtClean="0"/>
+              <a:t>In code you would connect to the pool and </a:t>
+            </a:r>
+            <a:r>
+              <a:rPr lang="en-GB" baseline="0" dirty="0" smtClean="0"/>
+              <a:t>query 200 of the databases at once.</a:t>
+            </a:r>
+          </a:p>
+          <a:p>
+            <a:endParaRPr lang="en-GB" baseline="0" dirty="0" smtClean="0"/>
+          </a:p>
+          <a:p>
+            <a:r>
               <a:rPr lang="en-GB" dirty="0" smtClean="0"/>
-              <a:t>When developing you app you may choose to start out using a basic database. But</a:t>
-            </a:r>
-            <a:r>
-              <a:rPr lang="en-GB" baseline="0" dirty="0" smtClean="0"/>
-              <a:t> in production you will want to change the database tier and as your app goes viral you will want to scale your database. </a:t>
-            </a:r>
-          </a:p>
-          <a:p>
-            <a:endParaRPr lang="en-GB" baseline="0" dirty="0" smtClean="0"/>
-          </a:p>
-          <a:p>
-            <a:r>
-              <a:rPr lang="en-GB" baseline="0" dirty="0" smtClean="0"/>
-              <a:t>Elastic scale is a simple concept, you allocate the performance to a pool, and pay for the pool not the databases in use. The pool will auto scale up and down to meet demand, but wont ever exceed the pool allocation , so cost will remain constant.</a:t>
-            </a:r>
-          </a:p>
-          <a:p>
-            <a:endParaRPr lang="en-GB" baseline="0" dirty="0" smtClean="0"/>
-          </a:p>
-          <a:p>
-            <a:r>
-              <a:rPr lang="en-GB" baseline="0" dirty="0" smtClean="0"/>
-              <a:t>A simple example would be to have a pool with 1000 DTUs allocated to it and then fill it with 200 basic databases. In code you would connect to the pool and all the </a:t>
-            </a:r>
-            <a:r>
-              <a:rPr lang="en-GB" baseline="0" dirty="0" err="1" smtClean="0"/>
-              <a:t>sharding</a:t>
-            </a:r>
-            <a:r>
-              <a:rPr lang="en-GB" baseline="0" dirty="0" smtClean="0"/>
-              <a:t> would be managed for you.</a:t>
+              <a:t>Further reading - https://azure.microsoft.com/en-us/documentation/articles/sql-database-elastic-scale-introduction/</a:t>
             </a:r>
             <a:endParaRPr lang="en-GB" dirty="0"/>
           </a:p>
@@ -1217,52 +1246,11 @@
             </a:r>
             <a:r>
               <a:rPr lang="en-GB" dirty="0" smtClean="0"/>
-              <a:t> is a fully managed JSON document database as a service and designed to keep pace with modern rapidly evolving applications. </a:t>
-            </a:r>
-            <a:r>
-              <a:rPr lang="en-GB" dirty="0" err="1" smtClean="0"/>
-              <a:t>DocumentDB</a:t>
+              <a:t> is a fully managed JSON document database as a service and designed to keep pace with modern rapidly evolving applications</a:t>
             </a:r>
             <a:r>
               <a:rPr lang="en-GB" dirty="0" smtClean="0"/>
-              <a:t> executes </a:t>
-            </a:r>
-            <a:r>
-              <a:rPr lang="en-GB" dirty="0" err="1" smtClean="0"/>
-              <a:t>Javascript</a:t>
-            </a:r>
-            <a:r>
-              <a:rPr lang="en-GB" dirty="0" smtClean="0"/>
-              <a:t> within it database engine. Meaning you can write and execute stored procedures and user defined functions directly on the database written in </a:t>
-            </a:r>
-            <a:r>
-              <a:rPr lang="en-GB" dirty="0" err="1" smtClean="0"/>
-              <a:t>Javascript</a:t>
-            </a:r>
-            <a:r>
-              <a:rPr lang="en-GB" dirty="0" smtClean="0"/>
-              <a:t>. </a:t>
-            </a:r>
-          </a:p>
-          <a:p>
-            <a:endParaRPr lang="en-GB" dirty="0" smtClean="0"/>
-          </a:p>
-          <a:p>
-            <a:r>
-              <a:rPr lang="en-GB" dirty="0" err="1" smtClean="0"/>
-              <a:t>DocumentDB</a:t>
-            </a:r>
-            <a:r>
-              <a:rPr lang="en-GB" dirty="0" smtClean="0"/>
-              <a:t> automatically indexes all JSON documents, then allows you to query them with the familiar SQL syntax. A well as JavaScript Azure also provide SDKs in </a:t>
-            </a:r>
-            <a:r>
-              <a:rPr lang="en-GB" dirty="0" err="1" smtClean="0"/>
-              <a:t>.Net</a:t>
-            </a:r>
-            <a:r>
-              <a:rPr lang="en-GB" dirty="0" smtClean="0"/>
-              <a:t>, Java, Python and more, so you up and running quickly with the tools and languages you are already familiar with.</a:t>
+              <a:t>.</a:t>
             </a:r>
             <a:endParaRPr lang="en-GB" dirty="0"/>
           </a:p>
@@ -1349,91 +1337,49 @@
           <a:lstStyle/>
           <a:p>
             <a:r>
+              <a:rPr lang="en-GB" dirty="0" err="1" smtClean="0"/>
+              <a:t>DocumentDB</a:t>
+            </a:r>
+            <a:r>
               <a:rPr lang="en-GB" dirty="0" smtClean="0"/>
-              <a:t>Azure Table Storage is a non-relational,</a:t>
-            </a:r>
-            <a:r>
-              <a:rPr lang="en-GB" baseline="0" dirty="0" smtClean="0"/>
-              <a:t> key-value pair data store designed for storing massive amounts of unstructured data and optimised for fast retrieval.</a:t>
-            </a:r>
-          </a:p>
-          <a:p>
-            <a:endParaRPr lang="en-GB" baseline="0" dirty="0" smtClean="0"/>
-          </a:p>
-          <a:p>
-            <a:r>
-              <a:rPr lang="en-GB" baseline="0" dirty="0" smtClean="0"/>
-              <a:t>Table storage offers highly available, massively scalable storage so you application can automatically scale to meet demand.</a:t>
-            </a:r>
-          </a:p>
-          <a:p>
-            <a:endParaRPr lang="en-GB" baseline="0" dirty="0" smtClean="0"/>
-          </a:p>
-          <a:p>
+              <a:t> automatically indexes all JSON documents, then allows you to query them with a</a:t>
+            </a:r>
+            <a:r>
+              <a:rPr lang="en-GB" baseline="0" dirty="0" smtClean="0"/>
+              <a:t> </a:t>
+            </a:r>
             <a:r>
               <a:rPr lang="en-GB" dirty="0" smtClean="0"/>
-              <a:t>Table</a:t>
-            </a:r>
-            <a:r>
-              <a:rPr lang="en-GB" baseline="0" dirty="0" smtClean="0"/>
-              <a:t> storage is scales in terms of data storage rather than server resource. With a single Azure subscription you can create 50 storage accounts and each storage account can store up to 500TB of data, that’s 25 </a:t>
+              <a:t>SQL like syntax. </a:t>
+            </a:r>
+          </a:p>
+          <a:p>
+            <a:endParaRPr lang="en-GB" dirty="0" smtClean="0"/>
+          </a:p>
+          <a:p>
+            <a:r>
+              <a:rPr lang="en-GB" dirty="0" smtClean="0"/>
+              <a:t>Here is an</a:t>
+            </a:r>
+            <a:r>
+              <a:rPr lang="en-GB" baseline="0" dirty="0" smtClean="0"/>
+              <a:t> example JSON document. And selecting the </a:t>
             </a:r>
             <a:r>
               <a:rPr lang="en-GB" baseline="0" dirty="0" err="1" smtClean="0"/>
-              <a:t>peta</a:t>
-            </a:r>
-            <a:r>
-              <a:rPr lang="en-GB" baseline="0" dirty="0" smtClean="0"/>
-              <a:t> bytes of data.</a:t>
-            </a:r>
-          </a:p>
-          <a:p>
-            <a:endParaRPr lang="en-GB" baseline="0" dirty="0" smtClean="0"/>
-          </a:p>
-          <a:p>
-            <a:r>
-              <a:rPr lang="en-GB" baseline="0" dirty="0" smtClean="0"/>
-              <a:t>With those sort of volumes of data available you would be pretty miffed if that data was lost.</a:t>
-            </a:r>
-          </a:p>
-          <a:p>
-            <a:endParaRPr lang="en-GB" baseline="0" dirty="0" smtClean="0"/>
-          </a:p>
-          <a:p>
-            <a:r>
-              <a:rPr lang="en-GB" baseline="0" dirty="0" smtClean="0"/>
-              <a:t>Azure always at least three copies of you data. When you create a storage account you have to pick one of 4 replication options.</a:t>
-            </a:r>
-          </a:p>
-          <a:p>
-            <a:endParaRPr lang="en-GB" baseline="0" dirty="0" smtClean="0"/>
-          </a:p>
-          <a:p>
-            <a:r>
-              <a:rPr lang="en-GB" dirty="0" smtClean="0"/>
-              <a:t>Locally redundant storage – data is replicated 3x</a:t>
-            </a:r>
-            <a:r>
-              <a:rPr lang="en-GB" baseline="0" dirty="0" smtClean="0"/>
-              <a:t> in a data centre.</a:t>
-            </a:r>
-          </a:p>
-          <a:p>
-            <a:r>
-              <a:rPr lang="en-GB" baseline="0" dirty="0" smtClean="0"/>
-              <a:t>Zone redundant storage – data is replicated 2-3 times within 1 or 2  near by regions.</a:t>
-            </a:r>
-          </a:p>
-          <a:p>
-            <a:r>
-              <a:rPr lang="en-GB" baseline="0" dirty="0" smtClean="0"/>
-              <a:t>Geo-redundant storage – data is replicated 6x. 3x in your primary region and 3x in a secondary region which is located hundreds of miles away.</a:t>
-            </a:r>
-          </a:p>
-          <a:p>
-            <a:r>
-              <a:rPr lang="en-GB" baseline="0" dirty="0" smtClean="0"/>
-              <a:t>Read-Access Geo-Redundant Storage – The same as Geo-Redundant Storage, but you get read access to the secondary location when the primary location is unavailable.</a:t>
+              <a:t>givenName</a:t>
+            </a:r>
+            <a:r>
+              <a:rPr lang="en-GB" baseline="0" dirty="0" smtClean="0"/>
+              <a:t> from the </a:t>
+            </a:r>
+            <a:r>
+              <a:rPr lang="en-GB" baseline="0" dirty="0" err="1" smtClean="0"/>
+              <a:t>childrens</a:t>
+            </a:r>
+            <a:r>
+              <a:rPr lang="en-GB" baseline="0" dirty="0" smtClean="0"/>
+              <a:t> array will result in.</a:t>
             </a:r>
             <a:endParaRPr lang="en-GB" dirty="0" smtClean="0"/>
           </a:p>
@@ -1465,7 +1411,7 @@
     </p:spTree>
     <p:extLst>
       <p:ext uri="{BB962C8B-B14F-4D97-AF65-F5344CB8AC3E}">
-        <p14:creationId xmlns:p14="http://schemas.microsoft.com/office/powerpoint/2010/main" val="248086816"/>
+        <p14:creationId xmlns:p14="http://schemas.microsoft.com/office/powerpoint/2010/main" val="3810548041"/>
       </p:ext>
     </p:extLst>
   </p:cSld>
@@ -1520,61 +1466,122 @@
           <a:lstStyle/>
           <a:p>
             <a:r>
+              <a:rPr lang="en-GB" dirty="0" err="1" smtClean="0"/>
+              <a:t>DocumentDB</a:t>
+            </a:r>
+            <a:r>
               <a:rPr lang="en-GB" dirty="0" smtClean="0"/>
-              <a:t>Like me, if you are</a:t>
-            </a:r>
-            <a:r>
-              <a:rPr lang="en-GB" baseline="0" dirty="0" smtClean="0"/>
-              <a:t> used to developing relational models you will find table storage strange and you will make all the mistakes I have.</a:t>
-            </a:r>
-          </a:p>
-          <a:p>
-            <a:r>
-              <a:rPr lang="en-GB" baseline="0" dirty="0" smtClean="0"/>
-              <a:t>There are a number of factors you need to consider when building you data model.</a:t>
-            </a:r>
-          </a:p>
-          <a:p>
-            <a:endParaRPr lang="en-GB" baseline="0" dirty="0" smtClean="0"/>
-          </a:p>
-          <a:p>
-            <a:r>
-              <a:rPr lang="en-GB" baseline="0" dirty="0" smtClean="0"/>
-              <a:t>As I said earlier, Table storage is key/value store. Which means every property in an entity has a name and a value. The value can by any of the basic data types plus it can be a byte array as well. You cannot have more than 252 properties to an entity and an entity cannot be more than 1MB in size.</a:t>
-            </a:r>
-          </a:p>
-          <a:p>
-            <a:endParaRPr lang="en-GB" baseline="0" dirty="0" smtClean="0"/>
-          </a:p>
-          <a:p>
-            <a:r>
-              <a:rPr lang="en-GB" baseline="0" dirty="0" smtClean="0"/>
-              <a:t>Every entity also has a Partition Key, a Row Key and a Time stamp. The timestamp is updated every time you save the entity. The partition key and row key form a composite key. And how this key is used is why table storage is so fast at retrieving data.</a:t>
-            </a:r>
-          </a:p>
-          <a:p>
-            <a:endParaRPr lang="en-GB" baseline="0" dirty="0" smtClean="0"/>
-          </a:p>
-          <a:p>
-            <a:r>
-              <a:rPr lang="en-GB" baseline="0" dirty="0" smtClean="0"/>
-              <a:t>The Partition key groups all entities with the same key into one partition and stores them together on the same server. Key advantages to grouping a set of entities in a single partition is that it is possible to perform batch operations and query a subset of the data.</a:t>
-            </a:r>
-          </a:p>
-          <a:p>
-            <a:r>
-              <a:rPr lang="en-GB" baseline="0" dirty="0" smtClean="0"/>
-              <a:t>Data spread across multiple partitions can be load balanced making it possible to have massive data sets that are lighting quick to query.</a:t>
-            </a:r>
-          </a:p>
-          <a:p>
-            <a:endParaRPr lang="en-GB" baseline="0" dirty="0" smtClean="0"/>
-          </a:p>
-          <a:p>
-            <a:r>
-              <a:rPr lang="en-GB" baseline="0" dirty="0" smtClean="0"/>
-              <a:t>The Row Key is used to order the data in the partition and to identify a single record. Which means a row key has to be unique within a partition.</a:t>
-            </a:r>
+              <a:t> executes </a:t>
+            </a:r>
+            <a:r>
+              <a:rPr lang="en-GB" dirty="0" err="1" smtClean="0"/>
+              <a:t>Javascript</a:t>
+            </a:r>
+            <a:r>
+              <a:rPr lang="en-GB" dirty="0" smtClean="0"/>
+              <a:t> within it database engine. Meaning you can write and execute stored procedures and user defined functions directly on the database written in </a:t>
+            </a:r>
+            <a:r>
+              <a:rPr lang="en-GB" dirty="0" err="1" smtClean="0"/>
+              <a:t>Javascript</a:t>
+            </a:r>
+            <a:r>
+              <a:rPr lang="en-GB" dirty="0" smtClean="0"/>
+              <a:t>.</a:t>
+            </a:r>
+          </a:p>
+          <a:p>
+            <a:endParaRPr lang="en-GB" dirty="0" smtClean="0"/>
+          </a:p>
+          <a:p>
+            <a:r>
+              <a:rPr lang="en-GB" sz="1200" b="0" i="0" kern="1200" dirty="0" smtClean="0">
+                <a:solidFill>
+                  <a:schemeClr val="tx1"/>
+                </a:solidFill>
+                <a:effectLst/>
+                <a:latin typeface="+mn-lt"/>
+                <a:ea typeface="+mn-ea"/>
+                <a:cs typeface="+mn-cs"/>
+              </a:rPr>
+              <a:t>In this example creates a UDF whose name is </a:t>
+            </a:r>
+            <a:r>
+              <a:rPr lang="en-GB" dirty="0" smtClean="0"/>
+              <a:t>REGEX_MATCH</a:t>
+            </a:r>
+            <a:r>
+              <a:rPr lang="en-GB" sz="1200" b="0" i="0" kern="1200" dirty="0" smtClean="0">
+                <a:solidFill>
+                  <a:schemeClr val="tx1"/>
+                </a:solidFill>
+                <a:effectLst/>
+                <a:latin typeface="+mn-lt"/>
+                <a:ea typeface="+mn-ea"/>
+                <a:cs typeface="+mn-cs"/>
+              </a:rPr>
+              <a:t>. It accepts two JSON string values </a:t>
+            </a:r>
+            <a:r>
+              <a:rPr lang="en-GB" dirty="0" smtClean="0"/>
+              <a:t>input</a:t>
+            </a:r>
+            <a:r>
+              <a:rPr lang="en-GB" sz="1200" b="0" i="0" kern="1200" dirty="0" smtClean="0">
+                <a:solidFill>
+                  <a:schemeClr val="tx1"/>
+                </a:solidFill>
+                <a:effectLst/>
+                <a:latin typeface="+mn-lt"/>
+                <a:ea typeface="+mn-ea"/>
+                <a:cs typeface="+mn-cs"/>
+              </a:rPr>
+              <a:t> and </a:t>
+            </a:r>
+            <a:r>
+              <a:rPr lang="en-GB" dirty="0" smtClean="0"/>
+              <a:t>pattern</a:t>
+            </a:r>
+            <a:r>
+              <a:rPr lang="en-GB" sz="1200" b="0" i="0" kern="1200" dirty="0" smtClean="0">
+                <a:solidFill>
+                  <a:schemeClr val="tx1"/>
+                </a:solidFill>
+                <a:effectLst/>
+                <a:latin typeface="+mn-lt"/>
+                <a:ea typeface="+mn-ea"/>
+                <a:cs typeface="+mn-cs"/>
+              </a:rPr>
+              <a:t> and checks if the first matches the pattern specified in the second using JavaScript's </a:t>
+            </a:r>
+            <a:r>
+              <a:rPr lang="en-GB" sz="1200" b="0" i="0" kern="1200" dirty="0" err="1" smtClean="0">
+                <a:solidFill>
+                  <a:schemeClr val="tx1"/>
+                </a:solidFill>
+                <a:effectLst/>
+                <a:latin typeface="+mn-lt"/>
+                <a:ea typeface="+mn-ea"/>
+                <a:cs typeface="+mn-cs"/>
+              </a:rPr>
+              <a:t>string.match</a:t>
+            </a:r>
+            <a:r>
+              <a:rPr lang="en-GB" sz="1200" b="0" i="0" kern="1200" dirty="0" smtClean="0">
+                <a:solidFill>
+                  <a:schemeClr val="tx1"/>
+                </a:solidFill>
+                <a:effectLst/>
+                <a:latin typeface="+mn-lt"/>
+                <a:ea typeface="+mn-ea"/>
+                <a:cs typeface="+mn-cs"/>
+              </a:rPr>
+              <a:t>() function.</a:t>
+            </a:r>
+            <a:endParaRPr lang="en-GB" dirty="0" smtClean="0"/>
+          </a:p>
+          <a:p>
+            <a:endParaRPr lang="en-GB" dirty="0"/>
           </a:p>
         </p:txBody>
       </p:sp>
@@ -1604,7 +1611,7 @@
     </p:spTree>
     <p:extLst>
       <p:ext uri="{BB962C8B-B14F-4D97-AF65-F5344CB8AC3E}">
-        <p14:creationId xmlns:p14="http://schemas.microsoft.com/office/powerpoint/2010/main" val="3425282268"/>
+        <p14:creationId xmlns:p14="http://schemas.microsoft.com/office/powerpoint/2010/main" val="2832579297"/>
       </p:ext>
     </p:extLst>
   </p:cSld>
@@ -1660,31 +1667,92 @@
           <a:p>
             <a:r>
               <a:rPr lang="en-GB" dirty="0" smtClean="0"/>
-              <a:t>For an </a:t>
-            </a:r>
-            <a:r>
-              <a:rPr lang="en-GB" baseline="0" dirty="0" smtClean="0"/>
-              <a:t>example of good table design, </a:t>
-            </a:r>
+              <a:t>Azure Table Storage is a non-relational,</a:t>
+            </a:r>
+            <a:r>
+              <a:rPr lang="en-GB" baseline="0" dirty="0" smtClean="0"/>
+              <a:t> key-value pair data store designed for storing massive amounts of unstructured data and optimised for fast retrieval.</a:t>
+            </a:r>
+          </a:p>
+          <a:p>
+            <a:endParaRPr lang="en-GB" baseline="0" dirty="0" smtClean="0"/>
+          </a:p>
+          <a:p>
+            <a:r>
+              <a:rPr lang="en-GB" baseline="0" dirty="0" smtClean="0"/>
+              <a:t>Table storage offers highly available, massively scalable storage so you application can automatically scale to meet demand.</a:t>
+            </a:r>
+          </a:p>
+          <a:p>
+            <a:endParaRPr lang="en-GB" baseline="0" dirty="0" smtClean="0"/>
+          </a:p>
+          <a:p>
             <a:r>
               <a:rPr lang="en-GB" dirty="0" smtClean="0"/>
-              <a:t>Troy Hunt has written a really good blog post about how he setup table storage for his Have I been </a:t>
-            </a:r>
-            <a:r>
-              <a:rPr lang="en-GB" dirty="0" err="1" smtClean="0"/>
-              <a:t>Pwnd</a:t>
-            </a:r>
+              <a:t>Table</a:t>
+            </a:r>
+            <a:r>
+              <a:rPr lang="en-GB" baseline="0" dirty="0" smtClean="0"/>
+              <a:t> storage is scales in terms of data storage rather than server resource. With a single Azure subscription you can create 50 storage accounts and each storage account can store up to 500TB of data, that’s 25 </a:t>
+            </a:r>
+            <a:r>
+              <a:rPr lang="en-GB" baseline="0" dirty="0" err="1" smtClean="0"/>
+              <a:t>peta</a:t>
+            </a:r>
+            <a:r>
+              <a:rPr lang="en-GB" baseline="0" dirty="0" smtClean="0"/>
+              <a:t> bytes of data.</a:t>
+            </a:r>
+          </a:p>
+          <a:p>
+            <a:endParaRPr lang="en-GB" baseline="0" dirty="0" smtClean="0"/>
+          </a:p>
+          <a:p>
+            <a:r>
+              <a:rPr lang="en-GB" baseline="0" dirty="0" smtClean="0"/>
+              <a:t>With those sort of volumes of data available you would be pretty miffed if that data was lost.</a:t>
+            </a:r>
+          </a:p>
+          <a:p>
+            <a:endParaRPr lang="en-GB" baseline="0" dirty="0" smtClean="0"/>
+          </a:p>
+          <a:p>
+            <a:r>
+              <a:rPr lang="en-GB" baseline="0" dirty="0" smtClean="0"/>
+              <a:t>Azure always at least three copies of you data. When you create a storage account you have to pick one of 4 replication options.</a:t>
+            </a:r>
+          </a:p>
+          <a:p>
+            <a:endParaRPr lang="en-GB" baseline="0" dirty="0" smtClean="0"/>
+          </a:p>
+          <a:p>
             <a:r>
               <a:rPr lang="en-GB" dirty="0" smtClean="0"/>
-              <a:t> site. </a:t>
-            </a:r>
-          </a:p>
-          <a:p>
-            <a:r>
-              <a:rPr lang="en-GB" dirty="0" smtClean="0"/>
-              <a:t>In it he say that he had to put a 400ms delay into his code because table storage was returning too quickly and the UX didn't feel real.</a:t>
-            </a:r>
-            <a:endParaRPr lang="en-GB" dirty="0"/>
+              <a:t>Locally redundant storage – data is replicated 3x</a:t>
+            </a:r>
+            <a:r>
+              <a:rPr lang="en-GB" baseline="0" dirty="0" smtClean="0"/>
+              <a:t> in a data centre.</a:t>
+            </a:r>
+          </a:p>
+          <a:p>
+            <a:r>
+              <a:rPr lang="en-GB" baseline="0" dirty="0" smtClean="0"/>
+              <a:t>Zone redundant storage – data is replicated 2-3 times within 1 or 2  near by regions.</a:t>
+            </a:r>
+          </a:p>
+          <a:p>
+            <a:r>
+              <a:rPr lang="en-GB" baseline="0" dirty="0" smtClean="0"/>
+              <a:t>Geo-redundant storage – data is replicated 6x. 3x in your primary region and 3x in a secondary region which is located hundreds of miles away.</a:t>
+            </a:r>
+          </a:p>
+          <a:p>
+            <a:r>
+              <a:rPr lang="en-GB" baseline="0" dirty="0" smtClean="0"/>
+              <a:t>Read-Access Geo-Redundant Storage – The same as Geo-Redundant Storage, but you get read access to the secondary location when the primary location is unavailable.</a:t>
+            </a:r>
+            <a:endParaRPr lang="en-GB" dirty="0" smtClean="0"/>
           </a:p>
         </p:txBody>
       </p:sp>
@@ -1714,7 +1782,7 @@
     </p:spTree>
     <p:extLst>
       <p:ext uri="{BB962C8B-B14F-4D97-AF65-F5344CB8AC3E}">
-        <p14:creationId xmlns:p14="http://schemas.microsoft.com/office/powerpoint/2010/main" val="2856833730"/>
+        <p14:creationId xmlns:p14="http://schemas.microsoft.com/office/powerpoint/2010/main" val="248086816"/>
       </p:ext>
     </p:extLst>
   </p:cSld>
@@ -1770,27 +1838,17 @@
           <a:p>
             <a:r>
               <a:rPr lang="en-GB" dirty="0" smtClean="0"/>
-              <a:t>Azure supports two types of queue</a:t>
-            </a:r>
-            <a:r>
-              <a:rPr lang="en-GB" baseline="0" dirty="0" smtClean="0"/>
-              <a:t> mechanisms. </a:t>
-            </a:r>
-            <a:r>
-              <a:rPr lang="en-GB" b="1" baseline="0" dirty="0" smtClean="0"/>
-              <a:t>Azure Queues</a:t>
-            </a:r>
-            <a:r>
-              <a:rPr lang="en-GB" baseline="0" dirty="0" smtClean="0"/>
-              <a:t> and </a:t>
-            </a:r>
-            <a:r>
-              <a:rPr lang="en-GB" b="1" baseline="0" dirty="0" smtClean="0"/>
-              <a:t>Service Bus Queues</a:t>
-            </a:r>
-            <a:r>
-              <a:rPr lang="en-GB" baseline="0" dirty="0" smtClean="0"/>
-              <a:t>.</a:t>
+              <a:t>Like me, if you are</a:t>
+            </a:r>
+            <a:r>
+              <a:rPr lang="en-GB" baseline="0" dirty="0" smtClean="0"/>
+              <a:t> used to developing relational models you will find table storage strange and you will make all the mistakes I have.</a:t>
+            </a:r>
+          </a:p>
+          <a:p>
+            <a:r>
+              <a:rPr lang="en-GB" baseline="0" dirty="0" smtClean="0"/>
+              <a:t>There are a number of factors you need to consider when building you data model.</a:t>
             </a:r>
           </a:p>
           <a:p>
@@ -1798,12 +1856,8 @@
           </a:p>
           <a:p>
             <a:r>
-              <a:rPr lang="en-GB" b="1" baseline="0" dirty="0" smtClean="0"/>
-              <a:t>Azure Queues</a:t>
-            </a:r>
-            <a:r>
-              <a:rPr lang="en-GB" baseline="0" dirty="0" smtClean="0"/>
-              <a:t> are part of the same Azure Storage service that Table Storage is part of. They provide a simple interface to reliably persist messages between services.</a:t>
+              <a:rPr lang="en-GB" baseline="0" dirty="0" smtClean="0"/>
+              <a:t>As I said earlier, Table storage is key/value store. Which means every property in an entity has a name and a value. The value can by any of the basic data types plus it can be a byte array as well. You cannot have more than 252 properties to an entity and an entity cannot be more than 1MB in size.</a:t>
             </a:r>
           </a:p>
           <a:p>
@@ -1811,14 +1865,33 @@
           </a:p>
           <a:p>
             <a:r>
-              <a:rPr lang="en-GB" b="1" baseline="0" dirty="0" smtClean="0"/>
-              <a:t>Service Bus</a:t>
-            </a:r>
-            <a:r>
-              <a:rPr lang="en-GB" baseline="0" dirty="0" smtClean="0"/>
-              <a:t> queues are part of the wider Azure Messaging service which provides Queues, Topics, Relays and Event Hubs.</a:t>
-            </a:r>
-            <a:endParaRPr lang="en-GB" dirty="0" smtClean="0"/>
+              <a:rPr lang="en-GB" baseline="0" dirty="0" smtClean="0"/>
+              <a:t>Every entity also has a Partition Key, a Row Key and a Time stamp. The timestamp is updated every time you save the entity. The partition key and row key form a composite key. And how this key is used is why table storage is so fast at retrieving data.</a:t>
+            </a:r>
+          </a:p>
+          <a:p>
+            <a:endParaRPr lang="en-GB" baseline="0" dirty="0" smtClean="0"/>
+          </a:p>
+          <a:p>
+            <a:r>
+              <a:rPr lang="en-GB" baseline="0" dirty="0" smtClean="0"/>
+              <a:t>The Partition key groups all entities with the same key into one partition and stores them together on the same server. Key advantages to grouping a set of entities in a single partition is that it is possible to perform batch operations and query a subset of the data.</a:t>
+            </a:r>
+          </a:p>
+          <a:p>
+            <a:r>
+              <a:rPr lang="en-GB" baseline="0" dirty="0" smtClean="0"/>
+              <a:t>Data spread across multiple partitions can be load balanced making it possible to have massive data sets that are lighting quick to query.</a:t>
+            </a:r>
+          </a:p>
+          <a:p>
+            <a:endParaRPr lang="en-GB" baseline="0" dirty="0" smtClean="0"/>
+          </a:p>
+          <a:p>
+            <a:r>
+              <a:rPr lang="en-GB" baseline="0" dirty="0" smtClean="0"/>
+              <a:t>The Row Key is used to order the data in the partition and to identify a single record. Which means a row key has to be unique within a partition.</a:t>
+            </a:r>
           </a:p>
         </p:txBody>
       </p:sp>
@@ -1848,7 +1921,7 @@
     </p:spTree>
     <p:extLst>
       <p:ext uri="{BB962C8B-B14F-4D97-AF65-F5344CB8AC3E}">
-        <p14:creationId xmlns:p14="http://schemas.microsoft.com/office/powerpoint/2010/main" val="4251635917"/>
+        <p14:creationId xmlns:p14="http://schemas.microsoft.com/office/powerpoint/2010/main" val="3425282268"/>
       </p:ext>
     </p:extLst>
   </p:cSld>
@@ -1904,73 +1977,29 @@
           <a:p>
             <a:r>
               <a:rPr lang="en-GB" dirty="0" smtClean="0"/>
-              <a:t>Azure Storage Queues was</a:t>
-            </a:r>
-            <a:r>
-              <a:rPr lang="en-GB" baseline="0" dirty="0" smtClean="0"/>
-              <a:t> the first queue mechanism on Azure and provides a way of storing a large number of messages for services to process.</a:t>
-            </a:r>
-          </a:p>
-          <a:p>
-            <a:endParaRPr lang="en-GB" baseline="0" dirty="0" smtClean="0"/>
-          </a:p>
-          <a:p>
-            <a:r>
-              <a:rPr lang="en-GB" baseline="0" dirty="0" smtClean="0"/>
-              <a:t>A single message can be up to 64KB and the only limit on the number of messages you can store is the storage account data limit of 500TB.</a:t>
-            </a:r>
-          </a:p>
-          <a:p>
-            <a:endParaRPr lang="en-GB" baseline="0" dirty="0" smtClean="0"/>
-          </a:p>
-          <a:p>
-            <a:r>
-              <a:rPr lang="en-GB" baseline="0" dirty="0" smtClean="0"/>
-              <a:t>Queues are used to delegate work and decouple your application from long running tasks.</a:t>
-            </a:r>
-          </a:p>
-          <a:p>
-            <a:r>
-              <a:rPr lang="en-GB" baseline="0" dirty="0" smtClean="0"/>
-              <a:t>For example you application may allow you users to upload images, But the application needs a thumbnail of the image.</a:t>
-            </a:r>
-          </a:p>
-          <a:p>
-            <a:r>
-              <a:rPr lang="en-GB" baseline="0" dirty="0" smtClean="0"/>
-              <a:t>Rather than making your customer wait for the thumbnail to be created you can put the location of the image in a message and put the message on a queue.</a:t>
-            </a:r>
-          </a:p>
-          <a:p>
-            <a:r>
-              <a:rPr lang="en-GB" baseline="0" dirty="0" smtClean="0"/>
-              <a:t>Then a background task can take that message off the queue generate the thumbnail, save it and delete the message off the queue.</a:t>
-            </a:r>
-          </a:p>
-          <a:p>
-            <a:endParaRPr lang="en-GB" baseline="0" dirty="0" smtClean="0"/>
-          </a:p>
-          <a:p>
-            <a:r>
-              <a:rPr lang="en-GB" baseline="0" dirty="0" smtClean="0"/>
-              <a:t>One thing to be aware of is when a message is read it is not removed off the queue it is hidden for a configurable amount of time. You need to be careful not to set the Invisibility Timeout to low, by default is 2 </a:t>
-            </a:r>
-            <a:r>
-              <a:rPr lang="en-GB" baseline="0" dirty="0" err="1" smtClean="0"/>
-              <a:t>mins</a:t>
-            </a:r>
-            <a:r>
-              <a:rPr lang="en-GB" baseline="0" dirty="0" smtClean="0"/>
-              <a:t>, because your message could appear back on the queue and be read again before you have finished processing it. </a:t>
-            </a:r>
-          </a:p>
-          <a:p>
-            <a:endParaRPr lang="en-GB" baseline="0" dirty="0" smtClean="0"/>
-          </a:p>
-          <a:p>
-            <a:r>
-              <a:rPr lang="en-GB" baseline="0" dirty="0" smtClean="0"/>
-              <a:t>I have hit upon this problem when encoding video. Video can take a long time to encode and the timeout on the messages was left at its default of 2mins. Which meant the message was being read multiple times kicking of a new encoding job each time. Until the first job had finished and deleted the message off he queue.</a:t>
+              <a:t>For an </a:t>
+            </a:r>
+            <a:r>
+              <a:rPr lang="en-GB" baseline="0" dirty="0" smtClean="0"/>
+              <a:t>example of good table design, </a:t>
+            </a:r>
+            <a:r>
+              <a:rPr lang="en-GB" dirty="0" smtClean="0"/>
+              <a:t>Troy Hunt has written a really good blog post about how he setup table storage for his Have I been </a:t>
+            </a:r>
+            <a:r>
+              <a:rPr lang="en-GB" dirty="0" err="1" smtClean="0"/>
+              <a:t>Pwnd</a:t>
+            </a:r>
+            <a:r>
+              <a:rPr lang="en-GB" dirty="0" smtClean="0"/>
+              <a:t> site. </a:t>
+            </a:r>
+          </a:p>
+          <a:p>
+            <a:r>
+              <a:rPr lang="en-GB" dirty="0" smtClean="0"/>
+              <a:t>In it he say that he had to put a 400ms delay into his code because table storage was returning too quickly and the UX didn't feel real.</a:t>
             </a:r>
             <a:endParaRPr lang="en-GB" dirty="0"/>
           </a:p>
@@ -2002,7 +2031,7 @@
     </p:spTree>
     <p:extLst>
       <p:ext uri="{BB962C8B-B14F-4D97-AF65-F5344CB8AC3E}">
-        <p14:creationId xmlns:p14="http://schemas.microsoft.com/office/powerpoint/2010/main" val="2631402639"/>
+        <p14:creationId xmlns:p14="http://schemas.microsoft.com/office/powerpoint/2010/main" val="2856833730"/>
       </p:ext>
     </p:extLst>
   </p:cSld>
@@ -2058,135 +2087,55 @@
           <a:p>
             <a:r>
               <a:rPr lang="en-GB" dirty="0" smtClean="0"/>
-              <a:t>The Azure Service Bus Service allows the user to create</a:t>
-            </a:r>
-            <a:r>
-              <a:rPr lang="en-GB" baseline="0" dirty="0" smtClean="0"/>
-              <a:t> namespaces where they can setup one or more of the available communication mechanisms.</a:t>
+              <a:t>Azure supports two types of queue</a:t>
+            </a:r>
+            <a:r>
+              <a:rPr lang="en-GB" baseline="0" dirty="0" smtClean="0"/>
+              <a:t> mechanisms. </a:t>
+            </a:r>
+            <a:r>
+              <a:rPr lang="en-GB" b="1" baseline="0" dirty="0" smtClean="0"/>
+              <a:t>Azure Queues</a:t>
+            </a:r>
+            <a:r>
+              <a:rPr lang="en-GB" baseline="0" dirty="0" smtClean="0"/>
+              <a:t> and </a:t>
+            </a:r>
+            <a:r>
+              <a:rPr lang="en-GB" b="1" baseline="0" dirty="0" smtClean="0"/>
+              <a:t>Service Bus Queues</a:t>
+            </a:r>
+            <a:r>
+              <a:rPr lang="en-GB" baseline="0" dirty="0" smtClean="0"/>
+              <a:t>.</a:t>
             </a:r>
           </a:p>
           <a:p>
             <a:endParaRPr lang="en-GB" baseline="0" dirty="0" smtClean="0"/>
           </a:p>
           <a:p>
+            <a:r>
+              <a:rPr lang="en-GB" b="1" baseline="0" dirty="0" smtClean="0"/>
+              <a:t>Azure Queues</a:t>
+            </a:r>
+            <a:r>
+              <a:rPr lang="en-GB" baseline="0" dirty="0" smtClean="0"/>
+              <a:t> are part of the same Azure Storage service that Table Storage is part of. They provide a simple interface to reliably persist messages between services.</a:t>
+            </a:r>
+          </a:p>
+          <a:p>
             <a:endParaRPr lang="en-GB" baseline="0" dirty="0" smtClean="0"/>
           </a:p>
           <a:p>
-            <a:pPr marL="171450" indent="-171450">
-              <a:buFont typeface="Arial" panose="020B0604020202020204" pitchFamily="34" charset="0"/>
-              <a:buChar char="•"/>
-            </a:pPr>
-            <a:r>
-              <a:rPr lang="en-GB" b="1" dirty="0" smtClean="0"/>
-              <a:t>Queues</a:t>
-            </a:r>
-            <a:r>
-              <a:rPr lang="en-GB" dirty="0" smtClean="0"/>
-              <a:t>,</a:t>
-            </a:r>
-            <a:r>
-              <a:rPr lang="en-GB" baseline="0" dirty="0" smtClean="0"/>
-              <a:t> which allow one directional communication. A message producer hands off a message to the queue. A single message consumer pulls the message from the queue and processes it.</a:t>
-            </a:r>
-          </a:p>
-          <a:p>
-            <a:pPr marL="171450" indent="-171450">
-              <a:buFont typeface="Arial" panose="020B0604020202020204" pitchFamily="34" charset="0"/>
-              <a:buChar char="•"/>
-            </a:pPr>
             <a:r>
               <a:rPr lang="en-GB" b="1" baseline="0" dirty="0" smtClean="0"/>
-              <a:t>Topics</a:t>
-            </a:r>
-            <a:r>
-              <a:rPr lang="en-GB" baseline="0" dirty="0" smtClean="0"/>
-              <a:t>, </a:t>
-            </a:r>
-            <a:r>
-              <a:rPr lang="en-GB" sz="1200" dirty="0" smtClean="0">
-                <a:solidFill>
-                  <a:srgbClr val="737373"/>
-                </a:solidFill>
-                <a:latin typeface="Georgia" panose="02040502050405020303" pitchFamily="18" charset="0"/>
-              </a:rPr>
-              <a:t>which provide one-directional communication using a publish/subscribe pattern. Like queues a single message producer hands a message off to a queue, but multiple message consumers can subscribe to that topic.</a:t>
-            </a:r>
-          </a:p>
-          <a:p>
-            <a:pPr marL="171450" indent="-171450">
-              <a:buFont typeface="Arial" panose="020B0604020202020204" pitchFamily="34" charset="0"/>
-              <a:buChar char="•"/>
-            </a:pPr>
-            <a:r>
-              <a:rPr lang="en-GB" sz="1200" b="1" dirty="0" smtClean="0">
-                <a:solidFill>
-                  <a:srgbClr val="737373"/>
-                </a:solidFill>
-                <a:latin typeface="Georgia" panose="02040502050405020303" pitchFamily="18" charset="0"/>
-              </a:rPr>
-              <a:t>Relays</a:t>
-            </a:r>
-            <a:r>
-              <a:rPr lang="en-GB" sz="1200" dirty="0" smtClean="0">
-                <a:solidFill>
-                  <a:srgbClr val="737373"/>
-                </a:solidFill>
-                <a:latin typeface="Georgia" panose="02040502050405020303" pitchFamily="18" charset="0"/>
-              </a:rPr>
-              <a:t>, which provide bi-directional communication. Unlike queues and topics a relay doesn’t broker messages via a queue. Instead,</a:t>
-            </a:r>
-            <a:r>
-              <a:rPr lang="en-GB" sz="1200" baseline="0" dirty="0" smtClean="0">
-                <a:solidFill>
-                  <a:srgbClr val="737373"/>
-                </a:solidFill>
-                <a:latin typeface="Georgia" panose="02040502050405020303" pitchFamily="18" charset="0"/>
-              </a:rPr>
-              <a:t> it just passes them on to the destination application via WCF messages.</a:t>
-            </a:r>
-          </a:p>
-          <a:p>
-            <a:pPr marL="171450" indent="-171450">
-              <a:buFont typeface="Arial" panose="020B0604020202020204" pitchFamily="34" charset="0"/>
-              <a:buChar char="•"/>
-            </a:pPr>
-            <a:r>
-              <a:rPr lang="en-GB" sz="1200" b="1" baseline="0" dirty="0" smtClean="0">
-                <a:solidFill>
-                  <a:srgbClr val="737373"/>
-                </a:solidFill>
-                <a:latin typeface="Georgia" panose="02040502050405020303" pitchFamily="18" charset="0"/>
-              </a:rPr>
-              <a:t>Event Hubs</a:t>
-            </a:r>
-            <a:r>
-              <a:rPr lang="en-GB" sz="1200" baseline="0" dirty="0" smtClean="0">
-                <a:solidFill>
-                  <a:srgbClr val="737373"/>
-                </a:solidFill>
-                <a:latin typeface="Georgia" panose="02040502050405020303" pitchFamily="18" charset="0"/>
-              </a:rPr>
-              <a:t>, </a:t>
-            </a:r>
-            <a:r>
-              <a:rPr lang="en-GB" sz="1200" dirty="0" smtClean="0">
-                <a:solidFill>
-                  <a:srgbClr val="737373"/>
-                </a:solidFill>
-                <a:latin typeface="Georgia" panose="02040502050405020303" pitchFamily="18" charset="0"/>
-              </a:rPr>
-              <a:t>which provide event and telemetry ingress to the cloud. Event Hubs are use</a:t>
-            </a:r>
-            <a:r>
-              <a:rPr lang="en-GB" sz="1200" baseline="0" dirty="0" smtClean="0">
-                <a:solidFill>
-                  <a:srgbClr val="737373"/>
-                </a:solidFill>
-                <a:latin typeface="Georgia" panose="02040502050405020303" pitchFamily="18" charset="0"/>
-              </a:rPr>
-              <a:t> to collect high volumes of data. They can process millions of events per second. For example, Volkswagen could have collect the live emissions data from all its cars using event hubs.</a:t>
-            </a:r>
-            <a:endParaRPr lang="en-GB" dirty="0"/>
+              <a:t>Service Bus</a:t>
+            </a:r>
+            <a:r>
+              <a:rPr lang="en-GB" baseline="0" dirty="0" smtClean="0"/>
+              <a:t> queues are part of the wider Azure Messaging service which provides Queues, Topics, Relays and Event Hubs.</a:t>
+            </a:r>
+            <a:endParaRPr lang="en-GB" dirty="0" smtClean="0"/>
           </a:p>
         </p:txBody>
       </p:sp>
@@ -2216,7 +2165,7 @@
     </p:spTree>
     <p:extLst>
       <p:ext uri="{BB962C8B-B14F-4D97-AF65-F5344CB8AC3E}">
-        <p14:creationId xmlns:p14="http://schemas.microsoft.com/office/powerpoint/2010/main" val="1570882835"/>
+        <p14:creationId xmlns:p14="http://schemas.microsoft.com/office/powerpoint/2010/main" val="4251635917"/>
       </p:ext>
     </p:extLst>
   </p:cSld>
@@ -2274,7 +2223,6 @@
               <a:rPr lang="en-GB" u="sng" baseline="0" dirty="0" smtClean="0"/>
               <a:t>Why use Cloud Computing?</a:t>
             </a:r>
-            <a:endParaRPr lang="en-GB" u="sng" baseline="0" dirty="0" smtClean="0"/>
           </a:p>
           <a:p>
             <a:endParaRPr lang="en-GB" baseline="0" dirty="0" smtClean="0"/>
@@ -2282,54 +2230,22 @@
           <a:p>
             <a:r>
               <a:rPr lang="en-GB" baseline="0" dirty="0" smtClean="0"/>
-              <a:t>If you have an on-premises data canter you have to deal with the purchasing and installation of the hardware, </a:t>
-            </a:r>
-            <a:r>
-              <a:rPr lang="en-GB" baseline="0" dirty="0" smtClean="0"/>
-              <a:t>the installation </a:t>
-            </a:r>
-            <a:r>
-              <a:rPr lang="en-GB" baseline="0" dirty="0" smtClean="0"/>
-              <a:t>of operating systems </a:t>
-            </a:r>
-            <a:r>
-              <a:rPr lang="en-GB" baseline="0" dirty="0" smtClean="0"/>
-              <a:t>and </a:t>
-            </a:r>
-            <a:r>
-              <a:rPr lang="en-GB" baseline="0" dirty="0" smtClean="0"/>
-              <a:t>any </a:t>
-            </a:r>
-            <a:r>
-              <a:rPr lang="en-GB" baseline="0" dirty="0" smtClean="0"/>
-              <a:t>other software </a:t>
-            </a:r>
-            <a:r>
-              <a:rPr lang="en-GB" baseline="0" dirty="0" smtClean="0"/>
-              <a:t>required. Then there is the setup of the </a:t>
-            </a:r>
-            <a:r>
-              <a:rPr lang="en-GB" baseline="0" dirty="0" smtClean="0"/>
-              <a:t>networks, </a:t>
-            </a:r>
-            <a:r>
-              <a:rPr lang="en-GB" baseline="0" dirty="0" smtClean="0"/>
-              <a:t>configuring of firewalls, etc. </a:t>
-            </a:r>
+              <a:t>If you have an on-premises data canter you have to deal with the purchasing and installation of the hardware, the installation of operating systems and any other software required. Then there is the setup of the networks, configuring of firewalls, etc. </a:t>
+            </a:r>
+          </a:p>
+          <a:p>
+            <a:r>
+              <a:rPr lang="en-GB" baseline="0" dirty="0" smtClean="0"/>
+              <a:t>Once the servers are setup they need to be maintained.</a:t>
+            </a:r>
+          </a:p>
+          <a:p>
             <a:endParaRPr lang="en-GB" baseline="0" dirty="0" smtClean="0"/>
           </a:p>
           <a:p>
             <a:r>
               <a:rPr lang="en-GB" baseline="0" dirty="0" smtClean="0"/>
-              <a:t>Once </a:t>
-            </a:r>
-            <a:r>
-              <a:rPr lang="en-GB" baseline="0" dirty="0" smtClean="0"/>
-              <a:t>the servers </a:t>
-            </a:r>
-            <a:r>
-              <a:rPr lang="en-GB" baseline="0" dirty="0" smtClean="0"/>
-              <a:t>are setup they need to be maintained.</a:t>
+              <a:t>Finally you need to predicted what your average load will be and buy extra hardware for when you have high load. Which wont be doing anything most of the time, other than costing you money.</a:t>
             </a:r>
           </a:p>
           <a:p>
@@ -2338,20 +2254,7 @@
           <a:p>
             <a:r>
               <a:rPr lang="en-GB" baseline="0" dirty="0" smtClean="0"/>
-              <a:t>Finally you need to predicted what your average load will be and buy extra hardware for when you have high load. Which wont be doing anything most of the time, other than costing you money.</a:t>
-            </a:r>
-          </a:p>
-          <a:p>
-            <a:endParaRPr lang="en-GB" baseline="0" dirty="0" smtClean="0"/>
-          </a:p>
-          <a:p>
-            <a:r>
-              <a:rPr lang="en-GB" baseline="0" dirty="0" smtClean="0"/>
-              <a:t>With cloud computing the vender is responsible for the servers. They will purchase servers, update and upgrade them for you. The only thing you have to pay for is the </a:t>
-            </a:r>
-            <a:r>
-              <a:rPr lang="en-GB" baseline="0" dirty="0" smtClean="0"/>
-              <a:t>amount of servers or VMs you use.</a:t>
+              <a:t>With cloud computing the vender is responsible for the servers. They will purchase servers, update and upgrade them for you. The only thing you have to pay for is the amount of servers or VMs you use.</a:t>
             </a:r>
             <a:endParaRPr lang="en-GB" dirty="0" smtClean="0"/>
           </a:p>
@@ -2439,53 +2342,75 @@
           <a:p>
             <a:r>
               <a:rPr lang="en-GB" dirty="0" smtClean="0"/>
-              <a:t>At every size of web application you will probably need to run some sort of background task</a:t>
-            </a:r>
-            <a:r>
-              <a:rPr lang="en-GB" baseline="0" dirty="0" smtClean="0"/>
-              <a:t> weather that is clean up data, resize images or process queue messages.</a:t>
-            </a:r>
-          </a:p>
-          <a:p>
-            <a:r>
-              <a:rPr lang="en-GB" baseline="0" dirty="0" smtClean="0"/>
-              <a:t>Azure has two services you could use.</a:t>
+              <a:t>Azure Storage Queues was</a:t>
+            </a:r>
+            <a:r>
+              <a:rPr lang="en-GB" baseline="0" dirty="0" smtClean="0"/>
+              <a:t> the first queue mechanism on Azure and provides a way of storing a large number of messages for services to process.</a:t>
             </a:r>
           </a:p>
           <a:p>
             <a:endParaRPr lang="en-GB" baseline="0" dirty="0" smtClean="0"/>
           </a:p>
           <a:p>
-            <a:pPr marL="171450" indent="-171450">
-              <a:buFont typeface="Arial" panose="020B0604020202020204" pitchFamily="34" charset="0"/>
-              <a:buChar char="•"/>
-            </a:pPr>
-            <a:r>
-              <a:rPr lang="en-GB" b="1" baseline="0" dirty="0" smtClean="0"/>
-              <a:t>Web Jobs</a:t>
-            </a:r>
-            <a:r>
-              <a:rPr lang="en-GB" baseline="0" dirty="0" smtClean="0"/>
-              <a:t>, which are part of the Web Apps service. You can run any program or script continuously, on a schedule or on a trigger with a web job.</a:t>
-            </a:r>
-          </a:p>
-          <a:p>
-            <a:pPr marL="171450" indent="-171450">
-              <a:buFont typeface="Arial" panose="020B0604020202020204" pitchFamily="34" charset="0"/>
-              <a:buChar char="•"/>
-            </a:pPr>
-            <a:r>
-              <a:rPr lang="en-GB" b="1" baseline="0" dirty="0" smtClean="0"/>
-              <a:t>Worker Roles</a:t>
-            </a:r>
-            <a:r>
-              <a:rPr lang="en-GB" baseline="0" dirty="0" smtClean="0"/>
-              <a:t>, which are part of the Cloud Services service. Like a Web Role a Worker Role has an entry point class, which as a number of events that are triggered.</a:t>
-            </a:r>
-            <a:endParaRPr lang="en-GB" dirty="0" smtClean="0"/>
+            <a:r>
+              <a:rPr lang="en-GB" baseline="0" dirty="0" smtClean="0"/>
+              <a:t>A single message can be up to 64KB and the only limit on the number of messages you can store is the storage account data limit of 500TB.</a:t>
+            </a:r>
           </a:p>
           <a:p>
             <a:endParaRPr lang="en-GB" baseline="0" dirty="0" smtClean="0"/>
+          </a:p>
+          <a:p>
+            <a:r>
+              <a:rPr lang="en-GB" baseline="0" dirty="0" smtClean="0"/>
+              <a:t>Queues are used to delegate work and decouple your application from long running tasks.</a:t>
+            </a:r>
+          </a:p>
+          <a:p>
+            <a:r>
+              <a:rPr lang="en-GB" baseline="0" dirty="0" smtClean="0"/>
+              <a:t>For example you application may allow you users to upload images, But the application needs a thumbnail of the image.</a:t>
+            </a:r>
+          </a:p>
+          <a:p>
+            <a:r>
+              <a:rPr lang="en-GB" baseline="0" dirty="0" smtClean="0"/>
+              <a:t>Rather than making your customer wait for the thumbnail to be created you can put the location of the image in a message and put the message on a queue.</a:t>
+            </a:r>
+          </a:p>
+          <a:p>
+            <a:r>
+              <a:rPr lang="en-GB" baseline="0" dirty="0" smtClean="0"/>
+              <a:t>Then a background task can take that message off the queue generate the thumbnail, save it and delete the message off the queue.</a:t>
+            </a:r>
+          </a:p>
+          <a:p>
+            <a:endParaRPr lang="en-GB" baseline="0" dirty="0" smtClean="0"/>
+          </a:p>
+          <a:p>
+            <a:r>
+              <a:rPr lang="en-GB" baseline="0" dirty="0" smtClean="0"/>
+              <a:t>One thing to be aware of is when a message is read it is not removed off the queue it is hidden for a configurable amount of time. You need to be careful not to set the Invisibility Timeout to low, by default is 2 </a:t>
+            </a:r>
+            <a:r>
+              <a:rPr lang="en-GB" baseline="0" dirty="0" err="1" smtClean="0"/>
+              <a:t>mins</a:t>
+            </a:r>
+            <a:r>
+              <a:rPr lang="en-GB" baseline="0" dirty="0" smtClean="0"/>
+              <a:t>, because your message could appear back on the queue and be read again before you have finished processing it. </a:t>
+            </a:r>
+          </a:p>
+          <a:p>
+            <a:endParaRPr lang="en-GB" baseline="0" dirty="0" smtClean="0"/>
+          </a:p>
+          <a:p>
+            <a:r>
+              <a:rPr lang="en-GB" baseline="0" dirty="0" smtClean="0"/>
+              <a:t>I have hit upon this problem when encoding video. Video can take a long time to encode and the timeout on the messages was left at its default of 2mins. Which meant the message was being read multiple times kicking of a new encoding job each time. Until the first job had finished and deleted the message off he queue.</a:t>
+            </a:r>
+            <a:endParaRPr lang="en-GB" dirty="0"/>
           </a:p>
         </p:txBody>
       </p:sp>
@@ -2515,7 +2440,7 @@
     </p:spTree>
     <p:extLst>
       <p:ext uri="{BB962C8B-B14F-4D97-AF65-F5344CB8AC3E}">
-        <p14:creationId xmlns:p14="http://schemas.microsoft.com/office/powerpoint/2010/main" val="3640884441"/>
+        <p14:creationId xmlns:p14="http://schemas.microsoft.com/office/powerpoint/2010/main" val="2631402639"/>
       </p:ext>
     </p:extLst>
   </p:cSld>
@@ -2569,17 +2494,37 @@
           <a:bodyPr/>
           <a:lstStyle/>
           <a:p>
+            <a:r>
+              <a:rPr lang="en-GB" dirty="0" smtClean="0"/>
+              <a:t>The Azure Service Bus Service allows the user to create</a:t>
+            </a:r>
+            <a:r>
+              <a:rPr lang="en-GB" baseline="0" dirty="0" smtClean="0"/>
+              <a:t> namespaces where they can setup one or more of the available communication mechanisms.</a:t>
+            </a:r>
+          </a:p>
+          <a:p>
+            <a:endParaRPr lang="en-GB" baseline="0" dirty="0" smtClean="0"/>
+          </a:p>
+          <a:p>
+            <a:endParaRPr lang="en-GB" baseline="0" dirty="0" smtClean="0"/>
+          </a:p>
+          <a:p>
             <a:pPr marL="171450" indent="-171450">
               <a:buFont typeface="Arial" panose="020B0604020202020204" pitchFamily="34" charset="0"/>
               <a:buChar char="•"/>
             </a:pPr>
             <a:r>
+              <a:rPr lang="en-GB" b="1" dirty="0" smtClean="0"/>
+              <a:t>Queues</a:t>
+            </a:r>
+            <a:r>
               <a:rPr lang="en-GB" dirty="0" smtClean="0"/>
-              <a:t>Put simply,</a:t>
-            </a:r>
-            <a:r>
-              <a:rPr lang="en-GB" baseline="0" dirty="0" smtClean="0"/>
-              <a:t> if you are able to run a script or a program on your local computer you can run it on Azure. All you need to do is upload it.</a:t>
+              <a:t>,</a:t>
+            </a:r>
+            <a:r>
+              <a:rPr lang="en-GB" baseline="0" dirty="0" smtClean="0"/>
+              <a:t> which allow one directional communication. A message producer hands off a message to the queue. A single message consumer pulls the message from the queue and processes it.</a:t>
             </a:r>
           </a:p>
           <a:p>
@@ -2588,8 +2533,21 @@
               <a:buChar char="•"/>
             </a:pPr>
             <a:r>
-              <a:rPr lang="en-GB" baseline="0" dirty="0" smtClean="0"/>
-              <a:t>There are lot of scripts and programs which are supported. </a:t>
+              <a:rPr lang="en-GB" b="1" baseline="0" dirty="0" smtClean="0"/>
+              <a:t>Topics</a:t>
+            </a:r>
+            <a:r>
+              <a:rPr lang="en-GB" baseline="0" dirty="0" smtClean="0"/>
+              <a:t>, </a:t>
+            </a:r>
+            <a:r>
+              <a:rPr lang="en-GB" sz="1200" dirty="0" smtClean="0">
+                <a:solidFill>
+                  <a:srgbClr val="737373"/>
+                </a:solidFill>
+                <a:latin typeface="Georgia" panose="02040502050405020303" pitchFamily="18" charset="0"/>
+              </a:rPr>
+              <a:t>which provide one-directional communication using a publish/subscribe pattern. Like queues a single message producer hands a message off to a queue, but multiple message consumers can subscribe to that topic.</a:t>
             </a:r>
           </a:p>
           <a:p>
@@ -2598,52 +2556,31 @@
               <a:buChar char="•"/>
             </a:pPr>
             <a:r>
-              <a:rPr lang="en-GB" dirty="0" smtClean="0"/>
-              <a:t>As they are built in</a:t>
-            </a:r>
-            <a:r>
-              <a:rPr lang="en-GB" baseline="0" dirty="0" smtClean="0"/>
-              <a:t> to the </a:t>
-            </a:r>
-            <a:r>
-              <a:rPr lang="en-GB" baseline="0" dirty="0" err="1" smtClean="0"/>
-              <a:t>WebApps</a:t>
-            </a:r>
-            <a:r>
-              <a:rPr lang="en-GB" baseline="0" dirty="0" smtClean="0"/>
-              <a:t> service </a:t>
-            </a:r>
-            <a:r>
-              <a:rPr lang="en-GB" baseline="0" dirty="0" err="1" smtClean="0"/>
-              <a:t>WebJobs</a:t>
-            </a:r>
-            <a:r>
-              <a:rPr lang="en-GB" baseline="0" dirty="0" smtClean="0"/>
-              <a:t> get all the feature </a:t>
-            </a:r>
-            <a:r>
-              <a:rPr lang="en-GB" baseline="0" dirty="0" err="1" smtClean="0"/>
-              <a:t>WebApps</a:t>
-            </a:r>
-            <a:r>
-              <a:rPr lang="en-GB" baseline="0" dirty="0" smtClean="0"/>
-              <a:t> do, </a:t>
-            </a:r>
-            <a:r>
-              <a:rPr lang="en-GB" baseline="0" dirty="0" err="1" smtClean="0"/>
-              <a:t>WebJobs</a:t>
-            </a:r>
-            <a:r>
-              <a:rPr lang="en-GB" baseline="0" dirty="0" smtClean="0"/>
-              <a:t> also share the same instance resources as you </a:t>
-            </a:r>
-            <a:r>
-              <a:rPr lang="en-GB" baseline="0" dirty="0" err="1" smtClean="0"/>
-              <a:t>WebApp</a:t>
-            </a:r>
-            <a:r>
-              <a:rPr lang="en-GB" baseline="0" dirty="0" smtClean="0"/>
-              <a:t>.</a:t>
+              <a:rPr lang="en-GB" sz="1200" b="1" dirty="0" smtClean="0">
+                <a:solidFill>
+                  <a:srgbClr val="737373"/>
+                </a:solidFill>
+                <a:latin typeface="Georgia" panose="02040502050405020303" pitchFamily="18" charset="0"/>
+              </a:rPr>
+              <a:t>Relays</a:t>
+            </a:r>
+            <a:r>
+              <a:rPr lang="en-GB" sz="1200" dirty="0" smtClean="0">
+                <a:solidFill>
+                  <a:srgbClr val="737373"/>
+                </a:solidFill>
+                <a:latin typeface="Georgia" panose="02040502050405020303" pitchFamily="18" charset="0"/>
+              </a:rPr>
+              <a:t>, which provide bi-directional communication. Unlike queues and topics a relay doesn’t broker messages via a queue. Instead,</a:t>
+            </a:r>
+            <a:r>
+              <a:rPr lang="en-GB" sz="1200" baseline="0" dirty="0" smtClean="0">
+                <a:solidFill>
+                  <a:srgbClr val="737373"/>
+                </a:solidFill>
+                <a:latin typeface="Georgia" panose="02040502050405020303" pitchFamily="18" charset="0"/>
+              </a:rPr>
+              <a:t> it just passes them on to the destination application via WCF messages.</a:t>
             </a:r>
           </a:p>
           <a:p>
@@ -2652,83 +2589,42 @@
               <a:buChar char="•"/>
             </a:pPr>
             <a:r>
-              <a:rPr lang="en-GB" baseline="0" dirty="0" smtClean="0"/>
-              <a:t>The </a:t>
-            </a:r>
-            <a:r>
-              <a:rPr lang="en-GB" baseline="0" dirty="0" err="1" smtClean="0"/>
-              <a:t>WebJobs</a:t>
-            </a:r>
-            <a:r>
-              <a:rPr lang="en-GB" baseline="0" dirty="0" smtClean="0"/>
-              <a:t> SDK makes working with over Azure service, such as Blob &amp; table storage, Queues and Service Bus, a breeze.</a:t>
-            </a:r>
-          </a:p>
-          <a:p>
-            <a:pPr marL="171450" indent="-171450">
-              <a:buFont typeface="Arial" panose="020B0604020202020204" pitchFamily="34" charset="0"/>
-              <a:buChar char="•"/>
-            </a:pPr>
-            <a:r>
-              <a:rPr lang="en-GB" baseline="0" dirty="0" smtClean="0"/>
-              <a:t>Because </a:t>
-            </a:r>
-            <a:r>
-              <a:rPr lang="en-GB" baseline="0" dirty="0" err="1" smtClean="0"/>
-              <a:t>WebJobs</a:t>
-            </a:r>
-            <a:r>
-              <a:rPr lang="en-GB" baseline="0" dirty="0" smtClean="0"/>
-              <a:t> are on the same server instance as your </a:t>
-            </a:r>
-            <a:r>
-              <a:rPr lang="en-GB" baseline="0" dirty="0" err="1" smtClean="0"/>
-              <a:t>WebApp</a:t>
-            </a:r>
-            <a:r>
-              <a:rPr lang="en-GB" baseline="0" dirty="0" smtClean="0"/>
-              <a:t>, it means </a:t>
-            </a:r>
-            <a:r>
-              <a:rPr lang="en-GB" baseline="0" dirty="0" err="1" smtClean="0"/>
-              <a:t>WebApp</a:t>
-            </a:r>
-            <a:r>
-              <a:rPr lang="en-GB" baseline="0" dirty="0" smtClean="0"/>
-              <a:t> and </a:t>
-            </a:r>
-            <a:r>
-              <a:rPr lang="en-GB" baseline="0" dirty="0" err="1" smtClean="0"/>
-              <a:t>WebJob</a:t>
-            </a:r>
-            <a:r>
-              <a:rPr lang="en-GB" baseline="0" dirty="0" smtClean="0"/>
-              <a:t> scale together. If your </a:t>
-            </a:r>
-            <a:r>
-              <a:rPr lang="en-GB" baseline="0" dirty="0" err="1" smtClean="0"/>
-              <a:t>WebApp</a:t>
-            </a:r>
-            <a:r>
-              <a:rPr lang="en-GB" baseline="0" dirty="0" smtClean="0"/>
-              <a:t> trigger an </a:t>
-            </a:r>
-            <a:r>
-              <a:rPr lang="en-GB" baseline="0" dirty="0" err="1" smtClean="0"/>
-              <a:t>autoscale</a:t>
-            </a:r>
-            <a:r>
-              <a:rPr lang="en-GB" baseline="0" dirty="0" smtClean="0"/>
-              <a:t> event your </a:t>
-            </a:r>
-            <a:r>
-              <a:rPr lang="en-GB" baseline="0" dirty="0" err="1" smtClean="0"/>
-              <a:t>WebJob</a:t>
-            </a:r>
-            <a:r>
-              <a:rPr lang="en-GB" baseline="0" dirty="0" smtClean="0"/>
-              <a:t> will scale out with the App.</a:t>
-            </a:r>
+              <a:rPr lang="en-GB" sz="1200" b="1" baseline="0" dirty="0" smtClean="0">
+                <a:solidFill>
+                  <a:srgbClr val="737373"/>
+                </a:solidFill>
+                <a:latin typeface="Georgia" panose="02040502050405020303" pitchFamily="18" charset="0"/>
+              </a:rPr>
+              <a:t>Event Hubs</a:t>
+            </a:r>
+            <a:r>
+              <a:rPr lang="en-GB" sz="1200" baseline="0" dirty="0" smtClean="0">
+                <a:solidFill>
+                  <a:srgbClr val="737373"/>
+                </a:solidFill>
+                <a:latin typeface="Georgia" panose="02040502050405020303" pitchFamily="18" charset="0"/>
+              </a:rPr>
+              <a:t>, </a:t>
+            </a:r>
+            <a:r>
+              <a:rPr lang="en-GB" sz="1200" dirty="0" smtClean="0">
+                <a:solidFill>
+                  <a:srgbClr val="737373"/>
+                </a:solidFill>
+                <a:latin typeface="Georgia" panose="02040502050405020303" pitchFamily="18" charset="0"/>
+              </a:rPr>
+              <a:t>which provide event and telemetry ingress to the cloud. Event Hubs are use</a:t>
+            </a:r>
+            <a:r>
+              <a:rPr lang="en-GB" sz="1200" baseline="0" dirty="0" smtClean="0">
+                <a:solidFill>
+                  <a:srgbClr val="737373"/>
+                </a:solidFill>
+                <a:latin typeface="Georgia" panose="02040502050405020303" pitchFamily="18" charset="0"/>
+              </a:rPr>
+              <a:t> to collect high volumes of data. They can process millions of events per second. For example, Volkswagen could have collect the live emissions data from all its cars using event hubs.</a:t>
+            </a:r>
+            <a:endParaRPr lang="en-GB" dirty="0"/>
           </a:p>
         </p:txBody>
       </p:sp>
@@ -2758,7 +2654,7 @@
     </p:spTree>
     <p:extLst>
       <p:ext uri="{BB962C8B-B14F-4D97-AF65-F5344CB8AC3E}">
-        <p14:creationId xmlns:p14="http://schemas.microsoft.com/office/powerpoint/2010/main" val="2191421544"/>
+        <p14:creationId xmlns:p14="http://schemas.microsoft.com/office/powerpoint/2010/main" val="1570882835"/>
       </p:ext>
     </p:extLst>
   </p:cSld>
@@ -2813,17 +2709,22 @@
           <a:lstStyle/>
           <a:p>
             <a:r>
-              <a:rPr lang="en-GB" baseline="0" dirty="0" smtClean="0"/>
-              <a:t>Worker Roles can be thought of the </a:t>
-            </a:r>
-            <a:r>
-              <a:rPr lang="en-GB" baseline="0" dirty="0" err="1" smtClean="0"/>
-              <a:t>WebJobs</a:t>
-            </a:r>
-            <a:r>
-              <a:rPr lang="en-GB" baseline="0" dirty="0" smtClean="0"/>
-              <a:t> powerlifting big brother. Worker Roles are part of the Cloud Services service, which Web Roles are part of too.</a:t>
-            </a:r>
+              <a:rPr lang="en-GB" dirty="0" smtClean="0"/>
+              <a:t>At every size of web application you will probably need to run some sort of background task</a:t>
+            </a:r>
+            <a:r>
+              <a:rPr lang="en-GB" baseline="0" dirty="0" smtClean="0"/>
+              <a:t> weather that is clean up data, resize images or process queue messages.</a:t>
+            </a:r>
+          </a:p>
+          <a:p>
+            <a:r>
+              <a:rPr lang="en-GB" baseline="0" dirty="0" smtClean="0"/>
+              <a:t>Azure has two services you could use.</a:t>
+            </a:r>
+          </a:p>
+          <a:p>
+            <a:endParaRPr lang="en-GB" baseline="0" dirty="0" smtClean="0"/>
           </a:p>
           <a:p>
             <a:pPr marL="171450" indent="-171450">
@@ -2831,12 +2732,12 @@
               <a:buChar char="•"/>
             </a:pPr>
             <a:r>
-              <a:rPr lang="en-GB" baseline="0" dirty="0" smtClean="0"/>
-              <a:t>So all the features a Web Role has a Worker Role has. The difference between a Web Role and a Worker role is that Worker Roles are not hosted in IIS so cannot contain one or more web applications. A Worker Role </a:t>
-            </a:r>
-            <a:r>
-              <a:rPr lang="en-GB" dirty="0" smtClean="0"/>
-              <a:t>can be thought of as Windows services that execute background tasks but in the cloud.</a:t>
+              <a:rPr lang="en-GB" b="1" baseline="0" dirty="0" smtClean="0"/>
+              <a:t>Web Jobs</a:t>
+            </a:r>
+            <a:r>
+              <a:rPr lang="en-GB" baseline="0" dirty="0" smtClean="0"/>
+              <a:t>, which are part of the Web Apps service. You can run any program or script continuously, on a schedule or on a trigger with a web job.</a:t>
             </a:r>
           </a:p>
           <a:p>
@@ -2845,40 +2746,14 @@
               <a:buChar char="•"/>
             </a:pPr>
             <a:r>
-              <a:rPr lang="en-GB" dirty="0" smtClean="0"/>
-              <a:t>Unlike a </a:t>
-            </a:r>
-            <a:r>
-              <a:rPr lang="en-GB" dirty="0" err="1" smtClean="0"/>
-              <a:t>WebJob</a:t>
-            </a:r>
-            <a:r>
-              <a:rPr lang="en-GB" dirty="0" smtClean="0"/>
-              <a:t> a </a:t>
-            </a:r>
-            <a:r>
-              <a:rPr lang="en-GB" dirty="0" err="1" smtClean="0"/>
-              <a:t>WorkerRole</a:t>
-            </a:r>
-            <a:r>
-              <a:rPr lang="en-GB" baseline="0" dirty="0" smtClean="0"/>
-              <a:t> is hosted in its own VM, so any resource heavy tasks wont affect the Website. This also means it can scale independently of a </a:t>
-            </a:r>
-            <a:r>
-              <a:rPr lang="en-GB" baseline="0" dirty="0" err="1" smtClean="0"/>
-              <a:t>WebApp</a:t>
-            </a:r>
-            <a:r>
-              <a:rPr lang="en-GB" baseline="0" dirty="0" smtClean="0"/>
-              <a:t> or Web Role. </a:t>
+              <a:rPr lang="en-GB" b="1" baseline="0" dirty="0" smtClean="0"/>
+              <a:t>Worker Roles</a:t>
+            </a:r>
+            <a:r>
+              <a:rPr lang="en-GB" baseline="0" dirty="0" smtClean="0"/>
+              <a:t>, which are part of the Cloud Services service. Like a Web Role a Worker Role has an entry point class, which as a number of events that are triggered.</a:t>
             </a:r>
             <a:endParaRPr lang="en-GB" dirty="0" smtClean="0"/>
-          </a:p>
-          <a:p>
-            <a:endParaRPr lang="en-GB" baseline="0" dirty="0" smtClean="0"/>
-          </a:p>
-          <a:p>
-            <a:endParaRPr lang="en-GB" baseline="0" dirty="0" smtClean="0"/>
           </a:p>
           <a:p>
             <a:endParaRPr lang="en-GB" baseline="0" dirty="0" smtClean="0"/>
@@ -2911,7 +2786,7 @@
     </p:spTree>
     <p:extLst>
       <p:ext uri="{BB962C8B-B14F-4D97-AF65-F5344CB8AC3E}">
-        <p14:creationId xmlns:p14="http://schemas.microsoft.com/office/powerpoint/2010/main" val="2757543137"/>
+        <p14:creationId xmlns:p14="http://schemas.microsoft.com/office/powerpoint/2010/main" val="3640884441"/>
       </p:ext>
     </p:extLst>
   </p:cSld>
@@ -2965,21 +2840,166 @@
           <a:bodyPr/>
           <a:lstStyle/>
           <a:p>
-            <a:r>
-              <a:rPr lang="en-GB" baseline="0" dirty="0" smtClean="0"/>
-              <a:t>Worker Roles still has a </a:t>
+            <a:pPr marL="171450" indent="-171450">
+              <a:buFont typeface="Arial" panose="020B0604020202020204" pitchFamily="34" charset="0"/>
+              <a:buChar char="•"/>
+            </a:pPr>
+            <a:r>
+              <a:rPr lang="en-GB" dirty="0" smtClean="0"/>
+              <a:t>Put simply,</a:t>
+            </a:r>
+            <a:r>
+              <a:rPr lang="en-GB" baseline="0" dirty="0" smtClean="0"/>
+              <a:t> if you are able to run a script or a program on your local computer you can run it on Azure. All you need to do is upload it.</a:t>
+            </a:r>
+          </a:p>
+          <a:p>
+            <a:pPr marL="171450" indent="-171450">
+              <a:buFont typeface="Arial" panose="020B0604020202020204" pitchFamily="34" charset="0"/>
+              <a:buChar char="•"/>
+            </a:pPr>
+            <a:r>
+              <a:rPr lang="en-GB" baseline="0" dirty="0" smtClean="0"/>
+              <a:t>There are lot of scripts and programs which are supported. </a:t>
+            </a:r>
+          </a:p>
+          <a:p>
+            <a:pPr marL="171450" indent="-171450">
+              <a:buFont typeface="Arial" panose="020B0604020202020204" pitchFamily="34" charset="0"/>
+              <a:buChar char="•"/>
+            </a:pPr>
+            <a:r>
+              <a:rPr lang="en-GB" dirty="0" smtClean="0"/>
+              <a:t>As they are built in</a:t>
+            </a:r>
+            <a:r>
+              <a:rPr lang="en-GB" baseline="0" dirty="0" smtClean="0"/>
+              <a:t> to the </a:t>
             </a:r>
             <a:r>
               <a:rPr lang="en-GB" baseline="0" dirty="0" err="1" smtClean="0"/>
-              <a:t>RoleEntryPoint</a:t>
-            </a:r>
-            <a:r>
-              <a:rPr lang="en-GB" baseline="0" dirty="0" smtClean="0"/>
-              <a:t> class and the Service Configuration project, but we don’t have the ASP.NET that we had earlier.</a:t>
-            </a:r>
-          </a:p>
-          <a:p>
-            <a:endParaRPr lang="en-GB" baseline="0" dirty="0" smtClean="0"/>
+              <a:t>WebApps</a:t>
+            </a:r>
+            <a:r>
+              <a:rPr lang="en-GB" baseline="0" dirty="0" smtClean="0"/>
+              <a:t> service </a:t>
+            </a:r>
+            <a:r>
+              <a:rPr lang="en-GB" baseline="0" dirty="0" err="1" smtClean="0"/>
+              <a:t>WebJobs</a:t>
+            </a:r>
+            <a:r>
+              <a:rPr lang="en-GB" baseline="0" dirty="0" smtClean="0"/>
+              <a:t> get all the feature </a:t>
+            </a:r>
+            <a:r>
+              <a:rPr lang="en-GB" baseline="0" dirty="0" err="1" smtClean="0"/>
+              <a:t>WebApps</a:t>
+            </a:r>
+            <a:r>
+              <a:rPr lang="en-GB" baseline="0" dirty="0" smtClean="0"/>
+              <a:t> do, </a:t>
+            </a:r>
+            <a:r>
+              <a:rPr lang="en-GB" baseline="0" dirty="0" err="1" smtClean="0"/>
+              <a:t>WebJobs</a:t>
+            </a:r>
+            <a:r>
+              <a:rPr lang="en-GB" baseline="0" dirty="0" smtClean="0"/>
+              <a:t> also share the same instance resources as you </a:t>
+            </a:r>
+            <a:r>
+              <a:rPr lang="en-GB" baseline="0" dirty="0" err="1" smtClean="0"/>
+              <a:t>WebApp</a:t>
+            </a:r>
+            <a:r>
+              <a:rPr lang="en-GB" baseline="0" dirty="0" smtClean="0"/>
+              <a:t>.</a:t>
+            </a:r>
+          </a:p>
+          <a:p>
+            <a:pPr marL="171450" indent="-171450">
+              <a:buFont typeface="Arial" panose="020B0604020202020204" pitchFamily="34" charset="0"/>
+              <a:buChar char="•"/>
+            </a:pPr>
+            <a:r>
+              <a:rPr lang="en-GB" baseline="0" dirty="0" smtClean="0"/>
+              <a:t>The </a:t>
+            </a:r>
+            <a:r>
+              <a:rPr lang="en-GB" baseline="0" dirty="0" err="1" smtClean="0"/>
+              <a:t>WebJobs</a:t>
+            </a:r>
+            <a:r>
+              <a:rPr lang="en-GB" baseline="0" dirty="0" smtClean="0"/>
+              <a:t> SDK makes working with over Azure service, such as Blob &amp; table storage, Queues and Service Bus, a breeze.</a:t>
+            </a:r>
+          </a:p>
+          <a:p>
+            <a:pPr marL="171450" indent="-171450">
+              <a:buFont typeface="Arial" panose="020B0604020202020204" pitchFamily="34" charset="0"/>
+              <a:buChar char="•"/>
+            </a:pPr>
+            <a:r>
+              <a:rPr lang="en-GB" baseline="0" dirty="0" smtClean="0"/>
+              <a:t>Because </a:t>
+            </a:r>
+            <a:r>
+              <a:rPr lang="en-GB" baseline="0" dirty="0" err="1" smtClean="0"/>
+              <a:t>WebJobs</a:t>
+            </a:r>
+            <a:r>
+              <a:rPr lang="en-GB" baseline="0" dirty="0" smtClean="0"/>
+              <a:t> are on the same server instance as your </a:t>
+            </a:r>
+            <a:r>
+              <a:rPr lang="en-GB" baseline="0" dirty="0" err="1" smtClean="0"/>
+              <a:t>WebApp</a:t>
+            </a:r>
+            <a:r>
+              <a:rPr lang="en-GB" baseline="0" dirty="0" smtClean="0"/>
+              <a:t>, it means </a:t>
+            </a:r>
+            <a:r>
+              <a:rPr lang="en-GB" baseline="0" dirty="0" err="1" smtClean="0"/>
+              <a:t>WebApp</a:t>
+            </a:r>
+            <a:r>
+              <a:rPr lang="en-GB" baseline="0" dirty="0" smtClean="0"/>
+              <a:t> and </a:t>
+            </a:r>
+            <a:r>
+              <a:rPr lang="en-GB" baseline="0" dirty="0" err="1" smtClean="0"/>
+              <a:t>WebJob</a:t>
+            </a:r>
+            <a:r>
+              <a:rPr lang="en-GB" baseline="0" dirty="0" smtClean="0"/>
+              <a:t> scale together. If your </a:t>
+            </a:r>
+            <a:r>
+              <a:rPr lang="en-GB" baseline="0" dirty="0" err="1" smtClean="0"/>
+              <a:t>WebApp</a:t>
+            </a:r>
+            <a:r>
+              <a:rPr lang="en-GB" baseline="0" dirty="0" smtClean="0"/>
+              <a:t> trigger an </a:t>
+            </a:r>
+            <a:r>
+              <a:rPr lang="en-GB" baseline="0" dirty="0" err="1" smtClean="0"/>
+              <a:t>autoscale</a:t>
+            </a:r>
+            <a:r>
+              <a:rPr lang="en-GB" baseline="0" dirty="0" smtClean="0"/>
+              <a:t> event your </a:t>
+            </a:r>
+            <a:r>
+              <a:rPr lang="en-GB" baseline="0" dirty="0" err="1" smtClean="0"/>
+              <a:t>WebJob</a:t>
+            </a:r>
+            <a:r>
+              <a:rPr lang="en-GB" baseline="0" dirty="0" smtClean="0"/>
+              <a:t> will scale out with the App.</a:t>
+            </a:r>
           </a:p>
         </p:txBody>
       </p:sp>
@@ -3009,7 +3029,7 @@
     </p:spTree>
     <p:extLst>
       <p:ext uri="{BB962C8B-B14F-4D97-AF65-F5344CB8AC3E}">
-        <p14:creationId xmlns:p14="http://schemas.microsoft.com/office/powerpoint/2010/main" val="251820965"/>
+        <p14:creationId xmlns:p14="http://schemas.microsoft.com/office/powerpoint/2010/main" val="2191421544"/>
       </p:ext>
     </p:extLst>
   </p:cSld>
@@ -3065,24 +3085,7 @@
           <a:p>
             <a:r>
               <a:rPr lang="en-GB" baseline="0" dirty="0" smtClean="0"/>
-              <a:t>Here I have modified the class to write some text out every 5 seconds using a Timer event. It is not spectacular but it shows how the Worker Role creates and sets up the Timer in the </a:t>
-            </a:r>
-            <a:r>
-              <a:rPr lang="en-GB" baseline="0" dirty="0" err="1" smtClean="0"/>
-              <a:t>OnStart</a:t>
-            </a:r>
-            <a:r>
-              <a:rPr lang="en-GB" baseline="0" dirty="0" smtClean="0"/>
-              <a:t> method. Then Starts the timer in the Run method.</a:t>
-            </a:r>
-          </a:p>
-          <a:p>
-            <a:endParaRPr lang="en-GB" baseline="0" dirty="0" smtClean="0"/>
-          </a:p>
-          <a:p>
-            <a:r>
-              <a:rPr lang="en-GB" baseline="0" dirty="0" smtClean="0"/>
-              <a:t>While both </a:t>
+              <a:t>Worker Roles can be thought of the </a:t>
             </a:r>
             <a:r>
               <a:rPr lang="en-GB" baseline="0" dirty="0" err="1" smtClean="0"/>
@@ -3090,87 +3093,63 @@
             </a:r>
             <a:r>
               <a:rPr lang="en-GB" baseline="0" dirty="0" smtClean="0"/>
-              <a:t> and Worker Roles are able to process background tasks. </a:t>
-            </a:r>
-          </a:p>
-          <a:p>
+              <a:t> powerlifting big brother. Worker Roles are part of the Cloud Services service, which Web Roles are part of too.</a:t>
+            </a:r>
+          </a:p>
+          <a:p>
+            <a:pPr marL="171450" indent="-171450">
+              <a:buFont typeface="Arial" panose="020B0604020202020204" pitchFamily="34" charset="0"/>
+              <a:buChar char="•"/>
+            </a:pPr>
+            <a:r>
+              <a:rPr lang="en-GB" baseline="0" dirty="0" smtClean="0"/>
+              <a:t>So all the features a Web Role has a Worker Role has. The difference between a Web Role and a Worker role is that Worker Roles are not hosted in IIS so cannot contain one or more web applications. A Worker Role </a:t>
+            </a:r>
+            <a:r>
+              <a:rPr lang="en-GB" dirty="0" smtClean="0"/>
+              <a:t>can be thought of as Windows services that execute background tasks but in the cloud.</a:t>
+            </a:r>
+          </a:p>
+          <a:p>
+            <a:pPr marL="171450" indent="-171450">
+              <a:buFont typeface="Arial" panose="020B0604020202020204" pitchFamily="34" charset="0"/>
+              <a:buChar char="•"/>
+            </a:pPr>
+            <a:r>
+              <a:rPr lang="en-GB" dirty="0" smtClean="0"/>
+              <a:t>Unlike a </a:t>
+            </a:r>
+            <a:r>
+              <a:rPr lang="en-GB" dirty="0" err="1" smtClean="0"/>
+              <a:t>WebJob</a:t>
+            </a:r>
+            <a:r>
+              <a:rPr lang="en-GB" dirty="0" smtClean="0"/>
+              <a:t> a </a:t>
+            </a:r>
+            <a:r>
+              <a:rPr lang="en-GB" dirty="0" err="1" smtClean="0"/>
+              <a:t>WorkerRole</a:t>
+            </a:r>
+            <a:r>
+              <a:rPr lang="en-GB" baseline="0" dirty="0" smtClean="0"/>
+              <a:t> is hosted in its own VM, so any resource heavy tasks wont affect the Website. This also means it can scale independently of a </a:t>
+            </a:r>
             <a:r>
               <a:rPr lang="en-GB" baseline="0" dirty="0" err="1" smtClean="0"/>
-              <a:t>WebJobs</a:t>
-            </a:r>
-            <a:r>
-              <a:rPr lang="en-GB" baseline="0" dirty="0" smtClean="0"/>
-              <a:t> can only do one thing, you would have to deploy many different </a:t>
-            </a:r>
-            <a:r>
-              <a:rPr lang="en-GB" baseline="0" dirty="0" err="1" smtClean="0"/>
-              <a:t>WebJobs</a:t>
-            </a:r>
-            <a:r>
-              <a:rPr lang="en-GB" baseline="0" dirty="0" smtClean="0"/>
-              <a:t> to process different tasks.</a:t>
-            </a:r>
-          </a:p>
-          <a:p>
-            <a:r>
-              <a:rPr lang="en-GB" baseline="0" dirty="0" smtClean="0"/>
-              <a:t>If you required additional software installed to complete a task, a Worker Role would be the only choice as you can RDP into a Worker Role but you cannot on a </a:t>
-            </a:r>
-            <a:r>
-              <a:rPr lang="en-GB" baseline="0" dirty="0" err="1" smtClean="0"/>
-              <a:t>WebJob</a:t>
-            </a:r>
-            <a:r>
-              <a:rPr lang="en-GB" baseline="0" dirty="0" smtClean="0"/>
-              <a:t>.</a:t>
-            </a:r>
-          </a:p>
-          <a:p>
-            <a:r>
-              <a:rPr lang="en-GB" baseline="0" dirty="0" smtClean="0"/>
-              <a:t>If your objective is to run scheduled jobs only using the libraries available in </a:t>
-            </a:r>
-            <a:r>
-              <a:rPr lang="en-GB" baseline="0" dirty="0" err="1" smtClean="0"/>
-              <a:t>.Net</a:t>
-            </a:r>
-            <a:r>
-              <a:rPr lang="en-GB" baseline="0" dirty="0" smtClean="0"/>
-              <a:t> then a </a:t>
-            </a:r>
-            <a:r>
-              <a:rPr lang="en-GB" baseline="0" dirty="0" err="1" smtClean="0"/>
-              <a:t>WebJob</a:t>
-            </a:r>
-            <a:r>
-              <a:rPr lang="en-GB" baseline="0" dirty="0" smtClean="0"/>
-              <a:t> would be the correct choice.</a:t>
-            </a:r>
+              <a:t>WebApp</a:t>
+            </a:r>
+            <a:r>
+              <a:rPr lang="en-GB" baseline="0" dirty="0" smtClean="0"/>
+              <a:t> or Web Role. </a:t>
+            </a:r>
+            <a:endParaRPr lang="en-GB" dirty="0" smtClean="0"/>
           </a:p>
           <a:p>
             <a:endParaRPr lang="en-GB" baseline="0" dirty="0" smtClean="0"/>
           </a:p>
           <a:p>
-            <a:r>
-              <a:rPr lang="en-GB" baseline="0" dirty="0" smtClean="0"/>
-              <a:t>In my opinion I would start off with a </a:t>
-            </a:r>
-            <a:r>
-              <a:rPr lang="en-GB" baseline="0" dirty="0" err="1" smtClean="0"/>
-              <a:t>WebJob</a:t>
-            </a:r>
-            <a:r>
-              <a:rPr lang="en-GB" baseline="0" dirty="0" smtClean="0"/>
-              <a:t> as they are easy to setup and deploy. They also scale really well and are cheap. If you find in the future that </a:t>
-            </a:r>
-            <a:r>
-              <a:rPr lang="en-GB" baseline="0" dirty="0" err="1" smtClean="0"/>
-              <a:t>WebJobs</a:t>
-            </a:r>
-            <a:r>
-              <a:rPr lang="en-GB" baseline="0" dirty="0" smtClean="0"/>
-              <a:t> are suboptimal for whatever you are doing you can move over to a Worker Role.</a:t>
-            </a:r>
+            <a:endParaRPr lang="en-GB" baseline="0" dirty="0" smtClean="0"/>
           </a:p>
           <a:p>
             <a:endParaRPr lang="en-GB" baseline="0" dirty="0" smtClean="0"/>
@@ -3195,6 +3174,298 @@
             <a:fld id="{F9DCBFB8-3C0D-4265-9EBB-AF74934A7B39}" type="slidenum">
               <a:rPr lang="en-GB" smtClean="0"/>
               <a:t>24</a:t>
+            </a:fld>
+            <a:endParaRPr lang="en-GB"/>
+          </a:p>
+        </p:txBody>
+      </p:sp>
+    </p:spTree>
+    <p:extLst>
+      <p:ext uri="{BB962C8B-B14F-4D97-AF65-F5344CB8AC3E}">
+        <p14:creationId xmlns:p14="http://schemas.microsoft.com/office/powerpoint/2010/main" val="2757543137"/>
+      </p:ext>
+    </p:extLst>
+  </p:cSld>
+  <p:clrMapOvr>
+    <a:masterClrMapping/>
+  </p:clrMapOvr>
+</p:notes>
+</file>
+
+<file path=ppt/notesSlides/notesSlide25.xml><?xml version="1.0" encoding="utf-8"?>
+<p:notes xmlns:a="http://schemas.openxmlformats.org/drawingml/2006/main" xmlns:r="http://schemas.openxmlformats.org/officeDocument/2006/relationships" xmlns:p="http://schemas.openxmlformats.org/presentationml/2006/main">
+  <p:cSld>
+    <p:spTree>
+      <p:nvGrpSpPr>
+        <p:cNvPr id="1" name=""/>
+        <p:cNvGrpSpPr/>
+        <p:nvPr/>
+      </p:nvGrpSpPr>
+      <p:grpSpPr>
+        <a:xfrm>
+          <a:off x="0" y="0"/>
+          <a:ext cx="0" cy="0"/>
+          <a:chOff x="0" y="0"/>
+          <a:chExt cx="0" cy="0"/>
+        </a:xfrm>
+      </p:grpSpPr>
+      <p:sp>
+        <p:nvSpPr>
+          <p:cNvPr id="2" name="Slide Image Placeholder 1"/>
+          <p:cNvSpPr>
+            <a:spLocks noGrp="1" noRot="1" noChangeAspect="1"/>
+          </p:cNvSpPr>
+          <p:nvPr>
+            <p:ph type="sldImg"/>
+          </p:nvPr>
+        </p:nvSpPr>
+        <p:spPr/>
+      </p:sp>
+      <p:sp>
+        <p:nvSpPr>
+          <p:cNvPr id="3" name="Notes Placeholder 2"/>
+          <p:cNvSpPr>
+            <a:spLocks noGrp="1"/>
+          </p:cNvSpPr>
+          <p:nvPr>
+            <p:ph type="body" idx="1"/>
+          </p:nvPr>
+        </p:nvSpPr>
+        <p:spPr/>
+        <p:txBody>
+          <a:bodyPr/>
+          <a:lstStyle/>
+          <a:p>
+            <a:r>
+              <a:rPr lang="en-GB" baseline="0" dirty="0" smtClean="0"/>
+              <a:t>Worker Roles still has a </a:t>
+            </a:r>
+            <a:r>
+              <a:rPr lang="en-GB" baseline="0" dirty="0" err="1" smtClean="0"/>
+              <a:t>RoleEntryPoint</a:t>
+            </a:r>
+            <a:r>
+              <a:rPr lang="en-GB" baseline="0" dirty="0" smtClean="0"/>
+              <a:t> class and the Service Configuration project, but we don’t have the ASP.NET that we had earlier.</a:t>
+            </a:r>
+          </a:p>
+          <a:p>
+            <a:endParaRPr lang="en-GB" baseline="0" dirty="0" smtClean="0"/>
+          </a:p>
+        </p:txBody>
+      </p:sp>
+      <p:sp>
+        <p:nvSpPr>
+          <p:cNvPr id="4" name="Slide Number Placeholder 3"/>
+          <p:cNvSpPr>
+            <a:spLocks noGrp="1"/>
+          </p:cNvSpPr>
+          <p:nvPr>
+            <p:ph type="sldNum" sz="quarter" idx="10"/>
+          </p:nvPr>
+        </p:nvSpPr>
+        <p:spPr/>
+        <p:txBody>
+          <a:bodyPr/>
+          <a:lstStyle/>
+          <a:p>
+            <a:fld id="{F9DCBFB8-3C0D-4265-9EBB-AF74934A7B39}" type="slidenum">
+              <a:rPr lang="en-GB" smtClean="0"/>
+              <a:t>25</a:t>
+            </a:fld>
+            <a:endParaRPr lang="en-GB"/>
+          </a:p>
+        </p:txBody>
+      </p:sp>
+    </p:spTree>
+    <p:extLst>
+      <p:ext uri="{BB962C8B-B14F-4D97-AF65-F5344CB8AC3E}">
+        <p14:creationId xmlns:p14="http://schemas.microsoft.com/office/powerpoint/2010/main" val="251820965"/>
+      </p:ext>
+    </p:extLst>
+  </p:cSld>
+  <p:clrMapOvr>
+    <a:masterClrMapping/>
+  </p:clrMapOvr>
+</p:notes>
+</file>
+
+<file path=ppt/notesSlides/notesSlide26.xml><?xml version="1.0" encoding="utf-8"?>
+<p:notes xmlns:a="http://schemas.openxmlformats.org/drawingml/2006/main" xmlns:r="http://schemas.openxmlformats.org/officeDocument/2006/relationships" xmlns:p="http://schemas.openxmlformats.org/presentationml/2006/main">
+  <p:cSld>
+    <p:spTree>
+      <p:nvGrpSpPr>
+        <p:cNvPr id="1" name=""/>
+        <p:cNvGrpSpPr/>
+        <p:nvPr/>
+      </p:nvGrpSpPr>
+      <p:grpSpPr>
+        <a:xfrm>
+          <a:off x="0" y="0"/>
+          <a:ext cx="0" cy="0"/>
+          <a:chOff x="0" y="0"/>
+          <a:chExt cx="0" cy="0"/>
+        </a:xfrm>
+      </p:grpSpPr>
+      <p:sp>
+        <p:nvSpPr>
+          <p:cNvPr id="2" name="Slide Image Placeholder 1"/>
+          <p:cNvSpPr>
+            <a:spLocks noGrp="1" noRot="1" noChangeAspect="1"/>
+          </p:cNvSpPr>
+          <p:nvPr>
+            <p:ph type="sldImg"/>
+          </p:nvPr>
+        </p:nvSpPr>
+        <p:spPr/>
+      </p:sp>
+      <p:sp>
+        <p:nvSpPr>
+          <p:cNvPr id="3" name="Notes Placeholder 2"/>
+          <p:cNvSpPr>
+            <a:spLocks noGrp="1"/>
+          </p:cNvSpPr>
+          <p:nvPr>
+            <p:ph type="body" idx="1"/>
+          </p:nvPr>
+        </p:nvSpPr>
+        <p:spPr/>
+        <p:txBody>
+          <a:bodyPr/>
+          <a:lstStyle/>
+          <a:p>
+            <a:r>
+              <a:rPr lang="en-GB" baseline="0" dirty="0" smtClean="0"/>
+              <a:t>Here I have modified the class to write some text out every 5 seconds using a Timer event. It is not spectacular but it shows how the Worker Role creates and sets up the Timer in the </a:t>
+            </a:r>
+            <a:r>
+              <a:rPr lang="en-GB" baseline="0" dirty="0" err="1" smtClean="0"/>
+              <a:t>OnStart</a:t>
+            </a:r>
+            <a:r>
+              <a:rPr lang="en-GB" baseline="0" dirty="0" smtClean="0"/>
+              <a:t> method. Then Starts the timer in the Run method.</a:t>
+            </a:r>
+          </a:p>
+          <a:p>
+            <a:endParaRPr lang="en-GB" baseline="0" dirty="0" smtClean="0"/>
+          </a:p>
+          <a:p>
+            <a:r>
+              <a:rPr lang="en-GB" baseline="0" dirty="0" smtClean="0"/>
+              <a:t>While both </a:t>
+            </a:r>
+            <a:r>
+              <a:rPr lang="en-GB" baseline="0" dirty="0" err="1" smtClean="0"/>
+              <a:t>WebJobs</a:t>
+            </a:r>
+            <a:r>
+              <a:rPr lang="en-GB" baseline="0" dirty="0" smtClean="0"/>
+              <a:t> and Worker Roles are able to process background tasks. </a:t>
+            </a:r>
+          </a:p>
+          <a:p>
+            <a:r>
+              <a:rPr lang="en-GB" baseline="0" dirty="0" err="1" smtClean="0"/>
+              <a:t>WebJobs</a:t>
+            </a:r>
+            <a:r>
+              <a:rPr lang="en-GB" baseline="0" dirty="0" smtClean="0"/>
+              <a:t> can only do one thing, you would have to deploy many different </a:t>
+            </a:r>
+            <a:r>
+              <a:rPr lang="en-GB" baseline="0" dirty="0" err="1" smtClean="0"/>
+              <a:t>WebJobs</a:t>
+            </a:r>
+            <a:r>
+              <a:rPr lang="en-GB" baseline="0" dirty="0" smtClean="0"/>
+              <a:t> to process different tasks.</a:t>
+            </a:r>
+          </a:p>
+          <a:p>
+            <a:r>
+              <a:rPr lang="en-GB" baseline="0" dirty="0" smtClean="0"/>
+              <a:t>If you required additional software installed to complete a task, a Worker Role would be the only choice as you can RDP into a Worker Role but you cannot on a </a:t>
+            </a:r>
+            <a:r>
+              <a:rPr lang="en-GB" baseline="0" dirty="0" err="1" smtClean="0"/>
+              <a:t>WebJob</a:t>
+            </a:r>
+            <a:r>
+              <a:rPr lang="en-GB" baseline="0" dirty="0" smtClean="0"/>
+              <a:t>.</a:t>
+            </a:r>
+          </a:p>
+          <a:p>
+            <a:r>
+              <a:rPr lang="en-GB" baseline="0" dirty="0" smtClean="0"/>
+              <a:t>If your objective is to run scheduled jobs only using the libraries available in </a:t>
+            </a:r>
+            <a:r>
+              <a:rPr lang="en-GB" baseline="0" dirty="0" err="1" smtClean="0"/>
+              <a:t>.Net</a:t>
+            </a:r>
+            <a:r>
+              <a:rPr lang="en-GB" baseline="0" dirty="0" smtClean="0"/>
+              <a:t> then a </a:t>
+            </a:r>
+            <a:r>
+              <a:rPr lang="en-GB" baseline="0" dirty="0" err="1" smtClean="0"/>
+              <a:t>WebJob</a:t>
+            </a:r>
+            <a:r>
+              <a:rPr lang="en-GB" baseline="0" dirty="0" smtClean="0"/>
+              <a:t> would be the correct choice.</a:t>
+            </a:r>
+          </a:p>
+          <a:p>
+            <a:endParaRPr lang="en-GB" baseline="0" dirty="0" smtClean="0"/>
+          </a:p>
+          <a:p>
+            <a:r>
+              <a:rPr lang="en-GB" baseline="0" dirty="0" smtClean="0"/>
+              <a:t>In my opinion I would start off with a </a:t>
+            </a:r>
+            <a:r>
+              <a:rPr lang="en-GB" baseline="0" dirty="0" err="1" smtClean="0"/>
+              <a:t>WebJob</a:t>
+            </a:r>
+            <a:r>
+              <a:rPr lang="en-GB" baseline="0" dirty="0" smtClean="0"/>
+              <a:t> as they are easy to setup and deploy. They also scale really well and are cheap. If you find in the future that </a:t>
+            </a:r>
+            <a:r>
+              <a:rPr lang="en-GB" baseline="0" dirty="0" err="1" smtClean="0"/>
+              <a:t>WebJobs</a:t>
+            </a:r>
+            <a:r>
+              <a:rPr lang="en-GB" baseline="0" dirty="0" smtClean="0"/>
+              <a:t> are suboptimal for whatever you are doing you can move over to a Worker Role.</a:t>
+            </a:r>
+          </a:p>
+          <a:p>
+            <a:endParaRPr lang="en-GB" baseline="0" dirty="0" smtClean="0"/>
+          </a:p>
+        </p:txBody>
+      </p:sp>
+      <p:sp>
+        <p:nvSpPr>
+          <p:cNvPr id="4" name="Slide Number Placeholder 3"/>
+          <p:cNvSpPr>
+            <a:spLocks noGrp="1"/>
+          </p:cNvSpPr>
+          <p:nvPr>
+            <p:ph type="sldNum" sz="quarter" idx="10"/>
+          </p:nvPr>
+        </p:nvSpPr>
+        <p:spPr/>
+        <p:txBody>
+          <a:bodyPr/>
+          <a:lstStyle/>
+          <a:p>
+            <a:fld id="{F9DCBFB8-3C0D-4265-9EBB-AF74934A7B39}" type="slidenum">
+              <a:rPr lang="en-GB" smtClean="0"/>
+              <a:t>26</a:t>
             </a:fld>
             <a:endParaRPr lang="en-GB"/>
           </a:p>
@@ -3319,11 +3590,7 @@
             </a:pPr>
             <a:r>
               <a:rPr lang="en-GB" dirty="0" smtClean="0"/>
-              <a:t>Azure </a:t>
-            </a:r>
-            <a:r>
-              <a:rPr lang="en-GB" dirty="0" smtClean="0"/>
-              <a:t>is Microsoft’s entrant to the Cloud computing market.</a:t>
+              <a:t>Azure is Microsoft’s entrant to the Cloud computing market.</a:t>
             </a:r>
           </a:p>
           <a:p>
@@ -3336,15 +3603,7 @@
             </a:r>
             <a:r>
               <a:rPr lang="en-GB" baseline="0" dirty="0" smtClean="0"/>
-              <a:t> provide a lot of services via the Azure platform, each </a:t>
-            </a:r>
-            <a:r>
-              <a:rPr lang="en-GB" baseline="0" dirty="0" smtClean="0"/>
-              <a:t>of the services </a:t>
-            </a:r>
-            <a:r>
-              <a:rPr lang="en-GB" baseline="0" dirty="0" smtClean="0"/>
-              <a:t>will fall into either the Infrastructure-as-a-Service (IaaS) or the Platform-as-a-Service (PaaS) categories.</a:t>
+              <a:t> provide a lot of services via the Azure platform, each of the services will fall into either the Infrastructure-as-a-Service (IaaS) or the Platform-as-a-Service (PaaS) categories.</a:t>
             </a:r>
           </a:p>
           <a:p>
@@ -3361,16 +3620,11 @@
               <a:rPr lang="en-GB" baseline="0" dirty="0" smtClean="0"/>
               <a:t>PaaS gives you access to managed services and software. You don’t have to worry about patching servers or upgrading the software this is done for you. </a:t>
             </a:r>
-            <a:endParaRPr lang="en-GB" baseline="0" dirty="0" smtClean="0"/>
-          </a:p>
-          <a:p>
-            <a:r>
-              <a:rPr lang="en-GB" baseline="0" dirty="0" smtClean="0"/>
-              <a:t>All </a:t>
-            </a:r>
-            <a:r>
-              <a:rPr lang="en-GB" baseline="0" dirty="0" smtClean="0"/>
-              <a:t>of the services I will talk about today come under the PaaS category. </a:t>
+          </a:p>
+          <a:p>
+            <a:r>
+              <a:rPr lang="en-GB" baseline="0" dirty="0" smtClean="0"/>
+              <a:t>All of the services I will talk about today come under the PaaS category. </a:t>
             </a:r>
             <a:endParaRPr lang="en-GB" dirty="0" smtClean="0"/>
           </a:p>
@@ -3980,11 +4234,7 @@
             </a:pPr>
             <a:r>
               <a:rPr lang="en-GB" dirty="0" smtClean="0"/>
-              <a:t>Web Roles are Web Apps on steroids</a:t>
-            </a:r>
-            <a:r>
-              <a:rPr lang="en-GB" dirty="0" smtClean="0"/>
-              <a:t>.</a:t>
+              <a:t>Web Roles are Web Apps on steroids.</a:t>
             </a:r>
           </a:p>
           <a:p>
@@ -4504,16 +4754,7 @@
                 </a:solidFill>
                 <a:latin typeface="Georgia" panose="02040502050405020303" pitchFamily="18" charset="0"/>
               </a:rPr>
-              <a:t>In </a:t>
-            </a:r>
-            <a:r>
-              <a:rPr lang="en-GB" sz="1200" baseline="0" dirty="0" smtClean="0">
-                <a:solidFill>
-                  <a:srgbClr val="737373"/>
-                </a:solidFill>
-                <a:latin typeface="Georgia" panose="02040502050405020303" pitchFamily="18" charset="0"/>
-              </a:rPr>
-              <a:t>conclusion, most of the time a web site will be the best choice. It is the simplest to setup and fastest to deploy. But if you need multiple sites that are massively scalable that require you to run some sort of start up process then maybe Web Roles are for you. </a:t>
+              <a:t>In conclusion, most of the time a web site will be the best choice. It is the simplest to setup and fastest to deploy. But if you need multiple sites that are massively scalable that require you to run some sort of start up process then maybe Web Roles are for you. </a:t>
             </a:r>
           </a:p>
           <a:p>
@@ -4659,6 +4900,19 @@
           <a:p>
             <a:r>
               <a:rPr lang="en-GB" dirty="0" smtClean="0"/>
+              <a:t>Before</a:t>
+            </a:r>
+            <a:r>
+              <a:rPr lang="en-GB" baseline="0" dirty="0" smtClean="0"/>
+              <a:t> you can start deploying your app, you will probably need to store some data.</a:t>
+            </a:r>
+          </a:p>
+          <a:p>
+            <a:endParaRPr lang="en-GB" dirty="0" smtClean="0"/>
+          </a:p>
+          <a:p>
+            <a:r>
+              <a:rPr lang="en-GB" dirty="0" smtClean="0"/>
               <a:t>Most people are</a:t>
             </a:r>
             <a:r>
@@ -4669,32 +4923,11 @@
           <a:p>
             <a:r>
               <a:rPr lang="en-GB" baseline="0" dirty="0" smtClean="0"/>
-              <a:t>Some of the common problems I hear are due to relational databases producing suboptimal performance no matter how </a:t>
-            </a:r>
-            <a:r>
-              <a:rPr lang="en-GB" sz="1200" b="0" i="0" kern="1200" dirty="0" smtClean="0">
-                <a:solidFill>
-                  <a:schemeClr val="tx1"/>
-                </a:solidFill>
-                <a:effectLst/>
-                <a:latin typeface="+mn-lt"/>
-                <a:ea typeface="+mn-ea"/>
-                <a:cs typeface="+mn-cs"/>
-              </a:rPr>
-              <a:t>efficient </a:t>
-            </a:r>
-            <a:r>
-              <a:rPr lang="en-GB" baseline="0" dirty="0" smtClean="0"/>
-              <a:t>the query is and being expensive to licence.</a:t>
-            </a:r>
-          </a:p>
-          <a:p>
-            <a:endParaRPr lang="en-GB" baseline="0" dirty="0" smtClean="0"/>
-          </a:p>
-          <a:p>
-            <a:r>
-              <a:rPr lang="en-GB" baseline="0" dirty="0" smtClean="0"/>
-              <a:t>A NoSQL data store may have solved their problems, as they can handle tasks better than a relational data store. But it would be stupid to suggest that a NoSQL database can do everything well.</a:t>
+              <a:t>A </a:t>
+            </a:r>
+            <a:r>
+              <a:rPr lang="en-GB" baseline="0" dirty="0" smtClean="0"/>
+              <a:t>good developer uses the right tool for the job, so lets have a look at what tools Azure provides.</a:t>
             </a:r>
             <a:endParaRPr lang="en-GB" dirty="0"/>
           </a:p>
@@ -4782,11 +5015,19 @@
           <a:p>
             <a:r>
               <a:rPr lang="en-GB" dirty="0" smtClean="0"/>
-              <a:t>Most data store technologies will fall into one of these</a:t>
-            </a:r>
-            <a:r>
-              <a:rPr lang="en-GB" baseline="0" dirty="0" smtClean="0"/>
-              <a:t> families.</a:t>
+              <a:t>Most data store technologies will fall into one of </a:t>
+            </a:r>
+            <a:r>
+              <a:rPr lang="en-GB" dirty="0" smtClean="0"/>
+              <a:t>5 </a:t>
+            </a:r>
+            <a:r>
+              <a:rPr lang="en-GB" baseline="0" dirty="0" smtClean="0"/>
+              <a:t>families</a:t>
+            </a:r>
+            <a:r>
+              <a:rPr lang="en-GB" baseline="0" dirty="0" smtClean="0"/>
+              <a:t>.</a:t>
             </a:r>
           </a:p>
           <a:p>
@@ -5003,7 +5244,7 @@
           <a:p>
             <a:fld id="{8A04FFFD-6AAA-4290-B9C8-6140E8302CD5}" type="datetimeFigureOut">
               <a:rPr lang="en-GB" smtClean="0"/>
-              <a:t>14/10/2015</a:t>
+              <a:t>19/10/2015</a:t>
             </a:fld>
             <a:endParaRPr lang="en-GB"/>
           </a:p>
@@ -5173,7 +5414,7 @@
           <a:p>
             <a:fld id="{8A04FFFD-6AAA-4290-B9C8-6140E8302CD5}" type="datetimeFigureOut">
               <a:rPr lang="en-GB" smtClean="0"/>
-              <a:t>14/10/2015</a:t>
+              <a:t>19/10/2015</a:t>
             </a:fld>
             <a:endParaRPr lang="en-GB"/>
           </a:p>
@@ -5353,7 +5594,7 @@
           <a:p>
             <a:fld id="{8A04FFFD-6AAA-4290-B9C8-6140E8302CD5}" type="datetimeFigureOut">
               <a:rPr lang="en-GB" smtClean="0"/>
-              <a:t>14/10/2015</a:t>
+              <a:t>19/10/2015</a:t>
             </a:fld>
             <a:endParaRPr lang="en-GB"/>
           </a:p>
@@ -6450,7 +6691,7 @@
           <a:p>
             <a:fld id="{8A04FFFD-6AAA-4290-B9C8-6140E8302CD5}" type="datetimeFigureOut">
               <a:rPr lang="en-GB" smtClean="0"/>
-              <a:t>14/10/2015</a:t>
+              <a:t>19/10/2015</a:t>
             </a:fld>
             <a:endParaRPr lang="en-GB"/>
           </a:p>
@@ -6694,7 +6935,7 @@
           <a:p>
             <a:fld id="{8A04FFFD-6AAA-4290-B9C8-6140E8302CD5}" type="datetimeFigureOut">
               <a:rPr lang="en-GB" smtClean="0"/>
-              <a:t>14/10/2015</a:t>
+              <a:t>19/10/2015</a:t>
             </a:fld>
             <a:endParaRPr lang="en-GB"/>
           </a:p>
@@ -6926,7 +7167,7 @@
           <a:p>
             <a:fld id="{8A04FFFD-6AAA-4290-B9C8-6140E8302CD5}" type="datetimeFigureOut">
               <a:rPr lang="en-GB" smtClean="0"/>
-              <a:t>14/10/2015</a:t>
+              <a:t>19/10/2015</a:t>
             </a:fld>
             <a:endParaRPr lang="en-GB"/>
           </a:p>
@@ -7293,7 +7534,7 @@
           <a:p>
             <a:fld id="{8A04FFFD-6AAA-4290-B9C8-6140E8302CD5}" type="datetimeFigureOut">
               <a:rPr lang="en-GB" smtClean="0"/>
-              <a:t>14/10/2015</a:t>
+              <a:t>19/10/2015</a:t>
             </a:fld>
             <a:endParaRPr lang="en-GB"/>
           </a:p>
@@ -7411,7 +7652,7 @@
           <a:p>
             <a:fld id="{8A04FFFD-6AAA-4290-B9C8-6140E8302CD5}" type="datetimeFigureOut">
               <a:rPr lang="en-GB" smtClean="0"/>
-              <a:t>14/10/2015</a:t>
+              <a:t>19/10/2015</a:t>
             </a:fld>
             <a:endParaRPr lang="en-GB"/>
           </a:p>
@@ -7506,7 +7747,7 @@
           <a:p>
             <a:fld id="{8A04FFFD-6AAA-4290-B9C8-6140E8302CD5}" type="datetimeFigureOut">
               <a:rPr lang="en-GB" smtClean="0"/>
-              <a:t>14/10/2015</a:t>
+              <a:t>19/10/2015</a:t>
             </a:fld>
             <a:endParaRPr lang="en-GB"/>
           </a:p>
@@ -7783,7 +8024,7 @@
           <a:p>
             <a:fld id="{8A04FFFD-6AAA-4290-B9C8-6140E8302CD5}" type="datetimeFigureOut">
               <a:rPr lang="en-GB" smtClean="0"/>
-              <a:t>14/10/2015</a:t>
+              <a:t>19/10/2015</a:t>
             </a:fld>
             <a:endParaRPr lang="en-GB"/>
           </a:p>
@@ -8040,7 +8281,7 @@
           <a:p>
             <a:fld id="{8A04FFFD-6AAA-4290-B9C8-6140E8302CD5}" type="datetimeFigureOut">
               <a:rPr lang="en-GB" smtClean="0"/>
-              <a:t>14/10/2015</a:t>
+              <a:t>19/10/2015</a:t>
             </a:fld>
             <a:endParaRPr lang="en-GB"/>
           </a:p>
@@ -8262,7 +8503,7 @@
           <a:p>
             <a:fld id="{8A04FFFD-6AAA-4290-B9C8-6140E8302CD5}" type="datetimeFigureOut">
               <a:rPr lang="en-GB" smtClean="0"/>
-              <a:t>14/10/2015</a:t>
+              <a:t>19/10/2015</a:t>
             </a:fld>
             <a:endParaRPr lang="en-GB"/>
           </a:p>
@@ -9692,34 +9933,59 @@
       </p:sp>
       <p:pic>
         <p:nvPicPr>
-          <p:cNvPr id="7" name="Picture 6"/>
+          <p:cNvPr id="2" name="Picture 1"/>
           <p:cNvPicPr>
             <a:picLocks noChangeAspect="1"/>
           </p:cNvPicPr>
           <p:nvPr/>
         </p:nvPicPr>
         <p:blipFill>
-          <a:blip r:embed="rId3">
-            <a:extLst>
-              <a:ext uri="{28A0092B-C50C-407E-A947-70E740481C1C}">
-                <a14:useLocalDpi xmlns:a14="http://schemas.microsoft.com/office/drawing/2010/main" val="0"/>
-              </a:ext>
-            </a:extLst>
-          </a:blip>
+          <a:blip r:embed="rId3"/>
           <a:stretch>
             <a:fillRect/>
           </a:stretch>
         </p:blipFill>
         <p:spPr>
           <a:xfrm>
-            <a:off x="395534" y="2201569"/>
-            <a:ext cx="8352930" cy="3615624"/>
+            <a:off x="1619670" y="1340768"/>
+            <a:ext cx="5904658" cy="5096806"/>
           </a:xfrm>
           <a:prstGeom prst="rect">
             <a:avLst/>
           </a:prstGeom>
         </p:spPr>
       </p:pic>
+      <p:sp>
+        <p:nvSpPr>
+          <p:cNvPr id="3" name="TextBox 2"/>
+          <p:cNvSpPr txBox="1"/>
+          <p:nvPr/>
+        </p:nvSpPr>
+        <p:spPr>
+          <a:xfrm>
+            <a:off x="1619670" y="6437574"/>
+            <a:ext cx="5904658" cy="261610"/>
+          </a:xfrm>
+          <a:prstGeom prst="rect">
+            <a:avLst/>
+          </a:prstGeom>
+          <a:noFill/>
+        </p:spPr>
+        <p:txBody>
+          <a:bodyPr wrap="square" rtlCol="0">
+            <a:spAutoFit/>
+          </a:bodyPr>
+          <a:lstStyle/>
+          <a:p>
+            <a:r>
+              <a:rPr lang="en-GB" sz="1100" dirty="0">
+                <a:latin typeface="+mj-lt"/>
+              </a:rPr>
+              <a:t>https://azure.microsoft.com/en-us/documentation/articles/sql-database-elastic-scale-introduction</a:t>
+            </a:r>
+          </a:p>
+        </p:txBody>
+      </p:sp>
     </p:spTree>
     <p:extLst>
       <p:ext uri="{BB962C8B-B14F-4D97-AF65-F5344CB8AC3E}">
@@ -9854,6 +10120,325 @@
           <a:chExt cx="0" cy="0"/>
         </a:xfrm>
       </p:grpSpPr>
+      <p:sp>
+        <p:nvSpPr>
+          <p:cNvPr id="4" name="Title 3"/>
+          <p:cNvSpPr>
+            <a:spLocks noGrp="1"/>
+          </p:cNvSpPr>
+          <p:nvPr>
+            <p:ph type="title"/>
+          </p:nvPr>
+        </p:nvSpPr>
+        <p:spPr>
+          <a:xfrm>
+            <a:off x="0" y="126000"/>
+            <a:ext cx="9143999" cy="757130"/>
+          </a:xfrm>
+        </p:spPr>
+        <p:txBody>
+          <a:bodyPr anchor="ctr" anchorCtr="1">
+            <a:spAutoFit/>
+          </a:bodyPr>
+          <a:lstStyle/>
+          <a:p>
+            <a:r>
+              <a:rPr lang="en-GB" dirty="0" smtClean="0"/>
+              <a:t>Querying Documents</a:t>
+            </a:r>
+            <a:endParaRPr lang="en-GB" dirty="0"/>
+          </a:p>
+        </p:txBody>
+      </p:sp>
+      <p:pic>
+        <p:nvPicPr>
+          <p:cNvPr id="7" name="Picture 6"/>
+          <p:cNvPicPr>
+            <a:picLocks noChangeAspect="1"/>
+          </p:cNvPicPr>
+          <p:nvPr/>
+        </p:nvPicPr>
+        <p:blipFill>
+          <a:blip r:embed="rId3"/>
+          <a:stretch>
+            <a:fillRect/>
+          </a:stretch>
+        </p:blipFill>
+        <p:spPr>
+          <a:xfrm>
+            <a:off x="1979712" y="1052736"/>
+            <a:ext cx="4680520" cy="4035543"/>
+          </a:xfrm>
+          <a:prstGeom prst="rect">
+            <a:avLst/>
+          </a:prstGeom>
+        </p:spPr>
+      </p:pic>
+      <p:pic>
+        <p:nvPicPr>
+          <p:cNvPr id="8" name="Picture 7"/>
+          <p:cNvPicPr>
+            <a:picLocks noChangeAspect="1"/>
+          </p:cNvPicPr>
+          <p:nvPr/>
+        </p:nvPicPr>
+        <p:blipFill>
+          <a:blip r:embed="rId4"/>
+          <a:stretch>
+            <a:fillRect/>
+          </a:stretch>
+        </p:blipFill>
+        <p:spPr>
+          <a:xfrm>
+            <a:off x="395536" y="5219163"/>
+            <a:ext cx="3456384" cy="1308488"/>
+          </a:xfrm>
+          <a:prstGeom prst="rect">
+            <a:avLst/>
+          </a:prstGeom>
+        </p:spPr>
+      </p:pic>
+      <p:pic>
+        <p:nvPicPr>
+          <p:cNvPr id="9" name="Picture 8"/>
+          <p:cNvPicPr>
+            <a:picLocks noChangeAspect="1"/>
+          </p:cNvPicPr>
+          <p:nvPr/>
+        </p:nvPicPr>
+        <p:blipFill>
+          <a:blip r:embed="rId5"/>
+          <a:stretch>
+            <a:fillRect/>
+          </a:stretch>
+        </p:blipFill>
+        <p:spPr>
+          <a:xfrm>
+            <a:off x="4788024" y="5219163"/>
+            <a:ext cx="3711176" cy="1307461"/>
+          </a:xfrm>
+          <a:prstGeom prst="rect">
+            <a:avLst/>
+          </a:prstGeom>
+        </p:spPr>
+      </p:pic>
+    </p:spTree>
+    <p:extLst>
+      <p:ext uri="{BB962C8B-B14F-4D97-AF65-F5344CB8AC3E}">
+        <p14:creationId xmlns:p14="http://schemas.microsoft.com/office/powerpoint/2010/main" val="42728359"/>
+      </p:ext>
+    </p:extLst>
+  </p:cSld>
+  <p:clrMapOvr>
+    <a:masterClrMapping/>
+  </p:clrMapOvr>
+  <p:timing>
+    <p:tnLst>
+      <p:par>
+        <p:cTn id="1" dur="indefinite" restart="never" nodeType="tmRoot">
+          <p:childTnLst>
+            <p:seq concurrent="1" nextAc="seek">
+              <p:cTn id="2" dur="indefinite" nodeType="mainSeq">
+                <p:childTnLst>
+                  <p:par>
+                    <p:cTn id="3" fill="hold">
+                      <p:stCondLst>
+                        <p:cond delay="indefinite"/>
+                      </p:stCondLst>
+                      <p:childTnLst>
+                        <p:par>
+                          <p:cTn id="4" fill="hold">
+                            <p:stCondLst>
+                              <p:cond delay="0"/>
+                            </p:stCondLst>
+                            <p:childTnLst>
+                              <p:par>
+                                <p:cTn id="5" presetID="1" presetClass="entr" presetSubtype="0" fill="hold" nodeType="clickEffect">
+                                  <p:stCondLst>
+                                    <p:cond delay="0"/>
+                                  </p:stCondLst>
+                                  <p:childTnLst>
+                                    <p:set>
+                                      <p:cBhvr>
+                                        <p:cTn id="6" dur="1" fill="hold">
+                                          <p:stCondLst>
+                                            <p:cond delay="0"/>
+                                          </p:stCondLst>
+                                        </p:cTn>
+                                        <p:tgtEl>
+                                          <p:spTgt spid="8"/>
+                                        </p:tgtEl>
+                                        <p:attrNameLst>
+                                          <p:attrName>style.visibility</p:attrName>
+                                        </p:attrNameLst>
+                                      </p:cBhvr>
+                                      <p:to>
+                                        <p:strVal val="visible"/>
+                                      </p:to>
+                                    </p:set>
+                                  </p:childTnLst>
+                                </p:cTn>
+                              </p:par>
+                            </p:childTnLst>
+                          </p:cTn>
+                        </p:par>
+                      </p:childTnLst>
+                    </p:cTn>
+                  </p:par>
+                  <p:par>
+                    <p:cTn id="7" fill="hold">
+                      <p:stCondLst>
+                        <p:cond delay="indefinite"/>
+                      </p:stCondLst>
+                      <p:childTnLst>
+                        <p:par>
+                          <p:cTn id="8" fill="hold">
+                            <p:stCondLst>
+                              <p:cond delay="0"/>
+                            </p:stCondLst>
+                            <p:childTnLst>
+                              <p:par>
+                                <p:cTn id="9" presetID="1" presetClass="entr" presetSubtype="0" fill="hold" nodeType="clickEffect">
+                                  <p:stCondLst>
+                                    <p:cond delay="0"/>
+                                  </p:stCondLst>
+                                  <p:childTnLst>
+                                    <p:set>
+                                      <p:cBhvr>
+                                        <p:cTn id="10" dur="1" fill="hold">
+                                          <p:stCondLst>
+                                            <p:cond delay="0"/>
+                                          </p:stCondLst>
+                                        </p:cTn>
+                                        <p:tgtEl>
+                                          <p:spTgt spid="9"/>
+                                        </p:tgtEl>
+                                        <p:attrNameLst>
+                                          <p:attrName>style.visibility</p:attrName>
+                                        </p:attrNameLst>
+                                      </p:cBhvr>
+                                      <p:to>
+                                        <p:strVal val="visible"/>
+                                      </p:to>
+                                    </p:set>
+                                  </p:childTnLst>
+                                </p:cTn>
+                              </p:par>
+                            </p:childTnLst>
+                          </p:cTn>
+                        </p:par>
+                      </p:childTnLst>
+                    </p:cTn>
+                  </p:par>
+                </p:childTnLst>
+              </p:cTn>
+              <p:prevCondLst>
+                <p:cond evt="onPrev" delay="0">
+                  <p:tgtEl>
+                    <p:sldTgt/>
+                  </p:tgtEl>
+                </p:cond>
+              </p:prevCondLst>
+              <p:nextCondLst>
+                <p:cond evt="onNext" delay="0">
+                  <p:tgtEl>
+                    <p:sldTgt/>
+                  </p:tgtEl>
+                </p:cond>
+              </p:nextCondLst>
+            </p:seq>
+          </p:childTnLst>
+        </p:cTn>
+      </p:par>
+    </p:tnLst>
+  </p:timing>
+</p:sld>
+</file>
+
+<file path=ppt/slides/slide15.xml><?xml version="1.0" encoding="utf-8"?>
+<p:sld xmlns:a="http://schemas.openxmlformats.org/drawingml/2006/main" xmlns:r="http://schemas.openxmlformats.org/officeDocument/2006/relationships" xmlns:p="http://schemas.openxmlformats.org/presentationml/2006/main">
+  <p:cSld>
+    <p:spTree>
+      <p:nvGrpSpPr>
+        <p:cNvPr id="1" name=""/>
+        <p:cNvGrpSpPr/>
+        <p:nvPr/>
+      </p:nvGrpSpPr>
+      <p:grpSpPr>
+        <a:xfrm>
+          <a:off x="0" y="0"/>
+          <a:ext cx="0" cy="0"/>
+          <a:chOff x="0" y="0"/>
+          <a:chExt cx="0" cy="0"/>
+        </a:xfrm>
+      </p:grpSpPr>
+      <p:sp>
+        <p:nvSpPr>
+          <p:cNvPr id="4" name="Title 3"/>
+          <p:cNvSpPr>
+            <a:spLocks noGrp="1"/>
+          </p:cNvSpPr>
+          <p:nvPr>
+            <p:ph type="title"/>
+          </p:nvPr>
+        </p:nvSpPr>
+        <p:spPr>
+          <a:xfrm>
+            <a:off x="0" y="126000"/>
+            <a:ext cx="9143999" cy="757130"/>
+          </a:xfrm>
+        </p:spPr>
+        <p:txBody>
+          <a:bodyPr anchor="ctr" anchorCtr="1">
+            <a:spAutoFit/>
+          </a:bodyPr>
+          <a:lstStyle/>
+          <a:p>
+            <a:r>
+              <a:rPr lang="en-GB" dirty="0" smtClean="0"/>
+              <a:t>Querying Documents</a:t>
+            </a:r>
+            <a:endParaRPr lang="en-GB" dirty="0"/>
+          </a:p>
+        </p:txBody>
+      </p:sp>
+    </p:spTree>
+    <p:extLst>
+      <p:ext uri="{BB962C8B-B14F-4D97-AF65-F5344CB8AC3E}">
+        <p14:creationId xmlns:p14="http://schemas.microsoft.com/office/powerpoint/2010/main" val="3686095763"/>
+      </p:ext>
+    </p:extLst>
+  </p:cSld>
+  <p:clrMapOvr>
+    <a:masterClrMapping/>
+  </p:clrMapOvr>
+  <p:timing>
+    <p:tnLst>
+      <p:par>
+        <p:cTn id="1" dur="indefinite" restart="never" nodeType="tmRoot"/>
+      </p:par>
+    </p:tnLst>
+  </p:timing>
+</p:sld>
+</file>
+
+<file path=ppt/slides/slide16.xml><?xml version="1.0" encoding="utf-8"?>
+<p:sld xmlns:a="http://schemas.openxmlformats.org/drawingml/2006/main" xmlns:r="http://schemas.openxmlformats.org/officeDocument/2006/relationships" xmlns:p="http://schemas.openxmlformats.org/presentationml/2006/main">
+  <p:cSld>
+    <p:spTree>
+      <p:nvGrpSpPr>
+        <p:cNvPr id="1" name=""/>
+        <p:cNvGrpSpPr/>
+        <p:nvPr/>
+      </p:nvGrpSpPr>
+      <p:grpSpPr>
+        <a:xfrm>
+          <a:off x="0" y="0"/>
+          <a:ext cx="0" cy="0"/>
+          <a:chOff x="0" y="0"/>
+          <a:chExt cx="0" cy="0"/>
+        </a:xfrm>
+      </p:grpSpPr>
       <p:pic>
         <p:nvPicPr>
           <p:cNvPr id="5" name="Picture Placeholder 4"/>
@@ -9933,7 +10518,7 @@
 </p:sld>
 </file>
 
-<file path=ppt/slides/slide15.xml><?xml version="1.0" encoding="utf-8"?>
+<file path=ppt/slides/slide17.xml><?xml version="1.0" encoding="utf-8"?>
 <p:sld xmlns:a="http://schemas.openxmlformats.org/drawingml/2006/main" xmlns:r="http://schemas.openxmlformats.org/officeDocument/2006/relationships" xmlns:p="http://schemas.openxmlformats.org/presentationml/2006/main">
   <p:cSld>
     <p:spTree>
@@ -10636,7 +11221,7 @@
 </p:sld>
 </file>
 
-<file path=ppt/slides/slide16.xml><?xml version="1.0" encoding="utf-8"?>
+<file path=ppt/slides/slide18.xml><?xml version="1.0" encoding="utf-8"?>
 <p:sld xmlns:a="http://schemas.openxmlformats.org/drawingml/2006/main" xmlns:r="http://schemas.openxmlformats.org/officeDocument/2006/relationships" xmlns:p="http://schemas.openxmlformats.org/presentationml/2006/main">
   <p:cSld>
     <p:spTree>
@@ -10770,7 +11355,7 @@
 </p:sld>
 </file>
 
-<file path=ppt/slides/slide17.xml><?xml version="1.0" encoding="utf-8"?>
+<file path=ppt/slides/slide19.xml><?xml version="1.0" encoding="utf-8"?>
 <p:sld xmlns:a="http://schemas.openxmlformats.org/drawingml/2006/main" xmlns:r="http://schemas.openxmlformats.org/officeDocument/2006/relationships" xmlns:p="http://schemas.openxmlformats.org/presentationml/2006/main">
   <p:cSld>
     <p:spTree>
@@ -10896,7 +11481,118 @@
 </p:sld>
 </file>
 
-<file path=ppt/slides/slide18.xml><?xml version="1.0" encoding="utf-8"?>
+<file path=ppt/slides/slide2.xml><?xml version="1.0" encoding="utf-8"?>
+<p:sld xmlns:a="http://schemas.openxmlformats.org/drawingml/2006/main" xmlns:r="http://schemas.openxmlformats.org/officeDocument/2006/relationships" xmlns:p="http://schemas.openxmlformats.org/presentationml/2006/main">
+  <p:cSld>
+    <p:spTree>
+      <p:nvGrpSpPr>
+        <p:cNvPr id="1" name=""/>
+        <p:cNvGrpSpPr/>
+        <p:nvPr/>
+      </p:nvGrpSpPr>
+      <p:grpSpPr>
+        <a:xfrm>
+          <a:off x="0" y="0"/>
+          <a:ext cx="0" cy="0"/>
+          <a:chOff x="0" y="0"/>
+          <a:chExt cx="0" cy="0"/>
+        </a:xfrm>
+      </p:grpSpPr>
+      <p:sp>
+        <p:nvSpPr>
+          <p:cNvPr id="10" name="TextBox 9"/>
+          <p:cNvSpPr txBox="1"/>
+          <p:nvPr/>
+        </p:nvSpPr>
+        <p:spPr>
+          <a:xfrm>
+            <a:off x="863588" y="2367171"/>
+            <a:ext cx="7416824" cy="2123658"/>
+          </a:xfrm>
+          <a:prstGeom prst="rect">
+            <a:avLst/>
+          </a:prstGeom>
+          <a:noFill/>
+        </p:spPr>
+        <p:txBody>
+          <a:bodyPr wrap="square" rtlCol="0">
+            <a:spAutoFit/>
+          </a:bodyPr>
+          <a:lstStyle/>
+          <a:p>
+            <a:pPr algn="ctr"/>
+            <a:r>
+              <a:rPr lang="en-GB" sz="6600" cap="all" dirty="0" smtClean="0">
+                <a:solidFill>
+                  <a:srgbClr val="737373"/>
+                </a:solidFill>
+                <a:effectLst>
+                  <a:outerShdw blurRad="50800" dist="38100" dir="2700000" algn="tl" rotWithShape="0">
+                    <a:prstClr val="black">
+                      <a:alpha val="40000"/>
+                    </a:prstClr>
+                  </a:outerShdw>
+                </a:effectLst>
+                <a:latin typeface="News Cycle" panose="02000503000000000000" pitchFamily="2" charset="2"/>
+              </a:rPr>
+              <a:t>Why use </a:t>
+            </a:r>
+          </a:p>
+          <a:p>
+            <a:pPr algn="ctr"/>
+            <a:r>
+              <a:rPr lang="en-GB" sz="6600" cap="all" dirty="0" smtClean="0">
+                <a:solidFill>
+                  <a:srgbClr val="CB623C"/>
+                </a:solidFill>
+                <a:effectLst>
+                  <a:outerShdw blurRad="50800" dist="38100" dir="2700000" algn="tl" rotWithShape="0">
+                    <a:prstClr val="black">
+                      <a:alpha val="40000"/>
+                    </a:prstClr>
+                  </a:outerShdw>
+                </a:effectLst>
+                <a:latin typeface="News Cycle" panose="02000503000000000000" pitchFamily="2" charset="2"/>
+              </a:rPr>
+              <a:t>Cloud Computing?</a:t>
+            </a:r>
+            <a:endParaRPr lang="en-GB" sz="6600" cap="all" dirty="0">
+              <a:solidFill>
+                <a:srgbClr val="CB623C"/>
+              </a:solidFill>
+              <a:effectLst>
+                <a:outerShdw blurRad="50800" dist="38100" dir="2700000" algn="tl" rotWithShape="0">
+                  <a:prstClr val="black">
+                    <a:alpha val="40000"/>
+                  </a:prstClr>
+                </a:outerShdw>
+              </a:effectLst>
+              <a:latin typeface="News Cycle" panose="02000503000000000000" pitchFamily="2" charset="2"/>
+            </a:endParaRPr>
+          </a:p>
+        </p:txBody>
+      </p:sp>
+    </p:spTree>
+    <p:extLst>
+      <p:ext uri="{BB962C8B-B14F-4D97-AF65-F5344CB8AC3E}">
+        <p14:creationId xmlns:p14="http://schemas.microsoft.com/office/powerpoint/2010/main" val="486634373"/>
+      </p:ext>
+    </p:extLst>
+  </p:cSld>
+  <p:clrMapOvr>
+    <a:masterClrMapping/>
+  </p:clrMapOvr>
+  <p:timing>
+    <p:tnLst>
+      <p:par>
+        <p:cTn id="1" dur="indefinite" restart="never" nodeType="tmRoot"/>
+      </p:par>
+    </p:tnLst>
+  </p:timing>
+</p:sld>
+</file>
+
+<file path=ppt/slides/slide20.xml><?xml version="1.0" encoding="utf-8"?>
 <p:sld xmlns:a="http://schemas.openxmlformats.org/drawingml/2006/main" xmlns:r="http://schemas.openxmlformats.org/officeDocument/2006/relationships" xmlns:p="http://schemas.openxmlformats.org/presentationml/2006/main">
   <p:cSld>
     <p:spTree>
@@ -11481,7 +12177,7 @@
 </p:sld>
 </file>
 
-<file path=ppt/slides/slide19.xml><?xml version="1.0" encoding="utf-8"?>
+<file path=ppt/slides/slide21.xml><?xml version="1.0" encoding="utf-8"?>
 <p:sld xmlns:a="http://schemas.openxmlformats.org/drawingml/2006/main" xmlns:r="http://schemas.openxmlformats.org/officeDocument/2006/relationships" xmlns:p="http://schemas.openxmlformats.org/presentationml/2006/main">
   <p:cSld>
     <p:spTree>
@@ -11958,118 +12654,7 @@
 </p:sld>
 </file>
 
-<file path=ppt/slides/slide2.xml><?xml version="1.0" encoding="utf-8"?>
-<p:sld xmlns:a="http://schemas.openxmlformats.org/drawingml/2006/main" xmlns:r="http://schemas.openxmlformats.org/officeDocument/2006/relationships" xmlns:p="http://schemas.openxmlformats.org/presentationml/2006/main">
-  <p:cSld>
-    <p:spTree>
-      <p:nvGrpSpPr>
-        <p:cNvPr id="1" name=""/>
-        <p:cNvGrpSpPr/>
-        <p:nvPr/>
-      </p:nvGrpSpPr>
-      <p:grpSpPr>
-        <a:xfrm>
-          <a:off x="0" y="0"/>
-          <a:ext cx="0" cy="0"/>
-          <a:chOff x="0" y="0"/>
-          <a:chExt cx="0" cy="0"/>
-        </a:xfrm>
-      </p:grpSpPr>
-      <p:sp>
-        <p:nvSpPr>
-          <p:cNvPr id="10" name="TextBox 9"/>
-          <p:cNvSpPr txBox="1"/>
-          <p:nvPr/>
-        </p:nvSpPr>
-        <p:spPr>
-          <a:xfrm>
-            <a:off x="863588" y="2367171"/>
-            <a:ext cx="7416824" cy="2123658"/>
-          </a:xfrm>
-          <a:prstGeom prst="rect">
-            <a:avLst/>
-          </a:prstGeom>
-          <a:noFill/>
-        </p:spPr>
-        <p:txBody>
-          <a:bodyPr wrap="square" rtlCol="0">
-            <a:spAutoFit/>
-          </a:bodyPr>
-          <a:lstStyle/>
-          <a:p>
-            <a:pPr algn="ctr"/>
-            <a:r>
-              <a:rPr lang="en-GB" sz="6600" cap="all" dirty="0" smtClean="0">
-                <a:solidFill>
-                  <a:srgbClr val="737373"/>
-                </a:solidFill>
-                <a:effectLst>
-                  <a:outerShdw blurRad="50800" dist="38100" dir="2700000" algn="tl" rotWithShape="0">
-                    <a:prstClr val="black">
-                      <a:alpha val="40000"/>
-                    </a:prstClr>
-                  </a:outerShdw>
-                </a:effectLst>
-                <a:latin typeface="News Cycle" panose="02000503000000000000" pitchFamily="2" charset="2"/>
-              </a:rPr>
-              <a:t>Why use </a:t>
-            </a:r>
-          </a:p>
-          <a:p>
-            <a:pPr algn="ctr"/>
-            <a:r>
-              <a:rPr lang="en-GB" sz="6600" cap="all" dirty="0" smtClean="0">
-                <a:solidFill>
-                  <a:srgbClr val="CB623C"/>
-                </a:solidFill>
-                <a:effectLst>
-                  <a:outerShdw blurRad="50800" dist="38100" dir="2700000" algn="tl" rotWithShape="0">
-                    <a:prstClr val="black">
-                      <a:alpha val="40000"/>
-                    </a:prstClr>
-                  </a:outerShdw>
-                </a:effectLst>
-                <a:latin typeface="News Cycle" panose="02000503000000000000" pitchFamily="2" charset="2"/>
-              </a:rPr>
-              <a:t>Cloud Computing?</a:t>
-            </a:r>
-            <a:endParaRPr lang="en-GB" sz="6600" cap="all" dirty="0">
-              <a:solidFill>
-                <a:srgbClr val="CB623C"/>
-              </a:solidFill>
-              <a:effectLst>
-                <a:outerShdw blurRad="50800" dist="38100" dir="2700000" algn="tl" rotWithShape="0">
-                  <a:prstClr val="black">
-                    <a:alpha val="40000"/>
-                  </a:prstClr>
-                </a:outerShdw>
-              </a:effectLst>
-              <a:latin typeface="News Cycle" panose="02000503000000000000" pitchFamily="2" charset="2"/>
-            </a:endParaRPr>
-          </a:p>
-        </p:txBody>
-      </p:sp>
-    </p:spTree>
-    <p:extLst>
-      <p:ext uri="{BB962C8B-B14F-4D97-AF65-F5344CB8AC3E}">
-        <p14:creationId xmlns:p14="http://schemas.microsoft.com/office/powerpoint/2010/main" val="486634373"/>
-      </p:ext>
-    </p:extLst>
-  </p:cSld>
-  <p:clrMapOvr>
-    <a:masterClrMapping/>
-  </p:clrMapOvr>
-  <p:timing>
-    <p:tnLst>
-      <p:par>
-        <p:cTn id="1" dur="indefinite" restart="never" nodeType="tmRoot"/>
-      </p:par>
-    </p:tnLst>
-  </p:timing>
-</p:sld>
-</file>
-
-<file path=ppt/slides/slide20.xml><?xml version="1.0" encoding="utf-8"?>
+<file path=ppt/slides/slide22.xml><?xml version="1.0" encoding="utf-8"?>
 <p:sld xmlns:a="http://schemas.openxmlformats.org/drawingml/2006/main" xmlns:r="http://schemas.openxmlformats.org/officeDocument/2006/relationships" xmlns:p="http://schemas.openxmlformats.org/presentationml/2006/main">
   <p:cSld>
     <p:spTree>
@@ -12195,7 +12780,7 @@
 </p:sld>
 </file>
 
-<file path=ppt/slides/slide21.xml><?xml version="1.0" encoding="utf-8"?>
+<file path=ppt/slides/slide23.xml><?xml version="1.0" encoding="utf-8"?>
 <p:sld xmlns:a="http://schemas.openxmlformats.org/drawingml/2006/main" xmlns:r="http://schemas.openxmlformats.org/officeDocument/2006/relationships" xmlns:p="http://schemas.openxmlformats.org/presentationml/2006/main">
   <p:cSld>
     <p:spTree>
@@ -13180,7 +13765,7 @@
 </p:sld>
 </file>
 
-<file path=ppt/slides/slide22.xml><?xml version="1.0" encoding="utf-8"?>
+<file path=ppt/slides/slide24.xml><?xml version="1.0" encoding="utf-8"?>
 <p:sld xmlns:a="http://schemas.openxmlformats.org/drawingml/2006/main" xmlns:r="http://schemas.openxmlformats.org/officeDocument/2006/relationships" xmlns:p="http://schemas.openxmlformats.org/presentationml/2006/main">
   <p:cSld>
     <p:spTree>
@@ -13271,7 +13856,7 @@
 </p:sld>
 </file>
 
-<file path=ppt/slides/slide23.xml><?xml version="1.0" encoding="utf-8"?>
+<file path=ppt/slides/slide25.xml><?xml version="1.0" encoding="utf-8"?>
 <p:sld xmlns:a="http://schemas.openxmlformats.org/drawingml/2006/main" xmlns:r="http://schemas.openxmlformats.org/officeDocument/2006/relationships" xmlns:p="http://schemas.openxmlformats.org/presentationml/2006/main">
   <p:cSld>
     <p:spTree>
@@ -13362,7 +13947,7 @@
 </p:sld>
 </file>
 
-<file path=ppt/slides/slide24.xml><?xml version="1.0" encoding="utf-8"?>
+<file path=ppt/slides/slide26.xml><?xml version="1.0" encoding="utf-8"?>
 <p:sld xmlns:a="http://schemas.openxmlformats.org/drawingml/2006/main" xmlns:r="http://schemas.openxmlformats.org/officeDocument/2006/relationships" xmlns:p="http://schemas.openxmlformats.org/presentationml/2006/main">
   <p:cSld>
     <p:spTree>
@@ -13453,7 +14038,7 @@
 </p:sld>
 </file>
 
-<file path=ppt/slides/slide25.xml><?xml version="1.0" encoding="utf-8"?>
+<file path=ppt/slides/slide27.xml><?xml version="1.0" encoding="utf-8"?>
 <p:sld xmlns:a="http://schemas.openxmlformats.org/drawingml/2006/main" xmlns:r="http://schemas.openxmlformats.org/officeDocument/2006/relationships" xmlns:p="http://schemas.openxmlformats.org/presentationml/2006/main">
   <p:cSld>
     <p:spTree>

</xml_diff>

<commit_message>
Finishs off queues and worker roles. Adds summary and reorders some of the slides.
</commit_message>
<xml_diff>
--- a/Current/Azure The Good Parts Web Apps/AzureTheGoodParts-WebApps.pptx
+++ b/Current/Azure The Good Parts Web Apps/AzureTheGoodParts-WebApps.pptx
@@ -6,7 +6,7 @@
     <p:sldMasterId id="2147483672" r:id="rId2"/>
   </p:sldMasterIdLst>
   <p:notesMasterIdLst>
-    <p:notesMasterId r:id="rId31"/>
+    <p:notesMasterId r:id="rId30"/>
   </p:notesMasterIdLst>
   <p:sldIdLst>
     <p:sldId id="256" r:id="rId3"/>
@@ -28,15 +28,14 @@
     <p:sldId id="316" r:id="rId19"/>
     <p:sldId id="302" r:id="rId20"/>
     <p:sldId id="274" r:id="rId21"/>
-    <p:sldId id="303" r:id="rId22"/>
-    <p:sldId id="304" r:id="rId23"/>
-    <p:sldId id="305" r:id="rId24"/>
-    <p:sldId id="307" r:id="rId25"/>
-    <p:sldId id="308" r:id="rId26"/>
-    <p:sldId id="309" r:id="rId27"/>
-    <p:sldId id="310" r:id="rId28"/>
-    <p:sldId id="311" r:id="rId29"/>
-    <p:sldId id="288" r:id="rId30"/>
+    <p:sldId id="307" r:id="rId22"/>
+    <p:sldId id="308" r:id="rId23"/>
+    <p:sldId id="309" r:id="rId24"/>
+    <p:sldId id="303" r:id="rId25"/>
+    <p:sldId id="304" r:id="rId26"/>
+    <p:sldId id="305" r:id="rId27"/>
+    <p:sldId id="317" r:id="rId28"/>
+    <p:sldId id="288" r:id="rId29"/>
   </p:sldIdLst>
   <p:sldSz cx="9144000" cy="6858000" type="screen4x3"/>
   <p:notesSz cx="6858000" cy="9144000"/>
@@ -236,7 +235,7 @@
           <a:p>
             <a:fld id="{9E29A4B1-5A86-4619-B723-CCAF1C8CA250}" type="datetimeFigureOut">
               <a:rPr lang="en-GB" smtClean="0"/>
-              <a:t>21/10/2015</a:t>
+              <a:t>22/10/2015</a:t>
             </a:fld>
             <a:endParaRPr lang="en-GB"/>
           </a:p>
@@ -1463,11 +1462,7 @@
             </a:r>
             <a:r>
               <a:rPr lang="en-GB" dirty="0" smtClean="0"/>
-              <a:t>. </a:t>
-            </a:r>
-            <a:r>
-              <a:rPr lang="en-GB" dirty="0" smtClean="0"/>
-              <a:t>Meaning you can write and execute stored procedures and user defined functions directly on the database written in </a:t>
+              <a:t>. Meaning you can write and execute stored procedures and user defined functions directly on the database written in </a:t>
             </a:r>
             <a:r>
               <a:rPr lang="en-GB" dirty="0" err="1" smtClean="0"/>
@@ -1675,13 +1670,8 @@
           <a:p>
             <a:r>
               <a:rPr lang="en-GB" baseline="0" dirty="0" smtClean="0"/>
-              <a:t>Table storage offers highly available, massively scalable storage so you application can automatically scale to meet demand</a:t>
-            </a:r>
-            <a:r>
-              <a:rPr lang="en-GB" baseline="0" dirty="0" smtClean="0"/>
-              <a:t>.</a:t>
-            </a:r>
-            <a:endParaRPr lang="en-GB" baseline="0" dirty="0" smtClean="0"/>
+              <a:t>Table storage offers highly available, massively scalable storage so you application can automatically scale to meet demand.</a:t>
+            </a:r>
           </a:p>
         </p:txBody>
       </p:sp>
@@ -1916,19 +1906,11 @@
           <a:p>
             <a:r>
               <a:rPr lang="en-GB" dirty="0" smtClean="0"/>
-              <a:t>Table storage is designed to be fast at retrieving data. If </a:t>
-            </a:r>
-            <a:r>
-              <a:rPr lang="en-GB" dirty="0" smtClean="0"/>
-              <a:t>you are</a:t>
-            </a:r>
-            <a:r>
-              <a:rPr lang="en-GB" baseline="0" dirty="0" smtClean="0"/>
-              <a:t> used to developing relational models you will find </a:t>
-            </a:r>
-            <a:r>
-              <a:rPr lang="en-GB" baseline="0" dirty="0" smtClean="0"/>
-              <a:t>the design of a table storage table strange.</a:t>
+              <a:t>Table storage is designed to be fast at retrieving data. If you are</a:t>
+            </a:r>
+            <a:r>
+              <a:rPr lang="en-GB" baseline="0" dirty="0" smtClean="0"/>
+              <a:t> used to developing relational models you will find the design of a table storage table strange.</a:t>
             </a:r>
           </a:p>
           <a:p>
@@ -2107,39 +2089,7 @@
           <a:p>
             <a:r>
               <a:rPr lang="en-GB" dirty="0" smtClean="0"/>
-              <a:t>Troy concludes that </a:t>
-            </a:r>
-            <a:r>
-              <a:rPr lang="en-GB" dirty="0" smtClean="0"/>
-              <a:t>he </a:t>
-            </a:r>
-            <a:r>
-              <a:rPr lang="en-GB" dirty="0" smtClean="0"/>
-              <a:t>had </a:t>
-            </a:r>
-            <a:r>
-              <a:rPr lang="en-GB" dirty="0" smtClean="0"/>
-              <a:t>to put a 400ms delay into his code because table storage was returning </a:t>
-            </a:r>
-            <a:r>
-              <a:rPr lang="en-GB" dirty="0" smtClean="0"/>
-              <a:t>so </a:t>
-            </a:r>
-            <a:r>
-              <a:rPr lang="en-GB" dirty="0" smtClean="0"/>
-              <a:t>quickly </a:t>
-            </a:r>
-            <a:r>
-              <a:rPr lang="en-GB" dirty="0" smtClean="0"/>
-              <a:t>that users </a:t>
-            </a:r>
-            <a:r>
-              <a:rPr lang="en-GB" dirty="0" smtClean="0"/>
-              <a:t>didn't </a:t>
-            </a:r>
-            <a:r>
-              <a:rPr lang="en-GB" dirty="0" smtClean="0"/>
-              <a:t>believe it was searching anything.</a:t>
+              <a:t>Troy concludes that he had to put a 400ms delay into his code because table storage was returning so quickly that users didn't believe it was searching anything.</a:t>
             </a:r>
           </a:p>
           <a:p>
@@ -2357,17 +2307,7 @@
           <a:p>
             <a:r>
               <a:rPr lang="en-GB" dirty="0" smtClean="0"/>
-              <a:t>The first step when scaling an application is to just throw </a:t>
-            </a:r>
-            <a:r>
-              <a:rPr lang="en-GB" baseline="0" dirty="0" smtClean="0"/>
-              <a:t>more processing power at your app. But that will only go so far.</a:t>
-            </a:r>
-          </a:p>
-          <a:p>
-            <a:r>
-              <a:rPr lang="en-GB" baseline="0" dirty="0" smtClean="0"/>
-              <a:t>The next step is to start breaking your app into components so they can scale independently. But now we have the problem of communication between the components. One solution is to use queues.</a:t>
+              <a:t>Now I want to start thinking about how you can increase the performance of your application. By distributing your app and moving any long running tasks out of the UI.</a:t>
             </a:r>
           </a:p>
           <a:p>
@@ -2375,81 +2315,48 @@
           </a:p>
           <a:p>
             <a:r>
-              <a:rPr lang="en-GB" dirty="0" smtClean="0"/>
+              <a:rPr lang="en-GB" baseline="0" dirty="0" smtClean="0"/>
               <a:t>Azure </a:t>
             </a:r>
             <a:r>
-              <a:rPr lang="en-GB" dirty="0" smtClean="0"/>
-              <a:t>supports two types of queue</a:t>
-            </a:r>
-            <a:r>
-              <a:rPr lang="en-GB" baseline="0" dirty="0" smtClean="0"/>
-              <a:t> mechanisms. </a:t>
-            </a:r>
+              <a:rPr lang="en-GB" baseline="0" dirty="0" smtClean="0"/>
+              <a:t>has two services you could use.</a:t>
+            </a:r>
+          </a:p>
+          <a:p>
+            <a:endParaRPr lang="en-GB" baseline="0" dirty="0" smtClean="0"/>
+          </a:p>
+          <a:p>
+            <a:pPr marL="171450" indent="-171450">
+              <a:buFont typeface="Arial" panose="020B0604020202020204" pitchFamily="34" charset="0"/>
+              <a:buChar char="•"/>
+            </a:pPr>
             <a:r>
               <a:rPr lang="en-GB" b="1" baseline="0" dirty="0" smtClean="0"/>
-              <a:t>Azure Queues</a:t>
-            </a:r>
-            <a:r>
-              <a:rPr lang="en-GB" baseline="0" dirty="0" smtClean="0"/>
-              <a:t> and </a:t>
-            </a:r>
+              <a:t>Web Jobs</a:t>
+            </a:r>
+            <a:r>
+              <a:rPr lang="en-GB" baseline="0" dirty="0" smtClean="0"/>
+              <a:t>, which are part of the Web Apps service. You can run any program or script continuously, on a schedule or on a trigger with a web job.</a:t>
+            </a:r>
+          </a:p>
+          <a:p>
+            <a:pPr marL="171450" indent="-171450">
+              <a:buFont typeface="Arial" panose="020B0604020202020204" pitchFamily="34" charset="0"/>
+              <a:buChar char="•"/>
+            </a:pPr>
             <a:r>
               <a:rPr lang="en-GB" b="1" baseline="0" dirty="0" smtClean="0"/>
-              <a:t>Service Bus Queues</a:t>
-            </a:r>
-            <a:r>
-              <a:rPr lang="en-GB" baseline="0" dirty="0" smtClean="0"/>
-              <a:t>.</a:t>
-            </a:r>
+              <a:t>Worker Roles</a:t>
+            </a:r>
+            <a:r>
+              <a:rPr lang="en-GB" baseline="0" dirty="0" smtClean="0"/>
+              <a:t>, which are part of the Cloud Services service. Like a Web Role a Worker Role has an entry point class, which as a number of events that are triggered.</a:t>
+            </a:r>
+            <a:endParaRPr lang="en-GB" dirty="0" smtClean="0"/>
           </a:p>
           <a:p>
             <a:endParaRPr lang="en-GB" baseline="0" dirty="0" smtClean="0"/>
-          </a:p>
-          <a:p>
-            <a:r>
-              <a:rPr lang="en-GB" b="1" baseline="0" dirty="0" smtClean="0"/>
-              <a:t>Azure Queues</a:t>
-            </a:r>
-            <a:r>
-              <a:rPr lang="en-GB" baseline="0" dirty="0" smtClean="0"/>
-              <a:t> are part of the same Azure Storage service that Table Storage </a:t>
-            </a:r>
-            <a:r>
-              <a:rPr lang="en-GB" baseline="0" dirty="0" smtClean="0"/>
-              <a:t>and Blob Storage are </a:t>
-            </a:r>
-            <a:r>
-              <a:rPr lang="en-GB" baseline="0" dirty="0" smtClean="0"/>
-              <a:t>part of. They provide a simple interface to reliably persist messages between </a:t>
-            </a:r>
-            <a:r>
-              <a:rPr lang="en-GB" baseline="0" dirty="0" smtClean="0"/>
-              <a:t>components.</a:t>
-            </a:r>
-            <a:endParaRPr lang="en-GB" baseline="0" dirty="0" smtClean="0"/>
-          </a:p>
-          <a:p>
-            <a:endParaRPr lang="en-GB" baseline="0" dirty="0" smtClean="0"/>
-          </a:p>
-          <a:p>
-            <a:r>
-              <a:rPr lang="en-GB" b="1" baseline="0" dirty="0" smtClean="0"/>
-              <a:t>Service Bus</a:t>
-            </a:r>
-            <a:r>
-              <a:rPr lang="en-GB" baseline="0" dirty="0" smtClean="0"/>
-              <a:t> queues are part of the wider Azure Messaging </a:t>
-            </a:r>
-            <a:r>
-              <a:rPr lang="en-GB" baseline="0" dirty="0" smtClean="0"/>
-              <a:t>service. Service Bus is a more advanced mechanism and provides Queues</a:t>
-            </a:r>
-            <a:r>
-              <a:rPr lang="en-GB" baseline="0" dirty="0" smtClean="0"/>
-              <a:t>, Topics, Relays and Event Hubs.</a:t>
-            </a:r>
-            <a:endParaRPr lang="en-GB" dirty="0" smtClean="0"/>
           </a:p>
         </p:txBody>
       </p:sp>
@@ -2479,7 +2386,7 @@
     </p:spTree>
     <p:extLst>
       <p:ext uri="{BB962C8B-B14F-4D97-AF65-F5344CB8AC3E}">
-        <p14:creationId xmlns:p14="http://schemas.microsoft.com/office/powerpoint/2010/main" val="4251635917"/>
+        <p14:creationId xmlns:p14="http://schemas.microsoft.com/office/powerpoint/2010/main" val="3640884441"/>
       </p:ext>
     </p:extLst>
   </p:cSld>
@@ -2533,59 +2440,378 @@
           <a:bodyPr/>
           <a:lstStyle/>
           <a:p>
+            <a:pPr marL="0" indent="0">
+              <a:buFont typeface="Arial" panose="020B0604020202020204" pitchFamily="34" charset="0"/>
+              <a:buNone/>
+            </a:pPr>
             <a:r>
               <a:rPr lang="en-GB" dirty="0" smtClean="0"/>
-              <a:t>Azure Storage Queues was</a:t>
-            </a:r>
-            <a:r>
-              <a:rPr lang="en-GB" baseline="0" dirty="0" smtClean="0"/>
-              <a:t> the first queue mechanism on Azure and provides a way of storing a large number of messages for </a:t>
-            </a:r>
-            <a:r>
-              <a:rPr lang="en-GB" baseline="0" dirty="0" smtClean="0"/>
-              <a:t>components to </a:t>
-            </a:r>
-            <a:r>
-              <a:rPr lang="en-GB" baseline="0" dirty="0" smtClean="0"/>
-              <a:t>process.</a:t>
-            </a:r>
-          </a:p>
-          <a:p>
+              <a:t>If your </a:t>
+            </a:r>
+            <a:r>
+              <a:rPr lang="en-GB" dirty="0" err="1" smtClean="0"/>
+              <a:t>WebApp</a:t>
+            </a:r>
+            <a:r>
+              <a:rPr lang="en-GB" dirty="0" smtClean="0"/>
+              <a:t> is fairly small scale and the most intensive tasks you application does is sending emails, data cleansing and maybe some basic image manipulating such as resizing. Then a </a:t>
+            </a:r>
+            <a:r>
+              <a:rPr lang="en-GB" dirty="0" err="1" smtClean="0"/>
+              <a:t>WebJob</a:t>
+            </a:r>
+            <a:r>
+              <a:rPr lang="en-GB" baseline="0" dirty="0" smtClean="0"/>
+              <a:t> will be a good staring point.</a:t>
+            </a:r>
+          </a:p>
+          <a:p>
+            <a:pPr marL="0" indent="0">
+              <a:buFont typeface="Arial" panose="020B0604020202020204" pitchFamily="34" charset="0"/>
+              <a:buNone/>
+            </a:pPr>
+            <a:r>
+              <a:rPr lang="en-GB" baseline="0" dirty="0" err="1" smtClean="0"/>
+              <a:t>WebJobs</a:t>
+            </a:r>
+            <a:r>
+              <a:rPr lang="en-GB" baseline="0" dirty="0" smtClean="0"/>
+              <a:t> aim to improve user experience by moving long running tasks out of the UI to the background so users don’t have wait for emails to be sent, images resized, etc.</a:t>
+            </a:r>
+          </a:p>
+          <a:p>
+            <a:pPr marL="0" indent="0">
+              <a:buFont typeface="Arial" panose="020B0604020202020204" pitchFamily="34" charset="0"/>
+              <a:buNone/>
+            </a:pPr>
             <a:endParaRPr lang="en-GB" baseline="0" dirty="0" smtClean="0"/>
           </a:p>
           <a:p>
-            <a:r>
-              <a:rPr lang="en-GB" baseline="0" dirty="0" smtClean="0"/>
-              <a:t>A single message can be up to 64KB and the only limit on the number of messages you can store </a:t>
-            </a:r>
-            <a:r>
-              <a:rPr lang="en-GB" baseline="0" dirty="0" smtClean="0"/>
-              <a:t>on a queue is </a:t>
-            </a:r>
-            <a:r>
-              <a:rPr lang="en-GB" baseline="0" dirty="0" smtClean="0"/>
-              <a:t>the storage account data limit of 500TB</a:t>
-            </a:r>
-            <a:r>
-              <a:rPr lang="en-GB" baseline="0" dirty="0" smtClean="0"/>
+            <a:pPr marL="0" indent="0">
+              <a:buFont typeface="Arial" panose="020B0604020202020204" pitchFamily="34" charset="0"/>
+              <a:buNone/>
+            </a:pPr>
+            <a:r>
+              <a:rPr lang="en-GB" baseline="0" dirty="0" err="1" smtClean="0"/>
+              <a:t>WebJobs</a:t>
+            </a:r>
+            <a:r>
+              <a:rPr lang="en-GB" baseline="0" dirty="0" smtClean="0"/>
+              <a:t> can be part of your </a:t>
+            </a:r>
+            <a:r>
+              <a:rPr lang="en-GB" baseline="0" dirty="0" err="1" smtClean="0"/>
+              <a:t>WebApps</a:t>
+            </a:r>
+            <a:r>
+              <a:rPr lang="en-GB" baseline="0" dirty="0" smtClean="0"/>
+              <a:t> solution and will be deployed at the same time or you can upload a script or executable in the Azure portal.</a:t>
+            </a:r>
+          </a:p>
+          <a:p>
+            <a:pPr marL="0" indent="0">
+              <a:buFont typeface="Arial" panose="020B0604020202020204" pitchFamily="34" charset="0"/>
+              <a:buNone/>
+            </a:pPr>
+            <a:r>
+              <a:rPr lang="en-GB" sz="1200" b="0" i="0" kern="1200" dirty="0" smtClean="0">
+                <a:solidFill>
+                  <a:schemeClr val="tx1"/>
+                </a:solidFill>
+                <a:effectLst/>
+                <a:latin typeface="+mn-lt"/>
+                <a:ea typeface="+mn-ea"/>
+                <a:cs typeface="+mn-cs"/>
+              </a:rPr>
+              <a:t>A </a:t>
+            </a:r>
+            <a:r>
+              <a:rPr lang="en-GB" sz="1200" b="0" i="0" kern="1200" dirty="0" err="1" smtClean="0">
+                <a:solidFill>
+                  <a:schemeClr val="tx1"/>
+                </a:solidFill>
+                <a:effectLst/>
+                <a:latin typeface="+mn-lt"/>
+                <a:ea typeface="+mn-ea"/>
+                <a:cs typeface="+mn-cs"/>
+              </a:rPr>
+              <a:t>WebJob</a:t>
+            </a:r>
+            <a:r>
+              <a:rPr lang="en-GB" sz="1200" b="0" i="0" kern="1200" baseline="0" dirty="0" smtClean="0">
+                <a:solidFill>
+                  <a:schemeClr val="tx1"/>
+                </a:solidFill>
+                <a:effectLst/>
+                <a:latin typeface="+mn-lt"/>
+                <a:ea typeface="+mn-ea"/>
+                <a:cs typeface="+mn-cs"/>
+              </a:rPr>
+              <a:t> can be</a:t>
+            </a:r>
+            <a:r>
+              <a:rPr lang="en-GB" sz="1200" b="0" i="0" kern="1200" dirty="0" smtClean="0">
+                <a:solidFill>
+                  <a:schemeClr val="tx1"/>
+                </a:solidFill>
+                <a:effectLst/>
+                <a:latin typeface="+mn-lt"/>
+                <a:ea typeface="+mn-ea"/>
+                <a:cs typeface="+mn-cs"/>
+              </a:rPr>
+              <a:t> executed in two ways, either they are triggered or they are continuously running. Triggered jobs happen when some event occurs and Continuous jobs run in a while loop.</a:t>
+            </a:r>
+          </a:p>
+          <a:p>
+            <a:pPr marL="0" indent="0">
+              <a:buFont typeface="Arial" panose="020B0604020202020204" pitchFamily="34" charset="0"/>
+              <a:buNone/>
+            </a:pPr>
+            <a:endParaRPr lang="en-GB" sz="1200" b="0" i="0" kern="1200" dirty="0" smtClean="0">
+              <a:solidFill>
+                <a:schemeClr val="tx1"/>
+              </a:solidFill>
+              <a:effectLst/>
+              <a:latin typeface="+mn-lt"/>
+              <a:ea typeface="+mn-ea"/>
+              <a:cs typeface="+mn-cs"/>
+            </a:endParaRPr>
+          </a:p>
+          <a:p>
+            <a:pPr marL="0" indent="0">
+              <a:buFont typeface="Arial" panose="020B0604020202020204" pitchFamily="34" charset="0"/>
+              <a:buNone/>
+            </a:pPr>
+            <a:r>
+              <a:rPr lang="en-GB" sz="1200" b="0" i="0" kern="1200" dirty="0" smtClean="0">
+                <a:solidFill>
+                  <a:schemeClr val="tx1"/>
+                </a:solidFill>
+                <a:effectLst/>
+                <a:latin typeface="+mn-lt"/>
+                <a:ea typeface="+mn-ea"/>
+                <a:cs typeface="+mn-cs"/>
+              </a:rPr>
+              <a:t>The following file</a:t>
+            </a:r>
+            <a:r>
+              <a:rPr lang="en-GB" sz="1200" b="0" i="0" kern="1200" baseline="0" dirty="0" smtClean="0">
+                <a:solidFill>
+                  <a:schemeClr val="tx1"/>
+                </a:solidFill>
+                <a:effectLst/>
+                <a:latin typeface="+mn-lt"/>
+                <a:ea typeface="+mn-ea"/>
+                <a:cs typeface="+mn-cs"/>
+              </a:rPr>
+              <a:t> types can be used as </a:t>
+            </a:r>
+            <a:r>
+              <a:rPr lang="en-GB" sz="1200" b="0" i="0" kern="1200" baseline="0" dirty="0" err="1" smtClean="0">
+                <a:solidFill>
+                  <a:schemeClr val="tx1"/>
+                </a:solidFill>
+                <a:effectLst/>
+                <a:latin typeface="+mn-lt"/>
+                <a:ea typeface="+mn-ea"/>
+                <a:cs typeface="+mn-cs"/>
+              </a:rPr>
+              <a:t>WebJobs</a:t>
+            </a:r>
+            <a:r>
+              <a:rPr lang="en-GB" sz="1200" b="0" i="0" kern="1200" baseline="0" dirty="0" smtClean="0">
+                <a:solidFill>
+                  <a:schemeClr val="tx1"/>
+                </a:solidFill>
+                <a:effectLst/>
+                <a:latin typeface="+mn-lt"/>
+                <a:ea typeface="+mn-ea"/>
+                <a:cs typeface="+mn-cs"/>
+              </a:rPr>
               <a:t>.</a:t>
             </a:r>
           </a:p>
           <a:p>
+            <a:pPr marL="0" indent="0">
+              <a:buFont typeface="Arial" panose="020B0604020202020204" pitchFamily="34" charset="0"/>
+              <a:buNone/>
+            </a:pPr>
+            <a:r>
+              <a:rPr lang="en-GB" sz="1200" b="0" i="0" kern="1200" baseline="0" dirty="0" smtClean="0">
+                <a:solidFill>
+                  <a:schemeClr val="tx1"/>
+                </a:solidFill>
+                <a:effectLst/>
+                <a:latin typeface="+mn-lt"/>
+                <a:ea typeface="+mn-ea"/>
+                <a:cs typeface="+mn-cs"/>
+              </a:rPr>
+              <a:t>There is a </a:t>
+            </a:r>
+            <a:r>
+              <a:rPr lang="en-GB" sz="1200" b="0" i="0" kern="1200" baseline="0" dirty="0" err="1" smtClean="0">
+                <a:solidFill>
+                  <a:schemeClr val="tx1"/>
+                </a:solidFill>
+                <a:effectLst/>
+                <a:latin typeface="+mn-lt"/>
+                <a:ea typeface="+mn-ea"/>
+                <a:cs typeface="+mn-cs"/>
+              </a:rPr>
+              <a:t>WebJobs</a:t>
+            </a:r>
+            <a:r>
+              <a:rPr lang="en-GB" sz="1200" b="0" i="0" kern="1200" baseline="0" dirty="0" smtClean="0">
+                <a:solidFill>
+                  <a:schemeClr val="tx1"/>
+                </a:solidFill>
+                <a:effectLst/>
+                <a:latin typeface="+mn-lt"/>
+                <a:ea typeface="+mn-ea"/>
+                <a:cs typeface="+mn-cs"/>
+              </a:rPr>
+              <a:t> SDK available which makes </a:t>
+            </a:r>
+            <a:r>
+              <a:rPr lang="en-GB" baseline="0" dirty="0" smtClean="0"/>
+              <a:t>working with over Azure service, such as Blob &amp; table storage, Queues and Service Bus, really easy.</a:t>
+            </a:r>
+            <a:endParaRPr lang="en-GB" sz="1200" b="0" i="0" kern="1200" baseline="0" dirty="0" smtClean="0">
+              <a:solidFill>
+                <a:schemeClr val="tx1"/>
+              </a:solidFill>
+              <a:effectLst/>
+              <a:latin typeface="+mn-lt"/>
+              <a:ea typeface="+mn-ea"/>
+              <a:cs typeface="+mn-cs"/>
+            </a:endParaRPr>
+          </a:p>
+          <a:p>
+            <a:pPr marL="0" indent="0">
+              <a:buFont typeface="Arial" panose="020B0604020202020204" pitchFamily="34" charset="0"/>
+              <a:buNone/>
+            </a:pPr>
+            <a:r>
+              <a:rPr lang="en-GB" sz="1200" b="0" i="0" kern="1200" baseline="0" dirty="0" err="1" smtClean="0">
+                <a:solidFill>
+                  <a:schemeClr val="tx1"/>
+                </a:solidFill>
+                <a:effectLst/>
+                <a:latin typeface="+mn-lt"/>
+                <a:ea typeface="+mn-ea"/>
+                <a:cs typeface="+mn-cs"/>
+              </a:rPr>
+              <a:t>WebJobs</a:t>
+            </a:r>
+            <a:r>
+              <a:rPr lang="en-GB" sz="1200" b="0" i="0" kern="1200" baseline="0" dirty="0" smtClean="0">
+                <a:solidFill>
+                  <a:schemeClr val="tx1"/>
+                </a:solidFill>
+                <a:effectLst/>
+                <a:latin typeface="+mn-lt"/>
+                <a:ea typeface="+mn-ea"/>
+                <a:cs typeface="+mn-cs"/>
+              </a:rPr>
+              <a:t> are deployed as part of your </a:t>
+            </a:r>
+            <a:r>
+              <a:rPr lang="en-GB" sz="1200" b="0" i="0" kern="1200" baseline="0" dirty="0" err="1" smtClean="0">
+                <a:solidFill>
+                  <a:schemeClr val="tx1"/>
+                </a:solidFill>
+                <a:effectLst/>
+                <a:latin typeface="+mn-lt"/>
+                <a:ea typeface="+mn-ea"/>
+                <a:cs typeface="+mn-cs"/>
+              </a:rPr>
+              <a:t>WebApp</a:t>
+            </a:r>
+            <a:r>
+              <a:rPr lang="en-GB" sz="1200" b="0" i="0" kern="1200" baseline="0" dirty="0" smtClean="0">
+                <a:solidFill>
+                  <a:schemeClr val="tx1"/>
+                </a:solidFill>
+                <a:effectLst/>
+                <a:latin typeface="+mn-lt"/>
+                <a:ea typeface="+mn-ea"/>
+                <a:cs typeface="+mn-cs"/>
+              </a:rPr>
+              <a:t>, because of this both you </a:t>
+            </a:r>
+            <a:r>
+              <a:rPr lang="en-GB" sz="1200" b="0" i="0" kern="1200" baseline="0" dirty="0" err="1" smtClean="0">
+                <a:solidFill>
+                  <a:schemeClr val="tx1"/>
+                </a:solidFill>
+                <a:effectLst/>
+                <a:latin typeface="+mn-lt"/>
+                <a:ea typeface="+mn-ea"/>
+                <a:cs typeface="+mn-cs"/>
+              </a:rPr>
+              <a:t>WebApp</a:t>
+            </a:r>
+            <a:r>
+              <a:rPr lang="en-GB" sz="1200" b="0" i="0" kern="1200" baseline="0" dirty="0" smtClean="0">
+                <a:solidFill>
+                  <a:schemeClr val="tx1"/>
+                </a:solidFill>
+                <a:effectLst/>
+                <a:latin typeface="+mn-lt"/>
+                <a:ea typeface="+mn-ea"/>
+                <a:cs typeface="+mn-cs"/>
+              </a:rPr>
+              <a:t> and </a:t>
+            </a:r>
+            <a:r>
+              <a:rPr lang="en-GB" sz="1200" b="0" i="0" kern="1200" baseline="0" dirty="0" err="1" smtClean="0">
+                <a:solidFill>
+                  <a:schemeClr val="tx1"/>
+                </a:solidFill>
+                <a:effectLst/>
+                <a:latin typeface="+mn-lt"/>
+                <a:ea typeface="+mn-ea"/>
+                <a:cs typeface="+mn-cs"/>
+              </a:rPr>
+              <a:t>WebJob</a:t>
+            </a:r>
+            <a:r>
+              <a:rPr lang="en-GB" sz="1200" b="0" i="0" kern="1200" baseline="0" dirty="0" smtClean="0">
+                <a:solidFill>
+                  <a:schemeClr val="tx1"/>
+                </a:solidFill>
+                <a:effectLst/>
+                <a:latin typeface="+mn-lt"/>
+                <a:ea typeface="+mn-ea"/>
+                <a:cs typeface="+mn-cs"/>
+              </a:rPr>
+              <a:t> share the same CPU &amp; Memory resources. If you have auto scale configure a very intensive </a:t>
+            </a:r>
+            <a:r>
+              <a:rPr lang="en-GB" sz="1200" b="0" i="0" kern="1200" baseline="0" dirty="0" err="1" smtClean="0">
+                <a:solidFill>
+                  <a:schemeClr val="tx1"/>
+                </a:solidFill>
+                <a:effectLst/>
+                <a:latin typeface="+mn-lt"/>
+                <a:ea typeface="+mn-ea"/>
+                <a:cs typeface="+mn-cs"/>
+              </a:rPr>
+              <a:t>WebJob</a:t>
+            </a:r>
+            <a:r>
+              <a:rPr lang="en-GB" sz="1200" b="0" i="0" kern="1200" baseline="0" dirty="0" smtClean="0">
+                <a:solidFill>
+                  <a:schemeClr val="tx1"/>
+                </a:solidFill>
+                <a:effectLst/>
+                <a:latin typeface="+mn-lt"/>
+                <a:ea typeface="+mn-ea"/>
+                <a:cs typeface="+mn-cs"/>
+              </a:rPr>
+              <a:t> task could trigger an auto scale event.</a:t>
+            </a:r>
             <a:endParaRPr lang="en-GB" baseline="0" dirty="0" smtClean="0"/>
-          </a:p>
-          <a:p>
-            <a:r>
-              <a:rPr lang="en-GB" baseline="0" dirty="0" smtClean="0"/>
-              <a:t>Storage Queues don’t follow any standard, objects a serialised the serialised object is added to the body of a message then put on a queue. </a:t>
-            </a:r>
-          </a:p>
-          <a:p>
-            <a:r>
-              <a:rPr lang="en-GB" baseline="0" smtClean="0"/>
-              <a:t>Each message has an Id, </a:t>
-            </a:r>
-            <a:endParaRPr lang="en-GB" dirty="0"/>
           </a:p>
         </p:txBody>
       </p:sp>
@@ -2615,7 +2841,7 @@
     </p:spTree>
     <p:extLst>
       <p:ext uri="{BB962C8B-B14F-4D97-AF65-F5344CB8AC3E}">
-        <p14:creationId xmlns:p14="http://schemas.microsoft.com/office/powerpoint/2010/main" val="2631402639"/>
+        <p14:creationId xmlns:p14="http://schemas.microsoft.com/office/powerpoint/2010/main" val="2191421544"/>
       </p:ext>
     </p:extLst>
   </p:cSld>
@@ -2670,18 +2896,33 @@
           <a:lstStyle/>
           <a:p>
             <a:r>
-              <a:rPr lang="en-GB" dirty="0" smtClean="0"/>
-              <a:t>The Azure Service Bus Service allows the user to create</a:t>
-            </a:r>
-            <a:r>
-              <a:rPr lang="en-GB" baseline="0" dirty="0" smtClean="0"/>
-              <a:t> namespaces where they can setup one or more of the available communication mechanisms.</a:t>
-            </a:r>
-          </a:p>
-          <a:p>
-            <a:endParaRPr lang="en-GB" baseline="0" dirty="0" smtClean="0"/>
-          </a:p>
-          <a:p>
+              <a:rPr lang="en-GB" baseline="0" dirty="0" smtClean="0"/>
+              <a:t>Worker </a:t>
+            </a:r>
+            <a:r>
+              <a:rPr lang="en-GB" baseline="0" dirty="0" smtClean="0"/>
+              <a:t>Roles are part of the </a:t>
+            </a:r>
+            <a:r>
+              <a:rPr lang="en-GB" baseline="0" dirty="0" smtClean="0"/>
+              <a:t>Azure Cloud </a:t>
+            </a:r>
+            <a:r>
+              <a:rPr lang="en-GB" baseline="0" dirty="0" smtClean="0"/>
+              <a:t>Services </a:t>
+            </a:r>
+            <a:r>
+              <a:rPr lang="en-GB" baseline="0" dirty="0" smtClean="0"/>
+              <a:t>feature, </a:t>
+            </a:r>
+            <a:r>
+              <a:rPr lang="en-GB" baseline="0" dirty="0" smtClean="0"/>
+              <a:t>which Web Roles are part </a:t>
+            </a:r>
+            <a:r>
+              <a:rPr lang="en-GB" baseline="0" dirty="0" smtClean="0"/>
+              <a:t>of.</a:t>
+            </a:r>
             <a:endParaRPr lang="en-GB" baseline="0" dirty="0" smtClean="0"/>
           </a:p>
           <a:p>
@@ -2690,16 +2931,76 @@
               <a:buChar char="•"/>
             </a:pPr>
             <a:r>
-              <a:rPr lang="en-GB" b="1" dirty="0" smtClean="0"/>
-              <a:t>Queues</a:t>
+              <a:rPr lang="en-GB" baseline="0" dirty="0" smtClean="0"/>
+              <a:t>All </a:t>
+            </a:r>
+            <a:r>
+              <a:rPr lang="en-GB" baseline="0" dirty="0" smtClean="0"/>
+              <a:t>the features a Web Role has a Worker Role </a:t>
+            </a:r>
+            <a:r>
+              <a:rPr lang="en-GB" baseline="0" dirty="0" smtClean="0"/>
+              <a:t>has too. </a:t>
+            </a:r>
+            <a:r>
+              <a:rPr lang="en-GB" baseline="0" dirty="0" smtClean="0"/>
+              <a:t>The difference between a Web Role and a Worker role is that </a:t>
+            </a:r>
+            <a:r>
+              <a:rPr lang="en-GB" baseline="0" dirty="0" smtClean="0"/>
+              <a:t>Web </a:t>
+            </a:r>
+            <a:r>
+              <a:rPr lang="en-GB" baseline="0" dirty="0" smtClean="0"/>
+              <a:t>Roles are </a:t>
+            </a:r>
+            <a:r>
+              <a:rPr lang="en-GB" baseline="0" dirty="0" smtClean="0"/>
+              <a:t>hosted </a:t>
+            </a:r>
+            <a:r>
+              <a:rPr lang="en-GB" baseline="0" dirty="0" smtClean="0"/>
+              <a:t>in IIS </a:t>
+            </a:r>
+            <a:r>
+              <a:rPr lang="en-GB" baseline="0" dirty="0" smtClean="0"/>
+              <a:t>and can </a:t>
+            </a:r>
+            <a:r>
+              <a:rPr lang="en-GB" baseline="0" dirty="0" smtClean="0"/>
+              <a:t>contain one or more web </a:t>
+            </a:r>
+            <a:r>
+              <a:rPr lang="en-GB" baseline="0" dirty="0" smtClean="0"/>
+              <a:t>applications, whilst a </a:t>
+            </a:r>
+            <a:r>
+              <a:rPr lang="en-GB" baseline="0" dirty="0" smtClean="0"/>
+              <a:t>Worker Role </a:t>
+            </a:r>
+            <a:r>
+              <a:rPr lang="en-GB" baseline="0" dirty="0" smtClean="0"/>
+              <a:t>is not. A Worker Role </a:t>
             </a:r>
             <a:r>
               <a:rPr lang="en-GB" dirty="0" smtClean="0"/>
-              <a:t>,</a:t>
-            </a:r>
-            <a:r>
-              <a:rPr lang="en-GB" baseline="0" dirty="0" smtClean="0"/>
-              <a:t> which allow one directional communication. A message producer hands off a message to the queue. A single message consumer pulls the message from the queue and processes it.</a:t>
+              <a:t>can </a:t>
+            </a:r>
+            <a:r>
+              <a:rPr lang="en-GB" dirty="0" smtClean="0"/>
+              <a:t>be thought of as Windows services </a:t>
+            </a:r>
+            <a:r>
+              <a:rPr lang="en-GB" dirty="0" smtClean="0"/>
+              <a:t>executing </a:t>
+            </a:r>
+            <a:r>
+              <a:rPr lang="en-GB" dirty="0" smtClean="0"/>
+              <a:t>background tasks but in the cloud</a:t>
+            </a:r>
+            <a:r>
+              <a:rPr lang="en-GB" dirty="0" smtClean="0"/>
+              <a:t>.</a:t>
             </a:r>
           </a:p>
           <a:p>
@@ -2708,98 +3009,100 @@
               <a:buChar char="•"/>
             </a:pPr>
             <a:r>
-              <a:rPr lang="en-GB" b="1" baseline="0" dirty="0" smtClean="0"/>
-              <a:t>Topics</a:t>
-            </a:r>
-            <a:r>
-              <a:rPr lang="en-GB" baseline="0" dirty="0" smtClean="0"/>
-              <a:t>, </a:t>
-            </a:r>
-            <a:r>
-              <a:rPr lang="en-GB" sz="1200" dirty="0" smtClean="0">
-                <a:solidFill>
-                  <a:srgbClr val="737373"/>
-                </a:solidFill>
-                <a:latin typeface="Georgia" panose="02040502050405020303" pitchFamily="18" charset="0"/>
-              </a:rPr>
-              <a:t>which provide one-directional communication using a publish/subscribe pattern. Like queues a single message producer hands a message off to a queue, but multiple message consumers can subscribe to that topic.</a:t>
-            </a:r>
-          </a:p>
-          <a:p>
-            <a:pPr marL="171450" indent="-171450">
+              <a:rPr lang="en-GB" baseline="0" dirty="0" smtClean="0"/>
+              <a:t>If you have a background task which is too intensive for a </a:t>
+            </a:r>
+            <a:r>
+              <a:rPr lang="en-GB" baseline="0" dirty="0" err="1" smtClean="0"/>
+              <a:t>WebJob</a:t>
+            </a:r>
+            <a:r>
+              <a:rPr lang="en-GB" baseline="0" dirty="0" smtClean="0"/>
+              <a:t> you could use a </a:t>
+            </a:r>
+            <a:r>
+              <a:rPr lang="en-GB" baseline="0" dirty="0" err="1" smtClean="0"/>
+              <a:t>WorkerRole</a:t>
+            </a:r>
+            <a:r>
+              <a:rPr lang="en-GB" baseline="0" dirty="0" smtClean="0"/>
+              <a:t> and it wont effect your </a:t>
+            </a:r>
+            <a:r>
+              <a:rPr lang="en-GB" baseline="0" dirty="0" err="1" smtClean="0"/>
+              <a:t>WebApp</a:t>
+            </a:r>
+            <a:r>
+              <a:rPr lang="en-GB" baseline="0" dirty="0" smtClean="0"/>
+              <a:t> because it runs in its own VM.</a:t>
+            </a:r>
+          </a:p>
+          <a:p>
+            <a:pPr marL="171450" marR="0" indent="-171450" algn="l" defTabSz="914400" rtl="0" eaLnBrk="1" fontAlgn="auto" latinLnBrk="0" hangingPunct="1">
+              <a:lnSpc>
+                <a:spcPct val="100000"/>
+              </a:lnSpc>
+              <a:spcBef>
+                <a:spcPts val="0"/>
+              </a:spcBef>
+              <a:spcAft>
+                <a:spcPts val="0"/>
+              </a:spcAft>
+              <a:buClrTx/>
+              <a:buSzTx/>
               <a:buFont typeface="Arial" panose="020B0604020202020204" pitchFamily="34" charset="0"/>
               <a:buChar char="•"/>
+              <a:tabLst/>
+              <a:defRPr/>
             </a:pPr>
             <a:r>
-              <a:rPr lang="en-GB" sz="1200" b="1" dirty="0" smtClean="0">
-                <a:solidFill>
-                  <a:srgbClr val="737373"/>
-                </a:solidFill>
-                <a:latin typeface="Georgia" panose="02040502050405020303" pitchFamily="18" charset="0"/>
-              </a:rPr>
-              <a:t>Relays</a:t>
-            </a:r>
-            <a:r>
-              <a:rPr lang="en-GB" sz="1200" dirty="0" smtClean="0">
-                <a:solidFill>
-                  <a:srgbClr val="737373"/>
-                </a:solidFill>
-                <a:latin typeface="Georgia" panose="02040502050405020303" pitchFamily="18" charset="0"/>
-              </a:rPr>
-              <a:t>, which provide bi-directional communication. Unlike queues and topics a relay doesn’t broker messages via a queue. Instead,</a:t>
-            </a:r>
-            <a:r>
-              <a:rPr lang="en-GB" sz="1200" baseline="0" dirty="0" smtClean="0">
-                <a:solidFill>
-                  <a:srgbClr val="737373"/>
-                </a:solidFill>
-                <a:latin typeface="Georgia" panose="02040502050405020303" pitchFamily="18" charset="0"/>
-              </a:rPr>
-              <a:t> it just passes them on to the destination application via WCF messages.</a:t>
-            </a:r>
-          </a:p>
-          <a:p>
-            <a:pPr marL="171450" indent="-171450">
+              <a:rPr lang="en-GB" baseline="0" dirty="0" smtClean="0"/>
+              <a:t>If you are thinking about moving to a Service Orientated Architecture or some other distributed architecture then Worker Roles are what you are wanting to use.</a:t>
+            </a:r>
+          </a:p>
+          <a:p>
+            <a:pPr marL="171450" marR="0" indent="-171450" algn="l" defTabSz="914400" rtl="0" eaLnBrk="1" fontAlgn="auto" latinLnBrk="0" hangingPunct="1">
+              <a:lnSpc>
+                <a:spcPct val="100000"/>
+              </a:lnSpc>
+              <a:spcBef>
+                <a:spcPts val="0"/>
+              </a:spcBef>
+              <a:spcAft>
+                <a:spcPts val="0"/>
+              </a:spcAft>
+              <a:buClrTx/>
+              <a:buSzTx/>
               <a:buFont typeface="Arial" panose="020B0604020202020204" pitchFamily="34" charset="0"/>
               <a:buChar char="•"/>
+              <a:tabLst/>
+              <a:defRPr/>
             </a:pPr>
-            <a:r>
-              <a:rPr lang="en-GB" sz="1200" b="1" baseline="0" dirty="0" smtClean="0">
-                <a:solidFill>
-                  <a:srgbClr val="737373"/>
-                </a:solidFill>
-                <a:latin typeface="Georgia" panose="02040502050405020303" pitchFamily="18" charset="0"/>
-              </a:rPr>
-              <a:t>Event Hubs</a:t>
-            </a:r>
-            <a:r>
-              <a:rPr lang="en-GB" sz="1200" baseline="0" dirty="0" smtClean="0">
-                <a:solidFill>
-                  <a:srgbClr val="737373"/>
-                </a:solidFill>
-                <a:latin typeface="Georgia" panose="02040502050405020303" pitchFamily="18" charset="0"/>
-              </a:rPr>
-              <a:t>, </a:t>
-            </a:r>
-            <a:r>
-              <a:rPr lang="en-GB" sz="1200" dirty="0" smtClean="0">
-                <a:solidFill>
-                  <a:srgbClr val="737373"/>
-                </a:solidFill>
-                <a:latin typeface="Georgia" panose="02040502050405020303" pitchFamily="18" charset="0"/>
-              </a:rPr>
-              <a:t>which provide event and telemetry ingress to the cloud. Event Hubs are use</a:t>
-            </a:r>
-            <a:r>
-              <a:rPr lang="en-GB" sz="1200" baseline="0" dirty="0" smtClean="0">
-                <a:solidFill>
-                  <a:srgbClr val="737373"/>
-                </a:solidFill>
-                <a:latin typeface="Georgia" panose="02040502050405020303" pitchFamily="18" charset="0"/>
-              </a:rPr>
-              <a:t> to collect high volumes of data. They can process millions of events per second. For example, Volkswagen could have collect the live emissions data from all its cars using event hubs.</a:t>
-            </a:r>
-            <a:endParaRPr lang="en-GB" dirty="0"/>
+            <a:endParaRPr lang="en-GB" baseline="0" dirty="0" smtClean="0"/>
+          </a:p>
+          <a:p>
+            <a:pPr marL="171450" marR="0" indent="-171450" algn="l" defTabSz="914400" rtl="0" eaLnBrk="1" fontAlgn="auto" latinLnBrk="0" hangingPunct="1">
+              <a:lnSpc>
+                <a:spcPct val="100000"/>
+              </a:lnSpc>
+              <a:spcBef>
+                <a:spcPts val="0"/>
+              </a:spcBef>
+              <a:spcAft>
+                <a:spcPts val="0"/>
+              </a:spcAft>
+              <a:buClrTx/>
+              <a:buSzTx/>
+              <a:buFont typeface="Arial" panose="020B0604020202020204" pitchFamily="34" charset="0"/>
+              <a:buChar char="•"/>
+              <a:tabLst/>
+              <a:defRPr/>
+            </a:pPr>
+            <a:r>
+              <a:rPr lang="en-GB" baseline="0" dirty="0" smtClean="0"/>
+              <a:t>You can make them poll for messages off queues, or subscribe to Topics in Azure Service Bus. You could even create a Http listener and send requests to them.</a:t>
+            </a:r>
+            <a:endParaRPr lang="en-GB" baseline="0" dirty="0" smtClean="0"/>
           </a:p>
         </p:txBody>
       </p:sp>
@@ -2829,7 +3132,7 @@
     </p:spTree>
     <p:extLst>
       <p:ext uri="{BB962C8B-B14F-4D97-AF65-F5344CB8AC3E}">
-        <p14:creationId xmlns:p14="http://schemas.microsoft.com/office/powerpoint/2010/main" val="1570882835"/>
+        <p14:creationId xmlns:p14="http://schemas.microsoft.com/office/powerpoint/2010/main" val="2757543137"/>
       </p:ext>
     </p:extLst>
   </p:cSld>
@@ -2884,54 +3187,77 @@
           <a:lstStyle/>
           <a:p>
             <a:r>
+              <a:rPr lang="en-GB" baseline="0" dirty="0" smtClean="0"/>
+              <a:t>Now you have broken your app into distributed components, that can scale independently of each other. But </a:t>
+            </a:r>
+            <a:r>
+              <a:rPr lang="en-GB" baseline="0" dirty="0" smtClean="0"/>
+              <a:t>now </a:t>
+            </a:r>
+            <a:r>
+              <a:rPr lang="en-GB" baseline="0" dirty="0" smtClean="0"/>
+              <a:t>you </a:t>
+            </a:r>
+            <a:r>
+              <a:rPr lang="en-GB" baseline="0" dirty="0" smtClean="0"/>
+              <a:t>have the problem of communication between the components. One solution is to use queues.</a:t>
+            </a:r>
+          </a:p>
+          <a:p>
+            <a:endParaRPr lang="en-GB" dirty="0" smtClean="0"/>
+          </a:p>
+          <a:p>
+            <a:r>
               <a:rPr lang="en-GB" dirty="0" smtClean="0"/>
-              <a:t>At every size of web application you will probably need to run some sort of background task</a:t>
-            </a:r>
-            <a:r>
-              <a:rPr lang="en-GB" baseline="0" dirty="0" smtClean="0"/>
-              <a:t> weather that is clean up data, resize images or process queue messages.</a:t>
-            </a:r>
-          </a:p>
-          <a:p>
-            <a:r>
-              <a:rPr lang="en-GB" baseline="0" dirty="0" smtClean="0"/>
-              <a:t>Azure has two services you could use.</a:t>
+              <a:t>Azure supports two types of queue</a:t>
+            </a:r>
+            <a:r>
+              <a:rPr lang="en-GB" baseline="0" dirty="0" smtClean="0"/>
+              <a:t> mechanisms. </a:t>
+            </a:r>
+            <a:r>
+              <a:rPr lang="en-GB" b="1" baseline="0" dirty="0" smtClean="0"/>
+              <a:t>Azure Queues</a:t>
+            </a:r>
+            <a:r>
+              <a:rPr lang="en-GB" baseline="0" dirty="0" smtClean="0"/>
+              <a:t> and </a:t>
+            </a:r>
+            <a:r>
+              <a:rPr lang="en-GB" b="1" baseline="0" dirty="0" smtClean="0"/>
+              <a:t>Service Bus Queues</a:t>
+            </a:r>
+            <a:r>
+              <a:rPr lang="en-GB" baseline="0" dirty="0" smtClean="0"/>
+              <a:t>.</a:t>
             </a:r>
           </a:p>
           <a:p>
             <a:endParaRPr lang="en-GB" baseline="0" dirty="0" smtClean="0"/>
           </a:p>
           <a:p>
-            <a:pPr marL="171450" indent="-171450">
-              <a:buFont typeface="Arial" panose="020B0604020202020204" pitchFamily="34" charset="0"/>
-              <a:buChar char="•"/>
-            </a:pPr>
             <a:r>
               <a:rPr lang="en-GB" b="1" baseline="0" dirty="0" smtClean="0"/>
-              <a:t>Web Jobs</a:t>
-            </a:r>
-            <a:r>
-              <a:rPr lang="en-GB" baseline="0" dirty="0" smtClean="0"/>
-              <a:t>, which are part of the Web Apps service. You can run any program or script continuously, on a schedule or on a trigger with a web job.</a:t>
-            </a:r>
-          </a:p>
-          <a:p>
-            <a:pPr marL="171450" indent="-171450">
-              <a:buFont typeface="Arial" panose="020B0604020202020204" pitchFamily="34" charset="0"/>
-              <a:buChar char="•"/>
-            </a:pPr>
+              <a:t>Azure Queues</a:t>
+            </a:r>
+            <a:r>
+              <a:rPr lang="en-GB" baseline="0" dirty="0" smtClean="0"/>
+              <a:t> are part of the same Azure Storage service that Table Storage and Blob Storage are part of. They provide a simple interface to reliably persist messages between components.</a:t>
+            </a:r>
+          </a:p>
+          <a:p>
+            <a:endParaRPr lang="en-GB" baseline="0" dirty="0" smtClean="0"/>
+          </a:p>
+          <a:p>
             <a:r>
               <a:rPr lang="en-GB" b="1" baseline="0" dirty="0" smtClean="0"/>
-              <a:t>Worker Roles</a:t>
-            </a:r>
-            <a:r>
-              <a:rPr lang="en-GB" baseline="0" dirty="0" smtClean="0"/>
-              <a:t>, which are part of the Cloud Services service. Like a Web Role a Worker Role has an entry point class, which as a number of events that are triggered.</a:t>
+              <a:t>Service Bus</a:t>
+            </a:r>
+            <a:r>
+              <a:rPr lang="en-GB" baseline="0" dirty="0" smtClean="0"/>
+              <a:t> queues are part of the wider Azure Messaging service. Service Bus is a more advanced mechanism and provides Queues, Topics, Relays and Event Hubs.</a:t>
             </a:r>
             <a:endParaRPr lang="en-GB" dirty="0" smtClean="0"/>
-          </a:p>
-          <a:p>
-            <a:endParaRPr lang="en-GB" baseline="0" dirty="0" smtClean="0"/>
           </a:p>
         </p:txBody>
       </p:sp>
@@ -2961,7 +3287,7 @@
     </p:spTree>
     <p:extLst>
       <p:ext uri="{BB962C8B-B14F-4D97-AF65-F5344CB8AC3E}">
-        <p14:creationId xmlns:p14="http://schemas.microsoft.com/office/powerpoint/2010/main" val="3640884441"/>
+        <p14:creationId xmlns:p14="http://schemas.microsoft.com/office/powerpoint/2010/main" val="4251635917"/>
       </p:ext>
     </p:extLst>
   </p:cSld>
@@ -3015,166 +3341,70 @@
           <a:bodyPr/>
           <a:lstStyle/>
           <a:p>
-            <a:pPr marL="171450" indent="-171450">
-              <a:buFont typeface="Arial" panose="020B0604020202020204" pitchFamily="34" charset="0"/>
-              <a:buChar char="•"/>
-            </a:pPr>
             <a:r>
               <a:rPr lang="en-GB" dirty="0" smtClean="0"/>
-              <a:t>Put simply,</a:t>
-            </a:r>
-            <a:r>
-              <a:rPr lang="en-GB" baseline="0" dirty="0" smtClean="0"/>
-              <a:t> if you are able to run a script or a program on your local computer you can run it on Azure. All you need to do is upload it.</a:t>
-            </a:r>
-          </a:p>
-          <a:p>
-            <a:pPr marL="171450" indent="-171450">
-              <a:buFont typeface="Arial" panose="020B0604020202020204" pitchFamily="34" charset="0"/>
-              <a:buChar char="•"/>
-            </a:pPr>
-            <a:r>
-              <a:rPr lang="en-GB" baseline="0" dirty="0" smtClean="0"/>
-              <a:t>There are lot of scripts and programs which are supported. </a:t>
-            </a:r>
-          </a:p>
-          <a:p>
-            <a:pPr marL="171450" indent="-171450">
-              <a:buFont typeface="Arial" panose="020B0604020202020204" pitchFamily="34" charset="0"/>
-              <a:buChar char="•"/>
-            </a:pPr>
-            <a:r>
-              <a:rPr lang="en-GB" dirty="0" smtClean="0"/>
-              <a:t>As they are built in</a:t>
-            </a:r>
-            <a:r>
-              <a:rPr lang="en-GB" baseline="0" dirty="0" smtClean="0"/>
-              <a:t> to the </a:t>
+              <a:t>Azure Storage Queues was</a:t>
+            </a:r>
+            <a:r>
+              <a:rPr lang="en-GB" baseline="0" dirty="0" smtClean="0"/>
+              <a:t> the first queue mechanism on Azure and provides a way of storing a large number of messages for components to process.</a:t>
+            </a:r>
+          </a:p>
+          <a:p>
+            <a:endParaRPr lang="en-GB" baseline="0" dirty="0" smtClean="0"/>
+          </a:p>
+          <a:p>
+            <a:r>
+              <a:rPr lang="en-GB" baseline="0" dirty="0" smtClean="0"/>
+              <a:t>A single message can be up to 64KB and the only limit on the number of messages you can store on a queue is the storage account data limit of 500TB.</a:t>
+            </a:r>
+          </a:p>
+          <a:p>
+            <a:endParaRPr lang="en-GB" baseline="0" dirty="0" smtClean="0"/>
+          </a:p>
+          <a:p>
+            <a:r>
+              <a:rPr lang="en-GB" baseline="0" dirty="0" smtClean="0"/>
+              <a:t>Storage Queues don’t follow any standard, </a:t>
+            </a:r>
+            <a:r>
+              <a:rPr lang="en-GB" baseline="0" dirty="0" smtClean="0"/>
+              <a:t>the body of </a:t>
+            </a:r>
+            <a:r>
+              <a:rPr lang="en-GB" baseline="0" dirty="0" smtClean="0"/>
+              <a:t>a </a:t>
+            </a:r>
+            <a:r>
+              <a:rPr lang="en-GB" baseline="0" dirty="0" smtClean="0"/>
+              <a:t>message is a string you can serialise on object to a string add it to the message, then </a:t>
+            </a:r>
+            <a:r>
+              <a:rPr lang="en-GB" baseline="0" dirty="0" smtClean="0"/>
+              <a:t>put on a queue</a:t>
+            </a:r>
+            <a:r>
+              <a:rPr lang="en-GB" baseline="0" dirty="0" smtClean="0"/>
+              <a:t>.</a:t>
+            </a:r>
+          </a:p>
+          <a:p>
+            <a:endParaRPr lang="en-GB" baseline="0" dirty="0" smtClean="0"/>
+          </a:p>
+          <a:p>
+            <a:r>
+              <a:rPr lang="en-GB" baseline="0" dirty="0" smtClean="0"/>
+              <a:t>The benefits of an Azure Storage Queue is speed, 2000 </a:t>
             </a:r>
             <a:r>
               <a:rPr lang="en-GB" baseline="0" dirty="0" err="1" smtClean="0"/>
-              <a:t>WebApps</a:t>
-            </a:r>
-            <a:r>
-              <a:rPr lang="en-GB" baseline="0" dirty="0" smtClean="0"/>
-              <a:t> service </a:t>
-            </a:r>
-            <a:r>
-              <a:rPr lang="en-GB" baseline="0" dirty="0" err="1" smtClean="0"/>
-              <a:t>WebJobs</a:t>
-            </a:r>
-            <a:r>
-              <a:rPr lang="en-GB" baseline="0" dirty="0" smtClean="0"/>
-              <a:t> get all the feature </a:t>
-            </a:r>
-            <a:r>
-              <a:rPr lang="en-GB" baseline="0" dirty="0" err="1" smtClean="0"/>
-              <a:t>WebApps</a:t>
-            </a:r>
-            <a:r>
-              <a:rPr lang="en-GB" baseline="0" dirty="0" smtClean="0"/>
-              <a:t> do, </a:t>
-            </a:r>
-            <a:r>
-              <a:rPr lang="en-GB" baseline="0" dirty="0" err="1" smtClean="0"/>
-              <a:t>WebJobs</a:t>
-            </a:r>
-            <a:r>
-              <a:rPr lang="en-GB" baseline="0" dirty="0" smtClean="0"/>
-              <a:t> also share the same instance resources as you </a:t>
-            </a:r>
-            <a:r>
-              <a:rPr lang="en-GB" baseline="0" dirty="0" err="1" smtClean="0"/>
-              <a:t>WebApp</a:t>
-            </a:r>
-            <a:r>
-              <a:rPr lang="en-GB" baseline="0" dirty="0" smtClean="0"/>
-              <a:t>.</a:t>
-            </a:r>
-          </a:p>
-          <a:p>
-            <a:pPr marL="171450" indent="-171450">
-              <a:buFont typeface="Arial" panose="020B0604020202020204" pitchFamily="34" charset="0"/>
-              <a:buChar char="•"/>
-            </a:pPr>
-            <a:r>
-              <a:rPr lang="en-GB" baseline="0" dirty="0" smtClean="0"/>
-              <a:t>The </a:t>
-            </a:r>
-            <a:r>
-              <a:rPr lang="en-GB" baseline="0" dirty="0" err="1" smtClean="0"/>
-              <a:t>WebJobs</a:t>
-            </a:r>
-            <a:r>
-              <a:rPr lang="en-GB" baseline="0" dirty="0" smtClean="0"/>
-              <a:t> SDK makes working with over Azure service, such as Blob &amp; table storage, Queues and Service Bus, a breeze.</a:t>
-            </a:r>
-          </a:p>
-          <a:p>
-            <a:pPr marL="171450" indent="-171450">
-              <a:buFont typeface="Arial" panose="020B0604020202020204" pitchFamily="34" charset="0"/>
-              <a:buChar char="•"/>
-            </a:pPr>
-            <a:r>
-              <a:rPr lang="en-GB" baseline="0" dirty="0" smtClean="0"/>
-              <a:t>Because </a:t>
-            </a:r>
-            <a:r>
-              <a:rPr lang="en-GB" baseline="0" dirty="0" err="1" smtClean="0"/>
-              <a:t>WebJobs</a:t>
-            </a:r>
-            <a:r>
-              <a:rPr lang="en-GB" baseline="0" dirty="0" smtClean="0"/>
-              <a:t> are on the same server instance as your </a:t>
-            </a:r>
-            <a:r>
-              <a:rPr lang="en-GB" baseline="0" dirty="0" err="1" smtClean="0"/>
-              <a:t>WebApp</a:t>
-            </a:r>
-            <a:r>
-              <a:rPr lang="en-GB" baseline="0" dirty="0" smtClean="0"/>
-              <a:t>, it means </a:t>
-            </a:r>
-            <a:r>
-              <a:rPr lang="en-GB" baseline="0" dirty="0" err="1" smtClean="0"/>
-              <a:t>WebApp</a:t>
-            </a:r>
-            <a:r>
-              <a:rPr lang="en-GB" baseline="0" dirty="0" smtClean="0"/>
-              <a:t> and </a:t>
-            </a:r>
-            <a:r>
-              <a:rPr lang="en-GB" baseline="0" dirty="0" err="1" smtClean="0"/>
-              <a:t>WebJob</a:t>
-            </a:r>
-            <a:r>
-              <a:rPr lang="en-GB" baseline="0" dirty="0" smtClean="0"/>
-              <a:t> scale together. If your </a:t>
-            </a:r>
-            <a:r>
-              <a:rPr lang="en-GB" baseline="0" dirty="0" err="1" smtClean="0"/>
-              <a:t>WebApp</a:t>
-            </a:r>
-            <a:r>
-              <a:rPr lang="en-GB" baseline="0" dirty="0" smtClean="0"/>
-              <a:t> trigger an </a:t>
-            </a:r>
-            <a:r>
-              <a:rPr lang="en-GB" baseline="0" dirty="0" err="1" smtClean="0"/>
-              <a:t>autoscale</a:t>
-            </a:r>
-            <a:r>
-              <a:rPr lang="en-GB" baseline="0" dirty="0" smtClean="0"/>
-              <a:t> event your </a:t>
-            </a:r>
-            <a:r>
-              <a:rPr lang="en-GB" baseline="0" dirty="0" err="1" smtClean="0"/>
-              <a:t>WebJob</a:t>
-            </a:r>
-            <a:r>
-              <a:rPr lang="en-GB" baseline="0" dirty="0" smtClean="0"/>
-              <a:t> will scale out with the App.</a:t>
-            </a:r>
+              <a:t>req</a:t>
+            </a:r>
+            <a:r>
+              <a:rPr lang="en-GB" baseline="0" dirty="0" smtClean="0"/>
+              <a:t>/sec and storage, which is currently 500TB. There is no limit on the number of queues you can have.</a:t>
+            </a:r>
+            <a:endParaRPr lang="en-GB" dirty="0"/>
           </a:p>
         </p:txBody>
       </p:sp>
@@ -3204,7 +3434,7 @@
     </p:spTree>
     <p:extLst>
       <p:ext uri="{BB962C8B-B14F-4D97-AF65-F5344CB8AC3E}">
-        <p14:creationId xmlns:p14="http://schemas.microsoft.com/office/powerpoint/2010/main" val="2191421544"/>
+        <p14:creationId xmlns:p14="http://schemas.microsoft.com/office/powerpoint/2010/main" val="2631402639"/>
       </p:ext>
     </p:extLst>
   </p:cSld>
@@ -3259,17 +3489,17 @@
           <a:lstStyle/>
           <a:p>
             <a:r>
-              <a:rPr lang="en-GB" baseline="0" dirty="0" smtClean="0"/>
-              <a:t>Worker Roles can be thought of the </a:t>
-            </a:r>
-            <a:r>
-              <a:rPr lang="en-GB" baseline="0" dirty="0" err="1" smtClean="0"/>
-              <a:t>WebJobs</a:t>
-            </a:r>
-            <a:r>
-              <a:rPr lang="en-GB" baseline="0" dirty="0" smtClean="0"/>
-              <a:t> powerlifting big brother. Worker Roles are part of the Cloud Services service, which Web Roles are part of too.</a:t>
-            </a:r>
+              <a:rPr lang="en-GB" dirty="0" smtClean="0"/>
+              <a:t>The Azure Service Bus is much more advanced</a:t>
+            </a:r>
+            <a:r>
+              <a:rPr lang="en-GB" baseline="0" dirty="0" smtClean="0"/>
+              <a:t> than a Storage Queue. The first notable difference is that if complies to the Advanced Message Queuing Protocol. And has built-in features such as routing, sessions, transactions, duplicate detection, and automatic dead-lettering. You can use an Azure Service Bus in one of four ways.</a:t>
+            </a:r>
+            <a:endParaRPr lang="en-GB" baseline="0" dirty="0" smtClean="0"/>
+          </a:p>
+          <a:p>
+            <a:endParaRPr lang="en-GB" baseline="0" dirty="0" smtClean="0"/>
           </a:p>
           <a:p>
             <a:pPr marL="171450" indent="-171450">
@@ -3277,12 +3507,16 @@
               <a:buChar char="•"/>
             </a:pPr>
             <a:r>
-              <a:rPr lang="en-GB" baseline="0" dirty="0" smtClean="0"/>
-              <a:t>So all the features a Web Role has a Worker Role has. The difference between a Web Role and a Worker role is that Worker Roles are not hosted in IIS so cannot contain one or more web applications. A Worker Role </a:t>
+              <a:rPr lang="en-GB" b="1" dirty="0" smtClean="0"/>
+              <a:t>Queues</a:t>
             </a:r>
             <a:r>
               <a:rPr lang="en-GB" dirty="0" smtClean="0"/>
-              <a:t>can be thought of as Windows services that execute background tasks but in the cloud.</a:t>
+              <a:t>,</a:t>
+            </a:r>
+            <a:r>
+              <a:rPr lang="en-GB" baseline="0" dirty="0" smtClean="0"/>
+              <a:t> which allow one directional communication. A message producer hands off a message to the queue. A single message consumer pulls the message from the queue and processes it.</a:t>
             </a:r>
           </a:p>
           <a:p>
@@ -3291,43 +3525,98 @@
               <a:buChar char="•"/>
             </a:pPr>
             <a:r>
-              <a:rPr lang="en-GB" dirty="0" smtClean="0"/>
-              <a:t>Unlike a </a:t>
-            </a:r>
-            <a:r>
-              <a:rPr lang="en-GB" dirty="0" err="1" smtClean="0"/>
-              <a:t>WebJob</a:t>
-            </a:r>
-            <a:r>
-              <a:rPr lang="en-GB" dirty="0" smtClean="0"/>
-              <a:t> a </a:t>
-            </a:r>
-            <a:r>
-              <a:rPr lang="en-GB" dirty="0" err="1" smtClean="0"/>
-              <a:t>WorkerRole</a:t>
-            </a:r>
-            <a:r>
-              <a:rPr lang="en-GB" baseline="0" dirty="0" smtClean="0"/>
-              <a:t> is hosted in its own VM, so any resource heavy tasks wont affect the Website. This also means it can scale independently of a </a:t>
-            </a:r>
-            <a:r>
-              <a:rPr lang="en-GB" baseline="0" dirty="0" err="1" smtClean="0"/>
-              <a:t>WebApp</a:t>
-            </a:r>
-            <a:r>
-              <a:rPr lang="en-GB" baseline="0" dirty="0" smtClean="0"/>
-              <a:t> or Web Role. </a:t>
-            </a:r>
-            <a:endParaRPr lang="en-GB" dirty="0" smtClean="0"/>
-          </a:p>
-          <a:p>
-            <a:endParaRPr lang="en-GB" baseline="0" dirty="0" smtClean="0"/>
-          </a:p>
-          <a:p>
-            <a:endParaRPr lang="en-GB" baseline="0" dirty="0" smtClean="0"/>
-          </a:p>
-          <a:p>
-            <a:endParaRPr lang="en-GB" baseline="0" dirty="0" smtClean="0"/>
+              <a:rPr lang="en-GB" b="1" baseline="0" dirty="0" smtClean="0"/>
+              <a:t>Topics</a:t>
+            </a:r>
+            <a:r>
+              <a:rPr lang="en-GB" baseline="0" dirty="0" smtClean="0"/>
+              <a:t>, </a:t>
+            </a:r>
+            <a:r>
+              <a:rPr lang="en-GB" sz="1200" dirty="0" smtClean="0">
+                <a:solidFill>
+                  <a:srgbClr val="737373"/>
+                </a:solidFill>
+                <a:latin typeface="Georgia" panose="02040502050405020303" pitchFamily="18" charset="0"/>
+              </a:rPr>
+              <a:t>which provide one-directional communication using a publish/subscribe pattern. Like queues a single message producer hands a message off to a queue, but multiple message consumers can subscribe to that topic.</a:t>
+            </a:r>
+          </a:p>
+          <a:p>
+            <a:pPr marL="171450" indent="-171450">
+              <a:buFont typeface="Arial" panose="020B0604020202020204" pitchFamily="34" charset="0"/>
+              <a:buChar char="•"/>
+            </a:pPr>
+            <a:r>
+              <a:rPr lang="en-GB" sz="1200" b="1" dirty="0" smtClean="0">
+                <a:solidFill>
+                  <a:srgbClr val="737373"/>
+                </a:solidFill>
+                <a:latin typeface="Georgia" panose="02040502050405020303" pitchFamily="18" charset="0"/>
+              </a:rPr>
+              <a:t>Relays</a:t>
+            </a:r>
+            <a:r>
+              <a:rPr lang="en-GB" sz="1200" dirty="0" smtClean="0">
+                <a:solidFill>
+                  <a:srgbClr val="737373"/>
+                </a:solidFill>
+                <a:latin typeface="Georgia" panose="02040502050405020303" pitchFamily="18" charset="0"/>
+              </a:rPr>
+              <a:t>, which provide bi-directional communication. Unlike queues and topics a relay doesn’t broker messages via a queue. Instead,</a:t>
+            </a:r>
+            <a:r>
+              <a:rPr lang="en-GB" sz="1200" baseline="0" dirty="0" smtClean="0">
+                <a:solidFill>
+                  <a:srgbClr val="737373"/>
+                </a:solidFill>
+                <a:latin typeface="Georgia" panose="02040502050405020303" pitchFamily="18" charset="0"/>
+              </a:rPr>
+              <a:t> it just passes them on to the destination application via WCF messages.</a:t>
+            </a:r>
+          </a:p>
+          <a:p>
+            <a:pPr marL="171450" indent="-171450">
+              <a:buFont typeface="Arial" panose="020B0604020202020204" pitchFamily="34" charset="0"/>
+              <a:buChar char="•"/>
+            </a:pPr>
+            <a:r>
+              <a:rPr lang="en-GB" sz="1200" b="1" baseline="0" dirty="0" smtClean="0">
+                <a:solidFill>
+                  <a:srgbClr val="737373"/>
+                </a:solidFill>
+                <a:latin typeface="Georgia" panose="02040502050405020303" pitchFamily="18" charset="0"/>
+              </a:rPr>
+              <a:t>Event Hubs</a:t>
+            </a:r>
+            <a:r>
+              <a:rPr lang="en-GB" sz="1200" baseline="0" dirty="0" smtClean="0">
+                <a:solidFill>
+                  <a:srgbClr val="737373"/>
+                </a:solidFill>
+                <a:latin typeface="Georgia" panose="02040502050405020303" pitchFamily="18" charset="0"/>
+              </a:rPr>
+              <a:t>, </a:t>
+            </a:r>
+            <a:r>
+              <a:rPr lang="en-GB" sz="1200" dirty="0" smtClean="0">
+                <a:solidFill>
+                  <a:srgbClr val="737373"/>
+                </a:solidFill>
+                <a:latin typeface="Georgia" panose="02040502050405020303" pitchFamily="18" charset="0"/>
+              </a:rPr>
+              <a:t>which provide event and telemetry ingress to the cloud. Event Hubs are use</a:t>
+            </a:r>
+            <a:r>
+              <a:rPr lang="en-GB" sz="1200" baseline="0" dirty="0" smtClean="0">
+                <a:solidFill>
+                  <a:srgbClr val="737373"/>
+                </a:solidFill>
+                <a:latin typeface="Georgia" panose="02040502050405020303" pitchFamily="18" charset="0"/>
+              </a:rPr>
+              <a:t> to collect high volumes of data. They can process millions of events per second. For example, Volkswagen could have collect the live emissions data from all its cars using event hubs.</a:t>
+            </a:r>
+            <a:endParaRPr lang="en-GB" dirty="0"/>
           </a:p>
         </p:txBody>
       </p:sp>
@@ -3357,7 +3646,7 @@
     </p:spTree>
     <p:extLst>
       <p:ext uri="{BB962C8B-B14F-4D97-AF65-F5344CB8AC3E}">
-        <p14:creationId xmlns:p14="http://schemas.microsoft.com/office/powerpoint/2010/main" val="2757543137"/>
+        <p14:creationId xmlns:p14="http://schemas.microsoft.com/office/powerpoint/2010/main" val="1570882835"/>
       </p:ext>
     </p:extLst>
   </p:cSld>
@@ -3412,20 +3701,123 @@
           <a:lstStyle/>
           <a:p>
             <a:r>
-              <a:rPr lang="en-GB" baseline="0" dirty="0" smtClean="0"/>
-              <a:t>Worker Roles still has a </a:t>
+              <a:rPr lang="en-GB" dirty="0" smtClean="0"/>
+              <a:t>Just to wrap up, I have talked about the options available for</a:t>
+            </a:r>
+            <a:r>
+              <a:rPr lang="en-GB" baseline="0" dirty="0" smtClean="0"/>
+              <a:t> hosting you application on Azure</a:t>
+            </a:r>
+          </a:p>
+          <a:p>
+            <a:r>
+              <a:rPr lang="en-GB" baseline="0" dirty="0" smtClean="0"/>
+              <a:t>If you have a simple application the a </a:t>
             </a:r>
             <a:r>
               <a:rPr lang="en-GB" baseline="0" dirty="0" err="1" smtClean="0"/>
-              <a:t>RoleEntryPoint</a:t>
-            </a:r>
-            <a:r>
-              <a:rPr lang="en-GB" baseline="0" dirty="0" smtClean="0"/>
-              <a:t> class and the Service Configuration project, but we don’t have the ASP.NET that we had earlier.</a:t>
+              <a:t>WebApp</a:t>
+            </a:r>
+            <a:r>
+              <a:rPr lang="en-GB" baseline="0" dirty="0" smtClean="0"/>
+              <a:t> would be my recommendation. If you have a complex application that is required to scale massively and you need start up tasks to get your app into a ready state then </a:t>
+            </a:r>
+            <a:r>
+              <a:rPr lang="en-GB" baseline="0" dirty="0" err="1" smtClean="0"/>
+              <a:t>WebRoles</a:t>
+            </a:r>
+            <a:r>
+              <a:rPr lang="en-GB" baseline="0" dirty="0" smtClean="0"/>
+              <a:t> would probably be your choice.</a:t>
             </a:r>
           </a:p>
           <a:p>
             <a:endParaRPr lang="en-GB" baseline="0" dirty="0" smtClean="0"/>
+          </a:p>
+          <a:p>
+            <a:r>
+              <a:rPr lang="en-GB" baseline="0" dirty="0" smtClean="0"/>
+              <a:t>Then I have gone through the Data Storage options available.</a:t>
+            </a:r>
+          </a:p>
+          <a:p>
+            <a:r>
+              <a:rPr lang="en-GB" baseline="0" dirty="0" smtClean="0"/>
+              <a:t>If you require normalised relational data store then Azure SQL is available. </a:t>
+            </a:r>
+          </a:p>
+          <a:p>
+            <a:r>
+              <a:rPr lang="en-GB" baseline="0" dirty="0" smtClean="0"/>
+              <a:t>There is </a:t>
+            </a:r>
+            <a:r>
+              <a:rPr lang="en-GB" baseline="0" dirty="0" err="1" smtClean="0"/>
+              <a:t>DocumentDB</a:t>
+            </a:r>
+            <a:r>
+              <a:rPr lang="en-GB" baseline="0" dirty="0" smtClean="0"/>
+              <a:t> for storing JSON documents.</a:t>
+            </a:r>
+          </a:p>
+          <a:p>
+            <a:r>
+              <a:rPr lang="en-GB" baseline="0" dirty="0" smtClean="0"/>
+              <a:t>For systems that designed for querying Table Storage provides fast database reads.</a:t>
+            </a:r>
+          </a:p>
+          <a:p>
+            <a:endParaRPr lang="en-GB" baseline="0" dirty="0" smtClean="0"/>
+          </a:p>
+          <a:p>
+            <a:r>
+              <a:rPr lang="en-GB" baseline="0" dirty="0" smtClean="0"/>
+              <a:t>Next I looked at how you can start to scale your app by moving long running tasks to a background task with </a:t>
+            </a:r>
+            <a:r>
+              <a:rPr lang="en-GB" baseline="0" dirty="0" err="1" smtClean="0"/>
+              <a:t>WebJobs</a:t>
+            </a:r>
+            <a:r>
+              <a:rPr lang="en-GB" baseline="0" dirty="0" smtClean="0"/>
+              <a:t>.</a:t>
+            </a:r>
+          </a:p>
+          <a:p>
+            <a:r>
+              <a:rPr lang="en-GB" baseline="0" dirty="0" smtClean="0"/>
+              <a:t>And we decoupled our app with Worker Roles.</a:t>
+            </a:r>
+          </a:p>
+          <a:p>
+            <a:endParaRPr lang="en-GB" baseline="0" dirty="0" smtClean="0"/>
+          </a:p>
+          <a:p>
+            <a:r>
+              <a:rPr lang="en-GB" baseline="0" dirty="0" smtClean="0"/>
+              <a:t>Finally we looked at solving the communication issue between distributed apps with queues. </a:t>
+            </a:r>
+          </a:p>
+          <a:p>
+            <a:r>
+              <a:rPr lang="en-GB" baseline="0" dirty="0" smtClean="0"/>
+              <a:t>If you just want basic communication between you app services, you would consider Azure Storage Queues.</a:t>
+            </a:r>
+          </a:p>
+          <a:p>
+            <a:r>
+              <a:rPr lang="en-GB" baseline="0" dirty="0" smtClean="0"/>
+              <a:t>And Service Bus is available if you require </a:t>
+            </a:r>
+            <a:r>
+              <a:rPr lang="en-GB" baseline="0" dirty="0" err="1" smtClean="0"/>
+              <a:t>fatures</a:t>
+            </a:r>
+            <a:r>
+              <a:rPr lang="en-GB" baseline="0" dirty="0" smtClean="0"/>
+              <a:t> out of the box like routing, pub/sub patterns or high data ingress.</a:t>
+            </a:r>
+            <a:endParaRPr lang="en-GB" dirty="0"/>
           </a:p>
         </p:txBody>
       </p:sp>
@@ -3455,201 +3847,7 @@
     </p:spTree>
     <p:extLst>
       <p:ext uri="{BB962C8B-B14F-4D97-AF65-F5344CB8AC3E}">
-        <p14:creationId xmlns:p14="http://schemas.microsoft.com/office/powerpoint/2010/main" val="251820965"/>
-      </p:ext>
-    </p:extLst>
-  </p:cSld>
-  <p:clrMapOvr>
-    <a:masterClrMapping/>
-  </p:clrMapOvr>
-</p:notes>
-</file>
-
-<file path=ppt/notesSlides/notesSlide27.xml><?xml version="1.0" encoding="utf-8"?>
-<p:notes xmlns:a="http://schemas.openxmlformats.org/drawingml/2006/main" xmlns:r="http://schemas.openxmlformats.org/officeDocument/2006/relationships" xmlns:p="http://schemas.openxmlformats.org/presentationml/2006/main">
-  <p:cSld>
-    <p:spTree>
-      <p:nvGrpSpPr>
-        <p:cNvPr id="1" name=""/>
-        <p:cNvGrpSpPr/>
-        <p:nvPr/>
-      </p:nvGrpSpPr>
-      <p:grpSpPr>
-        <a:xfrm>
-          <a:off x="0" y="0"/>
-          <a:ext cx="0" cy="0"/>
-          <a:chOff x="0" y="0"/>
-          <a:chExt cx="0" cy="0"/>
-        </a:xfrm>
-      </p:grpSpPr>
-      <p:sp>
-        <p:nvSpPr>
-          <p:cNvPr id="2" name="Slide Image Placeholder 1"/>
-          <p:cNvSpPr>
-            <a:spLocks noGrp="1" noRot="1" noChangeAspect="1"/>
-          </p:cNvSpPr>
-          <p:nvPr>
-            <p:ph type="sldImg"/>
-          </p:nvPr>
-        </p:nvSpPr>
-        <p:spPr/>
-      </p:sp>
-      <p:sp>
-        <p:nvSpPr>
-          <p:cNvPr id="3" name="Notes Placeholder 2"/>
-          <p:cNvSpPr>
-            <a:spLocks noGrp="1"/>
-          </p:cNvSpPr>
-          <p:nvPr>
-            <p:ph type="body" idx="1"/>
-          </p:nvPr>
-        </p:nvSpPr>
-        <p:spPr/>
-        <p:txBody>
-          <a:bodyPr/>
-          <a:lstStyle/>
-          <a:p>
-            <a:r>
-              <a:rPr lang="en-GB" baseline="0" dirty="0" smtClean="0"/>
-              <a:t>Here I have modified the class to write some text out every 5 seconds using a Timer event. It is not spectacular but it shows how the Worker Role creates and sets up the Timer in the </a:t>
-            </a:r>
-            <a:r>
-              <a:rPr lang="en-GB" baseline="0" dirty="0" err="1" smtClean="0"/>
-              <a:t>OnStart</a:t>
-            </a:r>
-            <a:r>
-              <a:rPr lang="en-GB" baseline="0" dirty="0" smtClean="0"/>
-              <a:t> method. Then Starts the timer in the Run method.</a:t>
-            </a:r>
-          </a:p>
-          <a:p>
-            <a:endParaRPr lang="en-GB" baseline="0" dirty="0" smtClean="0"/>
-          </a:p>
-          <a:p>
-            <a:r>
-              <a:rPr lang="en-GB" baseline="0" dirty="0" smtClean="0"/>
-              <a:t>While both </a:t>
-            </a:r>
-            <a:r>
-              <a:rPr lang="en-GB" baseline="0" dirty="0" err="1" smtClean="0"/>
-              <a:t>WebJobs</a:t>
-            </a:r>
-            <a:r>
-              <a:rPr lang="en-GB" baseline="0" dirty="0" smtClean="0"/>
-              <a:t> and Worker Roles are able to process background tasks. </a:t>
-            </a:r>
-          </a:p>
-          <a:p>
-            <a:r>
-              <a:rPr lang="en-GB" baseline="0" dirty="0" err="1" smtClean="0"/>
-              <a:t>WebJobs</a:t>
-            </a:r>
-            <a:r>
-              <a:rPr lang="en-GB" baseline="0" dirty="0" smtClean="0"/>
-              <a:t> can only do one thing, you would have to deploy many different </a:t>
-            </a:r>
-            <a:r>
-              <a:rPr lang="en-GB" baseline="0" dirty="0" err="1" smtClean="0"/>
-              <a:t>WebJobs</a:t>
-            </a:r>
-            <a:r>
-              <a:rPr lang="en-GB" baseline="0" dirty="0" smtClean="0"/>
-              <a:t> to process different tasks.</a:t>
-            </a:r>
-          </a:p>
-          <a:p>
-            <a:r>
-              <a:rPr lang="en-GB" baseline="0" dirty="0" smtClean="0"/>
-              <a:t>If you required additional software installed to complete a task, a Worker Role would be the only choice as you can RDP into a Worker Role but you cannot on a </a:t>
-            </a:r>
-            <a:r>
-              <a:rPr lang="en-GB" baseline="0" dirty="0" err="1" smtClean="0"/>
-              <a:t>WebJob</a:t>
-            </a:r>
-            <a:r>
-              <a:rPr lang="en-GB" baseline="0" dirty="0" smtClean="0"/>
-              <a:t>.</a:t>
-            </a:r>
-          </a:p>
-          <a:p>
-            <a:r>
-              <a:rPr lang="en-GB" baseline="0" dirty="0" smtClean="0"/>
-              <a:t>If your objective is to run scheduled jobs only using the libraries available in </a:t>
-            </a:r>
-            <a:r>
-              <a:rPr lang="en-GB" baseline="0" dirty="0" err="1" smtClean="0"/>
-              <a:t>.Net</a:t>
-            </a:r>
-            <a:r>
-              <a:rPr lang="en-GB" baseline="0" dirty="0" smtClean="0"/>
-              <a:t> then a </a:t>
-            </a:r>
-            <a:r>
-              <a:rPr lang="en-GB" baseline="0" dirty="0" err="1" smtClean="0"/>
-              <a:t>WebJob</a:t>
-            </a:r>
-            <a:r>
-              <a:rPr lang="en-GB" baseline="0" dirty="0" smtClean="0"/>
-              <a:t> would be the correct choice.</a:t>
-            </a:r>
-          </a:p>
-          <a:p>
-            <a:endParaRPr lang="en-GB" baseline="0" dirty="0" smtClean="0"/>
-          </a:p>
-          <a:p>
-            <a:r>
-              <a:rPr lang="en-GB" baseline="0" dirty="0" smtClean="0"/>
-              <a:t>In my opinion I would start off with a </a:t>
-            </a:r>
-            <a:r>
-              <a:rPr lang="en-GB" baseline="0" dirty="0" err="1" smtClean="0"/>
-              <a:t>WebJob</a:t>
-            </a:r>
-            <a:r>
-              <a:rPr lang="en-GB" baseline="0" dirty="0" smtClean="0"/>
-              <a:t> as they are easy to setup and deploy. They also scale really well and are cheap. If you find in the future that </a:t>
-            </a:r>
-            <a:r>
-              <a:rPr lang="en-GB" baseline="0" dirty="0" err="1" smtClean="0"/>
-              <a:t>WebJobs</a:t>
-            </a:r>
-            <a:r>
-              <a:rPr lang="en-GB" baseline="0" dirty="0" smtClean="0"/>
-              <a:t> are suboptimal for whatever you are doing you can move over to a Worker Role.</a:t>
-            </a:r>
-          </a:p>
-          <a:p>
-            <a:endParaRPr lang="en-GB" baseline="0" dirty="0" smtClean="0"/>
-          </a:p>
-        </p:txBody>
-      </p:sp>
-      <p:sp>
-        <p:nvSpPr>
-          <p:cNvPr id="4" name="Slide Number Placeholder 3"/>
-          <p:cNvSpPr>
-            <a:spLocks noGrp="1"/>
-          </p:cNvSpPr>
-          <p:nvPr>
-            <p:ph type="sldNum" sz="quarter" idx="10"/>
-          </p:nvPr>
-        </p:nvSpPr>
-        <p:spPr/>
-        <p:txBody>
-          <a:bodyPr/>
-          <a:lstStyle/>
-          <a:p>
-            <a:fld id="{F9DCBFB8-3C0D-4265-9EBB-AF74934A7B39}" type="slidenum">
-              <a:rPr lang="en-GB" smtClean="0"/>
-              <a:t>27</a:t>
-            </a:fld>
-            <a:endParaRPr lang="en-GB"/>
-          </a:p>
-        </p:txBody>
-      </p:sp>
-    </p:spTree>
-    <p:extLst>
-      <p:ext uri="{BB962C8B-B14F-4D97-AF65-F5344CB8AC3E}">
-        <p14:creationId xmlns:p14="http://schemas.microsoft.com/office/powerpoint/2010/main" val="3593320600"/>
+        <p14:creationId xmlns:p14="http://schemas.microsoft.com/office/powerpoint/2010/main" val="1690686911"/>
       </p:ext>
     </p:extLst>
   </p:cSld>
@@ -3939,7 +4137,23 @@
             </a:r>
             <a:r>
               <a:rPr lang="en-GB" dirty="0" smtClean="0"/>
-              <a:t>, which is part of the App Services, which include Mobile Apps, API Apps and Logic Apps.</a:t>
+              <a:t>, which is part of the App Services, </a:t>
+            </a:r>
+            <a:r>
+              <a:rPr lang="en-GB" dirty="0" smtClean="0"/>
+              <a:t>other</a:t>
+            </a:r>
+            <a:r>
+              <a:rPr lang="en-GB" baseline="0" dirty="0" smtClean="0"/>
+              <a:t> App Services </a:t>
+            </a:r>
+            <a:r>
+              <a:rPr lang="en-GB" dirty="0" smtClean="0"/>
+              <a:t>include </a:t>
+            </a:r>
+            <a:r>
+              <a:rPr lang="en-GB" dirty="0" smtClean="0"/>
+              <a:t>Mobile Apps, API Apps and Logic Apps.</a:t>
             </a:r>
           </a:p>
           <a:p>
@@ -3974,19 +4188,19 @@
           <a:p>
             <a:r>
               <a:rPr lang="en-GB" baseline="0" dirty="0" err="1" smtClean="0"/>
-              <a:t>WebRole</a:t>
-            </a:r>
-            <a:r>
-              <a:rPr lang="en-GB" baseline="0" dirty="0" smtClean="0"/>
-              <a:t> </a:t>
-            </a:r>
-            <a:r>
-              <a:rPr lang="en-GB" baseline="0" dirty="0" err="1" smtClean="0"/>
-              <a:t>sare</a:t>
-            </a:r>
-            <a:r>
-              <a:rPr lang="en-GB" baseline="0" dirty="0" smtClean="0"/>
-              <a:t> the other option, which are part of Cloud Services. Cloud Services also includes Worker Roles which I’ll touch on later.  </a:t>
+              <a:t>WebRoles</a:t>
+            </a:r>
+            <a:r>
+              <a:rPr lang="en-GB" baseline="0" dirty="0" smtClean="0"/>
+              <a:t> are </a:t>
+            </a:r>
+            <a:r>
+              <a:rPr lang="en-GB" baseline="0" dirty="0" smtClean="0"/>
+              <a:t>the other option, which are part of Cloud Services. Cloud Services also includes Worker Roles which I’ll touch on </a:t>
+            </a:r>
+            <a:r>
+              <a:rPr lang="en-GB" baseline="0" dirty="0" smtClean="0"/>
+              <a:t>later.  </a:t>
             </a:r>
             <a:r>
               <a:rPr lang="en-GB" baseline="0" dirty="0" err="1" smtClean="0"/>
@@ -4006,11 +4220,15 @@
             </a:r>
             <a:r>
               <a:rPr lang="en-GB" baseline="0" dirty="0" err="1" smtClean="0"/>
-              <a:t>WebRoles</a:t>
-            </a:r>
-            <a:r>
-              <a:rPr lang="en-GB" baseline="0" dirty="0" smtClean="0"/>
-              <a:t> and also give you more control over the VM.</a:t>
+              <a:t>WebApps</a:t>
+            </a:r>
+            <a:r>
+              <a:rPr lang="en-GB" baseline="0" dirty="0" smtClean="0"/>
+              <a:t> </a:t>
+            </a:r>
+            <a:r>
+              <a:rPr lang="en-GB" baseline="0" dirty="0" smtClean="0"/>
+              <a:t>and also give you more control over the VM.</a:t>
             </a:r>
             <a:endParaRPr lang="en-GB" dirty="0"/>
           </a:p>
@@ -5407,7 +5625,7 @@
           <a:p>
             <a:fld id="{8A04FFFD-6AAA-4290-B9C8-6140E8302CD5}" type="datetimeFigureOut">
               <a:rPr lang="en-GB" smtClean="0"/>
-              <a:t>21/10/2015</a:t>
+              <a:t>22/10/2015</a:t>
             </a:fld>
             <a:endParaRPr lang="en-GB"/>
           </a:p>
@@ -5580,7 +5798,7 @@
           <a:p>
             <a:fld id="{8A04FFFD-6AAA-4290-B9C8-6140E8302CD5}" type="datetimeFigureOut">
               <a:rPr lang="en-GB" smtClean="0"/>
-              <a:t>21/10/2015</a:t>
+              <a:t>22/10/2015</a:t>
             </a:fld>
             <a:endParaRPr lang="en-GB"/>
           </a:p>
@@ -5763,7 +5981,7 @@
           <a:p>
             <a:fld id="{8A04FFFD-6AAA-4290-B9C8-6140E8302CD5}" type="datetimeFigureOut">
               <a:rPr lang="en-GB" smtClean="0"/>
-              <a:t>21/10/2015</a:t>
+              <a:t>22/10/2015</a:t>
             </a:fld>
             <a:endParaRPr lang="en-GB"/>
           </a:p>
@@ -6872,7 +7090,7 @@
           <a:p>
             <a:fld id="{8A04FFFD-6AAA-4290-B9C8-6140E8302CD5}" type="datetimeFigureOut">
               <a:rPr lang="en-GB" smtClean="0"/>
-              <a:t>21/10/2015</a:t>
+              <a:t>22/10/2015</a:t>
             </a:fld>
             <a:endParaRPr lang="en-GB"/>
           </a:p>
@@ -7119,7 +7337,7 @@
           <a:p>
             <a:fld id="{8A04FFFD-6AAA-4290-B9C8-6140E8302CD5}" type="datetimeFigureOut">
               <a:rPr lang="en-GB" smtClean="0"/>
-              <a:t>21/10/2015</a:t>
+              <a:t>22/10/2015</a:t>
             </a:fld>
             <a:endParaRPr lang="en-GB"/>
           </a:p>
@@ -7354,7 +7572,7 @@
           <a:p>
             <a:fld id="{8A04FFFD-6AAA-4290-B9C8-6140E8302CD5}" type="datetimeFigureOut">
               <a:rPr lang="en-GB" smtClean="0"/>
-              <a:t>21/10/2015</a:t>
+              <a:t>22/10/2015</a:t>
             </a:fld>
             <a:endParaRPr lang="en-GB"/>
           </a:p>
@@ -7724,7 +7942,7 @@
           <a:p>
             <a:fld id="{8A04FFFD-6AAA-4290-B9C8-6140E8302CD5}" type="datetimeFigureOut">
               <a:rPr lang="en-GB" smtClean="0"/>
-              <a:t>21/10/2015</a:t>
+              <a:t>22/10/2015</a:t>
             </a:fld>
             <a:endParaRPr lang="en-GB"/>
           </a:p>
@@ -7845,7 +8063,7 @@
           <a:p>
             <a:fld id="{8A04FFFD-6AAA-4290-B9C8-6140E8302CD5}" type="datetimeFigureOut">
               <a:rPr lang="en-GB" smtClean="0"/>
-              <a:t>21/10/2015</a:t>
+              <a:t>22/10/2015</a:t>
             </a:fld>
             <a:endParaRPr lang="en-GB"/>
           </a:p>
@@ -7943,7 +8161,7 @@
           <a:p>
             <a:fld id="{8A04FFFD-6AAA-4290-B9C8-6140E8302CD5}" type="datetimeFigureOut">
               <a:rPr lang="en-GB" smtClean="0"/>
-              <a:t>21/10/2015</a:t>
+              <a:t>22/10/2015</a:t>
             </a:fld>
             <a:endParaRPr lang="en-GB"/>
           </a:p>
@@ -8223,7 +8441,7 @@
           <a:p>
             <a:fld id="{8A04FFFD-6AAA-4290-B9C8-6140E8302CD5}" type="datetimeFigureOut">
               <a:rPr lang="en-GB" smtClean="0"/>
-              <a:t>21/10/2015</a:t>
+              <a:t>22/10/2015</a:t>
             </a:fld>
             <a:endParaRPr lang="en-GB"/>
           </a:p>
@@ -8483,7 +8701,7 @@
           <a:p>
             <a:fld id="{8A04FFFD-6AAA-4290-B9C8-6140E8302CD5}" type="datetimeFigureOut">
               <a:rPr lang="en-GB" smtClean="0"/>
-              <a:t>21/10/2015</a:t>
+              <a:t>22/10/2015</a:t>
             </a:fld>
             <a:endParaRPr lang="en-GB"/>
           </a:p>
@@ -8708,7 +8926,7 @@
           <a:p>
             <a:fld id="{8A04FFFD-6AAA-4290-B9C8-6140E8302CD5}" type="datetimeFigureOut">
               <a:rPr lang="en-GB" smtClean="0"/>
-              <a:t>21/10/2015</a:t>
+              <a:t>22/10/2015</a:t>
             </a:fld>
             <a:endParaRPr lang="en-GB"/>
           </a:p>
@@ -9470,11 +9688,11 @@
   <p:clrMapOvr>
     <a:masterClrMapping/>
   </p:clrMapOvr>
-  <mc:AlternateContent xmlns:mc="http://schemas.openxmlformats.org/markup-compatibility/2006">
-    <mc:Choice xmlns:p14="http://schemas.microsoft.com/office/powerpoint/2010/main" Requires="p14">
+  <mc:AlternateContent xmlns:mc="http://schemas.openxmlformats.org/markup-compatibility/2006" xmlns:p14="http://schemas.microsoft.com/office/powerpoint/2010/main">
+    <mc:Choice Requires="p14">
       <p:transition p14:dur="0"/>
     </mc:Choice>
-    <mc:Fallback>
+    <mc:Fallback xmlns="">
       <p:transition/>
     </mc:Fallback>
   </mc:AlternateContent>
@@ -11782,7 +12000,7 @@
               <a:t>with 154 million records on Azure Table Storage – the story of “Have I been </a:t>
             </a:r>
             <a:r>
-              <a:rPr lang="en-GB" sz="1800" cap="none" dirty="0" err="1"/>
+              <a:rPr lang="en-GB" sz="1800" cap="none" dirty="0" err="1" smtClean="0"/>
               <a:t>pwned</a:t>
             </a:r>
             <a:r>
@@ -11985,6 +12203,903 @@
 </file>
 
 <file path=ppt/slides/slide20.xml><?xml version="1.0" encoding="utf-8"?>
+<p:sld xmlns:a="http://schemas.openxmlformats.org/drawingml/2006/main" xmlns:r="http://schemas.openxmlformats.org/officeDocument/2006/relationships" xmlns:p="http://schemas.openxmlformats.org/presentationml/2006/main">
+  <p:cSld>
+    <p:spTree>
+      <p:nvGrpSpPr>
+        <p:cNvPr id="1" name=""/>
+        <p:cNvGrpSpPr/>
+        <p:nvPr/>
+      </p:nvGrpSpPr>
+      <p:grpSpPr>
+        <a:xfrm>
+          <a:off x="0" y="0"/>
+          <a:ext cx="0" cy="0"/>
+          <a:chOff x="0" y="0"/>
+          <a:chExt cx="0" cy="0"/>
+        </a:xfrm>
+      </p:grpSpPr>
+      <p:pic>
+        <p:nvPicPr>
+          <p:cNvPr id="5" name="Picture Placeholder 4"/>
+          <p:cNvPicPr>
+            <a:picLocks noGrp="1" noChangeAspect="1"/>
+          </p:cNvPicPr>
+          <p:nvPr>
+            <p:ph type="pic" sz="quarter" idx="10"/>
+          </p:nvPr>
+        </p:nvPicPr>
+        <p:blipFill>
+          <a:blip r:embed="rId3">
+            <a:extLst>
+              <a:ext uri="{28A0092B-C50C-407E-A947-70E740481C1C}">
+                <a14:useLocalDpi xmlns:a14="http://schemas.microsoft.com/office/drawing/2010/main" val="0"/>
+              </a:ext>
+            </a:extLst>
+          </a:blip>
+          <a:stretch>
+            <a:fillRect/>
+          </a:stretch>
+        </p:blipFill>
+        <p:spPr>
+          <a:xfrm>
+            <a:off x="827584" y="1340768"/>
+            <a:ext cx="2700000" cy="2700000"/>
+          </a:xfrm>
+        </p:spPr>
+      </p:pic>
+      <p:sp>
+        <p:nvSpPr>
+          <p:cNvPr id="4" name="Title 3"/>
+          <p:cNvSpPr>
+            <a:spLocks noGrp="1"/>
+          </p:cNvSpPr>
+          <p:nvPr>
+            <p:ph type="title"/>
+          </p:nvPr>
+        </p:nvSpPr>
+        <p:spPr>
+          <a:xfrm>
+            <a:off x="0" y="122025"/>
+            <a:ext cx="9143999" cy="765081"/>
+          </a:xfrm>
+        </p:spPr>
+        <p:txBody>
+          <a:bodyPr anchor="ctr" anchorCtr="1">
+            <a:spAutoFit/>
+          </a:bodyPr>
+          <a:lstStyle/>
+          <a:p>
+            <a:r>
+              <a:rPr lang="en-GB" dirty="0" smtClean="0"/>
+              <a:t>Distributing Your APP</a:t>
+            </a:r>
+            <a:endParaRPr lang="en-GB" dirty="0"/>
+          </a:p>
+        </p:txBody>
+      </p:sp>
+      <p:pic>
+        <p:nvPicPr>
+          <p:cNvPr id="2" name="Picture 1"/>
+          <p:cNvPicPr>
+            <a:picLocks noChangeAspect="1"/>
+          </p:cNvPicPr>
+          <p:nvPr/>
+        </p:nvPicPr>
+        <p:blipFill>
+          <a:blip r:embed="rId4">
+            <a:extLst>
+              <a:ext uri="{28A0092B-C50C-407E-A947-70E740481C1C}">
+                <a14:useLocalDpi xmlns:a14="http://schemas.microsoft.com/office/drawing/2010/main" val="0"/>
+              </a:ext>
+            </a:extLst>
+          </a:blip>
+          <a:stretch>
+            <a:fillRect/>
+          </a:stretch>
+        </p:blipFill>
+        <p:spPr>
+          <a:xfrm>
+            <a:off x="5436096" y="3573016"/>
+            <a:ext cx="2700000" cy="2700000"/>
+          </a:xfrm>
+          <a:prstGeom prst="rect">
+            <a:avLst/>
+          </a:prstGeom>
+        </p:spPr>
+      </p:pic>
+    </p:spTree>
+    <p:extLst>
+      <p:ext uri="{BB962C8B-B14F-4D97-AF65-F5344CB8AC3E}">
+        <p14:creationId xmlns:p14="http://schemas.microsoft.com/office/powerpoint/2010/main" val="3122039734"/>
+      </p:ext>
+    </p:extLst>
+  </p:cSld>
+  <p:clrMapOvr>
+    <a:masterClrMapping/>
+  </p:clrMapOvr>
+  <p:transition spd="slow">
+    <p:push/>
+  </p:transition>
+  <p:timing>
+    <p:tnLst>
+      <p:par>
+        <p:cTn id="1" dur="indefinite" restart="never" nodeType="tmRoot"/>
+      </p:par>
+    </p:tnLst>
+  </p:timing>
+</p:sld>
+</file>
+
+<file path=ppt/slides/slide21.xml><?xml version="1.0" encoding="utf-8"?>
+<p:sld xmlns:a="http://schemas.openxmlformats.org/drawingml/2006/main" xmlns:r="http://schemas.openxmlformats.org/officeDocument/2006/relationships" xmlns:p="http://schemas.openxmlformats.org/presentationml/2006/main">
+  <p:cSld>
+    <p:spTree>
+      <p:nvGrpSpPr>
+        <p:cNvPr id="1" name=""/>
+        <p:cNvGrpSpPr/>
+        <p:nvPr/>
+      </p:nvGrpSpPr>
+      <p:grpSpPr>
+        <a:xfrm>
+          <a:off x="0" y="0"/>
+          <a:ext cx="0" cy="0"/>
+          <a:chOff x="0" y="0"/>
+          <a:chExt cx="0" cy="0"/>
+        </a:xfrm>
+      </p:grpSpPr>
+      <p:sp>
+        <p:nvSpPr>
+          <p:cNvPr id="4" name="Title 3"/>
+          <p:cNvSpPr>
+            <a:spLocks noGrp="1"/>
+          </p:cNvSpPr>
+          <p:nvPr>
+            <p:ph type="title"/>
+          </p:nvPr>
+        </p:nvSpPr>
+        <p:spPr>
+          <a:xfrm>
+            <a:off x="0" y="122025"/>
+            <a:ext cx="9143999" cy="765081"/>
+          </a:xfrm>
+        </p:spPr>
+        <p:txBody>
+          <a:bodyPr anchor="ctr" anchorCtr="1">
+            <a:spAutoFit/>
+          </a:bodyPr>
+          <a:lstStyle/>
+          <a:p>
+            <a:r>
+              <a:rPr lang="en-GB" dirty="0" smtClean="0"/>
+              <a:t>What are </a:t>
+            </a:r>
+            <a:r>
+              <a:rPr lang="en-GB" dirty="0" err="1" smtClean="0"/>
+              <a:t>WebJobs</a:t>
+            </a:r>
+            <a:r>
+              <a:rPr lang="en-GB" dirty="0" smtClean="0"/>
+              <a:t>?</a:t>
+            </a:r>
+            <a:endParaRPr lang="en-GB" dirty="0"/>
+          </a:p>
+        </p:txBody>
+      </p:sp>
+      <p:sp>
+        <p:nvSpPr>
+          <p:cNvPr id="5" name="TextBox 4"/>
+          <p:cNvSpPr txBox="1"/>
+          <p:nvPr/>
+        </p:nvSpPr>
+        <p:spPr>
+          <a:xfrm>
+            <a:off x="2195735" y="1412776"/>
+            <a:ext cx="4752528" cy="4306692"/>
+          </a:xfrm>
+          <a:prstGeom prst="rect">
+            <a:avLst/>
+          </a:prstGeom>
+          <a:noFill/>
+        </p:spPr>
+        <p:txBody>
+          <a:bodyPr wrap="square" rtlCol="0">
+            <a:spAutoFit/>
+          </a:bodyPr>
+          <a:lstStyle/>
+          <a:p>
+            <a:pPr marL="342900" indent="-342900">
+              <a:lnSpc>
+                <a:spcPct val="200000"/>
+              </a:lnSpc>
+              <a:buClr>
+                <a:srgbClr val="CB623C"/>
+              </a:buClr>
+              <a:buFont typeface="Georgia" panose="02040502050405020303" pitchFamily="18" charset="0"/>
+              <a:buChar char="»"/>
+            </a:pPr>
+            <a:r>
+              <a:rPr lang="en-GB" sz="2000" dirty="0" smtClean="0">
+                <a:solidFill>
+                  <a:srgbClr val="737373"/>
+                </a:solidFill>
+                <a:latin typeface="Georgia" panose="02040502050405020303" pitchFamily="18" charset="0"/>
+              </a:rPr>
+              <a:t>.</a:t>
+            </a:r>
+            <a:r>
+              <a:rPr lang="en-GB" sz="2000" dirty="0" err="1" smtClean="0">
+                <a:solidFill>
+                  <a:srgbClr val="737373"/>
+                </a:solidFill>
+                <a:latin typeface="Georgia" panose="02040502050405020303" pitchFamily="18" charset="0"/>
+              </a:rPr>
+              <a:t>cmd</a:t>
+            </a:r>
+            <a:r>
+              <a:rPr lang="en-GB" sz="2000" dirty="0">
+                <a:solidFill>
+                  <a:srgbClr val="737373"/>
+                </a:solidFill>
+                <a:latin typeface="Georgia" panose="02040502050405020303" pitchFamily="18" charset="0"/>
+              </a:rPr>
+              <a:t>, .bat, .exe (using windows </a:t>
+            </a:r>
+            <a:r>
+              <a:rPr lang="en-GB" sz="2000" dirty="0" err="1">
+                <a:solidFill>
+                  <a:srgbClr val="737373"/>
+                </a:solidFill>
+                <a:latin typeface="Georgia" panose="02040502050405020303" pitchFamily="18" charset="0"/>
+              </a:rPr>
+              <a:t>cmd</a:t>
+            </a:r>
+            <a:r>
+              <a:rPr lang="en-GB" sz="2000" dirty="0">
+                <a:solidFill>
+                  <a:srgbClr val="737373"/>
+                </a:solidFill>
+                <a:latin typeface="Georgia" panose="02040502050405020303" pitchFamily="18" charset="0"/>
+              </a:rPr>
+              <a:t>)</a:t>
+            </a:r>
+          </a:p>
+          <a:p>
+            <a:pPr marL="342900" indent="-342900">
+              <a:lnSpc>
+                <a:spcPct val="200000"/>
+              </a:lnSpc>
+              <a:buClr>
+                <a:srgbClr val="CB623C"/>
+              </a:buClr>
+              <a:buFont typeface="Georgia" panose="02040502050405020303" pitchFamily="18" charset="0"/>
+              <a:buChar char="»"/>
+            </a:pPr>
+            <a:r>
+              <a:rPr lang="en-GB" sz="2000" dirty="0">
+                <a:solidFill>
+                  <a:srgbClr val="737373"/>
+                </a:solidFill>
+                <a:latin typeface="Georgia" panose="02040502050405020303" pitchFamily="18" charset="0"/>
+              </a:rPr>
+              <a:t>.ps1 (using </a:t>
+            </a:r>
+            <a:r>
+              <a:rPr lang="en-GB" sz="2000" dirty="0" err="1">
+                <a:solidFill>
+                  <a:srgbClr val="737373"/>
+                </a:solidFill>
+                <a:latin typeface="Georgia" panose="02040502050405020303" pitchFamily="18" charset="0"/>
+              </a:rPr>
+              <a:t>powershell</a:t>
+            </a:r>
+            <a:r>
+              <a:rPr lang="en-GB" sz="2000" dirty="0">
+                <a:solidFill>
+                  <a:srgbClr val="737373"/>
+                </a:solidFill>
+                <a:latin typeface="Georgia" panose="02040502050405020303" pitchFamily="18" charset="0"/>
+              </a:rPr>
+              <a:t>)</a:t>
+            </a:r>
+          </a:p>
+          <a:p>
+            <a:pPr marL="342900" indent="-342900">
+              <a:lnSpc>
+                <a:spcPct val="200000"/>
+              </a:lnSpc>
+              <a:buClr>
+                <a:srgbClr val="CB623C"/>
+              </a:buClr>
+              <a:buFont typeface="Georgia" panose="02040502050405020303" pitchFamily="18" charset="0"/>
+              <a:buChar char="»"/>
+            </a:pPr>
+            <a:r>
+              <a:rPr lang="en-GB" sz="2000" dirty="0">
+                <a:solidFill>
+                  <a:srgbClr val="737373"/>
+                </a:solidFill>
+                <a:latin typeface="Georgia" panose="02040502050405020303" pitchFamily="18" charset="0"/>
+              </a:rPr>
+              <a:t>.</a:t>
+            </a:r>
+            <a:r>
+              <a:rPr lang="en-GB" sz="2000" dirty="0" err="1">
+                <a:solidFill>
+                  <a:srgbClr val="737373"/>
+                </a:solidFill>
+                <a:latin typeface="Georgia" panose="02040502050405020303" pitchFamily="18" charset="0"/>
+              </a:rPr>
+              <a:t>sh</a:t>
+            </a:r>
+            <a:r>
+              <a:rPr lang="en-GB" sz="2000" dirty="0">
+                <a:solidFill>
+                  <a:srgbClr val="737373"/>
+                </a:solidFill>
+                <a:latin typeface="Georgia" panose="02040502050405020303" pitchFamily="18" charset="0"/>
+              </a:rPr>
+              <a:t> (using bash)</a:t>
+            </a:r>
+          </a:p>
+          <a:p>
+            <a:pPr marL="342900" indent="-342900">
+              <a:lnSpc>
+                <a:spcPct val="200000"/>
+              </a:lnSpc>
+              <a:buClr>
+                <a:srgbClr val="CB623C"/>
+              </a:buClr>
+              <a:buFont typeface="Georgia" panose="02040502050405020303" pitchFamily="18" charset="0"/>
+              <a:buChar char="»"/>
+            </a:pPr>
+            <a:r>
+              <a:rPr lang="en-GB" sz="2000" dirty="0">
+                <a:solidFill>
+                  <a:srgbClr val="737373"/>
+                </a:solidFill>
+                <a:latin typeface="Georgia" panose="02040502050405020303" pitchFamily="18" charset="0"/>
+              </a:rPr>
+              <a:t>.</a:t>
+            </a:r>
+            <a:r>
+              <a:rPr lang="en-GB" sz="2000" dirty="0" err="1">
+                <a:solidFill>
+                  <a:srgbClr val="737373"/>
+                </a:solidFill>
+                <a:latin typeface="Georgia" panose="02040502050405020303" pitchFamily="18" charset="0"/>
+              </a:rPr>
+              <a:t>php</a:t>
+            </a:r>
+            <a:r>
+              <a:rPr lang="en-GB" sz="2000" dirty="0">
+                <a:solidFill>
+                  <a:srgbClr val="737373"/>
+                </a:solidFill>
+                <a:latin typeface="Georgia" panose="02040502050405020303" pitchFamily="18" charset="0"/>
+              </a:rPr>
+              <a:t> (using </a:t>
+            </a:r>
+            <a:r>
+              <a:rPr lang="en-GB" sz="2000" dirty="0" err="1">
+                <a:solidFill>
+                  <a:srgbClr val="737373"/>
+                </a:solidFill>
+                <a:latin typeface="Georgia" panose="02040502050405020303" pitchFamily="18" charset="0"/>
+              </a:rPr>
+              <a:t>php</a:t>
+            </a:r>
+            <a:r>
+              <a:rPr lang="en-GB" sz="2000" dirty="0">
+                <a:solidFill>
+                  <a:srgbClr val="737373"/>
+                </a:solidFill>
+                <a:latin typeface="Georgia" panose="02040502050405020303" pitchFamily="18" charset="0"/>
+              </a:rPr>
+              <a:t>)</a:t>
+            </a:r>
+          </a:p>
+          <a:p>
+            <a:pPr marL="342900" indent="-342900">
+              <a:lnSpc>
+                <a:spcPct val="200000"/>
+              </a:lnSpc>
+              <a:buClr>
+                <a:srgbClr val="CB623C"/>
+              </a:buClr>
+              <a:buFont typeface="Georgia" panose="02040502050405020303" pitchFamily="18" charset="0"/>
+              <a:buChar char="»"/>
+            </a:pPr>
+            <a:r>
+              <a:rPr lang="en-GB" sz="2000" dirty="0">
+                <a:solidFill>
+                  <a:srgbClr val="737373"/>
+                </a:solidFill>
+                <a:latin typeface="Georgia" panose="02040502050405020303" pitchFamily="18" charset="0"/>
+              </a:rPr>
+              <a:t>.</a:t>
+            </a:r>
+            <a:r>
+              <a:rPr lang="en-GB" sz="2000" dirty="0" err="1">
+                <a:solidFill>
+                  <a:srgbClr val="737373"/>
+                </a:solidFill>
+                <a:latin typeface="Georgia" panose="02040502050405020303" pitchFamily="18" charset="0"/>
+              </a:rPr>
+              <a:t>py</a:t>
+            </a:r>
+            <a:r>
+              <a:rPr lang="en-GB" sz="2000" dirty="0">
+                <a:solidFill>
+                  <a:srgbClr val="737373"/>
+                </a:solidFill>
+                <a:latin typeface="Georgia" panose="02040502050405020303" pitchFamily="18" charset="0"/>
+              </a:rPr>
+              <a:t> (using python)</a:t>
+            </a:r>
+          </a:p>
+          <a:p>
+            <a:pPr marL="342900" indent="-342900">
+              <a:lnSpc>
+                <a:spcPct val="200000"/>
+              </a:lnSpc>
+              <a:buClr>
+                <a:srgbClr val="CB623C"/>
+              </a:buClr>
+              <a:buFont typeface="Georgia" panose="02040502050405020303" pitchFamily="18" charset="0"/>
+              <a:buChar char="»"/>
+            </a:pPr>
+            <a:r>
+              <a:rPr lang="en-GB" sz="2000" dirty="0">
+                <a:solidFill>
+                  <a:srgbClr val="737373"/>
+                </a:solidFill>
+                <a:latin typeface="Georgia" panose="02040502050405020303" pitchFamily="18" charset="0"/>
+              </a:rPr>
+              <a:t>.</a:t>
+            </a:r>
+            <a:r>
+              <a:rPr lang="en-GB" sz="2000" dirty="0" err="1">
+                <a:solidFill>
+                  <a:srgbClr val="737373"/>
+                </a:solidFill>
+                <a:latin typeface="Georgia" panose="02040502050405020303" pitchFamily="18" charset="0"/>
+              </a:rPr>
+              <a:t>js</a:t>
+            </a:r>
+            <a:r>
+              <a:rPr lang="en-GB" sz="2000" dirty="0">
+                <a:solidFill>
+                  <a:srgbClr val="737373"/>
+                </a:solidFill>
+                <a:latin typeface="Georgia" panose="02040502050405020303" pitchFamily="18" charset="0"/>
+              </a:rPr>
+              <a:t> (using node)</a:t>
+            </a:r>
+          </a:p>
+          <a:p>
+            <a:pPr marL="342900" indent="-342900">
+              <a:lnSpc>
+                <a:spcPct val="200000"/>
+              </a:lnSpc>
+              <a:buClr>
+                <a:srgbClr val="CB623C"/>
+              </a:buClr>
+              <a:buFont typeface="Georgia" panose="02040502050405020303" pitchFamily="18" charset="0"/>
+              <a:buChar char="»"/>
+            </a:pPr>
+            <a:r>
+              <a:rPr lang="en-GB" sz="2000" dirty="0">
+                <a:solidFill>
+                  <a:srgbClr val="737373"/>
+                </a:solidFill>
+                <a:latin typeface="Georgia" panose="02040502050405020303" pitchFamily="18" charset="0"/>
+              </a:rPr>
+              <a:t>.jar (using java</a:t>
+            </a:r>
+            <a:r>
+              <a:rPr lang="en-GB" sz="2000" dirty="0" smtClean="0">
+                <a:solidFill>
+                  <a:srgbClr val="737373"/>
+                </a:solidFill>
+                <a:latin typeface="Georgia" panose="02040502050405020303" pitchFamily="18" charset="0"/>
+              </a:rPr>
+              <a:t>)</a:t>
+            </a:r>
+            <a:endParaRPr lang="en-GB" sz="2000" dirty="0">
+              <a:solidFill>
+                <a:srgbClr val="737373"/>
+              </a:solidFill>
+              <a:latin typeface="Georgia" panose="02040502050405020303" pitchFamily="18" charset="0"/>
+            </a:endParaRPr>
+          </a:p>
+        </p:txBody>
+      </p:sp>
+    </p:spTree>
+    <p:extLst>
+      <p:ext uri="{BB962C8B-B14F-4D97-AF65-F5344CB8AC3E}">
+        <p14:creationId xmlns:p14="http://schemas.microsoft.com/office/powerpoint/2010/main" val="2639179751"/>
+      </p:ext>
+    </p:extLst>
+  </p:cSld>
+  <p:clrMapOvr>
+    <a:masterClrMapping/>
+  </p:clrMapOvr>
+  <p:transition spd="slow">
+    <p:push/>
+  </p:transition>
+  <p:timing>
+    <p:tnLst>
+      <p:par>
+        <p:cTn id="1" dur="indefinite" restart="never" nodeType="tmRoot">
+          <p:childTnLst>
+            <p:seq concurrent="1" nextAc="seek">
+              <p:cTn id="2" dur="indefinite" nodeType="mainSeq">
+                <p:childTnLst>
+                  <p:par>
+                    <p:cTn id="3" fill="hold">
+                      <p:stCondLst>
+                        <p:cond delay="indefinite"/>
+                        <p:cond evt="onBegin" delay="0">
+                          <p:tn val="2"/>
+                        </p:cond>
+                      </p:stCondLst>
+                      <p:childTnLst>
+                        <p:par>
+                          <p:cTn id="4" fill="hold">
+                            <p:stCondLst>
+                              <p:cond delay="0"/>
+                            </p:stCondLst>
+                            <p:childTnLst>
+                              <p:par>
+                                <p:cTn id="5" presetID="1" presetClass="entr" presetSubtype="0" fill="hold" nodeType="withEffect">
+                                  <p:stCondLst>
+                                    <p:cond delay="0"/>
+                                  </p:stCondLst>
+                                  <p:childTnLst>
+                                    <p:set>
+                                      <p:cBhvr>
+                                        <p:cTn id="6" dur="1" fill="hold">
+                                          <p:stCondLst>
+                                            <p:cond delay="0"/>
+                                          </p:stCondLst>
+                                        </p:cTn>
+                                        <p:tgtEl>
+                                          <p:spTgt spid="5">
+                                            <p:txEl>
+                                              <p:pRg st="0" end="0"/>
+                                            </p:txEl>
+                                          </p:spTgt>
+                                        </p:tgtEl>
+                                        <p:attrNameLst>
+                                          <p:attrName>style.visibility</p:attrName>
+                                        </p:attrNameLst>
+                                      </p:cBhvr>
+                                      <p:to>
+                                        <p:strVal val="visible"/>
+                                      </p:to>
+                                    </p:set>
+                                  </p:childTnLst>
+                                </p:cTn>
+                              </p:par>
+                              <p:par>
+                                <p:cTn id="7" presetID="1" presetClass="entr" presetSubtype="0" fill="hold" nodeType="withEffect">
+                                  <p:stCondLst>
+                                    <p:cond delay="0"/>
+                                  </p:stCondLst>
+                                  <p:childTnLst>
+                                    <p:set>
+                                      <p:cBhvr>
+                                        <p:cTn id="8" dur="1" fill="hold">
+                                          <p:stCondLst>
+                                            <p:cond delay="0"/>
+                                          </p:stCondLst>
+                                        </p:cTn>
+                                        <p:tgtEl>
+                                          <p:spTgt spid="5">
+                                            <p:txEl>
+                                              <p:pRg st="1" end="1"/>
+                                            </p:txEl>
+                                          </p:spTgt>
+                                        </p:tgtEl>
+                                        <p:attrNameLst>
+                                          <p:attrName>style.visibility</p:attrName>
+                                        </p:attrNameLst>
+                                      </p:cBhvr>
+                                      <p:to>
+                                        <p:strVal val="visible"/>
+                                      </p:to>
+                                    </p:set>
+                                  </p:childTnLst>
+                                </p:cTn>
+                              </p:par>
+                              <p:par>
+                                <p:cTn id="9" presetID="1" presetClass="entr" presetSubtype="0" fill="hold" nodeType="withEffect">
+                                  <p:stCondLst>
+                                    <p:cond delay="0"/>
+                                  </p:stCondLst>
+                                  <p:childTnLst>
+                                    <p:set>
+                                      <p:cBhvr>
+                                        <p:cTn id="10" dur="1" fill="hold">
+                                          <p:stCondLst>
+                                            <p:cond delay="0"/>
+                                          </p:stCondLst>
+                                        </p:cTn>
+                                        <p:tgtEl>
+                                          <p:spTgt spid="5">
+                                            <p:txEl>
+                                              <p:pRg st="2" end="2"/>
+                                            </p:txEl>
+                                          </p:spTgt>
+                                        </p:tgtEl>
+                                        <p:attrNameLst>
+                                          <p:attrName>style.visibility</p:attrName>
+                                        </p:attrNameLst>
+                                      </p:cBhvr>
+                                      <p:to>
+                                        <p:strVal val="visible"/>
+                                      </p:to>
+                                    </p:set>
+                                  </p:childTnLst>
+                                </p:cTn>
+                              </p:par>
+                              <p:par>
+                                <p:cTn id="11" presetID="1" presetClass="entr" presetSubtype="0" fill="hold" nodeType="withEffect">
+                                  <p:stCondLst>
+                                    <p:cond delay="0"/>
+                                  </p:stCondLst>
+                                  <p:childTnLst>
+                                    <p:set>
+                                      <p:cBhvr>
+                                        <p:cTn id="12" dur="1" fill="hold">
+                                          <p:stCondLst>
+                                            <p:cond delay="0"/>
+                                          </p:stCondLst>
+                                        </p:cTn>
+                                        <p:tgtEl>
+                                          <p:spTgt spid="5">
+                                            <p:txEl>
+                                              <p:pRg st="3" end="3"/>
+                                            </p:txEl>
+                                          </p:spTgt>
+                                        </p:tgtEl>
+                                        <p:attrNameLst>
+                                          <p:attrName>style.visibility</p:attrName>
+                                        </p:attrNameLst>
+                                      </p:cBhvr>
+                                      <p:to>
+                                        <p:strVal val="visible"/>
+                                      </p:to>
+                                    </p:set>
+                                  </p:childTnLst>
+                                </p:cTn>
+                              </p:par>
+                              <p:par>
+                                <p:cTn id="13" presetID="1" presetClass="entr" presetSubtype="0" fill="hold" nodeType="withEffect">
+                                  <p:stCondLst>
+                                    <p:cond delay="0"/>
+                                  </p:stCondLst>
+                                  <p:childTnLst>
+                                    <p:set>
+                                      <p:cBhvr>
+                                        <p:cTn id="14" dur="1" fill="hold">
+                                          <p:stCondLst>
+                                            <p:cond delay="0"/>
+                                          </p:stCondLst>
+                                        </p:cTn>
+                                        <p:tgtEl>
+                                          <p:spTgt spid="5">
+                                            <p:txEl>
+                                              <p:pRg st="4" end="4"/>
+                                            </p:txEl>
+                                          </p:spTgt>
+                                        </p:tgtEl>
+                                        <p:attrNameLst>
+                                          <p:attrName>style.visibility</p:attrName>
+                                        </p:attrNameLst>
+                                      </p:cBhvr>
+                                      <p:to>
+                                        <p:strVal val="visible"/>
+                                      </p:to>
+                                    </p:set>
+                                  </p:childTnLst>
+                                </p:cTn>
+                              </p:par>
+                              <p:par>
+                                <p:cTn id="15" presetID="1" presetClass="entr" presetSubtype="0" fill="hold" nodeType="withEffect">
+                                  <p:stCondLst>
+                                    <p:cond delay="0"/>
+                                  </p:stCondLst>
+                                  <p:childTnLst>
+                                    <p:set>
+                                      <p:cBhvr>
+                                        <p:cTn id="16" dur="1" fill="hold">
+                                          <p:stCondLst>
+                                            <p:cond delay="0"/>
+                                          </p:stCondLst>
+                                        </p:cTn>
+                                        <p:tgtEl>
+                                          <p:spTgt spid="5">
+                                            <p:txEl>
+                                              <p:pRg st="5" end="5"/>
+                                            </p:txEl>
+                                          </p:spTgt>
+                                        </p:tgtEl>
+                                        <p:attrNameLst>
+                                          <p:attrName>style.visibility</p:attrName>
+                                        </p:attrNameLst>
+                                      </p:cBhvr>
+                                      <p:to>
+                                        <p:strVal val="visible"/>
+                                      </p:to>
+                                    </p:set>
+                                  </p:childTnLst>
+                                </p:cTn>
+                              </p:par>
+                              <p:par>
+                                <p:cTn id="17" presetID="1" presetClass="entr" presetSubtype="0" fill="hold" nodeType="withEffect">
+                                  <p:stCondLst>
+                                    <p:cond delay="0"/>
+                                  </p:stCondLst>
+                                  <p:childTnLst>
+                                    <p:set>
+                                      <p:cBhvr>
+                                        <p:cTn id="18" dur="1" fill="hold">
+                                          <p:stCondLst>
+                                            <p:cond delay="0"/>
+                                          </p:stCondLst>
+                                        </p:cTn>
+                                        <p:tgtEl>
+                                          <p:spTgt spid="5">
+                                            <p:txEl>
+                                              <p:pRg st="6" end="6"/>
+                                            </p:txEl>
+                                          </p:spTgt>
+                                        </p:tgtEl>
+                                        <p:attrNameLst>
+                                          <p:attrName>style.visibility</p:attrName>
+                                        </p:attrNameLst>
+                                      </p:cBhvr>
+                                      <p:to>
+                                        <p:strVal val="visible"/>
+                                      </p:to>
+                                    </p:set>
+                                  </p:childTnLst>
+                                </p:cTn>
+                              </p:par>
+                            </p:childTnLst>
+                          </p:cTn>
+                        </p:par>
+                      </p:childTnLst>
+                    </p:cTn>
+                  </p:par>
+                </p:childTnLst>
+              </p:cTn>
+              <p:prevCondLst>
+                <p:cond evt="onPrev" delay="0">
+                  <p:tgtEl>
+                    <p:sldTgt/>
+                  </p:tgtEl>
+                </p:cond>
+              </p:prevCondLst>
+              <p:nextCondLst>
+                <p:cond evt="onNext" delay="0">
+                  <p:tgtEl>
+                    <p:sldTgt/>
+                  </p:tgtEl>
+                </p:cond>
+              </p:nextCondLst>
+            </p:seq>
+          </p:childTnLst>
+        </p:cTn>
+      </p:par>
+    </p:tnLst>
+  </p:timing>
+</p:sld>
+</file>
+
+<file path=ppt/slides/slide22.xml><?xml version="1.0" encoding="utf-8"?>
+<p:sld xmlns:a="http://schemas.openxmlformats.org/drawingml/2006/main" xmlns:r="http://schemas.openxmlformats.org/officeDocument/2006/relationships" xmlns:p="http://schemas.openxmlformats.org/presentationml/2006/main">
+  <p:cSld>
+    <p:spTree>
+      <p:nvGrpSpPr>
+        <p:cNvPr id="1" name=""/>
+        <p:cNvGrpSpPr/>
+        <p:nvPr/>
+      </p:nvGrpSpPr>
+      <p:grpSpPr>
+        <a:xfrm>
+          <a:off x="0" y="0"/>
+          <a:ext cx="0" cy="0"/>
+          <a:chOff x="0" y="0"/>
+          <a:chExt cx="0" cy="0"/>
+        </a:xfrm>
+      </p:grpSpPr>
+      <p:sp>
+        <p:nvSpPr>
+          <p:cNvPr id="4" name="Title 3"/>
+          <p:cNvSpPr>
+            <a:spLocks noGrp="1"/>
+          </p:cNvSpPr>
+          <p:nvPr>
+            <p:ph type="title"/>
+          </p:nvPr>
+        </p:nvSpPr>
+        <p:spPr>
+          <a:xfrm>
+            <a:off x="0" y="122025"/>
+            <a:ext cx="9143999" cy="765081"/>
+          </a:xfrm>
+        </p:spPr>
+        <p:txBody>
+          <a:bodyPr anchor="ctr" anchorCtr="1">
+            <a:spAutoFit/>
+          </a:bodyPr>
+          <a:lstStyle/>
+          <a:p>
+            <a:r>
+              <a:rPr lang="en-GB" dirty="0" smtClean="0"/>
+              <a:t>Worker Roles</a:t>
+            </a:r>
+            <a:endParaRPr lang="en-GB" dirty="0"/>
+          </a:p>
+        </p:txBody>
+      </p:sp>
+      <p:pic>
+        <p:nvPicPr>
+          <p:cNvPr id="3" name="Picture 2"/>
+          <p:cNvPicPr>
+            <a:picLocks noChangeAspect="1"/>
+          </p:cNvPicPr>
+          <p:nvPr/>
+        </p:nvPicPr>
+        <p:blipFill>
+          <a:blip r:embed="rId3">
+            <a:extLst>
+              <a:ext uri="{28A0092B-C50C-407E-A947-70E740481C1C}">
+                <a14:useLocalDpi xmlns:a14="http://schemas.microsoft.com/office/drawing/2010/main" val="0"/>
+              </a:ext>
+            </a:extLst>
+          </a:blip>
+          <a:stretch>
+            <a:fillRect/>
+          </a:stretch>
+        </p:blipFill>
+        <p:spPr>
+          <a:xfrm>
+            <a:off x="1475657" y="1124744"/>
+            <a:ext cx="6192684" cy="5407122"/>
+          </a:xfrm>
+          <a:prstGeom prst="rect">
+            <a:avLst/>
+          </a:prstGeom>
+        </p:spPr>
+      </p:pic>
+    </p:spTree>
+    <p:extLst>
+      <p:ext uri="{BB962C8B-B14F-4D97-AF65-F5344CB8AC3E}">
+        <p14:creationId xmlns:p14="http://schemas.microsoft.com/office/powerpoint/2010/main" val="2351633853"/>
+      </p:ext>
+    </p:extLst>
+  </p:cSld>
+  <p:clrMapOvr>
+    <a:masterClrMapping/>
+  </p:clrMapOvr>
+  <p:transition spd="slow">
+    <p:push/>
+  </p:transition>
+  <p:timing>
+    <p:tnLst>
+      <p:par>
+        <p:cTn id="1" dur="indefinite" restart="never" nodeType="tmRoot"/>
+      </p:par>
+    </p:tnLst>
+  </p:timing>
+</p:sld>
+</file>
+
+<file path=ppt/slides/slide23.xml><?xml version="1.0" encoding="utf-8"?>
 <p:sld xmlns:a="http://schemas.openxmlformats.org/drawingml/2006/main" xmlns:r="http://schemas.openxmlformats.org/officeDocument/2006/relationships" xmlns:p="http://schemas.openxmlformats.org/presentationml/2006/main">
   <p:cSld>
     <p:spTree>
@@ -12113,7 +13228,7 @@
 </p:sld>
 </file>
 
-<file path=ppt/slides/slide21.xml><?xml version="1.0" encoding="utf-8"?>
+<file path=ppt/slides/slide24.xml><?xml version="1.0" encoding="utf-8"?>
 <p:sld xmlns:a="http://schemas.openxmlformats.org/drawingml/2006/main" xmlns:r="http://schemas.openxmlformats.org/officeDocument/2006/relationships" xmlns:p="http://schemas.openxmlformats.org/presentationml/2006/main">
   <p:cSld>
     <p:spTree>
@@ -12160,6 +13275,35 @@
           </a:p>
         </p:txBody>
       </p:sp>
+      <p:pic>
+        <p:nvPicPr>
+          <p:cNvPr id="3" name="Picture Placeholder 4"/>
+          <p:cNvPicPr>
+            <a:picLocks noGrp="1" noChangeAspect="1"/>
+          </p:cNvPicPr>
+          <p:nvPr>
+            <p:ph type="pic" sz="quarter" idx="10"/>
+          </p:nvPr>
+        </p:nvPicPr>
+        <p:blipFill>
+          <a:blip r:embed="rId3">
+            <a:extLst>
+              <a:ext uri="{28A0092B-C50C-407E-A947-70E740481C1C}">
+                <a14:useLocalDpi xmlns:a14="http://schemas.microsoft.com/office/drawing/2010/main" val="0"/>
+              </a:ext>
+            </a:extLst>
+          </a:blip>
+          <a:stretch>
+            <a:fillRect/>
+          </a:stretch>
+        </p:blipFill>
+        <p:spPr>
+          <a:xfrm>
+            <a:off x="1922399" y="1196752"/>
+            <a:ext cx="5299200" cy="5299200"/>
+          </a:xfrm>
+        </p:spPr>
+      </p:pic>
     </p:spTree>
     <p:extLst>
       <p:ext uri="{BB962C8B-B14F-4D97-AF65-F5344CB8AC3E}">
@@ -12183,7 +13327,7 @@
 </p:sld>
 </file>
 
-<file path=ppt/slides/slide22.xml><?xml version="1.0" encoding="utf-8"?>
+<file path=ppt/slides/slide25.xml><?xml version="1.0" encoding="utf-8"?>
 <p:sld xmlns:a="http://schemas.openxmlformats.org/drawingml/2006/main" xmlns:r="http://schemas.openxmlformats.org/officeDocument/2006/relationships" xmlns:p="http://schemas.openxmlformats.org/presentationml/2006/main">
   <p:cSld>
     <p:spTree>
@@ -12663,7 +13807,7 @@
 </p:sld>
 </file>
 
-<file path=ppt/slides/slide23.xml><?xml version="1.0" encoding="utf-8"?>
+<file path=ppt/slides/slide26.xml><?xml version="1.0" encoding="utf-8"?>
 <p:sld xmlns:a="http://schemas.openxmlformats.org/drawingml/2006/main" xmlns:r="http://schemas.openxmlformats.org/officeDocument/2006/relationships" xmlns:p="http://schemas.openxmlformats.org/presentationml/2006/main">
   <p:cSld>
     <p:spTree>
@@ -12680,38 +13824,9 @@
           <a:chExt cx="0" cy="0"/>
         </a:xfrm>
       </p:grpSpPr>
-      <p:pic>
-        <p:nvPicPr>
-          <p:cNvPr id="5" name="Picture Placeholder 4"/>
-          <p:cNvPicPr>
-            <a:picLocks noGrp="1" noChangeAspect="1"/>
-          </p:cNvPicPr>
-          <p:nvPr>
-            <p:ph type="pic" sz="quarter" idx="10"/>
-          </p:nvPr>
-        </p:nvPicPr>
-        <p:blipFill>
-          <a:blip r:embed="rId3">
-            <a:extLst>
-              <a:ext uri="{28A0092B-C50C-407E-A947-70E740481C1C}">
-                <a14:useLocalDpi xmlns:a14="http://schemas.microsoft.com/office/drawing/2010/main" val="0"/>
-              </a:ext>
-            </a:extLst>
-          </a:blip>
-          <a:stretch>
-            <a:fillRect/>
-          </a:stretch>
-        </p:blipFill>
-        <p:spPr>
-          <a:xfrm>
-            <a:off x="827584" y="1340768"/>
-            <a:ext cx="2700000" cy="2700000"/>
-          </a:xfrm>
-        </p:spPr>
-      </p:pic>
-      <p:sp>
-        <p:nvSpPr>
-          <p:cNvPr id="4" name="Title 3"/>
+      <p:sp>
+        <p:nvSpPr>
+          <p:cNvPr id="6" name="Title 3"/>
           <p:cNvSpPr>
             <a:spLocks noGrp="1"/>
           </p:cNvSpPr>
@@ -12733,130 +13848,22 @@
           <a:p>
             <a:r>
               <a:rPr lang="en-GB" dirty="0" smtClean="0"/>
-              <a:t>Background Tasks</a:t>
+              <a:t>Summary</a:t>
             </a:r>
             <a:endParaRPr lang="en-GB" dirty="0"/>
           </a:p>
         </p:txBody>
       </p:sp>
-      <p:pic>
-        <p:nvPicPr>
-          <p:cNvPr id="2" name="Picture 1"/>
-          <p:cNvPicPr>
-            <a:picLocks noChangeAspect="1"/>
-          </p:cNvPicPr>
+      <p:sp>
+        <p:nvSpPr>
+          <p:cNvPr id="7" name="TextBox 6"/>
+          <p:cNvSpPr txBox="1"/>
           <p:nvPr/>
-        </p:nvPicPr>
-        <p:blipFill>
-          <a:blip r:embed="rId4">
-            <a:extLst>
-              <a:ext uri="{28A0092B-C50C-407E-A947-70E740481C1C}">
-                <a14:useLocalDpi xmlns:a14="http://schemas.microsoft.com/office/drawing/2010/main" val="0"/>
-              </a:ext>
-            </a:extLst>
-          </a:blip>
-          <a:stretch>
-            <a:fillRect/>
-          </a:stretch>
-        </p:blipFill>
+        </p:nvSpPr>
         <p:spPr>
           <a:xfrm>
-            <a:off x="5436096" y="3573016"/>
-            <a:ext cx="2700000" cy="2700000"/>
-          </a:xfrm>
-          <a:prstGeom prst="rect">
-            <a:avLst/>
-          </a:prstGeom>
-        </p:spPr>
-      </p:pic>
-    </p:spTree>
-    <p:extLst>
-      <p:ext uri="{BB962C8B-B14F-4D97-AF65-F5344CB8AC3E}">
-        <p14:creationId xmlns:p14="http://schemas.microsoft.com/office/powerpoint/2010/main" val="3122039734"/>
-      </p:ext>
-    </p:extLst>
-  </p:cSld>
-  <p:clrMapOvr>
-    <a:masterClrMapping/>
-  </p:clrMapOvr>
-  <p:transition spd="slow">
-    <p:push/>
-  </p:transition>
-  <p:timing>
-    <p:tnLst>
-      <p:par>
-        <p:cTn id="1" dur="indefinite" restart="never" nodeType="tmRoot"/>
-      </p:par>
-    </p:tnLst>
-  </p:timing>
-</p:sld>
-</file>
-
-<file path=ppt/slides/slide24.xml><?xml version="1.0" encoding="utf-8"?>
-<p:sld xmlns:a="http://schemas.openxmlformats.org/drawingml/2006/main" xmlns:r="http://schemas.openxmlformats.org/officeDocument/2006/relationships" xmlns:p="http://schemas.openxmlformats.org/presentationml/2006/main">
-  <p:cSld>
-    <p:spTree>
-      <p:nvGrpSpPr>
-        <p:cNvPr id="1" name=""/>
-        <p:cNvGrpSpPr/>
-        <p:nvPr/>
-      </p:nvGrpSpPr>
-      <p:grpSpPr>
-        <a:xfrm>
-          <a:off x="0" y="0"/>
-          <a:ext cx="0" cy="0"/>
-          <a:chOff x="0" y="0"/>
-          <a:chExt cx="0" cy="0"/>
-        </a:xfrm>
-      </p:grpSpPr>
-      <p:sp>
-        <p:nvSpPr>
-          <p:cNvPr id="4" name="Title 3"/>
-          <p:cNvSpPr>
-            <a:spLocks noGrp="1"/>
-          </p:cNvSpPr>
-          <p:nvPr>
-            <p:ph type="title"/>
-          </p:nvPr>
-        </p:nvSpPr>
-        <p:spPr>
-          <a:xfrm>
-            <a:off x="0" y="122025"/>
-            <a:ext cx="9143999" cy="765081"/>
-          </a:xfrm>
-        </p:spPr>
-        <p:txBody>
-          <a:bodyPr anchor="ctr" anchorCtr="1">
-            <a:spAutoFit/>
-          </a:bodyPr>
-          <a:lstStyle/>
-          <a:p>
-            <a:r>
-              <a:rPr lang="en-GB" dirty="0" smtClean="0"/>
-              <a:t>What are </a:t>
-            </a:r>
-            <a:r>
-              <a:rPr lang="en-GB" dirty="0" err="1" smtClean="0"/>
-              <a:t>WebJobs</a:t>
-            </a:r>
-            <a:r>
-              <a:rPr lang="en-GB" dirty="0" smtClean="0"/>
-              <a:t>?</a:t>
-            </a:r>
-            <a:endParaRPr lang="en-GB" dirty="0"/>
-          </a:p>
-        </p:txBody>
-      </p:sp>
-      <p:sp>
-        <p:nvSpPr>
-          <p:cNvPr id="5" name="TextBox 4"/>
-          <p:cNvSpPr txBox="1"/>
-          <p:nvPr/>
-        </p:nvSpPr>
-        <p:spPr>
-          <a:xfrm>
-            <a:off x="467544" y="1052736"/>
-            <a:ext cx="8208910" cy="5078313"/>
+            <a:off x="2195735" y="1412776"/>
+            <a:ext cx="4752528" cy="4401205"/>
           </a:xfrm>
           <a:prstGeom prst="rect">
             <a:avLst/>
@@ -12871,328 +13878,16 @@
           <a:p>
             <a:pPr marL="342900" indent="-342900">
               <a:lnSpc>
-                <a:spcPct val="150000"/>
+                <a:spcPct val="200000"/>
               </a:lnSpc>
-              <a:buFont typeface="Arial" panose="020B0604020202020204" pitchFamily="34" charset="0"/>
-              <a:buChar char="•"/>
+              <a:buClr>
+                <a:srgbClr val="CB623C"/>
+              </a:buClr>
+              <a:buFont typeface="Georgia" panose="02040502050405020303" pitchFamily="18" charset="0"/>
+              <a:buChar char="»"/>
             </a:pPr>
             <a:r>
-              <a:rPr lang="en-GB" dirty="0" smtClean="0">
-                <a:solidFill>
-                  <a:srgbClr val="737373"/>
-                </a:solidFill>
-                <a:latin typeface="Georgia" panose="02040502050405020303" pitchFamily="18" charset="0"/>
-              </a:rPr>
-              <a:t>Run scripts and programs in Azure</a:t>
-            </a:r>
-          </a:p>
-          <a:p>
-            <a:pPr marL="342900" indent="-342900">
-              <a:lnSpc>
-                <a:spcPct val="150000"/>
-              </a:lnSpc>
-              <a:buFont typeface="Arial" panose="020B0604020202020204" pitchFamily="34" charset="0"/>
-              <a:buChar char="•"/>
-            </a:pPr>
-            <a:r>
-              <a:rPr lang="en-GB" dirty="0" smtClean="0">
-                <a:solidFill>
-                  <a:srgbClr val="737373"/>
-                </a:solidFill>
-                <a:latin typeface="Georgia" panose="02040502050405020303" pitchFamily="18" charset="0"/>
-              </a:rPr>
-              <a:t>Supported file types</a:t>
-            </a:r>
-          </a:p>
-          <a:p>
-            <a:pPr marL="800100" lvl="1" indent="-342900">
-              <a:lnSpc>
-                <a:spcPct val="150000"/>
-              </a:lnSpc>
-              <a:buFont typeface="Arial" panose="020B0604020202020204" pitchFamily="34" charset="0"/>
-              <a:buChar char="•"/>
-            </a:pPr>
-            <a:r>
-              <a:rPr lang="en-GB" dirty="0">
-                <a:solidFill>
-                  <a:srgbClr val="737373"/>
-                </a:solidFill>
-                <a:latin typeface="Georgia" panose="02040502050405020303" pitchFamily="18" charset="0"/>
-              </a:rPr>
-              <a:t>.</a:t>
-            </a:r>
-            <a:r>
-              <a:rPr lang="en-GB" dirty="0" err="1">
-                <a:solidFill>
-                  <a:srgbClr val="737373"/>
-                </a:solidFill>
-                <a:latin typeface="Georgia" panose="02040502050405020303" pitchFamily="18" charset="0"/>
-              </a:rPr>
-              <a:t>cmd</a:t>
-            </a:r>
-            <a:r>
-              <a:rPr lang="en-GB" dirty="0">
-                <a:solidFill>
-                  <a:srgbClr val="737373"/>
-                </a:solidFill>
-                <a:latin typeface="Georgia" panose="02040502050405020303" pitchFamily="18" charset="0"/>
-              </a:rPr>
-              <a:t>, .bat, .exe (using windows </a:t>
-            </a:r>
-            <a:r>
-              <a:rPr lang="en-GB" dirty="0" err="1">
-                <a:solidFill>
-                  <a:srgbClr val="737373"/>
-                </a:solidFill>
-                <a:latin typeface="Georgia" panose="02040502050405020303" pitchFamily="18" charset="0"/>
-              </a:rPr>
-              <a:t>cmd</a:t>
-            </a:r>
-            <a:r>
-              <a:rPr lang="en-GB" dirty="0">
-                <a:solidFill>
-                  <a:srgbClr val="737373"/>
-                </a:solidFill>
-                <a:latin typeface="Georgia" panose="02040502050405020303" pitchFamily="18" charset="0"/>
-              </a:rPr>
-              <a:t>)</a:t>
-            </a:r>
-          </a:p>
-          <a:p>
-            <a:pPr marL="800100" lvl="1" indent="-342900">
-              <a:lnSpc>
-                <a:spcPct val="150000"/>
-              </a:lnSpc>
-              <a:buFont typeface="Arial" panose="020B0604020202020204" pitchFamily="34" charset="0"/>
-              <a:buChar char="•"/>
-            </a:pPr>
-            <a:r>
-              <a:rPr lang="en-GB" dirty="0">
-                <a:solidFill>
-                  <a:srgbClr val="737373"/>
-                </a:solidFill>
-                <a:latin typeface="Georgia" panose="02040502050405020303" pitchFamily="18" charset="0"/>
-              </a:rPr>
-              <a:t>.ps1 (using </a:t>
-            </a:r>
-            <a:r>
-              <a:rPr lang="en-GB" dirty="0" err="1">
-                <a:solidFill>
-                  <a:srgbClr val="737373"/>
-                </a:solidFill>
-                <a:latin typeface="Georgia" panose="02040502050405020303" pitchFamily="18" charset="0"/>
-              </a:rPr>
-              <a:t>powershell</a:t>
-            </a:r>
-            <a:r>
-              <a:rPr lang="en-GB" dirty="0">
-                <a:solidFill>
-                  <a:srgbClr val="737373"/>
-                </a:solidFill>
-                <a:latin typeface="Georgia" panose="02040502050405020303" pitchFamily="18" charset="0"/>
-              </a:rPr>
-              <a:t>)</a:t>
-            </a:r>
-          </a:p>
-          <a:p>
-            <a:pPr marL="800100" lvl="1" indent="-342900">
-              <a:lnSpc>
-                <a:spcPct val="150000"/>
-              </a:lnSpc>
-              <a:buFont typeface="Arial" panose="020B0604020202020204" pitchFamily="34" charset="0"/>
-              <a:buChar char="•"/>
-            </a:pPr>
-            <a:r>
-              <a:rPr lang="en-GB" dirty="0">
-                <a:solidFill>
-                  <a:srgbClr val="737373"/>
-                </a:solidFill>
-                <a:latin typeface="Georgia" panose="02040502050405020303" pitchFamily="18" charset="0"/>
-              </a:rPr>
-              <a:t>.</a:t>
-            </a:r>
-            <a:r>
-              <a:rPr lang="en-GB" dirty="0" err="1">
-                <a:solidFill>
-                  <a:srgbClr val="737373"/>
-                </a:solidFill>
-                <a:latin typeface="Georgia" panose="02040502050405020303" pitchFamily="18" charset="0"/>
-              </a:rPr>
-              <a:t>sh</a:t>
-            </a:r>
-            <a:r>
-              <a:rPr lang="en-GB" dirty="0">
-                <a:solidFill>
-                  <a:srgbClr val="737373"/>
-                </a:solidFill>
-                <a:latin typeface="Georgia" panose="02040502050405020303" pitchFamily="18" charset="0"/>
-              </a:rPr>
-              <a:t> (using bash)</a:t>
-            </a:r>
-          </a:p>
-          <a:p>
-            <a:pPr marL="800100" lvl="1" indent="-342900">
-              <a:lnSpc>
-                <a:spcPct val="150000"/>
-              </a:lnSpc>
-              <a:buFont typeface="Arial" panose="020B0604020202020204" pitchFamily="34" charset="0"/>
-              <a:buChar char="•"/>
-            </a:pPr>
-            <a:r>
-              <a:rPr lang="en-GB" dirty="0">
-                <a:solidFill>
-                  <a:srgbClr val="737373"/>
-                </a:solidFill>
-                <a:latin typeface="Georgia" panose="02040502050405020303" pitchFamily="18" charset="0"/>
-              </a:rPr>
-              <a:t>.</a:t>
-            </a:r>
-            <a:r>
-              <a:rPr lang="en-GB" dirty="0" err="1">
-                <a:solidFill>
-                  <a:srgbClr val="737373"/>
-                </a:solidFill>
-                <a:latin typeface="Georgia" panose="02040502050405020303" pitchFamily="18" charset="0"/>
-              </a:rPr>
-              <a:t>php</a:t>
-            </a:r>
-            <a:r>
-              <a:rPr lang="en-GB" dirty="0">
-                <a:solidFill>
-                  <a:srgbClr val="737373"/>
-                </a:solidFill>
-                <a:latin typeface="Georgia" panose="02040502050405020303" pitchFamily="18" charset="0"/>
-              </a:rPr>
-              <a:t> (using </a:t>
-            </a:r>
-            <a:r>
-              <a:rPr lang="en-GB" dirty="0" err="1">
-                <a:solidFill>
-                  <a:srgbClr val="737373"/>
-                </a:solidFill>
-                <a:latin typeface="Georgia" panose="02040502050405020303" pitchFamily="18" charset="0"/>
-              </a:rPr>
-              <a:t>php</a:t>
-            </a:r>
-            <a:r>
-              <a:rPr lang="en-GB" dirty="0">
-                <a:solidFill>
-                  <a:srgbClr val="737373"/>
-                </a:solidFill>
-                <a:latin typeface="Georgia" panose="02040502050405020303" pitchFamily="18" charset="0"/>
-              </a:rPr>
-              <a:t>)</a:t>
-            </a:r>
-          </a:p>
-          <a:p>
-            <a:pPr marL="800100" lvl="1" indent="-342900">
-              <a:lnSpc>
-                <a:spcPct val="150000"/>
-              </a:lnSpc>
-              <a:buFont typeface="Arial" panose="020B0604020202020204" pitchFamily="34" charset="0"/>
-              <a:buChar char="•"/>
-            </a:pPr>
-            <a:r>
-              <a:rPr lang="en-GB" dirty="0">
-                <a:solidFill>
-                  <a:srgbClr val="737373"/>
-                </a:solidFill>
-                <a:latin typeface="Georgia" panose="02040502050405020303" pitchFamily="18" charset="0"/>
-              </a:rPr>
-              <a:t>.</a:t>
-            </a:r>
-            <a:r>
-              <a:rPr lang="en-GB" dirty="0" err="1">
-                <a:solidFill>
-                  <a:srgbClr val="737373"/>
-                </a:solidFill>
-                <a:latin typeface="Georgia" panose="02040502050405020303" pitchFamily="18" charset="0"/>
-              </a:rPr>
-              <a:t>py</a:t>
-            </a:r>
-            <a:r>
-              <a:rPr lang="en-GB" dirty="0">
-                <a:solidFill>
-                  <a:srgbClr val="737373"/>
-                </a:solidFill>
-                <a:latin typeface="Georgia" panose="02040502050405020303" pitchFamily="18" charset="0"/>
-              </a:rPr>
-              <a:t> (using python)</a:t>
-            </a:r>
-          </a:p>
-          <a:p>
-            <a:pPr marL="800100" lvl="1" indent="-342900">
-              <a:lnSpc>
-                <a:spcPct val="150000"/>
-              </a:lnSpc>
-              <a:buFont typeface="Arial" panose="020B0604020202020204" pitchFamily="34" charset="0"/>
-              <a:buChar char="•"/>
-            </a:pPr>
-            <a:r>
-              <a:rPr lang="en-GB" dirty="0">
-                <a:solidFill>
-                  <a:srgbClr val="737373"/>
-                </a:solidFill>
-                <a:latin typeface="Georgia" panose="02040502050405020303" pitchFamily="18" charset="0"/>
-              </a:rPr>
-              <a:t>.</a:t>
-            </a:r>
-            <a:r>
-              <a:rPr lang="en-GB" dirty="0" err="1">
-                <a:solidFill>
-                  <a:srgbClr val="737373"/>
-                </a:solidFill>
-                <a:latin typeface="Georgia" panose="02040502050405020303" pitchFamily="18" charset="0"/>
-              </a:rPr>
-              <a:t>js</a:t>
-            </a:r>
-            <a:r>
-              <a:rPr lang="en-GB" dirty="0">
-                <a:solidFill>
-                  <a:srgbClr val="737373"/>
-                </a:solidFill>
-                <a:latin typeface="Georgia" panose="02040502050405020303" pitchFamily="18" charset="0"/>
-              </a:rPr>
-              <a:t> (using node)</a:t>
-            </a:r>
-          </a:p>
-          <a:p>
-            <a:pPr marL="800100" lvl="1" indent="-342900">
-              <a:lnSpc>
-                <a:spcPct val="150000"/>
-              </a:lnSpc>
-              <a:buFont typeface="Arial" panose="020B0604020202020204" pitchFamily="34" charset="0"/>
-              <a:buChar char="•"/>
-            </a:pPr>
-            <a:r>
-              <a:rPr lang="en-GB" dirty="0">
-                <a:solidFill>
-                  <a:srgbClr val="737373"/>
-                </a:solidFill>
-                <a:latin typeface="Georgia" panose="02040502050405020303" pitchFamily="18" charset="0"/>
-              </a:rPr>
-              <a:t>.jar (using java)</a:t>
-            </a:r>
-          </a:p>
-          <a:p>
-            <a:pPr marL="342900" indent="-342900">
-              <a:lnSpc>
-                <a:spcPct val="150000"/>
-              </a:lnSpc>
-              <a:buFont typeface="Arial" panose="020B0604020202020204" pitchFamily="34" charset="0"/>
-              <a:buChar char="•"/>
-            </a:pPr>
-            <a:r>
-              <a:rPr lang="en-GB" dirty="0" smtClean="0">
-                <a:solidFill>
-                  <a:srgbClr val="737373"/>
-                </a:solidFill>
-                <a:latin typeface="Georgia" panose="02040502050405020303" pitchFamily="18" charset="0"/>
-              </a:rPr>
-              <a:t>Part of the </a:t>
-            </a:r>
-            <a:r>
-              <a:rPr lang="en-GB" dirty="0" err="1" smtClean="0">
+              <a:rPr lang="en-GB" sz="2000" dirty="0" err="1" smtClean="0">
                 <a:solidFill>
                   <a:srgbClr val="737373"/>
                 </a:solidFill>
@@ -13201,81 +13896,192 @@
               <a:t>WebApps</a:t>
             </a:r>
             <a:r>
-              <a:rPr lang="en-GB" dirty="0" smtClean="0">
+              <a:rPr lang="en-GB" sz="2000" dirty="0" smtClean="0">
                 <a:solidFill>
                   <a:srgbClr val="737373"/>
                 </a:solidFill>
                 <a:latin typeface="Georgia" panose="02040502050405020303" pitchFamily="18" charset="0"/>
               </a:rPr>
-              <a:t> service</a:t>
-            </a:r>
-          </a:p>
-          <a:p>
-            <a:pPr marL="342900" indent="-342900">
-              <a:lnSpc>
-                <a:spcPct val="150000"/>
-              </a:lnSpc>
-              <a:buFont typeface="Arial" panose="020B0604020202020204" pitchFamily="34" charset="0"/>
-              <a:buChar char="•"/>
-            </a:pPr>
-            <a:r>
-              <a:rPr lang="en-GB" dirty="0" err="1" smtClean="0">
+              <a:t> Vs </a:t>
+            </a:r>
+            <a:r>
+              <a:rPr lang="en-GB" sz="2000" dirty="0" err="1" smtClean="0">
                 <a:solidFill>
                   <a:srgbClr val="737373"/>
                 </a:solidFill>
                 <a:latin typeface="Georgia" panose="02040502050405020303" pitchFamily="18" charset="0"/>
               </a:rPr>
-              <a:t>WebJob</a:t>
-            </a:r>
-            <a:r>
-              <a:rPr lang="en-GB" dirty="0" smtClean="0">
+              <a:t>WebRoles</a:t>
+            </a:r>
+            <a:endParaRPr lang="en-GB" sz="2000" dirty="0" smtClean="0">
+              <a:solidFill>
+                <a:srgbClr val="737373"/>
+              </a:solidFill>
+              <a:latin typeface="Georgia" panose="02040502050405020303" pitchFamily="18" charset="0"/>
+            </a:endParaRPr>
+          </a:p>
+          <a:p>
+            <a:pPr marL="342900" indent="-342900">
+              <a:lnSpc>
+                <a:spcPct val="200000"/>
+              </a:lnSpc>
+              <a:buClr>
+                <a:srgbClr val="CB623C"/>
+              </a:buClr>
+              <a:buFont typeface="Georgia" panose="02040502050405020303" pitchFamily="18" charset="0"/>
+              <a:buChar char="»"/>
+            </a:pPr>
+            <a:r>
+              <a:rPr lang="en-GB" sz="2000" dirty="0" smtClean="0">
                 <a:solidFill>
                   <a:srgbClr val="737373"/>
                 </a:solidFill>
                 <a:latin typeface="Georgia" panose="02040502050405020303" pitchFamily="18" charset="0"/>
               </a:rPr>
-              <a:t> SDK makes interfacing with Azure components easy</a:t>
-            </a:r>
-          </a:p>
-          <a:p>
-            <a:pPr marL="342900" indent="-342900">
+              <a:t>Data Storage Options</a:t>
+            </a:r>
+          </a:p>
+          <a:p>
+            <a:pPr marL="800100" lvl="1" indent="-342900">
               <a:lnSpc>
-                <a:spcPct val="150000"/>
+                <a:spcPct val="200000"/>
               </a:lnSpc>
-              <a:buFont typeface="Arial" panose="020B0604020202020204" pitchFamily="34" charset="0"/>
-              <a:buChar char="•"/>
+              <a:buClr>
+                <a:srgbClr val="CB623C"/>
+              </a:buClr>
+              <a:buFont typeface="Georgia" panose="02040502050405020303" pitchFamily="18" charset="0"/>
+              <a:buChar char="»"/>
             </a:pPr>
             <a:r>
-              <a:rPr lang="en-GB" dirty="0" smtClean="0">
+              <a:rPr lang="en-GB" sz="2000" dirty="0" smtClean="0">
                 <a:solidFill>
                   <a:srgbClr val="737373"/>
                 </a:solidFill>
                 <a:latin typeface="Georgia" panose="02040502050405020303" pitchFamily="18" charset="0"/>
               </a:rPr>
-              <a:t>Can scale with your </a:t>
-            </a:r>
-            <a:r>
-              <a:rPr lang="en-GB" dirty="0" err="1" smtClean="0">
+              <a:t>Azure SQL</a:t>
+            </a:r>
+          </a:p>
+          <a:p>
+            <a:pPr marL="800100" lvl="1" indent="-342900">
+              <a:lnSpc>
+                <a:spcPct val="200000"/>
+              </a:lnSpc>
+              <a:buClr>
+                <a:srgbClr val="CB623C"/>
+              </a:buClr>
+              <a:buFont typeface="Georgia" panose="02040502050405020303" pitchFamily="18" charset="0"/>
+              <a:buChar char="»"/>
+            </a:pPr>
+            <a:r>
+              <a:rPr lang="en-GB" sz="2000" dirty="0" err="1" smtClean="0">
                 <a:solidFill>
                   <a:srgbClr val="737373"/>
                 </a:solidFill>
                 <a:latin typeface="Georgia" panose="02040502050405020303" pitchFamily="18" charset="0"/>
               </a:rPr>
-              <a:t>WebApp</a:t>
-            </a:r>
-            <a:endParaRPr lang="en-GB" dirty="0">
+              <a:t>DocumentDB</a:t>
+            </a:r>
+            <a:endParaRPr lang="en-GB" sz="2000" dirty="0" smtClean="0">
               <a:solidFill>
                 <a:srgbClr val="737373"/>
               </a:solidFill>
               <a:latin typeface="Georgia" panose="02040502050405020303" pitchFamily="18" charset="0"/>
             </a:endParaRPr>
           </a:p>
+          <a:p>
+            <a:pPr marL="800100" lvl="1" indent="-342900">
+              <a:lnSpc>
+                <a:spcPct val="200000"/>
+              </a:lnSpc>
+              <a:buClr>
+                <a:srgbClr val="CB623C"/>
+              </a:buClr>
+              <a:buFont typeface="Georgia" panose="02040502050405020303" pitchFamily="18" charset="0"/>
+              <a:buChar char="»"/>
+            </a:pPr>
+            <a:r>
+              <a:rPr lang="en-GB" sz="2000" dirty="0" smtClean="0">
+                <a:solidFill>
+                  <a:srgbClr val="737373"/>
+                </a:solidFill>
+                <a:latin typeface="Georgia" panose="02040502050405020303" pitchFamily="18" charset="0"/>
+              </a:rPr>
+              <a:t>Table Storage</a:t>
+            </a:r>
+          </a:p>
+          <a:p>
+            <a:pPr marL="342900" indent="-342900">
+              <a:lnSpc>
+                <a:spcPct val="200000"/>
+              </a:lnSpc>
+              <a:buClr>
+                <a:srgbClr val="CB623C"/>
+              </a:buClr>
+              <a:buFont typeface="Georgia" panose="02040502050405020303" pitchFamily="18" charset="0"/>
+              <a:buChar char="»"/>
+            </a:pPr>
+            <a:r>
+              <a:rPr lang="en-GB" sz="2000" dirty="0" smtClean="0">
+                <a:solidFill>
+                  <a:srgbClr val="737373"/>
+                </a:solidFill>
+                <a:latin typeface="Georgia" panose="02040502050405020303" pitchFamily="18" charset="0"/>
+              </a:rPr>
+              <a:t>Distributing </a:t>
+            </a:r>
+            <a:r>
+              <a:rPr lang="en-GB" sz="2000" dirty="0">
+                <a:solidFill>
+                  <a:srgbClr val="737373"/>
+                </a:solidFill>
+                <a:latin typeface="Georgia" panose="02040502050405020303" pitchFamily="18" charset="0"/>
+              </a:rPr>
+              <a:t>Your </a:t>
+            </a:r>
+            <a:r>
+              <a:rPr lang="en-GB" sz="2000" dirty="0" smtClean="0">
+                <a:solidFill>
+                  <a:srgbClr val="737373"/>
+                </a:solidFill>
+                <a:latin typeface="Georgia" panose="02040502050405020303" pitchFamily="18" charset="0"/>
+              </a:rPr>
+              <a:t>App</a:t>
+            </a:r>
+          </a:p>
+          <a:p>
+            <a:pPr marL="342900" indent="-342900">
+              <a:lnSpc>
+                <a:spcPct val="200000"/>
+              </a:lnSpc>
+              <a:buClr>
+                <a:srgbClr val="CB623C"/>
+              </a:buClr>
+              <a:buFont typeface="Georgia" panose="02040502050405020303" pitchFamily="18" charset="0"/>
+              <a:buChar char="»"/>
+            </a:pPr>
+            <a:r>
+              <a:rPr lang="en-GB" sz="2000" dirty="0">
+                <a:solidFill>
+                  <a:srgbClr val="737373"/>
+                </a:solidFill>
+                <a:latin typeface="Georgia" panose="02040502050405020303" pitchFamily="18" charset="0"/>
+              </a:rPr>
+              <a:t>Queuing</a:t>
+            </a:r>
+            <a:endParaRPr lang="en-GB" sz="2000" dirty="0">
+              <a:solidFill>
+                <a:srgbClr val="737373"/>
+              </a:solidFill>
+              <a:latin typeface="Georgia" panose="02040502050405020303" pitchFamily="18" charset="0"/>
+            </a:endParaRPr>
+          </a:p>
         </p:txBody>
       </p:sp>
     </p:spTree>
     <p:extLst>
       <p:ext uri="{BB962C8B-B14F-4D97-AF65-F5344CB8AC3E}">
-        <p14:creationId xmlns:p14="http://schemas.microsoft.com/office/powerpoint/2010/main" val="2639179751"/>
+        <p14:creationId xmlns:p14="http://schemas.microsoft.com/office/powerpoint/2010/main" val="2881485822"/>
       </p:ext>
     </p:extLst>
   </p:cSld>
@@ -13297,6 +14103,9 @@
                     <p:cTn id="3" fill="hold">
                       <p:stCondLst>
                         <p:cond delay="indefinite"/>
+                        <p:cond evt="onBegin" delay="0">
+                          <p:tn val="2"/>
+                        </p:cond>
                       </p:stCondLst>
                       <p:childTnLst>
                         <p:par>
@@ -13306,7 +14115,7 @@
                             </p:stCondLst>
                             <p:childTnLst>
                               <p:par>
-                                <p:cTn id="5" presetID="1" presetClass="entr" presetSubtype="0" fill="hold" nodeType="clickEffect">
+                                <p:cTn id="5" presetID="1" presetClass="entr" presetSubtype="0" fill="hold" nodeType="withEffect">
                                   <p:stCondLst>
                                     <p:cond delay="0"/>
                                   </p:stCondLst>
@@ -13319,7 +14128,7 @@
                                           </p:stCondLst>
                                         </p:cTn>
                                         <p:tgtEl>
-                                          <p:spTgt spid="5">
+                                          <p:spTgt spid="7">
                                             <p:txEl>
                                               <p:pRg st="0" end="0"/>
                                             </p:txEl>
@@ -13336,26 +14145,39 @@
                                   </p:childTnLst>
                                 </p:cTn>
                               </p:par>
-                            </p:childTnLst>
-                          </p:cTn>
-                        </p:par>
-                      </p:childTnLst>
-                    </p:cTn>
-                  </p:par>
-                  <p:par>
-                    <p:cTn id="7" fill="hold">
-                      <p:stCondLst>
-                        <p:cond delay="indefinite"/>
-                      </p:stCondLst>
-                      <p:childTnLst>
-                        <p:par>
-                          <p:cTn id="8" fill="hold">
-                            <p:stCondLst>
-                              <p:cond delay="0"/>
-                            </p:stCondLst>
-                            <p:childTnLst>
                               <p:par>
-                                <p:cTn id="9" presetID="1" presetClass="entr" presetSubtype="0" fill="hold" nodeType="clickEffect">
+                                <p:cTn id="7" presetID="1" presetClass="entr" presetSubtype="0" fill="hold" nodeType="withEffect">
+                                  <p:stCondLst>
+                                    <p:cond delay="0"/>
+                                  </p:stCondLst>
+                                  <p:childTnLst>
+                                    <p:set>
+                                      <p:cBhvr>
+                                        <p:cTn id="8" dur="1" fill="hold">
+                                          <p:stCondLst>
+                                            <p:cond delay="0"/>
+                                          </p:stCondLst>
+                                        </p:cTn>
+                                        <p:tgtEl>
+                                          <p:spTgt spid="7">
+                                            <p:txEl>
+                                              <p:pRg st="1" end="1"/>
+                                            </p:txEl>
+                                          </p:spTgt>
+                                        </p:tgtEl>
+                                        <p:attrNameLst>
+                                          <p:attrName>style.visibility</p:attrName>
+                                        </p:attrNameLst>
+                                      </p:cBhvr>
+                                      <p:to>
+                                        <p:strVal val="visible"/>
+                                      </p:to>
+                                    </p:set>
+                                  </p:childTnLst>
+                                </p:cTn>
+                              </p:par>
+                              <p:par>
+                                <p:cTn id="9" presetID="1" presetClass="entr" presetSubtype="0" fill="hold" nodeType="withEffect">
                                   <p:stCondLst>
                                     <p:cond delay="0"/>
                                   </p:stCondLst>
@@ -13368,9 +14190,9 @@
                                           </p:stCondLst>
                                         </p:cTn>
                                         <p:tgtEl>
-                                          <p:spTgt spid="5">
+                                          <p:spTgt spid="7">
                                             <p:txEl>
-                                              <p:pRg st="1" end="1"/>
+                                              <p:pRg st="2" end="2"/>
                                             </p:txEl>
                                           </p:spTgt>
                                         </p:tgtEl>
@@ -13399,9 +14221,9 @@
                                           </p:stCondLst>
                                         </p:cTn>
                                         <p:tgtEl>
-                                          <p:spTgt spid="5">
+                                          <p:spTgt spid="7">
                                             <p:txEl>
-                                              <p:pRg st="2" end="2"/>
+                                              <p:pRg st="3" end="3"/>
                                             </p:txEl>
                                           </p:spTgt>
                                         </p:tgtEl>
@@ -13430,311 +14252,9 @@
                                           </p:stCondLst>
                                         </p:cTn>
                                         <p:tgtEl>
-                                          <p:spTgt spid="5">
-                                            <p:txEl>
-                                              <p:pRg st="3" end="3"/>
-                                            </p:txEl>
-                                          </p:spTgt>
-                                        </p:tgtEl>
-                                        <p:attrNameLst>
-                                          <p:attrName>style.visibility</p:attrName>
-                                        </p:attrNameLst>
-                                      </p:cBhvr>
-                                      <p:to>
-                                        <p:strVal val="visible"/>
-                                      </p:to>
-                                    </p:set>
-                                  </p:childTnLst>
-                                </p:cTn>
-                              </p:par>
-                              <p:par>
-                                <p:cTn id="15" presetID="1" presetClass="entr" presetSubtype="0" fill="hold" nodeType="withEffect">
-                                  <p:stCondLst>
-                                    <p:cond delay="0"/>
-                                  </p:stCondLst>
-                                  <p:childTnLst>
-                                    <p:set>
-                                      <p:cBhvr>
-                                        <p:cTn id="16" dur="1" fill="hold">
-                                          <p:stCondLst>
-                                            <p:cond delay="0"/>
-                                          </p:stCondLst>
-                                        </p:cTn>
-                                        <p:tgtEl>
-                                          <p:spTgt spid="5">
+                                          <p:spTgt spid="7">
                                             <p:txEl>
                                               <p:pRg st="4" end="4"/>
-                                            </p:txEl>
-                                          </p:spTgt>
-                                        </p:tgtEl>
-                                        <p:attrNameLst>
-                                          <p:attrName>style.visibility</p:attrName>
-                                        </p:attrNameLst>
-                                      </p:cBhvr>
-                                      <p:to>
-                                        <p:strVal val="visible"/>
-                                      </p:to>
-                                    </p:set>
-                                  </p:childTnLst>
-                                </p:cTn>
-                              </p:par>
-                              <p:par>
-                                <p:cTn id="17" presetID="1" presetClass="entr" presetSubtype="0" fill="hold" nodeType="withEffect">
-                                  <p:stCondLst>
-                                    <p:cond delay="0"/>
-                                  </p:stCondLst>
-                                  <p:childTnLst>
-                                    <p:set>
-                                      <p:cBhvr>
-                                        <p:cTn id="18" dur="1" fill="hold">
-                                          <p:stCondLst>
-                                            <p:cond delay="0"/>
-                                          </p:stCondLst>
-                                        </p:cTn>
-                                        <p:tgtEl>
-                                          <p:spTgt spid="5">
-                                            <p:txEl>
-                                              <p:pRg st="5" end="5"/>
-                                            </p:txEl>
-                                          </p:spTgt>
-                                        </p:tgtEl>
-                                        <p:attrNameLst>
-                                          <p:attrName>style.visibility</p:attrName>
-                                        </p:attrNameLst>
-                                      </p:cBhvr>
-                                      <p:to>
-                                        <p:strVal val="visible"/>
-                                      </p:to>
-                                    </p:set>
-                                  </p:childTnLst>
-                                </p:cTn>
-                              </p:par>
-                              <p:par>
-                                <p:cTn id="19" presetID="1" presetClass="entr" presetSubtype="0" fill="hold" nodeType="withEffect">
-                                  <p:stCondLst>
-                                    <p:cond delay="0"/>
-                                  </p:stCondLst>
-                                  <p:childTnLst>
-                                    <p:set>
-                                      <p:cBhvr>
-                                        <p:cTn id="20" dur="1" fill="hold">
-                                          <p:stCondLst>
-                                            <p:cond delay="0"/>
-                                          </p:stCondLst>
-                                        </p:cTn>
-                                        <p:tgtEl>
-                                          <p:spTgt spid="5">
-                                            <p:txEl>
-                                              <p:pRg st="6" end="6"/>
-                                            </p:txEl>
-                                          </p:spTgt>
-                                        </p:tgtEl>
-                                        <p:attrNameLst>
-                                          <p:attrName>style.visibility</p:attrName>
-                                        </p:attrNameLst>
-                                      </p:cBhvr>
-                                      <p:to>
-                                        <p:strVal val="visible"/>
-                                      </p:to>
-                                    </p:set>
-                                  </p:childTnLst>
-                                </p:cTn>
-                              </p:par>
-                              <p:par>
-                                <p:cTn id="21" presetID="1" presetClass="entr" presetSubtype="0" fill="hold" nodeType="withEffect">
-                                  <p:stCondLst>
-                                    <p:cond delay="0"/>
-                                  </p:stCondLst>
-                                  <p:childTnLst>
-                                    <p:set>
-                                      <p:cBhvr>
-                                        <p:cTn id="22" dur="1" fill="hold">
-                                          <p:stCondLst>
-                                            <p:cond delay="0"/>
-                                          </p:stCondLst>
-                                        </p:cTn>
-                                        <p:tgtEl>
-                                          <p:spTgt spid="5">
-                                            <p:txEl>
-                                              <p:pRg st="7" end="7"/>
-                                            </p:txEl>
-                                          </p:spTgt>
-                                        </p:tgtEl>
-                                        <p:attrNameLst>
-                                          <p:attrName>style.visibility</p:attrName>
-                                        </p:attrNameLst>
-                                      </p:cBhvr>
-                                      <p:to>
-                                        <p:strVal val="visible"/>
-                                      </p:to>
-                                    </p:set>
-                                  </p:childTnLst>
-                                </p:cTn>
-                              </p:par>
-                              <p:par>
-                                <p:cTn id="23" presetID="1" presetClass="entr" presetSubtype="0" fill="hold" nodeType="withEffect">
-                                  <p:stCondLst>
-                                    <p:cond delay="0"/>
-                                  </p:stCondLst>
-                                  <p:childTnLst>
-                                    <p:set>
-                                      <p:cBhvr>
-                                        <p:cTn id="24" dur="1" fill="hold">
-                                          <p:stCondLst>
-                                            <p:cond delay="0"/>
-                                          </p:stCondLst>
-                                        </p:cTn>
-                                        <p:tgtEl>
-                                          <p:spTgt spid="5">
-                                            <p:txEl>
-                                              <p:pRg st="8" end="8"/>
-                                            </p:txEl>
-                                          </p:spTgt>
-                                        </p:tgtEl>
-                                        <p:attrNameLst>
-                                          <p:attrName>style.visibility</p:attrName>
-                                        </p:attrNameLst>
-                                      </p:cBhvr>
-                                      <p:to>
-                                        <p:strVal val="visible"/>
-                                      </p:to>
-                                    </p:set>
-                                  </p:childTnLst>
-                                </p:cTn>
-                              </p:par>
-                            </p:childTnLst>
-                          </p:cTn>
-                        </p:par>
-                      </p:childTnLst>
-                    </p:cTn>
-                  </p:par>
-                  <p:par>
-                    <p:cTn id="25" fill="hold">
-                      <p:stCondLst>
-                        <p:cond delay="indefinite"/>
-                      </p:stCondLst>
-                      <p:childTnLst>
-                        <p:par>
-                          <p:cTn id="26" fill="hold">
-                            <p:stCondLst>
-                              <p:cond delay="0"/>
-                            </p:stCondLst>
-                            <p:childTnLst>
-                              <p:par>
-                                <p:cTn id="27" presetID="1" presetClass="entr" presetSubtype="0" fill="hold" nodeType="clickEffect">
-                                  <p:stCondLst>
-                                    <p:cond delay="0"/>
-                                  </p:stCondLst>
-                                  <p:childTnLst>
-                                    <p:set>
-                                      <p:cBhvr>
-                                        <p:cTn id="28" dur="1" fill="hold">
-                                          <p:stCondLst>
-                                            <p:cond delay="0"/>
-                                          </p:stCondLst>
-                                        </p:cTn>
-                                        <p:tgtEl>
-                                          <p:spTgt spid="5">
-                                            <p:txEl>
-                                              <p:pRg st="9" end="9"/>
-                                            </p:txEl>
-                                          </p:spTgt>
-                                        </p:tgtEl>
-                                        <p:attrNameLst>
-                                          <p:attrName>style.visibility</p:attrName>
-                                        </p:attrNameLst>
-                                      </p:cBhvr>
-                                      <p:to>
-                                        <p:strVal val="visible"/>
-                                      </p:to>
-                                    </p:set>
-                                  </p:childTnLst>
-                                </p:cTn>
-                              </p:par>
-                            </p:childTnLst>
-                          </p:cTn>
-                        </p:par>
-                      </p:childTnLst>
-                    </p:cTn>
-                  </p:par>
-                  <p:par>
-                    <p:cTn id="29" fill="hold">
-                      <p:stCondLst>
-                        <p:cond delay="indefinite"/>
-                      </p:stCondLst>
-                      <p:childTnLst>
-                        <p:par>
-                          <p:cTn id="30" fill="hold">
-                            <p:stCondLst>
-                              <p:cond delay="0"/>
-                            </p:stCondLst>
-                            <p:childTnLst>
-                              <p:par>
-                                <p:cTn id="31" presetID="1" presetClass="entr" presetSubtype="0" fill="hold" nodeType="clickEffect">
-                                  <p:stCondLst>
-                                    <p:cond delay="0"/>
-                                  </p:stCondLst>
-                                  <p:childTnLst>
-                                    <p:set>
-                                      <p:cBhvr>
-                                        <p:cTn id="32" dur="1" fill="hold">
-                                          <p:stCondLst>
-                                            <p:cond delay="0"/>
-                                          </p:stCondLst>
-                                        </p:cTn>
-                                        <p:tgtEl>
-                                          <p:spTgt spid="5">
-                                            <p:txEl>
-                                              <p:pRg st="10" end="10"/>
-                                            </p:txEl>
-                                          </p:spTgt>
-                                        </p:tgtEl>
-                                        <p:attrNameLst>
-                                          <p:attrName>style.visibility</p:attrName>
-                                        </p:attrNameLst>
-                                      </p:cBhvr>
-                                      <p:to>
-                                        <p:strVal val="visible"/>
-                                      </p:to>
-                                    </p:set>
-                                  </p:childTnLst>
-                                </p:cTn>
-                              </p:par>
-                            </p:childTnLst>
-                          </p:cTn>
-                        </p:par>
-                      </p:childTnLst>
-                    </p:cTn>
-                  </p:par>
-                  <p:par>
-                    <p:cTn id="33" fill="hold">
-                      <p:stCondLst>
-                        <p:cond delay="indefinite"/>
-                      </p:stCondLst>
-                      <p:childTnLst>
-                        <p:par>
-                          <p:cTn id="34" fill="hold">
-                            <p:stCondLst>
-                              <p:cond delay="0"/>
-                            </p:stCondLst>
-                            <p:childTnLst>
-                              <p:par>
-                                <p:cTn id="35" presetID="1" presetClass="entr" presetSubtype="0" fill="hold" nodeType="clickEffect">
-                                  <p:stCondLst>
-                                    <p:cond delay="0"/>
-                                  </p:stCondLst>
-                                  <p:childTnLst>
-                                    <p:set>
-                                      <p:cBhvr>
-                                        <p:cTn id="36" dur="1" fill="hold">
-                                          <p:stCondLst>
-                                            <p:cond delay="0"/>
-                                          </p:stCondLst>
-                                        </p:cTn>
-                                        <p:tgtEl>
-                                          <p:spTgt spid="5">
-                                            <p:txEl>
-                                              <p:pRg st="11" end="11"/>
                                             </p:txEl>
                                           </p:spTgt>
                                         </p:tgtEl>
@@ -13780,289 +14300,7 @@
 </p:sld>
 </file>
 
-<file path=ppt/slides/slide25.xml><?xml version="1.0" encoding="utf-8"?>
-<p:sld xmlns:a="http://schemas.openxmlformats.org/drawingml/2006/main" xmlns:r="http://schemas.openxmlformats.org/officeDocument/2006/relationships" xmlns:p="http://schemas.openxmlformats.org/presentationml/2006/main">
-  <p:cSld>
-    <p:spTree>
-      <p:nvGrpSpPr>
-        <p:cNvPr id="1" name=""/>
-        <p:cNvGrpSpPr/>
-        <p:nvPr/>
-      </p:nvGrpSpPr>
-      <p:grpSpPr>
-        <a:xfrm>
-          <a:off x="0" y="0"/>
-          <a:ext cx="0" cy="0"/>
-          <a:chOff x="0" y="0"/>
-          <a:chExt cx="0" cy="0"/>
-        </a:xfrm>
-      </p:grpSpPr>
-      <p:sp>
-        <p:nvSpPr>
-          <p:cNvPr id="4" name="Title 3"/>
-          <p:cNvSpPr>
-            <a:spLocks noGrp="1"/>
-          </p:cNvSpPr>
-          <p:nvPr>
-            <p:ph type="title"/>
-          </p:nvPr>
-        </p:nvSpPr>
-        <p:spPr>
-          <a:xfrm>
-            <a:off x="0" y="122025"/>
-            <a:ext cx="9143999" cy="765081"/>
-          </a:xfrm>
-        </p:spPr>
-        <p:txBody>
-          <a:bodyPr anchor="ctr" anchorCtr="1">
-            <a:spAutoFit/>
-          </a:bodyPr>
-          <a:lstStyle/>
-          <a:p>
-            <a:r>
-              <a:rPr lang="en-GB" dirty="0" smtClean="0"/>
-              <a:t>Worker Roles</a:t>
-            </a:r>
-            <a:endParaRPr lang="en-GB" dirty="0"/>
-          </a:p>
-        </p:txBody>
-      </p:sp>
-      <p:pic>
-        <p:nvPicPr>
-          <p:cNvPr id="2" name="Picture 1"/>
-          <p:cNvPicPr>
-            <a:picLocks noChangeAspect="1"/>
-          </p:cNvPicPr>
-          <p:nvPr/>
-        </p:nvPicPr>
-        <p:blipFill>
-          <a:blip r:embed="rId3"/>
-          <a:stretch>
-            <a:fillRect/>
-          </a:stretch>
-        </p:blipFill>
-        <p:spPr>
-          <a:xfrm>
-            <a:off x="1709736" y="1412776"/>
-            <a:ext cx="5724525" cy="3743325"/>
-          </a:xfrm>
-          <a:prstGeom prst="rect">
-            <a:avLst/>
-          </a:prstGeom>
-        </p:spPr>
-      </p:pic>
-    </p:spTree>
-    <p:extLst>
-      <p:ext uri="{BB962C8B-B14F-4D97-AF65-F5344CB8AC3E}">
-        <p14:creationId xmlns:p14="http://schemas.microsoft.com/office/powerpoint/2010/main" val="2351633853"/>
-      </p:ext>
-    </p:extLst>
-  </p:cSld>
-  <p:clrMapOvr>
-    <a:masterClrMapping/>
-  </p:clrMapOvr>
-  <p:transition spd="slow">
-    <p:push/>
-  </p:transition>
-  <p:timing>
-    <p:tnLst>
-      <p:par>
-        <p:cTn id="1" dur="indefinite" restart="never" nodeType="tmRoot"/>
-      </p:par>
-    </p:tnLst>
-  </p:timing>
-</p:sld>
-</file>
-
-<file path=ppt/slides/slide26.xml><?xml version="1.0" encoding="utf-8"?>
-<p:sld xmlns:a="http://schemas.openxmlformats.org/drawingml/2006/main" xmlns:r="http://schemas.openxmlformats.org/officeDocument/2006/relationships" xmlns:p="http://schemas.openxmlformats.org/presentationml/2006/main">
-  <p:cSld>
-    <p:spTree>
-      <p:nvGrpSpPr>
-        <p:cNvPr id="1" name=""/>
-        <p:cNvGrpSpPr/>
-        <p:nvPr/>
-      </p:nvGrpSpPr>
-      <p:grpSpPr>
-        <a:xfrm>
-          <a:off x="0" y="0"/>
-          <a:ext cx="0" cy="0"/>
-          <a:chOff x="0" y="0"/>
-          <a:chExt cx="0" cy="0"/>
-        </a:xfrm>
-      </p:grpSpPr>
-      <p:sp>
-        <p:nvSpPr>
-          <p:cNvPr id="4" name="Title 3"/>
-          <p:cNvSpPr>
-            <a:spLocks noGrp="1"/>
-          </p:cNvSpPr>
-          <p:nvPr>
-            <p:ph type="title"/>
-          </p:nvPr>
-        </p:nvSpPr>
-        <p:spPr>
-          <a:xfrm>
-            <a:off x="0" y="122025"/>
-            <a:ext cx="9143999" cy="765081"/>
-          </a:xfrm>
-        </p:spPr>
-        <p:txBody>
-          <a:bodyPr anchor="ctr" anchorCtr="1">
-            <a:spAutoFit/>
-          </a:bodyPr>
-          <a:lstStyle/>
-          <a:p>
-            <a:r>
-              <a:rPr lang="en-GB" dirty="0" smtClean="0"/>
-              <a:t>Worker Roles</a:t>
-            </a:r>
-            <a:endParaRPr lang="en-GB" dirty="0"/>
-          </a:p>
-        </p:txBody>
-      </p:sp>
-      <p:pic>
-        <p:nvPicPr>
-          <p:cNvPr id="3" name="Picture 2"/>
-          <p:cNvPicPr>
-            <a:picLocks noChangeAspect="1"/>
-          </p:cNvPicPr>
-          <p:nvPr/>
-        </p:nvPicPr>
-        <p:blipFill>
-          <a:blip r:embed="rId3"/>
-          <a:stretch>
-            <a:fillRect/>
-          </a:stretch>
-        </p:blipFill>
-        <p:spPr>
-          <a:xfrm>
-            <a:off x="395534" y="1082696"/>
-            <a:ext cx="8352930" cy="5469886"/>
-          </a:xfrm>
-          <a:prstGeom prst="rect">
-            <a:avLst/>
-          </a:prstGeom>
-        </p:spPr>
-      </p:pic>
-    </p:spTree>
-    <p:extLst>
-      <p:ext uri="{BB962C8B-B14F-4D97-AF65-F5344CB8AC3E}">
-        <p14:creationId xmlns:p14="http://schemas.microsoft.com/office/powerpoint/2010/main" val="1880676854"/>
-      </p:ext>
-    </p:extLst>
-  </p:cSld>
-  <p:clrMapOvr>
-    <a:masterClrMapping/>
-  </p:clrMapOvr>
-  <p:transition spd="slow">
-    <p:push/>
-  </p:transition>
-  <p:timing>
-    <p:tnLst>
-      <p:par>
-        <p:cTn id="1" dur="indefinite" restart="never" nodeType="tmRoot"/>
-      </p:par>
-    </p:tnLst>
-  </p:timing>
-</p:sld>
-</file>
-
 <file path=ppt/slides/slide27.xml><?xml version="1.0" encoding="utf-8"?>
-<p:sld xmlns:a="http://schemas.openxmlformats.org/drawingml/2006/main" xmlns:r="http://schemas.openxmlformats.org/officeDocument/2006/relationships" xmlns:p="http://schemas.openxmlformats.org/presentationml/2006/main">
-  <p:cSld>
-    <p:spTree>
-      <p:nvGrpSpPr>
-        <p:cNvPr id="1" name=""/>
-        <p:cNvGrpSpPr/>
-        <p:nvPr/>
-      </p:nvGrpSpPr>
-      <p:grpSpPr>
-        <a:xfrm>
-          <a:off x="0" y="0"/>
-          <a:ext cx="0" cy="0"/>
-          <a:chOff x="0" y="0"/>
-          <a:chExt cx="0" cy="0"/>
-        </a:xfrm>
-      </p:grpSpPr>
-      <p:sp>
-        <p:nvSpPr>
-          <p:cNvPr id="4" name="Title 3"/>
-          <p:cNvSpPr>
-            <a:spLocks noGrp="1"/>
-          </p:cNvSpPr>
-          <p:nvPr>
-            <p:ph type="title"/>
-          </p:nvPr>
-        </p:nvSpPr>
-        <p:spPr>
-          <a:xfrm>
-            <a:off x="0" y="122025"/>
-            <a:ext cx="9143999" cy="765081"/>
-          </a:xfrm>
-        </p:spPr>
-        <p:txBody>
-          <a:bodyPr anchor="ctr" anchorCtr="1">
-            <a:spAutoFit/>
-          </a:bodyPr>
-          <a:lstStyle/>
-          <a:p>
-            <a:r>
-              <a:rPr lang="en-GB" dirty="0" smtClean="0"/>
-              <a:t>Worker Roles</a:t>
-            </a:r>
-            <a:endParaRPr lang="en-GB" dirty="0"/>
-          </a:p>
-        </p:txBody>
-      </p:sp>
-      <p:pic>
-        <p:nvPicPr>
-          <p:cNvPr id="5" name="Picture 4"/>
-          <p:cNvPicPr>
-            <a:picLocks noChangeAspect="1"/>
-          </p:cNvPicPr>
-          <p:nvPr/>
-        </p:nvPicPr>
-        <p:blipFill>
-          <a:blip r:embed="rId3"/>
-          <a:stretch>
-            <a:fillRect/>
-          </a:stretch>
-        </p:blipFill>
-        <p:spPr>
-          <a:xfrm>
-            <a:off x="827583" y="1268760"/>
-            <a:ext cx="7488832" cy="5188238"/>
-          </a:xfrm>
-          <a:prstGeom prst="rect">
-            <a:avLst/>
-          </a:prstGeom>
-        </p:spPr>
-      </p:pic>
-    </p:spTree>
-    <p:extLst>
-      <p:ext uri="{BB962C8B-B14F-4D97-AF65-F5344CB8AC3E}">
-        <p14:creationId xmlns:p14="http://schemas.microsoft.com/office/powerpoint/2010/main" val="3561315749"/>
-      </p:ext>
-    </p:extLst>
-  </p:cSld>
-  <p:clrMapOvr>
-    <a:masterClrMapping/>
-  </p:clrMapOvr>
-  <p:transition spd="slow">
-    <p:push/>
-  </p:transition>
-  <p:timing>
-    <p:tnLst>
-      <p:par>
-        <p:cTn id="1" dur="indefinite" restart="never" nodeType="tmRoot"/>
-      </p:par>
-    </p:tnLst>
-  </p:timing>
-</p:sld>
-</file>
-
-<file path=ppt/slides/slide28.xml><?xml version="1.0" encoding="utf-8"?>
 <p:sld xmlns:a="http://schemas.openxmlformats.org/drawingml/2006/main" xmlns:r="http://schemas.openxmlformats.org/officeDocument/2006/relationships" xmlns:p="http://schemas.openxmlformats.org/presentationml/2006/main">
   <p:cSld>
     <p:spTree>

</xml_diff>